<commit_message>
shared flags added to nemd.ppt
</commit_message>
<xml_diff>
--- a/docs/power_point/nemd.pptx
+++ b/docs/power_point/nemd.pptx
@@ -5,7 +5,7 @@
     <p:sldMasterId id="2147483648" r:id="rId1"/>
   </p:sldMasterIdLst>
   <p:notesMasterIdLst>
-    <p:notesMasterId r:id="rId17"/>
+    <p:notesMasterId r:id="rId18"/>
   </p:notesMasterIdLst>
   <p:sldIdLst>
     <p:sldId id="256" r:id="rId2"/>
@@ -22,7 +22,8 @@
     <p:sldId id="271" r:id="rId13"/>
     <p:sldId id="268" r:id="rId14"/>
     <p:sldId id="267" r:id="rId15"/>
-    <p:sldId id="265" r:id="rId16"/>
+    <p:sldId id="272" r:id="rId16"/>
+    <p:sldId id="265" r:id="rId17"/>
   </p:sldIdLst>
   <p:sldSz cx="12192000" cy="6858000"/>
   <p:notesSz cx="6858000" cy="9144000"/>
@@ -3130,7 +3131,7 @@
           <a:p>
             <a:fld id="{4E7935B3-F5AC-0F49-A77F-693DEAA46623}" type="datetimeFigureOut">
               <a:rPr lang="en-US" smtClean="0"/>
-              <a:t>2/2/25</a:t>
+              <a:t>2/3/25</a:t>
             </a:fld>
             <a:endParaRPr lang="en-US"/>
           </a:p>
@@ -3796,7 +3797,7 @@
           <a:p>
             <a:fld id="{7139230D-D256-FE47-99BF-6F642436F56E}" type="datetime1">
               <a:rPr lang="en-US" smtClean="0"/>
-              <a:t>2/2/25</a:t>
+              <a:t>2/3/25</a:t>
             </a:fld>
             <a:endParaRPr lang="en-US"/>
           </a:p>
@@ -3994,7 +3995,7 @@
           <a:p>
             <a:fld id="{785AC849-5CEB-3846-9265-8D72BE481A70}" type="datetime1">
               <a:rPr lang="en-US" smtClean="0"/>
-              <a:t>2/2/25</a:t>
+              <a:t>2/3/25</a:t>
             </a:fld>
             <a:endParaRPr lang="en-US"/>
           </a:p>
@@ -4202,7 +4203,7 @@
           <a:p>
             <a:fld id="{A02BBDEB-BEE0-FD44-AAFC-27969F9541FD}" type="datetime1">
               <a:rPr lang="en-US" smtClean="0"/>
-              <a:t>2/2/25</a:t>
+              <a:t>2/3/25</a:t>
             </a:fld>
             <a:endParaRPr lang="en-US"/>
           </a:p>
@@ -4400,7 +4401,7 @@
           <a:p>
             <a:fld id="{4F82860A-5855-1941-A1E0-F1AE52EC854D}" type="datetime1">
               <a:rPr lang="en-US" smtClean="0"/>
-              <a:t>2/2/25</a:t>
+              <a:t>2/3/25</a:t>
             </a:fld>
             <a:endParaRPr lang="en-US"/>
           </a:p>
@@ -4675,7 +4676,7 @@
           <a:p>
             <a:fld id="{6A874B4C-42F5-E24E-B25F-613EC7F4AF0D}" type="datetime1">
               <a:rPr lang="en-US" smtClean="0"/>
-              <a:t>2/2/25</a:t>
+              <a:t>2/3/25</a:t>
             </a:fld>
             <a:endParaRPr lang="en-US"/>
           </a:p>
@@ -4940,7 +4941,7 @@
           <a:p>
             <a:fld id="{9A2BCD20-0178-0C41-9D8E-10FA267A6CCC}" type="datetime1">
               <a:rPr lang="en-US" smtClean="0"/>
-              <a:t>2/2/25</a:t>
+              <a:t>2/3/25</a:t>
             </a:fld>
             <a:endParaRPr lang="en-US"/>
           </a:p>
@@ -5352,7 +5353,7 @@
           <a:p>
             <a:fld id="{EDE58456-60EB-6840-BCEB-E4C2678C039E}" type="datetime1">
               <a:rPr lang="en-US" smtClean="0"/>
-              <a:t>2/2/25</a:t>
+              <a:t>2/3/25</a:t>
             </a:fld>
             <a:endParaRPr lang="en-US"/>
           </a:p>
@@ -5493,7 +5494,7 @@
           <a:p>
             <a:fld id="{8BBFCD94-1F0D-3948-A9F0-DB82F9AAC2D3}" type="datetime1">
               <a:rPr lang="en-US" smtClean="0"/>
-              <a:t>2/2/25</a:t>
+              <a:t>2/3/25</a:t>
             </a:fld>
             <a:endParaRPr lang="en-US"/>
           </a:p>
@@ -5606,7 +5607,7 @@
           <a:p>
             <a:fld id="{13692FAC-AC21-0848-AC27-426B7BF29104}" type="datetime1">
               <a:rPr lang="en-US" smtClean="0"/>
-              <a:t>2/2/25</a:t>
+              <a:t>2/3/25</a:t>
             </a:fld>
             <a:endParaRPr lang="en-US"/>
           </a:p>
@@ -5917,7 +5918,7 @@
           <a:p>
             <a:fld id="{A3FF56F3-8608-FF4D-9C26-AE6D473095CB}" type="datetime1">
               <a:rPr lang="en-US" smtClean="0"/>
-              <a:t>2/2/25</a:t>
+              <a:t>2/3/25</a:t>
             </a:fld>
             <a:endParaRPr lang="en-US"/>
           </a:p>
@@ -6205,7 +6206,7 @@
           <a:p>
             <a:fld id="{58CC49A9-C646-2345-B4A7-439457175566}" type="datetime1">
               <a:rPr lang="en-US" smtClean="0"/>
-              <a:t>2/2/25</a:t>
+              <a:t>2/3/25</a:t>
             </a:fld>
             <a:endParaRPr lang="en-US"/>
           </a:p>
@@ -6446,7 +6447,7 @@
           <a:p>
             <a:fld id="{D516C8CC-C3CD-B94B-94D6-0913487DB5E5}" type="datetime1">
               <a:rPr lang="en-US" smtClean="0"/>
-              <a:t>2/2/25</a:t>
+              <a:t>2/3/25</a:t>
             </a:fld>
             <a:endParaRPr lang="en-US"/>
           </a:p>
@@ -15192,6 +15193,1323 @@
           <p:cNvPr id="2" name="Title 1">
             <a:extLst>
               <a:ext uri="{FF2B5EF4-FFF2-40B4-BE49-F238E27FC236}">
+                <a16:creationId xmlns:a16="http://schemas.microsoft.com/office/drawing/2014/main" id="{A88C344A-6936-3292-7B0A-CEBF0C3697D8}"/>
+              </a:ext>
+            </a:extLst>
+          </p:cNvPr>
+          <p:cNvSpPr>
+            <a:spLocks noGrp="1"/>
+          </p:cNvSpPr>
+          <p:nvPr>
+            <p:ph type="title"/>
+          </p:nvPr>
+        </p:nvSpPr>
+        <p:spPr/>
+        <p:txBody>
+          <a:bodyPr/>
+          <a:lstStyle/>
+          <a:p>
+            <a:r>
+              <a:rPr lang="en-US" dirty="0"/>
+              <a:t>Shared Flags</a:t>
+            </a:r>
+          </a:p>
+        </p:txBody>
+      </p:sp>
+      <p:sp>
+        <p:nvSpPr>
+          <p:cNvPr id="4" name="Slide Number Placeholder 3">
+            <a:extLst>
+              <a:ext uri="{FF2B5EF4-FFF2-40B4-BE49-F238E27FC236}">
+                <a16:creationId xmlns:a16="http://schemas.microsoft.com/office/drawing/2014/main" id="{CFBB0EB9-B9FD-2DC2-79C0-D12E70D80138}"/>
+              </a:ext>
+            </a:extLst>
+          </p:cNvPr>
+          <p:cNvSpPr>
+            <a:spLocks noGrp="1"/>
+          </p:cNvSpPr>
+          <p:nvPr>
+            <p:ph type="sldNum" sz="quarter" idx="12"/>
+          </p:nvPr>
+        </p:nvSpPr>
+        <p:spPr/>
+        <p:txBody>
+          <a:bodyPr/>
+          <a:lstStyle/>
+          <a:p>
+            <a:fld id="{CF79FC58-3559-EC47-B32E-5EF128B06581}" type="slidenum">
+              <a:rPr lang="en-US" smtClean="0"/>
+              <a:t>15</a:t>
+            </a:fld>
+            <a:endParaRPr lang="en-US"/>
+          </a:p>
+        </p:txBody>
+      </p:sp>
+      <p:graphicFrame>
+        <p:nvGraphicFramePr>
+          <p:cNvPr id="7" name="Table 6">
+            <a:extLst>
+              <a:ext uri="{FF2B5EF4-FFF2-40B4-BE49-F238E27FC236}">
+                <a16:creationId xmlns:a16="http://schemas.microsoft.com/office/drawing/2014/main" id="{067DFA66-50BE-1E11-024B-05226D2C6393}"/>
+              </a:ext>
+            </a:extLst>
+          </p:cNvPr>
+          <p:cNvGraphicFramePr>
+            <a:graphicFrameLocks noGrp="1"/>
+          </p:cNvGraphicFramePr>
+          <p:nvPr>
+            <p:extLst>
+              <p:ext uri="{D42A27DB-BD31-4B8C-83A1-F6EECF244321}">
+                <p14:modId xmlns:p14="http://schemas.microsoft.com/office/powerpoint/2010/main" val="207351834"/>
+              </p:ext>
+            </p:extLst>
+          </p:nvPr>
+        </p:nvGraphicFramePr>
+        <p:xfrm>
+          <a:off x="947990" y="1449442"/>
+          <a:ext cx="10076429" cy="2595880"/>
+        </p:xfrm>
+        <a:graphic>
+          <a:graphicData uri="http://schemas.openxmlformats.org/drawingml/2006/table">
+            <a:tbl>
+              <a:tblPr firstRow="1" bandRow="1">
+                <a:tableStyleId>{69CF1AB2-1976-4502-BF36-3FF5EA218861}</a:tableStyleId>
+              </a:tblPr>
+              <a:tblGrid>
+                <a:gridCol w="2460344">
+                  <a:extLst>
+                    <a:ext uri="{9D8B030D-6E8A-4147-A177-3AD203B41FA5}">
+                      <a16:colId xmlns:a16="http://schemas.microsoft.com/office/drawing/2014/main" val="578952244"/>
+                    </a:ext>
+                  </a:extLst>
+                </a:gridCol>
+                <a:gridCol w="3316931">
+                  <a:extLst>
+                    <a:ext uri="{9D8B030D-6E8A-4147-A177-3AD203B41FA5}">
+                      <a16:colId xmlns:a16="http://schemas.microsoft.com/office/drawing/2014/main" val="3414224844"/>
+                    </a:ext>
+                  </a:extLst>
+                </a:gridCol>
+                <a:gridCol w="4299154">
+                  <a:extLst>
+                    <a:ext uri="{9D8B030D-6E8A-4147-A177-3AD203B41FA5}">
+                      <a16:colId xmlns:a16="http://schemas.microsoft.com/office/drawing/2014/main" val="2334211859"/>
+                    </a:ext>
+                  </a:extLst>
+                </a:gridCol>
+              </a:tblGrid>
+              <a:tr h="370840">
+                <a:tc>
+                  <a:txBody>
+                    <a:bodyPr/>
+                    <a:lstStyle/>
+                    <a:p>
+                      <a:r>
+                        <a:rPr lang="en-US" sz="1400" dirty="0"/>
+                        <a:t>Script Flag</a:t>
+                      </a:r>
+                    </a:p>
+                  </a:txBody>
+                  <a:tcPr/>
+                </a:tc>
+                <a:tc>
+                  <a:txBody>
+                    <a:bodyPr/>
+                    <a:lstStyle/>
+                    <a:p>
+                      <a:r>
+                        <a:rPr lang="en-US" sz="1400" dirty="0"/>
+                        <a:t>Description</a:t>
+                      </a:r>
+                    </a:p>
+                  </a:txBody>
+                  <a:tcPr/>
+                </a:tc>
+                <a:tc>
+                  <a:txBody>
+                    <a:bodyPr/>
+                    <a:lstStyle/>
+                    <a:p>
+                      <a:r>
+                        <a:rPr lang="en-US" sz="1400" dirty="0"/>
+                        <a:t>Comment</a:t>
+                      </a:r>
+                    </a:p>
+                  </a:txBody>
+                  <a:tcPr/>
+                </a:tc>
+                <a:extLst>
+                  <a:ext uri="{0D108BD9-81ED-4DB2-BD59-A6C34878D82A}">
+                    <a16:rowId xmlns:a16="http://schemas.microsoft.com/office/drawing/2014/main" val="3806641120"/>
+                  </a:ext>
+                </a:extLst>
+              </a:tr>
+              <a:tr h="370840">
+                <a:tc>
+                  <a:txBody>
+                    <a:bodyPr/>
+                    <a:lstStyle/>
+                    <a:p>
+                      <a:r>
+                        <a:rPr lang="en-US" sz="1400" kern="1200" dirty="0">
+                          <a:solidFill>
+                            <a:schemeClr val="dk1"/>
+                          </a:solidFill>
+                          <a:latin typeface="+mn-lt"/>
+                          <a:ea typeface="+mn-ea"/>
+                          <a:cs typeface="+mn-cs"/>
+                        </a:rPr>
+                        <a:t>-seed SEED</a:t>
+                      </a:r>
+                    </a:p>
+                  </a:txBody>
+                  <a:tcPr/>
+                </a:tc>
+                <a:tc>
+                  <a:txBody>
+                    <a:bodyPr/>
+                    <a:lstStyle/>
+                    <a:p>
+                      <a:pPr marL="0" marR="0" lvl="0" indent="0" algn="l" defTabSz="914400" rtl="0" eaLnBrk="1" fontAlgn="auto" latinLnBrk="0" hangingPunct="1">
+                        <a:lnSpc>
+                          <a:spcPct val="100000"/>
+                        </a:lnSpc>
+                        <a:spcBef>
+                          <a:spcPts val="0"/>
+                        </a:spcBef>
+                        <a:spcAft>
+                          <a:spcPts val="0"/>
+                        </a:spcAft>
+                        <a:buClrTx/>
+                        <a:buSzTx/>
+                        <a:buFontTx/>
+                        <a:buNone/>
+                        <a:tabLst/>
+                        <a:defRPr/>
+                      </a:pPr>
+                      <a:r>
+                        <a:rPr lang="en-US" sz="1400" kern="1200" dirty="0">
+                          <a:solidFill>
+                            <a:schemeClr val="dk1"/>
+                          </a:solidFill>
+                          <a:latin typeface="+mn-lt"/>
+                          <a:ea typeface="+mn-ea"/>
+                          <a:cs typeface="+mn-cs"/>
+                        </a:rPr>
+                        <a:t>Set random state</a:t>
+                      </a:r>
+                    </a:p>
+                  </a:txBody>
+                  <a:tcPr/>
+                </a:tc>
+                <a:tc>
+                  <a:txBody>
+                    <a:bodyPr/>
+                    <a:lstStyle/>
+                    <a:p>
+                      <a:pPr marL="0" marR="0" lvl="0" indent="0" algn="l" defTabSz="914400" rtl="0" eaLnBrk="1" fontAlgn="auto" latinLnBrk="0" hangingPunct="1">
+                        <a:lnSpc>
+                          <a:spcPct val="100000"/>
+                        </a:lnSpc>
+                        <a:spcBef>
+                          <a:spcPts val="0"/>
+                        </a:spcBef>
+                        <a:spcAft>
+                          <a:spcPts val="0"/>
+                        </a:spcAft>
+                        <a:buClrTx/>
+                        <a:buSzTx/>
+                        <a:buFontTx/>
+                        <a:buNone/>
+                        <a:tabLst/>
+                        <a:defRPr/>
+                      </a:pPr>
+                      <a:r>
+                        <a:rPr lang="en-US" sz="1400" kern="1200" dirty="0">
+                          <a:solidFill>
+                            <a:schemeClr val="dk1"/>
+                          </a:solidFill>
+                          <a:latin typeface="+mn-lt"/>
+                          <a:ea typeface="+mn-ea"/>
+                          <a:cs typeface="+mn-cs"/>
+                        </a:rPr>
+                        <a:t>Randomize coordinate, velocity, sequence, selection, etc.</a:t>
+                      </a:r>
+                    </a:p>
+                  </a:txBody>
+                  <a:tcPr/>
+                </a:tc>
+                <a:extLst>
+                  <a:ext uri="{0D108BD9-81ED-4DB2-BD59-A6C34878D82A}">
+                    <a16:rowId xmlns:a16="http://schemas.microsoft.com/office/drawing/2014/main" val="3976651731"/>
+                  </a:ext>
+                </a:extLst>
+              </a:tr>
+              <a:tr h="370840">
+                <a:tc>
+                  <a:txBody>
+                    <a:bodyPr/>
+                    <a:lstStyle/>
+                    <a:p>
+                      <a:r>
+                        <a:rPr lang="en-US" sz="1400" kern="1200" dirty="0">
+                          <a:solidFill>
+                            <a:schemeClr val="dk1"/>
+                          </a:solidFill>
+                          <a:latin typeface="+mn-lt"/>
+                          <a:ea typeface="+mn-ea"/>
+                          <a:cs typeface="+mn-cs"/>
+                        </a:rPr>
+                        <a:t>-JOBNAME JOBNAME</a:t>
+                      </a:r>
+                    </a:p>
+                  </a:txBody>
+                  <a:tcPr/>
+                </a:tc>
+                <a:tc>
+                  <a:txBody>
+                    <a:bodyPr/>
+                    <a:lstStyle/>
+                    <a:p>
+                      <a:r>
+                        <a:rPr lang="en-US" sz="1400" kern="1200" dirty="0">
+                          <a:solidFill>
+                            <a:schemeClr val="dk1"/>
+                          </a:solidFill>
+                          <a:latin typeface="+mn-lt"/>
+                          <a:ea typeface="+mn-ea"/>
+                          <a:cs typeface="+mn-cs"/>
+                        </a:rPr>
+                        <a:t>Name output files</a:t>
+                      </a:r>
+                    </a:p>
+                  </a:txBody>
+                  <a:tcPr/>
+                </a:tc>
+                <a:tc>
+                  <a:txBody>
+                    <a:bodyPr/>
+                    <a:lstStyle/>
+                    <a:p>
+                      <a:r>
+                        <a:rPr lang="en-US" sz="1400" kern="1200" dirty="0">
+                          <a:solidFill>
+                            <a:schemeClr val="dk1"/>
+                          </a:solidFill>
+                          <a:latin typeface="+mn-lt"/>
+                          <a:ea typeface="+mn-ea"/>
+                          <a:cs typeface="+mn-cs"/>
+                        </a:rPr>
+                        <a:t>Jobname.{log, csv, data, </a:t>
+                      </a:r>
+                      <a:r>
+                        <a:rPr lang="en-US" sz="1400" kern="1200" dirty="0" err="1">
+                          <a:solidFill>
+                            <a:schemeClr val="dk1"/>
+                          </a:solidFill>
+                          <a:latin typeface="+mn-lt"/>
+                          <a:ea typeface="+mn-ea"/>
+                          <a:cs typeface="+mn-cs"/>
+                        </a:rPr>
+                        <a:t>npz</a:t>
+                      </a:r>
+                      <a:r>
+                        <a:rPr lang="en-US" sz="1400" kern="1200" dirty="0">
+                          <a:solidFill>
+                            <a:schemeClr val="dk1"/>
+                          </a:solidFill>
+                          <a:latin typeface="+mn-lt"/>
+                          <a:ea typeface="+mn-ea"/>
+                          <a:cs typeface="+mn-cs"/>
+                        </a:rPr>
+                        <a:t>, parquet, etc.}</a:t>
+                      </a:r>
+                    </a:p>
+                  </a:txBody>
+                  <a:tcPr/>
+                </a:tc>
+                <a:extLst>
+                  <a:ext uri="{0D108BD9-81ED-4DB2-BD59-A6C34878D82A}">
+                    <a16:rowId xmlns:a16="http://schemas.microsoft.com/office/drawing/2014/main" val="2853868156"/>
+                  </a:ext>
+                </a:extLst>
+              </a:tr>
+              <a:tr h="370840">
+                <a:tc>
+                  <a:txBody>
+                    <a:bodyPr/>
+                    <a:lstStyle/>
+                    <a:p>
+                      <a:r>
+                        <a:rPr lang="en-US" sz="1400" kern="1200" dirty="0">
+                          <a:solidFill>
+                            <a:schemeClr val="dk1"/>
+                          </a:solidFill>
+                          <a:latin typeface="+mn-lt"/>
+                          <a:ea typeface="+mn-ea"/>
+                          <a:cs typeface="+mn-cs"/>
+                        </a:rPr>
+                        <a:t>-INTERACTIVE</a:t>
+                      </a:r>
+                    </a:p>
+                  </a:txBody>
+                  <a:tcPr/>
+                </a:tc>
+                <a:tc>
+                  <a:txBody>
+                    <a:bodyPr/>
+                    <a:lstStyle/>
+                    <a:p>
+                      <a:pPr marL="0" marR="0" lvl="0" indent="0" algn="l" defTabSz="914400" rtl="0" eaLnBrk="1" fontAlgn="auto" latinLnBrk="0" hangingPunct="1">
+                        <a:lnSpc>
+                          <a:spcPct val="100000"/>
+                        </a:lnSpc>
+                        <a:spcBef>
+                          <a:spcPts val="0"/>
+                        </a:spcBef>
+                        <a:spcAft>
+                          <a:spcPts val="0"/>
+                        </a:spcAft>
+                        <a:buClrTx/>
+                        <a:buSzTx/>
+                        <a:buFontTx/>
+                        <a:buNone/>
+                        <a:tabLst/>
+                        <a:defRPr/>
+                      </a:pPr>
+                      <a:r>
+                        <a:rPr lang="en-US" sz="1400" kern="1200" dirty="0">
+                          <a:solidFill>
+                            <a:schemeClr val="dk1"/>
+                          </a:solidFill>
+                          <a:latin typeface="+mn-lt"/>
+                          <a:ea typeface="+mn-ea"/>
+                          <a:cs typeface="+mn-cs"/>
+                        </a:rPr>
+                        <a:t>Pause for user input</a:t>
+                      </a:r>
+                    </a:p>
+                  </a:txBody>
+                  <a:tcPr/>
+                </a:tc>
+                <a:tc>
+                  <a:txBody>
+                    <a:bodyPr/>
+                    <a:lstStyle/>
+                    <a:p>
+                      <a:pPr marL="0" marR="0" lvl="0" indent="0" algn="l" defTabSz="914400" rtl="0" eaLnBrk="1" fontAlgn="auto" latinLnBrk="0" hangingPunct="1">
+                        <a:lnSpc>
+                          <a:spcPct val="100000"/>
+                        </a:lnSpc>
+                        <a:spcBef>
+                          <a:spcPts val="0"/>
+                        </a:spcBef>
+                        <a:spcAft>
+                          <a:spcPts val="0"/>
+                        </a:spcAft>
+                        <a:buClrTx/>
+                        <a:buSzTx/>
+                        <a:buFontTx/>
+                        <a:buNone/>
+                        <a:tabLst/>
+                        <a:defRPr/>
+                      </a:pPr>
+                      <a:r>
+                        <a:rPr lang="en-US" sz="1400" kern="1200" dirty="0">
+                          <a:solidFill>
+                            <a:schemeClr val="dk1"/>
+                          </a:solidFill>
+                          <a:latin typeface="+mn-lt"/>
+                          <a:ea typeface="+mn-ea"/>
+                          <a:cs typeface="+mn-cs"/>
+                        </a:rPr>
+                        <a:t>Zoom in / out figure, set initial guess, etc.</a:t>
+                      </a:r>
+                    </a:p>
+                  </a:txBody>
+                  <a:tcPr/>
+                </a:tc>
+                <a:extLst>
+                  <a:ext uri="{0D108BD9-81ED-4DB2-BD59-A6C34878D82A}">
+                    <a16:rowId xmlns:a16="http://schemas.microsoft.com/office/drawing/2014/main" val="885736037"/>
+                  </a:ext>
+                </a:extLst>
+              </a:tr>
+              <a:tr h="370840">
+                <a:tc>
+                  <a:txBody>
+                    <a:bodyPr/>
+                    <a:lstStyle/>
+                    <a:p>
+                      <a:r>
+                        <a:rPr lang="en-US" sz="1400" kern="1200" dirty="0">
+                          <a:solidFill>
+                            <a:schemeClr val="dk1"/>
+                          </a:solidFill>
+                          <a:latin typeface="+mn-lt"/>
+                          <a:ea typeface="+mn-ea"/>
+                          <a:cs typeface="+mn-cs"/>
+                        </a:rPr>
+                        <a:t>-PYTHON {-1,0,1,2}</a:t>
+                      </a:r>
+                    </a:p>
+                  </a:txBody>
+                  <a:tcPr/>
+                </a:tc>
+                <a:tc>
+                  <a:txBody>
+                    <a:bodyPr/>
+                    <a:lstStyle/>
+                    <a:p>
+                      <a:r>
+                        <a:rPr lang="en-US" sz="1400" kern="1200" dirty="0">
+                          <a:solidFill>
+                            <a:schemeClr val="dk1"/>
+                          </a:solidFill>
+                          <a:latin typeface="+mn-lt"/>
+                          <a:ea typeface="+mn-ea"/>
+                          <a:cs typeface="+mn-cs"/>
+                        </a:rPr>
+                        <a:t>0: native; 1: compiled; 2: cached</a:t>
+                      </a:r>
+                    </a:p>
+                  </a:txBody>
+                  <a:tcPr/>
+                </a:tc>
+                <a:tc>
+                  <a:txBody>
+                    <a:bodyPr/>
+                    <a:lstStyle/>
+                    <a:p>
+                      <a:r>
+                        <a:rPr lang="en-US" sz="1400" kern="1200" dirty="0">
+                          <a:solidFill>
+                            <a:schemeClr val="dk1"/>
+                          </a:solidFill>
+                          <a:latin typeface="+mn-lt"/>
+                          <a:ea typeface="+mn-ea"/>
+                          <a:cs typeface="+mn-cs"/>
+                        </a:rPr>
+                        <a:t>High performance compiled python.</a:t>
+                      </a:r>
+                    </a:p>
+                  </a:txBody>
+                  <a:tcPr/>
+                </a:tc>
+                <a:extLst>
+                  <a:ext uri="{0D108BD9-81ED-4DB2-BD59-A6C34878D82A}">
+                    <a16:rowId xmlns:a16="http://schemas.microsoft.com/office/drawing/2014/main" val="3812749967"/>
+                  </a:ext>
+                </a:extLst>
+              </a:tr>
+              <a:tr h="370840">
+                <a:tc>
+                  <a:txBody>
+                    <a:bodyPr/>
+                    <a:lstStyle/>
+                    <a:p>
+                      <a:r>
+                        <a:rPr lang="en-US" sz="1400" kern="1200" dirty="0">
+                          <a:solidFill>
+                            <a:schemeClr val="dk1"/>
+                          </a:solidFill>
+                          <a:latin typeface="+mn-lt"/>
+                          <a:ea typeface="+mn-ea"/>
+                          <a:cs typeface="+mn-cs"/>
+                        </a:rPr>
+                        <a:t>-</a:t>
+                      </a:r>
+                      <a:r>
+                        <a:rPr lang="en-US" sz="1400" kern="1200" dirty="0" err="1">
+                          <a:solidFill>
+                            <a:schemeClr val="dk1"/>
+                          </a:solidFill>
+                          <a:latin typeface="+mn-lt"/>
+                          <a:ea typeface="+mn-ea"/>
+                          <a:cs typeface="+mn-cs"/>
+                        </a:rPr>
+                        <a:t>cpu</a:t>
+                      </a:r>
+                      <a:r>
+                        <a:rPr lang="en-US" sz="1400" kern="1200" dirty="0">
+                          <a:solidFill>
+                            <a:schemeClr val="dk1"/>
+                          </a:solidFill>
+                          <a:latin typeface="+mn-lt"/>
+                          <a:ea typeface="+mn-ea"/>
+                          <a:cs typeface="+mn-cs"/>
+                        </a:rPr>
+                        <a:t> CPU [CPU ...]</a:t>
+                      </a:r>
+                    </a:p>
+                  </a:txBody>
+                  <a:tcPr/>
+                </a:tc>
+                <a:tc>
+                  <a:txBody>
+                    <a:bodyPr/>
+                    <a:lstStyle/>
+                    <a:p>
+                      <a:r>
+                        <a:rPr lang="en-US" sz="1400" kern="1200" dirty="0">
+                          <a:solidFill>
+                            <a:schemeClr val="dk1"/>
+                          </a:solidFill>
+                          <a:latin typeface="+mn-lt"/>
+                          <a:ea typeface="+mn-ea"/>
+                          <a:cs typeface="+mn-cs"/>
+                        </a:rPr>
+                        <a:t>Total number of CPUs [num for one task]</a:t>
+                      </a:r>
+                    </a:p>
+                  </a:txBody>
+                  <a:tcPr/>
+                </a:tc>
+                <a:tc>
+                  <a:txBody>
+                    <a:bodyPr/>
+                    <a:lstStyle/>
+                    <a:p>
+                      <a:r>
+                        <a:rPr lang="en-US" sz="1400" kern="1200" dirty="0">
+                          <a:solidFill>
+                            <a:schemeClr val="dk1"/>
+                          </a:solidFill>
+                          <a:latin typeface="+mn-lt"/>
+                          <a:ea typeface="+mn-ea"/>
+                          <a:cs typeface="+mn-cs"/>
+                        </a:rPr>
+                        <a:t>Limit the total resource and max single consumption </a:t>
+                      </a:r>
+                    </a:p>
+                  </a:txBody>
+                  <a:tcPr/>
+                </a:tc>
+                <a:extLst>
+                  <a:ext uri="{0D108BD9-81ED-4DB2-BD59-A6C34878D82A}">
+                    <a16:rowId xmlns:a16="http://schemas.microsoft.com/office/drawing/2014/main" val="2459397568"/>
+                  </a:ext>
+                </a:extLst>
+              </a:tr>
+              <a:tr h="370840">
+                <a:tc>
+                  <a:txBody>
+                    <a:bodyPr/>
+                    <a:lstStyle/>
+                    <a:p>
+                      <a:r>
+                        <a:rPr lang="en-US" sz="1400" kern="1200" dirty="0">
+                          <a:solidFill>
+                            <a:schemeClr val="dk1"/>
+                          </a:solidFill>
+                          <a:latin typeface="+mn-lt"/>
+                          <a:ea typeface="+mn-ea"/>
+                          <a:cs typeface="+mn-cs"/>
+                        </a:rPr>
+                        <a:t>-DEBUG</a:t>
+                      </a:r>
+                    </a:p>
+                  </a:txBody>
+                  <a:tcPr/>
+                </a:tc>
+                <a:tc>
+                  <a:txBody>
+                    <a:bodyPr/>
+                    <a:lstStyle/>
+                    <a:p>
+                      <a:pPr marL="0" marR="0" lvl="0" indent="0" algn="l" defTabSz="914400" rtl="0" eaLnBrk="1" fontAlgn="auto" latinLnBrk="0" hangingPunct="1">
+                        <a:lnSpc>
+                          <a:spcPct val="100000"/>
+                        </a:lnSpc>
+                        <a:spcBef>
+                          <a:spcPts val="0"/>
+                        </a:spcBef>
+                        <a:spcAft>
+                          <a:spcPts val="0"/>
+                        </a:spcAft>
+                        <a:buClrTx/>
+                        <a:buSzTx/>
+                        <a:buFontTx/>
+                        <a:buNone/>
+                        <a:tabLst/>
+                        <a:defRPr/>
+                      </a:pPr>
+                      <a:r>
+                        <a:rPr lang="en-US" sz="1400" kern="1200" dirty="0">
+                          <a:solidFill>
+                            <a:schemeClr val="dk1"/>
+                          </a:solidFill>
+                          <a:latin typeface="+mn-lt"/>
+                          <a:ea typeface="+mn-ea"/>
+                          <a:cs typeface="+mn-cs"/>
+                        </a:rPr>
+                        <a:t>Additional printing and output files</a:t>
+                      </a:r>
+                    </a:p>
+                  </a:txBody>
+                  <a:tcPr/>
+                </a:tc>
+                <a:tc>
+                  <a:txBody>
+                    <a:bodyPr/>
+                    <a:lstStyle/>
+                    <a:p>
+                      <a:pPr marL="0" marR="0" lvl="0" indent="0" algn="l" defTabSz="914400" rtl="0" eaLnBrk="1" fontAlgn="auto" latinLnBrk="0" hangingPunct="1">
+                        <a:lnSpc>
+                          <a:spcPct val="100000"/>
+                        </a:lnSpc>
+                        <a:spcBef>
+                          <a:spcPts val="0"/>
+                        </a:spcBef>
+                        <a:spcAft>
+                          <a:spcPts val="0"/>
+                        </a:spcAft>
+                        <a:buClrTx/>
+                        <a:buSzTx/>
+                        <a:buFontTx/>
+                        <a:buNone/>
+                        <a:tabLst/>
+                        <a:defRPr/>
+                      </a:pPr>
+                      <a:r>
+                        <a:rPr lang="en-US" sz="1400" kern="1200" dirty="0">
+                          <a:solidFill>
+                            <a:schemeClr val="dk1"/>
+                          </a:solidFill>
+                          <a:latin typeface="+mn-lt"/>
+                          <a:ea typeface="+mn-ea"/>
+                          <a:cs typeface="+mn-cs"/>
+                        </a:rPr>
+                        <a:t>Surfaces the issues instead of prioritizing performance</a:t>
+                      </a:r>
+                    </a:p>
+                  </a:txBody>
+                  <a:tcPr/>
+                </a:tc>
+                <a:extLst>
+                  <a:ext uri="{0D108BD9-81ED-4DB2-BD59-A6C34878D82A}">
+                    <a16:rowId xmlns:a16="http://schemas.microsoft.com/office/drawing/2014/main" val="3160089168"/>
+                  </a:ext>
+                </a:extLst>
+              </a:tr>
+            </a:tbl>
+          </a:graphicData>
+        </a:graphic>
+      </p:graphicFrame>
+      <p:graphicFrame>
+        <p:nvGraphicFramePr>
+          <p:cNvPr id="8" name="Table 7">
+            <a:extLst>
+              <a:ext uri="{FF2B5EF4-FFF2-40B4-BE49-F238E27FC236}">
+                <a16:creationId xmlns:a16="http://schemas.microsoft.com/office/drawing/2014/main" id="{0CC97128-65D5-F9CE-8A26-7A7EF3F7ADF3}"/>
+              </a:ext>
+            </a:extLst>
+          </p:cNvPr>
+          <p:cNvGraphicFramePr>
+            <a:graphicFrameLocks noGrp="1"/>
+          </p:cNvGraphicFramePr>
+          <p:nvPr>
+            <p:extLst>
+              <p:ext uri="{D42A27DB-BD31-4B8C-83A1-F6EECF244321}">
+                <p14:modId xmlns:p14="http://schemas.microsoft.com/office/powerpoint/2010/main" val="733147631"/>
+              </p:ext>
+            </p:extLst>
+          </p:nvPr>
+        </p:nvGraphicFramePr>
+        <p:xfrm>
+          <a:off x="947992" y="4262120"/>
+          <a:ext cx="10076428" cy="2148840"/>
+        </p:xfrm>
+        <a:graphic>
+          <a:graphicData uri="http://schemas.openxmlformats.org/drawingml/2006/table">
+            <a:tbl>
+              <a:tblPr firstRow="1" bandRow="1">
+                <a:tableStyleId>{69CF1AB2-1976-4502-BF36-3FF5EA218861}</a:tableStyleId>
+              </a:tblPr>
+              <a:tblGrid>
+                <a:gridCol w="2452919">
+                  <a:extLst>
+                    <a:ext uri="{9D8B030D-6E8A-4147-A177-3AD203B41FA5}">
+                      <a16:colId xmlns:a16="http://schemas.microsoft.com/office/drawing/2014/main" val="578952244"/>
+                    </a:ext>
+                  </a:extLst>
+                </a:gridCol>
+                <a:gridCol w="3331728">
+                  <a:extLst>
+                    <a:ext uri="{9D8B030D-6E8A-4147-A177-3AD203B41FA5}">
+                      <a16:colId xmlns:a16="http://schemas.microsoft.com/office/drawing/2014/main" val="3414224844"/>
+                    </a:ext>
+                  </a:extLst>
+                </a:gridCol>
+                <a:gridCol w="4291781">
+                  <a:extLst>
+                    <a:ext uri="{9D8B030D-6E8A-4147-A177-3AD203B41FA5}">
+                      <a16:colId xmlns:a16="http://schemas.microsoft.com/office/drawing/2014/main" val="2624247841"/>
+                    </a:ext>
+                  </a:extLst>
+                </a:gridCol>
+              </a:tblGrid>
+              <a:tr h="370840">
+                <a:tc>
+                  <a:txBody>
+                    <a:bodyPr/>
+                    <a:lstStyle/>
+                    <a:p>
+                      <a:r>
+                        <a:rPr lang="en-US" sz="1400" dirty="0"/>
+                        <a:t>Workflow Flag</a:t>
+                      </a:r>
+                    </a:p>
+                  </a:txBody>
+                  <a:tcPr/>
+                </a:tc>
+                <a:tc>
+                  <a:txBody>
+                    <a:bodyPr/>
+                    <a:lstStyle/>
+                    <a:p>
+                      <a:r>
+                        <a:rPr lang="en-US" sz="1400" dirty="0"/>
+                        <a:t>Description</a:t>
+                      </a:r>
+                    </a:p>
+                  </a:txBody>
+                  <a:tcPr/>
+                </a:tc>
+                <a:tc>
+                  <a:txBody>
+                    <a:bodyPr/>
+                    <a:lstStyle/>
+                    <a:p>
+                      <a:pPr marL="0" marR="0" lvl="0" indent="0" algn="l" defTabSz="914400" rtl="0" eaLnBrk="1" fontAlgn="auto" latinLnBrk="0" hangingPunct="1">
+                        <a:lnSpc>
+                          <a:spcPct val="100000"/>
+                        </a:lnSpc>
+                        <a:spcBef>
+                          <a:spcPts val="0"/>
+                        </a:spcBef>
+                        <a:spcAft>
+                          <a:spcPts val="0"/>
+                        </a:spcAft>
+                        <a:buClrTx/>
+                        <a:buSzTx/>
+                        <a:buFontTx/>
+                        <a:buNone/>
+                        <a:tabLst/>
+                        <a:defRPr/>
+                      </a:pPr>
+                      <a:r>
+                        <a:rPr lang="en-US" sz="1400" dirty="0"/>
+                        <a:t>Comment</a:t>
+                      </a:r>
+                    </a:p>
+                  </a:txBody>
+                  <a:tcPr/>
+                </a:tc>
+                <a:extLst>
+                  <a:ext uri="{0D108BD9-81ED-4DB2-BD59-A6C34878D82A}">
+                    <a16:rowId xmlns:a16="http://schemas.microsoft.com/office/drawing/2014/main" val="3806641120"/>
+                  </a:ext>
+                </a:extLst>
+              </a:tr>
+              <a:tr h="370840">
+                <a:tc>
+                  <a:txBody>
+                    <a:bodyPr/>
+                    <a:lstStyle/>
+                    <a:p>
+                      <a:r>
+                        <a:rPr lang="en-US" sz="1400" kern="1200" dirty="0">
+                          <a:solidFill>
+                            <a:schemeClr val="dk1"/>
+                          </a:solidFill>
+                          <a:latin typeface="+mn-lt"/>
+                          <a:ea typeface="+mn-ea"/>
+                          <a:cs typeface="+mn-cs"/>
+                        </a:rPr>
+                        <a:t>-</a:t>
+                      </a:r>
+                      <a:r>
+                        <a:rPr lang="en-US" sz="1400" kern="1200" dirty="0" err="1">
+                          <a:solidFill>
+                            <a:schemeClr val="dk1"/>
+                          </a:solidFill>
+                          <a:latin typeface="+mn-lt"/>
+                          <a:ea typeface="+mn-ea"/>
+                          <a:cs typeface="+mn-cs"/>
+                        </a:rPr>
+                        <a:t>jtype</a:t>
+                      </a:r>
+                      <a:r>
+                        <a:rPr lang="en-US" sz="1400" kern="1200" dirty="0">
+                          <a:solidFill>
+                            <a:schemeClr val="dk1"/>
+                          </a:solidFill>
+                          <a:latin typeface="+mn-lt"/>
+                          <a:ea typeface="+mn-ea"/>
+                          <a:cs typeface="+mn-cs"/>
+                        </a:rPr>
+                        <a:t> {</a:t>
+                      </a:r>
+                      <a:r>
+                        <a:rPr lang="en-US" sz="1400" kern="1200" dirty="0" err="1">
+                          <a:solidFill>
+                            <a:schemeClr val="dk1"/>
+                          </a:solidFill>
+                          <a:latin typeface="+mn-lt"/>
+                          <a:ea typeface="+mn-ea"/>
+                          <a:cs typeface="+mn-cs"/>
+                        </a:rPr>
+                        <a:t>task,aggregator</a:t>
+                      </a:r>
+                      <a:r>
+                        <a:rPr lang="en-US" sz="1400" kern="1200" dirty="0">
+                          <a:solidFill>
+                            <a:schemeClr val="dk1"/>
+                          </a:solidFill>
+                          <a:latin typeface="+mn-lt"/>
+                          <a:ea typeface="+mn-ea"/>
+                          <a:cs typeface="+mn-cs"/>
+                        </a:rPr>
+                        <a:t>}</a:t>
+                      </a:r>
+                    </a:p>
+                  </a:txBody>
+                  <a:tcPr/>
+                </a:tc>
+                <a:tc>
+                  <a:txBody>
+                    <a:bodyPr/>
+                    <a:lstStyle/>
+                    <a:p>
+                      <a:r>
+                        <a:rPr lang="en-US" sz="1400" kern="1200" dirty="0">
+                          <a:solidFill>
+                            <a:schemeClr val="dk1"/>
+                          </a:solidFill>
+                          <a:latin typeface="+mn-lt"/>
+                          <a:ea typeface="+mn-ea"/>
+                          <a:cs typeface="+mn-cs"/>
+                        </a:rPr>
+                        <a:t>task handles calculations and registers files</a:t>
+                      </a:r>
+                    </a:p>
+                    <a:p>
+                      <a:r>
+                        <a:rPr lang="en-US" sz="1400" kern="1200" dirty="0">
+                          <a:solidFill>
+                            <a:schemeClr val="dk1"/>
+                          </a:solidFill>
+                          <a:latin typeface="+mn-lt"/>
+                          <a:ea typeface="+mn-ea"/>
+                          <a:cs typeface="+mn-cs"/>
+                        </a:rPr>
+                        <a:t>aggregator collects results</a:t>
+                      </a:r>
+                    </a:p>
+                  </a:txBody>
+                  <a:tcPr/>
+                </a:tc>
+                <a:tc>
+                  <a:txBody>
+                    <a:bodyPr/>
+                    <a:lstStyle/>
+                    <a:p>
+                      <a:r>
+                        <a:rPr lang="en-US" sz="1400" kern="1200" dirty="0">
+                          <a:solidFill>
+                            <a:schemeClr val="dk1"/>
+                          </a:solidFill>
+                          <a:latin typeface="+mn-lt"/>
+                          <a:ea typeface="+mn-ea"/>
+                          <a:cs typeface="+mn-cs"/>
+                        </a:rPr>
+                        <a:t>High-cost tasks and light-weight aggregators can run either serially or separately.</a:t>
+                      </a:r>
+                    </a:p>
+                  </a:txBody>
+                  <a:tcPr/>
+                </a:tc>
+                <a:extLst>
+                  <a:ext uri="{0D108BD9-81ED-4DB2-BD59-A6C34878D82A}">
+                    <a16:rowId xmlns:a16="http://schemas.microsoft.com/office/drawing/2014/main" val="2853868156"/>
+                  </a:ext>
+                </a:extLst>
+              </a:tr>
+              <a:tr h="370840">
+                <a:tc>
+                  <a:txBody>
+                    <a:bodyPr/>
+                    <a:lstStyle/>
+                    <a:p>
+                      <a:r>
+                        <a:rPr lang="en-US" sz="1400" kern="1200" dirty="0">
+                          <a:solidFill>
+                            <a:schemeClr val="dk1"/>
+                          </a:solidFill>
+                          <a:latin typeface="+mn-lt"/>
+                          <a:ea typeface="+mn-ea"/>
+                          <a:cs typeface="+mn-cs"/>
+                        </a:rPr>
+                        <a:t>-clean</a:t>
+                      </a:r>
+                    </a:p>
+                  </a:txBody>
+                  <a:tcPr/>
+                </a:tc>
+                <a:tc>
+                  <a:txBody>
+                    <a:bodyPr/>
+                    <a:lstStyle/>
+                    <a:p>
+                      <a:pPr marL="0" marR="0" lvl="0" indent="0" algn="l" defTabSz="914400" rtl="0" eaLnBrk="1" fontAlgn="auto" latinLnBrk="0" hangingPunct="1">
+                        <a:lnSpc>
+                          <a:spcPct val="100000"/>
+                        </a:lnSpc>
+                        <a:spcBef>
+                          <a:spcPts val="0"/>
+                        </a:spcBef>
+                        <a:spcAft>
+                          <a:spcPts val="0"/>
+                        </a:spcAft>
+                        <a:buClrTx/>
+                        <a:buSzTx/>
+                        <a:buFontTx/>
+                        <a:buNone/>
+                        <a:tabLst/>
+                        <a:defRPr/>
+                      </a:pPr>
+                      <a:r>
+                        <a:rPr lang="en-US" sz="1400" kern="1200" dirty="0">
+                          <a:solidFill>
+                            <a:schemeClr val="dk1"/>
+                          </a:solidFill>
+                          <a:latin typeface="+mn-lt"/>
+                          <a:ea typeface="+mn-ea"/>
+                          <a:cs typeface="+mn-cs"/>
+                        </a:rPr>
+                        <a:t>Clean previous results</a:t>
+                      </a:r>
+                    </a:p>
+                  </a:txBody>
+                  <a:tcPr/>
+                </a:tc>
+                <a:tc>
+                  <a:txBody>
+                    <a:bodyPr/>
+                    <a:lstStyle/>
+                    <a:p>
+                      <a:pPr marL="0" marR="0" lvl="0" indent="0" algn="l" defTabSz="914400" rtl="0" eaLnBrk="1" fontAlgn="auto" latinLnBrk="0" hangingPunct="1">
+                        <a:lnSpc>
+                          <a:spcPct val="100000"/>
+                        </a:lnSpc>
+                        <a:spcBef>
+                          <a:spcPts val="0"/>
+                        </a:spcBef>
+                        <a:spcAft>
+                          <a:spcPts val="0"/>
+                        </a:spcAft>
+                        <a:buClrTx/>
+                        <a:buSzTx/>
+                        <a:buFontTx/>
+                        <a:buNone/>
+                        <a:tabLst/>
+                        <a:defRPr/>
+                      </a:pPr>
+                      <a:r>
+                        <a:rPr lang="en-US" sz="1400" kern="1200" dirty="0">
+                          <a:solidFill>
+                            <a:schemeClr val="dk1"/>
+                          </a:solidFill>
+                          <a:latin typeface="+mn-lt"/>
+                          <a:ea typeface="+mn-ea"/>
+                          <a:cs typeface="+mn-cs"/>
+                        </a:rPr>
+                        <a:t>Run on top of previous results or from scratches</a:t>
+                      </a:r>
+                    </a:p>
+                  </a:txBody>
+                  <a:tcPr/>
+                </a:tc>
+                <a:extLst>
+                  <a:ext uri="{0D108BD9-81ED-4DB2-BD59-A6C34878D82A}">
+                    <a16:rowId xmlns:a16="http://schemas.microsoft.com/office/drawing/2014/main" val="885736037"/>
+                  </a:ext>
+                </a:extLst>
+              </a:tr>
+              <a:tr h="370840">
+                <a:tc>
+                  <a:txBody>
+                    <a:bodyPr/>
+                    <a:lstStyle/>
+                    <a:p>
+                      <a:r>
+                        <a:rPr lang="en-US" sz="1400" kern="1200" dirty="0">
+                          <a:solidFill>
+                            <a:schemeClr val="dk1"/>
+                          </a:solidFill>
+                          <a:latin typeface="+mn-lt"/>
+                          <a:ea typeface="+mn-ea"/>
+                          <a:cs typeface="+mn-cs"/>
+                        </a:rPr>
+                        <a:t>-screen {</a:t>
+                      </a:r>
+                      <a:r>
+                        <a:rPr lang="en-US" sz="1400" kern="1200" dirty="0" err="1">
+                          <a:solidFill>
+                            <a:schemeClr val="dk1"/>
+                          </a:solidFill>
+                          <a:latin typeface="+mn-lt"/>
+                          <a:ea typeface="+mn-ea"/>
+                          <a:cs typeface="+mn-cs"/>
+                        </a:rPr>
+                        <a:t>tqdm,progress,job,off</a:t>
+                      </a:r>
+                      <a:r>
+                        <a:rPr lang="en-US" sz="1400" kern="1200" dirty="0">
+                          <a:solidFill>
+                            <a:schemeClr val="dk1"/>
+                          </a:solidFill>
+                          <a:latin typeface="+mn-lt"/>
+                          <a:ea typeface="+mn-ea"/>
+                          <a:cs typeface="+mn-cs"/>
+                        </a:rPr>
+                        <a:t>}</a:t>
+                      </a:r>
+                    </a:p>
+                  </a:txBody>
+                  <a:tcPr/>
+                </a:tc>
+                <a:tc>
+                  <a:txBody>
+                    <a:bodyPr/>
+                    <a:lstStyle/>
+                    <a:p>
+                      <a:r>
+                        <a:rPr lang="en-US" sz="1400" kern="1200" dirty="0">
+                          <a:solidFill>
+                            <a:schemeClr val="dk1"/>
+                          </a:solidFill>
+                          <a:latin typeface="+mn-lt"/>
+                          <a:ea typeface="+mn-ea"/>
+                          <a:cs typeface="+mn-cs"/>
+                        </a:rPr>
+                        <a:t>Print the serialization </a:t>
+                      </a:r>
+                      <a:r>
+                        <a:rPr lang="en-US" sz="1400" kern="1200" dirty="0" err="1">
+                          <a:solidFill>
+                            <a:schemeClr val="dk1"/>
+                          </a:solidFill>
+                          <a:latin typeface="+mn-lt"/>
+                          <a:ea typeface="+mn-ea"/>
+                          <a:cs typeface="+mn-cs"/>
+                        </a:rPr>
+                        <a:t>tqdm</a:t>
+                      </a:r>
+                      <a:r>
+                        <a:rPr lang="en-US" sz="1400" kern="1200" dirty="0">
+                          <a:solidFill>
+                            <a:schemeClr val="dk1"/>
+                          </a:solidFill>
+                          <a:latin typeface="+mn-lt"/>
+                          <a:ea typeface="+mn-ea"/>
+                          <a:cs typeface="+mn-cs"/>
+                        </a:rPr>
+                        <a:t>, parallelization progress, and job details</a:t>
+                      </a:r>
+                    </a:p>
+                  </a:txBody>
+                  <a:tcPr/>
+                </a:tc>
+                <a:tc>
+                  <a:txBody>
+                    <a:bodyPr/>
+                    <a:lstStyle/>
+                    <a:p>
+                      <a:r>
+                        <a:rPr lang="en-US" sz="1400" kern="1200" dirty="0">
+                          <a:solidFill>
+                            <a:schemeClr val="dk1"/>
+                          </a:solidFill>
+                          <a:latin typeface="+mn-lt"/>
+                          <a:ea typeface="+mn-ea"/>
+                          <a:cs typeface="+mn-cs"/>
+                        </a:rPr>
+                        <a:t>Run batch script silently or with selected printing</a:t>
+                      </a:r>
+                    </a:p>
+                  </a:txBody>
+                  <a:tcPr/>
+                </a:tc>
+                <a:extLst>
+                  <a:ext uri="{0D108BD9-81ED-4DB2-BD59-A6C34878D82A}">
+                    <a16:rowId xmlns:a16="http://schemas.microsoft.com/office/drawing/2014/main" val="3812749967"/>
+                  </a:ext>
+                </a:extLst>
+              </a:tr>
+              <a:tr h="370840">
+                <a:tc>
+                  <a:txBody>
+                    <a:bodyPr/>
+                    <a:lstStyle/>
+                    <a:p>
+                      <a:r>
+                        <a:rPr lang="en-US" sz="1400" kern="1200" dirty="0">
+                          <a:solidFill>
+                            <a:schemeClr val="dk1"/>
+                          </a:solidFill>
+                          <a:latin typeface="+mn-lt"/>
+                          <a:ea typeface="+mn-ea"/>
+                          <a:cs typeface="+mn-cs"/>
+                        </a:rPr>
+                        <a:t>-DEBUG [{</a:t>
+                      </a:r>
+                      <a:r>
+                        <a:rPr lang="en-US" sz="1400" kern="1200" dirty="0" err="1">
+                          <a:solidFill>
+                            <a:schemeClr val="dk1"/>
+                          </a:solidFill>
+                          <a:latin typeface="+mn-lt"/>
+                          <a:ea typeface="+mn-ea"/>
+                          <a:cs typeface="+mn-cs"/>
+                        </a:rPr>
+                        <a:t>on,off</a:t>
+                      </a:r>
+                      <a:r>
+                        <a:rPr lang="en-US" sz="1400" kern="1200" dirty="0">
+                          <a:solidFill>
+                            <a:schemeClr val="dk1"/>
+                          </a:solidFill>
+                          <a:latin typeface="+mn-lt"/>
+                          <a:ea typeface="+mn-ea"/>
+                          <a:cs typeface="+mn-cs"/>
+                        </a:rPr>
+                        <a:t>}]</a:t>
+                      </a:r>
+                    </a:p>
+                  </a:txBody>
+                  <a:tcPr/>
+                </a:tc>
+                <a:tc>
+                  <a:txBody>
+                    <a:bodyPr/>
+                    <a:lstStyle/>
+                    <a:p>
+                      <a:pPr marL="0" marR="0" lvl="0" indent="0" algn="l" defTabSz="914400" rtl="0" eaLnBrk="1" fontAlgn="auto" latinLnBrk="0" hangingPunct="1">
+                        <a:lnSpc>
+                          <a:spcPct val="100000"/>
+                        </a:lnSpc>
+                        <a:spcBef>
+                          <a:spcPts val="0"/>
+                        </a:spcBef>
+                        <a:spcAft>
+                          <a:spcPts val="0"/>
+                        </a:spcAft>
+                        <a:buClrTx/>
+                        <a:buSzTx/>
+                        <a:buFontTx/>
+                        <a:buNone/>
+                        <a:tabLst/>
+                        <a:defRPr/>
+                      </a:pPr>
+                      <a:r>
+                        <a:rPr lang="en-US" sz="1400" kern="1200" dirty="0">
+                          <a:solidFill>
+                            <a:schemeClr val="dk1"/>
+                          </a:solidFill>
+                          <a:latin typeface="+mn-lt"/>
+                          <a:ea typeface="+mn-ea"/>
+                          <a:cs typeface="+mn-cs"/>
+                        </a:rPr>
+                        <a:t>Additional printing and output files</a:t>
+                      </a:r>
+                    </a:p>
+                  </a:txBody>
+                  <a:tcPr/>
+                </a:tc>
+                <a:tc>
+                  <a:txBody>
+                    <a:bodyPr/>
+                    <a:lstStyle/>
+                    <a:p>
+                      <a:pPr marL="0" marR="0" lvl="0" indent="0" algn="l" defTabSz="914400" rtl="0" eaLnBrk="1" fontAlgn="auto" latinLnBrk="0" hangingPunct="1">
+                        <a:lnSpc>
+                          <a:spcPct val="100000"/>
+                        </a:lnSpc>
+                        <a:spcBef>
+                          <a:spcPts val="0"/>
+                        </a:spcBef>
+                        <a:spcAft>
+                          <a:spcPts val="0"/>
+                        </a:spcAft>
+                        <a:buClrTx/>
+                        <a:buSzTx/>
+                        <a:buFontTx/>
+                        <a:buNone/>
+                        <a:tabLst/>
+                        <a:defRPr/>
+                      </a:pPr>
+                      <a:r>
+                        <a:rPr lang="en-US" sz="1400" kern="1200" dirty="0">
+                          <a:solidFill>
+                            <a:schemeClr val="dk1"/>
+                          </a:solidFill>
+                          <a:latin typeface="+mn-lt"/>
+                          <a:ea typeface="+mn-ea"/>
+                          <a:cs typeface="+mn-cs"/>
+                        </a:rPr>
+                        <a:t>Set or let the sub-jobs set the debug mode</a:t>
+                      </a:r>
+                    </a:p>
+                  </a:txBody>
+                  <a:tcPr/>
+                </a:tc>
+                <a:extLst>
+                  <a:ext uri="{0D108BD9-81ED-4DB2-BD59-A6C34878D82A}">
+                    <a16:rowId xmlns:a16="http://schemas.microsoft.com/office/drawing/2014/main" val="3160089168"/>
+                  </a:ext>
+                </a:extLst>
+              </a:tr>
+            </a:tbl>
+          </a:graphicData>
+        </a:graphic>
+      </p:graphicFrame>
+    </p:spTree>
+    <p:extLst>
+      <p:ext uri="{BB962C8B-B14F-4D97-AF65-F5344CB8AC3E}">
+        <p14:creationId xmlns:p14="http://schemas.microsoft.com/office/powerpoint/2010/main" val="3199098768"/>
+      </p:ext>
+    </p:extLst>
+  </p:cSld>
+  <p:clrMapOvr>
+    <a:masterClrMapping/>
+  </p:clrMapOvr>
+</p:sld>
+</file>
+
+<file path=ppt/slides/slide16.xml><?xml version="1.0" encoding="utf-8"?>
+<p:sld xmlns:a="http://schemas.openxmlformats.org/drawingml/2006/main" xmlns:r="http://schemas.openxmlformats.org/officeDocument/2006/relationships" xmlns:p="http://schemas.openxmlformats.org/presentationml/2006/main">
+  <p:cSld>
+    <p:spTree>
+      <p:nvGrpSpPr>
+        <p:cNvPr id="1" name=""/>
+        <p:cNvGrpSpPr/>
+        <p:nvPr/>
+      </p:nvGrpSpPr>
+      <p:grpSpPr>
+        <a:xfrm>
+          <a:off x="0" y="0"/>
+          <a:ext cx="0" cy="0"/>
+          <a:chOff x="0" y="0"/>
+          <a:chExt cx="0" cy="0"/>
+        </a:xfrm>
+      </p:grpSpPr>
+      <p:sp>
+        <p:nvSpPr>
+          <p:cNvPr id="2" name="Title 1">
+            <a:extLst>
+              <a:ext uri="{FF2B5EF4-FFF2-40B4-BE49-F238E27FC236}">
                 <a16:creationId xmlns:a16="http://schemas.microsoft.com/office/drawing/2014/main" id="{2336F0F3-2CAE-174E-A141-B83E10C0D34A}"/>
               </a:ext>
             </a:extLst>
@@ -15326,7 +16644,7 @@
           <a:p>
             <a:fld id="{CF79FC58-3559-EC47-B32E-5EF128B06581}" type="slidenum">
               <a:rPr lang="en-US" smtClean="0"/>
-              <a:t>15</a:t>
+              <a:t>16</a:t>
             </a:fld>
             <a:endParaRPr lang="en-US"/>
           </a:p>
@@ -16394,7 +17712,7 @@
                   <a:schemeClr val="accent1"/>
                 </a:solidFill>
               </a:rPr>
-              <a:t># Distribute python, shell, and data</a:t>
+              <a:t># Distribute shell, python, and data</a:t>
             </a:r>
             <a:br>
               <a:rPr lang="en-US" sz="1400" dirty="0">
@@ -16431,21 +17749,6 @@
               </a:rPr>
               <a:t>()</a:t>
             </a:r>
-          </a:p>
-          <a:p>
-            <a:endParaRPr lang="en-US" sz="1400" dirty="0">
-              <a:solidFill>
-                <a:schemeClr val="tx1"/>
-              </a:solidFill>
-              <a:effectLst/>
-            </a:endParaRPr>
-          </a:p>
-          <a:p>
-            <a:endParaRPr lang="en-US" sz="1400" dirty="0">
-              <a:solidFill>
-                <a:schemeClr val="tx1"/>
-              </a:solidFill>
-            </a:endParaRPr>
           </a:p>
           <a:p>
             <a:endParaRPr lang="en-US" sz="1400" dirty="0">
@@ -16931,7 +18234,7 @@
         </p:nvSpPr>
         <p:spPr>
           <a:xfrm>
-            <a:off x="5970243" y="2361381"/>
+            <a:off x="5970243" y="4464099"/>
             <a:ext cx="1007840" cy="369332"/>
           </a:xfrm>
           <a:prstGeom prst="rect">
@@ -27168,8 +28471,8 @@
         </p:nvSpPr>
         <p:spPr>
           <a:xfrm>
-            <a:off x="259878" y="1963691"/>
-            <a:ext cx="12057247" cy="4114800"/>
+            <a:off x="429485" y="1963691"/>
+            <a:ext cx="11206992" cy="4524315"/>
           </a:xfrm>
           <a:prstGeom prst="rect">
             <a:avLst/>
@@ -27306,7 +28609,7 @@
             </a:br>
             <a:r>
               <a:rPr lang="en-US" sz="1200" dirty="0"/>
-              <a:t>  NEMD_SRC="$0" &amp;&amp; echo "Shell Type: </a:t>
+              <a:t>  NEMD_SRC="$0" &amp;&amp; echo "</a:t>
             </a:r>
             <a:r>
               <a:rPr lang="en-US" sz="1200" dirty="0" err="1"/>
@@ -27339,7 +28642,7 @@
             </a:br>
             <a:r>
               <a:rPr lang="en-US" sz="1200" dirty="0"/>
-              <a:t>  NEMD_SRC=${BASH_SOURCE[0]} &amp;&amp; echo "Shell Type: POSIX"</a:t>
+              <a:t>  NEMD_SRC=${BASH_SOURCE[0]} &amp;&amp; echo "POSIX"</a:t>
             </a:r>
             <a:br>
               <a:rPr lang="en-US" sz="1200" dirty="0"/>
@@ -27361,7 +28664,7 @@
             </a:r>
             <a:r>
               <a:rPr lang="en-US" sz="1200" dirty="0"/>
-              <a:t> -p $$ -Fn0 | tail -1 | tr -d "\0")" &amp;&amp; NEMD_SRC=${x#*n} &amp;&amp; echo "Shell Type: dash"</a:t>
+              <a:t> -p $$ -Fn0 | tail -1 | tr -d "\0")" &amp;&amp; NEMD_SRC=${x#*n} &amp;&amp; echo "dash"</a:t>
             </a:r>
             <a:br>
               <a:rPr lang="en-US" sz="1200" dirty="0"/>
@@ -27504,24 +28807,6 @@
             </a:endParaRPr>
           </a:p>
           <a:p>
-            <a:endParaRPr lang="en-US" sz="1200" dirty="0">
-              <a:ln w="0"/>
-              <a:solidFill>
-                <a:schemeClr val="accent1"/>
-              </a:solidFill>
-              <a:effectLst>
-                <a:outerShdw blurRad="38100" dist="25400" dir="5400000" algn="ctr" rotWithShape="0">
-                  <a:srgbClr val="6E747A">
-                    <a:alpha val="43000"/>
-                  </a:srgbClr>
-                </a:outerShdw>
-              </a:effectLst>
-            </a:endParaRPr>
-          </a:p>
-          <a:p>
-            <a:br>
-              <a:rPr lang="en-US" sz="1200" dirty="0"/>
-            </a:br>
             <a:endParaRPr lang="en-US" sz="1200" dirty="0"/>
           </a:p>
           <a:p>
@@ -27613,7 +28898,19 @@
             </a:br>
             <a:r>
               <a:rPr lang="en-US" sz="1200" dirty="0"/>
-              <a:t>path() { [ -d "$1" ] &amp;&amp; echo $PATH | grep -q "$1”  || export PATH="$1${PATH:+":$PATH"}”; }</a:t>
+              <a:t>path() {</a:t>
+            </a:r>
+          </a:p>
+          <a:p>
+            <a:r>
+              <a:rPr lang="en-US" sz="1200" dirty="0"/>
+              <a:t>  [ -d "$1" ] &amp;&amp; echo $PATH | grep -q "$1”  || export PATH="$1${PATH:+":$PATH"}”</a:t>
+            </a:r>
+          </a:p>
+          <a:p>
+            <a:r>
+              <a:rPr lang="en-US" sz="1200" dirty="0"/>
+              <a:t>}</a:t>
             </a:r>
             <a:br>
               <a:rPr lang="en-US" sz="1200" dirty="0">
@@ -27685,7 +28982,7 @@
         </p:nvSpPr>
         <p:spPr>
           <a:xfrm>
-            <a:off x="362447" y="1326363"/>
+            <a:off x="391943" y="1326363"/>
             <a:ext cx="8589042" cy="369332"/>
           </a:xfrm>
           <a:prstGeom prst="rect">

</xml_diff>

<commit_message>
itest for openmp molecular dynamics add SHALLOW to ppt install.sh dried out setup.py updated
</commit_message>
<xml_diff>
--- a/docs/power_point/nemd.pptx
+++ b/docs/power_point/nemd.pptx
@@ -15211,7 +15211,7 @@
           <a:p>
             <a:r>
               <a:rPr lang="en-US" dirty="0"/>
-              <a:t>Shared Flags</a:t>
+              <a:t>Command-Line Arguments</a:t>
             </a:r>
           </a:p>
         </p:txBody>
@@ -15260,7 +15260,7 @@
           <p:nvPr>
             <p:extLst>
               <p:ext uri="{D42A27DB-BD31-4B8C-83A1-F6EECF244321}">
-                <p14:modId xmlns:p14="http://schemas.microsoft.com/office/powerpoint/2010/main" val="207351834"/>
+                <p14:modId xmlns:p14="http://schemas.microsoft.com/office/powerpoint/2010/main" val="2676216063"/>
               </p:ext>
             </p:extLst>
           </p:nvPr>
@@ -15500,7 +15500,7 @@
                           <a:ea typeface="+mn-ea"/>
                           <a:cs typeface="+mn-cs"/>
                         </a:rPr>
-                        <a:t>Jobname.{log, csv, data, </a:t>
+                        <a:t>Jobname[_type].{log, csv, data, </a:t>
                       </a:r>
                       <a:r>
                         <a:rPr lang="en-US" sz="1400" kern="1200" dirty="0" err="1">
@@ -15911,13 +15911,13 @@
           <p:nvPr>
             <p:extLst>
               <p:ext uri="{D42A27DB-BD31-4B8C-83A1-F6EECF244321}">
-                <p14:modId xmlns:p14="http://schemas.microsoft.com/office/powerpoint/2010/main" val="733147631"/>
+                <p14:modId xmlns:p14="http://schemas.microsoft.com/office/powerpoint/2010/main" val="1095404363"/>
               </p:ext>
             </p:extLst>
           </p:nvPr>
         </p:nvGraphicFramePr>
         <p:xfrm>
-          <a:off x="947992" y="4262120"/>
+          <a:off x="947992" y="4133528"/>
           <a:ext cx="10076428" cy="2148840"/>
         </p:xfrm>
         <a:graphic>
@@ -16091,7 +16091,7 @@
                           <a:ea typeface="+mn-ea"/>
                           <a:cs typeface="+mn-cs"/>
                         </a:rPr>
-                        <a:t>task handles calculations and registers files</a:t>
+                        <a:t>Task handles calculations and registers files</a:t>
                       </a:r>
                     </a:p>
                     <a:p>
@@ -16104,7 +16104,7 @@
                           <a:ea typeface="+mn-ea"/>
                           <a:cs typeface="+mn-cs"/>
                         </a:rPr>
-                        <a:t>aggregator collects results</a:t>
+                        <a:t>Aggregator collects results</a:t>
                       </a:r>
                     </a:p>
                   </a:txBody>
@@ -16475,6 +16475,45 @@
           </a:graphicData>
         </a:graphic>
       </p:graphicFrame>
+      <p:sp>
+        <p:nvSpPr>
+          <p:cNvPr id="3" name="TextBox 2">
+            <a:extLst>
+              <a:ext uri="{FF2B5EF4-FFF2-40B4-BE49-F238E27FC236}">
+                <a16:creationId xmlns:a16="http://schemas.microsoft.com/office/drawing/2014/main" id="{4BBCC9C4-DC60-1158-2C05-E55902CF670E}"/>
+              </a:ext>
+            </a:extLst>
+          </p:cNvPr>
+          <p:cNvSpPr txBox="1"/>
+          <p:nvPr/>
+        </p:nvSpPr>
+        <p:spPr>
+          <a:xfrm>
+            <a:off x="947990" y="6328788"/>
+            <a:ext cx="7978851" cy="307777"/>
+          </a:xfrm>
+          <a:prstGeom prst="rect">
+            <a:avLst/>
+          </a:prstGeom>
+          <a:noFill/>
+        </p:spPr>
+        <p:txBody>
+          <a:bodyPr wrap="none" rtlCol="0">
+            <a:spAutoFit/>
+          </a:bodyPr>
+          <a:lstStyle/>
+          <a:p>
+            <a:r>
+              <a:rPr lang="en-US" sz="1400" i="1" dirty="0"/>
+              <a:t>export SHALLOW=1</a:t>
+            </a:r>
+            <a:r>
+              <a:rPr lang="en-US" sz="1400" dirty="0"/>
+              <a:t> increases the performance at the sacrifice of stability. (e.g. shallow copy, unclean build)</a:t>
+            </a:r>
+          </a:p>
+        </p:txBody>
+      </p:sp>
     </p:spTree>
     <p:extLst>
       <p:ext uri="{BB962C8B-B14F-4D97-AF65-F5344CB8AC3E}">

</xml_diff>

<commit_message>
test.check finalized power point updated
</commit_message>
<xml_diff>
--- a/docs/power_point/nemd.pptx
+++ b/docs/power_point/nemd.pptx
@@ -3131,7 +3131,7 @@
           <a:p>
             <a:fld id="{4E7935B3-F5AC-0F49-A77F-693DEAA46623}" type="datetimeFigureOut">
               <a:rPr lang="en-US" smtClean="0"/>
-              <a:t>2/3/25</a:t>
+              <a:t>2/10/25</a:t>
             </a:fld>
             <a:endParaRPr lang="en-US"/>
           </a:p>
@@ -3797,7 +3797,7 @@
           <a:p>
             <a:fld id="{7139230D-D256-FE47-99BF-6F642436F56E}" type="datetime1">
               <a:rPr lang="en-US" smtClean="0"/>
-              <a:t>2/3/25</a:t>
+              <a:t>2/10/25</a:t>
             </a:fld>
             <a:endParaRPr lang="en-US"/>
           </a:p>
@@ -3995,7 +3995,7 @@
           <a:p>
             <a:fld id="{785AC849-5CEB-3846-9265-8D72BE481A70}" type="datetime1">
               <a:rPr lang="en-US" smtClean="0"/>
-              <a:t>2/3/25</a:t>
+              <a:t>2/10/25</a:t>
             </a:fld>
             <a:endParaRPr lang="en-US"/>
           </a:p>
@@ -4203,7 +4203,7 @@
           <a:p>
             <a:fld id="{A02BBDEB-BEE0-FD44-AAFC-27969F9541FD}" type="datetime1">
               <a:rPr lang="en-US" smtClean="0"/>
-              <a:t>2/3/25</a:t>
+              <a:t>2/10/25</a:t>
             </a:fld>
             <a:endParaRPr lang="en-US"/>
           </a:p>
@@ -4401,7 +4401,7 @@
           <a:p>
             <a:fld id="{4F82860A-5855-1941-A1E0-F1AE52EC854D}" type="datetime1">
               <a:rPr lang="en-US" smtClean="0"/>
-              <a:t>2/3/25</a:t>
+              <a:t>2/10/25</a:t>
             </a:fld>
             <a:endParaRPr lang="en-US"/>
           </a:p>
@@ -4676,7 +4676,7 @@
           <a:p>
             <a:fld id="{6A874B4C-42F5-E24E-B25F-613EC7F4AF0D}" type="datetime1">
               <a:rPr lang="en-US" smtClean="0"/>
-              <a:t>2/3/25</a:t>
+              <a:t>2/10/25</a:t>
             </a:fld>
             <a:endParaRPr lang="en-US"/>
           </a:p>
@@ -4941,7 +4941,7 @@
           <a:p>
             <a:fld id="{9A2BCD20-0178-0C41-9D8E-10FA267A6CCC}" type="datetime1">
               <a:rPr lang="en-US" smtClean="0"/>
-              <a:t>2/3/25</a:t>
+              <a:t>2/10/25</a:t>
             </a:fld>
             <a:endParaRPr lang="en-US"/>
           </a:p>
@@ -5353,7 +5353,7 @@
           <a:p>
             <a:fld id="{EDE58456-60EB-6840-BCEB-E4C2678C039E}" type="datetime1">
               <a:rPr lang="en-US" smtClean="0"/>
-              <a:t>2/3/25</a:t>
+              <a:t>2/10/25</a:t>
             </a:fld>
             <a:endParaRPr lang="en-US"/>
           </a:p>
@@ -5494,7 +5494,7 @@
           <a:p>
             <a:fld id="{8BBFCD94-1F0D-3948-A9F0-DB82F9AAC2D3}" type="datetime1">
               <a:rPr lang="en-US" smtClean="0"/>
-              <a:t>2/3/25</a:t>
+              <a:t>2/10/25</a:t>
             </a:fld>
             <a:endParaRPr lang="en-US"/>
           </a:p>
@@ -5607,7 +5607,7 @@
           <a:p>
             <a:fld id="{13692FAC-AC21-0848-AC27-426B7BF29104}" type="datetime1">
               <a:rPr lang="en-US" smtClean="0"/>
-              <a:t>2/3/25</a:t>
+              <a:t>2/10/25</a:t>
             </a:fld>
             <a:endParaRPr lang="en-US"/>
           </a:p>
@@ -5918,7 +5918,7 @@
           <a:p>
             <a:fld id="{A3FF56F3-8608-FF4D-9C26-AE6D473095CB}" type="datetime1">
               <a:rPr lang="en-US" smtClean="0"/>
-              <a:t>2/3/25</a:t>
+              <a:t>2/10/25</a:t>
             </a:fld>
             <a:endParaRPr lang="en-US"/>
           </a:p>
@@ -6206,7 +6206,7 @@
           <a:p>
             <a:fld id="{58CC49A9-C646-2345-B4A7-439457175566}" type="datetime1">
               <a:rPr lang="en-US" smtClean="0"/>
-              <a:t>2/3/25</a:t>
+              <a:t>2/10/25</a:t>
             </a:fld>
             <a:endParaRPr lang="en-US"/>
           </a:p>
@@ -6447,7 +6447,7 @@
           <a:p>
             <a:fld id="{D516C8CC-C3CD-B94B-94D6-0913487DB5E5}" type="datetime1">
               <a:rPr lang="en-US" smtClean="0"/>
-              <a:t>2/3/25</a:t>
+              <a:t>2/10/25</a:t>
             </a:fld>
             <a:endParaRPr lang="en-US"/>
           </a:p>
@@ -7043,7 +7043,7 @@
         </p:nvSpPr>
         <p:spPr>
           <a:xfrm>
-            <a:off x="838200" y="365125"/>
+            <a:off x="838200" y="65081"/>
             <a:ext cx="4298004" cy="1325563"/>
           </a:xfrm>
         </p:spPr>
@@ -7073,14 +7073,14 @@
           <p:nvPr>
             <p:extLst>
               <p:ext uri="{D42A27DB-BD31-4B8C-83A1-F6EECF244321}">
-                <p14:modId xmlns:p14="http://schemas.microsoft.com/office/powerpoint/2010/main" val="4120104915"/>
+                <p14:modId xmlns:p14="http://schemas.microsoft.com/office/powerpoint/2010/main" val="531743047"/>
               </p:ext>
             </p:extLst>
           </p:nvPr>
         </p:nvGraphicFramePr>
         <p:xfrm>
-          <a:off x="7038321" y="1541496"/>
-          <a:ext cx="4167941" cy="1404705"/>
+          <a:off x="6845438" y="431766"/>
+          <a:ext cx="4841736" cy="1527050"/>
         </p:xfrm>
         <a:graphic>
           <a:graphicData uri="http://schemas.openxmlformats.org/drawingml/2006/table">
@@ -7089,14 +7089,14 @@
                 <a:tableStyleId>{C083E6E3-FA7D-4D7B-A595-EF9225AFEA82}</a:tableStyleId>
               </a:tblPr>
               <a:tblGrid>
-                <a:gridCol w="614103">
+                <a:gridCol w="812662">
                   <a:extLst>
                     <a:ext uri="{9D8B030D-6E8A-4147-A177-3AD203B41FA5}">
                       <a16:colId xmlns:a16="http://schemas.microsoft.com/office/drawing/2014/main" val="1700155147"/>
                     </a:ext>
                   </a:extLst>
                 </a:gridCol>
-                <a:gridCol w="3553838">
+                <a:gridCol w="4029074">
                   <a:extLst>
                     <a:ext uri="{9D8B030D-6E8A-4147-A177-3AD203B41FA5}">
                       <a16:colId xmlns:a16="http://schemas.microsoft.com/office/drawing/2014/main" val="4090573760"/>
@@ -7104,7 +7104,7 @@
                   </a:extLst>
                 </a:gridCol>
               </a:tblGrid>
-              <a:tr h="366635">
+              <a:tr h="305410">
                 <a:tc>
                   <a:txBody>
                     <a:bodyPr/>
@@ -7170,7 +7170,7 @@
                   </a:ext>
                 </a:extLst>
               </a:tr>
-              <a:tr h="366635">
+              <a:tr h="305410">
                 <a:tc>
                   <a:txBody>
                     <a:bodyPr/>
@@ -7259,7 +7259,7 @@
                   </a:ext>
                 </a:extLst>
               </a:tr>
-              <a:tr h="301752">
+              <a:tr h="305410">
                 <a:tc>
                   <a:txBody>
                     <a:bodyPr/>
@@ -7315,8 +7315,20 @@
                             <a:schemeClr val="accent2"/>
                           </a:solidFill>
                           <a:effectLst/>
-                        </a:rPr>
-                        <a:t>Check the results against expectations</a:t>
+                          <a:latin typeface="+mn-lt"/>
+                          <a:ea typeface="+mn-ea"/>
+                          <a:cs typeface="+mn-cs"/>
+                        </a:rPr>
+                        <a:t>Shell syntax </a:t>
+                      </a:r>
+                      <a:r>
+                        <a:rPr lang="en-US" sz="1400" kern="1200" dirty="0">
+                          <a:solidFill>
+                            <a:schemeClr val="accent2"/>
+                          </a:solidFill>
+                          <a:effectLst/>
+                        </a:rPr>
+                        <a:t>to check the results against expectations</a:t>
                       </a:r>
                       <a:endParaRPr lang="en-US" sz="1400" kern="1200" dirty="0">
                         <a:solidFill>
@@ -7337,7 +7349,7 @@
                   </a:ext>
                 </a:extLst>
               </a:tr>
-              <a:tr h="366635">
+              <a:tr h="305410">
                 <a:tc>
                   <a:txBody>
                     <a:bodyPr/>
@@ -7429,6 +7441,89 @@
                 <a:extLst>
                   <a:ext uri="{0D108BD9-81ED-4DB2-BD59-A6C34878D82A}">
                     <a16:rowId xmlns:a16="http://schemas.microsoft.com/office/drawing/2014/main" val="2821257283"/>
+                  </a:ext>
+                </a:extLst>
+              </a:tr>
+              <a:tr h="305410">
+                <a:tc>
+                  <a:txBody>
+                    <a:bodyPr/>
+                    <a:lstStyle/>
+                    <a:p>
+                      <a:pPr marL="0" marR="0" lvl="0" indent="0" algn="l" defTabSz="914400" rtl="0" eaLnBrk="1" fontAlgn="auto" latinLnBrk="0" hangingPunct="1">
+                        <a:lnSpc>
+                          <a:spcPct val="100000"/>
+                        </a:lnSpc>
+                        <a:spcBef>
+                          <a:spcPts val="0"/>
+                        </a:spcBef>
+                        <a:spcAft>
+                          <a:spcPts val="0"/>
+                        </a:spcAft>
+                        <a:buClrTx/>
+                        <a:buSzTx/>
+                        <a:buFontTx/>
+                        <a:buNone/>
+                        <a:tabLst/>
+                        <a:defRPr/>
+                      </a:pPr>
+                      <a:r>
+                        <a:rPr lang="en-US" sz="1400" kern="1200" dirty="0">
+                          <a:solidFill>
+                            <a:schemeClr val="accent6"/>
+                          </a:solidFill>
+                          <a:effectLst/>
+                          <a:latin typeface="+mn-lt"/>
+                          <a:ea typeface="+mn-ea"/>
+                          <a:cs typeface="+mn-cs"/>
+                        </a:rPr>
+                        <a:t>param</a:t>
+                      </a:r>
+                    </a:p>
+                  </a:txBody>
+                  <a:tcPr/>
+                </a:tc>
+                <a:tc>
+                  <a:txBody>
+                    <a:bodyPr/>
+                    <a:lstStyle/>
+                    <a:p>
+                      <a:pPr marL="0" marR="0" lvl="0" indent="0" algn="l" defTabSz="914400" rtl="0" eaLnBrk="1" fontAlgn="auto" latinLnBrk="0" hangingPunct="1">
+                        <a:lnSpc>
+                          <a:spcPct val="100000"/>
+                        </a:lnSpc>
+                        <a:spcBef>
+                          <a:spcPts val="0"/>
+                        </a:spcBef>
+                        <a:spcAft>
+                          <a:spcPts val="0"/>
+                        </a:spcAft>
+                        <a:buClrTx/>
+                        <a:buSzTx/>
+                        <a:buFontTx/>
+                        <a:buNone/>
+                        <a:tabLst/>
+                        <a:defRPr/>
+                      </a:pPr>
+                      <a:r>
+                        <a:rPr lang="en-US" sz="1400" kern="1200" dirty="0">
+                          <a:solidFill>
+                            <a:schemeClr val="accent6"/>
+                          </a:solidFill>
+                          <a:effectLst/>
+                          <a:latin typeface="+mn-lt"/>
+                          <a:ea typeface="+mn-ea"/>
+                          <a:cs typeface="+mn-cs"/>
+                        </a:rPr>
+                        <a:t>Parametrize one command into multiple</a:t>
+                      </a:r>
+                    </a:p>
+                  </a:txBody>
+                  <a:tcPr/>
+                </a:tc>
+                <a:extLst>
+                  <a:ext uri="{0D108BD9-81ED-4DB2-BD59-A6C34878D82A}">
+                    <a16:rowId xmlns:a16="http://schemas.microsoft.com/office/drawing/2014/main" val="1742718043"/>
                   </a:ext>
                 </a:extLst>
               </a:tr>
@@ -7451,14 +7546,14 @@
           <p:nvPr>
             <p:extLst>
               <p:ext uri="{D42A27DB-BD31-4B8C-83A1-F6EECF244321}">
-                <p14:modId xmlns:p14="http://schemas.microsoft.com/office/powerpoint/2010/main" val="4059345035"/>
+                <p14:modId xmlns:p14="http://schemas.microsoft.com/office/powerpoint/2010/main" val="1910268348"/>
               </p:ext>
             </p:extLst>
           </p:nvPr>
         </p:nvGraphicFramePr>
         <p:xfrm>
-          <a:off x="7038322" y="3112074"/>
-          <a:ext cx="4167940" cy="1828800"/>
+          <a:off x="6845438" y="2078219"/>
+          <a:ext cx="4841735" cy="2133600"/>
         </p:xfrm>
         <a:graphic>
           <a:graphicData uri="http://schemas.openxmlformats.org/drawingml/2006/table">
@@ -7467,14 +7562,14 @@
                 <a:tableStyleId>{21E4AEA4-8DFA-4A89-87EB-49C32662AFE0}</a:tableStyleId>
               </a:tblPr>
               <a:tblGrid>
-                <a:gridCol w="857792">
+                <a:gridCol w="1041262">
                   <a:extLst>
                     <a:ext uri="{9D8B030D-6E8A-4147-A177-3AD203B41FA5}">
                       <a16:colId xmlns:a16="http://schemas.microsoft.com/office/drawing/2014/main" val="3737494183"/>
                     </a:ext>
                   </a:extLst>
                 </a:gridCol>
-                <a:gridCol w="3310148">
+                <a:gridCol w="3800473">
                   <a:extLst>
                     <a:ext uri="{9D8B030D-6E8A-4147-A177-3AD203B41FA5}">
                       <a16:colId xmlns:a16="http://schemas.microsoft.com/office/drawing/2014/main" val="2798767956"/>
@@ -7482,7 +7577,7 @@
                   </a:extLst>
                 </a:gridCol>
               </a:tblGrid>
-              <a:tr h="284016">
+              <a:tr h="304365">
                 <a:tc gridSpan="2">
                   <a:txBody>
                     <a:bodyPr/>
@@ -7490,15 +7585,7 @@
                     <a:p>
                       <a:r>
                         <a:rPr lang="en-US" sz="1400" dirty="0"/>
-                        <a:t>Supported keys in </a:t>
-                      </a:r>
-                      <a:r>
-                        <a:rPr lang="en-US" sz="1400" dirty="0" err="1"/>
-                        <a:t>cmd</a:t>
-                      </a:r>
-                      <a:r>
-                        <a:rPr lang="en-US" sz="1400" dirty="0"/>
-                        <a:t> file</a:t>
+                        <a:t>Supported in check file</a:t>
                       </a:r>
                     </a:p>
                   </a:txBody>
@@ -7520,23 +7607,7 @@
                   </a:ext>
                 </a:extLst>
               </a:tr>
-              <a:tr h="301752">
-                <a:tc>
-                  <a:txBody>
-                    <a:bodyPr/>
-                    <a:lstStyle/>
-                    <a:p>
-                      <a:r>
-                        <a:rPr lang="en-US" sz="1400" kern="1200" dirty="0" err="1">
-                          <a:effectLst/>
-                        </a:rPr>
-                        <a:t>cmp</a:t>
-                      </a:r>
-                      <a:endParaRPr lang="en-US" sz="1400" dirty="0"/>
-                    </a:p>
-                  </a:txBody>
-                  <a:tcPr/>
-                </a:tc>
+              <a:tr h="304365">
                 <a:tc>
                   <a:txBody>
                     <a:bodyPr/>
@@ -7546,9 +7617,22 @@
                         <a:rPr lang="en-US" sz="1400" kern="1200" dirty="0">
                           <a:effectLst/>
                         </a:rPr>
-                        <a:t>Content comparison of multiples files</a:t>
+                        <a:t>shell syntax</a:t>
                       </a:r>
                       <a:endParaRPr lang="en-US" sz="1400" dirty="0"/>
+                    </a:p>
+                  </a:txBody>
+                  <a:tcPr/>
+                </a:tc>
+                <a:tc>
+                  <a:txBody>
+                    <a:bodyPr/>
+                    <a:lstStyle/>
+                    <a:p>
+                      <a:r>
+                        <a:rPr lang="en-US" sz="1400" dirty="0"/>
+                        <a:t>echo, [ -f file ], &amp;&amp;, ||, ( grep pattern file ), etc.</a:t>
+                      </a:r>
                     </a:p>
                   </a:txBody>
                   <a:tcPr/>
@@ -7559,7 +7643,7 @@
                   </a:ext>
                 </a:extLst>
               </a:tr>
-              <a:tr h="284016">
+              <a:tr h="304365">
                 <a:tc>
                   <a:txBody>
                     <a:bodyPr/>
@@ -7569,7 +7653,7 @@
                         <a:rPr lang="en-US" sz="1400" kern="1200" dirty="0">
                           <a:effectLst/>
                         </a:rPr>
-                        <a:t>glob</a:t>
+                        <a:t>exist</a:t>
                       </a:r>
                       <a:endParaRPr lang="en-US" sz="1400" dirty="0"/>
                     </a:p>
@@ -7585,7 +7669,7 @@
                         <a:rPr lang="en-US" sz="1400" kern="1200" dirty="0">
                           <a:effectLst/>
                         </a:rPr>
-                        <a:t>The match number by pattern expansion</a:t>
+                        <a:t>The existence of files</a:t>
                       </a:r>
                       <a:endParaRPr lang="en-US" sz="1400" dirty="0"/>
                     </a:p>
@@ -7598,7 +7682,7 @@
                   </a:ext>
                 </a:extLst>
               </a:tr>
-              <a:tr h="284016">
+              <a:tr h="304365">
                 <a:tc>
                   <a:txBody>
                     <a:bodyPr/>
@@ -7608,7 +7692,7 @@
                         <a:rPr lang="en-US" sz="1400" kern="1200" dirty="0">
                           <a:effectLst/>
                         </a:rPr>
-                        <a:t>exist</a:t>
+                        <a:t>glob</a:t>
                       </a:r>
                       <a:endParaRPr lang="en-US" sz="1400" dirty="0"/>
                     </a:p>
@@ -7624,7 +7708,7 @@
                         <a:rPr lang="en-US" sz="1400" kern="1200" dirty="0">
                           <a:effectLst/>
                         </a:rPr>
-                        <a:t>The existence of files</a:t>
+                        <a:t>The match number by pattern expansion</a:t>
                       </a:r>
                       <a:endParaRPr lang="en-US" sz="1400" dirty="0"/>
                     </a:p>
@@ -7637,23 +7721,7 @@
                   </a:ext>
                 </a:extLst>
               </a:tr>
-              <a:tr h="284016">
-                <a:tc>
-                  <a:txBody>
-                    <a:bodyPr/>
-                    <a:lstStyle/>
-                    <a:p>
-                      <a:r>
-                        <a:rPr lang="en-US" sz="1400" kern="1200" dirty="0" err="1">
-                          <a:effectLst/>
-                        </a:rPr>
-                        <a:t>not_exist</a:t>
-                      </a:r>
-                      <a:endParaRPr lang="en-US" sz="1400" dirty="0"/>
-                    </a:p>
-                  </a:txBody>
-                  <a:tcPr/>
-                </a:tc>
+              <a:tr h="304365">
                 <a:tc>
                   <a:txBody>
                     <a:bodyPr/>
@@ -7663,7 +7731,23 @@
                         <a:rPr lang="en-US" sz="1400" kern="1200" dirty="0">
                           <a:effectLst/>
                         </a:rPr>
-                        <a:t>The non-existence of files</a:t>
+                        <a:t>in</a:t>
+                      </a:r>
+                      <a:endParaRPr lang="en-US" sz="1400" dirty="0"/>
+                    </a:p>
+                  </a:txBody>
+                  <a:tcPr/>
+                </a:tc>
+                <a:tc>
+                  <a:txBody>
+                    <a:bodyPr/>
+                    <a:lstStyle/>
+                    <a:p>
+                      <a:r>
+                        <a:rPr lang="en-US" sz="1400" kern="1200" dirty="0">
+                          <a:effectLst/>
+                        </a:rPr>
+                        <a:t>Specific string in files</a:t>
                       </a:r>
                       <a:endParaRPr lang="en-US" sz="1400" dirty="0"/>
                     </a:p>
@@ -7676,7 +7760,23 @@
                   </a:ext>
                 </a:extLst>
               </a:tr>
-              <a:tr h="284016">
+              <a:tr h="304365">
+                <a:tc>
+                  <a:txBody>
+                    <a:bodyPr/>
+                    <a:lstStyle/>
+                    <a:p>
+                      <a:r>
+                        <a:rPr lang="en-US" sz="1400" kern="1200" dirty="0" err="1">
+                          <a:effectLst/>
+                        </a:rPr>
+                        <a:t>cmp</a:t>
+                      </a:r>
+                      <a:endParaRPr lang="en-US" sz="1400" dirty="0"/>
+                    </a:p>
+                  </a:txBody>
+                  <a:tcPr/>
+                </a:tc>
                 <a:tc>
                   <a:txBody>
                     <a:bodyPr/>
@@ -7686,23 +7786,7 @@
                         <a:rPr lang="en-US" sz="1400" kern="1200" dirty="0">
                           <a:effectLst/>
                         </a:rPr>
-                        <a:t>in</a:t>
-                      </a:r>
-                      <a:endParaRPr lang="en-US" sz="1400" dirty="0"/>
-                    </a:p>
-                  </a:txBody>
-                  <a:tcPr/>
-                </a:tc>
-                <a:tc>
-                  <a:txBody>
-                    <a:bodyPr/>
-                    <a:lstStyle/>
-                    <a:p>
-                      <a:r>
-                        <a:rPr lang="en-US" sz="1400" kern="1200" dirty="0">
-                          <a:effectLst/>
-                        </a:rPr>
-                        <a:t>Specific string in files</a:t>
+                        <a:t>Content comparison of multiples files</a:t>
                       </a:r>
                       <a:endParaRPr lang="en-US" sz="1400" dirty="0"/>
                     </a:p>
@@ -7712,6 +7796,64 @@
                 <a:extLst>
                   <a:ext uri="{0D108BD9-81ED-4DB2-BD59-A6C34878D82A}">
                     <a16:rowId xmlns:a16="http://schemas.microsoft.com/office/drawing/2014/main" val="3565061091"/>
+                  </a:ext>
+                </a:extLst>
+              </a:tr>
+              <a:tr h="304365">
+                <a:tc>
+                  <a:txBody>
+                    <a:bodyPr/>
+                    <a:lstStyle/>
+                    <a:p>
+                      <a:r>
+                        <a:rPr lang="en-US" sz="1400" kern="1200" dirty="0" err="1">
+                          <a:solidFill>
+                            <a:schemeClr val="dk1"/>
+                          </a:solidFill>
+                          <a:effectLst/>
+                          <a:latin typeface="+mn-lt"/>
+                          <a:ea typeface="+mn-ea"/>
+                          <a:cs typeface="+mn-cs"/>
+                        </a:rPr>
+                        <a:t>collect_log</a:t>
+                      </a:r>
+                      <a:endParaRPr lang="en-US" sz="1400" kern="1200" dirty="0">
+                        <a:solidFill>
+                          <a:schemeClr val="dk1"/>
+                        </a:solidFill>
+                        <a:effectLst/>
+                        <a:latin typeface="+mn-lt"/>
+                        <a:ea typeface="+mn-ea"/>
+                        <a:cs typeface="+mn-cs"/>
+                      </a:endParaRPr>
+                    </a:p>
+                  </a:txBody>
+                  <a:tcPr/>
+                </a:tc>
+                <a:tc>
+                  <a:txBody>
+                    <a:bodyPr/>
+                    <a:lstStyle/>
+                    <a:p>
+                      <a:r>
+                        <a:rPr lang="en-US" sz="1400" kern="1200" dirty="0">
+                          <a:solidFill>
+                            <a:schemeClr val="dk1"/>
+                          </a:solidFill>
+                          <a:effectLst/>
+                          <a:latin typeface="+mn-lt"/>
+                          <a:ea typeface="+mn-ea"/>
+                          <a:cs typeface="+mn-cs"/>
+                        </a:rPr>
+                        <a:t>Collect information from log files</a:t>
+                      </a:r>
+                    </a:p>
+                  </a:txBody>
+                  <a:tcPr/>
+                </a:tc>
+                <a:extLst>
+                  <a:ext uri="{0D108BD9-81ED-4DB2-BD59-A6C34878D82A}">
+                    <a16:rowId xmlns:a16="http://schemas.microsoft.com/office/drawing/2014/main" val="2523583919"/>
                   </a:ext>
                 </a:extLst>
               </a:tr>
@@ -7734,14 +7876,14 @@
           <p:nvPr>
             <p:extLst>
               <p:ext uri="{D42A27DB-BD31-4B8C-83A1-F6EECF244321}">
-                <p14:modId xmlns:p14="http://schemas.microsoft.com/office/powerpoint/2010/main" val="3123179171"/>
+                <p14:modId xmlns:p14="http://schemas.microsoft.com/office/powerpoint/2010/main" val="2881512327"/>
               </p:ext>
             </p:extLst>
           </p:nvPr>
         </p:nvGraphicFramePr>
         <p:xfrm>
-          <a:off x="7038322" y="5130999"/>
-          <a:ext cx="4167941" cy="1012988"/>
+          <a:off x="6845440" y="4334400"/>
+          <a:ext cx="4841734" cy="1006490"/>
         </p:xfrm>
         <a:graphic>
           <a:graphicData uri="http://schemas.openxmlformats.org/drawingml/2006/table">
@@ -7750,14 +7892,14 @@
                 <a:tableStyleId>{5C22544A-7EE6-4342-B048-85BDC9FD1C3A}</a:tableStyleId>
               </a:tblPr>
               <a:tblGrid>
-                <a:gridCol w="857792">
+                <a:gridCol w="1055549">
                   <a:extLst>
                     <a:ext uri="{9D8B030D-6E8A-4147-A177-3AD203B41FA5}">
                       <a16:colId xmlns:a16="http://schemas.microsoft.com/office/drawing/2014/main" val="3737494183"/>
                     </a:ext>
                   </a:extLst>
                 </a:gridCol>
-                <a:gridCol w="3310149">
+                <a:gridCol w="3786185">
                   <a:extLst>
                     <a:ext uri="{9D8B030D-6E8A-4147-A177-3AD203B41FA5}">
                       <a16:colId xmlns:a16="http://schemas.microsoft.com/office/drawing/2014/main" val="2798767956"/>
@@ -7765,7 +7907,7 @@
                   </a:extLst>
                 </a:gridCol>
               </a:tblGrid>
-              <a:tr h="354094">
+              <a:tr h="350845">
                 <a:tc gridSpan="2">
                   <a:txBody>
                     <a:bodyPr/>
@@ -7795,7 +7937,7 @@
                   </a:ext>
                 </a:extLst>
               </a:tr>
-              <a:tr h="301752">
+              <a:tr h="304150">
                 <a:tc>
                   <a:txBody>
                     <a:bodyPr/>
@@ -7846,7 +7988,7 @@
                   </a:ext>
                 </a:extLst>
               </a:tr>
-              <a:tr h="354094">
+              <a:tr h="350845">
                 <a:tc>
                   <a:txBody>
                     <a:bodyPr/>
@@ -7915,8 +8057,8 @@
         </p:nvSpPr>
         <p:spPr>
           <a:xfrm>
-            <a:off x="682915" y="1573958"/>
-            <a:ext cx="5847585" cy="4508927"/>
+            <a:off x="682915" y="1281054"/>
+            <a:ext cx="5847585" cy="5124480"/>
           </a:xfrm>
           <a:prstGeom prst="rect">
             <a:avLst/>
@@ -7998,31 +8140,12 @@
             </a:r>
           </a:p>
           <a:p>
-            <a:pPr algn="just"/>
-            <a:endParaRPr lang="en-US" sz="1500" dirty="0">
-              <a:solidFill>
-                <a:schemeClr val="dk1"/>
-              </a:solidFill>
-            </a:endParaRPr>
-          </a:p>
-          <a:p>
-            <a:pPr algn="just"/>
-            <a:r>
-              <a:rPr lang="en-US" sz="1500" dirty="0">
-                <a:solidFill>
-                  <a:schemeClr val="dk1"/>
-                </a:solidFill>
-              </a:rPr>
-              <a:t>For example:</a:t>
-            </a:r>
-          </a:p>
-          <a:p>
             <a:endParaRPr lang="en-US" sz="1500" dirty="0"/>
           </a:p>
           <a:p>
             <a:r>
               <a:rPr lang="en-US" sz="1400" i="1" dirty="0"/>
-              <a:t>cd test/integration/0001; head </a:t>
+              <a:t>cd test/integration/0049; head </a:t>
             </a:r>
             <a:r>
               <a:rPr lang="en-US" sz="1400" i="1" dirty="0" err="1"/>
@@ -8030,7 +8153,7 @@
             </a:r>
             <a:r>
               <a:rPr lang="en-US" sz="1400" i="1" dirty="0"/>
-              <a:t> check tag</a:t>
+              <a:t> check tag param</a:t>
             </a:r>
           </a:p>
           <a:p>
@@ -8053,13 +8176,21 @@
           <a:p>
             <a:r>
               <a:rPr lang="en-US" sz="1400" i="1" dirty="0"/>
-              <a:t># Amorphous builder on C</a:t>
-            </a:r>
-          </a:p>
-          <a:p>
+              <a:t># Performance: [</a:t>
+            </a:r>
             <a:r>
               <a:rPr lang="en-US" sz="1400" i="1" dirty="0" err="1"/>
-              <a:t>run_nemd</a:t>
+              <a:t>Ar</a:t>
+            </a:r>
+            <a:r>
+              <a:rPr lang="en-US" sz="1400" i="1" dirty="0"/>
+              <a:t>] Amorphous Builder</a:t>
+            </a:r>
+          </a:p>
+          <a:p>
+            <a:r>
+              <a:rPr lang="en-US" sz="1400" i="1" dirty="0" err="1"/>
+              <a:t>nemd_run</a:t>
             </a:r>
             <a:r>
               <a:rPr lang="en-US" sz="1400" i="1" dirty="0"/>
@@ -8071,15 +8202,15 @@
             </a:r>
             <a:r>
               <a:rPr lang="en-US" sz="1400" i="1" dirty="0"/>
-              <a:t> C -</a:t>
+              <a:t> [</a:t>
             </a:r>
             <a:r>
               <a:rPr lang="en-US" sz="1400" i="1" dirty="0" err="1"/>
-              <a:t>cru_num</a:t>
+              <a:t>Ar</a:t>
             </a:r>
             <a:r>
               <a:rPr lang="en-US" sz="1400" i="1" dirty="0"/>
-              <a:t> 10 -</a:t>
+              <a:t>] -method grid -</a:t>
             </a:r>
             <a:r>
               <a:rPr lang="en-US" sz="1400" i="1" dirty="0" err="1"/>
@@ -8087,7 +8218,7 @@
             </a:r>
             <a:r>
               <a:rPr lang="en-US" sz="1400" i="1" dirty="0"/>
-              <a:t> 10</a:t>
+              <a:t> $param -seed 1</a:t>
             </a:r>
           </a:p>
           <a:p>
@@ -8101,34 +8232,20 @@
           </a:p>
           <a:p>
             <a:r>
+              <a:rPr lang="en-US" sz="1400" i="1" dirty="0" err="1"/>
+              <a:t>collect_log</a:t>
+            </a:r>
+            <a:r>
               <a:rPr lang="en-US" sz="1400" i="1" dirty="0"/>
-              <a:t># polymers are built the same</a:t>
-            </a:r>
-          </a:p>
-          <a:p>
+              <a:t>(</a:t>
+            </a:r>
             <a:r>
               <a:rPr lang="en-US" sz="1400" i="1" dirty="0" err="1"/>
-              <a:t>cmp</a:t>
+              <a:t>time,memory</a:t>
             </a:r>
             <a:r>
               <a:rPr lang="en-US" sz="1400" i="1" dirty="0"/>
-              <a:t>('</a:t>
-            </a:r>
-            <a:r>
-              <a:rPr lang="en-US" sz="1400" i="1" dirty="0" err="1"/>
-              <a:t>polymer_builder.data</a:t>
-            </a:r>
-            <a:r>
-              <a:rPr lang="en-US" sz="1400" i="1" dirty="0"/>
-              <a:t>', '</a:t>
-            </a:r>
-            <a:r>
-              <a:rPr lang="en-US" sz="1400" i="1" dirty="0" err="1"/>
-              <a:t>amorp_bldr.data</a:t>
-            </a:r>
-            <a:r>
-              <a:rPr lang="en-US" sz="1400" i="1" dirty="0"/>
-              <a:t>')</a:t>
+              <a:t>) &amp;&amp; exist(0049.csv, 0049_time_memory.png)</a:t>
             </a:r>
           </a:p>
           <a:p>
@@ -8143,21 +8260,54 @@
           <a:p>
             <a:r>
               <a:rPr lang="en-US" sz="1400" i="1" dirty="0"/>
-              <a:t>slow(00:00:03)</a:t>
-            </a:r>
-          </a:p>
-          <a:p>
-            <a:r>
-              <a:rPr lang="en-US" sz="1400" i="1" dirty="0"/>
               <a:t>label(</a:t>
             </a:r>
             <a:r>
               <a:rPr lang="en-US" sz="1400" i="1" dirty="0" err="1"/>
-              <a:t>amorp_bldr</a:t>
+              <a:t>amorp_bldr,wa</a:t>
             </a:r>
             <a:r>
               <a:rPr lang="en-US" sz="1400" i="1" dirty="0"/>
               <a:t>)</a:t>
+            </a:r>
+          </a:p>
+          <a:p>
+            <a:r>
+              <a:rPr lang="en-US" sz="1400" i="1" dirty="0"/>
+              <a:t>slow(100, 00:00:01)</a:t>
+            </a:r>
+          </a:p>
+          <a:p>
+            <a:r>
+              <a:rPr lang="en-US" sz="1400" i="1" dirty="0"/>
+              <a:t>slow(50000, 00:00:04)</a:t>
+            </a:r>
+          </a:p>
+          <a:p>
+            <a:endParaRPr lang="en-US" sz="1400" i="1" dirty="0"/>
+          </a:p>
+          <a:p>
+            <a:r>
+              <a:rPr lang="en-US" sz="1400" i="1" dirty="0"/>
+              <a:t>==&gt; param &lt;==</a:t>
+            </a:r>
+          </a:p>
+          <a:p>
+            <a:r>
+              <a:rPr lang="en-US" sz="1400" i="1" dirty="0"/>
+              <a:t># Number of Molecules</a:t>
+            </a:r>
+          </a:p>
+          <a:p>
+            <a:r>
+              <a:rPr lang="en-US" sz="1400" i="1" dirty="0"/>
+              <a:t>100</a:t>
+            </a:r>
+          </a:p>
+          <a:p>
+            <a:r>
+              <a:rPr lang="en-US" sz="1400" i="1" dirty="0"/>
+              <a:t>50000</a:t>
             </a:r>
           </a:p>
         </p:txBody>
@@ -8191,6 +8341,188 @@
           </a:p>
         </p:txBody>
       </p:sp>
+      <p:graphicFrame>
+        <p:nvGraphicFramePr>
+          <p:cNvPr id="4" name="Table 3">
+            <a:extLst>
+              <a:ext uri="{FF2B5EF4-FFF2-40B4-BE49-F238E27FC236}">
+                <a16:creationId xmlns:a16="http://schemas.microsoft.com/office/drawing/2014/main" id="{244E2AD1-5186-F2C1-2AF8-715D4051967D}"/>
+              </a:ext>
+            </a:extLst>
+          </p:cNvPr>
+          <p:cNvGraphicFramePr>
+            <a:graphicFrameLocks noGrp="1"/>
+          </p:cNvGraphicFramePr>
+          <p:nvPr>
+            <p:extLst>
+              <p:ext uri="{D42A27DB-BD31-4B8C-83A1-F6EECF244321}">
+                <p14:modId xmlns:p14="http://schemas.microsoft.com/office/powerpoint/2010/main" val="2888985189"/>
+              </p:ext>
+            </p:extLst>
+          </p:nvPr>
+        </p:nvGraphicFramePr>
+        <p:xfrm>
+          <a:off x="6845439" y="5469752"/>
+          <a:ext cx="4841734" cy="923543"/>
+        </p:xfrm>
+        <a:graphic>
+          <a:graphicData uri="http://schemas.openxmlformats.org/drawingml/2006/table">
+            <a:tbl>
+              <a:tblPr firstRow="1" bandRow="1">
+                <a:tableStyleId>{93296810-A885-4BE3-A3E7-6D5BEEA58F35}</a:tableStyleId>
+              </a:tblPr>
+              <a:tblGrid>
+                <a:gridCol w="967019">
+                  <a:extLst>
+                    <a:ext uri="{9D8B030D-6E8A-4147-A177-3AD203B41FA5}">
+                      <a16:colId xmlns:a16="http://schemas.microsoft.com/office/drawing/2014/main" val="3737494183"/>
+                    </a:ext>
+                  </a:extLst>
+                </a:gridCol>
+                <a:gridCol w="3874715">
+                  <a:extLst>
+                    <a:ext uri="{9D8B030D-6E8A-4147-A177-3AD203B41FA5}">
+                      <a16:colId xmlns:a16="http://schemas.microsoft.com/office/drawing/2014/main" val="2798767956"/>
+                    </a:ext>
+                  </a:extLst>
+                </a:gridCol>
+              </a:tblGrid>
+              <a:tr h="309342">
+                <a:tc gridSpan="2">
+                  <a:txBody>
+                    <a:bodyPr/>
+                    <a:lstStyle/>
+                    <a:p>
+                      <a:r>
+                        <a:rPr lang="en-US" sz="1400" dirty="0"/>
+                        <a:t>Tag file format</a:t>
+                      </a:r>
+                    </a:p>
+                  </a:txBody>
+                  <a:tcPr/>
+                </a:tc>
+                <a:tc hMerge="1">
+                  <a:txBody>
+                    <a:bodyPr/>
+                    <a:lstStyle/>
+                    <a:p>
+                      <a:endParaRPr lang="en-US" sz="1400" dirty="0"/>
+                    </a:p>
+                  </a:txBody>
+                  <a:tcPr/>
+                </a:tc>
+                <a:extLst>
+                  <a:ext uri="{0D108BD9-81ED-4DB2-BD59-A6C34878D82A}">
+                    <a16:rowId xmlns:a16="http://schemas.microsoft.com/office/drawing/2014/main" val="2750088413"/>
+                  </a:ext>
+                </a:extLst>
+              </a:tr>
+              <a:tr h="304859">
+                <a:tc>
+                  <a:txBody>
+                    <a:bodyPr/>
+                    <a:lstStyle/>
+                    <a:p>
+                      <a:r>
+                        <a:rPr lang="en-US" sz="1400" kern="1200" dirty="0">
+                          <a:solidFill>
+                            <a:schemeClr val="dk1"/>
+                          </a:solidFill>
+                          <a:effectLst/>
+                        </a:rPr>
+                        <a:t>comment</a:t>
+                      </a:r>
+                      <a:endParaRPr lang="en-US" sz="1400" dirty="0"/>
+                    </a:p>
+                  </a:txBody>
+                  <a:tcPr/>
+                </a:tc>
+                <a:tc>
+                  <a:txBody>
+                    <a:bodyPr/>
+                    <a:lstStyle/>
+                    <a:p>
+                      <a:r>
+                        <a:rPr lang="en-US" sz="1400" kern="1200" dirty="0">
+                          <a:solidFill>
+                            <a:schemeClr val="dk1"/>
+                          </a:solidFill>
+                          <a:effectLst/>
+                        </a:rPr>
+                        <a:t>The str after # symbol is the label</a:t>
+                      </a:r>
+                      <a:endParaRPr lang="en-US" sz="1400" dirty="0"/>
+                    </a:p>
+                  </a:txBody>
+                  <a:tcPr/>
+                </a:tc>
+                <a:extLst>
+                  <a:ext uri="{0D108BD9-81ED-4DB2-BD59-A6C34878D82A}">
+                    <a16:rowId xmlns:a16="http://schemas.microsoft.com/office/drawing/2014/main" val="2397610778"/>
+                  </a:ext>
+                </a:extLst>
+              </a:tr>
+              <a:tr h="309342">
+                <a:tc>
+                  <a:txBody>
+                    <a:bodyPr/>
+                    <a:lstStyle/>
+                    <a:p>
+                      <a:r>
+                        <a:rPr lang="en-US" sz="1400" kern="1200" dirty="0">
+                          <a:solidFill>
+                            <a:schemeClr val="dk1"/>
+                          </a:solidFill>
+                          <a:effectLst/>
+                        </a:rPr>
+                        <a:t>parameter</a:t>
+                      </a:r>
+                      <a:endParaRPr lang="en-US" sz="1400" dirty="0"/>
+                    </a:p>
+                  </a:txBody>
+                  <a:tcPr/>
+                </a:tc>
+                <a:tc>
+                  <a:txBody>
+                    <a:bodyPr/>
+                    <a:lstStyle/>
+                    <a:p>
+                      <a:r>
+                        <a:rPr lang="en-US" sz="1400" i="1" dirty="0"/>
+                        <a:t>Replace the $param in </a:t>
+                      </a:r>
+                      <a:r>
+                        <a:rPr lang="en-US" sz="1400" i="1" dirty="0" err="1"/>
+                        <a:t>cmd</a:t>
+                      </a:r>
+                      <a:r>
+                        <a:rPr lang="en-US" sz="1400" i="1" dirty="0"/>
+                        <a:t> </a:t>
+                      </a:r>
+                      <a:r>
+                        <a:rPr lang="en-US" sz="1400" kern="1200" dirty="0">
+                          <a:solidFill>
+                            <a:schemeClr val="dk1"/>
+                          </a:solidFill>
+                          <a:effectLst/>
+                        </a:rPr>
+                        <a:t>to generate command</a:t>
+                      </a:r>
+                      <a:endParaRPr lang="en-US" sz="1400" dirty="0"/>
+                    </a:p>
+                  </a:txBody>
+                  <a:tcPr/>
+                </a:tc>
+                <a:extLst>
+                  <a:ext uri="{0D108BD9-81ED-4DB2-BD59-A6C34878D82A}">
+                    <a16:rowId xmlns:a16="http://schemas.microsoft.com/office/drawing/2014/main" val="621388844"/>
+                  </a:ext>
+                </a:extLst>
+              </a:tr>
+            </a:tbl>
+          </a:graphicData>
+        </a:graphic>
+      </p:graphicFrame>
     </p:spTree>
     <p:extLst>
       <p:ext uri="{BB962C8B-B14F-4D97-AF65-F5344CB8AC3E}">
@@ -17083,8 +17415,8 @@
         </p:nvSpPr>
         <p:spPr>
           <a:xfrm>
-            <a:off x="319525" y="1621795"/>
-            <a:ext cx="6767156" cy="712546"/>
+            <a:off x="397730" y="1378905"/>
+            <a:ext cx="6752041" cy="712546"/>
           </a:xfrm>
         </p:spPr>
         <p:txBody>
@@ -17097,11 +17429,11 @@
               <a:buNone/>
             </a:pPr>
             <a:r>
-              <a:rPr lang="en-US" sz="1550" dirty="0"/>
-              <a:t>1) </a:t>
-            </a:r>
-            <a:r>
-              <a:rPr lang="en-US" sz="1550" i="1" dirty="0">
+              <a:rPr lang="en-US" sz="1500" dirty="0"/>
+              <a:t>1)* </a:t>
+            </a:r>
+            <a:r>
+              <a:rPr lang="en-US" sz="1500" i="1" dirty="0">
                 <a:solidFill>
                   <a:schemeClr val="accent2"/>
                 </a:solidFill>
@@ -17109,7 +17441,7 @@
               <a:t>bash -c "$(curl 'https://</a:t>
             </a:r>
             <a:r>
-              <a:rPr lang="en-US" sz="1550" i="1" dirty="0" err="1">
+              <a:rPr lang="en-US" sz="1500" i="1" dirty="0" err="1">
                 <a:solidFill>
                   <a:schemeClr val="accent2"/>
                 </a:solidFill>
@@ -17117,7 +17449,7 @@
               <a:t>raw.githubusercontent.com</a:t>
             </a:r>
             <a:r>
-              <a:rPr lang="en-US" sz="1550" i="1" dirty="0">
+              <a:rPr lang="en-US" sz="1500" i="1" dirty="0">
                 <a:solidFill>
                   <a:schemeClr val="accent2"/>
                 </a:solidFill>
@@ -17125,7 +17457,7 @@
               <a:t>/zhteg4/</a:t>
             </a:r>
             <a:r>
-              <a:rPr lang="en-US" sz="1550" i="1" dirty="0" err="1">
+              <a:rPr lang="en-US" sz="1500" i="1" dirty="0" err="1">
                 <a:solidFill>
                   <a:schemeClr val="accent2"/>
                 </a:solidFill>
@@ -17133,7 +17465,7 @@
               <a:t>nemd</a:t>
             </a:r>
             <a:r>
-              <a:rPr lang="en-US" sz="1550" i="1" dirty="0">
+              <a:rPr lang="en-US" sz="1500" i="1" dirty="0">
                 <a:solidFill>
                   <a:schemeClr val="accent2"/>
                 </a:solidFill>
@@ -17146,11 +17478,11 @@
               <a:buNone/>
             </a:pPr>
             <a:r>
-              <a:rPr lang="en-US" sz="1550" dirty="0"/>
+              <a:rPr lang="en-US" sz="1500" dirty="0"/>
               <a:t>2) </a:t>
             </a:r>
             <a:r>
-              <a:rPr lang="en-US" sz="1550" i="1" dirty="0">
+              <a:rPr lang="en-US" sz="1500" i="1" dirty="0">
                 <a:solidFill>
                   <a:schemeClr val="accent1"/>
                 </a:solidFill>
@@ -17158,7 +17490,7 @@
               <a:t>cd ~/git/</a:t>
             </a:r>
             <a:r>
-              <a:rPr lang="en-US" sz="1550" i="1" dirty="0" err="1">
+              <a:rPr lang="en-US" sz="1500" i="1" dirty="0" err="1">
                 <a:solidFill>
                   <a:schemeClr val="accent1"/>
                 </a:solidFill>
@@ -17166,7 +17498,7 @@
               <a:t>nemd</a:t>
             </a:r>
             <a:r>
-              <a:rPr lang="en-US" sz="1550" i="1" dirty="0">
+              <a:rPr lang="en-US" sz="1500" i="1" dirty="0">
                 <a:solidFill>
                   <a:schemeClr val="accent1"/>
                 </a:solidFill>
@@ -17190,7 +17522,7 @@
         </p:nvSpPr>
         <p:spPr>
           <a:xfrm>
-            <a:off x="7149772" y="432226"/>
+            <a:off x="7149772" y="189336"/>
             <a:ext cx="4644498" cy="4401205"/>
           </a:xfrm>
           <a:prstGeom prst="rect">
@@ -17579,7 +17911,7 @@
         </p:nvSpPr>
         <p:spPr>
           <a:xfrm>
-            <a:off x="416261" y="2370813"/>
+            <a:off x="416261" y="2127923"/>
             <a:ext cx="6561822" cy="2468880"/>
           </a:xfrm>
           <a:prstGeom prst="rect">
@@ -18226,7 +18558,7 @@
         </p:nvSpPr>
         <p:spPr>
           <a:xfrm>
-            <a:off x="10772067" y="432226"/>
+            <a:off x="10772067" y="189336"/>
             <a:ext cx="1022203" cy="369332"/>
           </a:xfrm>
           <a:prstGeom prst="rect">
@@ -18273,7 +18605,7 @@
         </p:nvSpPr>
         <p:spPr>
           <a:xfrm>
-            <a:off x="5970243" y="4464099"/>
+            <a:off x="5970243" y="4221209"/>
             <a:ext cx="1007840" cy="369332"/>
           </a:xfrm>
           <a:prstGeom prst="rect">
@@ -18317,13 +18649,13 @@
           <p:nvPr>
             <p:extLst>
               <p:ext uri="{D42A27DB-BD31-4B8C-83A1-F6EECF244321}">
-                <p14:modId xmlns:p14="http://schemas.microsoft.com/office/powerpoint/2010/main" val="1714324843"/>
+                <p14:modId xmlns:p14="http://schemas.microsoft.com/office/powerpoint/2010/main" val="996424877"/>
               </p:ext>
             </p:extLst>
           </p:nvPr>
         </p:nvGraphicFramePr>
         <p:xfrm>
-          <a:off x="416261" y="5029200"/>
+          <a:off x="416261" y="4764878"/>
           <a:ext cx="11378010" cy="1557620"/>
         </p:xfrm>
         <a:graphic>
@@ -19331,7 +19663,133 @@
               <a:rPr lang="en-US" smtClean="0"/>
               <a:t>3</a:t>
             </a:fld>
-            <a:endParaRPr lang="en-US"/>
+            <a:endParaRPr lang="en-US" dirty="0"/>
+          </a:p>
+        </p:txBody>
+      </p:sp>
+      <p:sp>
+        <p:nvSpPr>
+          <p:cNvPr id="11" name="TextBox 10">
+            <a:extLst>
+              <a:ext uri="{FF2B5EF4-FFF2-40B4-BE49-F238E27FC236}">
+                <a16:creationId xmlns:a16="http://schemas.microsoft.com/office/drawing/2014/main" id="{2828832D-2287-F4AC-CF85-B0B344177870}"/>
+              </a:ext>
+            </a:extLst>
+          </p:cNvPr>
+          <p:cNvSpPr txBox="1"/>
+          <p:nvPr/>
+        </p:nvSpPr>
+        <p:spPr>
+          <a:xfrm>
+            <a:off x="416261" y="6349846"/>
+            <a:ext cx="8074381" cy="323165"/>
+          </a:xfrm>
+          <a:prstGeom prst="rect">
+            <a:avLst/>
+          </a:prstGeom>
+          <a:noFill/>
+        </p:spPr>
+        <p:txBody>
+          <a:bodyPr wrap="square">
+            <a:spAutoFit/>
+          </a:bodyPr>
+          <a:lstStyle/>
+          <a:p>
+            <a:pPr marL="0" indent="0">
+              <a:buNone/>
+            </a:pPr>
+            <a:r>
+              <a:rPr lang="en-US" sz="1500" dirty="0">
+                <a:effectLst/>
+              </a:rPr>
+              <a:t>* Ubuntu: </a:t>
+            </a:r>
+            <a:r>
+              <a:rPr lang="en-US" sz="1500" i="1" dirty="0">
+                <a:solidFill>
+                  <a:schemeClr val="accent2"/>
+                </a:solidFill>
+                <a:effectLst/>
+              </a:rPr>
+              <a:t>bash &lt;(</a:t>
+            </a:r>
+            <a:r>
+              <a:rPr lang="en-US" sz="1500" i="1" dirty="0" err="1">
+                <a:solidFill>
+                  <a:schemeClr val="accent2"/>
+                </a:solidFill>
+                <a:effectLst/>
+              </a:rPr>
+              <a:t>wget</a:t>
+            </a:r>
+            <a:r>
+              <a:rPr lang="en-US" sz="1500" i="1" dirty="0">
+                <a:solidFill>
+                  <a:schemeClr val="accent2"/>
+                </a:solidFill>
+                <a:effectLst/>
+              </a:rPr>
+              <a:t> -</a:t>
+            </a:r>
+            <a:r>
+              <a:rPr lang="en-US" sz="1500" i="1" dirty="0" err="1">
+                <a:solidFill>
+                  <a:schemeClr val="accent2"/>
+                </a:solidFill>
+                <a:effectLst/>
+              </a:rPr>
+              <a:t>qO</a:t>
+            </a:r>
+            <a:r>
+              <a:rPr lang="en-US" sz="1500" i="1" dirty="0">
+                <a:solidFill>
+                  <a:schemeClr val="accent2"/>
+                </a:solidFill>
+                <a:effectLst/>
+              </a:rPr>
+              <a:t>- https://</a:t>
+            </a:r>
+            <a:r>
+              <a:rPr lang="en-US" sz="1500" i="1" dirty="0" err="1">
+                <a:solidFill>
+                  <a:schemeClr val="accent2"/>
+                </a:solidFill>
+                <a:effectLst/>
+              </a:rPr>
+              <a:t>raw.githubusercontent.com</a:t>
+            </a:r>
+            <a:r>
+              <a:rPr lang="en-US" sz="1500" i="1" dirty="0">
+                <a:solidFill>
+                  <a:schemeClr val="accent2"/>
+                </a:solidFill>
+                <a:effectLst/>
+              </a:rPr>
+              <a:t>/zhteg4/</a:t>
+            </a:r>
+            <a:r>
+              <a:rPr lang="en-US" sz="1500" i="1" dirty="0" err="1">
+                <a:solidFill>
+                  <a:schemeClr val="accent2"/>
+                </a:solidFill>
+                <a:effectLst/>
+              </a:rPr>
+              <a:t>nemd</a:t>
+            </a:r>
+            <a:r>
+              <a:rPr lang="en-US" sz="1500" i="1" dirty="0">
+                <a:solidFill>
+                  <a:schemeClr val="accent2"/>
+                </a:solidFill>
+                <a:effectLst/>
+              </a:rPr>
+              <a:t>/main/setup)</a:t>
+            </a:r>
+            <a:endParaRPr lang="en-US" sz="1500" i="1" dirty="0">
+              <a:solidFill>
+                <a:schemeClr val="accent2"/>
+              </a:solidFill>
+            </a:endParaRPr>
           </a:p>
         </p:txBody>
       </p:sp>
@@ -20404,14 +20862,6 @@
                 <a:effectLst/>
               </a:rPr>
             </a:br>
-            <a:br>
-              <a:rPr lang="en-US" sz="1300" dirty="0">
-                <a:solidFill>
-                  <a:srgbClr val="BCBEC4"/>
-                </a:solidFill>
-                <a:effectLst/>
-              </a:rPr>
-            </a:br>
             <a:r>
               <a:rPr lang="en-US" sz="1300" dirty="0">
                 <a:effectLst/>
@@ -20776,13 +21226,13 @@
           <p:nvPr>
             <p:extLst>
               <p:ext uri="{D42A27DB-BD31-4B8C-83A1-F6EECF244321}">
-                <p14:modId xmlns:p14="http://schemas.microsoft.com/office/powerpoint/2010/main" val="2463246044"/>
+                <p14:modId xmlns:p14="http://schemas.microsoft.com/office/powerpoint/2010/main" val="3633392695"/>
               </p:ext>
             </p:extLst>
           </p:nvPr>
         </p:nvGraphicFramePr>
         <p:xfrm>
-          <a:off x="5163591" y="4146884"/>
+          <a:off x="5163591" y="3954001"/>
           <a:ext cx="4297680" cy="2133600"/>
         </p:xfrm>
         <a:graphic>
@@ -21424,7 +21874,7 @@
         </p:nvSpPr>
         <p:spPr>
           <a:xfrm>
-            <a:off x="9579769" y="4572001"/>
+            <a:off x="9579769" y="4379118"/>
             <a:ext cx="171450" cy="728662"/>
           </a:xfrm>
           <a:prstGeom prst="rightBrace">
@@ -21472,7 +21922,7 @@
         </p:nvCxnSpPr>
         <p:spPr>
           <a:xfrm>
-            <a:off x="9579769" y="5543551"/>
+            <a:off x="9579769" y="5350668"/>
             <a:ext cx="171450" cy="0"/>
           </a:xfrm>
           <a:prstGeom prst="straightConnector1">
@@ -21511,7 +21961,7 @@
         </p:nvSpPr>
         <p:spPr>
           <a:xfrm>
-            <a:off x="9869717" y="4751666"/>
+            <a:off x="9869717" y="4558783"/>
             <a:ext cx="1610289" cy="369332"/>
           </a:xfrm>
           <a:prstGeom prst="rect">
@@ -21549,7 +21999,7 @@
         </p:nvSpPr>
         <p:spPr>
           <a:xfrm>
-            <a:off x="9928515" y="5330309"/>
+            <a:off x="9928515" y="5137426"/>
             <a:ext cx="1484083" cy="369332"/>
           </a:xfrm>
           <a:prstGeom prst="rect">
@@ -29156,14 +29606,14 @@
           <p:nvPr>
             <p:extLst>
               <p:ext uri="{D42A27DB-BD31-4B8C-83A1-F6EECF244321}">
-                <p14:modId xmlns:p14="http://schemas.microsoft.com/office/powerpoint/2010/main" val="1506866693"/>
+                <p14:modId xmlns:p14="http://schemas.microsoft.com/office/powerpoint/2010/main" val="471451668"/>
               </p:ext>
             </p:extLst>
           </p:nvPr>
         </p:nvGraphicFramePr>
         <p:xfrm>
           <a:off x="714893" y="1591570"/>
-          <a:ext cx="10753965" cy="4782436"/>
+          <a:ext cx="10753965" cy="4764025"/>
         </p:xfrm>
         <a:graphic>
           <a:graphicData uri="http://schemas.openxmlformats.org/drawingml/2006/table">
@@ -29194,7 +29644,7 @@
                   </a:extLst>
                 </a:gridCol>
               </a:tblGrid>
-              <a:tr h="548590">
+              <a:tr h="548783">
                 <a:tc>
                   <a:txBody>
                     <a:bodyPr/>
@@ -29273,7 +29723,7 @@
                   </a:ext>
                 </a:extLst>
               </a:tr>
-              <a:tr h="822886">
+              <a:tr h="823174">
                 <a:tc>
                   <a:txBody>
                     <a:bodyPr/>
@@ -29385,7 +29835,7 @@
                   </a:ext>
                 </a:extLst>
               </a:tr>
-              <a:tr h="852709">
+              <a:tr h="848017">
                 <a:tc>
                   <a:txBody>
                     <a:bodyPr/>
@@ -29504,7 +29954,7 @@
                   </a:ext>
                 </a:extLst>
               </a:tr>
-              <a:tr h="852709">
+              <a:tr h="848017">
                 <a:tc>
                   <a:txBody>
                     <a:bodyPr/>
@@ -29643,7 +30093,7 @@
                   </a:ext>
                 </a:extLst>
               </a:tr>
-              <a:tr h="852709">
+              <a:tr h="848017">
                 <a:tc>
                   <a:txBody>
                     <a:bodyPr/>
@@ -29778,7 +30228,7 @@
                   </a:ext>
                 </a:extLst>
               </a:tr>
-              <a:tr h="852709">
+              <a:tr h="848017">
                 <a:tc>
                   <a:txBody>
                     <a:bodyPr/>

</xml_diff>

<commit_message>
lammps_driver.py errors when returncode !=0 and ERROR in log test_workflow.py added to the Power Point
</commit_message>
<xml_diff>
--- a/docs/power_point/nemd.pptx
+++ b/docs/power_point/nemd.pptx
@@ -5,7 +5,7 @@
     <p:sldMasterId id="2147483648" r:id="rId1"/>
   </p:sldMasterIdLst>
   <p:notesMasterIdLst>
-    <p:notesMasterId r:id="rId18"/>
+    <p:notesMasterId r:id="rId19"/>
   </p:notesMasterIdLst>
   <p:sldIdLst>
     <p:sldId id="256" r:id="rId2"/>
@@ -18,12 +18,13 @@
     <p:sldId id="269" r:id="rId9"/>
     <p:sldId id="261" r:id="rId10"/>
     <p:sldId id="263" r:id="rId11"/>
-    <p:sldId id="262" r:id="rId12"/>
-    <p:sldId id="271" r:id="rId13"/>
-    <p:sldId id="268" r:id="rId14"/>
-    <p:sldId id="267" r:id="rId15"/>
-    <p:sldId id="272" r:id="rId16"/>
-    <p:sldId id="265" r:id="rId17"/>
+    <p:sldId id="273" r:id="rId12"/>
+    <p:sldId id="262" r:id="rId13"/>
+    <p:sldId id="271" r:id="rId14"/>
+    <p:sldId id="268" r:id="rId15"/>
+    <p:sldId id="267" r:id="rId16"/>
+    <p:sldId id="272" r:id="rId17"/>
+    <p:sldId id="265" r:id="rId18"/>
   </p:sldIdLst>
   <p:sldSz cx="12192000" cy="6858000"/>
   <p:notesSz cx="6858000" cy="9144000"/>
@@ -3131,7 +3132,7 @@
           <a:p>
             <a:fld id="{4E7935B3-F5AC-0F49-A77F-693DEAA46623}" type="datetimeFigureOut">
               <a:rPr lang="en-US" smtClean="0"/>
-              <a:t>2/10/25</a:t>
+              <a:t>2/12/25</a:t>
             </a:fld>
             <a:endParaRPr lang="en-US"/>
           </a:p>
@@ -3797,7 +3798,7 @@
           <a:p>
             <a:fld id="{7139230D-D256-FE47-99BF-6F642436F56E}" type="datetime1">
               <a:rPr lang="en-US" smtClean="0"/>
-              <a:t>2/10/25</a:t>
+              <a:t>2/12/25</a:t>
             </a:fld>
             <a:endParaRPr lang="en-US"/>
           </a:p>
@@ -3995,7 +3996,7 @@
           <a:p>
             <a:fld id="{785AC849-5CEB-3846-9265-8D72BE481A70}" type="datetime1">
               <a:rPr lang="en-US" smtClean="0"/>
-              <a:t>2/10/25</a:t>
+              <a:t>2/12/25</a:t>
             </a:fld>
             <a:endParaRPr lang="en-US"/>
           </a:p>
@@ -4203,7 +4204,7 @@
           <a:p>
             <a:fld id="{A02BBDEB-BEE0-FD44-AAFC-27969F9541FD}" type="datetime1">
               <a:rPr lang="en-US" smtClean="0"/>
-              <a:t>2/10/25</a:t>
+              <a:t>2/12/25</a:t>
             </a:fld>
             <a:endParaRPr lang="en-US"/>
           </a:p>
@@ -4401,7 +4402,7 @@
           <a:p>
             <a:fld id="{4F82860A-5855-1941-A1E0-F1AE52EC854D}" type="datetime1">
               <a:rPr lang="en-US" smtClean="0"/>
-              <a:t>2/10/25</a:t>
+              <a:t>2/12/25</a:t>
             </a:fld>
             <a:endParaRPr lang="en-US"/>
           </a:p>
@@ -4676,7 +4677,7 @@
           <a:p>
             <a:fld id="{6A874B4C-42F5-E24E-B25F-613EC7F4AF0D}" type="datetime1">
               <a:rPr lang="en-US" smtClean="0"/>
-              <a:t>2/10/25</a:t>
+              <a:t>2/12/25</a:t>
             </a:fld>
             <a:endParaRPr lang="en-US"/>
           </a:p>
@@ -4941,7 +4942,7 @@
           <a:p>
             <a:fld id="{9A2BCD20-0178-0C41-9D8E-10FA267A6CCC}" type="datetime1">
               <a:rPr lang="en-US" smtClean="0"/>
-              <a:t>2/10/25</a:t>
+              <a:t>2/12/25</a:t>
             </a:fld>
             <a:endParaRPr lang="en-US"/>
           </a:p>
@@ -5353,7 +5354,7 @@
           <a:p>
             <a:fld id="{EDE58456-60EB-6840-BCEB-E4C2678C039E}" type="datetime1">
               <a:rPr lang="en-US" smtClean="0"/>
-              <a:t>2/10/25</a:t>
+              <a:t>2/12/25</a:t>
             </a:fld>
             <a:endParaRPr lang="en-US"/>
           </a:p>
@@ -5494,7 +5495,7 @@
           <a:p>
             <a:fld id="{8BBFCD94-1F0D-3948-A9F0-DB82F9AAC2D3}" type="datetime1">
               <a:rPr lang="en-US" smtClean="0"/>
-              <a:t>2/10/25</a:t>
+              <a:t>2/12/25</a:t>
             </a:fld>
             <a:endParaRPr lang="en-US"/>
           </a:p>
@@ -5607,7 +5608,7 @@
           <a:p>
             <a:fld id="{13692FAC-AC21-0848-AC27-426B7BF29104}" type="datetime1">
               <a:rPr lang="en-US" smtClean="0"/>
-              <a:t>2/10/25</a:t>
+              <a:t>2/12/25</a:t>
             </a:fld>
             <a:endParaRPr lang="en-US"/>
           </a:p>
@@ -5918,7 +5919,7 @@
           <a:p>
             <a:fld id="{A3FF56F3-8608-FF4D-9C26-AE6D473095CB}" type="datetime1">
               <a:rPr lang="en-US" smtClean="0"/>
-              <a:t>2/10/25</a:t>
+              <a:t>2/12/25</a:t>
             </a:fld>
             <a:endParaRPr lang="en-US"/>
           </a:p>
@@ -6206,7 +6207,7 @@
           <a:p>
             <a:fld id="{58CC49A9-C646-2345-B4A7-439457175566}" type="datetime1">
               <a:rPr lang="en-US" smtClean="0"/>
-              <a:t>2/10/25</a:t>
+              <a:t>2/12/25</a:t>
             </a:fld>
             <a:endParaRPr lang="en-US"/>
           </a:p>
@@ -6447,7 +6448,7 @@
           <a:p>
             <a:fld id="{D516C8CC-C3CD-B94B-94D6-0913487DB5E5}" type="datetime1">
               <a:rPr lang="en-US" smtClean="0"/>
-              <a:t>2/10/25</a:t>
+              <a:t>2/12/25</a:t>
             </a:fld>
             <a:endParaRPr lang="en-US"/>
           </a:p>
@@ -8541,6 +8542,1565 @@
   <p:cSld>
     <p:spTree>
       <p:nvGrpSpPr>
+        <p:cNvPr id="1" name="">
+          <a:extLst>
+            <a:ext uri="{FF2B5EF4-FFF2-40B4-BE49-F238E27FC236}">
+              <a16:creationId xmlns:a16="http://schemas.microsoft.com/office/drawing/2014/main" id="{7490AB48-4D0B-7282-1FF0-0E7F7304379E}"/>
+            </a:ext>
+          </a:extLst>
+        </p:cNvPr>
+        <p:cNvGrpSpPr/>
+        <p:nvPr/>
+      </p:nvGrpSpPr>
+      <p:grpSpPr>
+        <a:xfrm>
+          <a:off x="0" y="0"/>
+          <a:ext cx="0" cy="0"/>
+          <a:chOff x="0" y="0"/>
+          <a:chExt cx="0" cy="0"/>
+        </a:xfrm>
+      </p:grpSpPr>
+      <p:sp>
+        <p:nvSpPr>
+          <p:cNvPr id="2" name="Title 1">
+            <a:extLst>
+              <a:ext uri="{FF2B5EF4-FFF2-40B4-BE49-F238E27FC236}">
+                <a16:creationId xmlns:a16="http://schemas.microsoft.com/office/drawing/2014/main" id="{7D93CF70-0072-42F8-CA2A-26EFF1100DFD}"/>
+              </a:ext>
+            </a:extLst>
+          </p:cNvPr>
+          <p:cNvSpPr>
+            <a:spLocks noGrp="1"/>
+          </p:cNvSpPr>
+          <p:nvPr>
+            <p:ph type="title"/>
+          </p:nvPr>
+        </p:nvSpPr>
+        <p:spPr>
+          <a:xfrm>
+            <a:off x="838199" y="65081"/>
+            <a:ext cx="7052734" cy="1325563"/>
+          </a:xfrm>
+        </p:spPr>
+        <p:txBody>
+          <a:bodyPr/>
+          <a:lstStyle/>
+          <a:p>
+            <a:r>
+              <a:rPr lang="en-US" dirty="0" err="1"/>
+              <a:t>test_workflow.py</a:t>
+            </a:r>
+            <a:endParaRPr lang="en-US" dirty="0"/>
+          </a:p>
+        </p:txBody>
+      </p:sp>
+      <p:sp>
+        <p:nvSpPr>
+          <p:cNvPr id="3" name="Slide Number Placeholder 2">
+            <a:extLst>
+              <a:ext uri="{FF2B5EF4-FFF2-40B4-BE49-F238E27FC236}">
+                <a16:creationId xmlns:a16="http://schemas.microsoft.com/office/drawing/2014/main" id="{6529FC4E-A5C6-5829-9B82-9B625439DD6C}"/>
+              </a:ext>
+            </a:extLst>
+          </p:cNvPr>
+          <p:cNvSpPr>
+            <a:spLocks noGrp="1"/>
+          </p:cNvSpPr>
+          <p:nvPr>
+            <p:ph type="sldNum" sz="quarter" idx="12"/>
+          </p:nvPr>
+        </p:nvSpPr>
+        <p:spPr/>
+        <p:txBody>
+          <a:bodyPr/>
+          <a:lstStyle/>
+          <a:p>
+            <a:fld id="{CF79FC58-3559-EC47-B32E-5EF128B06581}" type="slidenum">
+              <a:rPr lang="en-US" smtClean="0"/>
+              <a:t>11</a:t>
+            </a:fld>
+            <a:endParaRPr lang="en-US"/>
+          </a:p>
+        </p:txBody>
+      </p:sp>
+      <p:graphicFrame>
+        <p:nvGraphicFramePr>
+          <p:cNvPr id="6" name="Table 5">
+            <a:extLst>
+              <a:ext uri="{FF2B5EF4-FFF2-40B4-BE49-F238E27FC236}">
+                <a16:creationId xmlns:a16="http://schemas.microsoft.com/office/drawing/2014/main" id="{1FDE4EC0-08D4-966E-FA72-011021835E02}"/>
+              </a:ext>
+            </a:extLst>
+          </p:cNvPr>
+          <p:cNvGraphicFramePr>
+            <a:graphicFrameLocks noGrp="1"/>
+          </p:cNvGraphicFramePr>
+          <p:nvPr>
+            <p:extLst>
+              <p:ext uri="{D42A27DB-BD31-4B8C-83A1-F6EECF244321}">
+                <p14:modId xmlns:p14="http://schemas.microsoft.com/office/powerpoint/2010/main" val="3482890042"/>
+              </p:ext>
+            </p:extLst>
+          </p:nvPr>
+        </p:nvGraphicFramePr>
+        <p:xfrm>
+          <a:off x="956732" y="1236133"/>
+          <a:ext cx="10397067" cy="5120220"/>
+        </p:xfrm>
+        <a:graphic>
+          <a:graphicData uri="http://schemas.openxmlformats.org/drawingml/2006/table">
+            <a:tbl>
+              <a:tblPr firstRow="1" bandRow="1">
+                <a:tableStyleId>{9D7B26C5-4107-4FEC-AEDC-1716B250A1EF}</a:tableStyleId>
+              </a:tblPr>
+              <a:tblGrid>
+                <a:gridCol w="4238243">
+                  <a:extLst>
+                    <a:ext uri="{9D8B030D-6E8A-4147-A177-3AD203B41FA5}">
+                      <a16:colId xmlns:a16="http://schemas.microsoft.com/office/drawing/2014/main" val="746965002"/>
+                    </a:ext>
+                  </a:extLst>
+                </a:gridCol>
+                <a:gridCol w="6158824">
+                  <a:extLst>
+                    <a:ext uri="{9D8B030D-6E8A-4147-A177-3AD203B41FA5}">
+                      <a16:colId xmlns:a16="http://schemas.microsoft.com/office/drawing/2014/main" val="295673291"/>
+                    </a:ext>
+                  </a:extLst>
+                </a:gridCol>
+              </a:tblGrid>
+              <a:tr h="372508">
+                <a:tc>
+                  <a:txBody>
+                    <a:bodyPr/>
+                    <a:lstStyle/>
+                    <a:p>
+                      <a:pPr marL="0" marR="0" lvl="0" indent="0" algn="l" defTabSz="914400" rtl="0" eaLnBrk="1" fontAlgn="auto" latinLnBrk="0" hangingPunct="1">
+                        <a:lnSpc>
+                          <a:spcPct val="100000"/>
+                        </a:lnSpc>
+                        <a:spcBef>
+                          <a:spcPts val="0"/>
+                        </a:spcBef>
+                        <a:spcAft>
+                          <a:spcPts val="0"/>
+                        </a:spcAft>
+                        <a:buClrTx/>
+                        <a:buSzTx/>
+                        <a:buFontTx/>
+                        <a:buNone/>
+                        <a:tabLst/>
+                        <a:defRPr/>
+                      </a:pPr>
+                      <a:r>
+                        <a:rPr lang="en-US" sz="1800" kern="1200" dirty="0">
+                          <a:effectLst/>
+                        </a:rPr>
+                        <a:t>Supported arguments</a:t>
+                      </a:r>
+                      <a:endParaRPr lang="en-US" sz="1800" kern="1200" dirty="0">
+                        <a:solidFill>
+                          <a:schemeClr val="dk1"/>
+                        </a:solidFill>
+                        <a:effectLst/>
+                        <a:latin typeface="+mn-lt"/>
+                        <a:ea typeface="+mn-ea"/>
+                        <a:cs typeface="+mn-cs"/>
+                      </a:endParaRPr>
+                    </a:p>
+                  </a:txBody>
+                  <a:tcPr/>
+                </a:tc>
+                <a:tc>
+                  <a:txBody>
+                    <a:bodyPr/>
+                    <a:lstStyle/>
+                    <a:p>
+                      <a:r>
+                        <a:rPr lang="en-US" dirty="0"/>
+                        <a:t>Description</a:t>
+                      </a:r>
+                    </a:p>
+                  </a:txBody>
+                  <a:tcPr/>
+                </a:tc>
+                <a:extLst>
+                  <a:ext uri="{0D108BD9-81ED-4DB2-BD59-A6C34878D82A}">
+                    <a16:rowId xmlns:a16="http://schemas.microsoft.com/office/drawing/2014/main" val="2095691384"/>
+                  </a:ext>
+                </a:extLst>
+              </a:tr>
+              <a:tr h="745015">
+                <a:tc>
+                  <a:txBody>
+                    <a:bodyPr/>
+                    <a:lstStyle/>
+                    <a:p>
+                      <a:r>
+                        <a:rPr lang="en-US" sz="1400" kern="1200" dirty="0">
+                          <a:solidFill>
+                            <a:schemeClr val="tx1"/>
+                          </a:solidFill>
+                          <a:effectLst/>
+                        </a:rPr>
+                        <a:t>-name {</a:t>
+                      </a:r>
+                      <a:r>
+                        <a:rPr lang="en-US" sz="1400" kern="1200" dirty="0" err="1">
+                          <a:solidFill>
+                            <a:schemeClr val="accent6"/>
+                          </a:solidFill>
+                          <a:effectLst/>
+                        </a:rPr>
+                        <a:t>integration</a:t>
+                      </a:r>
+                      <a:r>
+                        <a:rPr lang="en-US" sz="1400" kern="1200" dirty="0" err="1">
+                          <a:solidFill>
+                            <a:schemeClr val="tx1"/>
+                          </a:solidFill>
+                          <a:effectLst/>
+                        </a:rPr>
+                        <a:t>,</a:t>
+                      </a:r>
+                      <a:r>
+                        <a:rPr lang="en-US" sz="1400" kern="1200" dirty="0" err="1">
+                          <a:solidFill>
+                            <a:schemeClr val="accent1"/>
+                          </a:solidFill>
+                          <a:effectLst/>
+                        </a:rPr>
+                        <a:t>performance</a:t>
+                      </a:r>
+                      <a:r>
+                        <a:rPr lang="en-US" sz="1400" kern="1200" dirty="0" err="1">
+                          <a:solidFill>
+                            <a:schemeClr val="tx1"/>
+                          </a:solidFill>
+                          <a:effectLst/>
+                        </a:rPr>
+                        <a:t>,</a:t>
+                      </a:r>
+                      <a:r>
+                        <a:rPr lang="en-US" sz="1400" kern="1200" dirty="0" err="1">
+                          <a:solidFill>
+                            <a:schemeClr val="accent2"/>
+                          </a:solidFill>
+                          <a:effectLst/>
+                        </a:rPr>
+                        <a:t>scientific</a:t>
+                      </a:r>
+                      <a:r>
+                        <a:rPr lang="en-US" sz="1400" kern="1200" dirty="0">
+                          <a:solidFill>
+                            <a:schemeClr val="tx1"/>
+                          </a:solidFill>
+                          <a:effectLst/>
+                        </a:rPr>
+                        <a:t>}</a:t>
+                      </a:r>
+                      <a:endParaRPr lang="en-US" sz="1400" kern="1200" dirty="0">
+                        <a:solidFill>
+                          <a:schemeClr val="tx1"/>
+                        </a:solidFill>
+                        <a:effectLst/>
+                        <a:latin typeface="+mn-lt"/>
+                        <a:ea typeface="+mn-ea"/>
+                        <a:cs typeface="+mn-cs"/>
+                      </a:endParaRPr>
+                    </a:p>
+                  </a:txBody>
+                  <a:tcPr/>
+                </a:tc>
+                <a:tc>
+                  <a:txBody>
+                    <a:bodyPr/>
+                    <a:lstStyle/>
+                    <a:p>
+                      <a:pPr marL="0" marR="0" lvl="0" indent="0" algn="l" defTabSz="914400" rtl="0" eaLnBrk="1" fontAlgn="auto" latinLnBrk="0" hangingPunct="1">
+                        <a:lnSpc>
+                          <a:spcPct val="100000"/>
+                        </a:lnSpc>
+                        <a:spcBef>
+                          <a:spcPts val="0"/>
+                        </a:spcBef>
+                        <a:spcAft>
+                          <a:spcPts val="0"/>
+                        </a:spcAft>
+                        <a:buClrTx/>
+                        <a:buSzTx/>
+                        <a:buFontTx/>
+                        <a:buNone/>
+                        <a:tabLst/>
+                        <a:defRPr/>
+                      </a:pPr>
+                      <a:r>
+                        <a:rPr lang="en-US" sz="1400" kern="1200" dirty="0">
+                          <a:solidFill>
+                            <a:schemeClr val="accent6"/>
+                          </a:solidFill>
+                          <a:effectLst/>
+                        </a:rPr>
+                        <a:t>integration: reproducible</a:t>
+                      </a:r>
+                      <a:endParaRPr lang="en-US" sz="1400" kern="1200" dirty="0">
+                        <a:solidFill>
+                          <a:schemeClr val="tx1"/>
+                        </a:solidFill>
+                        <a:effectLst/>
+                      </a:endParaRPr>
+                    </a:p>
+                    <a:p>
+                      <a:pPr marL="0" marR="0" lvl="0" indent="0" algn="l" defTabSz="914400" rtl="0" eaLnBrk="1" fontAlgn="auto" latinLnBrk="0" hangingPunct="1">
+                        <a:lnSpc>
+                          <a:spcPct val="100000"/>
+                        </a:lnSpc>
+                        <a:spcBef>
+                          <a:spcPts val="0"/>
+                        </a:spcBef>
+                        <a:spcAft>
+                          <a:spcPts val="0"/>
+                        </a:spcAft>
+                        <a:buClrTx/>
+                        <a:buSzTx/>
+                        <a:buFontTx/>
+                        <a:buNone/>
+                        <a:tabLst/>
+                        <a:defRPr/>
+                      </a:pPr>
+                      <a:r>
+                        <a:rPr lang="en-US" sz="1400" kern="1200" dirty="0">
+                          <a:solidFill>
+                            <a:schemeClr val="accent1"/>
+                          </a:solidFill>
+                          <a:effectLst/>
+                        </a:rPr>
+                        <a:t>performance: resource efficient</a:t>
+                      </a:r>
+                      <a:endParaRPr lang="en-US" sz="1400" kern="1200" dirty="0">
+                        <a:solidFill>
+                          <a:schemeClr val="tx1"/>
+                        </a:solidFill>
+                        <a:effectLst/>
+                      </a:endParaRPr>
+                    </a:p>
+                    <a:p>
+                      <a:pPr marL="0" marR="0" lvl="0" indent="0" algn="l" defTabSz="914400" rtl="0" eaLnBrk="1" fontAlgn="auto" latinLnBrk="0" hangingPunct="1">
+                        <a:lnSpc>
+                          <a:spcPct val="100000"/>
+                        </a:lnSpc>
+                        <a:spcBef>
+                          <a:spcPts val="0"/>
+                        </a:spcBef>
+                        <a:spcAft>
+                          <a:spcPts val="0"/>
+                        </a:spcAft>
+                        <a:buClrTx/>
+                        <a:buSzTx/>
+                        <a:buFontTx/>
+                        <a:buNone/>
+                        <a:tabLst/>
+                        <a:defRPr/>
+                      </a:pPr>
+                      <a:r>
+                        <a:rPr lang="en-US" sz="1400" kern="1200" dirty="0">
+                          <a:solidFill>
+                            <a:schemeClr val="accent2"/>
+                          </a:solidFill>
+                          <a:effectLst/>
+                        </a:rPr>
+                        <a:t>scientific: physical meaningful</a:t>
+                      </a:r>
+                      <a:endParaRPr lang="en-US" sz="1400" kern="1200" dirty="0">
+                        <a:solidFill>
+                          <a:schemeClr val="accent2"/>
+                        </a:solidFill>
+                        <a:effectLst/>
+                        <a:latin typeface="+mn-lt"/>
+                        <a:ea typeface="+mn-ea"/>
+                        <a:cs typeface="+mn-cs"/>
+                      </a:endParaRPr>
+                    </a:p>
+                  </a:txBody>
+                  <a:tcPr/>
+                </a:tc>
+                <a:extLst>
+                  <a:ext uri="{0D108BD9-81ED-4DB2-BD59-A6C34878D82A}">
+                    <a16:rowId xmlns:a16="http://schemas.microsoft.com/office/drawing/2014/main" val="3847890681"/>
+                  </a:ext>
+                </a:extLst>
+              </a:tr>
+              <a:tr h="310423">
+                <a:tc>
+                  <a:txBody>
+                    <a:bodyPr/>
+                    <a:lstStyle/>
+                    <a:p>
+                      <a:pPr marL="0" marR="0" lvl="0" indent="0" algn="l" defTabSz="914400" rtl="0" eaLnBrk="1" fontAlgn="auto" latinLnBrk="0" hangingPunct="1">
+                        <a:lnSpc>
+                          <a:spcPct val="100000"/>
+                        </a:lnSpc>
+                        <a:spcBef>
+                          <a:spcPts val="0"/>
+                        </a:spcBef>
+                        <a:spcAft>
+                          <a:spcPts val="0"/>
+                        </a:spcAft>
+                        <a:buClrTx/>
+                        <a:buSzTx/>
+                        <a:buFontTx/>
+                        <a:buNone/>
+                        <a:tabLst/>
+                        <a:defRPr/>
+                      </a:pPr>
+                      <a:r>
+                        <a:rPr lang="en-US" sz="1400" kern="1200" dirty="0">
+                          <a:solidFill>
+                            <a:schemeClr val="tx1"/>
+                          </a:solidFill>
+                          <a:effectLst/>
+                        </a:rPr>
+                        <a:t>-</a:t>
+                      </a:r>
+                      <a:r>
+                        <a:rPr lang="en-US" sz="1400" kern="1200" dirty="0" err="1">
+                          <a:solidFill>
+                            <a:schemeClr val="tx1"/>
+                          </a:solidFill>
+                          <a:effectLst/>
+                        </a:rPr>
+                        <a:t>dir</a:t>
+                      </a:r>
+                      <a:r>
+                        <a:rPr lang="en-US" sz="1400" kern="1200" dirty="0">
+                          <a:solidFill>
+                            <a:schemeClr val="tx1"/>
+                          </a:solidFill>
+                          <a:effectLst/>
+                        </a:rPr>
+                        <a:t> DIR</a:t>
+                      </a:r>
+                      <a:endParaRPr lang="en-US" sz="1400" kern="1200" dirty="0">
+                        <a:solidFill>
+                          <a:schemeClr val="tx1"/>
+                        </a:solidFill>
+                        <a:effectLst/>
+                        <a:latin typeface="+mn-lt"/>
+                        <a:ea typeface="+mn-ea"/>
+                        <a:cs typeface="+mn-cs"/>
+                      </a:endParaRPr>
+                    </a:p>
+                  </a:txBody>
+                  <a:tcPr/>
+                </a:tc>
+                <a:tc>
+                  <a:txBody>
+                    <a:bodyPr/>
+                    <a:lstStyle/>
+                    <a:p>
+                      <a:r>
+                        <a:rPr lang="en-US" sz="1400" kern="1200" dirty="0">
+                          <a:solidFill>
+                            <a:schemeClr val="tx1"/>
+                          </a:solidFill>
+                          <a:effectLst/>
+                        </a:rPr>
+                        <a:t>Search test(s) under this directory</a:t>
+                      </a:r>
+                      <a:endParaRPr lang="en-US" sz="1400" kern="1200" dirty="0">
+                        <a:solidFill>
+                          <a:schemeClr val="tx1"/>
+                        </a:solidFill>
+                        <a:effectLst/>
+                        <a:latin typeface="+mn-lt"/>
+                        <a:ea typeface="+mn-ea"/>
+                        <a:cs typeface="+mn-cs"/>
+                      </a:endParaRPr>
+                    </a:p>
+                  </a:txBody>
+                  <a:tcPr/>
+                </a:tc>
+                <a:extLst>
+                  <a:ext uri="{0D108BD9-81ED-4DB2-BD59-A6C34878D82A}">
+                    <a16:rowId xmlns:a16="http://schemas.microsoft.com/office/drawing/2014/main" val="2504991860"/>
+                  </a:ext>
+                </a:extLst>
+              </a:tr>
+              <a:tr h="310423">
+                <a:tc>
+                  <a:txBody>
+                    <a:bodyPr/>
+                    <a:lstStyle/>
+                    <a:p>
+                      <a:pPr marL="0" marR="0" lvl="0" indent="0" algn="l" defTabSz="914400" rtl="0" eaLnBrk="1" fontAlgn="auto" latinLnBrk="0" hangingPunct="1">
+                        <a:lnSpc>
+                          <a:spcPct val="100000"/>
+                        </a:lnSpc>
+                        <a:spcBef>
+                          <a:spcPts val="0"/>
+                        </a:spcBef>
+                        <a:spcAft>
+                          <a:spcPts val="0"/>
+                        </a:spcAft>
+                        <a:buClrTx/>
+                        <a:buSzTx/>
+                        <a:buFontTx/>
+                        <a:buNone/>
+                        <a:tabLst/>
+                        <a:defRPr/>
+                      </a:pPr>
+                      <a:r>
+                        <a:rPr lang="en-US" sz="1400" kern="1200" dirty="0">
+                          <a:solidFill>
+                            <a:schemeClr val="tx1"/>
+                          </a:solidFill>
+                          <a:effectLst/>
+                        </a:rPr>
+                        <a:t>ID</a:t>
+                      </a:r>
+                      <a:endParaRPr lang="en-US" sz="1400" kern="1200" dirty="0">
+                        <a:solidFill>
+                          <a:schemeClr val="tx1"/>
+                        </a:solidFill>
+                        <a:effectLst/>
+                        <a:latin typeface="+mn-lt"/>
+                        <a:ea typeface="+mn-ea"/>
+                        <a:cs typeface="+mn-cs"/>
+                      </a:endParaRPr>
+                    </a:p>
+                  </a:txBody>
+                  <a:tcPr/>
+                </a:tc>
+                <a:tc>
+                  <a:txBody>
+                    <a:bodyPr/>
+                    <a:lstStyle/>
+                    <a:p>
+                      <a:pPr marL="0" marR="0" lvl="0" indent="0" algn="l" defTabSz="914400" rtl="0" eaLnBrk="1" fontAlgn="auto" latinLnBrk="0" hangingPunct="1">
+                        <a:lnSpc>
+                          <a:spcPct val="100000"/>
+                        </a:lnSpc>
+                        <a:spcBef>
+                          <a:spcPts val="0"/>
+                        </a:spcBef>
+                        <a:spcAft>
+                          <a:spcPts val="0"/>
+                        </a:spcAft>
+                        <a:buClrTx/>
+                        <a:buSzTx/>
+                        <a:buFontTx/>
+                        <a:buNone/>
+                        <a:tabLst/>
+                        <a:defRPr/>
+                      </a:pPr>
+                      <a:r>
+                        <a:rPr lang="en-US" sz="1400" kern="1200" dirty="0">
+                          <a:solidFill>
+                            <a:schemeClr val="tx1"/>
+                          </a:solidFill>
+                          <a:effectLst/>
+                        </a:rPr>
+                        <a:t>Select the tests according to these ids</a:t>
+                      </a:r>
+                      <a:endParaRPr lang="en-US" sz="1400" kern="1200" dirty="0">
+                        <a:solidFill>
+                          <a:schemeClr val="tx1"/>
+                        </a:solidFill>
+                        <a:effectLst/>
+                        <a:latin typeface="+mn-lt"/>
+                        <a:ea typeface="+mn-ea"/>
+                        <a:cs typeface="+mn-cs"/>
+                      </a:endParaRPr>
+                    </a:p>
+                  </a:txBody>
+                  <a:tcPr/>
+                </a:tc>
+                <a:extLst>
+                  <a:ext uri="{0D108BD9-81ED-4DB2-BD59-A6C34878D82A}">
+                    <a16:rowId xmlns:a16="http://schemas.microsoft.com/office/drawing/2014/main" val="3320858068"/>
+                  </a:ext>
+                </a:extLst>
+              </a:tr>
+              <a:tr h="371628">
+                <a:tc>
+                  <a:txBody>
+                    <a:bodyPr/>
+                    <a:lstStyle/>
+                    <a:p>
+                      <a:pPr marL="0" marR="0" lvl="0" indent="0" algn="l" defTabSz="914400" rtl="0" eaLnBrk="1" fontAlgn="auto" latinLnBrk="0" hangingPunct="1">
+                        <a:lnSpc>
+                          <a:spcPct val="100000"/>
+                        </a:lnSpc>
+                        <a:spcBef>
+                          <a:spcPts val="0"/>
+                        </a:spcBef>
+                        <a:spcAft>
+                          <a:spcPts val="0"/>
+                        </a:spcAft>
+                        <a:buClrTx/>
+                        <a:buSzTx/>
+                        <a:buFontTx/>
+                        <a:buNone/>
+                        <a:tabLst/>
+                        <a:defRPr/>
+                      </a:pPr>
+                      <a:r>
+                        <a:rPr lang="en-US" sz="1400" kern="1200" dirty="0">
+                          <a:solidFill>
+                            <a:schemeClr val="tx1"/>
+                          </a:solidFill>
+                          <a:effectLst/>
+                        </a:rPr>
+                        <a:t>-slow SECOND</a:t>
+                      </a:r>
+                      <a:endParaRPr lang="en-US" sz="1400" kern="1200" dirty="0">
+                        <a:solidFill>
+                          <a:schemeClr val="tx1"/>
+                        </a:solidFill>
+                        <a:effectLst/>
+                        <a:latin typeface="+mn-lt"/>
+                        <a:ea typeface="+mn-ea"/>
+                        <a:cs typeface="+mn-cs"/>
+                      </a:endParaRPr>
+                    </a:p>
+                  </a:txBody>
+                  <a:tcPr/>
+                </a:tc>
+                <a:tc>
+                  <a:txBody>
+                    <a:bodyPr/>
+                    <a:lstStyle/>
+                    <a:p>
+                      <a:pPr marL="0" marR="0" lvl="0" indent="0" algn="l" defTabSz="914400" rtl="0" eaLnBrk="1" fontAlgn="auto" latinLnBrk="0" hangingPunct="1">
+                        <a:lnSpc>
+                          <a:spcPct val="100000"/>
+                        </a:lnSpc>
+                        <a:spcBef>
+                          <a:spcPts val="0"/>
+                        </a:spcBef>
+                        <a:spcAft>
+                          <a:spcPts val="0"/>
+                        </a:spcAft>
+                        <a:buClrTx/>
+                        <a:buSzTx/>
+                        <a:buFontTx/>
+                        <a:buNone/>
+                        <a:tabLst/>
+                        <a:defRPr/>
+                      </a:pPr>
+                      <a:r>
+                        <a:rPr lang="en-US" sz="1400" kern="1200" dirty="0">
+                          <a:solidFill>
+                            <a:schemeClr val="tx1"/>
+                          </a:solidFill>
+                          <a:effectLst/>
+                        </a:rPr>
+                        <a:t>Skip (sub)tests marked with time longer than this criteria</a:t>
+                      </a:r>
+                      <a:endParaRPr lang="en-US" sz="1400" kern="1200" dirty="0">
+                        <a:solidFill>
+                          <a:schemeClr val="tx1"/>
+                        </a:solidFill>
+                        <a:effectLst/>
+                        <a:latin typeface="+mn-lt"/>
+                        <a:ea typeface="+mn-ea"/>
+                        <a:cs typeface="+mn-cs"/>
+                      </a:endParaRPr>
+                    </a:p>
+                  </a:txBody>
+                  <a:tcPr/>
+                </a:tc>
+                <a:extLst>
+                  <a:ext uri="{0D108BD9-81ED-4DB2-BD59-A6C34878D82A}">
+                    <a16:rowId xmlns:a16="http://schemas.microsoft.com/office/drawing/2014/main" val="2912525047"/>
+                  </a:ext>
+                </a:extLst>
+              </a:tr>
+              <a:tr h="310423">
+                <a:tc>
+                  <a:txBody>
+                    <a:bodyPr/>
+                    <a:lstStyle/>
+                    <a:p>
+                      <a:pPr marL="0" marR="0" lvl="0" indent="0" algn="l" defTabSz="914400" rtl="0" eaLnBrk="1" fontAlgn="auto" latinLnBrk="0" hangingPunct="1">
+                        <a:lnSpc>
+                          <a:spcPct val="100000"/>
+                        </a:lnSpc>
+                        <a:spcBef>
+                          <a:spcPts val="0"/>
+                        </a:spcBef>
+                        <a:spcAft>
+                          <a:spcPts val="0"/>
+                        </a:spcAft>
+                        <a:buClrTx/>
+                        <a:buSzTx/>
+                        <a:buFontTx/>
+                        <a:buNone/>
+                        <a:tabLst/>
+                        <a:defRPr/>
+                      </a:pPr>
+                      <a:r>
+                        <a:rPr lang="en-US" sz="1400" kern="1200" dirty="0">
+                          <a:solidFill>
+                            <a:schemeClr val="tx1"/>
+                          </a:solidFill>
+                          <a:effectLst/>
+                        </a:rPr>
+                        <a:t>-label LABEL [LABEL ...]</a:t>
+                      </a:r>
+                      <a:endParaRPr lang="en-US" sz="1400" kern="1200" dirty="0">
+                        <a:solidFill>
+                          <a:schemeClr val="tx1"/>
+                        </a:solidFill>
+                        <a:effectLst/>
+                        <a:latin typeface="+mn-lt"/>
+                        <a:ea typeface="+mn-ea"/>
+                        <a:cs typeface="+mn-cs"/>
+                      </a:endParaRPr>
+                    </a:p>
+                  </a:txBody>
+                  <a:tcPr/>
+                </a:tc>
+                <a:tc>
+                  <a:txBody>
+                    <a:bodyPr/>
+                    <a:lstStyle/>
+                    <a:p>
+                      <a:pPr marL="0" marR="0" lvl="0" indent="0" algn="l" defTabSz="914400" rtl="0" eaLnBrk="1" fontAlgn="auto" latinLnBrk="0" hangingPunct="1">
+                        <a:lnSpc>
+                          <a:spcPct val="100000"/>
+                        </a:lnSpc>
+                        <a:spcBef>
+                          <a:spcPts val="0"/>
+                        </a:spcBef>
+                        <a:spcAft>
+                          <a:spcPts val="0"/>
+                        </a:spcAft>
+                        <a:buClrTx/>
+                        <a:buSzTx/>
+                        <a:buFontTx/>
+                        <a:buNone/>
+                        <a:tabLst/>
+                        <a:defRPr/>
+                      </a:pPr>
+                      <a:r>
+                        <a:rPr lang="en-US" sz="1400" kern="1200" dirty="0">
+                          <a:solidFill>
+                            <a:schemeClr val="tx1"/>
+                          </a:solidFill>
+                          <a:effectLst/>
+                        </a:rPr>
+                        <a:t>Select the tests marked with the given labels</a:t>
+                      </a:r>
+                      <a:endParaRPr lang="en-US" sz="1400" kern="1200" dirty="0">
+                        <a:solidFill>
+                          <a:schemeClr val="tx1"/>
+                        </a:solidFill>
+                        <a:effectLst/>
+                        <a:latin typeface="+mn-lt"/>
+                        <a:ea typeface="+mn-ea"/>
+                        <a:cs typeface="+mn-cs"/>
+                      </a:endParaRPr>
+                    </a:p>
+                  </a:txBody>
+                  <a:tcPr/>
+                </a:tc>
+                <a:extLst>
+                  <a:ext uri="{0D108BD9-81ED-4DB2-BD59-A6C34878D82A}">
+                    <a16:rowId xmlns:a16="http://schemas.microsoft.com/office/drawing/2014/main" val="3701447737"/>
+                  </a:ext>
+                </a:extLst>
+              </a:tr>
+              <a:tr h="745015">
+                <a:tc>
+                  <a:txBody>
+                    <a:bodyPr/>
+                    <a:lstStyle/>
+                    <a:p>
+                      <a:pPr marL="0" marR="0" lvl="0" indent="0" algn="l" defTabSz="914400" rtl="0" eaLnBrk="1" fontAlgn="auto" latinLnBrk="0" hangingPunct="1">
+                        <a:lnSpc>
+                          <a:spcPct val="100000"/>
+                        </a:lnSpc>
+                        <a:spcBef>
+                          <a:spcPts val="0"/>
+                        </a:spcBef>
+                        <a:spcAft>
+                          <a:spcPts val="0"/>
+                        </a:spcAft>
+                        <a:buClrTx/>
+                        <a:buSzTx/>
+                        <a:buFontTx/>
+                        <a:buNone/>
+                        <a:tabLst/>
+                        <a:defRPr/>
+                      </a:pPr>
+                      <a:r>
+                        <a:rPr lang="en-US" sz="1400" kern="1200" dirty="0">
+                          <a:solidFill>
+                            <a:schemeClr val="tx1"/>
+                          </a:solidFill>
+                          <a:effectLst/>
+                        </a:rPr>
+                        <a:t>-task {</a:t>
+                      </a:r>
+                      <a:r>
+                        <a:rPr lang="en-US" sz="1400" kern="1200" dirty="0" err="1">
+                          <a:solidFill>
+                            <a:schemeClr val="tx1"/>
+                          </a:solidFill>
+                          <a:effectLst/>
+                        </a:rPr>
+                        <a:t>cmd,check,tag</a:t>
+                      </a:r>
+                      <a:r>
+                        <a:rPr lang="en-US" sz="1400" kern="1200" dirty="0">
+                          <a:solidFill>
+                            <a:schemeClr val="tx1"/>
+                          </a:solidFill>
+                          <a:effectLst/>
+                        </a:rPr>
+                        <a:t>}</a:t>
+                      </a:r>
+                      <a:endParaRPr lang="en-US" sz="1400" kern="1200" dirty="0">
+                        <a:solidFill>
+                          <a:schemeClr val="tx1"/>
+                        </a:solidFill>
+                        <a:effectLst/>
+                        <a:latin typeface="+mn-lt"/>
+                        <a:ea typeface="+mn-ea"/>
+                        <a:cs typeface="+mn-cs"/>
+                      </a:endParaRPr>
+                    </a:p>
+                  </a:txBody>
+                  <a:tcPr/>
+                </a:tc>
+                <a:tc>
+                  <a:txBody>
+                    <a:bodyPr/>
+                    <a:lstStyle/>
+                    <a:p>
+                      <a:pPr marL="0" marR="0" lvl="0" indent="0" algn="l" defTabSz="914400" rtl="0" eaLnBrk="1" fontAlgn="auto" latinLnBrk="0" hangingPunct="1">
+                        <a:lnSpc>
+                          <a:spcPct val="100000"/>
+                        </a:lnSpc>
+                        <a:spcBef>
+                          <a:spcPts val="0"/>
+                        </a:spcBef>
+                        <a:spcAft>
+                          <a:spcPts val="0"/>
+                        </a:spcAft>
+                        <a:buClrTx/>
+                        <a:buSzTx/>
+                        <a:buFontTx/>
+                        <a:buNone/>
+                        <a:tabLst/>
+                        <a:defRPr/>
+                      </a:pPr>
+                      <a:r>
+                        <a:rPr lang="en-US" sz="1400" kern="1200" dirty="0" err="1">
+                          <a:solidFill>
+                            <a:schemeClr val="tx1"/>
+                          </a:solidFill>
+                          <a:effectLst/>
+                        </a:rPr>
+                        <a:t>cmd</a:t>
+                      </a:r>
+                      <a:r>
+                        <a:rPr lang="en-US" sz="1400" kern="1200" dirty="0">
+                          <a:solidFill>
+                            <a:schemeClr val="tx1"/>
+                          </a:solidFill>
+                          <a:effectLst/>
+                        </a:rPr>
+                        <a:t>: run the commands in the </a:t>
+                      </a:r>
+                      <a:r>
+                        <a:rPr lang="en-US" sz="1400" kern="1200" dirty="0" err="1">
+                          <a:solidFill>
+                            <a:schemeClr val="tx1"/>
+                          </a:solidFill>
+                          <a:effectLst/>
+                        </a:rPr>
+                        <a:t>cmd</a:t>
+                      </a:r>
+                      <a:r>
+                        <a:rPr lang="en-US" sz="1400" kern="1200" dirty="0">
+                          <a:solidFill>
+                            <a:schemeClr val="tx1"/>
+                          </a:solidFill>
+                          <a:effectLst/>
+                        </a:rPr>
+                        <a:t> file</a:t>
+                      </a:r>
+                    </a:p>
+                    <a:p>
+                      <a:pPr marL="0" marR="0" lvl="0" indent="0" algn="l" defTabSz="914400" rtl="0" eaLnBrk="1" fontAlgn="auto" latinLnBrk="0" hangingPunct="1">
+                        <a:lnSpc>
+                          <a:spcPct val="100000"/>
+                        </a:lnSpc>
+                        <a:spcBef>
+                          <a:spcPts val="0"/>
+                        </a:spcBef>
+                        <a:spcAft>
+                          <a:spcPts val="0"/>
+                        </a:spcAft>
+                        <a:buClrTx/>
+                        <a:buSzTx/>
+                        <a:buFontTx/>
+                        <a:buNone/>
+                        <a:tabLst/>
+                        <a:defRPr/>
+                      </a:pPr>
+                      <a:r>
+                        <a:rPr lang="en-US" sz="1400" kern="1200" dirty="0">
+                          <a:solidFill>
+                            <a:schemeClr val="tx1"/>
+                          </a:solidFill>
+                          <a:effectLst/>
+                        </a:rPr>
+                        <a:t>check: check &amp; collect the results</a:t>
+                      </a:r>
+                    </a:p>
+                    <a:p>
+                      <a:pPr marL="0" marR="0" lvl="0" indent="0" algn="l" defTabSz="914400" rtl="0" eaLnBrk="1" fontAlgn="auto" latinLnBrk="0" hangingPunct="1">
+                        <a:lnSpc>
+                          <a:spcPct val="100000"/>
+                        </a:lnSpc>
+                        <a:spcBef>
+                          <a:spcPts val="0"/>
+                        </a:spcBef>
+                        <a:spcAft>
+                          <a:spcPts val="0"/>
+                        </a:spcAft>
+                        <a:buClrTx/>
+                        <a:buSzTx/>
+                        <a:buFontTx/>
+                        <a:buNone/>
+                        <a:tabLst/>
+                        <a:defRPr/>
+                      </a:pPr>
+                      <a:r>
+                        <a:rPr lang="en-US" sz="1400" kern="1200" dirty="0">
+                          <a:solidFill>
+                            <a:schemeClr val="tx1"/>
+                          </a:solidFill>
+                          <a:effectLst/>
+                        </a:rPr>
+                        <a:t>tag: update the tag file (e.g., time, name)</a:t>
+                      </a:r>
+                      <a:endParaRPr lang="en-US" sz="1400" kern="1200" dirty="0">
+                        <a:solidFill>
+                          <a:schemeClr val="tx1"/>
+                        </a:solidFill>
+                        <a:effectLst/>
+                        <a:latin typeface="+mn-lt"/>
+                        <a:ea typeface="+mn-ea"/>
+                        <a:cs typeface="+mn-cs"/>
+                      </a:endParaRPr>
+                    </a:p>
+                  </a:txBody>
+                  <a:tcPr/>
+                </a:tc>
+                <a:extLst>
+                  <a:ext uri="{0D108BD9-81ED-4DB2-BD59-A6C34878D82A}">
+                    <a16:rowId xmlns:a16="http://schemas.microsoft.com/office/drawing/2014/main" val="4167666738"/>
+                  </a:ext>
+                </a:extLst>
+              </a:tr>
+              <a:tr h="527719">
+                <a:tc>
+                  <a:txBody>
+                    <a:bodyPr/>
+                    <a:lstStyle/>
+                    <a:p>
+                      <a:pPr marL="0" marR="0" lvl="0" indent="0" algn="l" defTabSz="914400" rtl="0" eaLnBrk="1" fontAlgn="auto" latinLnBrk="0" hangingPunct="1">
+                        <a:lnSpc>
+                          <a:spcPct val="100000"/>
+                        </a:lnSpc>
+                        <a:spcBef>
+                          <a:spcPts val="0"/>
+                        </a:spcBef>
+                        <a:spcAft>
+                          <a:spcPts val="0"/>
+                        </a:spcAft>
+                        <a:buClrTx/>
+                        <a:buSzTx/>
+                        <a:buFontTx/>
+                        <a:buNone/>
+                        <a:tabLst/>
+                        <a:defRPr/>
+                      </a:pPr>
+                      <a:r>
+                        <a:rPr lang="en-US" sz="1400" kern="1200" dirty="0">
+                          <a:solidFill>
+                            <a:schemeClr val="tx1"/>
+                          </a:solidFill>
+                          <a:effectLst/>
+                        </a:rPr>
+                        <a:t>-</a:t>
+                      </a:r>
+                      <a:r>
+                        <a:rPr lang="en-US" sz="1400" kern="1200" dirty="0" err="1">
+                          <a:solidFill>
+                            <a:schemeClr val="tx1"/>
+                          </a:solidFill>
+                          <a:effectLst/>
+                        </a:rPr>
+                        <a:t>jtype</a:t>
+                      </a:r>
+                      <a:r>
+                        <a:rPr lang="en-US" sz="1400" kern="1200" dirty="0">
+                          <a:solidFill>
+                            <a:schemeClr val="tx1"/>
+                          </a:solidFill>
+                          <a:effectLst/>
+                        </a:rPr>
+                        <a:t> {</a:t>
+                      </a:r>
+                      <a:r>
+                        <a:rPr lang="en-US" sz="1400" kern="1200" dirty="0" err="1">
+                          <a:solidFill>
+                            <a:schemeClr val="tx1"/>
+                          </a:solidFill>
+                          <a:effectLst/>
+                        </a:rPr>
+                        <a:t>task,aggregator</a:t>
+                      </a:r>
+                      <a:r>
+                        <a:rPr lang="en-US" sz="1400" kern="1200" dirty="0">
+                          <a:solidFill>
+                            <a:schemeClr val="tx1"/>
+                          </a:solidFill>
+                          <a:effectLst/>
+                        </a:rPr>
+                        <a:t>}</a:t>
+                      </a:r>
+                      <a:endParaRPr lang="en-US" sz="1400" kern="1200" dirty="0">
+                        <a:solidFill>
+                          <a:schemeClr val="tx1"/>
+                        </a:solidFill>
+                        <a:effectLst/>
+                        <a:latin typeface="+mn-lt"/>
+                        <a:ea typeface="+mn-ea"/>
+                        <a:cs typeface="+mn-cs"/>
+                      </a:endParaRPr>
+                    </a:p>
+                  </a:txBody>
+                  <a:tcPr/>
+                </a:tc>
+                <a:tc>
+                  <a:txBody>
+                    <a:bodyPr/>
+                    <a:lstStyle/>
+                    <a:p>
+                      <a:pPr marL="0" marR="0" lvl="0" indent="0" algn="l" defTabSz="914400" rtl="0" eaLnBrk="1" fontAlgn="auto" latinLnBrk="0" hangingPunct="1">
+                        <a:lnSpc>
+                          <a:spcPct val="100000"/>
+                        </a:lnSpc>
+                        <a:spcBef>
+                          <a:spcPts val="0"/>
+                        </a:spcBef>
+                        <a:spcAft>
+                          <a:spcPts val="0"/>
+                        </a:spcAft>
+                        <a:buClrTx/>
+                        <a:buSzTx/>
+                        <a:buFontTx/>
+                        <a:buNone/>
+                        <a:tabLst/>
+                        <a:defRPr/>
+                      </a:pPr>
+                      <a:r>
+                        <a:rPr lang="en-US" sz="1400" kern="1200" dirty="0">
+                          <a:solidFill>
+                            <a:schemeClr val="tx1"/>
+                          </a:solidFill>
+                          <a:effectLst/>
+                        </a:rPr>
+                        <a:t>task: runs tasks and register files</a:t>
+                      </a:r>
+                    </a:p>
+                    <a:p>
+                      <a:pPr marL="0" marR="0" lvl="0" indent="0" algn="l" defTabSz="914400" rtl="0" eaLnBrk="1" fontAlgn="auto" latinLnBrk="0" hangingPunct="1">
+                        <a:lnSpc>
+                          <a:spcPct val="100000"/>
+                        </a:lnSpc>
+                        <a:spcBef>
+                          <a:spcPts val="0"/>
+                        </a:spcBef>
+                        <a:spcAft>
+                          <a:spcPts val="0"/>
+                        </a:spcAft>
+                        <a:buClrTx/>
+                        <a:buSzTx/>
+                        <a:buFontTx/>
+                        <a:buNone/>
+                        <a:tabLst/>
+                        <a:defRPr/>
+                      </a:pPr>
+                      <a:r>
+                        <a:rPr lang="en-US" sz="1400" kern="1200" dirty="0">
+                          <a:solidFill>
+                            <a:schemeClr val="tx1"/>
+                          </a:solidFill>
+                          <a:effectLst/>
+                        </a:rPr>
+                        <a:t>aggregator: collect results</a:t>
+                      </a:r>
+                      <a:endParaRPr lang="en-US" sz="1400" kern="1200" dirty="0">
+                        <a:solidFill>
+                          <a:schemeClr val="tx1"/>
+                        </a:solidFill>
+                        <a:effectLst/>
+                        <a:latin typeface="+mn-lt"/>
+                        <a:ea typeface="+mn-ea"/>
+                        <a:cs typeface="+mn-cs"/>
+                      </a:endParaRPr>
+                    </a:p>
+                  </a:txBody>
+                  <a:tcPr/>
+                </a:tc>
+                <a:extLst>
+                  <a:ext uri="{0D108BD9-81ED-4DB2-BD59-A6C34878D82A}">
+                    <a16:rowId xmlns:a16="http://schemas.microsoft.com/office/drawing/2014/main" val="2728033399"/>
+                  </a:ext>
+                </a:extLst>
+              </a:tr>
+              <a:tr h="527719">
+                <a:tc>
+                  <a:txBody>
+                    <a:bodyPr/>
+                    <a:lstStyle/>
+                    <a:p>
+                      <a:pPr marL="0" marR="0" lvl="0" indent="0" algn="l" defTabSz="914400" rtl="0" eaLnBrk="1" fontAlgn="auto" latinLnBrk="0" hangingPunct="1">
+                        <a:lnSpc>
+                          <a:spcPct val="100000"/>
+                        </a:lnSpc>
+                        <a:spcBef>
+                          <a:spcPts val="0"/>
+                        </a:spcBef>
+                        <a:spcAft>
+                          <a:spcPts val="0"/>
+                        </a:spcAft>
+                        <a:buClrTx/>
+                        <a:buSzTx/>
+                        <a:buFontTx/>
+                        <a:buNone/>
+                        <a:tabLst/>
+                        <a:defRPr/>
+                      </a:pPr>
+                      <a:r>
+                        <a:rPr lang="en-US" sz="1400" kern="1200" dirty="0">
+                          <a:solidFill>
+                            <a:schemeClr val="tx1"/>
+                          </a:solidFill>
+                          <a:effectLst/>
+                        </a:rPr>
+                        <a:t>-</a:t>
+                      </a:r>
+                      <a:r>
+                        <a:rPr lang="en-US" sz="1400" kern="1200" dirty="0" err="1">
+                          <a:solidFill>
+                            <a:schemeClr val="tx1"/>
+                          </a:solidFill>
+                          <a:effectLst/>
+                        </a:rPr>
+                        <a:t>cpu</a:t>
+                      </a:r>
+                      <a:r>
+                        <a:rPr lang="en-US" sz="1400" kern="1200" dirty="0">
+                          <a:solidFill>
+                            <a:schemeClr val="tx1"/>
+                          </a:solidFill>
+                          <a:effectLst/>
+                        </a:rPr>
+                        <a:t> CPU [CPU ...]</a:t>
+                      </a:r>
+                      <a:endParaRPr lang="en-US" sz="1400" kern="1200" dirty="0">
+                        <a:solidFill>
+                          <a:schemeClr val="tx1"/>
+                        </a:solidFill>
+                        <a:effectLst/>
+                        <a:latin typeface="+mn-lt"/>
+                        <a:ea typeface="+mn-ea"/>
+                        <a:cs typeface="+mn-cs"/>
+                      </a:endParaRPr>
+                    </a:p>
+                  </a:txBody>
+                  <a:tcPr/>
+                </a:tc>
+                <a:tc>
+                  <a:txBody>
+                    <a:bodyPr/>
+                    <a:lstStyle/>
+                    <a:p>
+                      <a:pPr marL="0" marR="0" lvl="0" indent="0" algn="l" defTabSz="914400" rtl="0" eaLnBrk="1" fontAlgn="auto" latinLnBrk="0" hangingPunct="1">
+                        <a:lnSpc>
+                          <a:spcPct val="100000"/>
+                        </a:lnSpc>
+                        <a:spcBef>
+                          <a:spcPts val="0"/>
+                        </a:spcBef>
+                        <a:spcAft>
+                          <a:spcPts val="0"/>
+                        </a:spcAft>
+                        <a:buClrTx/>
+                        <a:buSzTx/>
+                        <a:buFontTx/>
+                        <a:buNone/>
+                        <a:tabLst/>
+                        <a:defRPr/>
+                      </a:pPr>
+                      <a:r>
+                        <a:rPr lang="en-US" sz="1400" kern="1200" dirty="0">
+                          <a:solidFill>
+                            <a:schemeClr val="tx1"/>
+                          </a:solidFill>
+                          <a:effectLst/>
+                        </a:rPr>
+                        <a:t>Total number of CPUs [the CPUs for one task]</a:t>
+                      </a:r>
+                    </a:p>
+                    <a:p>
+                      <a:pPr marL="0" marR="0" lvl="0" indent="0" algn="l" defTabSz="914400" rtl="0" eaLnBrk="1" fontAlgn="auto" latinLnBrk="0" hangingPunct="1">
+                        <a:lnSpc>
+                          <a:spcPct val="100000"/>
+                        </a:lnSpc>
+                        <a:spcBef>
+                          <a:spcPts val="0"/>
+                        </a:spcBef>
+                        <a:spcAft>
+                          <a:spcPts val="0"/>
+                        </a:spcAft>
+                        <a:buClrTx/>
+                        <a:buSzTx/>
+                        <a:buFontTx/>
+                        <a:buNone/>
+                        <a:tabLst/>
+                        <a:defRPr/>
+                      </a:pPr>
+                      <a:r>
+                        <a:rPr lang="en-US" sz="1400" kern="1200" dirty="0">
+                          <a:solidFill>
+                            <a:schemeClr val="tx1"/>
+                          </a:solidFill>
+                          <a:effectLst/>
+                        </a:rPr>
+                        <a:t>Each task uses 1 CPU If one-task CPUs not provided</a:t>
+                      </a:r>
+                      <a:endParaRPr lang="en-US" sz="1400" kern="1200" dirty="0">
+                        <a:solidFill>
+                          <a:schemeClr val="tx1"/>
+                        </a:solidFill>
+                        <a:effectLst/>
+                        <a:latin typeface="+mn-lt"/>
+                        <a:ea typeface="+mn-ea"/>
+                        <a:cs typeface="+mn-cs"/>
+                      </a:endParaRPr>
+                    </a:p>
+                  </a:txBody>
+                  <a:tcPr/>
+                </a:tc>
+                <a:extLst>
+                  <a:ext uri="{0D108BD9-81ED-4DB2-BD59-A6C34878D82A}">
+                    <a16:rowId xmlns:a16="http://schemas.microsoft.com/office/drawing/2014/main" val="1278141949"/>
+                  </a:ext>
+                </a:extLst>
+              </a:tr>
+              <a:tr h="371628">
+                <a:tc>
+                  <a:txBody>
+                    <a:bodyPr/>
+                    <a:lstStyle/>
+                    <a:p>
+                      <a:pPr marL="0" marR="0" lvl="0" indent="0" algn="l" defTabSz="914400" rtl="0" eaLnBrk="1" fontAlgn="auto" latinLnBrk="0" hangingPunct="1">
+                        <a:lnSpc>
+                          <a:spcPct val="100000"/>
+                        </a:lnSpc>
+                        <a:spcBef>
+                          <a:spcPts val="0"/>
+                        </a:spcBef>
+                        <a:spcAft>
+                          <a:spcPts val="0"/>
+                        </a:spcAft>
+                        <a:buClrTx/>
+                        <a:buSzTx/>
+                        <a:buFontTx/>
+                        <a:buNone/>
+                        <a:tabLst/>
+                        <a:defRPr/>
+                      </a:pPr>
+                      <a:r>
+                        <a:rPr lang="en-US" sz="1400" kern="1200" dirty="0">
+                          <a:solidFill>
+                            <a:schemeClr val="tx1"/>
+                          </a:solidFill>
+                          <a:effectLst/>
+                        </a:rPr>
+                        <a:t>-screen {</a:t>
+                      </a:r>
+                      <a:r>
+                        <a:rPr lang="en-US" sz="1400" kern="1200" dirty="0" err="1">
+                          <a:solidFill>
+                            <a:schemeClr val="tx1"/>
+                          </a:solidFill>
+                          <a:effectLst/>
+                        </a:rPr>
+                        <a:t>tqdm,progress,job,off</a:t>
+                      </a:r>
+                      <a:r>
+                        <a:rPr lang="en-US" sz="1400" kern="1200" dirty="0">
+                          <a:solidFill>
+                            <a:schemeClr val="tx1"/>
+                          </a:solidFill>
+                          <a:effectLst/>
+                        </a:rPr>
+                        <a:t>}</a:t>
+                      </a:r>
+                      <a:endParaRPr lang="en-US" sz="1400" kern="1200" dirty="0">
+                        <a:solidFill>
+                          <a:schemeClr val="tx1"/>
+                        </a:solidFill>
+                        <a:effectLst/>
+                        <a:latin typeface="+mn-lt"/>
+                        <a:ea typeface="+mn-ea"/>
+                        <a:cs typeface="+mn-cs"/>
+                      </a:endParaRPr>
+                    </a:p>
+                  </a:txBody>
+                  <a:tcPr/>
+                </a:tc>
+                <a:tc>
+                  <a:txBody>
+                    <a:bodyPr/>
+                    <a:lstStyle/>
+                    <a:p>
+                      <a:pPr marL="0" marR="0" lvl="0" indent="0" algn="l" defTabSz="914400" rtl="0" eaLnBrk="1" fontAlgn="auto" latinLnBrk="0" hangingPunct="1">
+                        <a:lnSpc>
+                          <a:spcPct val="100000"/>
+                        </a:lnSpc>
+                        <a:spcBef>
+                          <a:spcPts val="0"/>
+                        </a:spcBef>
+                        <a:spcAft>
+                          <a:spcPts val="0"/>
+                        </a:spcAft>
+                        <a:buClrTx/>
+                        <a:buSzTx/>
+                        <a:buFontTx/>
+                        <a:buNone/>
+                        <a:tabLst/>
+                        <a:defRPr/>
+                      </a:pPr>
+                      <a:r>
+                        <a:rPr lang="en-US" sz="1400" kern="1200" dirty="0">
+                          <a:solidFill>
+                            <a:schemeClr val="tx1"/>
+                          </a:solidFill>
+                          <a:effectLst/>
+                        </a:rPr>
+                        <a:t>Print the serialization </a:t>
+                      </a:r>
+                      <a:r>
+                        <a:rPr lang="en-US" sz="1400" kern="1200" dirty="0" err="1">
+                          <a:solidFill>
+                            <a:schemeClr val="tx1"/>
+                          </a:solidFill>
+                          <a:effectLst/>
+                        </a:rPr>
+                        <a:t>tqdm</a:t>
+                      </a:r>
+                      <a:r>
+                        <a:rPr lang="en-US" sz="1400" kern="1200" dirty="0">
+                          <a:solidFill>
+                            <a:schemeClr val="tx1"/>
+                          </a:solidFill>
+                          <a:effectLst/>
+                        </a:rPr>
+                        <a:t>, parallelization progress, and job details</a:t>
+                      </a:r>
+                      <a:endParaRPr lang="en-US" sz="1400" kern="1200" dirty="0">
+                        <a:solidFill>
+                          <a:schemeClr val="tx1"/>
+                        </a:solidFill>
+                        <a:effectLst/>
+                        <a:latin typeface="+mn-lt"/>
+                        <a:ea typeface="+mn-ea"/>
+                        <a:cs typeface="+mn-cs"/>
+                      </a:endParaRPr>
+                    </a:p>
+                  </a:txBody>
+                  <a:tcPr/>
+                </a:tc>
+                <a:extLst>
+                  <a:ext uri="{0D108BD9-81ED-4DB2-BD59-A6C34878D82A}">
+                    <a16:rowId xmlns:a16="http://schemas.microsoft.com/office/drawing/2014/main" val="2260231954"/>
+                  </a:ext>
+                </a:extLst>
+              </a:tr>
+              <a:tr h="527719">
+                <a:tc>
+                  <a:txBody>
+                    <a:bodyPr/>
+                    <a:lstStyle/>
+                    <a:p>
+                      <a:pPr marL="0" marR="0" lvl="0" indent="0" algn="l" defTabSz="914400" rtl="0" eaLnBrk="1" fontAlgn="auto" latinLnBrk="0" hangingPunct="1">
+                        <a:lnSpc>
+                          <a:spcPct val="100000"/>
+                        </a:lnSpc>
+                        <a:spcBef>
+                          <a:spcPts val="0"/>
+                        </a:spcBef>
+                        <a:spcAft>
+                          <a:spcPts val="0"/>
+                        </a:spcAft>
+                        <a:buClrTx/>
+                        <a:buSzTx/>
+                        <a:buFontTx/>
+                        <a:buNone/>
+                        <a:tabLst/>
+                        <a:defRPr/>
+                      </a:pPr>
+                      <a:r>
+                        <a:rPr lang="en-US" sz="1400" kern="1200" dirty="0">
+                          <a:solidFill>
+                            <a:schemeClr val="tx1"/>
+                          </a:solidFill>
+                          <a:effectLst/>
+                        </a:rPr>
+                        <a:t>-DEBUG [{</a:t>
+                      </a:r>
+                      <a:r>
+                        <a:rPr lang="en-US" sz="1400" kern="1200" dirty="0" err="1">
+                          <a:solidFill>
+                            <a:schemeClr val="tx1"/>
+                          </a:solidFill>
+                          <a:effectLst/>
+                        </a:rPr>
+                        <a:t>on,off</a:t>
+                      </a:r>
+                      <a:r>
+                        <a:rPr lang="en-US" sz="1400" kern="1200" dirty="0">
+                          <a:solidFill>
+                            <a:schemeClr val="tx1"/>
+                          </a:solidFill>
+                          <a:effectLst/>
+                        </a:rPr>
+                        <a:t>}]</a:t>
+                      </a:r>
+                      <a:endParaRPr lang="en-US" sz="1400" kern="1200" dirty="0">
+                        <a:solidFill>
+                          <a:schemeClr val="tx1"/>
+                        </a:solidFill>
+                        <a:effectLst/>
+                        <a:latin typeface="+mn-lt"/>
+                        <a:ea typeface="+mn-ea"/>
+                        <a:cs typeface="+mn-cs"/>
+                      </a:endParaRPr>
+                    </a:p>
+                  </a:txBody>
+                  <a:tcPr/>
+                </a:tc>
+                <a:tc>
+                  <a:txBody>
+                    <a:bodyPr/>
+                    <a:lstStyle/>
+                    <a:p>
+                      <a:pPr marL="0" marR="0" lvl="0" indent="0" algn="l" defTabSz="914400" rtl="0" eaLnBrk="1" fontAlgn="auto" latinLnBrk="0" hangingPunct="1">
+                        <a:lnSpc>
+                          <a:spcPct val="100000"/>
+                        </a:lnSpc>
+                        <a:spcBef>
+                          <a:spcPts val="0"/>
+                        </a:spcBef>
+                        <a:spcAft>
+                          <a:spcPts val="0"/>
+                        </a:spcAft>
+                        <a:buClrTx/>
+                        <a:buSzTx/>
+                        <a:buFontTx/>
+                        <a:buNone/>
+                        <a:tabLst/>
+                        <a:defRPr/>
+                      </a:pPr>
+                      <a:r>
+                        <a:rPr lang="en-US" sz="1400" kern="1200" dirty="0">
+                          <a:solidFill>
+                            <a:schemeClr val="tx1"/>
+                          </a:solidFill>
+                          <a:effectLst/>
+                        </a:rPr>
+                        <a:t>on: enable debug mode for the workflow and sub-jobs</a:t>
+                      </a:r>
+                    </a:p>
+                    <a:p>
+                      <a:pPr marL="0" marR="0" lvl="0" indent="0" algn="l" defTabSz="914400" rtl="0" eaLnBrk="1" fontAlgn="auto" latinLnBrk="0" hangingPunct="1">
+                        <a:lnSpc>
+                          <a:spcPct val="100000"/>
+                        </a:lnSpc>
+                        <a:spcBef>
+                          <a:spcPts val="0"/>
+                        </a:spcBef>
+                        <a:spcAft>
+                          <a:spcPts val="0"/>
+                        </a:spcAft>
+                        <a:buClrTx/>
+                        <a:buSzTx/>
+                        <a:buFontTx/>
+                        <a:buNone/>
+                        <a:tabLst/>
+                        <a:defRPr/>
+                      </a:pPr>
+                      <a:r>
+                        <a:rPr lang="en-US" sz="1400" kern="1200" dirty="0">
+                          <a:solidFill>
+                            <a:schemeClr val="tx1"/>
+                          </a:solidFill>
+                          <a:effectLst/>
+                        </a:rPr>
+                        <a:t>off: disable the mode</a:t>
+                      </a:r>
+                      <a:endParaRPr lang="en-US" sz="1400" kern="1200" dirty="0">
+                        <a:solidFill>
+                          <a:schemeClr val="tx1"/>
+                        </a:solidFill>
+                        <a:effectLst/>
+                        <a:latin typeface="+mn-lt"/>
+                        <a:ea typeface="+mn-ea"/>
+                        <a:cs typeface="+mn-cs"/>
+                      </a:endParaRPr>
+                    </a:p>
+                  </a:txBody>
+                  <a:tcPr/>
+                </a:tc>
+                <a:extLst>
+                  <a:ext uri="{0D108BD9-81ED-4DB2-BD59-A6C34878D82A}">
+                    <a16:rowId xmlns:a16="http://schemas.microsoft.com/office/drawing/2014/main" val="2030284571"/>
+                  </a:ext>
+                </a:extLst>
+              </a:tr>
+            </a:tbl>
+          </a:graphicData>
+        </a:graphic>
+      </p:graphicFrame>
+    </p:spTree>
+    <p:extLst>
+      <p:ext uri="{BB962C8B-B14F-4D97-AF65-F5344CB8AC3E}">
+        <p14:creationId xmlns:p14="http://schemas.microsoft.com/office/powerpoint/2010/main" val="3319795759"/>
+      </p:ext>
+    </p:extLst>
+  </p:cSld>
+  <p:clrMapOvr>
+    <a:masterClrMapping/>
+  </p:clrMapOvr>
+</p:sld>
+</file>
+
+<file path=ppt/slides/slide12.xml><?xml version="1.0" encoding="utf-8"?>
+<p:sld xmlns:a="http://schemas.openxmlformats.org/drawingml/2006/main" xmlns:r="http://schemas.openxmlformats.org/officeDocument/2006/relationships" xmlns:p="http://schemas.openxmlformats.org/presentationml/2006/main">
+  <p:cSld>
+    <p:spTree>
+      <p:nvGrpSpPr>
         <p:cNvPr id="1" name=""/>
         <p:cNvGrpSpPr/>
         <p:nvPr/>
@@ -12826,7 +14386,7 @@
           <a:p>
             <a:fld id="{CF79FC58-3559-EC47-B32E-5EF128B06581}" type="slidenum">
               <a:rPr lang="en-US" smtClean="0"/>
-              <a:t>11</a:t>
+              <a:t>12</a:t>
             </a:fld>
             <a:endParaRPr lang="en-US"/>
           </a:p>
@@ -12845,7 +14405,7 @@
 </p:sld>
 </file>
 
-<file path=ppt/slides/slide12.xml><?xml version="1.0" encoding="utf-8"?>
+<file path=ppt/slides/slide13.xml><?xml version="1.0" encoding="utf-8"?>
 <p:sld xmlns:a="http://schemas.openxmlformats.org/drawingml/2006/main" xmlns:r="http://schemas.openxmlformats.org/officeDocument/2006/relationships" xmlns:p="http://schemas.openxmlformats.org/presentationml/2006/main">
   <p:cSld>
     <p:spTree>
@@ -15154,7 +16714,7 @@
           <a:p>
             <a:fld id="{CF79FC58-3559-EC47-B32E-5EF128B06581}" type="slidenum">
               <a:rPr lang="en-US" smtClean="0"/>
-              <a:t>12</a:t>
+              <a:t>13</a:t>
             </a:fld>
             <a:endParaRPr lang="en-US"/>
           </a:p>
@@ -15173,7 +16733,7 @@
 </p:sld>
 </file>
 
-<file path=ppt/slides/slide13.xml><?xml version="1.0" encoding="utf-8"?>
+<file path=ppt/slides/slide14.xml><?xml version="1.0" encoding="utf-8"?>
 <p:sld xmlns:a="http://schemas.openxmlformats.org/drawingml/2006/main" xmlns:r="http://schemas.openxmlformats.org/officeDocument/2006/relationships" xmlns:p="http://schemas.openxmlformats.org/presentationml/2006/main">
   <p:cSld>
     <p:spTree>
@@ -15283,7 +16843,7 @@
           <a:p>
             <a:fld id="{CF79FC58-3559-EC47-B32E-5EF128B06581}" type="slidenum">
               <a:rPr lang="en-US" smtClean="0"/>
-              <a:t>13</a:t>
+              <a:t>14</a:t>
             </a:fld>
             <a:endParaRPr lang="en-US"/>
           </a:p>
@@ -15302,7 +16862,7 @@
 </p:sld>
 </file>
 
-<file path=ppt/slides/slide14.xml><?xml version="1.0" encoding="utf-8"?>
+<file path=ppt/slides/slide15.xml><?xml version="1.0" encoding="utf-8"?>
 <p:sld xmlns:a="http://schemas.openxmlformats.org/drawingml/2006/main" xmlns:r="http://schemas.openxmlformats.org/officeDocument/2006/relationships" xmlns:p="http://schemas.openxmlformats.org/presentationml/2006/main">
   <p:cSld>
     <p:spTree>
@@ -15484,7 +17044,7 @@
           <a:p>
             <a:fld id="{CF79FC58-3559-EC47-B32E-5EF128B06581}" type="slidenum">
               <a:rPr lang="en-US" smtClean="0"/>
-              <a:t>14</a:t>
+              <a:t>15</a:t>
             </a:fld>
             <a:endParaRPr lang="en-US"/>
           </a:p>
@@ -15503,7 +17063,7 @@
 </p:sld>
 </file>
 
-<file path=ppt/slides/slide15.xml><?xml version="1.0" encoding="utf-8"?>
+<file path=ppt/slides/slide16.xml><?xml version="1.0" encoding="utf-8"?>
 <p:sld xmlns:a="http://schemas.openxmlformats.org/drawingml/2006/main" xmlns:r="http://schemas.openxmlformats.org/officeDocument/2006/relationships" xmlns:p="http://schemas.openxmlformats.org/presentationml/2006/main">
   <p:cSld>
     <p:spTree>
@@ -15571,7 +17131,7 @@
           <a:p>
             <a:fld id="{CF79FC58-3559-EC47-B32E-5EF128B06581}" type="slidenum">
               <a:rPr lang="en-US" smtClean="0"/>
-              <a:t>15</a:t>
+              <a:t>16</a:t>
             </a:fld>
             <a:endParaRPr lang="en-US"/>
           </a:p>
@@ -16859,7 +18419,7 @@
 </p:sld>
 </file>
 
-<file path=ppt/slides/slide16.xml><?xml version="1.0" encoding="utf-8"?>
+<file path=ppt/slides/slide17.xml><?xml version="1.0" encoding="utf-8"?>
 <p:sld xmlns:a="http://schemas.openxmlformats.org/drawingml/2006/main" xmlns:r="http://schemas.openxmlformats.org/officeDocument/2006/relationships" xmlns:p="http://schemas.openxmlformats.org/presentationml/2006/main">
   <p:cSld>
     <p:spTree>
@@ -17015,7 +18575,7 @@
           <a:p>
             <a:fld id="{CF79FC58-3559-EC47-B32E-5EF128B06581}" type="slidenum">
               <a:rPr lang="en-US" smtClean="0"/>
-              <a:t>16</a:t>
+              <a:t>17</a:t>
             </a:fld>
             <a:endParaRPr lang="en-US"/>
           </a:p>
@@ -29606,7 +31166,7 @@
           <p:nvPr>
             <p:extLst>
               <p:ext uri="{D42A27DB-BD31-4B8C-83A1-F6EECF244321}">
-                <p14:modId xmlns:p14="http://schemas.microsoft.com/office/powerpoint/2010/main" val="471451668"/>
+                <p14:modId xmlns:p14="http://schemas.microsoft.com/office/powerpoint/2010/main" val="3171743795"/>
               </p:ext>
             </p:extLst>
           </p:nvPr>
@@ -30102,7 +31662,7 @@
                       <a:pPr algn="just"/>
                       <a:r>
                         <a:rPr lang="en-US" dirty="0" err="1"/>
-                        <a:t>nemd_stest</a:t>
+                        <a:t>nemd_ptest</a:t>
                       </a:r>
                       <a:endParaRPr lang="en-US" dirty="0"/>
                     </a:p>
@@ -30136,7 +31696,7 @@
                       <a:pPr algn="just"/>
                       <a:r>
                         <a:rPr lang="en-US" dirty="0"/>
-                        <a:t>test/scientific/</a:t>
+                        <a:t>test/performance/</a:t>
                       </a:r>
                     </a:p>
                   </a:txBody>
@@ -30168,19 +31728,12 @@
                     <a:p>
                       <a:pPr algn="just"/>
                       <a:r>
-                        <a:rPr lang="en-US" sz="1800" kern="1200" dirty="0">
+                        <a:rPr lang="en-US" sz="1800" dirty="0">
                           <a:solidFill>
-                            <a:schemeClr val="accent2"/>
+                            <a:schemeClr val="accent1"/>
                           </a:solidFill>
-                          <a:latin typeface="+mn-lt"/>
-                          <a:ea typeface="+mn-ea"/>
-                          <a:cs typeface="+mn-cs"/>
-                        </a:rPr>
-                        <a:t>Scientific testing </a:t>
-                      </a:r>
-                      <a:r>
-                        <a:rPr lang="en-US" sz="1800" dirty="0"/>
-                        <a:t>ensures the repeatability, correctness and </a:t>
+                        </a:rPr>
+                        <a:t>Performance testing </a:t>
                       </a:r>
                       <a:r>
                         <a:rPr lang="en-US" sz="1800" b="0" i="0" kern="1200" dirty="0">
@@ -30192,11 +31745,7 @@
                           <a:ea typeface="+mn-ea"/>
                           <a:cs typeface="+mn-cs"/>
                         </a:rPr>
-                        <a:t>accuracy of the </a:t>
-                      </a:r>
-                      <a:r>
-                        <a:rPr lang="en-US" sz="1800" dirty="0"/>
-                        <a:t>scientific outputs.</a:t>
+                        <a:t>evaluates the speed, responsiveness and stability for bottleneck identification and nullification.</a:t>
                       </a:r>
                       <a:endParaRPr lang="en-US" dirty="0"/>
                     </a:p>
@@ -30224,7 +31773,7 @@
                 </a:tc>
                 <a:extLst>
                   <a:ext uri="{0D108BD9-81ED-4DB2-BD59-A6C34878D82A}">
-                    <a16:rowId xmlns:a16="http://schemas.microsoft.com/office/drawing/2014/main" val="3550715119"/>
+                    <a16:rowId xmlns:a16="http://schemas.microsoft.com/office/drawing/2014/main" val="865586714"/>
                   </a:ext>
                 </a:extLst>
               </a:tr>
@@ -30237,7 +31786,7 @@
                       <a:pPr algn="just"/>
                       <a:r>
                         <a:rPr lang="en-US" dirty="0" err="1"/>
-                        <a:t>nemd_ptest</a:t>
+                        <a:t>nemd_stest</a:t>
                       </a:r>
                       <a:endParaRPr lang="en-US" dirty="0"/>
                     </a:p>
@@ -30271,7 +31820,7 @@
                       <a:pPr algn="just"/>
                       <a:r>
                         <a:rPr lang="en-US" dirty="0"/>
-                        <a:t>test/performance/</a:t>
+                        <a:t>test/scientific/</a:t>
                       </a:r>
                     </a:p>
                   </a:txBody>
@@ -30303,12 +31852,19 @@
                     <a:p>
                       <a:pPr algn="just"/>
                       <a:r>
-                        <a:rPr lang="en-US" sz="1800" dirty="0">
+                        <a:rPr lang="en-US" sz="1800" kern="1200" dirty="0">
                           <a:solidFill>
-                            <a:schemeClr val="accent1"/>
+                            <a:schemeClr val="accent2"/>
                           </a:solidFill>
-                        </a:rPr>
-                        <a:t>Performance testing </a:t>
+                          <a:latin typeface="+mn-lt"/>
+                          <a:ea typeface="+mn-ea"/>
+                          <a:cs typeface="+mn-cs"/>
+                        </a:rPr>
+                        <a:t>Scientific testing </a:t>
+                      </a:r>
+                      <a:r>
+                        <a:rPr lang="en-US" sz="1800" dirty="0"/>
+                        <a:t>ensures the repeatability, correctness and </a:t>
                       </a:r>
                       <a:r>
                         <a:rPr lang="en-US" sz="1800" b="0" i="0" kern="1200" dirty="0">
@@ -30320,7 +31876,11 @@
                           <a:ea typeface="+mn-ea"/>
                           <a:cs typeface="+mn-cs"/>
                         </a:rPr>
-                        <a:t>evaluates the speed, responsiveness and stability for bottleneck identification and nullification.</a:t>
+                        <a:t>accuracy of the </a:t>
+                      </a:r>
+                      <a:r>
+                        <a:rPr lang="en-US" sz="1800" dirty="0"/>
+                        <a:t>scientific outputs.</a:t>
                       </a:r>
                       <a:endParaRPr lang="en-US" dirty="0"/>
                     </a:p>
@@ -30348,7 +31908,7 @@
                 </a:tc>
                 <a:extLst>
                   <a:ext uri="{0D108BD9-81ED-4DB2-BD59-A6C34878D82A}">
-                    <a16:rowId xmlns:a16="http://schemas.microsoft.com/office/drawing/2014/main" val="1872328772"/>
+                    <a16:rowId xmlns:a16="http://schemas.microsoft.com/office/drawing/2014/main" val="3550715119"/>
                   </a:ext>
                 </a:extLst>
               </a:tr>

</xml_diff>

<commit_message>
numpy.IntArray on -> on values
</commit_message>
<xml_diff>
--- a/docs/power_point/nemd.pptx
+++ b/docs/power_point/nemd.pptx
@@ -3132,7 +3132,7 @@
           <a:p>
             <a:fld id="{4E7935B3-F5AC-0F49-A77F-693DEAA46623}" type="datetimeFigureOut">
               <a:rPr lang="en-US" smtClean="0"/>
-              <a:t>2/12/25</a:t>
+              <a:t>4/2/25</a:t>
             </a:fld>
             <a:endParaRPr lang="en-US"/>
           </a:p>
@@ -3798,7 +3798,7 @@
           <a:p>
             <a:fld id="{7139230D-D256-FE47-99BF-6F642436F56E}" type="datetime1">
               <a:rPr lang="en-US" smtClean="0"/>
-              <a:t>2/12/25</a:t>
+              <a:t>4/2/25</a:t>
             </a:fld>
             <a:endParaRPr lang="en-US"/>
           </a:p>
@@ -3996,7 +3996,7 @@
           <a:p>
             <a:fld id="{785AC849-5CEB-3846-9265-8D72BE481A70}" type="datetime1">
               <a:rPr lang="en-US" smtClean="0"/>
-              <a:t>2/12/25</a:t>
+              <a:t>4/2/25</a:t>
             </a:fld>
             <a:endParaRPr lang="en-US"/>
           </a:p>
@@ -4204,7 +4204,7 @@
           <a:p>
             <a:fld id="{A02BBDEB-BEE0-FD44-AAFC-27969F9541FD}" type="datetime1">
               <a:rPr lang="en-US" smtClean="0"/>
-              <a:t>2/12/25</a:t>
+              <a:t>4/2/25</a:t>
             </a:fld>
             <a:endParaRPr lang="en-US"/>
           </a:p>
@@ -4402,7 +4402,7 @@
           <a:p>
             <a:fld id="{4F82860A-5855-1941-A1E0-F1AE52EC854D}" type="datetime1">
               <a:rPr lang="en-US" smtClean="0"/>
-              <a:t>2/12/25</a:t>
+              <a:t>4/2/25</a:t>
             </a:fld>
             <a:endParaRPr lang="en-US"/>
           </a:p>
@@ -4677,7 +4677,7 @@
           <a:p>
             <a:fld id="{6A874B4C-42F5-E24E-B25F-613EC7F4AF0D}" type="datetime1">
               <a:rPr lang="en-US" smtClean="0"/>
-              <a:t>2/12/25</a:t>
+              <a:t>4/2/25</a:t>
             </a:fld>
             <a:endParaRPr lang="en-US"/>
           </a:p>
@@ -4942,7 +4942,7 @@
           <a:p>
             <a:fld id="{9A2BCD20-0178-0C41-9D8E-10FA267A6CCC}" type="datetime1">
               <a:rPr lang="en-US" smtClean="0"/>
-              <a:t>2/12/25</a:t>
+              <a:t>4/2/25</a:t>
             </a:fld>
             <a:endParaRPr lang="en-US"/>
           </a:p>
@@ -5354,7 +5354,7 @@
           <a:p>
             <a:fld id="{EDE58456-60EB-6840-BCEB-E4C2678C039E}" type="datetime1">
               <a:rPr lang="en-US" smtClean="0"/>
-              <a:t>2/12/25</a:t>
+              <a:t>4/2/25</a:t>
             </a:fld>
             <a:endParaRPr lang="en-US"/>
           </a:p>
@@ -5495,7 +5495,7 @@
           <a:p>
             <a:fld id="{8BBFCD94-1F0D-3948-A9F0-DB82F9AAC2D3}" type="datetime1">
               <a:rPr lang="en-US" smtClean="0"/>
-              <a:t>2/12/25</a:t>
+              <a:t>4/2/25</a:t>
             </a:fld>
             <a:endParaRPr lang="en-US"/>
           </a:p>
@@ -5608,7 +5608,7 @@
           <a:p>
             <a:fld id="{13692FAC-AC21-0848-AC27-426B7BF29104}" type="datetime1">
               <a:rPr lang="en-US" smtClean="0"/>
-              <a:t>2/12/25</a:t>
+              <a:t>4/2/25</a:t>
             </a:fld>
             <a:endParaRPr lang="en-US"/>
           </a:p>
@@ -5919,7 +5919,7 @@
           <a:p>
             <a:fld id="{A3FF56F3-8608-FF4D-9C26-AE6D473095CB}" type="datetime1">
               <a:rPr lang="en-US" smtClean="0"/>
-              <a:t>2/12/25</a:t>
+              <a:t>4/2/25</a:t>
             </a:fld>
             <a:endParaRPr lang="en-US"/>
           </a:p>
@@ -6207,7 +6207,7 @@
           <a:p>
             <a:fld id="{58CC49A9-C646-2345-B4A7-439457175566}" type="datetime1">
               <a:rPr lang="en-US" smtClean="0"/>
-              <a:t>2/12/25</a:t>
+              <a:t>4/2/25</a:t>
             </a:fld>
             <a:endParaRPr lang="en-US"/>
           </a:p>
@@ -6448,7 +6448,7 @@
           <a:p>
             <a:fld id="{D516C8CC-C3CD-B94B-94D6-0913487DB5E5}" type="datetime1">
               <a:rPr lang="en-US" smtClean="0"/>
-              <a:t>2/12/25</a:t>
+              <a:t>4/2/25</a:t>
             </a:fld>
             <a:endParaRPr lang="en-US"/>
           </a:p>
@@ -25942,7 +25942,7 @@
         <p:spPr>
           <a:xfrm>
             <a:off x="3456996" y="3747543"/>
-            <a:ext cx="1497782" cy="307777"/>
+            <a:ext cx="1209242" cy="307777"/>
           </a:xfrm>
           <a:prstGeom prst="rect">
             <a:avLst/>
@@ -25956,7 +25956,7 @@
           <a:p>
             <a:r>
               <a:rPr lang="en-US" sz="1400" dirty="0"/>
-              <a:t>distance cell (</a:t>
+              <a:t>distance (</a:t>
             </a:r>
             <a:r>
               <a:rPr lang="en-US" sz="1400" dirty="0" err="1"/>

</xml_diff>

<commit_message>
itests checks reduced density, initiator relocation, and failed initialization
</commit_message>
<xml_diff>
--- a/docs/power_point/nemd.pptx
+++ b/docs/power_point/nemd.pptx
@@ -3133,7 +3133,7 @@
           <a:p>
             <a:fld id="{4E7935B3-F5AC-0F49-A77F-693DEAA46623}" type="datetimeFigureOut">
               <a:rPr lang="en-US" smtClean="0"/>
-              <a:t>4/30/25</a:t>
+              <a:t>5/26/25</a:t>
             </a:fld>
             <a:endParaRPr lang="en-US"/>
           </a:p>
@@ -3799,7 +3799,7 @@
           <a:p>
             <a:fld id="{7139230D-D256-FE47-99BF-6F642436F56E}" type="datetime1">
               <a:rPr lang="en-US" smtClean="0"/>
-              <a:t>4/30/25</a:t>
+              <a:t>5/26/25</a:t>
             </a:fld>
             <a:endParaRPr lang="en-US"/>
           </a:p>
@@ -3997,7 +3997,7 @@
           <a:p>
             <a:fld id="{785AC849-5CEB-3846-9265-8D72BE481A70}" type="datetime1">
               <a:rPr lang="en-US" smtClean="0"/>
-              <a:t>4/30/25</a:t>
+              <a:t>5/26/25</a:t>
             </a:fld>
             <a:endParaRPr lang="en-US"/>
           </a:p>
@@ -4205,7 +4205,7 @@
           <a:p>
             <a:fld id="{A02BBDEB-BEE0-FD44-AAFC-27969F9541FD}" type="datetime1">
               <a:rPr lang="en-US" smtClean="0"/>
-              <a:t>4/30/25</a:t>
+              <a:t>5/26/25</a:t>
             </a:fld>
             <a:endParaRPr lang="en-US"/>
           </a:p>
@@ -4403,7 +4403,7 @@
           <a:p>
             <a:fld id="{4F82860A-5855-1941-A1E0-F1AE52EC854D}" type="datetime1">
               <a:rPr lang="en-US" smtClean="0"/>
-              <a:t>4/30/25</a:t>
+              <a:t>5/26/25</a:t>
             </a:fld>
             <a:endParaRPr lang="en-US"/>
           </a:p>
@@ -4678,7 +4678,7 @@
           <a:p>
             <a:fld id="{6A874B4C-42F5-E24E-B25F-613EC7F4AF0D}" type="datetime1">
               <a:rPr lang="en-US" smtClean="0"/>
-              <a:t>4/30/25</a:t>
+              <a:t>5/26/25</a:t>
             </a:fld>
             <a:endParaRPr lang="en-US"/>
           </a:p>
@@ -4943,7 +4943,7 @@
           <a:p>
             <a:fld id="{9A2BCD20-0178-0C41-9D8E-10FA267A6CCC}" type="datetime1">
               <a:rPr lang="en-US" smtClean="0"/>
-              <a:t>4/30/25</a:t>
+              <a:t>5/26/25</a:t>
             </a:fld>
             <a:endParaRPr lang="en-US"/>
           </a:p>
@@ -5355,7 +5355,7 @@
           <a:p>
             <a:fld id="{EDE58456-60EB-6840-BCEB-E4C2678C039E}" type="datetime1">
               <a:rPr lang="en-US" smtClean="0"/>
-              <a:t>4/30/25</a:t>
+              <a:t>5/26/25</a:t>
             </a:fld>
             <a:endParaRPr lang="en-US"/>
           </a:p>
@@ -5496,7 +5496,7 @@
           <a:p>
             <a:fld id="{8BBFCD94-1F0D-3948-A9F0-DB82F9AAC2D3}" type="datetime1">
               <a:rPr lang="en-US" smtClean="0"/>
-              <a:t>4/30/25</a:t>
+              <a:t>5/26/25</a:t>
             </a:fld>
             <a:endParaRPr lang="en-US"/>
           </a:p>
@@ -5609,7 +5609,7 @@
           <a:p>
             <a:fld id="{13692FAC-AC21-0848-AC27-426B7BF29104}" type="datetime1">
               <a:rPr lang="en-US" smtClean="0"/>
-              <a:t>4/30/25</a:t>
+              <a:t>5/26/25</a:t>
             </a:fld>
             <a:endParaRPr lang="en-US"/>
           </a:p>
@@ -5920,7 +5920,7 @@
           <a:p>
             <a:fld id="{A3FF56F3-8608-FF4D-9C26-AE6D473095CB}" type="datetime1">
               <a:rPr lang="en-US" smtClean="0"/>
-              <a:t>4/30/25</a:t>
+              <a:t>5/26/25</a:t>
             </a:fld>
             <a:endParaRPr lang="en-US"/>
           </a:p>
@@ -6208,7 +6208,7 @@
           <a:p>
             <a:fld id="{58CC49A9-C646-2345-B4A7-439457175566}" type="datetime1">
               <a:rPr lang="en-US" smtClean="0"/>
-              <a:t>4/30/25</a:t>
+              <a:t>5/26/25</a:t>
             </a:fld>
             <a:endParaRPr lang="en-US"/>
           </a:p>
@@ -6449,7 +6449,7 @@
           <a:p>
             <a:fld id="{D516C8CC-C3CD-B94B-94D6-0913487DB5E5}" type="datetime1">
               <a:rPr lang="en-US" smtClean="0"/>
-              <a:t>4/30/25</a:t>
+              <a:t>5/26/25</a:t>
             </a:fld>
             <a:endParaRPr lang="en-US"/>
           </a:p>
@@ -10386,7 +10386,7 @@
           <p:nvPr>
             <p:extLst>
               <p:ext uri="{D42A27DB-BD31-4B8C-83A1-F6EECF244321}">
-                <p14:modId xmlns:p14="http://schemas.microsoft.com/office/powerpoint/2010/main" val="1246487948"/>
+                <p14:modId xmlns:p14="http://schemas.microsoft.com/office/powerpoint/2010/main" val="2166640308"/>
               </p:ext>
             </p:extLst>
           </p:nvPr>
@@ -12020,18 +12020,15 @@
                     <a:p>
                       <a:pPr algn="ctr" fontAlgn="b"/>
                       <a:r>
-                        <a:rPr lang="en-US" sz="1000" u="none" strike="noStrike">
+                        <a:rPr lang="en-US" sz="1000" b="0" i="0" u="none" strike="noStrike" dirty="0">
+                          <a:solidFill>
+                            <a:srgbClr val="000000"/>
+                          </a:solidFill>
                           <a:effectLst/>
-                        </a:rPr>
-                        <a:t>7(4)</a:t>
-                      </a:r>
-                      <a:endParaRPr lang="en-US" sz="1000" b="0" i="0" u="none" strike="noStrike">
-                        <a:solidFill>
-                          <a:srgbClr val="000000"/>
-                        </a:solidFill>
-                        <a:effectLst/>
-                        <a:latin typeface="Calibri" panose="020F0502020204030204" pitchFamily="34" charset="0"/>
-                      </a:endParaRPr>
+                          <a:latin typeface="Calibri" panose="020F0502020204030204" pitchFamily="34" charset="0"/>
+                        </a:rPr>
+                        <a:t>10 (1)| 10 (1)</a:t>
+                      </a:r>
                     </a:p>
                   </a:txBody>
                   <a:tcPr marL="5605" marR="5605" marT="5605" marB="0" anchor="ctr"/>
@@ -12043,18 +12040,35 @@
                     <a:p>
                       <a:pPr algn="ctr" fontAlgn="b"/>
                       <a:r>
-                        <a:rPr lang="en-US" sz="1000" u="none" strike="noStrike">
+                        <a:rPr lang="en-US" sz="1000" b="0" i="0" u="none" strike="noStrike" dirty="0">
+                          <a:solidFill>
+                            <a:srgbClr val="000000"/>
+                          </a:solidFill>
                           <a:effectLst/>
-                        </a:rPr>
-                        <a:t>*CC*</a:t>
-                      </a:r>
-                      <a:endParaRPr lang="en-US" sz="1000" b="0" i="0" u="none" strike="noStrike">
-                        <a:solidFill>
-                          <a:srgbClr val="000000"/>
-                        </a:solidFill>
-                        <a:effectLst/>
-                        <a:latin typeface="Calibri" panose="020F0502020204030204" pitchFamily="34" charset="0"/>
-                      </a:endParaRPr>
+                          <a:latin typeface="Calibri" panose="020F0502020204030204" pitchFamily="34" charset="0"/>
+                        </a:rPr>
+                        <a:t>[</a:t>
+                      </a:r>
+                      <a:r>
+                        <a:rPr lang="en-US" sz="1000" b="0" i="0" u="none" strike="noStrike" dirty="0" err="1">
+                          <a:solidFill>
+                            <a:srgbClr val="000000"/>
+                          </a:solidFill>
+                          <a:effectLst/>
+                          <a:latin typeface="Calibri" panose="020F0502020204030204" pitchFamily="34" charset="0"/>
+                        </a:rPr>
+                        <a:t>Ar</a:t>
+                      </a:r>
+                      <a:r>
+                        <a:rPr lang="en-US" sz="1000" b="0" i="0" u="none" strike="noStrike" dirty="0">
+                          <a:solidFill>
+                            <a:srgbClr val="000000"/>
+                          </a:solidFill>
+                          <a:effectLst/>
+                          <a:latin typeface="Calibri" panose="020F0502020204030204" pitchFamily="34" charset="0"/>
+                        </a:rPr>
+                        <a:t>] CCCC</a:t>
+                      </a:r>
                     </a:p>
                   </a:txBody>
                   <a:tcPr marL="5605" marR="5605" marT="5605" marB="0" anchor="ctr"/>
@@ -12066,12 +12080,12 @@
                     <a:p>
                       <a:pPr algn="ctr" fontAlgn="b"/>
                       <a:r>
-                        <a:rPr lang="en-US" sz="1000" u="none" strike="noStrike">
+                        <a:rPr lang="en-US" sz="1000" u="none" strike="noStrike" dirty="0">
                           <a:effectLst/>
                         </a:rPr>
-                        <a:t>Reduce (2.65)</a:t>
-                      </a:r>
-                      <a:endParaRPr lang="en-US" sz="1000" b="0" i="0" u="none" strike="noStrike">
+                        <a:t>Failed Initialization</a:t>
+                      </a:r>
+                      <a:endParaRPr lang="en-US" sz="1000" b="0" i="0" u="none" strike="noStrike" dirty="0">
                         <a:solidFill>
                           <a:srgbClr val="000000"/>
                         </a:solidFill>

</xml_diff>

<commit_message>
lammps to lmp 1389 passed, 16 errors in 37.15s
</commit_message>
<xml_diff>
--- a/docs/power_point/nemd.pptx
+++ b/docs/power_point/nemd.pptx
@@ -3133,7 +3133,7 @@
           <a:p>
             <a:fld id="{4E7935B3-F5AC-0F49-A77F-693DEAA46623}" type="datetimeFigureOut">
               <a:rPr lang="en-US" smtClean="0"/>
-              <a:t>5/26/25</a:t>
+              <a:t>6/9/25</a:t>
             </a:fld>
             <a:endParaRPr lang="en-US"/>
           </a:p>
@@ -3799,7 +3799,7 @@
           <a:p>
             <a:fld id="{7139230D-D256-FE47-99BF-6F642436F56E}" type="datetime1">
               <a:rPr lang="en-US" smtClean="0"/>
-              <a:t>5/26/25</a:t>
+              <a:t>6/9/25</a:t>
             </a:fld>
             <a:endParaRPr lang="en-US"/>
           </a:p>
@@ -3997,7 +3997,7 @@
           <a:p>
             <a:fld id="{785AC849-5CEB-3846-9265-8D72BE481A70}" type="datetime1">
               <a:rPr lang="en-US" smtClean="0"/>
-              <a:t>5/26/25</a:t>
+              <a:t>6/9/25</a:t>
             </a:fld>
             <a:endParaRPr lang="en-US"/>
           </a:p>
@@ -4205,7 +4205,7 @@
           <a:p>
             <a:fld id="{A02BBDEB-BEE0-FD44-AAFC-27969F9541FD}" type="datetime1">
               <a:rPr lang="en-US" smtClean="0"/>
-              <a:t>5/26/25</a:t>
+              <a:t>6/9/25</a:t>
             </a:fld>
             <a:endParaRPr lang="en-US"/>
           </a:p>
@@ -4403,7 +4403,7 @@
           <a:p>
             <a:fld id="{4F82860A-5855-1941-A1E0-F1AE52EC854D}" type="datetime1">
               <a:rPr lang="en-US" smtClean="0"/>
-              <a:t>5/26/25</a:t>
+              <a:t>6/9/25</a:t>
             </a:fld>
             <a:endParaRPr lang="en-US"/>
           </a:p>
@@ -4678,7 +4678,7 @@
           <a:p>
             <a:fld id="{6A874B4C-42F5-E24E-B25F-613EC7F4AF0D}" type="datetime1">
               <a:rPr lang="en-US" smtClean="0"/>
-              <a:t>5/26/25</a:t>
+              <a:t>6/9/25</a:t>
             </a:fld>
             <a:endParaRPr lang="en-US"/>
           </a:p>
@@ -4943,7 +4943,7 @@
           <a:p>
             <a:fld id="{9A2BCD20-0178-0C41-9D8E-10FA267A6CCC}" type="datetime1">
               <a:rPr lang="en-US" smtClean="0"/>
-              <a:t>5/26/25</a:t>
+              <a:t>6/9/25</a:t>
             </a:fld>
             <a:endParaRPr lang="en-US"/>
           </a:p>
@@ -5355,7 +5355,7 @@
           <a:p>
             <a:fld id="{EDE58456-60EB-6840-BCEB-E4C2678C039E}" type="datetime1">
               <a:rPr lang="en-US" smtClean="0"/>
-              <a:t>5/26/25</a:t>
+              <a:t>6/9/25</a:t>
             </a:fld>
             <a:endParaRPr lang="en-US"/>
           </a:p>
@@ -5496,7 +5496,7 @@
           <a:p>
             <a:fld id="{8BBFCD94-1F0D-3948-A9F0-DB82F9AAC2D3}" type="datetime1">
               <a:rPr lang="en-US" smtClean="0"/>
-              <a:t>5/26/25</a:t>
+              <a:t>6/9/25</a:t>
             </a:fld>
             <a:endParaRPr lang="en-US"/>
           </a:p>
@@ -5609,7 +5609,7 @@
           <a:p>
             <a:fld id="{13692FAC-AC21-0848-AC27-426B7BF29104}" type="datetime1">
               <a:rPr lang="en-US" smtClean="0"/>
-              <a:t>5/26/25</a:t>
+              <a:t>6/9/25</a:t>
             </a:fld>
             <a:endParaRPr lang="en-US"/>
           </a:p>
@@ -5920,7 +5920,7 @@
           <a:p>
             <a:fld id="{A3FF56F3-8608-FF4D-9C26-AE6D473095CB}" type="datetime1">
               <a:rPr lang="en-US" smtClean="0"/>
-              <a:t>5/26/25</a:t>
+              <a:t>6/9/25</a:t>
             </a:fld>
             <a:endParaRPr lang="en-US"/>
           </a:p>
@@ -6208,7 +6208,7 @@
           <a:p>
             <a:fld id="{58CC49A9-C646-2345-B4A7-439457175566}" type="datetime1">
               <a:rPr lang="en-US" smtClean="0"/>
-              <a:t>5/26/25</a:t>
+              <a:t>6/9/25</a:t>
             </a:fld>
             <a:endParaRPr lang="en-US"/>
           </a:p>
@@ -6449,7 +6449,7 @@
           <a:p>
             <a:fld id="{D516C8CC-C3CD-B94B-94D6-0913487DB5E5}" type="datetime1">
               <a:rPr lang="en-US" smtClean="0"/>
-              <a:t>5/26/25</a:t>
+              <a:t>6/9/25</a:t>
             </a:fld>
             <a:endParaRPr lang="en-US"/>
           </a:p>
@@ -25955,7 +25955,7 @@
         <p:spPr>
           <a:xfrm>
             <a:off x="7191485" y="3746582"/>
-            <a:ext cx="1668983" cy="307777"/>
+            <a:ext cx="1370119" cy="307777"/>
           </a:xfrm>
           <a:prstGeom prst="rect">
             <a:avLst/>
@@ -25981,7 +25981,7 @@
             </a:r>
             <a:r>
               <a:rPr lang="en-US" sz="1400" dirty="0" err="1"/>
-              <a:t>lammpsin</a:t>
+              <a:t>lmpin</a:t>
             </a:r>
             <a:r>
               <a:rPr lang="en-US" sz="1400" dirty="0"/>
@@ -30580,7 +30580,7 @@
                   <a:schemeClr val="tx1"/>
                 </a:solidFill>
               </a:rPr>
-              <a:t>lammpsfix</a:t>
+              <a:t>lmpfix</a:t>
             </a:r>
             <a:r>
               <a:rPr lang="en-US" sz="1400" dirty="0">

</xml_diff>

<commit_message>
nemd.pptx architecture update itest 0001 covers .in 56 itests passed in 2min7s 1498 unittests passed in 32.30s pandasutils.py deleted
</commit_message>
<xml_diff>
--- a/docs/power_point/nemd.pptx
+++ b/docs/power_point/nemd.pptx
@@ -5,7 +5,7 @@
     <p:sldMasterId id="2147483648" r:id="rId1"/>
   </p:sldMasterIdLst>
   <p:notesMasterIdLst>
-    <p:notesMasterId r:id="rId20"/>
+    <p:notesMasterId r:id="rId19"/>
   </p:notesMasterIdLst>
   <p:sldIdLst>
     <p:sldId id="256" r:id="rId2"/>
@@ -25,7 +25,6 @@
     <p:sldId id="267" r:id="rId16"/>
     <p:sldId id="272" r:id="rId17"/>
     <p:sldId id="265" r:id="rId18"/>
-    <p:sldId id="274" r:id="rId19"/>
   </p:sldIdLst>
   <p:sldSz cx="12192000" cy="6858000"/>
   <p:notesSz cx="6858000" cy="9144000"/>
@@ -3133,7 +3132,7 @@
           <a:p>
             <a:fld id="{4E7935B3-F5AC-0F49-A77F-693DEAA46623}" type="datetimeFigureOut">
               <a:rPr lang="en-US" smtClean="0"/>
-              <a:t>6/9/25</a:t>
+              <a:t>6/20/25</a:t>
             </a:fld>
             <a:endParaRPr lang="en-US"/>
           </a:p>
@@ -3799,7 +3798,7 @@
           <a:p>
             <a:fld id="{7139230D-D256-FE47-99BF-6F642436F56E}" type="datetime1">
               <a:rPr lang="en-US" smtClean="0"/>
-              <a:t>6/9/25</a:t>
+              <a:t>6/20/25</a:t>
             </a:fld>
             <a:endParaRPr lang="en-US"/>
           </a:p>
@@ -3997,7 +3996,7 @@
           <a:p>
             <a:fld id="{785AC849-5CEB-3846-9265-8D72BE481A70}" type="datetime1">
               <a:rPr lang="en-US" smtClean="0"/>
-              <a:t>6/9/25</a:t>
+              <a:t>6/20/25</a:t>
             </a:fld>
             <a:endParaRPr lang="en-US"/>
           </a:p>
@@ -4205,7 +4204,7 @@
           <a:p>
             <a:fld id="{A02BBDEB-BEE0-FD44-AAFC-27969F9541FD}" type="datetime1">
               <a:rPr lang="en-US" smtClean="0"/>
-              <a:t>6/9/25</a:t>
+              <a:t>6/20/25</a:t>
             </a:fld>
             <a:endParaRPr lang="en-US"/>
           </a:p>
@@ -4403,7 +4402,7 @@
           <a:p>
             <a:fld id="{4F82860A-5855-1941-A1E0-F1AE52EC854D}" type="datetime1">
               <a:rPr lang="en-US" smtClean="0"/>
-              <a:t>6/9/25</a:t>
+              <a:t>6/20/25</a:t>
             </a:fld>
             <a:endParaRPr lang="en-US"/>
           </a:p>
@@ -4678,7 +4677,7 @@
           <a:p>
             <a:fld id="{6A874B4C-42F5-E24E-B25F-613EC7F4AF0D}" type="datetime1">
               <a:rPr lang="en-US" smtClean="0"/>
-              <a:t>6/9/25</a:t>
+              <a:t>6/20/25</a:t>
             </a:fld>
             <a:endParaRPr lang="en-US"/>
           </a:p>
@@ -4943,7 +4942,7 @@
           <a:p>
             <a:fld id="{9A2BCD20-0178-0C41-9D8E-10FA267A6CCC}" type="datetime1">
               <a:rPr lang="en-US" smtClean="0"/>
-              <a:t>6/9/25</a:t>
+              <a:t>6/20/25</a:t>
             </a:fld>
             <a:endParaRPr lang="en-US"/>
           </a:p>
@@ -5355,7 +5354,7 @@
           <a:p>
             <a:fld id="{EDE58456-60EB-6840-BCEB-E4C2678C039E}" type="datetime1">
               <a:rPr lang="en-US" smtClean="0"/>
-              <a:t>6/9/25</a:t>
+              <a:t>6/20/25</a:t>
             </a:fld>
             <a:endParaRPr lang="en-US"/>
           </a:p>
@@ -5496,7 +5495,7 @@
           <a:p>
             <a:fld id="{8BBFCD94-1F0D-3948-A9F0-DB82F9AAC2D3}" type="datetime1">
               <a:rPr lang="en-US" smtClean="0"/>
-              <a:t>6/9/25</a:t>
+              <a:t>6/20/25</a:t>
             </a:fld>
             <a:endParaRPr lang="en-US"/>
           </a:p>
@@ -5609,7 +5608,7 @@
           <a:p>
             <a:fld id="{13692FAC-AC21-0848-AC27-426B7BF29104}" type="datetime1">
               <a:rPr lang="en-US" smtClean="0"/>
-              <a:t>6/9/25</a:t>
+              <a:t>6/20/25</a:t>
             </a:fld>
             <a:endParaRPr lang="en-US"/>
           </a:p>
@@ -5920,7 +5919,7 @@
           <a:p>
             <a:fld id="{A3FF56F3-8608-FF4D-9C26-AE6D473095CB}" type="datetime1">
               <a:rPr lang="en-US" smtClean="0"/>
-              <a:t>6/9/25</a:t>
+              <a:t>6/20/25</a:t>
             </a:fld>
             <a:endParaRPr lang="en-US"/>
           </a:p>
@@ -6208,7 +6207,7 @@
           <a:p>
             <a:fld id="{58CC49A9-C646-2345-B4A7-439457175566}" type="datetime1">
               <a:rPr lang="en-US" smtClean="0"/>
-              <a:t>6/9/25</a:t>
+              <a:t>6/20/25</a:t>
             </a:fld>
             <a:endParaRPr lang="en-US"/>
           </a:p>
@@ -6449,7 +6448,7 @@
           <a:p>
             <a:fld id="{D516C8CC-C3CD-B94B-94D6-0913487DB5E5}" type="datetime1">
               <a:rPr lang="en-US" smtClean="0"/>
-              <a:t>6/9/25</a:t>
+              <a:t>6/20/25</a:t>
             </a:fld>
             <a:endParaRPr lang="en-US"/>
           </a:p>
@@ -18621,403 +18620,6 @@
 </p:sld>
 </file>
 
-<file path=ppt/slides/slide18.xml><?xml version="1.0" encoding="utf-8"?>
-<p:sld xmlns:a="http://schemas.openxmlformats.org/drawingml/2006/main" xmlns:r="http://schemas.openxmlformats.org/officeDocument/2006/relationships" xmlns:p="http://schemas.openxmlformats.org/presentationml/2006/main">
-  <p:cSld>
-    <p:spTree>
-      <p:nvGrpSpPr>
-        <p:cNvPr id="1" name=""/>
-        <p:cNvGrpSpPr/>
-        <p:nvPr/>
-      </p:nvGrpSpPr>
-      <p:grpSpPr>
-        <a:xfrm>
-          <a:off x="0" y="0"/>
-          <a:ext cx="0" cy="0"/>
-          <a:chOff x="0" y="0"/>
-          <a:chExt cx="0" cy="0"/>
-        </a:xfrm>
-      </p:grpSpPr>
-      <p:sp>
-        <p:nvSpPr>
-          <p:cNvPr id="5" name="Rounded Rectangle 4">
-            <a:extLst>
-              <a:ext uri="{FF2B5EF4-FFF2-40B4-BE49-F238E27FC236}">
-                <a16:creationId xmlns:a16="http://schemas.microsoft.com/office/drawing/2014/main" id="{7A42516C-AEDC-294C-7357-100D6252F9BC}"/>
-              </a:ext>
-            </a:extLst>
-          </p:cNvPr>
-          <p:cNvSpPr/>
-          <p:nvPr/>
-        </p:nvSpPr>
-        <p:spPr>
-          <a:xfrm>
-            <a:off x="391887" y="924847"/>
-            <a:ext cx="8044542" cy="925724"/>
-          </a:xfrm>
-          <a:prstGeom prst="roundRect">
-            <a:avLst/>
-          </a:prstGeom>
-          <a:noFill/>
-        </p:spPr>
-        <p:style>
-          <a:lnRef idx="2">
-            <a:schemeClr val="accent1">
-              <a:shade val="50000"/>
-            </a:schemeClr>
-          </a:lnRef>
-          <a:fillRef idx="1">
-            <a:schemeClr val="accent1"/>
-          </a:fillRef>
-          <a:effectRef idx="0">
-            <a:schemeClr val="accent1"/>
-          </a:effectRef>
-          <a:fontRef idx="minor">
-            <a:schemeClr val="lt1"/>
-          </a:fontRef>
-        </p:style>
-        <p:txBody>
-          <a:bodyPr numCol="4" rtlCol="0" anchor="ctr"/>
-          <a:lstStyle/>
-          <a:p>
-            <a:pPr algn="ctr"/>
-            <a:r>
-              <a:rPr lang="en-US" sz="1400" dirty="0" err="1">
-                <a:solidFill>
-                  <a:schemeClr val="tx1"/>
-                </a:solidFill>
-              </a:rPr>
-              <a:t>builtins</a:t>
-            </a:r>
-            <a:r>
-              <a:rPr lang="en-US" sz="1400" dirty="0">
-                <a:solidFill>
-                  <a:schemeClr val="tx1"/>
-                </a:solidFill>
-              </a:rPr>
-              <a:t> (</a:t>
-            </a:r>
-            <a:r>
-              <a:rPr lang="en-US" sz="1400" dirty="0" err="1">
-                <a:solidFill>
-                  <a:schemeClr val="tx1"/>
-                </a:solidFill>
-              </a:rPr>
-              <a:t>builtinsutils</a:t>
-            </a:r>
-            <a:r>
-              <a:rPr lang="en-US" sz="1400" dirty="0">
-                <a:solidFill>
-                  <a:schemeClr val="tx1"/>
-                </a:solidFill>
-              </a:rPr>
-              <a:t>)</a:t>
-            </a:r>
-          </a:p>
-          <a:p>
-            <a:pPr algn="ctr"/>
-            <a:r>
-              <a:rPr lang="en-US" sz="1400" dirty="0">
-                <a:solidFill>
-                  <a:schemeClr val="tx1"/>
-                </a:solidFill>
-              </a:rPr>
-              <a:t>system (</a:t>
-            </a:r>
-            <a:r>
-              <a:rPr lang="en-US" sz="1400" dirty="0" err="1">
-                <a:solidFill>
-                  <a:schemeClr val="tx1"/>
-                </a:solidFill>
-              </a:rPr>
-              <a:t>osutils</a:t>
-            </a:r>
-            <a:r>
-              <a:rPr lang="en-US" sz="1400" dirty="0">
-                <a:solidFill>
-                  <a:schemeClr val="tx1"/>
-                </a:solidFill>
-              </a:rPr>
-              <a:t>)</a:t>
-            </a:r>
-          </a:p>
-          <a:p>
-            <a:pPr algn="ctr"/>
-            <a:r>
-              <a:rPr lang="en-US" sz="1400" dirty="0">
-                <a:solidFill>
-                  <a:schemeClr val="tx1"/>
-                </a:solidFill>
-              </a:rPr>
-              <a:t>process (</a:t>
-            </a:r>
-            <a:r>
-              <a:rPr lang="en-US" sz="1400" dirty="0" err="1">
-                <a:solidFill>
-                  <a:schemeClr val="tx1"/>
-                </a:solidFill>
-              </a:rPr>
-              <a:t>psutils</a:t>
-            </a:r>
-            <a:r>
-              <a:rPr lang="en-US" sz="1400" dirty="0">
-                <a:solidFill>
-                  <a:schemeClr val="tx1"/>
-                </a:solidFill>
-              </a:rPr>
-              <a:t>)</a:t>
-            </a:r>
-          </a:p>
-          <a:p>
-            <a:pPr algn="ctr"/>
-            <a:r>
-              <a:rPr lang="en-US" sz="1400" dirty="0">
-                <a:solidFill>
-                  <a:schemeClr val="tx1"/>
-                </a:solidFill>
-              </a:rPr>
-              <a:t>environment (</a:t>
-            </a:r>
-            <a:r>
-              <a:rPr lang="en-US" sz="1400" dirty="0" err="1">
-                <a:solidFill>
-                  <a:schemeClr val="tx1"/>
-                </a:solidFill>
-              </a:rPr>
-              <a:t>envutils</a:t>
-            </a:r>
-            <a:r>
-              <a:rPr lang="en-US" sz="1400" dirty="0">
-                <a:solidFill>
-                  <a:schemeClr val="tx1"/>
-                </a:solidFill>
-              </a:rPr>
-              <a:t>)</a:t>
-            </a:r>
-          </a:p>
-          <a:p>
-            <a:pPr algn="ctr"/>
-            <a:r>
-              <a:rPr lang="en-US" sz="1400" dirty="0">
-                <a:solidFill>
-                  <a:schemeClr val="tx1"/>
-                </a:solidFill>
-              </a:rPr>
-              <a:t>commands (</a:t>
-            </a:r>
-            <a:r>
-              <a:rPr lang="en-US" sz="1400" dirty="0" err="1">
-                <a:solidFill>
-                  <a:schemeClr val="tx1"/>
-                </a:solidFill>
-              </a:rPr>
-              <a:t>lammpsfix</a:t>
-            </a:r>
-            <a:r>
-              <a:rPr lang="en-US" sz="1400" dirty="0">
-                <a:solidFill>
-                  <a:schemeClr val="tx1"/>
-                </a:solidFill>
-              </a:rPr>
-              <a:t>)     matplotlib (</a:t>
-            </a:r>
-            <a:r>
-              <a:rPr lang="en-US" sz="1400" dirty="0" err="1">
-                <a:solidFill>
-                  <a:schemeClr val="tx1"/>
-                </a:solidFill>
-              </a:rPr>
-              <a:t>plotutils</a:t>
-            </a:r>
-            <a:r>
-              <a:rPr lang="en-US" sz="1400" dirty="0">
-                <a:solidFill>
-                  <a:schemeClr val="tx1"/>
-                </a:solidFill>
-              </a:rPr>
-              <a:t>)</a:t>
-            </a:r>
-          </a:p>
-          <a:p>
-            <a:pPr algn="ctr"/>
-            <a:r>
-              <a:rPr lang="en-US" sz="1400" dirty="0">
-                <a:solidFill>
-                  <a:schemeClr val="tx1"/>
-                </a:solidFill>
-              </a:rPr>
-              <a:t>constants (constants)</a:t>
-            </a:r>
-          </a:p>
-          <a:p>
-            <a:pPr algn="ctr"/>
-            <a:r>
-              <a:rPr lang="en-US" sz="1400" dirty="0">
-                <a:solidFill>
-                  <a:schemeClr val="tx1"/>
-                </a:solidFill>
-              </a:rPr>
-              <a:t>hardcoded const (symbols)</a:t>
-            </a:r>
-          </a:p>
-          <a:p>
-            <a:pPr algn="ctr"/>
-            <a:r>
-              <a:rPr lang="en-US" sz="1400" dirty="0">
-                <a:solidFill>
-                  <a:schemeClr val="tx1"/>
-                </a:solidFill>
-              </a:rPr>
-              <a:t>time (</a:t>
-            </a:r>
-            <a:r>
-              <a:rPr lang="en-US" sz="1400" dirty="0" err="1">
-                <a:solidFill>
-                  <a:schemeClr val="tx1"/>
-                </a:solidFill>
-              </a:rPr>
-              <a:t>timeutils</a:t>
-            </a:r>
-            <a:r>
-              <a:rPr lang="en-US" sz="1400" dirty="0">
-                <a:solidFill>
-                  <a:schemeClr val="tx1"/>
-                </a:solidFill>
-              </a:rPr>
-              <a:t>)</a:t>
-            </a:r>
-          </a:p>
-          <a:p>
-            <a:pPr algn="ctr"/>
-            <a:r>
-              <a:rPr lang="en-US" sz="1400" dirty="0" err="1">
-                <a:solidFill>
-                  <a:schemeClr val="tx1"/>
-                </a:solidFill>
-              </a:rPr>
-              <a:t>numpy</a:t>
-            </a:r>
-            <a:r>
-              <a:rPr lang="en-US" sz="1400" dirty="0">
-                <a:solidFill>
-                  <a:schemeClr val="tx1"/>
-                </a:solidFill>
-              </a:rPr>
-              <a:t> (</a:t>
-            </a:r>
-            <a:r>
-              <a:rPr lang="en-US" sz="1400" dirty="0" err="1">
-                <a:solidFill>
-                  <a:schemeClr val="tx1"/>
-                </a:solidFill>
-              </a:rPr>
-              <a:t>numpyutils</a:t>
-            </a:r>
-            <a:r>
-              <a:rPr lang="en-US" sz="1400" dirty="0">
-                <a:solidFill>
-                  <a:schemeClr val="tx1"/>
-                </a:solidFill>
-              </a:rPr>
-              <a:t>)</a:t>
-            </a:r>
-          </a:p>
-          <a:p>
-            <a:pPr algn="ctr"/>
-            <a:r>
-              <a:rPr lang="en-US" sz="1400" dirty="0" err="1">
-                <a:solidFill>
-                  <a:schemeClr val="tx1"/>
-                </a:solidFill>
-              </a:rPr>
-              <a:t>numba</a:t>
-            </a:r>
-            <a:r>
-              <a:rPr lang="en-US" sz="1400" dirty="0">
-                <a:solidFill>
-                  <a:schemeClr val="tx1"/>
-                </a:solidFill>
-              </a:rPr>
-              <a:t> (</a:t>
-            </a:r>
-            <a:r>
-              <a:rPr lang="en-US" sz="1400" dirty="0" err="1">
-                <a:solidFill>
-                  <a:schemeClr val="tx1"/>
-                </a:solidFill>
-              </a:rPr>
-              <a:t>numbautils</a:t>
-            </a:r>
-            <a:r>
-              <a:rPr lang="en-US" sz="1400" dirty="0">
-                <a:solidFill>
-                  <a:schemeClr val="tx1"/>
-                </a:solidFill>
-              </a:rPr>
-              <a:t>)</a:t>
-            </a:r>
-          </a:p>
-          <a:p>
-            <a:pPr algn="ctr"/>
-            <a:r>
-              <a:rPr lang="en-US" sz="1400" dirty="0" err="1">
-                <a:solidFill>
-                  <a:schemeClr val="tx1"/>
-                </a:solidFill>
-              </a:rPr>
-              <a:t>rdkit</a:t>
-            </a:r>
-            <a:r>
-              <a:rPr lang="en-US" sz="1400" dirty="0">
-                <a:solidFill>
-                  <a:schemeClr val="tx1"/>
-                </a:solidFill>
-              </a:rPr>
-              <a:t> (</a:t>
-            </a:r>
-            <a:r>
-              <a:rPr lang="en-US" sz="1400" dirty="0" err="1">
-                <a:solidFill>
-                  <a:schemeClr val="tx1"/>
-                </a:solidFill>
-              </a:rPr>
-              <a:t>rdkitutils</a:t>
-            </a:r>
-            <a:r>
-              <a:rPr lang="en-US" sz="1400" dirty="0">
-                <a:solidFill>
-                  <a:schemeClr val="tx1"/>
-                </a:solidFill>
-              </a:rPr>
-              <a:t>)</a:t>
-            </a:r>
-          </a:p>
-          <a:p>
-            <a:pPr algn="ctr"/>
-            <a:r>
-              <a:rPr lang="en-US" sz="1400" dirty="0">
-                <a:solidFill>
-                  <a:schemeClr val="tx1"/>
-                </a:solidFill>
-              </a:rPr>
-              <a:t>points (geometry)</a:t>
-            </a:r>
-          </a:p>
-        </p:txBody>
-      </p:sp>
-    </p:spTree>
-    <p:extLst>
-      <p:ext uri="{BB962C8B-B14F-4D97-AF65-F5344CB8AC3E}">
-        <p14:creationId xmlns:p14="http://schemas.microsoft.com/office/powerpoint/2010/main" val="2314276008"/>
-      </p:ext>
-    </p:extLst>
-  </p:cSld>
-  <p:clrMapOvr>
-    <a:masterClrMapping/>
-  </p:clrMapOvr>
-</p:sld>
-</file>
-
 <file path=ppt/slides/slide2.xml><?xml version="1.0" encoding="utf-8"?>
 <p:sld xmlns:a="http://schemas.openxmlformats.org/drawingml/2006/main" xmlns:r="http://schemas.openxmlformats.org/officeDocument/2006/relationships" xmlns:p="http://schemas.openxmlformats.org/presentationml/2006/main">
   <p:cSld>
@@ -25668,7 +25270,7 @@
         </p:nvSpPr>
         <p:spPr>
           <a:xfrm>
-            <a:off x="210327" y="3744577"/>
+            <a:off x="210327" y="3576743"/>
             <a:ext cx="1569917" cy="307777"/>
           </a:xfrm>
           <a:prstGeom prst="rect">
@@ -25711,7 +25313,7 @@
         </p:nvSpPr>
         <p:spPr>
           <a:xfrm>
-            <a:off x="167366" y="4196446"/>
+            <a:off x="167366" y="4028612"/>
             <a:ext cx="2488182" cy="307777"/>
           </a:xfrm>
           <a:prstGeom prst="rect">
@@ -25754,7 +25356,7 @@
         </p:nvSpPr>
         <p:spPr>
           <a:xfrm>
-            <a:off x="5094886" y="544632"/>
+            <a:off x="5094886" y="648798"/>
             <a:ext cx="2382768" cy="307777"/>
           </a:xfrm>
           <a:prstGeom prst="rect">
@@ -25805,7 +25407,7 @@
         </p:nvSpPr>
         <p:spPr>
           <a:xfrm>
-            <a:off x="203912" y="1001049"/>
+            <a:off x="203912" y="1105215"/>
             <a:ext cx="224742" cy="307777"/>
           </a:xfrm>
           <a:prstGeom prst="rect">
@@ -25840,7 +25442,7 @@
         </p:nvSpPr>
         <p:spPr>
           <a:xfrm>
-            <a:off x="1740522" y="4649526"/>
+            <a:off x="1740522" y="4481692"/>
             <a:ext cx="1989199" cy="307777"/>
           </a:xfrm>
           <a:prstGeom prst="rect">
@@ -25887,7 +25489,7 @@
         </p:nvSpPr>
         <p:spPr>
           <a:xfrm>
-            <a:off x="6101435" y="2211484"/>
+            <a:off x="4142605" y="2357713"/>
             <a:ext cx="2110939" cy="307777"/>
           </a:xfrm>
           <a:prstGeom prst="rect">
@@ -25907,30 +25509,14 @@
                   <a:srgbClr val="00B0F0"/>
                 </a:solidFill>
               </a:rPr>
-              <a:t>type &amp; assign (</a:t>
-            </a:r>
-            <a:r>
-              <a:rPr lang="en-US" sz="1400" dirty="0" err="1">
-                <a:solidFill>
-                  <a:srgbClr val="00B0F0"/>
-                </a:solidFill>
-              </a:rPr>
-              <a:t>oplsua</a:t>
-            </a:r>
-            <a:r>
-              <a:rPr lang="en-US" sz="1400" dirty="0">
-                <a:solidFill>
-                  <a:srgbClr val="00B0F0"/>
-                </a:solidFill>
-              </a:rPr>
-              <a:t>, </a:t>
-            </a:r>
-            <a:r>
-              <a:rPr lang="en-US" sz="1400" dirty="0" err="1">
-                <a:solidFill>
-                  <a:srgbClr val="00B0F0"/>
-                </a:solidFill>
-              </a:rPr>
+              <a:t>dynamic force field </a:t>
+            </a:r>
+            <a:r>
+              <a:rPr lang="en-US" sz="1400" dirty="0"/>
+              <a:t>(</a:t>
+            </a:r>
+            <a:r>
+              <a:rPr lang="en-US" sz="1400" dirty="0" err="1"/>
               <a:t>sw</a:t>
             </a:r>
             <a:r>
@@ -25954,7 +25540,7 @@
         </p:nvSpPr>
         <p:spPr>
           <a:xfrm>
-            <a:off x="7191485" y="3746582"/>
+            <a:off x="6214146" y="2359631"/>
             <a:ext cx="1370119" cy="307777"/>
           </a:xfrm>
           <a:prstGeom prst="rect">
@@ -26004,8 +25590,8 @@
         </p:nvSpPr>
         <p:spPr>
           <a:xfrm>
-            <a:off x="11005813" y="2272848"/>
-            <a:ext cx="1108609" cy="954107"/>
+            <a:off x="8893557" y="2566623"/>
+            <a:ext cx="2828998" cy="523220"/>
           </a:xfrm>
           <a:prstGeom prst="rect">
             <a:avLst/>
@@ -26024,29 +25610,7 @@
                   <a:srgbClr val="00B0F0"/>
                 </a:solidFill>
               </a:rPr>
-              <a:t>conformer</a:t>
-            </a:r>
-          </a:p>
-          <a:p>
-            <a:pPr algn="ctr"/>
-            <a:r>
-              <a:rPr lang="en-US" sz="1400" dirty="0">
-                <a:solidFill>
-                  <a:srgbClr val="00B0F0"/>
-                </a:solidFill>
-              </a:rPr>
-              <a:t>molecule</a:t>
-            </a:r>
-          </a:p>
-          <a:p>
-            <a:pPr algn="ctr"/>
-            <a:r>
-              <a:rPr lang="en-US" sz="1400" dirty="0">
-                <a:solidFill>
-                  <a:srgbClr val="00B0F0"/>
-                </a:solidFill>
-              </a:rPr>
-              <a:t>structure</a:t>
+              <a:t>conformer, molecule, structure</a:t>
             </a:r>
           </a:p>
           <a:p>
@@ -26072,7 +25636,7 @@
         </p:nvSpPr>
         <p:spPr>
           <a:xfrm>
-            <a:off x="6161977" y="2938690"/>
+            <a:off x="5069828" y="2777250"/>
             <a:ext cx="1974195" cy="307777"/>
           </a:xfrm>
           <a:prstGeom prst="rect">
@@ -26115,7 +25679,7 @@
         </p:nvSpPr>
         <p:spPr>
           <a:xfrm>
-            <a:off x="4919455" y="3333245"/>
+            <a:off x="5284052" y="3165411"/>
             <a:ext cx="1509837" cy="307777"/>
           </a:xfrm>
           <a:prstGeom prst="rect">
@@ -26162,7 +25726,7 @@
         </p:nvSpPr>
         <p:spPr>
           <a:xfrm>
-            <a:off x="4954329" y="3742854"/>
+            <a:off x="5087435" y="3575020"/>
             <a:ext cx="2347437" cy="307777"/>
           </a:xfrm>
           <a:prstGeom prst="rect">
@@ -26182,57 +25746,6 @@
             <a:r>
               <a:rPr lang="en-US" sz="1400" dirty="0" err="1"/>
               <a:t>structutils</a:t>
-            </a:r>
-            <a:r>
-              <a:rPr lang="en-US" sz="1400" dirty="0"/>
-              <a:t>)</a:t>
-            </a:r>
-          </a:p>
-        </p:txBody>
-      </p:sp>
-      <p:sp>
-        <p:nvSpPr>
-          <p:cNvPr id="30" name="TextBox 29">
-            <a:extLst>
-              <a:ext uri="{FF2B5EF4-FFF2-40B4-BE49-F238E27FC236}">
-                <a16:creationId xmlns:a16="http://schemas.microsoft.com/office/drawing/2014/main" id="{DAC948FC-462B-754D-9753-C9DD615D9B10}"/>
-              </a:ext>
-            </a:extLst>
-          </p:cNvPr>
-          <p:cNvSpPr txBox="1"/>
-          <p:nvPr/>
-        </p:nvSpPr>
-        <p:spPr>
-          <a:xfrm>
-            <a:off x="7946546" y="3336492"/>
-            <a:ext cx="1563057" cy="307777"/>
-          </a:xfrm>
-          <a:prstGeom prst="rect">
-            <a:avLst/>
-          </a:prstGeom>
-          <a:noFill/>
-        </p:spPr>
-        <p:txBody>
-          <a:bodyPr wrap="square" rtlCol="0">
-            <a:spAutoFit/>
-          </a:bodyPr>
-          <a:lstStyle/>
-          <a:p>
-            <a:r>
-              <a:rPr lang="en-US" sz="1400" dirty="0"/>
-              <a:t> </a:t>
-            </a:r>
-            <a:r>
-              <a:rPr lang="en-US" sz="1400" dirty="0" err="1"/>
-              <a:t>sw</a:t>
-            </a:r>
-            <a:r>
-              <a:rPr lang="en-US" sz="1400" dirty="0"/>
-              <a:t> data (</a:t>
-            </a:r>
-            <a:r>
-              <a:rPr lang="en-US" sz="1400" dirty="0" err="1"/>
-              <a:t>stillinger</a:t>
             </a:r>
             <a:r>
               <a:rPr lang="en-US" sz="1400" dirty="0"/>
@@ -26255,7 +25768,7 @@
         </p:nvSpPr>
         <p:spPr>
           <a:xfrm>
-            <a:off x="7169864" y="4183643"/>
+            <a:off x="7720528" y="2354934"/>
             <a:ext cx="1713033" cy="307777"/>
           </a:xfrm>
           <a:prstGeom prst="rect">
@@ -26313,7 +25826,7 @@
         </p:nvSpPr>
         <p:spPr>
           <a:xfrm>
-            <a:off x="2659577" y="4188434"/>
+            <a:off x="2659577" y="4020600"/>
             <a:ext cx="1614994" cy="307777"/>
           </a:xfrm>
           <a:prstGeom prst="rect">
@@ -26355,7 +25868,7 @@
         </p:nvSpPr>
         <p:spPr>
           <a:xfrm>
-            <a:off x="3829888" y="4659429"/>
+            <a:off x="3858823" y="4491595"/>
             <a:ext cx="1111394" cy="307777"/>
           </a:xfrm>
           <a:prstGeom prst="rect">
@@ -26389,7 +25902,7 @@
         </p:nvSpPr>
         <p:spPr>
           <a:xfrm>
-            <a:off x="3456996" y="3747543"/>
+            <a:off x="3590104" y="3579709"/>
             <a:ext cx="1209242" cy="307777"/>
           </a:xfrm>
           <a:prstGeom prst="rect">
@@ -26431,7 +25944,7 @@
         </p:nvSpPr>
         <p:spPr>
           <a:xfrm>
-            <a:off x="1708327" y="3746057"/>
+            <a:off x="1708327" y="3578223"/>
             <a:ext cx="1916807" cy="307777"/>
           </a:xfrm>
           <a:prstGeom prst="rect">
@@ -26481,7 +25994,7 @@
         </p:nvSpPr>
         <p:spPr>
           <a:xfrm>
-            <a:off x="2791170" y="3325769"/>
+            <a:off x="2924278" y="3157935"/>
             <a:ext cx="1952201" cy="307777"/>
           </a:xfrm>
           <a:prstGeom prst="rect">
@@ -26515,7 +26028,7 @@
         </p:nvSpPr>
         <p:spPr>
           <a:xfrm>
-            <a:off x="1447031" y="3333244"/>
+            <a:off x="1447031" y="3165410"/>
             <a:ext cx="1337097" cy="307777"/>
           </a:xfrm>
           <a:prstGeom prst="rect">
@@ -26547,40 +26060,6 @@
             <a:r>
               <a:rPr lang="en-US" sz="1400" dirty="0"/>
               <a:t>) </a:t>
-            </a:r>
-          </a:p>
-        </p:txBody>
-      </p:sp>
-      <p:sp>
-        <p:nvSpPr>
-          <p:cNvPr id="31" name="Rectangle 30">
-            <a:extLst>
-              <a:ext uri="{FF2B5EF4-FFF2-40B4-BE49-F238E27FC236}">
-                <a16:creationId xmlns:a16="http://schemas.microsoft.com/office/drawing/2014/main" id="{FE968D6B-323C-314E-B6DF-80413BCDFF2F}"/>
-              </a:ext>
-            </a:extLst>
-          </p:cNvPr>
-          <p:cNvSpPr/>
-          <p:nvPr/>
-        </p:nvSpPr>
-        <p:spPr>
-          <a:xfrm>
-            <a:off x="6198556" y="2576941"/>
-            <a:ext cx="1827744" cy="307777"/>
-          </a:xfrm>
-          <a:prstGeom prst="rect">
-            <a:avLst/>
-          </a:prstGeom>
-        </p:spPr>
-        <p:txBody>
-          <a:bodyPr wrap="none">
-            <a:spAutoFit/>
-          </a:bodyPr>
-          <a:lstStyle/>
-          <a:p>
-            <a:r>
-              <a:rPr lang="en-US" sz="1400" dirty="0"/>
-              <a:t>force fields (forcefield)</a:t>
             </a:r>
           </a:p>
         </p:txBody>
@@ -26599,8 +26078,8 @@
         </p:nvSpPr>
         <p:spPr>
           <a:xfrm>
-            <a:off x="10070536" y="990672"/>
-            <a:ext cx="1969479" cy="924967"/>
+            <a:off x="10070536" y="1094839"/>
+            <a:ext cx="1969479" cy="811220"/>
           </a:xfrm>
           <a:prstGeom prst="roundRect">
             <a:avLst/>
@@ -26736,7 +26215,7 @@
         </p:nvSpPr>
         <p:spPr>
           <a:xfrm>
-            <a:off x="153437" y="4634949"/>
+            <a:off x="153437" y="4467115"/>
             <a:ext cx="1628459" cy="307777"/>
           </a:xfrm>
           <a:prstGeom prst="rect">
@@ -26791,7 +26270,7 @@
         </p:nvCxnSpPr>
         <p:spPr>
           <a:xfrm>
-            <a:off x="5841811" y="827427"/>
+            <a:off x="5841811" y="931593"/>
             <a:ext cx="0" cy="148640"/>
           </a:xfrm>
           <a:prstGeom prst="straightConnector1">
@@ -26835,7 +26314,7 @@
         </p:nvCxnSpPr>
         <p:spPr>
           <a:xfrm>
-            <a:off x="9860044" y="1469142"/>
+            <a:off x="9860044" y="1573308"/>
             <a:ext cx="182880" cy="0"/>
           </a:xfrm>
           <a:prstGeom prst="straightConnector1">
@@ -26877,7 +26356,7 @@
         </p:nvCxnSpPr>
         <p:spPr>
           <a:xfrm>
-            <a:off x="1045805" y="1369491"/>
+            <a:off x="1045805" y="1473657"/>
             <a:ext cx="0" cy="148640"/>
           </a:xfrm>
           <a:prstGeom prst="straightConnector1">
@@ -26919,7 +26398,7 @@
         </p:nvSpPr>
         <p:spPr>
           <a:xfrm>
-            <a:off x="2527302" y="713925"/>
+            <a:off x="2527302" y="818091"/>
             <a:ext cx="2107693" cy="307777"/>
           </a:xfrm>
           <a:prstGeom prst="rect">
@@ -26958,7 +26437,7 @@
         </p:nvSpPr>
         <p:spPr>
           <a:xfrm>
-            <a:off x="10062762" y="712439"/>
+            <a:off x="10062762" y="816605"/>
             <a:ext cx="1373196" cy="307777"/>
           </a:xfrm>
           <a:prstGeom prst="rect">
@@ -26997,7 +26476,7 @@
         </p:nvSpPr>
         <p:spPr>
           <a:xfrm>
-            <a:off x="5127350" y="352076"/>
+            <a:off x="5127350" y="456242"/>
             <a:ext cx="841834" cy="307777"/>
           </a:xfrm>
           <a:prstGeom prst="rect">
@@ -27038,7 +26517,7 @@
         </p:nvCxnSpPr>
         <p:spPr>
           <a:xfrm flipH="1">
-            <a:off x="2313276" y="1469142"/>
+            <a:off x="2313276" y="1573308"/>
             <a:ext cx="182880" cy="0"/>
           </a:xfrm>
           <a:prstGeom prst="straightConnector1">
@@ -27080,7 +26559,7 @@
         </p:nvSpPr>
         <p:spPr>
           <a:xfrm>
-            <a:off x="171251" y="713925"/>
+            <a:off x="171251" y="818091"/>
             <a:ext cx="840295" cy="307777"/>
           </a:xfrm>
           <a:prstGeom prst="rect">
@@ -27105,50 +26584,6 @@
           </a:p>
         </p:txBody>
       </p:sp>
-      <p:cxnSp>
-        <p:nvCxnSpPr>
-          <p:cNvPr id="51" name="Straight Arrow Connector 50">
-            <a:extLst>
-              <a:ext uri="{FF2B5EF4-FFF2-40B4-BE49-F238E27FC236}">
-                <a16:creationId xmlns:a16="http://schemas.microsoft.com/office/drawing/2014/main" id="{4697AD97-2476-1342-B225-591341AC3CBD}"/>
-              </a:ext>
-            </a:extLst>
-          </p:cNvPr>
-          <p:cNvCxnSpPr>
-            <a:cxnSpLocks/>
-          </p:cNvCxnSpPr>
-          <p:nvPr/>
-        </p:nvCxnSpPr>
-        <p:spPr>
-          <a:xfrm>
-            <a:off x="6844124" y="2501701"/>
-            <a:ext cx="0" cy="109987"/>
-          </a:xfrm>
-          <a:prstGeom prst="straightConnector1">
-            <a:avLst/>
-          </a:prstGeom>
-          <a:ln>
-            <a:solidFill>
-              <a:schemeClr val="accent1"/>
-            </a:solidFill>
-            <a:tailEnd type="stealth"/>
-          </a:ln>
-        </p:spPr>
-        <p:style>
-          <a:lnRef idx="1">
-            <a:schemeClr val="accent1"/>
-          </a:lnRef>
-          <a:fillRef idx="0">
-            <a:schemeClr val="accent1"/>
-          </a:fillRef>
-          <a:effectRef idx="0">
-            <a:schemeClr val="accent1"/>
-          </a:effectRef>
-          <a:fontRef idx="minor">
-            <a:schemeClr val="tx1"/>
-          </a:fontRef>
-        </p:style>
-      </p:cxnSp>
       <p:cxnSp>
         <p:nvCxnSpPr>
           <p:cNvPr id="52" name="Straight Arrow Connector 51">
@@ -27165,7 +26600,7 @@
         </p:nvCxnSpPr>
         <p:spPr>
           <a:xfrm>
-            <a:off x="3703324" y="3209066"/>
+            <a:off x="3836432" y="3041232"/>
             <a:ext cx="0" cy="161927"/>
           </a:xfrm>
           <a:prstGeom prst="straightConnector1">
@@ -27207,7 +26642,7 @@
         </p:nvSpPr>
         <p:spPr>
           <a:xfrm>
-            <a:off x="9192708" y="3749636"/>
+            <a:off x="8390972" y="3175905"/>
             <a:ext cx="2150525" cy="307777"/>
           </a:xfrm>
           <a:prstGeom prst="rect">
@@ -27249,7 +26684,7 @@
         </p:nvSpPr>
         <p:spPr>
           <a:xfrm>
-            <a:off x="10729712" y="4191867"/>
+            <a:off x="10660262" y="4024033"/>
             <a:ext cx="1378070" cy="307777"/>
           </a:xfrm>
           <a:prstGeom prst="rect">
@@ -27283,7 +26718,7 @@
         </p:nvSpPr>
         <p:spPr>
           <a:xfrm>
-            <a:off x="4989508" y="4191752"/>
+            <a:off x="5122614" y="4023918"/>
             <a:ext cx="1705916" cy="307777"/>
           </a:xfrm>
           <a:prstGeom prst="rect">
@@ -27333,7 +26768,7 @@
         </p:nvSpPr>
         <p:spPr>
           <a:xfrm>
-            <a:off x="10960224" y="3337431"/>
+            <a:off x="10631839" y="3175426"/>
             <a:ext cx="1094980" cy="307777"/>
           </a:xfrm>
           <a:prstGeom prst="rect">
@@ -27377,8 +26812,8 @@
         </p:nvCxnSpPr>
         <p:spPr>
           <a:xfrm>
-            <a:off x="11968524" y="3262874"/>
-            <a:ext cx="0" cy="920769"/>
+            <a:off x="11662157" y="2942403"/>
+            <a:ext cx="0" cy="991954"/>
           </a:xfrm>
           <a:prstGeom prst="straightConnector1">
             <a:avLst/>
@@ -27421,7 +26856,7 @@
         </p:nvCxnSpPr>
         <p:spPr>
           <a:xfrm rot="16200000" flipH="1" flipV="1">
-            <a:off x="11279928" y="3334974"/>
+            <a:off x="10961623" y="3028246"/>
             <a:ext cx="155044" cy="805"/>
           </a:xfrm>
           <a:prstGeom prst="straightConnector1">
@@ -27464,9 +26899,9 @@
           <p:nvPr/>
         </p:nvCxnSpPr>
         <p:spPr>
-          <a:xfrm>
-            <a:off x="8182834" y="3113590"/>
-            <a:ext cx="2865726" cy="0"/>
+          <a:xfrm flipV="1">
+            <a:off x="7022424" y="2943128"/>
+            <a:ext cx="2779813" cy="1"/>
           </a:xfrm>
           <a:prstGeom prst="line">
             <a:avLst/>
@@ -27506,7 +26941,7 @@
         </p:nvCxnSpPr>
         <p:spPr>
           <a:xfrm>
-            <a:off x="5388921" y="3268525"/>
+            <a:off x="5753518" y="3100691"/>
             <a:ext cx="3214016" cy="0"/>
           </a:xfrm>
           <a:prstGeom prst="line">
@@ -27544,7 +26979,7 @@
         </p:nvCxnSpPr>
         <p:spPr>
           <a:xfrm flipH="1">
-            <a:off x="8605348" y="3270701"/>
+            <a:off x="8969945" y="3102867"/>
             <a:ext cx="598" cy="109728"/>
           </a:xfrm>
           <a:prstGeom prst="straightConnector1">
@@ -27588,7 +27023,7 @@
         </p:nvCxnSpPr>
         <p:spPr>
           <a:xfrm flipH="1">
-            <a:off x="5388922" y="3269279"/>
+            <a:off x="5753519" y="3101445"/>
             <a:ext cx="598" cy="109728"/>
           </a:xfrm>
           <a:prstGeom prst="straightConnector1">
@@ -27632,7 +27067,7 @@
         </p:nvCxnSpPr>
         <p:spPr>
           <a:xfrm>
-            <a:off x="6841361" y="3205065"/>
+            <a:off x="5753652" y="3037231"/>
             <a:ext cx="0" cy="64008"/>
           </a:xfrm>
           <a:prstGeom prst="straightConnector1">
@@ -27677,7 +27112,7 @@
         </p:nvCxnSpPr>
         <p:spPr>
           <a:xfrm>
-            <a:off x="5379276" y="3643371"/>
+            <a:off x="5755449" y="3475537"/>
             <a:ext cx="0" cy="161927"/>
           </a:xfrm>
           <a:prstGeom prst="straightConnector1">
@@ -27688,134 +27123,6 @@
               <a:schemeClr val="accent1"/>
             </a:solidFill>
             <a:tailEnd type="stealth"/>
-          </a:ln>
-        </p:spPr>
-        <p:style>
-          <a:lnRef idx="1">
-            <a:schemeClr val="accent1"/>
-          </a:lnRef>
-          <a:fillRef idx="0">
-            <a:schemeClr val="accent1"/>
-          </a:fillRef>
-          <a:effectRef idx="0">
-            <a:schemeClr val="accent1"/>
-          </a:effectRef>
-          <a:fontRef idx="minor">
-            <a:schemeClr val="tx1"/>
-          </a:fontRef>
-        </p:style>
-      </p:cxnSp>
-      <p:cxnSp>
-        <p:nvCxnSpPr>
-          <p:cNvPr id="110" name="Straight Connector 109">
-            <a:extLst>
-              <a:ext uri="{FF2B5EF4-FFF2-40B4-BE49-F238E27FC236}">
-                <a16:creationId xmlns:a16="http://schemas.microsoft.com/office/drawing/2014/main" id="{FFA627E8-B105-754C-B3B5-F71A0BC79912}"/>
-              </a:ext>
-            </a:extLst>
-          </p:cNvPr>
-          <p:cNvCxnSpPr>
-            <a:cxnSpLocks/>
-          </p:cNvCxnSpPr>
-          <p:nvPr/>
-        </p:nvCxnSpPr>
-        <p:spPr>
-          <a:xfrm>
-            <a:off x="8685274" y="3701116"/>
-            <a:ext cx="2668526" cy="0"/>
-          </a:xfrm>
-          <a:prstGeom prst="line">
-            <a:avLst/>
-          </a:prstGeom>
-        </p:spPr>
-        <p:style>
-          <a:lnRef idx="1">
-            <a:schemeClr val="accent1"/>
-          </a:lnRef>
-          <a:fillRef idx="0">
-            <a:schemeClr val="accent1"/>
-          </a:fillRef>
-          <a:effectRef idx="0">
-            <a:schemeClr val="accent1"/>
-          </a:effectRef>
-          <a:fontRef idx="minor">
-            <a:schemeClr val="tx1"/>
-          </a:fontRef>
-        </p:style>
-      </p:cxnSp>
-      <p:cxnSp>
-        <p:nvCxnSpPr>
-          <p:cNvPr id="111" name="Straight Arrow Connector 110">
-            <a:extLst>
-              <a:ext uri="{FF2B5EF4-FFF2-40B4-BE49-F238E27FC236}">
-                <a16:creationId xmlns:a16="http://schemas.microsoft.com/office/drawing/2014/main" id="{967589FD-AD7D-794F-A692-026751B959B4}"/>
-              </a:ext>
-            </a:extLst>
-          </p:cNvPr>
-          <p:cNvCxnSpPr>
-            <a:cxnSpLocks/>
-          </p:cNvCxnSpPr>
-          <p:nvPr/>
-        </p:nvCxnSpPr>
-        <p:spPr>
-          <a:xfrm>
-            <a:off x="8685274" y="3636316"/>
-            <a:ext cx="0" cy="64008"/>
-          </a:xfrm>
-          <a:prstGeom prst="straightConnector1">
-            <a:avLst/>
-          </a:prstGeom>
-          <a:ln>
-            <a:solidFill>
-              <a:schemeClr val="accent1"/>
-            </a:solidFill>
-            <a:headEnd type="none" w="med" len="med"/>
-            <a:tailEnd type="none" w="med" len="med"/>
-          </a:ln>
-        </p:spPr>
-        <p:style>
-          <a:lnRef idx="1">
-            <a:schemeClr val="accent1"/>
-          </a:lnRef>
-          <a:fillRef idx="0">
-            <a:schemeClr val="accent1"/>
-          </a:fillRef>
-          <a:effectRef idx="0">
-            <a:schemeClr val="accent1"/>
-          </a:effectRef>
-          <a:fontRef idx="minor">
-            <a:schemeClr val="tx1"/>
-          </a:fontRef>
-        </p:style>
-      </p:cxnSp>
-      <p:cxnSp>
-        <p:nvCxnSpPr>
-          <p:cNvPr id="112" name="Straight Arrow Connector 111">
-            <a:extLst>
-              <a:ext uri="{FF2B5EF4-FFF2-40B4-BE49-F238E27FC236}">
-                <a16:creationId xmlns:a16="http://schemas.microsoft.com/office/drawing/2014/main" id="{8E3DE2A6-655F-CB4B-B973-CA4473783585}"/>
-              </a:ext>
-            </a:extLst>
-          </p:cNvPr>
-          <p:cNvCxnSpPr>
-            <a:cxnSpLocks/>
-          </p:cNvCxnSpPr>
-          <p:nvPr/>
-        </p:nvCxnSpPr>
-        <p:spPr>
-          <a:xfrm>
-            <a:off x="10018828" y="3637913"/>
-            <a:ext cx="0" cy="64008"/>
-          </a:xfrm>
-          <a:prstGeom prst="straightConnector1">
-            <a:avLst/>
-          </a:prstGeom>
-          <a:ln>
-            <a:solidFill>
-              <a:schemeClr val="accent1"/>
-            </a:solidFill>
-            <a:headEnd type="none" w="med" len="med"/>
-            <a:tailEnd type="none" w="med" len="med"/>
           </a:ln>
         </p:spPr>
         <p:style>
@@ -27848,9 +27155,9 @@
           <p:nvPr/>
         </p:nvCxnSpPr>
         <p:spPr>
-          <a:xfrm flipH="1">
-            <a:off x="10018499" y="3704963"/>
-            <a:ext cx="598" cy="109728"/>
+          <a:xfrm flipV="1">
+            <a:off x="8970478" y="3474609"/>
+            <a:ext cx="0" cy="132163"/>
           </a:xfrm>
           <a:prstGeom prst="straightConnector1">
             <a:avLst/>
@@ -27893,7 +27200,7 @@
         </p:nvCxnSpPr>
         <p:spPr>
           <a:xfrm>
-            <a:off x="5379276" y="4051463"/>
+            <a:off x="5755449" y="3883629"/>
             <a:ext cx="0" cy="161927"/>
           </a:xfrm>
           <a:prstGeom prst="straightConnector1">
@@ -27937,7 +27244,7 @@
         </p:nvCxnSpPr>
         <p:spPr>
           <a:xfrm flipH="1">
-            <a:off x="11353800" y="3262874"/>
+            <a:off x="11036224" y="2939830"/>
             <a:ext cx="614724" cy="3130"/>
           </a:xfrm>
           <a:prstGeom prst="line">
@@ -27975,7 +27282,7 @@
         </p:nvCxnSpPr>
         <p:spPr>
           <a:xfrm rot="10800000">
-            <a:off x="11667097" y="3204611"/>
+            <a:off x="11348792" y="2880521"/>
             <a:ext cx="0" cy="64008"/>
           </a:xfrm>
           <a:prstGeom prst="straightConnector1">
@@ -28020,8 +27327,8 @@
         </p:nvCxnSpPr>
         <p:spPr>
           <a:xfrm flipH="1">
-            <a:off x="4800044" y="3111201"/>
-            <a:ext cx="1205632" cy="0"/>
+            <a:off x="4818056" y="2943926"/>
+            <a:ext cx="182880" cy="0"/>
           </a:xfrm>
           <a:prstGeom prst="line">
             <a:avLst/>
@@ -28059,7 +27366,7 @@
         </p:nvSpPr>
         <p:spPr>
           <a:xfrm>
-            <a:off x="2794176" y="2960748"/>
+            <a:off x="2927284" y="2792914"/>
             <a:ext cx="1937646" cy="307777"/>
           </a:xfrm>
           <a:prstGeom prst="rect">
@@ -28097,50 +27404,6 @@
       </p:sp>
       <p:cxnSp>
         <p:nvCxnSpPr>
-          <p:cNvPr id="138" name="Straight Arrow Connector 137">
-            <a:extLst>
-              <a:ext uri="{FF2B5EF4-FFF2-40B4-BE49-F238E27FC236}">
-                <a16:creationId xmlns:a16="http://schemas.microsoft.com/office/drawing/2014/main" id="{21D6DE39-900F-A642-8879-3312DC9805EE}"/>
-              </a:ext>
-            </a:extLst>
-          </p:cNvPr>
-          <p:cNvCxnSpPr>
-            <a:cxnSpLocks/>
-          </p:cNvCxnSpPr>
-          <p:nvPr/>
-        </p:nvCxnSpPr>
-        <p:spPr>
-          <a:xfrm rot="5400000" flipH="1">
-            <a:off x="7956101" y="3433923"/>
-            <a:ext cx="598" cy="109728"/>
-          </a:xfrm>
-          <a:prstGeom prst="straightConnector1">
-            <a:avLst/>
-          </a:prstGeom>
-          <a:ln>
-            <a:solidFill>
-              <a:schemeClr val="accent1"/>
-            </a:solidFill>
-            <a:tailEnd type="stealth"/>
-          </a:ln>
-        </p:spPr>
-        <p:style>
-          <a:lnRef idx="1">
-            <a:schemeClr val="accent1"/>
-          </a:lnRef>
-          <a:fillRef idx="0">
-            <a:schemeClr val="accent1"/>
-          </a:fillRef>
-          <a:effectRef idx="0">
-            <a:schemeClr val="accent1"/>
-          </a:effectRef>
-          <a:fontRef idx="minor">
-            <a:schemeClr val="tx1"/>
-          </a:fontRef>
-        </p:style>
-      </p:cxnSp>
-      <p:cxnSp>
-        <p:nvCxnSpPr>
           <p:cNvPr id="139" name="Straight Arrow Connector 138">
             <a:extLst>
               <a:ext uri="{FF2B5EF4-FFF2-40B4-BE49-F238E27FC236}">
@@ -28150,57 +27413,14 @@
           </p:cNvPr>
           <p:cNvCxnSpPr>
             <a:cxnSpLocks/>
-          </p:cNvCxnSpPr>
-          <p:nvPr/>
-        </p:nvCxnSpPr>
-        <p:spPr>
-          <a:xfrm rot="16200000" flipH="1">
-            <a:off x="6432430" y="3435815"/>
-            <a:ext cx="598" cy="109728"/>
-          </a:xfrm>
-          <a:prstGeom prst="straightConnector1">
-            <a:avLst/>
-          </a:prstGeom>
-          <a:ln>
-            <a:solidFill>
-              <a:schemeClr val="accent1"/>
-            </a:solidFill>
-            <a:tailEnd type="stealth"/>
-          </a:ln>
-        </p:spPr>
-        <p:style>
-          <a:lnRef idx="1">
-            <a:schemeClr val="accent1"/>
-          </a:lnRef>
-          <a:fillRef idx="0">
-            <a:schemeClr val="accent1"/>
-          </a:fillRef>
-          <a:effectRef idx="0">
-            <a:schemeClr val="accent1"/>
-          </a:effectRef>
-          <a:fontRef idx="minor">
-            <a:schemeClr val="tx1"/>
-          </a:fontRef>
-        </p:style>
-      </p:cxnSp>
-      <p:cxnSp>
-        <p:nvCxnSpPr>
-          <p:cNvPr id="140" name="Straight Arrow Connector 139">
-            <a:extLst>
-              <a:ext uri="{FF2B5EF4-FFF2-40B4-BE49-F238E27FC236}">
-                <a16:creationId xmlns:a16="http://schemas.microsoft.com/office/drawing/2014/main" id="{0B588961-8B60-BB4C-AC94-F82CAB6C540E}"/>
-              </a:ext>
-            </a:extLst>
-          </p:cNvPr>
-          <p:cNvCxnSpPr>
-            <a:cxnSpLocks/>
+            <a:stCxn id="27" idx="3"/>
           </p:cNvCxnSpPr>
           <p:nvPr/>
         </p:nvCxnSpPr>
         <p:spPr>
           <a:xfrm>
-            <a:off x="7575233" y="4075054"/>
-            <a:ext cx="0" cy="161927"/>
+            <a:off x="6793889" y="3319300"/>
+            <a:ext cx="150894" cy="3844"/>
           </a:xfrm>
           <a:prstGeom prst="straightConnector1">
             <a:avLst/>
@@ -28241,7 +27461,7 @@
         </p:nvSpPr>
         <p:spPr>
           <a:xfrm>
-            <a:off x="6467858" y="3343065"/>
+            <a:off x="6999236" y="3175231"/>
             <a:ext cx="1497562" cy="307777"/>
           </a:xfrm>
           <a:prstGeom prst="rect">
@@ -28293,7 +27513,7 @@
         </p:nvCxnSpPr>
         <p:spPr>
           <a:xfrm flipH="1" flipV="1">
-            <a:off x="4818581" y="3302702"/>
+            <a:off x="4823805" y="3134868"/>
             <a:ext cx="227042" cy="441816"/>
           </a:xfrm>
           <a:prstGeom prst="line">
@@ -28334,8 +27554,8 @@
         </p:nvCxnSpPr>
         <p:spPr>
           <a:xfrm>
-            <a:off x="4864641" y="3901861"/>
-            <a:ext cx="168999" cy="0"/>
+            <a:off x="4818712" y="3734027"/>
+            <a:ext cx="182880" cy="0"/>
           </a:xfrm>
           <a:prstGeom prst="straightConnector1">
             <a:avLst/>
@@ -28345,177 +27565,6 @@
               <a:schemeClr val="accent1"/>
             </a:solidFill>
             <a:tailEnd type="stealth"/>
-          </a:ln>
-        </p:spPr>
-        <p:style>
-          <a:lnRef idx="1">
-            <a:schemeClr val="accent1"/>
-          </a:lnRef>
-          <a:fillRef idx="0">
-            <a:schemeClr val="accent1"/>
-          </a:fillRef>
-          <a:effectRef idx="0">
-            <a:schemeClr val="accent1"/>
-          </a:effectRef>
-          <a:fontRef idx="minor">
-            <a:schemeClr val="tx1"/>
-          </a:fontRef>
-        </p:style>
-      </p:cxnSp>
-      <p:cxnSp>
-        <p:nvCxnSpPr>
-          <p:cNvPr id="162" name="Straight Connector 161">
-            <a:extLst>
-              <a:ext uri="{FF2B5EF4-FFF2-40B4-BE49-F238E27FC236}">
-                <a16:creationId xmlns:a16="http://schemas.microsoft.com/office/drawing/2014/main" id="{28F3566E-4891-CD40-A5DF-2B4AAF4101E4}"/>
-              </a:ext>
-            </a:extLst>
-          </p:cNvPr>
-          <p:cNvCxnSpPr>
-            <a:cxnSpLocks/>
-          </p:cNvCxnSpPr>
-          <p:nvPr/>
-        </p:nvCxnSpPr>
-        <p:spPr>
-          <a:xfrm flipV="1">
-            <a:off x="5529469" y="3742854"/>
-            <a:ext cx="2994576" cy="3203"/>
-          </a:xfrm>
-          <a:prstGeom prst="line">
-            <a:avLst/>
-          </a:prstGeom>
-        </p:spPr>
-        <p:style>
-          <a:lnRef idx="1">
-            <a:schemeClr val="accent1"/>
-          </a:lnRef>
-          <a:fillRef idx="0">
-            <a:schemeClr val="accent1"/>
-          </a:fillRef>
-          <a:effectRef idx="0">
-            <a:schemeClr val="accent1"/>
-          </a:effectRef>
-          <a:fontRef idx="minor">
-            <a:schemeClr val="tx1"/>
-          </a:fontRef>
-        </p:style>
-      </p:cxnSp>
-      <p:cxnSp>
-        <p:nvCxnSpPr>
-          <p:cNvPr id="163" name="Straight Arrow Connector 162">
-            <a:extLst>
-              <a:ext uri="{FF2B5EF4-FFF2-40B4-BE49-F238E27FC236}">
-                <a16:creationId xmlns:a16="http://schemas.microsoft.com/office/drawing/2014/main" id="{B5EE8B01-B3B5-D047-8C7E-BD87FA6084EE}"/>
-              </a:ext>
-            </a:extLst>
-          </p:cNvPr>
-          <p:cNvCxnSpPr>
-            <a:cxnSpLocks/>
-          </p:cNvCxnSpPr>
-          <p:nvPr/>
-        </p:nvCxnSpPr>
-        <p:spPr>
-          <a:xfrm rot="10800000" flipH="1">
-            <a:off x="5529469" y="3628759"/>
-            <a:ext cx="598" cy="109728"/>
-          </a:xfrm>
-          <a:prstGeom prst="straightConnector1">
-            <a:avLst/>
-          </a:prstGeom>
-          <a:ln>
-            <a:solidFill>
-              <a:schemeClr val="accent1"/>
-            </a:solidFill>
-            <a:tailEnd type="stealth"/>
-          </a:ln>
-        </p:spPr>
-        <p:style>
-          <a:lnRef idx="1">
-            <a:schemeClr val="accent1"/>
-          </a:lnRef>
-          <a:fillRef idx="0">
-            <a:schemeClr val="accent1"/>
-          </a:fillRef>
-          <a:effectRef idx="0">
-            <a:schemeClr val="accent1"/>
-          </a:effectRef>
-          <a:fontRef idx="minor">
-            <a:schemeClr val="tx1"/>
-          </a:fontRef>
-        </p:style>
-      </p:cxnSp>
-      <p:cxnSp>
-        <p:nvCxnSpPr>
-          <p:cNvPr id="164" name="Straight Arrow Connector 163">
-            <a:extLst>
-              <a:ext uri="{FF2B5EF4-FFF2-40B4-BE49-F238E27FC236}">
-                <a16:creationId xmlns:a16="http://schemas.microsoft.com/office/drawing/2014/main" id="{94A83404-54BB-5945-A56E-C7164E27DC79}"/>
-              </a:ext>
-            </a:extLst>
-          </p:cNvPr>
-          <p:cNvCxnSpPr>
-            <a:cxnSpLocks/>
-          </p:cNvCxnSpPr>
-          <p:nvPr/>
-        </p:nvCxnSpPr>
-        <p:spPr>
-          <a:xfrm rot="10800000" flipH="1">
-            <a:off x="8528478" y="3628883"/>
-            <a:ext cx="598" cy="109728"/>
-          </a:xfrm>
-          <a:prstGeom prst="straightConnector1">
-            <a:avLst/>
-          </a:prstGeom>
-          <a:ln>
-            <a:solidFill>
-              <a:schemeClr val="accent1"/>
-            </a:solidFill>
-            <a:tailEnd type="stealth"/>
-          </a:ln>
-        </p:spPr>
-        <p:style>
-          <a:lnRef idx="1">
-            <a:schemeClr val="accent1"/>
-          </a:lnRef>
-          <a:fillRef idx="0">
-            <a:schemeClr val="accent1"/>
-          </a:fillRef>
-          <a:effectRef idx="0">
-            <a:schemeClr val="accent1"/>
-          </a:effectRef>
-          <a:fontRef idx="minor">
-            <a:schemeClr val="tx1"/>
-          </a:fontRef>
-        </p:style>
-      </p:cxnSp>
-      <p:cxnSp>
-        <p:nvCxnSpPr>
-          <p:cNvPr id="166" name="Straight Arrow Connector 165">
-            <a:extLst>
-              <a:ext uri="{FF2B5EF4-FFF2-40B4-BE49-F238E27FC236}">
-                <a16:creationId xmlns:a16="http://schemas.microsoft.com/office/drawing/2014/main" id="{FE017328-8507-6344-918D-CB3EA1E05C72}"/>
-              </a:ext>
-            </a:extLst>
-          </p:cNvPr>
-          <p:cNvCxnSpPr>
-            <a:cxnSpLocks/>
-          </p:cNvCxnSpPr>
-          <p:nvPr/>
-        </p:nvCxnSpPr>
-        <p:spPr>
-          <a:xfrm>
-            <a:off x="7575233" y="3739867"/>
-            <a:ext cx="0" cy="64008"/>
-          </a:xfrm>
-          <a:prstGeom prst="straightConnector1">
-            <a:avLst/>
-          </a:prstGeom>
-          <a:ln>
-            <a:solidFill>
-              <a:schemeClr val="accent1"/>
-            </a:solidFill>
-            <a:headEnd type="none" w="med" len="med"/>
-            <a:tailEnd type="none" w="med" len="med"/>
           </a:ln>
         </p:spPr>
         <p:style>
@@ -28549,7 +27598,7 @@
         </p:nvCxnSpPr>
         <p:spPr>
           <a:xfrm rot="5400000" flipH="1">
-            <a:off x="2749419" y="3433531"/>
+            <a:off x="2801503" y="3265697"/>
             <a:ext cx="598" cy="109728"/>
           </a:xfrm>
           <a:prstGeom prst="straightConnector1">
@@ -28593,7 +27642,7 @@
         </p:nvCxnSpPr>
         <p:spPr>
           <a:xfrm>
-            <a:off x="3701244" y="3610636"/>
+            <a:off x="3834352" y="3442802"/>
             <a:ext cx="0" cy="161927"/>
           </a:xfrm>
           <a:prstGeom prst="straightConnector1">
@@ -28637,7 +27686,7 @@
         </p:nvCxnSpPr>
         <p:spPr>
           <a:xfrm flipV="1">
-            <a:off x="2300222" y="4079043"/>
+            <a:off x="2300222" y="3911209"/>
             <a:ext cx="1401022" cy="906"/>
           </a:xfrm>
           <a:prstGeom prst="line">
@@ -28675,7 +27724,7 @@
         </p:nvCxnSpPr>
         <p:spPr>
           <a:xfrm>
-            <a:off x="2297963" y="4015149"/>
+            <a:off x="2297963" y="3847315"/>
             <a:ext cx="0" cy="64008"/>
           </a:xfrm>
           <a:prstGeom prst="straightConnector1">
@@ -28720,7 +27769,7 @@
         </p:nvCxnSpPr>
         <p:spPr>
           <a:xfrm>
-            <a:off x="3694717" y="4016746"/>
+            <a:off x="3694717" y="3848912"/>
             <a:ext cx="0" cy="64008"/>
           </a:xfrm>
           <a:prstGeom prst="straightConnector1">
@@ -28765,7 +27814,7 @@
         </p:nvCxnSpPr>
         <p:spPr>
           <a:xfrm flipH="1">
-            <a:off x="3033988" y="4087382"/>
+            <a:off x="3033988" y="3919548"/>
             <a:ext cx="598" cy="109728"/>
           </a:xfrm>
           <a:prstGeom prst="straightConnector1">
@@ -28808,9 +27857,9 @@
           <p:nvPr/>
         </p:nvCxnSpPr>
         <p:spPr>
-          <a:xfrm>
-            <a:off x="5362825" y="4597056"/>
-            <a:ext cx="6598864" cy="0"/>
+          <a:xfrm flipV="1">
+            <a:off x="5733211" y="4429222"/>
+            <a:ext cx="5911221" cy="5297"/>
           </a:xfrm>
           <a:prstGeom prst="line">
             <a:avLst/>
@@ -28847,7 +27896,7 @@
         </p:nvCxnSpPr>
         <p:spPr>
           <a:xfrm rot="10800000" flipH="1">
-            <a:off x="5362826" y="4492624"/>
+            <a:off x="5738999" y="4324790"/>
             <a:ext cx="598" cy="109728"/>
           </a:xfrm>
           <a:prstGeom prst="straightConnector1">
@@ -28891,7 +27940,7 @@
         </p:nvCxnSpPr>
         <p:spPr>
           <a:xfrm>
-            <a:off x="11961689" y="4532798"/>
+            <a:off x="11643384" y="4364964"/>
             <a:ext cx="0" cy="64008"/>
           </a:xfrm>
           <a:prstGeom prst="straightConnector1">
@@ -28936,7 +27985,7 @@
         </p:nvCxnSpPr>
         <p:spPr>
           <a:xfrm>
-            <a:off x="6846772" y="2875233"/>
+            <a:off x="5761335" y="2680813"/>
             <a:ext cx="0" cy="109987"/>
           </a:xfrm>
           <a:prstGeom prst="straightConnector1">
@@ -28980,7 +28029,7 @@
         </p:nvCxnSpPr>
         <p:spPr>
           <a:xfrm>
-            <a:off x="517759" y="4051463"/>
+            <a:off x="517759" y="3883629"/>
             <a:ext cx="0" cy="161927"/>
           </a:xfrm>
           <a:prstGeom prst="straightConnector1">
@@ -29024,7 +28073,7 @@
         </p:nvCxnSpPr>
         <p:spPr>
           <a:xfrm flipV="1">
-            <a:off x="844068" y="4556931"/>
+            <a:off x="844068" y="4389097"/>
             <a:ext cx="2189920" cy="0"/>
           </a:xfrm>
           <a:prstGeom prst="line">
@@ -29062,7 +28111,7 @@
         </p:nvCxnSpPr>
         <p:spPr>
           <a:xfrm>
-            <a:off x="846160" y="4493037"/>
+            <a:off x="846160" y="4325203"/>
             <a:ext cx="0" cy="64008"/>
           </a:xfrm>
           <a:prstGeom prst="straightConnector1">
@@ -29107,7 +28156,7 @@
         </p:nvCxnSpPr>
         <p:spPr>
           <a:xfrm>
-            <a:off x="3027461" y="4494634"/>
+            <a:off x="3027461" y="4326800"/>
             <a:ext cx="0" cy="64008"/>
           </a:xfrm>
           <a:prstGeom prst="straightConnector1">
@@ -29152,7 +28201,7 @@
         </p:nvCxnSpPr>
         <p:spPr>
           <a:xfrm flipH="1">
-            <a:off x="2366732" y="4565270"/>
+            <a:off x="2366732" y="4397436"/>
             <a:ext cx="598" cy="109728"/>
           </a:xfrm>
           <a:prstGeom prst="straightConnector1">
@@ -29196,7 +28245,7 @@
         </p:nvCxnSpPr>
         <p:spPr>
           <a:xfrm>
-            <a:off x="517759" y="4495145"/>
+            <a:off x="517759" y="4327311"/>
             <a:ext cx="0" cy="161927"/>
           </a:xfrm>
           <a:prstGeom prst="straightConnector1">
@@ -29238,7 +28287,7 @@
         </p:nvSpPr>
         <p:spPr>
           <a:xfrm rot="5400000">
-            <a:off x="462597" y="3543105"/>
+            <a:off x="462597" y="3375271"/>
             <a:ext cx="109728" cy="384048"/>
           </a:xfrm>
           <a:prstGeom prst="rightBrace">
@@ -29289,7 +28338,7 @@
         </p:nvCxnSpPr>
         <p:spPr>
           <a:xfrm rot="5400000" flipH="1">
-            <a:off x="3768343" y="4751980"/>
+            <a:off x="3768343" y="4584146"/>
             <a:ext cx="598" cy="109728"/>
           </a:xfrm>
           <a:prstGeom prst="straightConnector1">
@@ -29331,8 +28380,8 @@
         </p:nvSpPr>
         <p:spPr>
           <a:xfrm>
-            <a:off x="174533" y="990672"/>
-            <a:ext cx="2121299" cy="924967"/>
+            <a:off x="174533" y="1094839"/>
+            <a:ext cx="2121299" cy="811220"/>
           </a:xfrm>
           <a:prstGeom prst="roundRect">
             <a:avLst>
@@ -29438,7 +28487,7 @@
         </p:nvSpPr>
         <p:spPr>
           <a:xfrm>
-            <a:off x="168928" y="5122266"/>
+            <a:off x="168928" y="5052820"/>
             <a:ext cx="11860396" cy="544456"/>
           </a:xfrm>
           <a:prstGeom prst="roundRect">
@@ -29819,7 +28868,7 @@
         </p:nvSpPr>
         <p:spPr>
           <a:xfrm>
-            <a:off x="167366" y="1936539"/>
+            <a:off x="167366" y="2023348"/>
             <a:ext cx="2272866" cy="307777"/>
           </a:xfrm>
           <a:prstGeom prst="rect">
@@ -29858,7 +28907,7 @@
         </p:nvSpPr>
         <p:spPr>
           <a:xfrm>
-            <a:off x="177582" y="5131618"/>
+            <a:off x="177582" y="5062172"/>
             <a:ext cx="11844164" cy="523220"/>
           </a:xfrm>
           <a:prstGeom prst="rect">
@@ -30009,7 +29058,7 @@
         </p:nvCxnSpPr>
         <p:spPr>
           <a:xfrm flipH="1">
-            <a:off x="388458" y="2647820"/>
+            <a:off x="388458" y="2734629"/>
             <a:ext cx="320270" cy="0"/>
           </a:xfrm>
           <a:prstGeom prst="line">
@@ -30048,7 +29097,7 @@
         </p:nvSpPr>
         <p:spPr>
           <a:xfrm>
-            <a:off x="177583" y="2211483"/>
+            <a:off x="177583" y="2298292"/>
             <a:ext cx="2349696" cy="899717"/>
           </a:xfrm>
           <a:prstGeom prst="roundRect">
@@ -30157,7 +29206,7 @@
         </p:nvSpPr>
         <p:spPr>
           <a:xfrm>
-            <a:off x="9401153" y="3336715"/>
+            <a:off x="8585339" y="3579975"/>
             <a:ext cx="1680588" cy="307777"/>
           </a:xfrm>
           <a:prstGeom prst="rect">
@@ -30185,51 +29234,6 @@
           </a:p>
         </p:txBody>
       </p:sp>
-      <p:cxnSp>
-        <p:nvCxnSpPr>
-          <p:cNvPr id="107" name="Straight Arrow Connector 106">
-            <a:extLst>
-              <a:ext uri="{FF2B5EF4-FFF2-40B4-BE49-F238E27FC236}">
-                <a16:creationId xmlns:a16="http://schemas.microsoft.com/office/drawing/2014/main" id="{2F612E1D-12F9-5344-8796-24225E09D6EA}"/>
-              </a:ext>
-            </a:extLst>
-          </p:cNvPr>
-          <p:cNvCxnSpPr>
-            <a:cxnSpLocks/>
-          </p:cNvCxnSpPr>
-          <p:nvPr/>
-        </p:nvCxnSpPr>
-        <p:spPr>
-          <a:xfrm>
-            <a:off x="11353800" y="3629558"/>
-            <a:ext cx="0" cy="64008"/>
-          </a:xfrm>
-          <a:prstGeom prst="straightConnector1">
-            <a:avLst/>
-          </a:prstGeom>
-          <a:ln>
-            <a:solidFill>
-              <a:schemeClr val="accent1"/>
-            </a:solidFill>
-            <a:headEnd type="none" w="med" len="med"/>
-            <a:tailEnd type="none" w="med" len="med"/>
-          </a:ln>
-        </p:spPr>
-        <p:style>
-          <a:lnRef idx="1">
-            <a:schemeClr val="accent1"/>
-          </a:lnRef>
-          <a:fillRef idx="0">
-            <a:schemeClr val="accent1"/>
-          </a:fillRef>
-          <a:effectRef idx="0">
-            <a:schemeClr val="accent1"/>
-          </a:effectRef>
-          <a:fontRef idx="minor">
-            <a:schemeClr val="tx1"/>
-          </a:fontRef>
-        </p:style>
-      </p:cxnSp>
       <p:sp>
         <p:nvSpPr>
           <p:cNvPr id="36" name="Rectangle 35">
@@ -30244,7 +29248,7 @@
         </p:nvSpPr>
         <p:spPr>
           <a:xfrm>
-            <a:off x="11353800" y="5126189"/>
+            <a:off x="11353800" y="5056743"/>
             <a:ext cx="627031" cy="307777"/>
           </a:xfrm>
           <a:prstGeom prst="rect">
@@ -30400,8 +29404,8 @@
         </p:nvSpPr>
         <p:spPr>
           <a:xfrm>
-            <a:off x="2522886" y="991604"/>
-            <a:ext cx="7318721" cy="925724"/>
+            <a:off x="2522886" y="1095770"/>
+            <a:ext cx="7318721" cy="805747"/>
           </a:xfrm>
           <a:prstGeom prst="roundRect">
             <a:avLst/>
@@ -30572,32 +29576,6 @@
                   <a:schemeClr val="tx1"/>
                 </a:solidFill>
               </a:rPr>
-              <a:t>commands (</a:t>
-            </a:r>
-            <a:r>
-              <a:rPr lang="en-US" sz="1400" dirty="0" err="1">
-                <a:solidFill>
-                  <a:schemeClr val="tx1"/>
-                </a:solidFill>
-              </a:rPr>
-              <a:t>lmpfix</a:t>
-            </a:r>
-            <a:r>
-              <a:rPr lang="en-US" sz="1400" dirty="0">
-                <a:solidFill>
-                  <a:schemeClr val="tx1"/>
-                </a:solidFill>
-              </a:rPr>
-              <a:t>)</a:t>
-            </a:r>
-          </a:p>
-          <a:p>
-            <a:r>
-              <a:rPr lang="en-US" sz="1400" dirty="0">
-                <a:solidFill>
-                  <a:schemeClr val="tx1"/>
-                </a:solidFill>
-              </a:rPr>
               <a:t>constants (constants)</a:t>
             </a:r>
           </a:p>
@@ -30765,7 +29743,7 @@
         </p:nvSpPr>
         <p:spPr>
           <a:xfrm>
-            <a:off x="4995681" y="4659276"/>
+            <a:off x="5128787" y="4491442"/>
             <a:ext cx="1167307" cy="307777"/>
           </a:xfrm>
           <a:prstGeom prst="rect">
@@ -30801,7 +29779,7 @@
         </p:nvCxnSpPr>
         <p:spPr>
           <a:xfrm rot="5400000" flipH="1">
-            <a:off x="4965771" y="4762864"/>
+            <a:off x="5098877" y="4595030"/>
             <a:ext cx="598" cy="109728"/>
           </a:xfrm>
           <a:prstGeom prst="straightConnector1">
@@ -30843,8 +29821,8 @@
         </p:nvSpPr>
         <p:spPr>
           <a:xfrm>
-            <a:off x="177582" y="2211484"/>
-            <a:ext cx="11860396" cy="2771799"/>
+            <a:off x="177582" y="2289477"/>
+            <a:ext cx="11860396" cy="2525972"/>
           </a:xfrm>
           <a:prstGeom prst="roundRect">
             <a:avLst>
@@ -30874,10 +29852,369 @@
           <a:lstStyle/>
           <a:p>
             <a:pPr algn="ctr"/>
-            <a:endParaRPr lang="en-US"/>
+            <a:endParaRPr lang="en-US" dirty="0"/>
           </a:p>
         </p:txBody>
       </p:sp>
+      <p:cxnSp>
+        <p:nvCxnSpPr>
+          <p:cNvPr id="19" name="Straight Arrow Connector 18">
+            <a:extLst>
+              <a:ext uri="{FF2B5EF4-FFF2-40B4-BE49-F238E27FC236}">
+                <a16:creationId xmlns:a16="http://schemas.microsoft.com/office/drawing/2014/main" id="{35942C55-FDA0-8FD1-FDFA-42C5E8A60CDB}"/>
+              </a:ext>
+            </a:extLst>
+          </p:cNvPr>
+          <p:cNvCxnSpPr>
+            <a:cxnSpLocks/>
+          </p:cNvCxnSpPr>
+          <p:nvPr/>
+        </p:nvCxnSpPr>
+        <p:spPr>
+          <a:xfrm>
+            <a:off x="7572802" y="2510949"/>
+            <a:ext cx="150422" cy="0"/>
+          </a:xfrm>
+          <a:prstGeom prst="straightConnector1">
+            <a:avLst/>
+          </a:prstGeom>
+          <a:ln>
+            <a:solidFill>
+              <a:schemeClr val="accent1"/>
+            </a:solidFill>
+            <a:tailEnd type="stealth"/>
+          </a:ln>
+        </p:spPr>
+        <p:style>
+          <a:lnRef idx="1">
+            <a:schemeClr val="accent1"/>
+          </a:lnRef>
+          <a:fillRef idx="0">
+            <a:schemeClr val="accent1"/>
+          </a:fillRef>
+          <a:effectRef idx="0">
+            <a:schemeClr val="accent1"/>
+          </a:effectRef>
+          <a:fontRef idx="minor">
+            <a:schemeClr val="tx1"/>
+          </a:fontRef>
+        </p:style>
+      </p:cxnSp>
+      <p:cxnSp>
+        <p:nvCxnSpPr>
+          <p:cNvPr id="55" name="Straight Connector 54">
+            <a:extLst>
+              <a:ext uri="{FF2B5EF4-FFF2-40B4-BE49-F238E27FC236}">
+                <a16:creationId xmlns:a16="http://schemas.microsoft.com/office/drawing/2014/main" id="{AA14FECF-B262-A4D6-7A52-2EC0E71A70C7}"/>
+              </a:ext>
+            </a:extLst>
+          </p:cNvPr>
+          <p:cNvCxnSpPr>
+            <a:cxnSpLocks/>
+          </p:cNvCxnSpPr>
+          <p:nvPr/>
+        </p:nvCxnSpPr>
+        <p:spPr>
+          <a:xfrm flipV="1">
+            <a:off x="5107967" y="2679623"/>
+            <a:ext cx="1401022" cy="906"/>
+          </a:xfrm>
+          <a:prstGeom prst="line">
+            <a:avLst/>
+          </a:prstGeom>
+        </p:spPr>
+        <p:style>
+          <a:lnRef idx="1">
+            <a:schemeClr val="accent1"/>
+          </a:lnRef>
+          <a:fillRef idx="0">
+            <a:schemeClr val="accent1"/>
+          </a:fillRef>
+          <a:effectRef idx="0">
+            <a:schemeClr val="accent1"/>
+          </a:effectRef>
+          <a:fontRef idx="minor">
+            <a:schemeClr val="tx1"/>
+          </a:fontRef>
+        </p:style>
+      </p:cxnSp>
+      <p:cxnSp>
+        <p:nvCxnSpPr>
+          <p:cNvPr id="56" name="Straight Arrow Connector 55">
+            <a:extLst>
+              <a:ext uri="{FF2B5EF4-FFF2-40B4-BE49-F238E27FC236}">
+                <a16:creationId xmlns:a16="http://schemas.microsoft.com/office/drawing/2014/main" id="{ABF1135A-49DB-43A7-1097-2185A561C68F}"/>
+              </a:ext>
+            </a:extLst>
+          </p:cNvPr>
+          <p:cNvCxnSpPr>
+            <a:cxnSpLocks/>
+          </p:cNvCxnSpPr>
+          <p:nvPr/>
+        </p:nvCxnSpPr>
+        <p:spPr>
+          <a:xfrm>
+            <a:off x="5111494" y="2615729"/>
+            <a:ext cx="0" cy="64008"/>
+          </a:xfrm>
+          <a:prstGeom prst="straightConnector1">
+            <a:avLst/>
+          </a:prstGeom>
+          <a:ln>
+            <a:solidFill>
+              <a:schemeClr val="accent1"/>
+            </a:solidFill>
+            <a:headEnd type="none" w="med" len="med"/>
+            <a:tailEnd type="none" w="med" len="med"/>
+          </a:ln>
+        </p:spPr>
+        <p:style>
+          <a:lnRef idx="1">
+            <a:schemeClr val="accent1"/>
+          </a:lnRef>
+          <a:fillRef idx="0">
+            <a:schemeClr val="accent1"/>
+          </a:fillRef>
+          <a:effectRef idx="0">
+            <a:schemeClr val="accent1"/>
+          </a:effectRef>
+          <a:fontRef idx="minor">
+            <a:schemeClr val="tx1"/>
+          </a:fontRef>
+        </p:style>
+      </p:cxnSp>
+      <p:cxnSp>
+        <p:nvCxnSpPr>
+          <p:cNvPr id="57" name="Straight Arrow Connector 56">
+            <a:extLst>
+              <a:ext uri="{FF2B5EF4-FFF2-40B4-BE49-F238E27FC236}">
+                <a16:creationId xmlns:a16="http://schemas.microsoft.com/office/drawing/2014/main" id="{6CA2648C-C1AC-D5E0-5CAB-B309CAC4DF3D}"/>
+              </a:ext>
+            </a:extLst>
+          </p:cNvPr>
+          <p:cNvCxnSpPr>
+            <a:cxnSpLocks/>
+          </p:cNvCxnSpPr>
+          <p:nvPr/>
+        </p:nvCxnSpPr>
+        <p:spPr>
+          <a:xfrm>
+            <a:off x="6508248" y="2617326"/>
+            <a:ext cx="0" cy="64008"/>
+          </a:xfrm>
+          <a:prstGeom prst="straightConnector1">
+            <a:avLst/>
+          </a:prstGeom>
+          <a:ln>
+            <a:solidFill>
+              <a:schemeClr val="accent1"/>
+            </a:solidFill>
+            <a:headEnd type="none" w="med" len="med"/>
+            <a:tailEnd type="none" w="med" len="med"/>
+          </a:ln>
+        </p:spPr>
+        <p:style>
+          <a:lnRef idx="1">
+            <a:schemeClr val="accent1"/>
+          </a:lnRef>
+          <a:fillRef idx="0">
+            <a:schemeClr val="accent1"/>
+          </a:fillRef>
+          <a:effectRef idx="0">
+            <a:schemeClr val="accent1"/>
+          </a:effectRef>
+          <a:fontRef idx="minor">
+            <a:schemeClr val="tx1"/>
+          </a:fontRef>
+        </p:style>
+      </p:cxnSp>
+      <p:cxnSp>
+        <p:nvCxnSpPr>
+          <p:cNvPr id="59" name="Straight Arrow Connector 58">
+            <a:extLst>
+              <a:ext uri="{FF2B5EF4-FFF2-40B4-BE49-F238E27FC236}">
+                <a16:creationId xmlns:a16="http://schemas.microsoft.com/office/drawing/2014/main" id="{C759BFA4-27FA-CD6B-6735-5F256E9C76BB}"/>
+              </a:ext>
+            </a:extLst>
+          </p:cNvPr>
+          <p:cNvCxnSpPr>
+            <a:cxnSpLocks/>
+          </p:cNvCxnSpPr>
+          <p:nvPr/>
+        </p:nvCxnSpPr>
+        <p:spPr>
+          <a:xfrm flipH="1">
+            <a:off x="7371963" y="3100842"/>
+            <a:ext cx="598" cy="109728"/>
+          </a:xfrm>
+          <a:prstGeom prst="straightConnector1">
+            <a:avLst/>
+          </a:prstGeom>
+          <a:ln>
+            <a:solidFill>
+              <a:schemeClr val="accent1"/>
+            </a:solidFill>
+            <a:tailEnd type="stealth"/>
+          </a:ln>
+        </p:spPr>
+        <p:style>
+          <a:lnRef idx="1">
+            <a:schemeClr val="accent1"/>
+          </a:lnRef>
+          <a:fillRef idx="0">
+            <a:schemeClr val="accent1"/>
+          </a:fillRef>
+          <a:effectRef idx="0">
+            <a:schemeClr val="accent1"/>
+          </a:effectRef>
+          <a:fontRef idx="minor">
+            <a:schemeClr val="tx1"/>
+          </a:fontRef>
+        </p:style>
+      </p:cxnSp>
+      <p:cxnSp>
+        <p:nvCxnSpPr>
+          <p:cNvPr id="65" name="Straight Arrow Connector 64">
+            <a:extLst>
+              <a:ext uri="{FF2B5EF4-FFF2-40B4-BE49-F238E27FC236}">
+                <a16:creationId xmlns:a16="http://schemas.microsoft.com/office/drawing/2014/main" id="{83F9C1E3-D35B-9A1D-D341-F75B46512ADE}"/>
+              </a:ext>
+            </a:extLst>
+          </p:cNvPr>
+          <p:cNvCxnSpPr>
+            <a:cxnSpLocks/>
+          </p:cNvCxnSpPr>
+          <p:nvPr/>
+        </p:nvCxnSpPr>
+        <p:spPr>
+          <a:xfrm rot="5400000" flipH="1">
+            <a:off x="10570353" y="3267951"/>
+            <a:ext cx="598" cy="109728"/>
+          </a:xfrm>
+          <a:prstGeom prst="straightConnector1">
+            <a:avLst/>
+          </a:prstGeom>
+          <a:ln>
+            <a:solidFill>
+              <a:schemeClr val="accent1"/>
+            </a:solidFill>
+            <a:tailEnd type="stealth"/>
+          </a:ln>
+        </p:spPr>
+        <p:style>
+          <a:lnRef idx="1">
+            <a:schemeClr val="accent1"/>
+          </a:lnRef>
+          <a:fillRef idx="0">
+            <a:schemeClr val="accent1"/>
+          </a:fillRef>
+          <a:effectRef idx="0">
+            <a:schemeClr val="accent1"/>
+          </a:effectRef>
+          <a:fontRef idx="minor">
+            <a:schemeClr val="tx1"/>
+          </a:fontRef>
+        </p:style>
+      </p:cxnSp>
+      <p:sp>
+        <p:nvSpPr>
+          <p:cNvPr id="70" name="TextBox 69">
+            <a:extLst>
+              <a:ext uri="{FF2B5EF4-FFF2-40B4-BE49-F238E27FC236}">
+                <a16:creationId xmlns:a16="http://schemas.microsoft.com/office/drawing/2014/main" id="{089F3599-5F63-4826-A4D3-00BAEEF5F2DA}"/>
+              </a:ext>
+            </a:extLst>
+          </p:cNvPr>
+          <p:cNvSpPr txBox="1"/>
+          <p:nvPr/>
+        </p:nvSpPr>
+        <p:spPr>
+          <a:xfrm>
+            <a:off x="7326479" y="3569724"/>
+            <a:ext cx="1361320" cy="523220"/>
+          </a:xfrm>
+          <a:prstGeom prst="rect">
+            <a:avLst/>
+          </a:prstGeom>
+          <a:noFill/>
+        </p:spPr>
+        <p:txBody>
+          <a:bodyPr wrap="square" rtlCol="0">
+            <a:spAutoFit/>
+          </a:bodyPr>
+          <a:lstStyle/>
+          <a:p>
+            <a:pPr algn="ctr"/>
+            <a:r>
+              <a:rPr lang="en-US" sz="1400" dirty="0">
+                <a:solidFill>
+                  <a:srgbClr val="00B0F0"/>
+                </a:solidFill>
+              </a:rPr>
+              <a:t>type &amp; assign</a:t>
+            </a:r>
+          </a:p>
+          <a:p>
+            <a:pPr algn="ctr"/>
+            <a:r>
+              <a:rPr lang="en-US" sz="1400" dirty="0"/>
+              <a:t>(</a:t>
+            </a:r>
+            <a:r>
+              <a:rPr lang="en-US" sz="1400" dirty="0" err="1"/>
+              <a:t>oplsua</a:t>
+            </a:r>
+            <a:r>
+              <a:rPr lang="en-US" sz="1400" dirty="0"/>
+              <a:t>)</a:t>
+            </a:r>
+          </a:p>
+        </p:txBody>
+      </p:sp>
+      <p:cxnSp>
+        <p:nvCxnSpPr>
+          <p:cNvPr id="75" name="Straight Arrow Connector 74">
+            <a:extLst>
+              <a:ext uri="{FF2B5EF4-FFF2-40B4-BE49-F238E27FC236}">
+                <a16:creationId xmlns:a16="http://schemas.microsoft.com/office/drawing/2014/main" id="{C5BA1D52-21BC-87F4-16EA-CFFF96D321E4}"/>
+              </a:ext>
+            </a:extLst>
+          </p:cNvPr>
+          <p:cNvCxnSpPr>
+            <a:cxnSpLocks/>
+          </p:cNvCxnSpPr>
+          <p:nvPr/>
+        </p:nvCxnSpPr>
+        <p:spPr>
+          <a:xfrm flipH="1" flipV="1">
+            <a:off x="6793889" y="3465712"/>
+            <a:ext cx="640983" cy="178882"/>
+          </a:xfrm>
+          <a:prstGeom prst="straightConnector1">
+            <a:avLst/>
+          </a:prstGeom>
+          <a:ln>
+            <a:solidFill>
+              <a:schemeClr val="accent1"/>
+            </a:solidFill>
+            <a:tailEnd type="stealth"/>
+          </a:ln>
+        </p:spPr>
+        <p:style>
+          <a:lnRef idx="1">
+            <a:schemeClr val="accent1"/>
+          </a:lnRef>
+          <a:fillRef idx="0">
+            <a:schemeClr val="accent1"/>
+          </a:fillRef>
+          <a:effectRef idx="0">
+            <a:schemeClr val="accent1"/>
+          </a:effectRef>
+          <a:fontRef idx="minor">
+            <a:schemeClr val="tx1"/>
+          </a:fontRef>
+        </p:style>
+      </p:cxnSp>
     </p:spTree>
     <p:extLst>
       <p:ext uri="{BB962C8B-B14F-4D97-AF65-F5344CB8AC3E}">

</xml_diff>

<commit_message>
1504 module unit test passed in 32.85s
</commit_message>
<xml_diff>
--- a/docs/power_point/nemd.pptx
+++ b/docs/power_point/nemd.pptx
@@ -3132,7 +3132,7 @@
           <a:p>
             <a:fld id="{4E7935B3-F5AC-0F49-A77F-693DEAA46623}" type="datetimeFigureOut">
               <a:rPr lang="en-US" smtClean="0"/>
-              <a:t>6/20/25</a:t>
+              <a:t>6/21/25</a:t>
             </a:fld>
             <a:endParaRPr lang="en-US"/>
           </a:p>
@@ -3798,7 +3798,7 @@
           <a:p>
             <a:fld id="{7139230D-D256-FE47-99BF-6F642436F56E}" type="datetime1">
               <a:rPr lang="en-US" smtClean="0"/>
-              <a:t>6/20/25</a:t>
+              <a:t>6/21/25</a:t>
             </a:fld>
             <a:endParaRPr lang="en-US"/>
           </a:p>
@@ -3996,7 +3996,7 @@
           <a:p>
             <a:fld id="{785AC849-5CEB-3846-9265-8D72BE481A70}" type="datetime1">
               <a:rPr lang="en-US" smtClean="0"/>
-              <a:t>6/20/25</a:t>
+              <a:t>6/21/25</a:t>
             </a:fld>
             <a:endParaRPr lang="en-US"/>
           </a:p>
@@ -4204,7 +4204,7 @@
           <a:p>
             <a:fld id="{A02BBDEB-BEE0-FD44-AAFC-27969F9541FD}" type="datetime1">
               <a:rPr lang="en-US" smtClean="0"/>
-              <a:t>6/20/25</a:t>
+              <a:t>6/21/25</a:t>
             </a:fld>
             <a:endParaRPr lang="en-US"/>
           </a:p>
@@ -4402,7 +4402,7 @@
           <a:p>
             <a:fld id="{4F82860A-5855-1941-A1E0-F1AE52EC854D}" type="datetime1">
               <a:rPr lang="en-US" smtClean="0"/>
-              <a:t>6/20/25</a:t>
+              <a:t>6/21/25</a:t>
             </a:fld>
             <a:endParaRPr lang="en-US"/>
           </a:p>
@@ -4677,7 +4677,7 @@
           <a:p>
             <a:fld id="{6A874B4C-42F5-E24E-B25F-613EC7F4AF0D}" type="datetime1">
               <a:rPr lang="en-US" smtClean="0"/>
-              <a:t>6/20/25</a:t>
+              <a:t>6/21/25</a:t>
             </a:fld>
             <a:endParaRPr lang="en-US"/>
           </a:p>
@@ -4942,7 +4942,7 @@
           <a:p>
             <a:fld id="{9A2BCD20-0178-0C41-9D8E-10FA267A6CCC}" type="datetime1">
               <a:rPr lang="en-US" smtClean="0"/>
-              <a:t>6/20/25</a:t>
+              <a:t>6/21/25</a:t>
             </a:fld>
             <a:endParaRPr lang="en-US"/>
           </a:p>
@@ -5354,7 +5354,7 @@
           <a:p>
             <a:fld id="{EDE58456-60EB-6840-BCEB-E4C2678C039E}" type="datetime1">
               <a:rPr lang="en-US" smtClean="0"/>
-              <a:t>6/20/25</a:t>
+              <a:t>6/21/25</a:t>
             </a:fld>
             <a:endParaRPr lang="en-US"/>
           </a:p>
@@ -5495,7 +5495,7 @@
           <a:p>
             <a:fld id="{8BBFCD94-1F0D-3948-A9F0-DB82F9AAC2D3}" type="datetime1">
               <a:rPr lang="en-US" smtClean="0"/>
-              <a:t>6/20/25</a:t>
+              <a:t>6/21/25</a:t>
             </a:fld>
             <a:endParaRPr lang="en-US"/>
           </a:p>
@@ -5608,7 +5608,7 @@
           <a:p>
             <a:fld id="{13692FAC-AC21-0848-AC27-426B7BF29104}" type="datetime1">
               <a:rPr lang="en-US" smtClean="0"/>
-              <a:t>6/20/25</a:t>
+              <a:t>6/21/25</a:t>
             </a:fld>
             <a:endParaRPr lang="en-US"/>
           </a:p>
@@ -5919,7 +5919,7 @@
           <a:p>
             <a:fld id="{A3FF56F3-8608-FF4D-9C26-AE6D473095CB}" type="datetime1">
               <a:rPr lang="en-US" smtClean="0"/>
-              <a:t>6/20/25</a:t>
+              <a:t>6/21/25</a:t>
             </a:fld>
             <a:endParaRPr lang="en-US"/>
           </a:p>
@@ -6207,7 +6207,7 @@
           <a:p>
             <a:fld id="{58CC49A9-C646-2345-B4A7-439457175566}" type="datetime1">
               <a:rPr lang="en-US" smtClean="0"/>
-              <a:t>6/20/25</a:t>
+              <a:t>6/21/25</a:t>
             </a:fld>
             <a:endParaRPr lang="en-US"/>
           </a:p>
@@ -6448,7 +6448,7 @@
           <a:p>
             <a:fld id="{D516C8CC-C3CD-B94B-94D6-0913487DB5E5}" type="datetime1">
               <a:rPr lang="en-US" smtClean="0"/>
-              <a:t>6/20/25</a:t>
+              <a:t>6/21/25</a:t>
             </a:fld>
             <a:endParaRPr lang="en-US"/>
           </a:p>
@@ -27394,101 +27394,6 @@
             <a:r>
               <a:rPr lang="en-US" sz="1400" dirty="0" err="1"/>
               <a:t>pbc</a:t>
-            </a:r>
-            <a:r>
-              <a:rPr lang="en-US" sz="1400" dirty="0"/>
-              <a:t>)</a:t>
-            </a:r>
-          </a:p>
-        </p:txBody>
-      </p:sp>
-      <p:cxnSp>
-        <p:nvCxnSpPr>
-          <p:cNvPr id="139" name="Straight Arrow Connector 138">
-            <a:extLst>
-              <a:ext uri="{FF2B5EF4-FFF2-40B4-BE49-F238E27FC236}">
-                <a16:creationId xmlns:a16="http://schemas.microsoft.com/office/drawing/2014/main" id="{416C88BD-64D6-A846-B55B-00C80378E874}"/>
-              </a:ext>
-            </a:extLst>
-          </p:cNvPr>
-          <p:cNvCxnSpPr>
-            <a:cxnSpLocks/>
-            <a:stCxn id="27" idx="3"/>
-          </p:cNvCxnSpPr>
-          <p:nvPr/>
-        </p:nvCxnSpPr>
-        <p:spPr>
-          <a:xfrm>
-            <a:off x="6793889" y="3319300"/>
-            <a:ext cx="150894" cy="3844"/>
-          </a:xfrm>
-          <a:prstGeom prst="straightConnector1">
-            <a:avLst/>
-          </a:prstGeom>
-          <a:ln>
-            <a:solidFill>
-              <a:schemeClr val="accent1"/>
-            </a:solidFill>
-            <a:tailEnd type="stealth"/>
-          </a:ln>
-        </p:spPr>
-        <p:style>
-          <a:lnRef idx="1">
-            <a:schemeClr val="accent1"/>
-          </a:lnRef>
-          <a:fillRef idx="0">
-            <a:schemeClr val="accent1"/>
-          </a:fillRef>
-          <a:effectRef idx="0">
-            <a:schemeClr val="accent1"/>
-          </a:effectRef>
-          <a:fontRef idx="minor">
-            <a:schemeClr val="tx1"/>
-          </a:fontRef>
-        </p:style>
-      </p:cxnSp>
-      <p:sp>
-        <p:nvSpPr>
-          <p:cNvPr id="148" name="Rectangle 147">
-            <a:extLst>
-              <a:ext uri="{FF2B5EF4-FFF2-40B4-BE49-F238E27FC236}">
-                <a16:creationId xmlns:a16="http://schemas.microsoft.com/office/drawing/2014/main" id="{CB03CAF2-CFF0-894B-B873-A4A31A10159F}"/>
-              </a:ext>
-            </a:extLst>
-          </p:cNvPr>
-          <p:cNvSpPr/>
-          <p:nvPr/>
-        </p:nvSpPr>
-        <p:spPr>
-          <a:xfrm>
-            <a:off x="6999236" y="3175231"/>
-            <a:ext cx="1497562" cy="307777"/>
-          </a:xfrm>
-          <a:prstGeom prst="rect">
-            <a:avLst/>
-          </a:prstGeom>
-        </p:spPr>
-        <p:txBody>
-          <a:bodyPr wrap="square">
-            <a:spAutoFit/>
-          </a:bodyPr>
-          <a:lstStyle/>
-          <a:p>
-            <a:r>
-              <a:rPr lang="en-US" sz="1400" dirty="0">
-                <a:solidFill>
-                  <a:srgbClr val="7030A0"/>
-                </a:solidFill>
-              </a:rPr>
-              <a:t>datafile</a:t>
-            </a:r>
-            <a:r>
-              <a:rPr lang="en-US" sz="1400" dirty="0"/>
-              <a:t> (</a:t>
-            </a:r>
-            <a:r>
-              <a:rPr lang="en-US" sz="1400" dirty="0" err="1"/>
-              <a:t>lmpdata</a:t>
             </a:r>
             <a:r>
               <a:rPr lang="en-US" sz="1400" dirty="0"/>
@@ -30030,50 +29935,6 @@
       </p:cxnSp>
       <p:cxnSp>
         <p:nvCxnSpPr>
-          <p:cNvPr id="59" name="Straight Arrow Connector 58">
-            <a:extLst>
-              <a:ext uri="{FF2B5EF4-FFF2-40B4-BE49-F238E27FC236}">
-                <a16:creationId xmlns:a16="http://schemas.microsoft.com/office/drawing/2014/main" id="{C759BFA4-27FA-CD6B-6735-5F256E9C76BB}"/>
-              </a:ext>
-            </a:extLst>
-          </p:cNvPr>
-          <p:cNvCxnSpPr>
-            <a:cxnSpLocks/>
-          </p:cNvCxnSpPr>
-          <p:nvPr/>
-        </p:nvCxnSpPr>
-        <p:spPr>
-          <a:xfrm flipH="1">
-            <a:off x="7371963" y="3100842"/>
-            <a:ext cx="598" cy="109728"/>
-          </a:xfrm>
-          <a:prstGeom prst="straightConnector1">
-            <a:avLst/>
-          </a:prstGeom>
-          <a:ln>
-            <a:solidFill>
-              <a:schemeClr val="accent1"/>
-            </a:solidFill>
-            <a:tailEnd type="stealth"/>
-          </a:ln>
-        </p:spPr>
-        <p:style>
-          <a:lnRef idx="1">
-            <a:schemeClr val="accent1"/>
-          </a:lnRef>
-          <a:fillRef idx="0">
-            <a:schemeClr val="accent1"/>
-          </a:fillRef>
-          <a:effectRef idx="0">
-            <a:schemeClr val="accent1"/>
-          </a:effectRef>
-          <a:fontRef idx="minor">
-            <a:schemeClr val="tx1"/>
-          </a:fontRef>
-        </p:style>
-      </p:cxnSp>
-      <p:cxnSp>
-        <p:nvCxnSpPr>
           <p:cNvPr id="65" name="Straight Arrow Connector 64">
             <a:extLst>
               <a:ext uri="{FF2B5EF4-FFF2-40B4-BE49-F238E27FC236}">
@@ -30130,7 +29991,7 @@
         </p:nvSpPr>
         <p:spPr>
           <a:xfrm>
-            <a:off x="7326479" y="3569724"/>
+            <a:off x="7138589" y="3176770"/>
             <a:ext cx="1361320" cy="523220"/>
           </a:xfrm>
           <a:prstGeom prst="rect">
@@ -30186,9 +30047,9 @@
           <p:nvPr/>
         </p:nvCxnSpPr>
         <p:spPr>
-          <a:xfrm flipH="1" flipV="1">
-            <a:off x="6793889" y="3465712"/>
-            <a:ext cx="640983" cy="178882"/>
+          <a:xfrm flipH="1">
+            <a:off x="6793889" y="3320262"/>
+            <a:ext cx="347266" cy="0"/>
           </a:xfrm>
           <a:prstGeom prst="straightConnector1">
             <a:avLst/>

</xml_diff>

<commit_message>
sh/nemd_cover analyze and report unittest coverage
</commit_message>
<xml_diff>
--- a/docs/power_point/nemd.pptx
+++ b/docs/power_point/nemd.pptx
@@ -5,7 +5,7 @@
     <p:sldMasterId id="2147483648" r:id="rId1"/>
   </p:sldMasterIdLst>
   <p:notesMasterIdLst>
-    <p:notesMasterId r:id="rId19"/>
+    <p:notesMasterId r:id="rId20"/>
   </p:notesMasterIdLst>
   <p:sldIdLst>
     <p:sldId id="256" r:id="rId2"/>
@@ -17,14 +17,15 @@
     <p:sldId id="270" r:id="rId8"/>
     <p:sldId id="269" r:id="rId9"/>
     <p:sldId id="261" r:id="rId10"/>
-    <p:sldId id="263" r:id="rId11"/>
-    <p:sldId id="273" r:id="rId12"/>
-    <p:sldId id="262" r:id="rId13"/>
-    <p:sldId id="271" r:id="rId14"/>
-    <p:sldId id="268" r:id="rId15"/>
-    <p:sldId id="267" r:id="rId16"/>
-    <p:sldId id="272" r:id="rId17"/>
-    <p:sldId id="265" r:id="rId18"/>
+    <p:sldId id="275" r:id="rId11"/>
+    <p:sldId id="263" r:id="rId12"/>
+    <p:sldId id="273" r:id="rId13"/>
+    <p:sldId id="262" r:id="rId14"/>
+    <p:sldId id="271" r:id="rId15"/>
+    <p:sldId id="268" r:id="rId16"/>
+    <p:sldId id="267" r:id="rId17"/>
+    <p:sldId id="272" r:id="rId18"/>
+    <p:sldId id="265" r:id="rId19"/>
   </p:sldIdLst>
   <p:sldSz cx="12192000" cy="6858000"/>
   <p:notesSz cx="6858000" cy="9144000"/>
@@ -975,10 +976,6 @@
         <a:lstStyle/>
         <a:p>
           <a:r>
-            <a:rPr lang="en-US" dirty="0"/>
-            <a:t>Accurate </a:t>
-          </a:r>
-          <a:r>
             <a:rPr lang="en-US" dirty="0">
               <a:solidFill>
                 <a:schemeClr val="accent6"/>
@@ -1036,10 +1033,6 @@
         <a:lstStyle/>
         <a:p>
           <a:r>
-            <a:rPr lang="en-US" dirty="0"/>
-            <a:t>Efficient </a:t>
-          </a:r>
-          <a:r>
             <a:rPr lang="en-US" dirty="0">
               <a:solidFill>
                 <a:schemeClr val="accent1"/>
@@ -1047,7 +1040,6 @@
             </a:rPr>
             <a:t>Performance</a:t>
           </a:r>
-          <a:endParaRPr lang="en-US" dirty="0"/>
         </a:p>
       </dgm:t>
     </dgm:pt>
@@ -1096,10 +1088,6 @@
         <a:lstStyle/>
         <a:p>
           <a:r>
-            <a:rPr lang="en-US" dirty="0"/>
-            <a:t>Physical </a:t>
-          </a:r>
-          <a:r>
             <a:rPr lang="en-US" dirty="0">
               <a:solidFill>
                 <a:schemeClr val="accent2"/>
@@ -1110,7 +1098,6 @@
             </a:rPr>
             <a:t>Scientific</a:t>
           </a:r>
-          <a:endParaRPr lang="en-US" dirty="0"/>
         </a:p>
       </dgm:t>
     </dgm:pt>
@@ -1301,10 +1288,6 @@
             <a:buNone/>
           </a:pPr>
           <a:r>
-            <a:rPr lang="en-US" sz="1200" kern="1200" dirty="0"/>
-            <a:t>Accurate </a:t>
-          </a:r>
-          <a:r>
             <a:rPr lang="en-US" sz="1200" kern="1200" dirty="0">
               <a:solidFill>
                 <a:schemeClr val="accent6"/>
@@ -1488,10 +1471,6 @@
             <a:buNone/>
           </a:pPr>
           <a:r>
-            <a:rPr lang="en-US" sz="1200" kern="1200" dirty="0"/>
-            <a:t>Efficient </a:t>
-          </a:r>
-          <a:r>
             <a:rPr lang="en-US" sz="1200" kern="1200" dirty="0">
               <a:solidFill>
                 <a:schemeClr val="accent1"/>
@@ -1499,7 +1478,6 @@
             </a:rPr>
             <a:t>Performance</a:t>
           </a:r>
-          <a:endParaRPr lang="en-US" sz="1200" kern="1200" dirty="0"/>
         </a:p>
       </dsp:txBody>
       <dsp:txXfrm>
@@ -1674,10 +1652,6 @@
             <a:buNone/>
           </a:pPr>
           <a:r>
-            <a:rPr lang="en-US" sz="1200" kern="1200" dirty="0"/>
-            <a:t>Physical </a:t>
-          </a:r>
-          <a:r>
             <a:rPr lang="en-US" sz="1200" kern="1200" dirty="0">
               <a:solidFill>
                 <a:schemeClr val="accent2"/>
@@ -1688,7 +1662,6 @@
             </a:rPr>
             <a:t>Scientific</a:t>
           </a:r>
-          <a:endParaRPr lang="en-US" sz="1200" kern="1200" dirty="0"/>
         </a:p>
       </dsp:txBody>
       <dsp:txXfrm>
@@ -3132,7 +3105,7 @@
           <a:p>
             <a:fld id="{4E7935B3-F5AC-0F49-A77F-693DEAA46623}" type="datetimeFigureOut">
               <a:rPr lang="en-US" smtClean="0"/>
-              <a:t>6/21/25</a:t>
+              <a:t>8/24/25</a:t>
             </a:fld>
             <a:endParaRPr lang="en-US"/>
           </a:p>
@@ -3651,6 +3624,114 @@
 </p:notes>
 </file>
 
+<file path=ppt/notesSlides/notesSlide4.xml><?xml version="1.0" encoding="utf-8"?>
+<p:notes xmlns:a="http://schemas.openxmlformats.org/drawingml/2006/main" xmlns:r="http://schemas.openxmlformats.org/officeDocument/2006/relationships" xmlns:p="http://schemas.openxmlformats.org/presentationml/2006/main">
+  <p:cSld>
+    <p:spTree>
+      <p:nvGrpSpPr>
+        <p:cNvPr id="1" name="">
+          <a:extLst>
+            <a:ext uri="{FF2B5EF4-FFF2-40B4-BE49-F238E27FC236}">
+              <a16:creationId xmlns:a16="http://schemas.microsoft.com/office/drawing/2014/main" id="{61F0F25D-A23E-4E2D-F308-5821D856D6C9}"/>
+            </a:ext>
+          </a:extLst>
+        </p:cNvPr>
+        <p:cNvGrpSpPr/>
+        <p:nvPr/>
+      </p:nvGrpSpPr>
+      <p:grpSpPr>
+        <a:xfrm>
+          <a:off x="0" y="0"/>
+          <a:ext cx="0" cy="0"/>
+          <a:chOff x="0" y="0"/>
+          <a:chExt cx="0" cy="0"/>
+        </a:xfrm>
+      </p:grpSpPr>
+      <p:sp>
+        <p:nvSpPr>
+          <p:cNvPr id="2" name="Slide Image Placeholder 1">
+            <a:extLst>
+              <a:ext uri="{FF2B5EF4-FFF2-40B4-BE49-F238E27FC236}">
+                <a16:creationId xmlns:a16="http://schemas.microsoft.com/office/drawing/2014/main" id="{9666B69F-1E68-6633-928C-A970FFA81463}"/>
+              </a:ext>
+            </a:extLst>
+          </p:cNvPr>
+          <p:cNvSpPr>
+            <a:spLocks noGrp="1" noRot="1" noChangeAspect="1"/>
+          </p:cNvSpPr>
+          <p:nvPr>
+            <p:ph type="sldImg"/>
+          </p:nvPr>
+        </p:nvSpPr>
+        <p:spPr/>
+      </p:sp>
+      <p:sp>
+        <p:nvSpPr>
+          <p:cNvPr id="3" name="Notes Placeholder 2">
+            <a:extLst>
+              <a:ext uri="{FF2B5EF4-FFF2-40B4-BE49-F238E27FC236}">
+                <a16:creationId xmlns:a16="http://schemas.microsoft.com/office/drawing/2014/main" id="{6B8C3ECE-C349-54BB-88B1-CB632DDD2093}"/>
+              </a:ext>
+            </a:extLst>
+          </p:cNvPr>
+          <p:cNvSpPr>
+            <a:spLocks noGrp="1"/>
+          </p:cNvSpPr>
+          <p:nvPr>
+            <p:ph type="body" idx="1"/>
+          </p:nvPr>
+        </p:nvSpPr>
+        <p:spPr/>
+        <p:txBody>
+          <a:bodyPr/>
+          <a:lstStyle/>
+          <a:p>
+            <a:endParaRPr lang="en-US" dirty="0"/>
+          </a:p>
+        </p:txBody>
+      </p:sp>
+      <p:sp>
+        <p:nvSpPr>
+          <p:cNvPr id="4" name="Slide Number Placeholder 3">
+            <a:extLst>
+              <a:ext uri="{FF2B5EF4-FFF2-40B4-BE49-F238E27FC236}">
+                <a16:creationId xmlns:a16="http://schemas.microsoft.com/office/drawing/2014/main" id="{8E3DB290-8F75-3992-14A6-2350E4215B73}"/>
+              </a:ext>
+            </a:extLst>
+          </p:cNvPr>
+          <p:cNvSpPr>
+            <a:spLocks noGrp="1"/>
+          </p:cNvSpPr>
+          <p:nvPr>
+            <p:ph type="sldNum" sz="quarter" idx="5"/>
+          </p:nvPr>
+        </p:nvSpPr>
+        <p:spPr/>
+        <p:txBody>
+          <a:bodyPr/>
+          <a:lstStyle/>
+          <a:p>
+            <a:fld id="{B9A8B51A-AF34-8043-88BB-7DEBFD50DDAE}" type="slidenum">
+              <a:rPr lang="en-US" smtClean="0"/>
+              <a:t>10</a:t>
+            </a:fld>
+            <a:endParaRPr lang="en-US"/>
+          </a:p>
+        </p:txBody>
+      </p:sp>
+    </p:spTree>
+    <p:extLst>
+      <p:ext uri="{BB962C8B-B14F-4D97-AF65-F5344CB8AC3E}">
+        <p14:creationId xmlns:p14="http://schemas.microsoft.com/office/powerpoint/2010/main" val="1470566928"/>
+      </p:ext>
+    </p:extLst>
+  </p:cSld>
+  <p:clrMapOvr>
+    <a:masterClrMapping/>
+  </p:clrMapOvr>
+</p:notes>
+</file>
+
 <file path=ppt/slideLayouts/slideLayout1.xml><?xml version="1.0" encoding="utf-8"?>
 <p:sldLayout xmlns:a="http://schemas.openxmlformats.org/drawingml/2006/main" xmlns:r="http://schemas.openxmlformats.org/officeDocument/2006/relationships" xmlns:p="http://schemas.openxmlformats.org/presentationml/2006/main" type="title" preserve="1">
   <p:cSld name="Title Slide">
@@ -3798,7 +3879,7 @@
           <a:p>
             <a:fld id="{7139230D-D256-FE47-99BF-6F642436F56E}" type="datetime1">
               <a:rPr lang="en-US" smtClean="0"/>
-              <a:t>6/21/25</a:t>
+              <a:t>8/24/25</a:t>
             </a:fld>
             <a:endParaRPr lang="en-US"/>
           </a:p>
@@ -3996,7 +4077,7 @@
           <a:p>
             <a:fld id="{785AC849-5CEB-3846-9265-8D72BE481A70}" type="datetime1">
               <a:rPr lang="en-US" smtClean="0"/>
-              <a:t>6/21/25</a:t>
+              <a:t>8/24/25</a:t>
             </a:fld>
             <a:endParaRPr lang="en-US"/>
           </a:p>
@@ -4204,7 +4285,7 @@
           <a:p>
             <a:fld id="{A02BBDEB-BEE0-FD44-AAFC-27969F9541FD}" type="datetime1">
               <a:rPr lang="en-US" smtClean="0"/>
-              <a:t>6/21/25</a:t>
+              <a:t>8/24/25</a:t>
             </a:fld>
             <a:endParaRPr lang="en-US"/>
           </a:p>
@@ -4402,7 +4483,7 @@
           <a:p>
             <a:fld id="{4F82860A-5855-1941-A1E0-F1AE52EC854D}" type="datetime1">
               <a:rPr lang="en-US" smtClean="0"/>
-              <a:t>6/21/25</a:t>
+              <a:t>8/24/25</a:t>
             </a:fld>
             <a:endParaRPr lang="en-US"/>
           </a:p>
@@ -4677,7 +4758,7 @@
           <a:p>
             <a:fld id="{6A874B4C-42F5-E24E-B25F-613EC7F4AF0D}" type="datetime1">
               <a:rPr lang="en-US" smtClean="0"/>
-              <a:t>6/21/25</a:t>
+              <a:t>8/24/25</a:t>
             </a:fld>
             <a:endParaRPr lang="en-US"/>
           </a:p>
@@ -4942,7 +5023,7 @@
           <a:p>
             <a:fld id="{9A2BCD20-0178-0C41-9D8E-10FA267A6CCC}" type="datetime1">
               <a:rPr lang="en-US" smtClean="0"/>
-              <a:t>6/21/25</a:t>
+              <a:t>8/24/25</a:t>
             </a:fld>
             <a:endParaRPr lang="en-US"/>
           </a:p>
@@ -5354,7 +5435,7 @@
           <a:p>
             <a:fld id="{EDE58456-60EB-6840-BCEB-E4C2678C039E}" type="datetime1">
               <a:rPr lang="en-US" smtClean="0"/>
-              <a:t>6/21/25</a:t>
+              <a:t>8/24/25</a:t>
             </a:fld>
             <a:endParaRPr lang="en-US"/>
           </a:p>
@@ -5495,7 +5576,7 @@
           <a:p>
             <a:fld id="{8BBFCD94-1F0D-3948-A9F0-DB82F9AAC2D3}" type="datetime1">
               <a:rPr lang="en-US" smtClean="0"/>
-              <a:t>6/21/25</a:t>
+              <a:t>8/24/25</a:t>
             </a:fld>
             <a:endParaRPr lang="en-US"/>
           </a:p>
@@ -5608,7 +5689,7 @@
           <a:p>
             <a:fld id="{13692FAC-AC21-0848-AC27-426B7BF29104}" type="datetime1">
               <a:rPr lang="en-US" smtClean="0"/>
-              <a:t>6/21/25</a:t>
+              <a:t>8/24/25</a:t>
             </a:fld>
             <a:endParaRPr lang="en-US"/>
           </a:p>
@@ -5919,7 +6000,7 @@
           <a:p>
             <a:fld id="{A3FF56F3-8608-FF4D-9C26-AE6D473095CB}" type="datetime1">
               <a:rPr lang="en-US" smtClean="0"/>
-              <a:t>6/21/25</a:t>
+              <a:t>8/24/25</a:t>
             </a:fld>
             <a:endParaRPr lang="en-US"/>
           </a:p>
@@ -6207,7 +6288,7 @@
           <a:p>
             <a:fld id="{58CC49A9-C646-2345-B4A7-439457175566}" type="datetime1">
               <a:rPr lang="en-US" smtClean="0"/>
-              <a:t>6/21/25</a:t>
+              <a:t>8/24/25</a:t>
             </a:fld>
             <a:endParaRPr lang="en-US"/>
           </a:p>
@@ -6448,7 +6529,7 @@
           <a:p>
             <a:fld id="{D516C8CC-C3CD-B94B-94D6-0913487DB5E5}" type="datetime1">
               <a:rPr lang="en-US" smtClean="0"/>
-              <a:t>6/21/25</a:t>
+              <a:t>8/24/25</a:t>
             </a:fld>
             <a:endParaRPr lang="en-US"/>
           </a:p>
@@ -7014,6 +7095,1169 @@
   <p:cSld>
     <p:spTree>
       <p:nvGrpSpPr>
+        <p:cNvPr id="1" name="">
+          <a:extLst>
+            <a:ext uri="{FF2B5EF4-FFF2-40B4-BE49-F238E27FC236}">
+              <a16:creationId xmlns:a16="http://schemas.microsoft.com/office/drawing/2014/main" id="{32E9633F-CBF3-EF3B-4E48-8D26D1F967FC}"/>
+            </a:ext>
+          </a:extLst>
+        </p:cNvPr>
+        <p:cNvGrpSpPr/>
+        <p:nvPr/>
+      </p:nvGrpSpPr>
+      <p:grpSpPr>
+        <a:xfrm>
+          <a:off x="0" y="0"/>
+          <a:ext cx="0" cy="0"/>
+          <a:chOff x="0" y="0"/>
+          <a:chExt cx="0" cy="0"/>
+        </a:xfrm>
+      </p:grpSpPr>
+      <p:sp>
+        <p:nvSpPr>
+          <p:cNvPr id="2" name="Title 1">
+            <a:extLst>
+              <a:ext uri="{FF2B5EF4-FFF2-40B4-BE49-F238E27FC236}">
+                <a16:creationId xmlns:a16="http://schemas.microsoft.com/office/drawing/2014/main" id="{18535031-93D8-A936-7C5B-6D1C1A5A0454}"/>
+              </a:ext>
+            </a:extLst>
+          </p:cNvPr>
+          <p:cNvSpPr>
+            <a:spLocks noGrp="1"/>
+          </p:cNvSpPr>
+          <p:nvPr>
+            <p:ph type="title"/>
+          </p:nvPr>
+        </p:nvSpPr>
+        <p:spPr>
+          <a:xfrm>
+            <a:off x="838200" y="365125"/>
+            <a:ext cx="3211286" cy="1325563"/>
+          </a:xfrm>
+        </p:spPr>
+        <p:txBody>
+          <a:bodyPr/>
+          <a:lstStyle/>
+          <a:p>
+            <a:r>
+              <a:rPr lang="en-US" dirty="0">
+                <a:solidFill>
+                  <a:schemeClr val="accent4">
+                    <a:lumMod val="75000"/>
+                  </a:schemeClr>
+                </a:solidFill>
+              </a:rPr>
+              <a:t>Unit Testing</a:t>
+            </a:r>
+          </a:p>
+        </p:txBody>
+      </p:sp>
+      <p:graphicFrame>
+        <p:nvGraphicFramePr>
+          <p:cNvPr id="4" name="Table 3">
+            <a:extLst>
+              <a:ext uri="{FF2B5EF4-FFF2-40B4-BE49-F238E27FC236}">
+                <a16:creationId xmlns:a16="http://schemas.microsoft.com/office/drawing/2014/main" id="{80BBD2F5-7534-1CD7-43D2-6A9AEC96FA6A}"/>
+              </a:ext>
+            </a:extLst>
+          </p:cNvPr>
+          <p:cNvGraphicFramePr>
+            <a:graphicFrameLocks noGrp="1"/>
+          </p:cNvGraphicFramePr>
+          <p:nvPr/>
+        </p:nvGraphicFramePr>
+        <p:xfrm>
+          <a:off x="404453" y="1591570"/>
+          <a:ext cx="11383094" cy="4764025"/>
+        </p:xfrm>
+        <a:graphic>
+          <a:graphicData uri="http://schemas.openxmlformats.org/drawingml/2006/table">
+            <a:tbl>
+              <a:tblPr firstRow="1" bandRow="1">
+                <a:tableStyleId>{2D5ABB26-0587-4C30-8999-92F81FD0307C}</a:tableStyleId>
+              </a:tblPr>
+              <a:tblGrid>
+                <a:gridCol w="1177604">
+                  <a:extLst>
+                    <a:ext uri="{9D8B030D-6E8A-4147-A177-3AD203B41FA5}">
+                      <a16:colId xmlns:a16="http://schemas.microsoft.com/office/drawing/2014/main" val="140681280"/>
+                    </a:ext>
+                  </a:extLst>
+                </a:gridCol>
+                <a:gridCol w="1632857">
+                  <a:extLst>
+                    <a:ext uri="{9D8B030D-6E8A-4147-A177-3AD203B41FA5}">
+                      <a16:colId xmlns:a16="http://schemas.microsoft.com/office/drawing/2014/main" val="819792391"/>
+                    </a:ext>
+                  </a:extLst>
+                </a:gridCol>
+                <a:gridCol w="5130334">
+                  <a:extLst>
+                    <a:ext uri="{9D8B030D-6E8A-4147-A177-3AD203B41FA5}">
+                      <a16:colId xmlns:a16="http://schemas.microsoft.com/office/drawing/2014/main" val="3388334755"/>
+                    </a:ext>
+                  </a:extLst>
+                </a:gridCol>
+                <a:gridCol w="3442299">
+                  <a:extLst>
+                    <a:ext uri="{9D8B030D-6E8A-4147-A177-3AD203B41FA5}">
+                      <a16:colId xmlns:a16="http://schemas.microsoft.com/office/drawing/2014/main" val="1365888191"/>
+                    </a:ext>
+                  </a:extLst>
+                </a:gridCol>
+              </a:tblGrid>
+              <a:tr h="548783">
+                <a:tc>
+                  <a:txBody>
+                    <a:bodyPr/>
+                    <a:lstStyle/>
+                    <a:p>
+                      <a:pPr algn="just"/>
+                      <a:r>
+                        <a:rPr lang="en-US" sz="1400" dirty="0"/>
+                        <a:t>Command</a:t>
+                      </a:r>
+                    </a:p>
+                  </a:txBody>
+                  <a:tcPr marL="137160" marR="137160" marT="137160" marB="137160" anchor="ctr">
+                    <a:lnB w="12700" cap="flat" cmpd="sng" algn="ctr">
+                      <a:solidFill>
+                        <a:schemeClr val="tx1"/>
+                      </a:solidFill>
+                      <a:prstDash val="solid"/>
+                      <a:round/>
+                      <a:headEnd type="none" w="med" len="med"/>
+                      <a:tailEnd type="none" w="med" len="med"/>
+                    </a:lnB>
+                  </a:tcPr>
+                </a:tc>
+                <a:tc>
+                  <a:txBody>
+                    <a:bodyPr/>
+                    <a:lstStyle/>
+                    <a:p>
+                      <a:pPr algn="just"/>
+                      <a:r>
+                        <a:rPr lang="en-US" sz="1400" dirty="0"/>
+                        <a:t>Location</a:t>
+                      </a:r>
+                    </a:p>
+                  </a:txBody>
+                  <a:tcPr marL="137160" marR="137160" marT="137160" marB="137160" anchor="ctr">
+                    <a:lnB w="12700" cap="flat" cmpd="sng" algn="ctr">
+                      <a:solidFill>
+                        <a:schemeClr val="tx1"/>
+                      </a:solidFill>
+                      <a:prstDash val="solid"/>
+                      <a:round/>
+                      <a:headEnd type="none" w="med" len="med"/>
+                      <a:tailEnd type="none" w="med" len="med"/>
+                    </a:lnB>
+                  </a:tcPr>
+                </a:tc>
+                <a:tc>
+                  <a:txBody>
+                    <a:bodyPr/>
+                    <a:lstStyle/>
+                    <a:p>
+                      <a:pPr algn="just"/>
+                      <a:r>
+                        <a:rPr lang="en-US" sz="1400" dirty="0"/>
+                        <a:t>Description</a:t>
+                      </a:r>
+                    </a:p>
+                  </a:txBody>
+                  <a:tcPr marL="137160" marR="137160" marT="137160" marB="137160" anchor="ctr">
+                    <a:lnB w="12700" cap="flat" cmpd="sng" algn="ctr">
+                      <a:solidFill>
+                        <a:schemeClr val="tx1"/>
+                      </a:solidFill>
+                      <a:prstDash val="solid"/>
+                      <a:round/>
+                      <a:headEnd type="none" w="med" len="med"/>
+                      <a:tailEnd type="none" w="med" len="med"/>
+                    </a:lnB>
+                  </a:tcPr>
+                </a:tc>
+                <a:tc>
+                  <a:txBody>
+                    <a:bodyPr/>
+                    <a:lstStyle/>
+                    <a:p>
+                      <a:pPr algn="just"/>
+                      <a:r>
+                        <a:rPr lang="en-US" sz="1400" dirty="0"/>
+                        <a:t>Goal</a:t>
+                      </a:r>
+                    </a:p>
+                  </a:txBody>
+                  <a:tcPr marL="137160" marR="137160" marT="137160" marB="137160" anchor="ctr">
+                    <a:lnB w="12700" cap="flat" cmpd="sng" algn="ctr">
+                      <a:solidFill>
+                        <a:schemeClr val="tx1"/>
+                      </a:solidFill>
+                      <a:prstDash val="solid"/>
+                      <a:round/>
+                      <a:headEnd type="none" w="med" len="med"/>
+                      <a:tailEnd type="none" w="med" len="med"/>
+                    </a:lnB>
+                  </a:tcPr>
+                </a:tc>
+                <a:extLst>
+                  <a:ext uri="{0D108BD9-81ED-4DB2-BD59-A6C34878D82A}">
+                    <a16:rowId xmlns:a16="http://schemas.microsoft.com/office/drawing/2014/main" val="2761390173"/>
+                  </a:ext>
+                </a:extLst>
+              </a:tr>
+              <a:tr h="823174">
+                <a:tc>
+                  <a:txBody>
+                    <a:bodyPr/>
+                    <a:lstStyle/>
+                    <a:p>
+                      <a:pPr algn="just"/>
+                      <a:r>
+                        <a:rPr lang="en-US" sz="1400" dirty="0"/>
+                        <a:t>source </a:t>
+                      </a:r>
+                      <a:r>
+                        <a:rPr lang="en-US" sz="1400" dirty="0" err="1"/>
+                        <a:t>premake</a:t>
+                      </a:r>
+                      <a:endParaRPr lang="en-US" sz="1400" dirty="0"/>
+                    </a:p>
+                  </a:txBody>
+                  <a:tcPr marL="137160" marR="137160" marT="137160" marB="137160" anchor="ctr">
+                    <a:lnT w="12700" cap="flat" cmpd="sng" algn="ctr">
+                      <a:solidFill>
+                        <a:schemeClr val="tx1"/>
+                      </a:solidFill>
+                      <a:prstDash val="solid"/>
+                      <a:round/>
+                      <a:headEnd type="none" w="med" len="med"/>
+                      <a:tailEnd type="none" w="med" len="med"/>
+                    </a:lnT>
+                    <a:lnB w="12700" cap="flat" cmpd="sng" algn="ctr">
+                      <a:solidFill>
+                        <a:schemeClr val="tx1"/>
+                      </a:solidFill>
+                      <a:prstDash val="solid"/>
+                      <a:round/>
+                      <a:headEnd type="none" w="med" len="med"/>
+                      <a:tailEnd type="none" w="med" len="med"/>
+                    </a:lnB>
+                  </a:tcPr>
+                </a:tc>
+                <a:tc>
+                  <a:txBody>
+                    <a:bodyPr/>
+                    <a:lstStyle/>
+                    <a:p>
+                      <a:pPr algn="just"/>
+                      <a:r>
+                        <a:rPr lang="en-US" sz="1400" dirty="0" err="1"/>
+                        <a:t>premake</a:t>
+                      </a:r>
+                      <a:endParaRPr lang="en-US" sz="1400" dirty="0"/>
+                    </a:p>
+                  </a:txBody>
+                  <a:tcPr marL="137160" marR="137160" marT="137160" marB="137160" anchor="ctr">
+                    <a:lnT w="12700" cap="flat" cmpd="sng" algn="ctr">
+                      <a:solidFill>
+                        <a:schemeClr val="tx1"/>
+                      </a:solidFill>
+                      <a:prstDash val="solid"/>
+                      <a:round/>
+                      <a:headEnd type="none" w="med" len="med"/>
+                      <a:tailEnd type="none" w="med" len="med"/>
+                    </a:lnT>
+                    <a:lnB w="12700" cap="flat" cmpd="sng" algn="ctr">
+                      <a:solidFill>
+                        <a:schemeClr val="tx1"/>
+                      </a:solidFill>
+                      <a:prstDash val="solid"/>
+                      <a:round/>
+                      <a:headEnd type="none" w="med" len="med"/>
+                      <a:tailEnd type="none" w="med" len="med"/>
+                    </a:lnB>
+                  </a:tcPr>
+                </a:tc>
+                <a:tc>
+                  <a:txBody>
+                    <a:bodyPr/>
+                    <a:lstStyle/>
+                    <a:p>
+                      <a:pPr algn="just"/>
+                      <a:r>
+                        <a:rPr lang="en-US" sz="1400" dirty="0"/>
+                        <a:t>Environmental configuration allows additional utilities, strongly recommended when opening a new shell.</a:t>
+                      </a:r>
+                    </a:p>
+                  </a:txBody>
+                  <a:tcPr marL="137160" marR="137160" marT="137160" marB="137160" anchor="ctr">
+                    <a:lnT w="12700" cap="flat" cmpd="sng" algn="ctr">
+                      <a:solidFill>
+                        <a:schemeClr val="tx1"/>
+                      </a:solidFill>
+                      <a:prstDash val="solid"/>
+                      <a:round/>
+                      <a:headEnd type="none" w="med" len="med"/>
+                      <a:tailEnd type="none" w="med" len="med"/>
+                    </a:lnT>
+                    <a:lnB w="12700" cap="flat" cmpd="sng" algn="ctr">
+                      <a:solidFill>
+                        <a:schemeClr val="tx1"/>
+                      </a:solidFill>
+                      <a:prstDash val="solid"/>
+                      <a:round/>
+                      <a:headEnd type="none" w="med" len="med"/>
+                      <a:tailEnd type="none" w="med" len="med"/>
+                    </a:lnB>
+                  </a:tcPr>
+                </a:tc>
+                <a:tc>
+                  <a:txBody>
+                    <a:bodyPr/>
+                    <a:lstStyle/>
+                    <a:p>
+                      <a:pPr marL="0" marR="0" lvl="0" indent="0" algn="just" defTabSz="914400" rtl="0" eaLnBrk="1" fontAlgn="auto" latinLnBrk="0" hangingPunct="1">
+                        <a:lnSpc>
+                          <a:spcPct val="100000"/>
+                        </a:lnSpc>
+                        <a:spcBef>
+                          <a:spcPts val="0"/>
+                        </a:spcBef>
+                        <a:spcAft>
+                          <a:spcPts val="0"/>
+                        </a:spcAft>
+                        <a:buClrTx/>
+                        <a:buSzTx/>
+                        <a:buFontTx/>
+                        <a:buNone/>
+                        <a:tabLst/>
+                        <a:defRPr/>
+                      </a:pPr>
+                      <a:r>
+                        <a:rPr lang="en-US" sz="1400" dirty="0"/>
+                        <a:t>Use the source code instead of the installation.</a:t>
+                      </a:r>
+                    </a:p>
+                  </a:txBody>
+                  <a:tcPr marL="137160" marR="137160" marT="137160" marB="137160" anchor="ctr">
+                    <a:lnT w="12700" cap="flat" cmpd="sng" algn="ctr">
+                      <a:solidFill>
+                        <a:schemeClr val="tx1"/>
+                      </a:solidFill>
+                      <a:prstDash val="solid"/>
+                      <a:round/>
+                      <a:headEnd type="none" w="med" len="med"/>
+                      <a:tailEnd type="none" w="med" len="med"/>
+                    </a:lnT>
+                    <a:lnB w="12700" cap="flat" cmpd="sng" algn="ctr">
+                      <a:solidFill>
+                        <a:schemeClr val="tx1"/>
+                      </a:solidFill>
+                      <a:prstDash val="solid"/>
+                      <a:round/>
+                      <a:headEnd type="none" w="med" len="med"/>
+                      <a:tailEnd type="none" w="med" len="med"/>
+                    </a:lnB>
+                  </a:tcPr>
+                </a:tc>
+                <a:extLst>
+                  <a:ext uri="{0D108BD9-81ED-4DB2-BD59-A6C34878D82A}">
+                    <a16:rowId xmlns:a16="http://schemas.microsoft.com/office/drawing/2014/main" val="1825471136"/>
+                  </a:ext>
+                </a:extLst>
+              </a:tr>
+              <a:tr h="848017">
+                <a:tc>
+                  <a:txBody>
+                    <a:bodyPr/>
+                    <a:lstStyle/>
+                    <a:p>
+                      <a:pPr algn="just"/>
+                      <a:r>
+                        <a:rPr lang="en-US" sz="1400" dirty="0" err="1"/>
+                        <a:t>nemd_test</a:t>
+                      </a:r>
+                      <a:endParaRPr lang="en-US" sz="1400" dirty="0"/>
+                    </a:p>
+                  </a:txBody>
+                  <a:tcPr marL="137160" marR="137160" marT="137160" marB="137160" anchor="ctr">
+                    <a:lnT w="12700" cap="flat" cmpd="sng" algn="ctr">
+                      <a:solidFill>
+                        <a:schemeClr val="tx1"/>
+                      </a:solidFill>
+                      <a:prstDash val="solid"/>
+                      <a:round/>
+                      <a:headEnd type="none" w="med" len="med"/>
+                      <a:tailEnd type="none" w="med" len="med"/>
+                    </a:lnT>
+                    <a:lnB w="12700" cap="flat" cmpd="sng" algn="ctr">
+                      <a:solidFill>
+                        <a:schemeClr val="tx1"/>
+                      </a:solidFill>
+                      <a:prstDash val="solid"/>
+                      <a:round/>
+                      <a:headEnd type="none" w="med" len="med"/>
+                      <a:tailEnd type="none" w="med" len="med"/>
+                    </a:lnB>
+                  </a:tcPr>
+                </a:tc>
+                <a:tc>
+                  <a:txBody>
+                    <a:bodyPr/>
+                    <a:lstStyle/>
+                    <a:p>
+                      <a:pPr algn="just"/>
+                      <a:r>
+                        <a:rPr lang="en-US" sz="1400" dirty="0"/>
+                        <a:t>test/unit/</a:t>
+                      </a:r>
+                    </a:p>
+                  </a:txBody>
+                  <a:tcPr marL="137160" marR="137160" marT="137160" marB="137160" anchor="ctr">
+                    <a:lnT w="12700" cap="flat" cmpd="sng" algn="ctr">
+                      <a:solidFill>
+                        <a:schemeClr val="tx1"/>
+                      </a:solidFill>
+                      <a:prstDash val="solid"/>
+                      <a:round/>
+                      <a:headEnd type="none" w="med" len="med"/>
+                      <a:tailEnd type="none" w="med" len="med"/>
+                    </a:lnT>
+                    <a:lnB w="12700" cap="flat" cmpd="sng" algn="ctr">
+                      <a:solidFill>
+                        <a:schemeClr val="tx1"/>
+                      </a:solidFill>
+                      <a:prstDash val="solid"/>
+                      <a:round/>
+                      <a:headEnd type="none" w="med" len="med"/>
+                      <a:tailEnd type="none" w="med" len="med"/>
+                    </a:lnB>
+                  </a:tcPr>
+                </a:tc>
+                <a:tc>
+                  <a:txBody>
+                    <a:bodyPr/>
+                    <a:lstStyle/>
+                    <a:p>
+                      <a:pPr marL="0" marR="0" lvl="0" indent="0" algn="just" defTabSz="914400" rtl="0" eaLnBrk="1" fontAlgn="auto" latinLnBrk="0" hangingPunct="1">
+                        <a:lnSpc>
+                          <a:spcPct val="100000"/>
+                        </a:lnSpc>
+                        <a:spcBef>
+                          <a:spcPts val="0"/>
+                        </a:spcBef>
+                        <a:spcAft>
+                          <a:spcPts val="0"/>
+                        </a:spcAft>
+                        <a:buClrTx/>
+                        <a:buSzTx/>
+                        <a:buFontTx/>
+                        <a:buNone/>
+                        <a:tabLst/>
+                        <a:defRPr/>
+                      </a:pPr>
+                      <a:r>
+                        <a:rPr lang="en-US" sz="1400" dirty="0">
+                          <a:solidFill>
+                            <a:schemeClr val="accent4">
+                              <a:lumMod val="75000"/>
+                            </a:schemeClr>
+                          </a:solidFill>
+                        </a:rPr>
+                        <a:t>Unit testing </a:t>
+                      </a:r>
+                      <a:r>
+                        <a:rPr lang="en-US" sz="1400" dirty="0"/>
+                        <a:t>makes sure that functions and methods are operating as expected. (Bug-free for every piece)</a:t>
+                      </a:r>
+                    </a:p>
+                  </a:txBody>
+                  <a:tcPr marL="137160" marR="137160" marT="137160" marB="137160" anchor="ctr">
+                    <a:lnT w="12700" cap="flat" cmpd="sng" algn="ctr">
+                      <a:solidFill>
+                        <a:schemeClr val="tx1"/>
+                      </a:solidFill>
+                      <a:prstDash val="solid"/>
+                      <a:round/>
+                      <a:headEnd type="none" w="med" len="med"/>
+                      <a:tailEnd type="none" w="med" len="med"/>
+                    </a:lnT>
+                    <a:lnB w="12700" cap="flat" cmpd="sng" algn="ctr">
+                      <a:solidFill>
+                        <a:schemeClr val="tx1"/>
+                      </a:solidFill>
+                      <a:prstDash val="solid"/>
+                      <a:round/>
+                      <a:headEnd type="none" w="med" len="med"/>
+                      <a:tailEnd type="none" w="med" len="med"/>
+                    </a:lnB>
+                  </a:tcPr>
+                </a:tc>
+                <a:tc>
+                  <a:txBody>
+                    <a:bodyPr/>
+                    <a:lstStyle/>
+                    <a:p>
+                      <a:pPr marL="0" marR="0" lvl="0" indent="0" algn="just" defTabSz="914400" rtl="0" eaLnBrk="1" fontAlgn="auto" latinLnBrk="0" hangingPunct="1">
+                        <a:lnSpc>
+                          <a:spcPct val="100000"/>
+                        </a:lnSpc>
+                        <a:spcBef>
+                          <a:spcPts val="0"/>
+                        </a:spcBef>
+                        <a:spcAft>
+                          <a:spcPts val="0"/>
+                        </a:spcAft>
+                        <a:buClrTx/>
+                        <a:buSzTx/>
+                        <a:buFontTx/>
+                        <a:buNone/>
+                        <a:tabLst/>
+                        <a:defRPr/>
+                      </a:pPr>
+                      <a:r>
+                        <a:rPr lang="en-US" sz="1400" dirty="0"/>
+                        <a:t>Free of bugs when parameterizing every piece of the code.</a:t>
+                      </a:r>
+                    </a:p>
+                  </a:txBody>
+                  <a:tcPr marL="137160" marR="137160" marT="137160" marB="137160" anchor="ctr">
+                    <a:lnT w="12700" cap="flat" cmpd="sng" algn="ctr">
+                      <a:solidFill>
+                        <a:schemeClr val="tx1"/>
+                      </a:solidFill>
+                      <a:prstDash val="solid"/>
+                      <a:round/>
+                      <a:headEnd type="none" w="med" len="med"/>
+                      <a:tailEnd type="none" w="med" len="med"/>
+                    </a:lnT>
+                    <a:lnB w="12700" cap="flat" cmpd="sng" algn="ctr">
+                      <a:solidFill>
+                        <a:schemeClr val="tx1"/>
+                      </a:solidFill>
+                      <a:prstDash val="solid"/>
+                      <a:round/>
+                      <a:headEnd type="none" w="med" len="med"/>
+                      <a:tailEnd type="none" w="med" len="med"/>
+                    </a:lnB>
+                  </a:tcPr>
+                </a:tc>
+                <a:extLst>
+                  <a:ext uri="{0D108BD9-81ED-4DB2-BD59-A6C34878D82A}">
+                    <a16:rowId xmlns:a16="http://schemas.microsoft.com/office/drawing/2014/main" val="1370259124"/>
+                  </a:ext>
+                </a:extLst>
+              </a:tr>
+              <a:tr h="848017">
+                <a:tc>
+                  <a:txBody>
+                    <a:bodyPr/>
+                    <a:lstStyle/>
+                    <a:p>
+                      <a:pPr algn="just"/>
+                      <a:r>
+                        <a:rPr lang="en-US" sz="1400" dirty="0" err="1"/>
+                        <a:t>nemd_itest</a:t>
+                      </a:r>
+                      <a:endParaRPr lang="en-US" sz="1400" dirty="0"/>
+                    </a:p>
+                  </a:txBody>
+                  <a:tcPr marL="137160" marR="137160" marT="137160" marB="137160" anchor="ctr">
+                    <a:lnT w="12700" cap="flat" cmpd="sng" algn="ctr">
+                      <a:solidFill>
+                        <a:schemeClr val="tx1"/>
+                      </a:solidFill>
+                      <a:prstDash val="solid"/>
+                      <a:round/>
+                      <a:headEnd type="none" w="med" len="med"/>
+                      <a:tailEnd type="none" w="med" len="med"/>
+                    </a:lnT>
+                    <a:lnB w="12700" cap="flat" cmpd="sng" algn="ctr">
+                      <a:solidFill>
+                        <a:schemeClr val="tx1"/>
+                      </a:solidFill>
+                      <a:prstDash val="solid"/>
+                      <a:round/>
+                      <a:headEnd type="none" w="med" len="med"/>
+                      <a:tailEnd type="none" w="med" len="med"/>
+                    </a:lnB>
+                  </a:tcPr>
+                </a:tc>
+                <a:tc>
+                  <a:txBody>
+                    <a:bodyPr/>
+                    <a:lstStyle/>
+                    <a:p>
+                      <a:pPr marL="0" marR="0" lvl="0" indent="0" algn="just" defTabSz="914400" rtl="0" eaLnBrk="1" fontAlgn="auto" latinLnBrk="0" hangingPunct="1">
+                        <a:lnSpc>
+                          <a:spcPct val="100000"/>
+                        </a:lnSpc>
+                        <a:spcBef>
+                          <a:spcPts val="0"/>
+                        </a:spcBef>
+                        <a:spcAft>
+                          <a:spcPts val="0"/>
+                        </a:spcAft>
+                        <a:buClrTx/>
+                        <a:buSzTx/>
+                        <a:buFontTx/>
+                        <a:buNone/>
+                        <a:tabLst/>
+                        <a:defRPr/>
+                      </a:pPr>
+                      <a:r>
+                        <a:rPr lang="en-US" sz="1400" dirty="0"/>
+                        <a:t>test/integration/</a:t>
+                      </a:r>
+                    </a:p>
+                  </a:txBody>
+                  <a:tcPr marL="137160" marR="137160" marT="137160" marB="137160" anchor="ctr">
+                    <a:lnT w="12700" cap="flat" cmpd="sng" algn="ctr">
+                      <a:solidFill>
+                        <a:schemeClr val="tx1"/>
+                      </a:solidFill>
+                      <a:prstDash val="solid"/>
+                      <a:round/>
+                      <a:headEnd type="none" w="med" len="med"/>
+                      <a:tailEnd type="none" w="med" len="med"/>
+                    </a:lnT>
+                    <a:lnB w="12700" cap="flat" cmpd="sng" algn="ctr">
+                      <a:solidFill>
+                        <a:schemeClr val="tx1"/>
+                      </a:solidFill>
+                      <a:prstDash val="solid"/>
+                      <a:round/>
+                      <a:headEnd type="none" w="med" len="med"/>
+                      <a:tailEnd type="none" w="med" len="med"/>
+                    </a:lnB>
+                  </a:tcPr>
+                </a:tc>
+                <a:tc>
+                  <a:txBody>
+                    <a:bodyPr/>
+                    <a:lstStyle/>
+                    <a:p>
+                      <a:pPr algn="just"/>
+                      <a:r>
+                        <a:rPr lang="en-US" sz="1400" kern="1200" dirty="0">
+                          <a:solidFill>
+                            <a:schemeClr val="accent6"/>
+                          </a:solidFill>
+                          <a:effectLst/>
+                        </a:rPr>
+                        <a:t>Integration testing</a:t>
+                      </a:r>
+                      <a:r>
+                        <a:rPr lang="en-US" sz="1400" kern="1200" dirty="0">
+                          <a:effectLst/>
+                        </a:rPr>
+                        <a:t> </a:t>
+                      </a:r>
+                      <a:r>
+                        <a:rPr lang="en-US" sz="1400" dirty="0"/>
+                        <a:t>makes sure that scripts run without tracebacks and yield reproducible results. </a:t>
+                      </a:r>
+                    </a:p>
+                  </a:txBody>
+                  <a:tcPr marL="137160" marR="137160" marT="137160" marB="137160" anchor="ctr">
+                    <a:lnT w="12700" cap="flat" cmpd="sng" algn="ctr">
+                      <a:solidFill>
+                        <a:schemeClr val="tx1"/>
+                      </a:solidFill>
+                      <a:prstDash val="solid"/>
+                      <a:round/>
+                      <a:headEnd type="none" w="med" len="med"/>
+                      <a:tailEnd type="none" w="med" len="med"/>
+                    </a:lnT>
+                    <a:lnB w="12700" cap="flat" cmpd="sng" algn="ctr">
+                      <a:solidFill>
+                        <a:schemeClr val="tx1"/>
+                      </a:solidFill>
+                      <a:prstDash val="solid"/>
+                      <a:round/>
+                      <a:headEnd type="none" w="med" len="med"/>
+                      <a:tailEnd type="none" w="med" len="med"/>
+                    </a:lnB>
+                  </a:tcPr>
+                </a:tc>
+                <a:tc>
+                  <a:txBody>
+                    <a:bodyPr/>
+                    <a:lstStyle/>
+                    <a:p>
+                      <a:pPr algn="just"/>
+                      <a:r>
+                        <a:rPr lang="en-US" sz="1400" dirty="0"/>
+                        <a:t>Expected behavior and accuracy when driver and workflow combines pieces.</a:t>
+                      </a:r>
+                    </a:p>
+                  </a:txBody>
+                  <a:tcPr marL="137160" marR="137160" marT="137160" marB="137160" anchor="ctr">
+                    <a:lnT w="12700" cap="flat" cmpd="sng" algn="ctr">
+                      <a:solidFill>
+                        <a:schemeClr val="tx1"/>
+                      </a:solidFill>
+                      <a:prstDash val="solid"/>
+                      <a:round/>
+                      <a:headEnd type="none" w="med" len="med"/>
+                      <a:tailEnd type="none" w="med" len="med"/>
+                    </a:lnT>
+                    <a:lnB w="12700" cap="flat" cmpd="sng" algn="ctr">
+                      <a:solidFill>
+                        <a:schemeClr val="tx1"/>
+                      </a:solidFill>
+                      <a:prstDash val="solid"/>
+                      <a:round/>
+                      <a:headEnd type="none" w="med" len="med"/>
+                      <a:tailEnd type="none" w="med" len="med"/>
+                    </a:lnB>
+                  </a:tcPr>
+                </a:tc>
+                <a:extLst>
+                  <a:ext uri="{0D108BD9-81ED-4DB2-BD59-A6C34878D82A}">
+                    <a16:rowId xmlns:a16="http://schemas.microsoft.com/office/drawing/2014/main" val="1118220872"/>
+                  </a:ext>
+                </a:extLst>
+              </a:tr>
+              <a:tr h="848017">
+                <a:tc>
+                  <a:txBody>
+                    <a:bodyPr/>
+                    <a:lstStyle/>
+                    <a:p>
+                      <a:pPr algn="just"/>
+                      <a:r>
+                        <a:rPr lang="en-US" sz="1400" dirty="0" err="1"/>
+                        <a:t>nemd_ptest</a:t>
+                      </a:r>
+                      <a:endParaRPr lang="en-US" sz="1400" dirty="0"/>
+                    </a:p>
+                  </a:txBody>
+                  <a:tcPr marL="137160" marR="137160" marT="137160" marB="137160" anchor="ctr">
+                    <a:lnT w="12700" cap="flat" cmpd="sng" algn="ctr">
+                      <a:solidFill>
+                        <a:schemeClr val="tx1"/>
+                      </a:solidFill>
+                      <a:prstDash val="solid"/>
+                      <a:round/>
+                      <a:headEnd type="none" w="med" len="med"/>
+                      <a:tailEnd type="none" w="med" len="med"/>
+                    </a:lnT>
+                    <a:lnB w="12700" cap="flat" cmpd="sng" algn="ctr">
+                      <a:solidFill>
+                        <a:schemeClr val="tx1"/>
+                      </a:solidFill>
+                      <a:prstDash val="solid"/>
+                      <a:round/>
+                      <a:headEnd type="none" w="med" len="med"/>
+                      <a:tailEnd type="none" w="med" len="med"/>
+                    </a:lnB>
+                  </a:tcPr>
+                </a:tc>
+                <a:tc>
+                  <a:txBody>
+                    <a:bodyPr/>
+                    <a:lstStyle/>
+                    <a:p>
+                      <a:pPr algn="just"/>
+                      <a:r>
+                        <a:rPr lang="en-US" sz="1400" dirty="0"/>
+                        <a:t>test/performance/</a:t>
+                      </a:r>
+                    </a:p>
+                  </a:txBody>
+                  <a:tcPr marL="137160" marR="137160" marT="137160" marB="137160" anchor="ctr">
+                    <a:lnT w="12700" cap="flat" cmpd="sng" algn="ctr">
+                      <a:solidFill>
+                        <a:schemeClr val="tx1"/>
+                      </a:solidFill>
+                      <a:prstDash val="solid"/>
+                      <a:round/>
+                      <a:headEnd type="none" w="med" len="med"/>
+                      <a:tailEnd type="none" w="med" len="med"/>
+                    </a:lnT>
+                    <a:lnB w="12700" cap="flat" cmpd="sng" algn="ctr">
+                      <a:solidFill>
+                        <a:schemeClr val="tx1"/>
+                      </a:solidFill>
+                      <a:prstDash val="solid"/>
+                      <a:round/>
+                      <a:headEnd type="none" w="med" len="med"/>
+                      <a:tailEnd type="none" w="med" len="med"/>
+                    </a:lnB>
+                  </a:tcPr>
+                </a:tc>
+                <a:tc>
+                  <a:txBody>
+                    <a:bodyPr/>
+                    <a:lstStyle/>
+                    <a:p>
+                      <a:pPr algn="just"/>
+                      <a:r>
+                        <a:rPr lang="en-US" sz="1400" dirty="0">
+                          <a:solidFill>
+                            <a:schemeClr val="accent1"/>
+                          </a:solidFill>
+                        </a:rPr>
+                        <a:t>Performance testing </a:t>
+                      </a:r>
+                      <a:r>
+                        <a:rPr lang="en-US" sz="1400" b="0" i="0" kern="1200" dirty="0">
+                          <a:solidFill>
+                            <a:schemeClr val="tx1"/>
+                          </a:solidFill>
+                          <a:effectLst/>
+                          <a:latin typeface="+mn-lt"/>
+                          <a:ea typeface="+mn-ea"/>
+                          <a:cs typeface="+mn-cs"/>
+                        </a:rPr>
+                        <a:t>evaluates the speed, responsiveness and stability for bottleneck identification and nullification. </a:t>
+                      </a:r>
+                      <a:endParaRPr lang="en-US" sz="1400" dirty="0"/>
+                    </a:p>
+                  </a:txBody>
+                  <a:tcPr marL="137160" marR="137160" marT="137160" marB="137160" anchor="ctr">
+                    <a:lnT w="12700" cap="flat" cmpd="sng" algn="ctr">
+                      <a:solidFill>
+                        <a:schemeClr val="tx1"/>
+                      </a:solidFill>
+                      <a:prstDash val="solid"/>
+                      <a:round/>
+                      <a:headEnd type="none" w="med" len="med"/>
+                      <a:tailEnd type="none" w="med" len="med"/>
+                    </a:lnT>
+                    <a:lnB w="12700" cap="flat" cmpd="sng" algn="ctr">
+                      <a:solidFill>
+                        <a:schemeClr val="tx1"/>
+                      </a:solidFill>
+                      <a:prstDash val="solid"/>
+                      <a:round/>
+                      <a:headEnd type="none" w="med" len="med"/>
+                      <a:tailEnd type="none" w="med" len="med"/>
+                    </a:lnB>
+                  </a:tcPr>
+                </a:tc>
+                <a:tc>
+                  <a:txBody>
+                    <a:bodyPr/>
+                    <a:lstStyle/>
+                    <a:p>
+                      <a:pPr algn="just"/>
+                      <a:r>
+                        <a:rPr lang="en-US" sz="1400" dirty="0"/>
+                        <a:t>Resource efficiency on scaling up.</a:t>
+                      </a:r>
+                    </a:p>
+                  </a:txBody>
+                  <a:tcPr marL="137160" marR="137160" marT="137160" marB="137160" anchor="ctr">
+                    <a:lnT w="12700" cap="flat" cmpd="sng" algn="ctr">
+                      <a:solidFill>
+                        <a:schemeClr val="tx1"/>
+                      </a:solidFill>
+                      <a:prstDash val="solid"/>
+                      <a:round/>
+                      <a:headEnd type="none" w="med" len="med"/>
+                      <a:tailEnd type="none" w="med" len="med"/>
+                    </a:lnT>
+                    <a:lnB w="12700" cap="flat" cmpd="sng" algn="ctr">
+                      <a:solidFill>
+                        <a:schemeClr val="tx1"/>
+                      </a:solidFill>
+                      <a:prstDash val="solid"/>
+                      <a:round/>
+                      <a:headEnd type="none" w="med" len="med"/>
+                      <a:tailEnd type="none" w="med" len="med"/>
+                    </a:lnB>
+                  </a:tcPr>
+                </a:tc>
+                <a:extLst>
+                  <a:ext uri="{0D108BD9-81ED-4DB2-BD59-A6C34878D82A}">
+                    <a16:rowId xmlns:a16="http://schemas.microsoft.com/office/drawing/2014/main" val="865586714"/>
+                  </a:ext>
+                </a:extLst>
+              </a:tr>
+              <a:tr h="848017">
+                <a:tc>
+                  <a:txBody>
+                    <a:bodyPr/>
+                    <a:lstStyle/>
+                    <a:p>
+                      <a:pPr algn="just"/>
+                      <a:r>
+                        <a:rPr lang="en-US" sz="1400" dirty="0" err="1"/>
+                        <a:t>nemd_stest</a:t>
+                      </a:r>
+                      <a:endParaRPr lang="en-US" sz="1400" dirty="0"/>
+                    </a:p>
+                  </a:txBody>
+                  <a:tcPr marL="137160" marR="137160" marT="137160" marB="137160" anchor="ctr">
+                    <a:lnT w="12700" cap="flat" cmpd="sng" algn="ctr">
+                      <a:solidFill>
+                        <a:schemeClr val="tx1"/>
+                      </a:solidFill>
+                      <a:prstDash val="solid"/>
+                      <a:round/>
+                      <a:headEnd type="none" w="med" len="med"/>
+                      <a:tailEnd type="none" w="med" len="med"/>
+                    </a:lnT>
+                    <a:lnB w="12700" cap="flat" cmpd="sng" algn="ctr">
+                      <a:solidFill>
+                        <a:schemeClr val="tx1"/>
+                      </a:solidFill>
+                      <a:prstDash val="solid"/>
+                      <a:round/>
+                      <a:headEnd type="none" w="med" len="med"/>
+                      <a:tailEnd type="none" w="med" len="med"/>
+                    </a:lnB>
+                  </a:tcPr>
+                </a:tc>
+                <a:tc>
+                  <a:txBody>
+                    <a:bodyPr/>
+                    <a:lstStyle/>
+                    <a:p>
+                      <a:pPr algn="just"/>
+                      <a:r>
+                        <a:rPr lang="en-US" sz="1400" dirty="0"/>
+                        <a:t>test/scientific/</a:t>
+                      </a:r>
+                    </a:p>
+                  </a:txBody>
+                  <a:tcPr marL="137160" marR="137160" marT="137160" marB="137160" anchor="ctr">
+                    <a:lnT w="12700" cap="flat" cmpd="sng" algn="ctr">
+                      <a:solidFill>
+                        <a:schemeClr val="tx1"/>
+                      </a:solidFill>
+                      <a:prstDash val="solid"/>
+                      <a:round/>
+                      <a:headEnd type="none" w="med" len="med"/>
+                      <a:tailEnd type="none" w="med" len="med"/>
+                    </a:lnT>
+                    <a:lnB w="12700" cap="flat" cmpd="sng" algn="ctr">
+                      <a:solidFill>
+                        <a:schemeClr val="tx1"/>
+                      </a:solidFill>
+                      <a:prstDash val="solid"/>
+                      <a:round/>
+                      <a:headEnd type="none" w="med" len="med"/>
+                      <a:tailEnd type="none" w="med" len="med"/>
+                    </a:lnB>
+                  </a:tcPr>
+                </a:tc>
+                <a:tc>
+                  <a:txBody>
+                    <a:bodyPr/>
+                    <a:lstStyle/>
+                    <a:p>
+                      <a:pPr algn="just"/>
+                      <a:r>
+                        <a:rPr lang="en-US" sz="1400" kern="1200" dirty="0">
+                          <a:solidFill>
+                            <a:schemeClr val="accent2"/>
+                          </a:solidFill>
+                          <a:latin typeface="+mn-lt"/>
+                          <a:ea typeface="+mn-ea"/>
+                          <a:cs typeface="+mn-cs"/>
+                        </a:rPr>
+                        <a:t>Scientific testing </a:t>
+                      </a:r>
+                      <a:r>
+                        <a:rPr lang="en-US" sz="1400" dirty="0"/>
+                        <a:t>ensures the repeatability, correctness and </a:t>
+                      </a:r>
+                      <a:r>
+                        <a:rPr lang="en-US" sz="1400" b="0" i="0" kern="1200" dirty="0">
+                          <a:solidFill>
+                            <a:schemeClr val="tx1"/>
+                          </a:solidFill>
+                          <a:effectLst/>
+                          <a:latin typeface="+mn-lt"/>
+                          <a:ea typeface="+mn-ea"/>
+                          <a:cs typeface="+mn-cs"/>
+                        </a:rPr>
+                        <a:t>accuracy of the </a:t>
+                      </a:r>
+                      <a:r>
+                        <a:rPr lang="en-US" sz="1400" dirty="0"/>
+                        <a:t>scientific outputs. </a:t>
+                      </a:r>
+                    </a:p>
+                  </a:txBody>
+                  <a:tcPr marL="137160" marR="137160" marT="137160" marB="137160" anchor="ctr">
+                    <a:lnT w="12700" cap="flat" cmpd="sng" algn="ctr">
+                      <a:solidFill>
+                        <a:schemeClr val="tx1"/>
+                      </a:solidFill>
+                      <a:prstDash val="solid"/>
+                      <a:round/>
+                      <a:headEnd type="none" w="med" len="med"/>
+                      <a:tailEnd type="none" w="med" len="med"/>
+                    </a:lnT>
+                    <a:lnB w="12700" cap="flat" cmpd="sng" algn="ctr">
+                      <a:solidFill>
+                        <a:schemeClr val="tx1"/>
+                      </a:solidFill>
+                      <a:prstDash val="solid"/>
+                      <a:round/>
+                      <a:headEnd type="none" w="med" len="med"/>
+                      <a:tailEnd type="none" w="med" len="med"/>
+                    </a:lnB>
+                  </a:tcPr>
+                </a:tc>
+                <a:tc>
+                  <a:txBody>
+                    <a:bodyPr/>
+                    <a:lstStyle/>
+                    <a:p>
+                      <a:pPr algn="just"/>
+                      <a:r>
+                        <a:rPr lang="en-US" sz="1400" dirty="0"/>
+                        <a:t>Physical meaning and standard deviation.</a:t>
+                      </a:r>
+                    </a:p>
+                  </a:txBody>
+                  <a:tcPr marL="137160" marR="137160" marT="137160" marB="137160" anchor="ctr">
+                    <a:lnT w="12700" cap="flat" cmpd="sng" algn="ctr">
+                      <a:solidFill>
+                        <a:schemeClr val="tx1"/>
+                      </a:solidFill>
+                      <a:prstDash val="solid"/>
+                      <a:round/>
+                      <a:headEnd type="none" w="med" len="med"/>
+                      <a:tailEnd type="none" w="med" len="med"/>
+                    </a:lnT>
+                    <a:lnB w="12700" cap="flat" cmpd="sng" algn="ctr">
+                      <a:solidFill>
+                        <a:schemeClr val="tx1"/>
+                      </a:solidFill>
+                      <a:prstDash val="solid"/>
+                      <a:round/>
+                      <a:headEnd type="none" w="med" len="med"/>
+                      <a:tailEnd type="none" w="med" len="med"/>
+                    </a:lnB>
+                  </a:tcPr>
+                </a:tc>
+                <a:extLst>
+                  <a:ext uri="{0D108BD9-81ED-4DB2-BD59-A6C34878D82A}">
+                    <a16:rowId xmlns:a16="http://schemas.microsoft.com/office/drawing/2014/main" val="3550715119"/>
+                  </a:ext>
+                </a:extLst>
+              </a:tr>
+            </a:tbl>
+          </a:graphicData>
+        </a:graphic>
+      </p:graphicFrame>
+      <p:sp>
+        <p:nvSpPr>
+          <p:cNvPr id="3" name="Slide Number Placeholder 2">
+            <a:extLst>
+              <a:ext uri="{FF2B5EF4-FFF2-40B4-BE49-F238E27FC236}">
+                <a16:creationId xmlns:a16="http://schemas.microsoft.com/office/drawing/2014/main" id="{93005D0D-F223-1F94-65FC-E62DB7B920D8}"/>
+              </a:ext>
+            </a:extLst>
+          </p:cNvPr>
+          <p:cNvSpPr>
+            <a:spLocks noGrp="1"/>
+          </p:cNvSpPr>
+          <p:nvPr>
+            <p:ph type="sldNum" sz="quarter" idx="12"/>
+          </p:nvPr>
+        </p:nvSpPr>
+        <p:spPr/>
+        <p:txBody>
+          <a:bodyPr/>
+          <a:lstStyle/>
+          <a:p>
+            <a:fld id="{CF79FC58-3559-EC47-B32E-5EF128B06581}" type="slidenum">
+              <a:rPr lang="en-US" smtClean="0"/>
+              <a:t>10</a:t>
+            </a:fld>
+            <a:endParaRPr lang="en-US"/>
+          </a:p>
+        </p:txBody>
+      </p:sp>
+      <p:sp>
+        <p:nvSpPr>
+          <p:cNvPr id="6" name="TextBox 5">
+            <a:extLst>
+              <a:ext uri="{FF2B5EF4-FFF2-40B4-BE49-F238E27FC236}">
+                <a16:creationId xmlns:a16="http://schemas.microsoft.com/office/drawing/2014/main" id="{81139EAB-FAE4-FB7B-AED3-4DD3FAC9C920}"/>
+              </a:ext>
+            </a:extLst>
+          </p:cNvPr>
+          <p:cNvSpPr txBox="1"/>
+          <p:nvPr/>
+        </p:nvSpPr>
+        <p:spPr>
+          <a:xfrm>
+            <a:off x="714893" y="6355595"/>
+            <a:ext cx="6097064" cy="307777"/>
+          </a:xfrm>
+          <a:prstGeom prst="rect">
+            <a:avLst/>
+          </a:prstGeom>
+          <a:noFill/>
+        </p:spPr>
+        <p:txBody>
+          <a:bodyPr wrap="square">
+            <a:spAutoFit/>
+          </a:bodyPr>
+          <a:lstStyle/>
+          <a:p>
+            <a:pPr marL="0" marR="0" lvl="0" indent="0" algn="just" defTabSz="914400" rtl="0" eaLnBrk="1" fontAlgn="auto" latinLnBrk="0" hangingPunct="1">
+              <a:lnSpc>
+                <a:spcPct val="100000"/>
+              </a:lnSpc>
+              <a:spcBef>
+                <a:spcPts val="0"/>
+              </a:spcBef>
+              <a:spcAft>
+                <a:spcPts val="0"/>
+              </a:spcAft>
+              <a:buClrTx/>
+              <a:buSzTx/>
+              <a:buFontTx/>
+              <a:buNone/>
+              <a:tabLst/>
+              <a:defRPr/>
+            </a:pPr>
+            <a:r>
+              <a:rPr lang="en-US" sz="1400" i="1" dirty="0"/>
+              <a:t>* source </a:t>
+            </a:r>
+            <a:r>
+              <a:rPr lang="en-US" sz="1400" i="1" dirty="0" err="1"/>
+              <a:t>premake</a:t>
+            </a:r>
+            <a:r>
+              <a:rPr lang="en-US" sz="1400" dirty="0"/>
+              <a:t> before running tests</a:t>
+            </a:r>
+          </a:p>
+        </p:txBody>
+      </p:sp>
+    </p:spTree>
+    <p:extLst>
+      <p:ext uri="{BB962C8B-B14F-4D97-AF65-F5344CB8AC3E}">
+        <p14:creationId xmlns:p14="http://schemas.microsoft.com/office/powerpoint/2010/main" val="3561220033"/>
+      </p:ext>
+    </p:extLst>
+  </p:cSld>
+  <p:clrMapOvr>
+    <a:masterClrMapping/>
+  </p:clrMapOvr>
+</p:sld>
+</file>
+
+<file path=ppt/slides/slide11.xml><?xml version="1.0" encoding="utf-8"?>
+<p:sld xmlns:a="http://schemas.openxmlformats.org/drawingml/2006/main" xmlns:r="http://schemas.openxmlformats.org/officeDocument/2006/relationships" xmlns:p="http://schemas.openxmlformats.org/presentationml/2006/main">
+  <p:cSld>
+    <p:spTree>
+      <p:nvGrpSpPr>
         <p:cNvPr id="1" name=""/>
         <p:cNvGrpSpPr/>
         <p:nvPr/>
@@ -7074,14 +8318,14 @@
           <p:nvPr>
             <p:extLst>
               <p:ext uri="{D42A27DB-BD31-4B8C-83A1-F6EECF244321}">
-                <p14:modId xmlns:p14="http://schemas.microsoft.com/office/powerpoint/2010/main" val="531743047"/>
+                <p14:modId xmlns:p14="http://schemas.microsoft.com/office/powerpoint/2010/main" val="3302656785"/>
               </p:ext>
             </p:extLst>
           </p:nvPr>
         </p:nvGraphicFramePr>
         <p:xfrm>
-          <a:off x="6845438" y="431766"/>
-          <a:ext cx="4841736" cy="1527050"/>
+          <a:off x="6473375" y="431766"/>
+          <a:ext cx="5268686" cy="1527050"/>
         </p:xfrm>
         <a:graphic>
           <a:graphicData uri="http://schemas.openxmlformats.org/drawingml/2006/table">
@@ -7090,14 +8334,14 @@
                 <a:tableStyleId>{C083E6E3-FA7D-4D7B-A595-EF9225AFEA82}</a:tableStyleId>
               </a:tblPr>
               <a:tblGrid>
-                <a:gridCol w="812662">
+                <a:gridCol w="884324">
                   <a:extLst>
                     <a:ext uri="{9D8B030D-6E8A-4147-A177-3AD203B41FA5}">
                       <a16:colId xmlns:a16="http://schemas.microsoft.com/office/drawing/2014/main" val="1700155147"/>
                     </a:ext>
                   </a:extLst>
                 </a:gridCol>
-                <a:gridCol w="4029074">
+                <a:gridCol w="4384362">
                   <a:extLst>
                     <a:ext uri="{9D8B030D-6E8A-4147-A177-3AD203B41FA5}">
                       <a16:colId xmlns:a16="http://schemas.microsoft.com/office/drawing/2014/main" val="4090573760"/>
@@ -7320,26 +8564,8 @@
                           <a:ea typeface="+mn-ea"/>
                           <a:cs typeface="+mn-cs"/>
                         </a:rPr>
-                        <a:t>Shell syntax </a:t>
-                      </a:r>
-                      <a:r>
-                        <a:rPr lang="en-US" sz="1400" kern="1200" dirty="0">
-                          <a:solidFill>
-                            <a:schemeClr val="accent2"/>
-                          </a:solidFill>
-                          <a:effectLst/>
-                        </a:rPr>
-                        <a:t>to check the results against expectations</a:t>
-                      </a:r>
-                      <a:endParaRPr lang="en-US" sz="1400" kern="1200" dirty="0">
-                        <a:solidFill>
-                          <a:schemeClr val="accent2"/>
-                        </a:solidFill>
-                        <a:effectLst/>
-                        <a:latin typeface="+mn-lt"/>
-                        <a:ea typeface="+mn-ea"/>
-                        <a:cs typeface="+mn-cs"/>
-                      </a:endParaRPr>
+                        <a:t>Shell commands to check the results against expectations</a:t>
+                      </a:r>
                     </a:p>
                   </a:txBody>
                   <a:tcPr/>
@@ -7424,7 +8650,28 @@
                           </a:solidFill>
                           <a:effectLst/>
                         </a:rPr>
-                        <a:t>Tag the execution (e.g., name, cost)</a:t>
+                        <a:t>Tag the </a:t>
+                      </a:r>
+                      <a:r>
+                        <a:rPr lang="en-US" sz="1400" kern="1200" dirty="0">
+                          <a:solidFill>
+                            <a:schemeClr val="accent1"/>
+                          </a:solidFill>
+                          <a:effectLst/>
+                          <a:latin typeface="+mn-lt"/>
+                          <a:ea typeface="+mn-ea"/>
+                          <a:cs typeface="+mn-cs"/>
+                        </a:rPr>
+                        <a:t>execution in shell syntax  </a:t>
+                      </a:r>
+                      <a:r>
+                        <a:rPr lang="en-US" sz="1400" kern="1200" dirty="0">
+                          <a:solidFill>
+                            <a:schemeClr val="accent1"/>
+                          </a:solidFill>
+                          <a:effectLst/>
+                        </a:rPr>
+                        <a:t>(e.g., name, cost)</a:t>
                       </a:r>
                       <a:endParaRPr lang="en-US" sz="1400" kern="1200" dirty="0">
                         <a:solidFill>
@@ -7516,7 +8763,7 @@
                           <a:ea typeface="+mn-ea"/>
                           <a:cs typeface="+mn-cs"/>
                         </a:rPr>
-                        <a:t>Parametrize one command into multiple</a:t>
+                        <a:t>Parametrize one command into multiples</a:t>
                       </a:r>
                     </a:p>
                   </a:txBody>
@@ -7547,14 +8794,14 @@
           <p:nvPr>
             <p:extLst>
               <p:ext uri="{D42A27DB-BD31-4B8C-83A1-F6EECF244321}">
-                <p14:modId xmlns:p14="http://schemas.microsoft.com/office/powerpoint/2010/main" val="1910268348"/>
+                <p14:modId xmlns:p14="http://schemas.microsoft.com/office/powerpoint/2010/main" val="309713289"/>
               </p:ext>
             </p:extLst>
           </p:nvPr>
         </p:nvGraphicFramePr>
         <p:xfrm>
-          <a:off x="6845438" y="2078219"/>
-          <a:ext cx="4841735" cy="2133600"/>
+          <a:off x="6473375" y="2078219"/>
+          <a:ext cx="5268685" cy="2133600"/>
         </p:xfrm>
         <a:graphic>
           <a:graphicData uri="http://schemas.openxmlformats.org/drawingml/2006/table">
@@ -7563,14 +8810,14 @@
                 <a:tableStyleId>{21E4AEA4-8DFA-4A89-87EB-49C32662AFE0}</a:tableStyleId>
               </a:tblPr>
               <a:tblGrid>
-                <a:gridCol w="1041262">
+                <a:gridCol w="1676400">
                   <a:extLst>
                     <a:ext uri="{9D8B030D-6E8A-4147-A177-3AD203B41FA5}">
                       <a16:colId xmlns:a16="http://schemas.microsoft.com/office/drawing/2014/main" val="3737494183"/>
                     </a:ext>
                   </a:extLst>
                 </a:gridCol>
-                <a:gridCol w="3800473">
+                <a:gridCol w="3592285">
                   <a:extLst>
                     <a:ext uri="{9D8B030D-6E8A-4147-A177-3AD203B41FA5}">
                       <a16:colId xmlns:a16="http://schemas.microsoft.com/office/drawing/2014/main" val="2798767956"/>
@@ -7618,7 +8865,13 @@
                         <a:rPr lang="en-US" sz="1400" kern="1200" dirty="0">
                           <a:effectLst/>
                         </a:rPr>
-                        <a:t>shell syntax</a:t>
+                        <a:t>shell </a:t>
+                      </a:r>
+                      <a:r>
+                        <a:rPr lang="en-US" sz="1400" kern="1200" dirty="0" err="1">
+                          <a:effectLst/>
+                        </a:rPr>
+                        <a:t>cmd</a:t>
                       </a:r>
                       <a:endParaRPr lang="en-US" sz="1400" dirty="0"/>
                     </a:p>
@@ -7651,10 +8904,16 @@
                     <a:lstStyle/>
                     <a:p>
                       <a:r>
+                        <a:rPr lang="en-US" sz="1400" kern="1200" dirty="0" err="1">
+                          <a:effectLst/>
+                        </a:rPr>
+                        <a:t>nemd_check</a:t>
+                      </a:r>
+                      <a:r>
                         <a:rPr lang="en-US" sz="1400" kern="1200" dirty="0">
                           <a:effectLst/>
                         </a:rPr>
-                        <a:t>exist</a:t>
+                        <a:t> exist</a:t>
                       </a:r>
                       <a:endParaRPr lang="en-US" sz="1400" dirty="0"/>
                     </a:p>
@@ -7690,10 +8949,16 @@
                     <a:lstStyle/>
                     <a:p>
                       <a:r>
+                        <a:rPr lang="en-US" sz="1400" kern="1200" dirty="0" err="1">
+                          <a:effectLst/>
+                        </a:rPr>
+                        <a:t>nemd_check</a:t>
+                      </a:r>
+                      <a:r>
                         <a:rPr lang="en-US" sz="1400" kern="1200" dirty="0">
                           <a:effectLst/>
                         </a:rPr>
-                        <a:t>glob</a:t>
+                        <a:t> glob</a:t>
                       </a:r>
                       <a:endParaRPr lang="en-US" sz="1400" dirty="0"/>
                     </a:p>
@@ -7729,10 +8994,16 @@
                     <a:lstStyle/>
                     <a:p>
                       <a:r>
+                        <a:rPr lang="en-US" sz="1400" kern="1200" dirty="0" err="1">
+                          <a:effectLst/>
+                        </a:rPr>
+                        <a:t>nemd_check</a:t>
+                      </a:r>
+                      <a:r>
                         <a:rPr lang="en-US" sz="1400" kern="1200" dirty="0">
                           <a:effectLst/>
                         </a:rPr>
-                        <a:t>in</a:t>
+                        <a:t> has</a:t>
                       </a:r>
                       <a:endParaRPr lang="en-US" sz="1400" dirty="0"/>
                     </a:p>
@@ -7748,7 +9019,7 @@
                         <a:rPr lang="en-US" sz="1400" kern="1200" dirty="0">
                           <a:effectLst/>
                         </a:rPr>
-                        <a:t>Specific string in files</a:t>
+                        <a:t>File contains specific strings</a:t>
                       </a:r>
                       <a:endParaRPr lang="en-US" sz="1400" dirty="0"/>
                     </a:p>
@@ -7771,6 +9042,18 @@
                         <a:rPr lang="en-US" sz="1400" kern="1200" dirty="0" err="1">
                           <a:effectLst/>
                         </a:rPr>
+                        <a:t>nemd_check</a:t>
+                      </a:r>
+                      <a:r>
+                        <a:rPr lang="en-US" sz="1400" kern="1200" dirty="0">
+                          <a:effectLst/>
+                        </a:rPr>
+                        <a:t> </a:t>
+                      </a:r>
+                      <a:r>
+                        <a:rPr lang="en-US" sz="1400" kern="1200" dirty="0" err="1">
+                          <a:effectLst/>
+                        </a:rPr>
                         <a:t>cmp</a:t>
                       </a:r>
                       <a:endParaRPr lang="en-US" sz="1400" dirty="0"/>
@@ -7808,6 +9091,18 @@
                     <a:p>
                       <a:r>
                         <a:rPr lang="en-US" sz="1400" kern="1200" dirty="0" err="1">
+                          <a:effectLst/>
+                        </a:rPr>
+                        <a:t>nemd_check</a:t>
+                      </a:r>
+                      <a:r>
+                        <a:rPr lang="en-US" sz="1400" kern="1200" dirty="0">
+                          <a:effectLst/>
+                        </a:rPr>
+                        <a:t> </a:t>
+                      </a:r>
+                      <a:r>
+                        <a:rPr lang="en-US" sz="1400" kern="1200" dirty="0">
                           <a:solidFill>
                             <a:schemeClr val="dk1"/>
                           </a:solidFill>
@@ -7816,17 +9111,8 @@
                           <a:ea typeface="+mn-ea"/>
                           <a:cs typeface="+mn-cs"/>
                         </a:rPr>
-                        <a:t>collect_log</a:t>
-                      </a:r>
-                      <a:endParaRPr lang="en-US" sz="1400" kern="1200" dirty="0">
-                        <a:solidFill>
-                          <a:schemeClr val="dk1"/>
-                        </a:solidFill>
-                        <a:effectLst/>
-                        <a:latin typeface="+mn-lt"/>
-                        <a:ea typeface="+mn-ea"/>
-                        <a:cs typeface="+mn-cs"/>
-                      </a:endParaRPr>
+                        <a:t>collect</a:t>
+                      </a:r>
                     </a:p>
                   </a:txBody>
                   <a:tcPr/>
@@ -7877,14 +9163,14 @@
           <p:nvPr>
             <p:extLst>
               <p:ext uri="{D42A27DB-BD31-4B8C-83A1-F6EECF244321}">
-                <p14:modId xmlns:p14="http://schemas.microsoft.com/office/powerpoint/2010/main" val="2881512327"/>
+                <p14:modId xmlns:p14="http://schemas.microsoft.com/office/powerpoint/2010/main" val="2036720886"/>
               </p:ext>
             </p:extLst>
           </p:nvPr>
         </p:nvGraphicFramePr>
         <p:xfrm>
-          <a:off x="6845440" y="4334400"/>
-          <a:ext cx="4841734" cy="1006490"/>
+          <a:off x="6473375" y="4334400"/>
+          <a:ext cx="5268685" cy="1006490"/>
         </p:xfrm>
         <a:graphic>
           <a:graphicData uri="http://schemas.openxmlformats.org/drawingml/2006/table">
@@ -7893,14 +9179,14 @@
                 <a:tableStyleId>{5C22544A-7EE6-4342-B048-85BDC9FD1C3A}</a:tableStyleId>
               </a:tblPr>
               <a:tblGrid>
-                <a:gridCol w="1055549">
+                <a:gridCol w="1148629">
                   <a:extLst>
                     <a:ext uri="{9D8B030D-6E8A-4147-A177-3AD203B41FA5}">
                       <a16:colId xmlns:a16="http://schemas.microsoft.com/office/drawing/2014/main" val="3737494183"/>
                     </a:ext>
                   </a:extLst>
                 </a:gridCol>
-                <a:gridCol w="3786185">
+                <a:gridCol w="4120056">
                   <a:extLst>
                     <a:ext uri="{9D8B030D-6E8A-4147-A177-3AD203B41FA5}">
                       <a16:colId xmlns:a16="http://schemas.microsoft.com/office/drawing/2014/main" val="2798767956"/>
@@ -7976,7 +9262,7 @@
                           <a:ea typeface="+mn-ea"/>
                           <a:cs typeface="+mn-cs"/>
                         </a:rPr>
-                        <a:t>The script name of driver or workflow</a:t>
+                        <a:t>The script name (-NAME in the .log)</a:t>
                       </a:r>
                       <a:endParaRPr lang="en-US" sz="1400" dirty="0"/>
                     </a:p>
@@ -8058,8 +9344,8 @@
         </p:nvSpPr>
         <p:spPr>
           <a:xfrm>
-            <a:off x="682915" y="1281054"/>
-            <a:ext cx="5847585" cy="5124480"/>
+            <a:off x="504827" y="1281054"/>
+            <a:ext cx="6055630" cy="5124480"/>
           </a:xfrm>
           <a:prstGeom prst="rect">
             <a:avLst/>
@@ -8121,7 +9407,18 @@
                   <a:schemeClr val="dk1"/>
                 </a:solidFill>
               </a:rPr>
-              <a:t> file, one check file, and one optional tag file. The four-digit </a:t>
+              <a:t> file, one check file, and one optional tag file.</a:t>
+            </a:r>
+          </a:p>
+          <a:p>
+            <a:pPr algn="just"/>
+            <a:r>
+              <a:rPr lang="en-US" sz="1500" dirty="0">
+                <a:solidFill>
+                  <a:schemeClr val="dk1"/>
+                </a:solidFill>
+              </a:rPr>
+              <a:t>The four-digit </a:t>
             </a:r>
             <a:r>
               <a:rPr lang="en-US" sz="1500" dirty="0" err="1">
@@ -8234,20 +9531,43 @@
           <a:p>
             <a:r>
               <a:rPr lang="en-US" sz="1400" i="1" dirty="0" err="1"/>
-              <a:t>collect_log</a:t>
+              <a:t>nemd_check</a:t>
             </a:r>
             <a:r>
               <a:rPr lang="en-US" sz="1400" i="1" dirty="0"/>
-              <a:t>(</a:t>
+              <a:t> collect </a:t>
             </a:r>
             <a:r>
               <a:rPr lang="en-US" sz="1400" i="1" dirty="0" err="1"/>
-              <a:t>time,memory</a:t>
+              <a:t>task_time</a:t>
             </a:r>
             <a:r>
               <a:rPr lang="en-US" sz="1400" i="1" dirty="0"/>
-              <a:t>) &amp;&amp; exist(0049.csv, 0049_time_memory.png)</a:t>
-            </a:r>
+              <a:t> memory</a:t>
+            </a:r>
+          </a:p>
+          <a:p>
+            <a:r>
+              <a:rPr lang="en-US" sz="1400" i="1" dirty="0" err="1"/>
+              <a:t>nemd_check</a:t>
+            </a:r>
+            <a:r>
+              <a:rPr lang="en-US" sz="1400" i="1" dirty="0"/>
+              <a:t> exist </a:t>
+            </a:r>
+            <a:r>
+              <a:rPr lang="en-US" sz="1400" i="1" dirty="0" err="1"/>
+              <a:t>collect.csv</a:t>
+            </a:r>
+            <a:r>
+              <a:rPr lang="en-US" sz="1400" i="1" dirty="0"/>
+              <a:t> </a:t>
+            </a:r>
+            <a:r>
+              <a:rPr lang="en-US" sz="1400" i="1" dirty="0" err="1"/>
+              <a:t>collect.png</a:t>
+            </a:r>
+            <a:endParaRPr lang="en-US" sz="1400" i="1" dirty="0"/>
           </a:p>
           <a:p>
             <a:endParaRPr lang="en-US" sz="1400" i="1" dirty="0"/>
@@ -8261,28 +9581,19 @@
           <a:p>
             <a:r>
               <a:rPr lang="en-US" sz="1400" i="1" dirty="0"/>
-              <a:t>label(</a:t>
+              <a:t>slow 100.0 00:00:04 50000.0 00:00:05</a:t>
+            </a:r>
+          </a:p>
+          <a:p>
+            <a:r>
+              <a:rPr lang="en-US" sz="1400" i="1" dirty="0"/>
+              <a:t>label </a:t>
             </a:r>
             <a:r>
               <a:rPr lang="en-US" sz="1400" i="1" dirty="0" err="1"/>
-              <a:t>amorp_bldr,wa</a:t>
-            </a:r>
-            <a:r>
-              <a:rPr lang="en-US" sz="1400" i="1" dirty="0"/>
-              <a:t>)</a:t>
-            </a:r>
-          </a:p>
-          <a:p>
-            <a:r>
-              <a:rPr lang="en-US" sz="1400" i="1" dirty="0"/>
-              <a:t>slow(100, 00:00:01)</a:t>
-            </a:r>
-          </a:p>
-          <a:p>
-            <a:r>
-              <a:rPr lang="en-US" sz="1400" i="1" dirty="0"/>
-              <a:t>slow(50000, 00:00:04)</a:t>
-            </a:r>
+              <a:t>number_of_molecules</a:t>
+            </a:r>
+            <a:endParaRPr lang="en-US" sz="1400" i="1" dirty="0"/>
           </a:p>
           <a:p>
             <a:endParaRPr lang="en-US" sz="1400" i="1" dirty="0"/>
@@ -8336,7 +9647,7 @@
           <a:p>
             <a:fld id="{CF79FC58-3559-EC47-B32E-5EF128B06581}" type="slidenum">
               <a:rPr lang="en-US" smtClean="0"/>
-              <a:t>10</a:t>
+              <a:t>11</a:t>
             </a:fld>
             <a:endParaRPr lang="en-US"/>
           </a:p>
@@ -8357,14 +9668,14 @@
           <p:nvPr>
             <p:extLst>
               <p:ext uri="{D42A27DB-BD31-4B8C-83A1-F6EECF244321}">
-                <p14:modId xmlns:p14="http://schemas.microsoft.com/office/powerpoint/2010/main" val="2888985189"/>
+                <p14:modId xmlns:p14="http://schemas.microsoft.com/office/powerpoint/2010/main" val="2150714889"/>
               </p:ext>
             </p:extLst>
           </p:nvPr>
         </p:nvGraphicFramePr>
         <p:xfrm>
-          <a:off x="6845439" y="5469752"/>
-          <a:ext cx="4841734" cy="923543"/>
+          <a:off x="6473375" y="5469752"/>
+          <a:ext cx="5268684" cy="923543"/>
         </p:xfrm>
         <a:graphic>
           <a:graphicData uri="http://schemas.openxmlformats.org/drawingml/2006/table">
@@ -8373,14 +9684,14 @@
                 <a:tableStyleId>{93296810-A885-4BE3-A3E7-6D5BEEA58F35}</a:tableStyleId>
               </a:tblPr>
               <a:tblGrid>
-                <a:gridCol w="967019">
+                <a:gridCol w="1052292">
                   <a:extLst>
                     <a:ext uri="{9D8B030D-6E8A-4147-A177-3AD203B41FA5}">
                       <a16:colId xmlns:a16="http://schemas.microsoft.com/office/drawing/2014/main" val="3737494183"/>
                     </a:ext>
                   </a:extLst>
                 </a:gridCol>
-                <a:gridCol w="3874715">
+                <a:gridCol w="4216392">
                   <a:extLst>
                     <a:ext uri="{9D8B030D-6E8A-4147-A177-3AD203B41FA5}">
                       <a16:colId xmlns:a16="http://schemas.microsoft.com/office/drawing/2014/main" val="2798767956"/>
@@ -8450,7 +9761,7 @@
                           </a:solidFill>
                           <a:effectLst/>
                         </a:rPr>
-                        <a:t>The str after # symbol is the label</a:t>
+                        <a:t>The str after # names the parameter</a:t>
                       </a:r>
                       <a:endParaRPr lang="en-US" sz="1400" dirty="0"/>
                     </a:p>
@@ -8537,7 +9848,7 @@
 </p:sld>
 </file>
 
-<file path=ppt/slides/slide11.xml><?xml version="1.0" encoding="utf-8"?>
+<file path=ppt/slides/slide12.xml><?xml version="1.0" encoding="utf-8"?>
 <p:sld xmlns:a="http://schemas.openxmlformats.org/drawingml/2006/main" xmlns:r="http://schemas.openxmlformats.org/officeDocument/2006/relationships" xmlns:p="http://schemas.openxmlformats.org/presentationml/2006/main">
   <p:cSld>
     <p:spTree>
@@ -8617,7 +9928,7 @@
           <a:p>
             <a:fld id="{CF79FC58-3559-EC47-B32E-5EF128B06581}" type="slidenum">
               <a:rPr lang="en-US" smtClean="0"/>
-              <a:t>11</a:t>
+              <a:t>12</a:t>
             </a:fld>
             <a:endParaRPr lang="en-US"/>
           </a:p>
@@ -8638,14 +9949,14 @@
           <p:nvPr>
             <p:extLst>
               <p:ext uri="{D42A27DB-BD31-4B8C-83A1-F6EECF244321}">
-                <p14:modId xmlns:p14="http://schemas.microsoft.com/office/powerpoint/2010/main" val="3482890042"/>
+                <p14:modId xmlns:p14="http://schemas.microsoft.com/office/powerpoint/2010/main" val="4207601747"/>
               </p:ext>
             </p:extLst>
           </p:nvPr>
         </p:nvGraphicFramePr>
         <p:xfrm>
-          <a:off x="956732" y="1236133"/>
-          <a:ext cx="10397067" cy="5120220"/>
+          <a:off x="891419" y="1149050"/>
+          <a:ext cx="10397067" cy="5475994"/>
         </p:xfrm>
         <a:graphic>
           <a:graphicData uri="http://schemas.openxmlformats.org/drawingml/2006/table">
@@ -8669,7 +9980,7 @@
                   </a:extLst>
                 </a:gridCol>
               </a:tblGrid>
-              <a:tr h="372508">
+              <a:tr h="349146">
                 <a:tc>
                   <a:txBody>
                     <a:bodyPr/>
@@ -8730,7 +10041,7 @@
                   </a:ext>
                 </a:extLst>
               </a:tr>
-              <a:tr h="745015">
+              <a:tr h="698292">
                 <a:tc>
                   <a:txBody>
                     <a:bodyPr/>
@@ -8930,7 +10241,7 @@
                   </a:ext>
                 </a:extLst>
               </a:tr>
-              <a:tr h="310423">
+              <a:tr h="290955">
                 <a:tc>
                   <a:txBody>
                     <a:bodyPr/>
@@ -8960,25 +10271,7 @@
                           </a:solidFill>
                           <a:effectLst/>
                         </a:rPr>
-                        <a:t>-</a:t>
-                      </a:r>
-                      <a:r>
-                        <a:rPr lang="en-US" sz="1400" kern="1200" dirty="0" err="1">
-                          <a:solidFill>
-                            <a:schemeClr val="tx1"/>
-                          </a:solidFill>
-                          <a:effectLst/>
-                        </a:rPr>
-                        <a:t>dir</a:t>
-                      </a:r>
-                      <a:r>
-                        <a:rPr lang="en-US" sz="1400" kern="1200" dirty="0">
-                          <a:solidFill>
-                            <a:schemeClr val="tx1"/>
-                          </a:solidFill>
-                          <a:effectLst/>
-                        </a:rPr>
-                        <a:t> DIR</a:t>
+                        <a:t>ID</a:t>
                       </a:r>
                       <a:endParaRPr lang="en-US" sz="1400" kern="1200" dirty="0">
                         <a:solidFill>
@@ -8993,40 +10286,6 @@
                   </a:txBody>
                   <a:tcPr/>
                 </a:tc>
-                <a:tc>
-                  <a:txBody>
-                    <a:bodyPr/>
-                    <a:lstStyle/>
-                    <a:p>
-                      <a:r>
-                        <a:rPr lang="en-US" sz="1400" kern="1200" dirty="0">
-                          <a:solidFill>
-                            <a:schemeClr val="tx1"/>
-                          </a:solidFill>
-                          <a:effectLst/>
-                        </a:rPr>
-                        <a:t>Search test(s) under this directory</a:t>
-                      </a:r>
-                      <a:endParaRPr lang="en-US" sz="1400" kern="1200" dirty="0">
-                        <a:solidFill>
-                          <a:schemeClr val="tx1"/>
-                        </a:solidFill>
-                        <a:effectLst/>
-                        <a:latin typeface="+mn-lt"/>
-                        <a:ea typeface="+mn-ea"/>
-                        <a:cs typeface="+mn-cs"/>
-                      </a:endParaRPr>
-                    </a:p>
-                  </a:txBody>
-                  <a:tcPr/>
-                </a:tc>
-                <a:extLst>
-                  <a:ext uri="{0D108BD9-81ED-4DB2-BD59-A6C34878D82A}">
-                    <a16:rowId xmlns:a16="http://schemas.microsoft.com/office/drawing/2014/main" val="2504991860"/>
-                  </a:ext>
-                </a:extLst>
-              </a:tr>
-              <a:tr h="310423">
                 <a:tc>
                   <a:txBody>
                     <a:bodyPr/>
@@ -9056,7 +10315,7 @@
                           </a:solidFill>
                           <a:effectLst/>
                         </a:rPr>
-                        <a:t>ID</a:t>
+                        <a:t>Select the tests according to these ids</a:t>
                       </a:r>
                       <a:endParaRPr lang="en-US" sz="1400" kern="1200" dirty="0">
                         <a:solidFill>
@@ -9071,6 +10330,13 @@
                   </a:txBody>
                   <a:tcPr/>
                 </a:tc>
+                <a:extLst>
+                  <a:ext uri="{0D108BD9-81ED-4DB2-BD59-A6C34878D82A}">
+                    <a16:rowId xmlns:a16="http://schemas.microsoft.com/office/drawing/2014/main" val="3320858068"/>
+                  </a:ext>
+                </a:extLst>
+              </a:tr>
+              <a:tr h="290955">
                 <a:tc>
                   <a:txBody>
                     <a:bodyPr/>
@@ -9100,7 +10366,25 @@
                           </a:solidFill>
                           <a:effectLst/>
                         </a:rPr>
-                        <a:t>Select the tests according to these ids</a:t>
+                        <a:t>-</a:t>
+                      </a:r>
+                      <a:r>
+                        <a:rPr lang="en-US" sz="1400" kern="1200" dirty="0" err="1">
+                          <a:solidFill>
+                            <a:schemeClr val="tx1"/>
+                          </a:solidFill>
+                          <a:effectLst/>
+                        </a:rPr>
+                        <a:t>dirname</a:t>
+                      </a:r>
+                      <a:r>
+                        <a:rPr lang="en-US" sz="1400" kern="1200" dirty="0">
+                          <a:solidFill>
+                            <a:schemeClr val="tx1"/>
+                          </a:solidFill>
+                          <a:effectLst/>
+                        </a:rPr>
+                        <a:t> DIRNAME</a:t>
                       </a:r>
                       <a:endParaRPr lang="en-US" sz="1400" kern="1200" dirty="0">
                         <a:solidFill>
@@ -9115,13 +10399,40 @@
                   </a:txBody>
                   <a:tcPr/>
                 </a:tc>
+                <a:tc>
+                  <a:txBody>
+                    <a:bodyPr/>
+                    <a:lstStyle/>
+                    <a:p>
+                      <a:r>
+                        <a:rPr lang="en-US" sz="1400" kern="1200" dirty="0">
+                          <a:solidFill>
+                            <a:schemeClr val="tx1"/>
+                          </a:solidFill>
+                          <a:effectLst/>
+                        </a:rPr>
+                        <a:t>Search test(s) under this directory</a:t>
+                      </a:r>
+                      <a:endParaRPr lang="en-US" sz="1400" kern="1200" dirty="0">
+                        <a:solidFill>
+                          <a:schemeClr val="tx1"/>
+                        </a:solidFill>
+                        <a:effectLst/>
+                        <a:latin typeface="+mn-lt"/>
+                        <a:ea typeface="+mn-ea"/>
+                        <a:cs typeface="+mn-cs"/>
+                      </a:endParaRPr>
+                    </a:p>
+                  </a:txBody>
+                  <a:tcPr/>
+                </a:tc>
                 <a:extLst>
                   <a:ext uri="{0D108BD9-81ED-4DB2-BD59-A6C34878D82A}">
-                    <a16:rowId xmlns:a16="http://schemas.microsoft.com/office/drawing/2014/main" val="3320858068"/>
+                    <a16:rowId xmlns:a16="http://schemas.microsoft.com/office/drawing/2014/main" val="3701223070"/>
                   </a:ext>
                 </a:extLst>
               </a:tr>
-              <a:tr h="371628">
+              <a:tr h="344534">
                 <a:tc>
                   <a:txBody>
                     <a:bodyPr/>
@@ -9216,7 +10527,7 @@
                   </a:ext>
                 </a:extLst>
               </a:tr>
-              <a:tr h="310423">
+              <a:tr h="290955">
                 <a:tc>
                   <a:txBody>
                     <a:bodyPr/>
@@ -9311,7 +10622,7 @@
                   </a:ext>
                 </a:extLst>
               </a:tr>
-              <a:tr h="745015">
+              <a:tr h="698292">
                 <a:tc>
                   <a:txBody>
                     <a:bodyPr/>
@@ -9507,7 +10818,7 @@
                   </a:ext>
                 </a:extLst>
               </a:tr>
-              <a:tr h="527719">
+              <a:tr h="494623">
                 <a:tc>
                   <a:txBody>
                     <a:bodyPr/>
@@ -9617,7 +10928,7 @@
                           </a:solidFill>
                           <a:effectLst/>
                         </a:rPr>
-                        <a:t>task: runs tasks and register files</a:t>
+                        <a:t>task: runs tasks and register outputs</a:t>
                       </a:r>
                     </a:p>
                     <a:p>
@@ -9666,7 +10977,7 @@
                   </a:ext>
                 </a:extLst>
               </a:tr>
-              <a:tr h="527719">
+              <a:tr h="494623">
                 <a:tc>
                   <a:txBody>
                     <a:bodyPr/>
@@ -9807,7 +11118,7 @@
                   </a:ext>
                 </a:extLst>
               </a:tr>
-              <a:tr h="371628">
+              <a:tr h="344534">
                 <a:tc>
                   <a:txBody>
                     <a:bodyPr/>
@@ -9846,7 +11157,7 @@
                           </a:solidFill>
                           <a:effectLst/>
                         </a:rPr>
-                        <a:t>tqdm,progress,job,off</a:t>
+                        <a:t>off,serial,parallel,job</a:t>
                       </a:r>
                       <a:r>
                         <a:rPr lang="en-US" sz="1400" kern="1200" dirty="0">
@@ -9938,7 +11249,7 @@
                   </a:ext>
                 </a:extLst>
               </a:tr>
-              <a:tr h="527719">
+              <a:tr h="494623">
                 <a:tc>
                   <a:txBody>
                     <a:bodyPr/>
@@ -9977,7 +11288,7 @@
                           </a:solidFill>
                           <a:effectLst/>
                         </a:rPr>
-                        <a:t>on,off</a:t>
+                        <a:t>True,False</a:t>
                       </a:r>
                       <a:r>
                         <a:rPr lang="en-US" sz="1400" kern="1200" dirty="0">
@@ -10030,7 +11341,7 @@
                           </a:solidFill>
                           <a:effectLst/>
                         </a:rPr>
-                        <a:t>on: enable debug mode for the workflow and sub-jobs</a:t>
+                        <a:t>True: enable debug mode for the workflow and sub-jobs</a:t>
                       </a:r>
                     </a:p>
                     <a:p>
@@ -10058,7 +11369,7 @@
                           </a:solidFill>
                           <a:effectLst/>
                         </a:rPr>
-                        <a:t>off: disable the mode</a:t>
+                        <a:t>False: disable the mode</a:t>
                       </a:r>
                       <a:endParaRPr lang="en-US" sz="1400" kern="1200" dirty="0">
                         <a:solidFill>
@@ -10076,6 +11387,89 @@
                 <a:extLst>
                   <a:ext uri="{0D108BD9-81ED-4DB2-BD59-A6C34878D82A}">
                     <a16:rowId xmlns:a16="http://schemas.microsoft.com/office/drawing/2014/main" val="2030284571"/>
+                  </a:ext>
+                </a:extLst>
+              </a:tr>
+              <a:tr h="489246">
+                <a:tc>
+                  <a:txBody>
+                    <a:bodyPr/>
+                    <a:lstStyle/>
+                    <a:p>
+                      <a:pPr marL="0" marR="0" lvl="0" indent="0" algn="l" defTabSz="914400" rtl="0" eaLnBrk="1" fontAlgn="auto" latinLnBrk="0" hangingPunct="1">
+                        <a:lnSpc>
+                          <a:spcPct val="100000"/>
+                        </a:lnSpc>
+                        <a:spcBef>
+                          <a:spcPts val="0"/>
+                        </a:spcBef>
+                        <a:spcAft>
+                          <a:spcPts val="0"/>
+                        </a:spcAft>
+                        <a:buClrTx/>
+                        <a:buSzTx/>
+                        <a:buFontTx/>
+                        <a:buNone/>
+                        <a:tabLst/>
+                        <a:defRPr/>
+                      </a:pPr>
+                      <a:r>
+                        <a:rPr lang="en-US" sz="1400" kern="1200" dirty="0">
+                          <a:solidFill>
+                            <a:schemeClr val="tx1"/>
+                          </a:solidFill>
+                          <a:effectLst/>
+                          <a:latin typeface="+mn-lt"/>
+                          <a:ea typeface="+mn-ea"/>
+                          <a:cs typeface="+mn-cs"/>
+                        </a:rPr>
+                        <a:t>-copy</a:t>
+                      </a:r>
+                    </a:p>
+                  </a:txBody>
+                  <a:tcPr/>
+                </a:tc>
+                <a:tc>
+                  <a:txBody>
+                    <a:bodyPr/>
+                    <a:lstStyle/>
+                    <a:p>
+                      <a:pPr marL="0" marR="0" lvl="0" indent="0" algn="l" defTabSz="914400" rtl="0" eaLnBrk="1" fontAlgn="auto" latinLnBrk="0" hangingPunct="1">
+                        <a:lnSpc>
+                          <a:spcPct val="100000"/>
+                        </a:lnSpc>
+                        <a:spcBef>
+                          <a:spcPts val="0"/>
+                        </a:spcBef>
+                        <a:spcAft>
+                          <a:spcPts val="0"/>
+                        </a:spcAft>
+                        <a:buClrTx/>
+                        <a:buSzTx/>
+                        <a:buFontTx/>
+                        <a:buNone/>
+                        <a:tabLst/>
+                        <a:defRPr/>
+                      </a:pPr>
+                      <a:r>
+                        <a:rPr lang="en-US" sz="1400" kern="1200" dirty="0">
+                          <a:solidFill>
+                            <a:schemeClr val="tx1"/>
+                          </a:solidFill>
+                          <a:effectLst/>
+                          <a:latin typeface="+mn-lt"/>
+                          <a:ea typeface="+mn-ea"/>
+                          <a:cs typeface="+mn-cs"/>
+                        </a:rPr>
+                        <a:t>Copy test data into the working directory</a:t>
+                      </a:r>
+                    </a:p>
+                  </a:txBody>
+                  <a:tcPr/>
+                </a:tc>
+                <a:extLst>
+                  <a:ext uri="{0D108BD9-81ED-4DB2-BD59-A6C34878D82A}">
+                    <a16:rowId xmlns:a16="http://schemas.microsoft.com/office/drawing/2014/main" val="2546077014"/>
                   </a:ext>
                 </a:extLst>
               </a:tr>
@@ -10096,7 +11490,7 @@
 </p:sld>
 </file>
 
-<file path=ppt/slides/slide12.xml><?xml version="1.0" encoding="utf-8"?>
+<file path=ppt/slides/slide13.xml><?xml version="1.0" encoding="utf-8"?>
 <p:sld xmlns:a="http://schemas.openxmlformats.org/drawingml/2006/main" xmlns:r="http://schemas.openxmlformats.org/officeDocument/2006/relationships" xmlns:p="http://schemas.openxmlformats.org/presentationml/2006/main">
   <p:cSld>
     <p:spTree>
@@ -14412,7 +15806,7 @@
           <a:p>
             <a:fld id="{CF79FC58-3559-EC47-B32E-5EF128B06581}" type="slidenum">
               <a:rPr lang="en-US" smtClean="0"/>
-              <a:t>12</a:t>
+              <a:t>13</a:t>
             </a:fld>
             <a:endParaRPr lang="en-US"/>
           </a:p>
@@ -14431,7 +15825,7 @@
 </p:sld>
 </file>
 
-<file path=ppt/slides/slide13.xml><?xml version="1.0" encoding="utf-8"?>
+<file path=ppt/slides/slide14.xml><?xml version="1.0" encoding="utf-8"?>
 <p:sld xmlns:a="http://schemas.openxmlformats.org/drawingml/2006/main" xmlns:r="http://schemas.openxmlformats.org/officeDocument/2006/relationships" xmlns:p="http://schemas.openxmlformats.org/presentationml/2006/main">
   <p:cSld>
     <p:spTree>
@@ -16740,7 +18134,7 @@
           <a:p>
             <a:fld id="{CF79FC58-3559-EC47-B32E-5EF128B06581}" type="slidenum">
               <a:rPr lang="en-US" smtClean="0"/>
-              <a:t>13</a:t>
+              <a:t>14</a:t>
             </a:fld>
             <a:endParaRPr lang="en-US"/>
           </a:p>
@@ -16759,7 +18153,7 @@
 </p:sld>
 </file>
 
-<file path=ppt/slides/slide14.xml><?xml version="1.0" encoding="utf-8"?>
+<file path=ppt/slides/slide15.xml><?xml version="1.0" encoding="utf-8"?>
 <p:sld xmlns:a="http://schemas.openxmlformats.org/drawingml/2006/main" xmlns:r="http://schemas.openxmlformats.org/officeDocument/2006/relationships" xmlns:p="http://schemas.openxmlformats.org/presentationml/2006/main">
   <p:cSld>
     <p:spTree>
@@ -16869,7 +18263,7 @@
           <a:p>
             <a:fld id="{CF79FC58-3559-EC47-B32E-5EF128B06581}" type="slidenum">
               <a:rPr lang="en-US" smtClean="0"/>
-              <a:t>14</a:t>
+              <a:t>15</a:t>
             </a:fld>
             <a:endParaRPr lang="en-US"/>
           </a:p>
@@ -16888,7 +18282,7 @@
 </p:sld>
 </file>
 
-<file path=ppt/slides/slide15.xml><?xml version="1.0" encoding="utf-8"?>
+<file path=ppt/slides/slide16.xml><?xml version="1.0" encoding="utf-8"?>
 <p:sld xmlns:a="http://schemas.openxmlformats.org/drawingml/2006/main" xmlns:r="http://schemas.openxmlformats.org/officeDocument/2006/relationships" xmlns:p="http://schemas.openxmlformats.org/presentationml/2006/main">
   <p:cSld>
     <p:spTree>
@@ -17070,7 +18464,7 @@
           <a:p>
             <a:fld id="{CF79FC58-3559-EC47-B32E-5EF128B06581}" type="slidenum">
               <a:rPr lang="en-US" smtClean="0"/>
-              <a:t>15</a:t>
+              <a:t>16</a:t>
             </a:fld>
             <a:endParaRPr lang="en-US"/>
           </a:p>
@@ -17089,7 +18483,7 @@
 </p:sld>
 </file>
 
-<file path=ppt/slides/slide16.xml><?xml version="1.0" encoding="utf-8"?>
+<file path=ppt/slides/slide17.xml><?xml version="1.0" encoding="utf-8"?>
 <p:sld xmlns:a="http://schemas.openxmlformats.org/drawingml/2006/main" xmlns:r="http://schemas.openxmlformats.org/officeDocument/2006/relationships" xmlns:p="http://schemas.openxmlformats.org/presentationml/2006/main">
   <p:cSld>
     <p:spTree>
@@ -17157,7 +18551,7 @@
           <a:p>
             <a:fld id="{CF79FC58-3559-EC47-B32E-5EF128B06581}" type="slidenum">
               <a:rPr lang="en-US" smtClean="0"/>
-              <a:t>16</a:t>
+              <a:t>17</a:t>
             </a:fld>
             <a:endParaRPr lang="en-US"/>
           </a:p>
@@ -17829,7 +19223,7 @@
           <p:nvPr>
             <p:extLst>
               <p:ext uri="{D42A27DB-BD31-4B8C-83A1-F6EECF244321}">
-                <p14:modId xmlns:p14="http://schemas.microsoft.com/office/powerpoint/2010/main" val="1095404363"/>
+                <p14:modId xmlns:p14="http://schemas.microsoft.com/office/powerpoint/2010/main" val="3658900205"/>
               </p:ext>
             </p:extLst>
           </p:nvPr>
@@ -18281,30 +19675,43 @@
                           <a:ea typeface="+mn-ea"/>
                           <a:cs typeface="+mn-cs"/>
                         </a:rPr>
-                        <a:t>-DEBUG [{</a:t>
+                        <a:t>-DEBUG </a:t>
+                      </a:r>
+                      <a:r>
+                        <a:rPr lang="en-US" sz="1400" kern="1200" dirty="0">
+                          <a:solidFill>
+                            <a:schemeClr val="tx1"/>
+                          </a:solidFill>
+                          <a:effectLst/>
+                        </a:rPr>
+                        <a:t>[{</a:t>
                       </a:r>
                       <a:r>
                         <a:rPr lang="en-US" sz="1400" kern="1200" dirty="0" err="1">
                           <a:solidFill>
-                            <a:schemeClr val="dk1"/>
+                            <a:schemeClr val="tx1"/>
                           </a:solidFill>
-                          <a:latin typeface="+mn-lt"/>
-                          <a:ea typeface="+mn-ea"/>
-                          <a:cs typeface="+mn-cs"/>
-                        </a:rPr>
-                        <a:t>on,off</a:t>
+                          <a:effectLst/>
+                        </a:rPr>
+                        <a:t>True,False</a:t>
                       </a:r>
                       <a:r>
                         <a:rPr lang="en-US" sz="1400" kern="1200" dirty="0">
                           <a:solidFill>
-                            <a:schemeClr val="dk1"/>
+                            <a:schemeClr val="tx1"/>
                           </a:solidFill>
-                          <a:latin typeface="+mn-lt"/>
-                          <a:ea typeface="+mn-ea"/>
-                          <a:cs typeface="+mn-cs"/>
+                          <a:effectLst/>
                         </a:rPr>
                         <a:t>}]</a:t>
                       </a:r>
+                      <a:endParaRPr lang="en-US" sz="1400" kern="1200" dirty="0">
+                        <a:solidFill>
+                          <a:schemeClr val="dk1"/>
+                        </a:solidFill>
+                        <a:latin typeface="+mn-lt"/>
+                        <a:ea typeface="+mn-ea"/>
+                        <a:cs typeface="+mn-cs"/>
+                      </a:endParaRPr>
                     </a:p>
                   </a:txBody>
                   <a:tcPr/>
@@ -18445,7 +19852,7 @@
 </p:sld>
 </file>
 
-<file path=ppt/slides/slide17.xml><?xml version="1.0" encoding="utf-8"?>
+<file path=ppt/slides/slide18.xml><?xml version="1.0" encoding="utf-8"?>
 <p:sld xmlns:a="http://schemas.openxmlformats.org/drawingml/2006/main" xmlns:r="http://schemas.openxmlformats.org/officeDocument/2006/relationships" xmlns:p="http://schemas.openxmlformats.org/presentationml/2006/main">
   <p:cSld>
     <p:spTree>
@@ -18576,6 +19983,29 @@
               <a:t>Assignment: assign parameters based on the types</a:t>
             </a:r>
           </a:p>
+          <a:p>
+            <a:endParaRPr lang="en-US" sz="2400" dirty="0"/>
+          </a:p>
+          <a:p>
+            <a:endParaRPr lang="en-US" sz="2400" dirty="0"/>
+          </a:p>
+          <a:p>
+            <a:pPr marL="0" indent="0">
+              <a:buNone/>
+            </a:pPr>
+            <a:r>
+              <a:rPr lang="en-US" sz="1500" dirty="0"/>
+              <a:t>https://</a:t>
+            </a:r>
+            <a:r>
+              <a:rPr lang="en-US" sz="1500" dirty="0" err="1"/>
+              <a:t>mattermodeling.stackexchange.com</a:t>
+            </a:r>
+            <a:r>
+              <a:rPr lang="en-US" sz="1500" dirty="0"/>
+              <a:t>/questions/8932/what-are-some-open-source-codes-that-can-generate-potentials</a:t>
+            </a:r>
+          </a:p>
         </p:txBody>
       </p:sp>
       <p:sp>
@@ -18601,7 +20031,7 @@
           <a:p>
             <a:fld id="{CF79FC58-3559-EC47-B32E-5EF128B06581}" type="slidenum">
               <a:rPr lang="en-US" smtClean="0"/>
-              <a:t>17</a:t>
+              <a:t>18</a:t>
             </a:fld>
             <a:endParaRPr lang="en-US"/>
           </a:p>
@@ -19272,31 +20702,15 @@
                   <a:schemeClr val="accent2"/>
                 </a:solidFill>
               </a:rPr>
-              <a:t># Login </a:t>
-            </a:r>
-            <a:r>
-              <a:rPr lang="en-US" sz="1400" dirty="0" err="1">
+              <a:t># </a:t>
+            </a:r>
+            <a:r>
+              <a:rPr lang="en-US" sz="1400" b="1" dirty="0">
                 <a:solidFill>
                   <a:schemeClr val="accent2"/>
                 </a:solidFill>
               </a:rPr>
-              <a:t>Github</a:t>
-            </a:r>
-            <a:r>
-              <a:rPr lang="en-US" sz="1400" dirty="0">
-                <a:solidFill>
-                  <a:schemeClr val="accent2"/>
-                </a:solidFill>
-              </a:rPr>
-              <a:t> and </a:t>
-            </a:r>
-            <a:r>
-              <a:rPr lang="en-US" sz="1400" b="1" dirty="0">
-                <a:solidFill>
-                  <a:schemeClr val="accent2"/>
-                </a:solidFill>
-              </a:rPr>
-              <a:t>clone code</a:t>
+              <a:t>Clone code</a:t>
             </a:r>
           </a:p>
           <a:p>
@@ -19306,15 +20720,7 @@
             </a:r>
             <a:r>
               <a:rPr lang="en-US" sz="1400" dirty="0"/>
-              <a:t> </a:t>
-            </a:r>
-            <a:r>
-              <a:rPr lang="en-US" sz="1400" dirty="0" err="1"/>
-              <a:t>auth</a:t>
-            </a:r>
-            <a:r>
-              <a:rPr lang="en-US" sz="1400" dirty="0"/>
-              <a:t> login --hostname </a:t>
+              <a:t> auth login --hostname </a:t>
             </a:r>
             <a:r>
               <a:rPr lang="en-US" sz="1400" dirty="0" err="1"/>
@@ -19333,15 +20739,7 @@
             </a:r>
             <a:r>
               <a:rPr lang="en-US" sz="1400" dirty="0"/>
-              <a:t> </a:t>
-            </a:r>
-            <a:r>
-              <a:rPr lang="en-US" sz="1400" dirty="0" err="1"/>
-              <a:t>auth</a:t>
-            </a:r>
-            <a:r>
-              <a:rPr lang="en-US" sz="1400" dirty="0"/>
-              <a:t> setup-git</a:t>
+              <a:t> auth setup-git</a:t>
             </a:r>
             <a:br>
               <a:rPr lang="en-US" sz="1400" dirty="0"/>
@@ -19386,15 +20784,7 @@
                   <a:schemeClr val="accent2"/>
                 </a:solidFill>
               </a:rPr>
-              <a:t>Install drivers </a:t>
-            </a:r>
-            <a:r>
-              <a:rPr lang="en-US" sz="1400" dirty="0">
-                <a:solidFill>
-                  <a:schemeClr val="accent2"/>
-                </a:solidFill>
-              </a:rPr>
-              <a:t>and ask for reboot</a:t>
+              <a:t>Install drivers</a:t>
             </a:r>
             <a:br>
               <a:rPr lang="en-US" sz="1400" dirty="0"/>
@@ -21379,6 +22769,44 @@
           </a:p>
         </p:txBody>
       </p:sp>
+      <p:sp>
+        <p:nvSpPr>
+          <p:cNvPr id="7" name="TextBox 6">
+            <a:extLst>
+              <a:ext uri="{FF2B5EF4-FFF2-40B4-BE49-F238E27FC236}">
+                <a16:creationId xmlns:a16="http://schemas.microsoft.com/office/drawing/2014/main" id="{7EE72D66-DA66-8C86-7389-06DDFABFFC57}"/>
+              </a:ext>
+            </a:extLst>
+          </p:cNvPr>
+          <p:cNvSpPr txBox="1"/>
+          <p:nvPr/>
+        </p:nvSpPr>
+        <p:spPr>
+          <a:xfrm>
+            <a:off x="8912514" y="6346067"/>
+            <a:ext cx="1579418" cy="323165"/>
+          </a:xfrm>
+          <a:prstGeom prst="rect">
+            <a:avLst/>
+          </a:prstGeom>
+          <a:noFill/>
+        </p:spPr>
+        <p:txBody>
+          <a:bodyPr wrap="square">
+            <a:spAutoFit/>
+          </a:bodyPr>
+          <a:lstStyle/>
+          <a:p>
+            <a:pPr marL="0" indent="0">
+              <a:buNone/>
+            </a:pPr>
+            <a:r>
+              <a:rPr lang="en-US" sz="1500" i="1" dirty="0"/>
+              <a:t>after factory reset</a:t>
+            </a:r>
+          </a:p>
+        </p:txBody>
+      </p:sp>
     </p:spTree>
     <p:extLst>
       <p:ext uri="{BB962C8B-B14F-4D97-AF65-F5344CB8AC3E}">
@@ -23682,7 +25110,7 @@
           <p:nvPr>
             <p:extLst>
               <p:ext uri="{D42A27DB-BD31-4B8C-83A1-F6EECF244321}">
-                <p14:modId xmlns:p14="http://schemas.microsoft.com/office/powerpoint/2010/main" val="472840913"/>
+                <p14:modId xmlns:p14="http://schemas.microsoft.com/office/powerpoint/2010/main" val="39725548"/>
               </p:ext>
             </p:extLst>
           </p:nvPr>
@@ -23988,7 +25416,7 @@
                       </a:pPr>
                       <a:r>
                         <a:rPr lang="en-US" dirty="0"/>
-                        <a:t>Executions and aggregation</a:t>
+                        <a:t>Execution and aggregation</a:t>
                       </a:r>
                     </a:p>
                   </a:txBody>
@@ -24528,7 +25956,7 @@
         </p:nvCxnSpPr>
         <p:spPr>
           <a:xfrm>
-            <a:off x="5990966" y="751226"/>
+            <a:off x="5990966" y="729455"/>
             <a:ext cx="0" cy="148640"/>
           </a:xfrm>
           <a:prstGeom prst="straightConnector1">
@@ -24572,7 +26000,7 @@
         </p:nvCxnSpPr>
         <p:spPr>
           <a:xfrm>
-            <a:off x="9798996" y="1297276"/>
+            <a:off x="9828024" y="1297276"/>
             <a:ext cx="104837" cy="3095"/>
           </a:xfrm>
           <a:prstGeom prst="straightConnector1">
@@ -24655,7 +26083,7 @@
         </p:nvCxnSpPr>
         <p:spPr>
           <a:xfrm flipH="1" flipV="1">
-            <a:off x="2308784" y="1290632"/>
+            <a:off x="2294270" y="1290632"/>
             <a:ext cx="94880" cy="6644"/>
           </a:xfrm>
           <a:prstGeom prst="straightConnector1">
@@ -28243,7 +29671,7 @@
         </p:nvCxnSpPr>
         <p:spPr>
           <a:xfrm rot="5400000" flipH="1">
-            <a:off x="3768343" y="4584146"/>
+            <a:off x="3787525" y="4584146"/>
             <a:ext cx="598" cy="109728"/>
           </a:xfrm>
           <a:prstGeom prst="straightConnector1">
@@ -28619,7 +30047,66 @@
                   <a:schemeClr val="tx1"/>
                 </a:solidFill>
               </a:rPr>
-              <a:t>  molecule </a:t>
+              <a:t>  molecule builder       </a:t>
+            </a:r>
+            <a:r>
+              <a:rPr lang="en-US" sz="1400" dirty="0">
+                <a:solidFill>
+                  <a:srgbClr val="C00000"/>
+                </a:solidFill>
+                <a:sym typeface="Wingdings" pitchFamily="2" charset="2"/>
+              </a:rPr>
+              <a:t></a:t>
+            </a:r>
+            <a:r>
+              <a:rPr lang="en-US" sz="1400" dirty="0">
+                <a:solidFill>
+                  <a:schemeClr val="tx1"/>
+                </a:solidFill>
+                <a:sym typeface="Wingdings" pitchFamily="2" charset="2"/>
+              </a:rPr>
+              <a:t> </a:t>
+            </a:r>
+            <a:r>
+              <a:rPr lang="en-US" sz="1400" dirty="0">
+                <a:solidFill>
+                  <a:schemeClr val="tx1"/>
+                </a:solidFill>
+              </a:rPr>
+              <a:t>molecular dynamics</a:t>
+            </a:r>
+            <a:r>
+              <a:rPr lang="en-US" sz="1400" dirty="0">
+                <a:solidFill>
+                  <a:srgbClr val="C00000"/>
+                </a:solidFill>
+              </a:rPr>
+              <a:t> </a:t>
+            </a:r>
+            <a:r>
+              <a:rPr lang="en-US" sz="1400" dirty="0">
+                <a:solidFill>
+                  <a:srgbClr val="C00000"/>
+                </a:solidFill>
+                <a:sym typeface="Wingdings" pitchFamily="2" charset="2"/>
+              </a:rPr>
+              <a:t></a:t>
+            </a:r>
+            <a:r>
+              <a:rPr lang="en-US" sz="1400" dirty="0">
+                <a:solidFill>
+                  <a:srgbClr val="C00000"/>
+                </a:solidFill>
+              </a:rPr>
+              <a:t> </a:t>
+            </a:r>
+            <a:r>
+              <a:rPr lang="en-US" sz="1400" dirty="0">
+                <a:solidFill>
+                  <a:schemeClr val="tx1"/>
+                </a:solidFill>
+              </a:rPr>
+              <a:t>log analysis (</a:t>
             </a:r>
             <a:r>
               <a:rPr lang="en-US" sz="1400" dirty="0" err="1">
@@ -28627,7 +30114,7 @@
                   <a:schemeClr val="tx1"/>
                 </a:solidFill>
               </a:rPr>
-              <a:t>builer</a:t>
+              <a:t>mb_lmp_log</a:t>
             </a:r>
             <a:r>
               <a:rPr lang="en-US" sz="1400" dirty="0">
@@ -28635,7 +30122,7 @@
                   <a:schemeClr val="tx1"/>
                 </a:solidFill>
               </a:rPr>
-              <a:t>       </a:t>
+              <a:t>)                run command </a:t>
             </a:r>
             <a:r>
               <a:rPr lang="en-US" sz="1400" dirty="0">
@@ -28644,7 +30131,7 @@
                 </a:solidFill>
                 <a:sym typeface="Wingdings" pitchFamily="2" charset="2"/>
               </a:rPr>
-              <a:t></a:t>
+              <a:t> </a:t>
             </a:r>
             <a:r>
               <a:rPr lang="en-US" sz="1400" dirty="0">
@@ -28653,100 +30140,25 @@
                 </a:solidFill>
                 <a:sym typeface="Wingdings" pitchFamily="2" charset="2"/>
               </a:rPr>
-              <a:t> </a:t>
+              <a:t>check results              </a:t>
             </a:r>
             <a:r>
               <a:rPr lang="en-US" sz="1400" dirty="0">
                 <a:solidFill>
+                  <a:srgbClr val="C00000"/>
+                </a:solidFill>
+                <a:sym typeface="Wingdings" pitchFamily="2" charset="2"/>
+              </a:rPr>
+              <a:t> </a:t>
+            </a:r>
+            <a:r>
+              <a:rPr lang="en-US" sz="1400" dirty="0">
+                <a:solidFill>
                   <a:schemeClr val="tx1"/>
                 </a:solidFill>
-              </a:rPr>
-              <a:t>molecular dynamics</a:t>
-            </a:r>
-            <a:r>
-              <a:rPr lang="en-US" sz="1400" dirty="0">
-                <a:solidFill>
-                  <a:srgbClr val="C00000"/>
-                </a:solidFill>
-              </a:rPr>
-              <a:t> </a:t>
-            </a:r>
-            <a:r>
-              <a:rPr lang="en-US" sz="1400" dirty="0">
-                <a:solidFill>
-                  <a:srgbClr val="C00000"/>
-                </a:solidFill>
                 <a:sym typeface="Wingdings" pitchFamily="2" charset="2"/>
               </a:rPr>
-              <a:t></a:t>
-            </a:r>
-            <a:r>
-              <a:rPr lang="en-US" sz="1400" dirty="0">
-                <a:solidFill>
-                  <a:srgbClr val="C00000"/>
-                </a:solidFill>
-              </a:rPr>
-              <a:t> </a:t>
-            </a:r>
-            <a:r>
-              <a:rPr lang="en-US" sz="1400" dirty="0">
-                <a:solidFill>
-                  <a:schemeClr val="tx1"/>
-                </a:solidFill>
-              </a:rPr>
-              <a:t>log analysis (</a:t>
-            </a:r>
-            <a:r>
-              <a:rPr lang="en-US" sz="1400" dirty="0" err="1">
-                <a:solidFill>
-                  <a:schemeClr val="tx1"/>
-                </a:solidFill>
-              </a:rPr>
-              <a:t>mb_lmp_log</a:t>
-            </a:r>
-            <a:r>
-              <a:rPr lang="en-US" sz="1400" dirty="0">
-                <a:solidFill>
-                  <a:schemeClr val="tx1"/>
-                </a:solidFill>
-              </a:rPr>
-              <a:t>)                  run command </a:t>
-            </a:r>
-            <a:r>
-              <a:rPr lang="en-US" sz="1400" dirty="0">
-                <a:solidFill>
-                  <a:srgbClr val="C00000"/>
-                </a:solidFill>
-                <a:sym typeface="Wingdings" pitchFamily="2" charset="2"/>
-              </a:rPr>
-              <a:t> </a:t>
-            </a:r>
-            <a:r>
-              <a:rPr lang="en-US" sz="1400" dirty="0">
-                <a:solidFill>
-                  <a:schemeClr val="tx1"/>
-                </a:solidFill>
-                <a:sym typeface="Wingdings" pitchFamily="2" charset="2"/>
-              </a:rPr>
-              <a:t>check results              </a:t>
-            </a:r>
-            <a:r>
-              <a:rPr lang="en-US" sz="1400" dirty="0">
-                <a:solidFill>
-                  <a:srgbClr val="C00000"/>
-                </a:solidFill>
-                <a:sym typeface="Wingdings" pitchFamily="2" charset="2"/>
-              </a:rPr>
-              <a:t> </a:t>
-            </a:r>
-            <a:r>
-              <a:rPr lang="en-US" sz="1400" dirty="0">
-                <a:solidFill>
-                  <a:schemeClr val="tx1"/>
-                </a:solidFill>
-                <a:sym typeface="Wingdings" pitchFamily="2" charset="2"/>
-              </a:rPr>
-              <a:t>update labels (</a:t>
+              <a:t>update tags (</a:t>
             </a:r>
             <a:r>
               <a:rPr lang="en-US" sz="1400" dirty="0">
@@ -28963,7 +30375,7 @@
         </p:nvCxnSpPr>
         <p:spPr>
           <a:xfrm flipH="1">
-            <a:off x="388458" y="2734629"/>
+            <a:off x="382064" y="2664294"/>
             <a:ext cx="320270" cy="0"/>
           </a:xfrm>
           <a:prstGeom prst="line">
@@ -29684,7 +31096,7 @@
         </p:nvCxnSpPr>
         <p:spPr>
           <a:xfrm rot="5400000" flipH="1">
-            <a:off x="5098877" y="4595030"/>
+            <a:off x="5066907" y="4595030"/>
             <a:ext cx="598" cy="109728"/>
           </a:xfrm>
           <a:prstGeom prst="straightConnector1">
@@ -30799,14 +32211,14 @@
           <p:nvPr>
             <p:extLst>
               <p:ext uri="{D42A27DB-BD31-4B8C-83A1-F6EECF244321}">
-                <p14:modId xmlns:p14="http://schemas.microsoft.com/office/powerpoint/2010/main" val="3171743795"/>
+                <p14:modId xmlns:p14="http://schemas.microsoft.com/office/powerpoint/2010/main" val="3277958268"/>
               </p:ext>
             </p:extLst>
           </p:nvPr>
         </p:nvGraphicFramePr>
         <p:xfrm>
-          <a:off x="714893" y="1591570"/>
-          <a:ext cx="10753965" cy="4764025"/>
+          <a:off x="404453" y="1591570"/>
+          <a:ext cx="11383094" cy="4764025"/>
         </p:xfrm>
         <a:graphic>
           <a:graphicData uri="http://schemas.openxmlformats.org/drawingml/2006/table">
@@ -30815,27 +32227,34 @@
                 <a:tableStyleId>{2D5ABB26-0587-4C30-8999-92F81FD0307C}</a:tableStyleId>
               </a:tblPr>
               <a:tblGrid>
-                <a:gridCol w="1854136">
+                <a:gridCol w="1177604">
                   <a:extLst>
                     <a:ext uri="{9D8B030D-6E8A-4147-A177-3AD203B41FA5}">
                       <a16:colId xmlns:a16="http://schemas.microsoft.com/office/drawing/2014/main" val="140681280"/>
                     </a:ext>
                   </a:extLst>
                 </a:gridCol>
-                <a:gridCol w="2111828">
+                <a:gridCol w="1632857">
                   <a:extLst>
                     <a:ext uri="{9D8B030D-6E8A-4147-A177-3AD203B41FA5}">
                       <a16:colId xmlns:a16="http://schemas.microsoft.com/office/drawing/2014/main" val="819792391"/>
                     </a:ext>
                   </a:extLst>
                 </a:gridCol>
-                <a:gridCol w="6788001">
+                <a:gridCol w="5130334">
                   <a:extLst>
                     <a:ext uri="{9D8B030D-6E8A-4147-A177-3AD203B41FA5}">
                       <a16:colId xmlns:a16="http://schemas.microsoft.com/office/drawing/2014/main" val="3388334755"/>
                     </a:ext>
                   </a:extLst>
                 </a:gridCol>
+                <a:gridCol w="3442299">
+                  <a:extLst>
+                    <a:ext uri="{9D8B030D-6E8A-4147-A177-3AD203B41FA5}">
+                      <a16:colId xmlns:a16="http://schemas.microsoft.com/office/drawing/2014/main" val="1365888191"/>
+                    </a:ext>
+                  </a:extLst>
+                </a:gridCol>
               </a:tblGrid>
               <a:tr h="548783">
                 <a:tc>
@@ -30845,7 +32264,7 @@
                     <a:p>
                       <a:pPr algn="just"/>
                       <a:r>
-                        <a:rPr lang="en-US" dirty="0"/>
+                        <a:rPr lang="en-US" sz="1400" dirty="0"/>
                         <a:t>Command</a:t>
                       </a:r>
                     </a:p>
@@ -30869,7 +32288,7 @@
                     <a:p>
                       <a:pPr algn="just"/>
                       <a:r>
-                        <a:rPr lang="en-US" dirty="0"/>
+                        <a:rPr lang="en-US" sz="1400" dirty="0"/>
                         <a:t>Location</a:t>
                       </a:r>
                     </a:p>
@@ -30893,7 +32312,7 @@
                     <a:p>
                       <a:pPr algn="just"/>
                       <a:r>
-                        <a:rPr lang="en-US" dirty="0"/>
+                        <a:rPr lang="en-US" sz="1400" dirty="0"/>
                         <a:t>Description</a:t>
                       </a:r>
                     </a:p>
@@ -30910,6 +32329,30 @@
                     </a:lnB>
                   </a:tcPr>
                 </a:tc>
+                <a:tc>
+                  <a:txBody>
+                    <a:bodyPr/>
+                    <a:lstStyle/>
+                    <a:p>
+                      <a:pPr algn="just"/>
+                      <a:r>
+                        <a:rPr lang="en-US" sz="1400" dirty="0"/>
+                        <a:t>Goal</a:t>
+                      </a:r>
+                    </a:p>
+                  </a:txBody>
+                  <a:tcPr marL="137160" marR="137160" marT="137160" marB="137160" anchor="ctr">
+                    <a:lnB w="12700" cap="flat" cmpd="sng" algn="ctr">
+                      <a:solidFill>
+                        <a:schemeClr val="tx1"/>
+                      </a:solidFill>
+                      <a:prstDash val="solid"/>
+                      <a:round/>
+                      <a:headEnd type="none" w="med" len="med"/>
+                      <a:tailEnd type="none" w="med" len="med"/>
+                    </a:lnB>
+                  </a:tcPr>
+                </a:tc>
                 <a:extLst>
                   <a:ext uri="{0D108BD9-81ED-4DB2-BD59-A6C34878D82A}">
                     <a16:rowId xmlns:a16="http://schemas.microsoft.com/office/drawing/2014/main" val="2761390173"/>
@@ -30924,14 +32367,14 @@
                     <a:p>
                       <a:pPr algn="just"/>
                       <a:r>
-                        <a:rPr lang="en-US" dirty="0"/>
+                        <a:rPr lang="en-US" sz="1400" dirty="0"/>
                         <a:t>source </a:t>
                       </a:r>
                       <a:r>
-                        <a:rPr lang="en-US" dirty="0" err="1"/>
+                        <a:rPr lang="en-US" sz="1400" dirty="0" err="1"/>
                         <a:t>premake</a:t>
                       </a:r>
-                      <a:endParaRPr lang="en-US" dirty="0"/>
+                      <a:endParaRPr lang="en-US" sz="1400" dirty="0"/>
                     </a:p>
                   </a:txBody>
                   <a:tcPr marL="137160" marR="137160" marT="137160" marB="137160" anchor="ctr">
@@ -30962,10 +32405,10 @@
                     <a:p>
                       <a:pPr algn="just"/>
                       <a:r>
-                        <a:rPr lang="en-US" dirty="0" err="1"/>
+                        <a:rPr lang="en-US" sz="1400" dirty="0" err="1"/>
                         <a:t>premake</a:t>
                       </a:r>
-                      <a:endParaRPr lang="en-US" dirty="0"/>
+                      <a:endParaRPr lang="en-US" sz="1400" dirty="0"/>
                     </a:p>
                   </a:txBody>
                   <a:tcPr marL="137160" marR="137160" marT="137160" marB="137160" anchor="ctr">
@@ -30996,7 +32439,7 @@
                     <a:p>
                       <a:pPr algn="just"/>
                       <a:r>
-                        <a:rPr lang="en-US" dirty="0"/>
+                        <a:rPr lang="en-US" sz="1400" dirty="0"/>
                         <a:t>Environmental configuration allows additional utilities, strongly recommended when opening a new shell.</a:t>
                       </a:r>
                     </a:p>
@@ -31022,24 +32465,32 @@
                     </a:lnB>
                   </a:tcPr>
                 </a:tc>
-                <a:extLst>
-                  <a:ext uri="{0D108BD9-81ED-4DB2-BD59-A6C34878D82A}">
-                    <a16:rowId xmlns:a16="http://schemas.microsoft.com/office/drawing/2014/main" val="1825471136"/>
-                  </a:ext>
-                </a:extLst>
-              </a:tr>
-              <a:tr h="848017">
-                <a:tc>
-                  <a:txBody>
-                    <a:bodyPr/>
-                    <a:lstStyle/>
-                    <a:p>
-                      <a:pPr algn="just"/>
-                      <a:r>
-                        <a:rPr lang="en-US" sz="1800" dirty="0" err="1"/>
-                        <a:t>nemd_test</a:t>
-                      </a:r>
-                      <a:endParaRPr lang="en-US" dirty="0"/>
+                <a:tc>
+                  <a:txBody>
+                    <a:bodyPr/>
+                    <a:lstStyle/>
+                    <a:p>
+                      <a:pPr marL="0" marR="0" lvl="0" indent="0" algn="just" defTabSz="914400" rtl="0" eaLnBrk="1" fontAlgn="auto" latinLnBrk="0" hangingPunct="1">
+                        <a:lnSpc>
+                          <a:spcPct val="100000"/>
+                        </a:lnSpc>
+                        <a:spcBef>
+                          <a:spcPts val="0"/>
+                        </a:spcBef>
+                        <a:spcAft>
+                          <a:spcPts val="0"/>
+                        </a:spcAft>
+                        <a:buClrTx/>
+                        <a:buSzTx/>
+                        <a:buFontTx/>
+                        <a:buNone/>
+                        <a:tabLst/>
+                        <a:defRPr/>
+                      </a:pPr>
+                      <a:r>
+                        <a:rPr lang="en-US" sz="1400" dirty="0"/>
+                        <a:t>Use the source code instead of the installation.</a:t>
+                      </a:r>
                     </a:p>
                   </a:txBody>
                   <a:tcPr marL="137160" marR="137160" marT="137160" marB="137160" anchor="ctr">
@@ -31063,6 +32514,13 @@
                     </a:lnB>
                   </a:tcPr>
                 </a:tc>
+                <a:extLst>
+                  <a:ext uri="{0D108BD9-81ED-4DB2-BD59-A6C34878D82A}">
+                    <a16:rowId xmlns:a16="http://schemas.microsoft.com/office/drawing/2014/main" val="1825471136"/>
+                  </a:ext>
+                </a:extLst>
+              </a:tr>
+              <a:tr h="848017">
                 <a:tc>
                   <a:txBody>
                     <a:bodyPr/>
@@ -31070,10 +32528,10 @@
                     <a:p>
                       <a:pPr algn="just"/>
                       <a:r>
-                        <a:rPr lang="en-US" sz="1800" dirty="0"/>
-                        <a:t>test/unit/</a:t>
-                      </a:r>
-                      <a:endParaRPr lang="en-US" dirty="0"/>
+                        <a:rPr lang="en-US" sz="1400" dirty="0" err="1"/>
+                        <a:t>nemd_test</a:t>
+                      </a:r>
+                      <a:endParaRPr lang="en-US" sz="1400" dirty="0"/>
                     </a:p>
                   </a:txBody>
                   <a:tcPr marL="137160" marR="137160" marT="137160" marB="137160" anchor="ctr">
@@ -31104,20 +32562,9 @@
                     <a:p>
                       <a:pPr algn="just"/>
                       <a:r>
-                        <a:rPr lang="en-US" sz="1800" dirty="0">
-                          <a:solidFill>
-                            <a:schemeClr val="accent4">
-                              <a:lumMod val="75000"/>
-                            </a:schemeClr>
-                          </a:solidFill>
-                        </a:rPr>
-                        <a:t>Unit testing </a:t>
-                      </a:r>
-                      <a:r>
-                        <a:rPr lang="en-US" sz="1800" dirty="0"/>
-                        <a:t>makes sure that functions and methods are operating as expected.</a:t>
-                      </a:r>
-                      <a:endParaRPr lang="en-US" dirty="0"/>
+                        <a:rPr lang="en-US" sz="1400" dirty="0"/>
+                        <a:t>test/unit/</a:t>
+                      </a:r>
                     </a:p>
                   </a:txBody>
                   <a:tcPr marL="137160" marR="137160" marT="137160" marB="137160" anchor="ctr">
@@ -31141,24 +32588,42 @@
                     </a:lnB>
                   </a:tcPr>
                 </a:tc>
-                <a:extLst>
-                  <a:ext uri="{0D108BD9-81ED-4DB2-BD59-A6C34878D82A}">
-                    <a16:rowId xmlns:a16="http://schemas.microsoft.com/office/drawing/2014/main" val="1370259124"/>
-                  </a:ext>
-                </a:extLst>
-              </a:tr>
-              <a:tr h="848017">
-                <a:tc>
-                  <a:txBody>
-                    <a:bodyPr/>
-                    <a:lstStyle/>
-                    <a:p>
-                      <a:pPr algn="just"/>
-                      <a:r>
-                        <a:rPr lang="en-US" dirty="0" err="1"/>
-                        <a:t>nemd_itest</a:t>
-                      </a:r>
-                      <a:endParaRPr lang="en-US" dirty="0"/>
+                <a:tc>
+                  <a:txBody>
+                    <a:bodyPr/>
+                    <a:lstStyle/>
+                    <a:p>
+                      <a:pPr marL="0" marR="0" lvl="0" indent="0" algn="just" defTabSz="914400" rtl="0" eaLnBrk="1" fontAlgn="auto" latinLnBrk="0" hangingPunct="1">
+                        <a:lnSpc>
+                          <a:spcPct val="100000"/>
+                        </a:lnSpc>
+                        <a:spcBef>
+                          <a:spcPts val="0"/>
+                        </a:spcBef>
+                        <a:spcAft>
+                          <a:spcPts val="0"/>
+                        </a:spcAft>
+                        <a:buClrTx/>
+                        <a:buSzTx/>
+                        <a:buFontTx/>
+                        <a:buNone/>
+                        <a:tabLst/>
+                        <a:defRPr/>
+                      </a:pPr>
+                      <a:r>
+                        <a:rPr lang="en-US" sz="1400" dirty="0">
+                          <a:solidFill>
+                            <a:schemeClr val="accent4">
+                              <a:lumMod val="75000"/>
+                            </a:schemeClr>
+                          </a:solidFill>
+                        </a:rPr>
+                        <a:t>Unit testing </a:t>
+                      </a:r>
+                      <a:r>
+                        <a:rPr lang="en-US" sz="1400" dirty="0"/>
+                        <a:t>makes sure that functions and methods are operating as expected. (Bug-free for every piece)</a:t>
+                      </a:r>
                     </a:p>
                   </a:txBody>
                   <a:tcPr marL="137160" marR="137160" marT="137160" marB="137160" anchor="ctr">
@@ -31205,8 +32670,8 @@
                         <a:defRPr/>
                       </a:pPr>
                       <a:r>
-                        <a:rPr lang="en-US" dirty="0"/>
-                        <a:t>test/integration/</a:t>
+                        <a:rPr lang="en-US" sz="1400" dirty="0"/>
+                        <a:t>Free of bugs when parameterizing every piece of the code.</a:t>
                       </a:r>
                     </a:p>
                   </a:txBody>
@@ -31231,6 +32696,13 @@
                     </a:lnB>
                   </a:tcPr>
                 </a:tc>
+                <a:extLst>
+                  <a:ext uri="{0D108BD9-81ED-4DB2-BD59-A6C34878D82A}">
+                    <a16:rowId xmlns:a16="http://schemas.microsoft.com/office/drawing/2014/main" val="1370259124"/>
+                  </a:ext>
+                </a:extLst>
+              </a:tr>
+              <a:tr h="848017">
                 <a:tc>
                   <a:txBody>
                     <a:bodyPr/>
@@ -31238,25 +32710,10 @@
                     <a:p>
                       <a:pPr algn="just"/>
                       <a:r>
-                        <a:rPr lang="en-US" sz="1800" kern="1200" dirty="0">
-                          <a:solidFill>
-                            <a:schemeClr val="accent6"/>
-                          </a:solidFill>
-                          <a:effectLst/>
-                        </a:rPr>
-                        <a:t>Integration testing</a:t>
-                      </a:r>
-                      <a:r>
-                        <a:rPr lang="en-US" sz="1800" kern="1200" dirty="0">
-                          <a:effectLst/>
-                        </a:rPr>
-                        <a:t> </a:t>
-                      </a:r>
-                      <a:r>
-                        <a:rPr lang="en-US" sz="1800" dirty="0"/>
-                        <a:t>makes sure that scripts run without tracebacks and yield reproducible results.</a:t>
-                      </a:r>
-                      <a:endParaRPr lang="en-US" dirty="0"/>
+                        <a:rPr lang="en-US" sz="1400" dirty="0" err="1"/>
+                        <a:t>nemd_itest</a:t>
+                      </a:r>
+                      <a:endParaRPr lang="en-US" sz="1400" dirty="0"/>
                     </a:p>
                   </a:txBody>
                   <a:tcPr marL="137160" marR="137160" marT="137160" marB="137160" anchor="ctr">
@@ -31280,24 +32737,32 @@
                     </a:lnB>
                   </a:tcPr>
                 </a:tc>
-                <a:extLst>
-                  <a:ext uri="{0D108BD9-81ED-4DB2-BD59-A6C34878D82A}">
-                    <a16:rowId xmlns:a16="http://schemas.microsoft.com/office/drawing/2014/main" val="1118220872"/>
-                  </a:ext>
-                </a:extLst>
-              </a:tr>
-              <a:tr h="848017">
-                <a:tc>
-                  <a:txBody>
-                    <a:bodyPr/>
-                    <a:lstStyle/>
-                    <a:p>
-                      <a:pPr algn="just"/>
-                      <a:r>
-                        <a:rPr lang="en-US" dirty="0" err="1"/>
-                        <a:t>nemd_ptest</a:t>
-                      </a:r>
-                      <a:endParaRPr lang="en-US" dirty="0"/>
+                <a:tc>
+                  <a:txBody>
+                    <a:bodyPr/>
+                    <a:lstStyle/>
+                    <a:p>
+                      <a:pPr marL="0" marR="0" lvl="0" indent="0" algn="just" defTabSz="914400" rtl="0" eaLnBrk="1" fontAlgn="auto" latinLnBrk="0" hangingPunct="1">
+                        <a:lnSpc>
+                          <a:spcPct val="100000"/>
+                        </a:lnSpc>
+                        <a:spcBef>
+                          <a:spcPts val="0"/>
+                        </a:spcBef>
+                        <a:spcAft>
+                          <a:spcPts val="0"/>
+                        </a:spcAft>
+                        <a:buClrTx/>
+                        <a:buSzTx/>
+                        <a:buFontTx/>
+                        <a:buNone/>
+                        <a:tabLst/>
+                        <a:defRPr/>
+                      </a:pPr>
+                      <a:r>
+                        <a:rPr lang="en-US" sz="1400" dirty="0"/>
+                        <a:t>test/integration/</a:t>
+                      </a:r>
                     </a:p>
                   </a:txBody>
                   <a:tcPr marL="137160" marR="137160" marT="137160" marB="137160" anchor="ctr">
@@ -31328,8 +32793,23 @@
                     <a:p>
                       <a:pPr algn="just"/>
                       <a:r>
-                        <a:rPr lang="en-US" dirty="0"/>
-                        <a:t>test/performance/</a:t>
+                        <a:rPr lang="en-US" sz="1400" kern="1200" dirty="0">
+                          <a:solidFill>
+                            <a:schemeClr val="accent6"/>
+                          </a:solidFill>
+                          <a:effectLst/>
+                        </a:rPr>
+                        <a:t>Integration testing</a:t>
+                      </a:r>
+                      <a:r>
+                        <a:rPr lang="en-US" sz="1400" kern="1200" dirty="0">
+                          <a:effectLst/>
+                        </a:rPr>
+                        <a:t> </a:t>
+                      </a:r>
+                      <a:r>
+                        <a:rPr lang="en-US" sz="1400" dirty="0"/>
+                        <a:t>makes sure that scripts run without tracebacks and yield reproducible results. </a:t>
                       </a:r>
                     </a:p>
                   </a:txBody>
@@ -31361,26 +32841,9 @@
                     <a:p>
                       <a:pPr algn="just"/>
                       <a:r>
-                        <a:rPr lang="en-US" sz="1800" dirty="0">
-                          <a:solidFill>
-                            <a:schemeClr val="accent1"/>
-                          </a:solidFill>
-                        </a:rPr>
-                        <a:t>Performance testing </a:t>
-                      </a:r>
-                      <a:r>
-                        <a:rPr lang="en-US" sz="1800" b="0" i="0" kern="1200" dirty="0">
-                          <a:solidFill>
-                            <a:schemeClr val="tx1"/>
-                          </a:solidFill>
-                          <a:effectLst/>
-                          <a:latin typeface="+mn-lt"/>
-                          <a:ea typeface="+mn-ea"/>
-                          <a:cs typeface="+mn-cs"/>
-                        </a:rPr>
-                        <a:t>evaluates the speed, responsiveness and stability for bottleneck identification and nullification.</a:t>
-                      </a:r>
-                      <a:endParaRPr lang="en-US" dirty="0"/>
+                        <a:rPr lang="en-US" sz="1400" dirty="0"/>
+                        <a:t>Expected behavior and accuracy when driver and workflow combines pieces.</a:t>
+                      </a:r>
                     </a:p>
                   </a:txBody>
                   <a:tcPr marL="137160" marR="137160" marT="137160" marB="137160" anchor="ctr">
@@ -31406,7 +32869,7 @@
                 </a:tc>
                 <a:extLst>
                   <a:ext uri="{0D108BD9-81ED-4DB2-BD59-A6C34878D82A}">
-                    <a16:rowId xmlns:a16="http://schemas.microsoft.com/office/drawing/2014/main" val="865586714"/>
+                    <a16:rowId xmlns:a16="http://schemas.microsoft.com/office/drawing/2014/main" val="1118220872"/>
                   </a:ext>
                 </a:extLst>
               </a:tr>
@@ -31418,10 +32881,10 @@
                     <a:p>
                       <a:pPr algn="just"/>
                       <a:r>
-                        <a:rPr lang="en-US" dirty="0" err="1"/>
-                        <a:t>nemd_stest</a:t>
-                      </a:r>
-                      <a:endParaRPr lang="en-US" dirty="0"/>
+                        <a:rPr lang="en-US" sz="1400" dirty="0" err="1"/>
+                        <a:t>nemd_ptest</a:t>
+                      </a:r>
+                      <a:endParaRPr lang="en-US" sz="1400" dirty="0"/>
                     </a:p>
                   </a:txBody>
                   <a:tcPr marL="137160" marR="137160" marT="137160" marB="137160" anchor="ctr">
@@ -31452,8 +32915,8 @@
                     <a:p>
                       <a:pPr algn="just"/>
                       <a:r>
-                        <a:rPr lang="en-US" dirty="0"/>
-                        <a:t>test/scientific/</a:t>
+                        <a:rPr lang="en-US" sz="1400" dirty="0"/>
+                        <a:t>test/performance/</a:t>
                       </a:r>
                     </a:p>
                   </a:txBody>
@@ -31485,22 +32948,15 @@
                     <a:p>
                       <a:pPr algn="just"/>
                       <a:r>
-                        <a:rPr lang="en-US" sz="1800" kern="1200" dirty="0">
+                        <a:rPr lang="en-US" sz="1400" dirty="0">
                           <a:solidFill>
-                            <a:schemeClr val="accent2"/>
+                            <a:schemeClr val="accent1"/>
                           </a:solidFill>
-                          <a:latin typeface="+mn-lt"/>
-                          <a:ea typeface="+mn-ea"/>
-                          <a:cs typeface="+mn-cs"/>
-                        </a:rPr>
-                        <a:t>Scientific testing </a:t>
-                      </a:r>
-                      <a:r>
-                        <a:rPr lang="en-US" sz="1800" dirty="0"/>
-                        <a:t>ensures the repeatability, correctness and </a:t>
-                      </a:r>
-                      <a:r>
-                        <a:rPr lang="en-US" sz="1800" b="0" i="0" kern="1200" dirty="0">
+                        </a:rPr>
+                        <a:t>Performance testing </a:t>
+                      </a:r>
+                      <a:r>
+                        <a:rPr lang="en-US" sz="1400" b="0" i="0" kern="1200" dirty="0">
                           <a:solidFill>
                             <a:schemeClr val="tx1"/>
                           </a:solidFill>
@@ -31509,13 +32965,209 @@
                           <a:ea typeface="+mn-ea"/>
                           <a:cs typeface="+mn-cs"/>
                         </a:rPr>
+                        <a:t>evaluates the speed, responsiveness and stability for bottleneck identification and nullification. </a:t>
+                      </a:r>
+                      <a:endParaRPr lang="en-US" sz="1400" dirty="0"/>
+                    </a:p>
+                  </a:txBody>
+                  <a:tcPr marL="137160" marR="137160" marT="137160" marB="137160" anchor="ctr">
+                    <a:lnT w="12700" cap="flat" cmpd="sng" algn="ctr">
+                      <a:solidFill>
+                        <a:schemeClr val="tx1"/>
+                      </a:solidFill>
+                      <a:prstDash val="solid"/>
+                      <a:round/>
+                      <a:headEnd type="none" w="med" len="med"/>
+                      <a:tailEnd type="none" w="med" len="med"/>
+                    </a:lnT>
+                    <a:lnB w="12700" cap="flat" cmpd="sng" algn="ctr">
+                      <a:solidFill>
+                        <a:schemeClr val="tx1"/>
+                      </a:solidFill>
+                      <a:prstDash val="solid"/>
+                      <a:round/>
+                      <a:headEnd type="none" w="med" len="med"/>
+                      <a:tailEnd type="none" w="med" len="med"/>
+                    </a:lnB>
+                  </a:tcPr>
+                </a:tc>
+                <a:tc>
+                  <a:txBody>
+                    <a:bodyPr/>
+                    <a:lstStyle/>
+                    <a:p>
+                      <a:pPr algn="just"/>
+                      <a:r>
+                        <a:rPr lang="en-US" sz="1400" dirty="0"/>
+                        <a:t>Resource efficiency on scaling up.</a:t>
+                      </a:r>
+                    </a:p>
+                  </a:txBody>
+                  <a:tcPr marL="137160" marR="137160" marT="137160" marB="137160" anchor="ctr">
+                    <a:lnT w="12700" cap="flat" cmpd="sng" algn="ctr">
+                      <a:solidFill>
+                        <a:schemeClr val="tx1"/>
+                      </a:solidFill>
+                      <a:prstDash val="solid"/>
+                      <a:round/>
+                      <a:headEnd type="none" w="med" len="med"/>
+                      <a:tailEnd type="none" w="med" len="med"/>
+                    </a:lnT>
+                    <a:lnB w="12700" cap="flat" cmpd="sng" algn="ctr">
+                      <a:solidFill>
+                        <a:schemeClr val="tx1"/>
+                      </a:solidFill>
+                      <a:prstDash val="solid"/>
+                      <a:round/>
+                      <a:headEnd type="none" w="med" len="med"/>
+                      <a:tailEnd type="none" w="med" len="med"/>
+                    </a:lnB>
+                  </a:tcPr>
+                </a:tc>
+                <a:extLst>
+                  <a:ext uri="{0D108BD9-81ED-4DB2-BD59-A6C34878D82A}">
+                    <a16:rowId xmlns:a16="http://schemas.microsoft.com/office/drawing/2014/main" val="865586714"/>
+                  </a:ext>
+                </a:extLst>
+              </a:tr>
+              <a:tr h="848017">
+                <a:tc>
+                  <a:txBody>
+                    <a:bodyPr/>
+                    <a:lstStyle/>
+                    <a:p>
+                      <a:pPr algn="just"/>
+                      <a:r>
+                        <a:rPr lang="en-US" sz="1400" dirty="0" err="1"/>
+                        <a:t>nemd_stest</a:t>
+                      </a:r>
+                      <a:endParaRPr lang="en-US" sz="1400" dirty="0"/>
+                    </a:p>
+                  </a:txBody>
+                  <a:tcPr marL="137160" marR="137160" marT="137160" marB="137160" anchor="ctr">
+                    <a:lnT w="12700" cap="flat" cmpd="sng" algn="ctr">
+                      <a:solidFill>
+                        <a:schemeClr val="tx1"/>
+                      </a:solidFill>
+                      <a:prstDash val="solid"/>
+                      <a:round/>
+                      <a:headEnd type="none" w="med" len="med"/>
+                      <a:tailEnd type="none" w="med" len="med"/>
+                    </a:lnT>
+                    <a:lnB w="12700" cap="flat" cmpd="sng" algn="ctr">
+                      <a:solidFill>
+                        <a:schemeClr val="tx1"/>
+                      </a:solidFill>
+                      <a:prstDash val="solid"/>
+                      <a:round/>
+                      <a:headEnd type="none" w="med" len="med"/>
+                      <a:tailEnd type="none" w="med" len="med"/>
+                    </a:lnB>
+                  </a:tcPr>
+                </a:tc>
+                <a:tc>
+                  <a:txBody>
+                    <a:bodyPr/>
+                    <a:lstStyle/>
+                    <a:p>
+                      <a:pPr algn="just"/>
+                      <a:r>
+                        <a:rPr lang="en-US" sz="1400" dirty="0"/>
+                        <a:t>test/scientific/</a:t>
+                      </a:r>
+                    </a:p>
+                  </a:txBody>
+                  <a:tcPr marL="137160" marR="137160" marT="137160" marB="137160" anchor="ctr">
+                    <a:lnT w="12700" cap="flat" cmpd="sng" algn="ctr">
+                      <a:solidFill>
+                        <a:schemeClr val="tx1"/>
+                      </a:solidFill>
+                      <a:prstDash val="solid"/>
+                      <a:round/>
+                      <a:headEnd type="none" w="med" len="med"/>
+                      <a:tailEnd type="none" w="med" len="med"/>
+                    </a:lnT>
+                    <a:lnB w="12700" cap="flat" cmpd="sng" algn="ctr">
+                      <a:solidFill>
+                        <a:schemeClr val="tx1"/>
+                      </a:solidFill>
+                      <a:prstDash val="solid"/>
+                      <a:round/>
+                      <a:headEnd type="none" w="med" len="med"/>
+                      <a:tailEnd type="none" w="med" len="med"/>
+                    </a:lnB>
+                  </a:tcPr>
+                </a:tc>
+                <a:tc>
+                  <a:txBody>
+                    <a:bodyPr/>
+                    <a:lstStyle/>
+                    <a:p>
+                      <a:pPr algn="just"/>
+                      <a:r>
+                        <a:rPr lang="en-US" sz="1400" kern="1200" dirty="0">
+                          <a:solidFill>
+                            <a:schemeClr val="accent2"/>
+                          </a:solidFill>
+                          <a:latin typeface="+mn-lt"/>
+                          <a:ea typeface="+mn-ea"/>
+                          <a:cs typeface="+mn-cs"/>
+                        </a:rPr>
+                        <a:t>Scientific testing </a:t>
+                      </a:r>
+                      <a:r>
+                        <a:rPr lang="en-US" sz="1400" dirty="0"/>
+                        <a:t>ensures the repeatability, correctness and </a:t>
+                      </a:r>
+                      <a:r>
+                        <a:rPr lang="en-US" sz="1400" b="0" i="0" kern="1200" dirty="0">
+                          <a:solidFill>
+                            <a:schemeClr val="tx1"/>
+                          </a:solidFill>
+                          <a:effectLst/>
+                          <a:latin typeface="+mn-lt"/>
+                          <a:ea typeface="+mn-ea"/>
+                          <a:cs typeface="+mn-cs"/>
+                        </a:rPr>
                         <a:t>accuracy of the </a:t>
                       </a:r>
                       <a:r>
-                        <a:rPr lang="en-US" sz="1800" dirty="0"/>
-                        <a:t>scientific outputs.</a:t>
-                      </a:r>
-                      <a:endParaRPr lang="en-US" dirty="0"/>
+                        <a:rPr lang="en-US" sz="1400" dirty="0"/>
+                        <a:t>scientific outputs. </a:t>
+                      </a:r>
+                    </a:p>
+                  </a:txBody>
+                  <a:tcPr marL="137160" marR="137160" marT="137160" marB="137160" anchor="ctr">
+                    <a:lnT w="12700" cap="flat" cmpd="sng" algn="ctr">
+                      <a:solidFill>
+                        <a:schemeClr val="tx1"/>
+                      </a:solidFill>
+                      <a:prstDash val="solid"/>
+                      <a:round/>
+                      <a:headEnd type="none" w="med" len="med"/>
+                      <a:tailEnd type="none" w="med" len="med"/>
+                    </a:lnT>
+                    <a:lnB w="12700" cap="flat" cmpd="sng" algn="ctr">
+                      <a:solidFill>
+                        <a:schemeClr val="tx1"/>
+                      </a:solidFill>
+                      <a:prstDash val="solid"/>
+                      <a:round/>
+                      <a:headEnd type="none" w="med" len="med"/>
+                      <a:tailEnd type="none" w="med" len="med"/>
+                    </a:lnB>
+                  </a:tcPr>
+                </a:tc>
+                <a:tc>
+                  <a:txBody>
+                    <a:bodyPr/>
+                    <a:lstStyle/>
+                    <a:p>
+                      <a:pPr algn="just"/>
+                      <a:r>
+                        <a:rPr lang="en-US" sz="1400" dirty="0"/>
+                        <a:t>Physical meaning and standard deviation.</a:t>
+                      </a:r>
                     </a:p>
                   </a:txBody>
                   <a:tcPr marL="137160" marR="137160" marT="137160" marB="137160" anchor="ctr">
@@ -31562,13 +33214,13 @@
           <p:nvPr>
             <p:extLst>
               <p:ext uri="{D42A27DB-BD31-4B8C-83A1-F6EECF244321}">
-                <p14:modId xmlns:p14="http://schemas.microsoft.com/office/powerpoint/2010/main" val="886976504"/>
+                <p14:modId xmlns:p14="http://schemas.microsoft.com/office/powerpoint/2010/main" val="1244679421"/>
               </p:ext>
             </p:extLst>
           </p:nvPr>
         </p:nvGraphicFramePr>
         <p:xfrm>
-          <a:off x="8977745" y="183788"/>
+          <a:off x="9348619" y="183788"/>
           <a:ext cx="2438928" cy="1820506"/>
         </p:xfrm>
         <a:graphic>
@@ -31591,8 +33243,8 @@
         </p:nvSpPr>
         <p:spPr>
           <a:xfrm>
-            <a:off x="9724536" y="1084119"/>
-            <a:ext cx="982289" cy="489365"/>
+            <a:off x="10069832" y="1160852"/>
+            <a:ext cx="982289" cy="313932"/>
           </a:xfrm>
           <a:prstGeom prst="rect">
             <a:avLst/>
@@ -31616,72 +33268,12 @@
               </a:spcAft>
             </a:pPr>
             <a:r>
-              <a:rPr lang="en-US" sz="1200" dirty="0"/>
-              <a:t>Bug-free</a:t>
-            </a:r>
-          </a:p>
-          <a:p>
-            <a:pPr lvl="0" algn="ctr" defTabSz="533400">
-              <a:lnSpc>
-                <a:spcPct val="90000"/>
-              </a:lnSpc>
-              <a:spcBef>
-                <a:spcPct val="0"/>
-              </a:spcBef>
-              <a:spcAft>
-                <a:spcPct val="35000"/>
-              </a:spcAft>
-            </a:pPr>
-            <a:r>
-              <a:rPr lang="en-US" sz="1200" dirty="0">
+              <a:rPr lang="en-US" sz="1600" dirty="0">
                 <a:solidFill>
                   <a:schemeClr val="accent4"/>
                 </a:solidFill>
               </a:rPr>
               <a:t>unit</a:t>
-            </a:r>
-          </a:p>
-        </p:txBody>
-      </p:sp>
-      <p:sp>
-        <p:nvSpPr>
-          <p:cNvPr id="8" name="Rectangle 7">
-            <a:extLst>
-              <a:ext uri="{FF2B5EF4-FFF2-40B4-BE49-F238E27FC236}">
-                <a16:creationId xmlns:a16="http://schemas.microsoft.com/office/drawing/2014/main" id="{847BE624-C351-E947-A83D-174C1415950F}"/>
-              </a:ext>
-            </a:extLst>
-          </p:cNvPr>
-          <p:cNvSpPr/>
-          <p:nvPr/>
-        </p:nvSpPr>
-        <p:spPr>
-          <a:xfrm>
-            <a:off x="2881745" y="569325"/>
-            <a:ext cx="6096000" cy="369332"/>
-          </a:xfrm>
-          <a:prstGeom prst="rect">
-            <a:avLst/>
-          </a:prstGeom>
-        </p:spPr>
-        <p:txBody>
-          <a:bodyPr>
-            <a:spAutoFit/>
-          </a:bodyPr>
-          <a:lstStyle/>
-          <a:p>
-            <a:pPr algn="ctr"/>
-            <a:r>
-              <a:rPr lang="en-US" i="1" dirty="0"/>
-              <a:t>source </a:t>
-            </a:r>
-            <a:r>
-              <a:rPr lang="en-US" i="1" dirty="0" err="1"/>
-              <a:t>premake</a:t>
-            </a:r>
-            <a:r>
-              <a:rPr lang="en-US" dirty="0"/>
-              <a:t> before running tests</a:t>
             </a:r>
           </a:p>
         </p:txBody>
@@ -31712,6 +33304,66 @@
               <a:t>9</a:t>
             </a:fld>
             <a:endParaRPr lang="en-US"/>
+          </a:p>
+        </p:txBody>
+      </p:sp>
+      <p:sp>
+        <p:nvSpPr>
+          <p:cNvPr id="6" name="TextBox 5">
+            <a:extLst>
+              <a:ext uri="{FF2B5EF4-FFF2-40B4-BE49-F238E27FC236}">
+                <a16:creationId xmlns:a16="http://schemas.microsoft.com/office/drawing/2014/main" id="{B9A57C75-0530-DFBC-804F-FE681A5481B6}"/>
+              </a:ext>
+            </a:extLst>
+          </p:cNvPr>
+          <p:cNvSpPr txBox="1"/>
+          <p:nvPr/>
+        </p:nvSpPr>
+        <p:spPr>
+          <a:xfrm>
+            <a:off x="714893" y="6355595"/>
+            <a:ext cx="6097064" cy="307777"/>
+          </a:xfrm>
+          <a:prstGeom prst="rect">
+            <a:avLst/>
+          </a:prstGeom>
+          <a:noFill/>
+        </p:spPr>
+        <p:txBody>
+          <a:bodyPr wrap="square">
+            <a:spAutoFit/>
+          </a:bodyPr>
+          <a:lstStyle/>
+          <a:p>
+            <a:pPr marL="0" marR="0" lvl="0" indent="0" algn="just" defTabSz="914400" rtl="0" eaLnBrk="1" fontAlgn="auto" latinLnBrk="0" hangingPunct="1">
+              <a:lnSpc>
+                <a:spcPct val="100000"/>
+              </a:lnSpc>
+              <a:spcBef>
+                <a:spcPts val="0"/>
+              </a:spcBef>
+              <a:spcAft>
+                <a:spcPts val="0"/>
+              </a:spcAft>
+              <a:buClrTx/>
+              <a:buSzTx/>
+              <a:buFontTx/>
+              <a:buNone/>
+              <a:tabLst/>
+              <a:defRPr/>
+            </a:pPr>
+            <a:r>
+              <a:rPr lang="en-US" sz="1400" i="1" dirty="0"/>
+              <a:t>* source </a:t>
+            </a:r>
+            <a:r>
+              <a:rPr lang="en-US" sz="1400" i="1" dirty="0" err="1"/>
+              <a:t>premake</a:t>
+            </a:r>
+            <a:r>
+              <a:rPr lang="en-US" sz="1400" dirty="0"/>
+              <a:t> before running tests</a:t>
+            </a:r>
           </a:p>
         </p:txBody>
       </p:sp>

</xml_diff>

<commit_message>
rdkit upgraded from '2024.9.4' to '2025.03.3' dispersion_driver.py passes logger to struct nemd_test adds help for PYTEST_ADDOPTS and -m slow to run slow tests add error fixture to conftest.py fix unittest screen printing for alamode_test.py, test_test.py, cb_lmp_log_workflow_test.py, ab_lmp_traj_workflow_test.py, and mb_lmp_log_workflow_test.py
</commit_message>
<xml_diff>
--- a/docs/power_point/nemd.pptx
+++ b/docs/power_point/nemd.pptx
@@ -3105,7 +3105,7 @@
           <a:p>
             <a:fld id="{4E7935B3-F5AC-0F49-A77F-693DEAA46623}" type="datetimeFigureOut">
               <a:rPr lang="en-US" smtClean="0"/>
-              <a:t>8/31/25</a:t>
+              <a:t>9/7/25</a:t>
             </a:fld>
             <a:endParaRPr lang="en-US"/>
           </a:p>
@@ -3879,7 +3879,7 @@
           <a:p>
             <a:fld id="{7139230D-D256-FE47-99BF-6F642436F56E}" type="datetime1">
               <a:rPr lang="en-US" smtClean="0"/>
-              <a:t>8/31/25</a:t>
+              <a:t>9/7/25</a:t>
             </a:fld>
             <a:endParaRPr lang="en-US"/>
           </a:p>
@@ -4077,7 +4077,7 @@
           <a:p>
             <a:fld id="{785AC849-5CEB-3846-9265-8D72BE481A70}" type="datetime1">
               <a:rPr lang="en-US" smtClean="0"/>
-              <a:t>8/31/25</a:t>
+              <a:t>9/7/25</a:t>
             </a:fld>
             <a:endParaRPr lang="en-US"/>
           </a:p>
@@ -4285,7 +4285,7 @@
           <a:p>
             <a:fld id="{A02BBDEB-BEE0-FD44-AAFC-27969F9541FD}" type="datetime1">
               <a:rPr lang="en-US" smtClean="0"/>
-              <a:t>8/31/25</a:t>
+              <a:t>9/7/25</a:t>
             </a:fld>
             <a:endParaRPr lang="en-US"/>
           </a:p>
@@ -4483,7 +4483,7 @@
           <a:p>
             <a:fld id="{4F82860A-5855-1941-A1E0-F1AE52EC854D}" type="datetime1">
               <a:rPr lang="en-US" smtClean="0"/>
-              <a:t>8/31/25</a:t>
+              <a:t>9/7/25</a:t>
             </a:fld>
             <a:endParaRPr lang="en-US"/>
           </a:p>
@@ -4758,7 +4758,7 @@
           <a:p>
             <a:fld id="{6A874B4C-42F5-E24E-B25F-613EC7F4AF0D}" type="datetime1">
               <a:rPr lang="en-US" smtClean="0"/>
-              <a:t>8/31/25</a:t>
+              <a:t>9/7/25</a:t>
             </a:fld>
             <a:endParaRPr lang="en-US"/>
           </a:p>
@@ -5023,7 +5023,7 @@
           <a:p>
             <a:fld id="{9A2BCD20-0178-0C41-9D8E-10FA267A6CCC}" type="datetime1">
               <a:rPr lang="en-US" smtClean="0"/>
-              <a:t>8/31/25</a:t>
+              <a:t>9/7/25</a:t>
             </a:fld>
             <a:endParaRPr lang="en-US"/>
           </a:p>
@@ -5435,7 +5435,7 @@
           <a:p>
             <a:fld id="{EDE58456-60EB-6840-BCEB-E4C2678C039E}" type="datetime1">
               <a:rPr lang="en-US" smtClean="0"/>
-              <a:t>8/31/25</a:t>
+              <a:t>9/7/25</a:t>
             </a:fld>
             <a:endParaRPr lang="en-US"/>
           </a:p>
@@ -5576,7 +5576,7 @@
           <a:p>
             <a:fld id="{8BBFCD94-1F0D-3948-A9F0-DB82F9AAC2D3}" type="datetime1">
               <a:rPr lang="en-US" smtClean="0"/>
-              <a:t>8/31/25</a:t>
+              <a:t>9/7/25</a:t>
             </a:fld>
             <a:endParaRPr lang="en-US"/>
           </a:p>
@@ -5689,7 +5689,7 @@
           <a:p>
             <a:fld id="{13692FAC-AC21-0848-AC27-426B7BF29104}" type="datetime1">
               <a:rPr lang="en-US" smtClean="0"/>
-              <a:t>8/31/25</a:t>
+              <a:t>9/7/25</a:t>
             </a:fld>
             <a:endParaRPr lang="en-US"/>
           </a:p>
@@ -6000,7 +6000,7 @@
           <a:p>
             <a:fld id="{A3FF56F3-8608-FF4D-9C26-AE6D473095CB}" type="datetime1">
               <a:rPr lang="en-US" smtClean="0"/>
-              <a:t>8/31/25</a:t>
+              <a:t>9/7/25</a:t>
             </a:fld>
             <a:endParaRPr lang="en-US"/>
           </a:p>
@@ -6288,7 +6288,7 @@
           <a:p>
             <a:fld id="{58CC49A9-C646-2345-B4A7-439457175566}" type="datetime1">
               <a:rPr lang="en-US" smtClean="0"/>
-              <a:t>8/31/25</a:t>
+              <a:t>9/7/25</a:t>
             </a:fld>
             <a:endParaRPr lang="en-US"/>
           </a:p>
@@ -6529,7 +6529,7 @@
           <a:p>
             <a:fld id="{D516C8CC-C3CD-B94B-94D6-0913487DB5E5}" type="datetime1">
               <a:rPr lang="en-US" smtClean="0"/>
-              <a:t>8/31/25</a:t>
+              <a:t>9/7/25</a:t>
             </a:fld>
             <a:endParaRPr lang="en-US"/>
           </a:p>
@@ -7164,11 +7164,17 @@
           <p:cNvGraphicFramePr>
             <a:graphicFrameLocks noGrp="1"/>
           </p:cNvGraphicFramePr>
-          <p:nvPr/>
+          <p:nvPr>
+            <p:extLst>
+              <p:ext uri="{D42A27DB-BD31-4B8C-83A1-F6EECF244321}">
+                <p14:modId xmlns:p14="http://schemas.microsoft.com/office/powerpoint/2010/main" val="273126429"/>
+              </p:ext>
+            </p:extLst>
+          </p:nvPr>
         </p:nvGraphicFramePr>
         <p:xfrm>
-          <a:off x="404453" y="1591570"/>
-          <a:ext cx="11383094" cy="4764025"/>
+          <a:off x="4470010" y="174303"/>
+          <a:ext cx="6598229" cy="2316480"/>
         </p:xfrm>
         <a:graphic>
           <a:graphicData uri="http://schemas.openxmlformats.org/drawingml/2006/table">
@@ -7177,42 +7183,49 @@
                 <a:tableStyleId>{2D5ABB26-0587-4C30-8999-92F81FD0307C}</a:tableStyleId>
               </a:tblPr>
               <a:tblGrid>
-                <a:gridCol w="1177604">
+                <a:gridCol w="1078739">
                   <a:extLst>
                     <a:ext uri="{9D8B030D-6E8A-4147-A177-3AD203B41FA5}">
                       <a16:colId xmlns:a16="http://schemas.microsoft.com/office/drawing/2014/main" val="140681280"/>
                     </a:ext>
                   </a:extLst>
                 </a:gridCol>
-                <a:gridCol w="1632857">
+                <a:gridCol w="1591724">
                   <a:extLst>
                     <a:ext uri="{9D8B030D-6E8A-4147-A177-3AD203B41FA5}">
-                      <a16:colId xmlns:a16="http://schemas.microsoft.com/office/drawing/2014/main" val="819792391"/>
+                      <a16:colId xmlns:a16="http://schemas.microsoft.com/office/drawing/2014/main" val="3804093500"/>
                     </a:ext>
                   </a:extLst>
                 </a:gridCol>
-                <a:gridCol w="5130334">
+                <a:gridCol w="987137">
                   <a:extLst>
                     <a:ext uri="{9D8B030D-6E8A-4147-A177-3AD203B41FA5}">
                       <a16:colId xmlns:a16="http://schemas.microsoft.com/office/drawing/2014/main" val="3388334755"/>
                     </a:ext>
                   </a:extLst>
                 </a:gridCol>
-                <a:gridCol w="3442299">
+                <a:gridCol w="1993842">
                   <a:extLst>
                     <a:ext uri="{9D8B030D-6E8A-4147-A177-3AD203B41FA5}">
                       <a16:colId xmlns:a16="http://schemas.microsoft.com/office/drawing/2014/main" val="1365888191"/>
                     </a:ext>
                   </a:extLst>
                 </a:gridCol>
+                <a:gridCol w="946787">
+                  <a:extLst>
+                    <a:ext uri="{9D8B030D-6E8A-4147-A177-3AD203B41FA5}">
+                      <a16:colId xmlns:a16="http://schemas.microsoft.com/office/drawing/2014/main" val="4111230781"/>
+                    </a:ext>
+                  </a:extLst>
+                </a:gridCol>
               </a:tblGrid>
-              <a:tr h="548783">
-                <a:tc>
-                  <a:txBody>
-                    <a:bodyPr/>
-                    <a:lstStyle/>
-                    <a:p>
-                      <a:pPr algn="just"/>
+              <a:tr h="476888">
+                <a:tc>
+                  <a:txBody>
+                    <a:bodyPr/>
+                    <a:lstStyle/>
+                    <a:p>
+                      <a:pPr algn="ctr"/>
                       <a:r>
                         <a:rPr lang="en-US" sz="1400" dirty="0"/>
                         <a:t>Command</a:t>
@@ -7236,10 +7249,10 @@
                     <a:bodyPr/>
                     <a:lstStyle/>
                     <a:p>
-                      <a:pPr algn="just"/>
+                      <a:pPr algn="ctr"/>
                       <a:r>
                         <a:rPr lang="en-US" sz="1400" dirty="0"/>
-                        <a:t>Location</a:t>
+                        <a:t>PYTEST_ADDOPTS</a:t>
                       </a:r>
                     </a:p>
                   </a:txBody>
@@ -7260,10 +7273,10 @@
                     <a:bodyPr/>
                     <a:lstStyle/>
                     <a:p>
-                      <a:pPr algn="just"/>
+                      <a:pPr algn="ctr"/>
                       <a:r>
                         <a:rPr lang="en-US" sz="1400" dirty="0"/>
-                        <a:t>Description</a:t>
+                        <a:t>Type</a:t>
                       </a:r>
                     </a:p>
                   </a:txBody>
@@ -7284,10 +7297,10 @@
                     <a:bodyPr/>
                     <a:lstStyle/>
                     <a:p>
-                      <a:pPr algn="just"/>
+                      <a:pPr algn="ctr"/>
                       <a:r>
                         <a:rPr lang="en-US" sz="1400" dirty="0"/>
-                        <a:t>Goal</a:t>
+                        <a:t>Results</a:t>
                       </a:r>
                     </a:p>
                   </a:txBody>
@@ -7303,26 +7316,46 @@
                     </a:lnB>
                   </a:tcPr>
                 </a:tc>
+                <a:tc>
+                  <a:txBody>
+                    <a:bodyPr/>
+                    <a:lstStyle/>
+                    <a:p>
+                      <a:pPr algn="ctr"/>
+                      <a:r>
+                        <a:rPr lang="en-US" sz="1400" dirty="0"/>
+                        <a:t>Per-Test</a:t>
+                      </a:r>
+                    </a:p>
+                  </a:txBody>
+                  <a:tcPr marL="137160" marR="137160" marT="137160" marB="137160" anchor="ctr">
+                    <a:lnB w="12700" cap="flat" cmpd="sng" algn="ctr">
+                      <a:solidFill>
+                        <a:schemeClr val="tx1"/>
+                      </a:solidFill>
+                      <a:prstDash val="solid"/>
+                      <a:round/>
+                      <a:headEnd type="none" w="med" len="med"/>
+                      <a:tailEnd type="none" w="med" len="med"/>
+                    </a:lnB>
+                  </a:tcPr>
+                </a:tc>
                 <a:extLst>
                   <a:ext uri="{0D108BD9-81ED-4DB2-BD59-A6C34878D82A}">
                     <a16:rowId xmlns:a16="http://schemas.microsoft.com/office/drawing/2014/main" val="2761390173"/>
                   </a:ext>
                 </a:extLst>
               </a:tr>
-              <a:tr h="823174">
-                <a:tc>
-                  <a:txBody>
-                    <a:bodyPr/>
-                    <a:lstStyle/>
-                    <a:p>
-                      <a:pPr algn="just"/>
-                      <a:r>
-                        <a:rPr lang="en-US" sz="1400" dirty="0"/>
-                        <a:t>source </a:t>
-                      </a:r>
+              <a:tr h="871903">
+                <a:tc rowSpan="2">
+                  <a:txBody>
+                    <a:bodyPr/>
+                    <a:lstStyle/>
+                    <a:p>
+                      <a:pPr algn="ctr"/>
                       <a:r>
                         <a:rPr lang="en-US" sz="1400" dirty="0" err="1"/>
-                        <a:t>premake</a:t>
+                        <a:t>nemd_test</a:t>
                       </a:r>
                       <a:endParaRPr lang="en-US" sz="1400" dirty="0"/>
                     </a:p>
@@ -7353,12 +7386,11 @@
                     <a:bodyPr/>
                     <a:lstStyle/>
                     <a:p>
-                      <a:pPr algn="just"/>
-                      <a:r>
-                        <a:rPr lang="en-US" sz="1400" dirty="0" err="1"/>
-                        <a:t>premake</a:t>
-                      </a:r>
-                      <a:endParaRPr lang="en-US" sz="1400" dirty="0"/>
+                      <a:pPr algn="ctr"/>
+                      <a:r>
+                        <a:rPr lang="en-US" sz="1400" dirty="0"/>
+                        <a:t>"-m 'not slow'"</a:t>
+                      </a:r>
                     </a:p>
                   </a:txBody>
                   <a:tcPr marL="137160" marR="137160" marT="137160" marB="137160" anchor="ctr">
@@ -7387,10 +7419,84 @@
                     <a:bodyPr/>
                     <a:lstStyle/>
                     <a:p>
-                      <a:pPr algn="just"/>
-                      <a:r>
-                        <a:rPr lang="en-US" sz="1400" dirty="0"/>
-                        <a:t>Environmental configuration allows additional utilities, strongly recommended when opening a new shell.</a:t>
+                      <a:pPr marL="0" marR="0" lvl="0" indent="0" algn="ctr" defTabSz="914400" rtl="0" eaLnBrk="1" fontAlgn="auto" latinLnBrk="0" hangingPunct="1">
+                        <a:lnSpc>
+                          <a:spcPct val="100000"/>
+                        </a:lnSpc>
+                        <a:spcBef>
+                          <a:spcPts val="0"/>
+                        </a:spcBef>
+                        <a:spcAft>
+                          <a:spcPts val="0"/>
+                        </a:spcAft>
+                        <a:buClrTx/>
+                        <a:buSzTx/>
+                        <a:buFontTx/>
+                        <a:buNone/>
+                        <a:tabLst/>
+                        <a:defRPr/>
+                      </a:pPr>
+                      <a:r>
+                        <a:rPr lang="en-US" sz="1400" dirty="0">
+                          <a:solidFill>
+                            <a:schemeClr val="tx1"/>
+                          </a:solidFill>
+                        </a:rPr>
+                        <a:t>module</a:t>
+                      </a:r>
+                    </a:p>
+                    <a:p>
+                      <a:pPr marL="0" marR="0" lvl="0" indent="0" algn="ctr" defTabSz="914400" rtl="0" eaLnBrk="1" fontAlgn="auto" latinLnBrk="0" hangingPunct="1">
+                        <a:lnSpc>
+                          <a:spcPct val="100000"/>
+                        </a:lnSpc>
+                        <a:spcBef>
+                          <a:spcPts val="0"/>
+                        </a:spcBef>
+                        <a:spcAft>
+                          <a:spcPts val="0"/>
+                        </a:spcAft>
+                        <a:buClrTx/>
+                        <a:buSzTx/>
+                        <a:buFontTx/>
+                        <a:buNone/>
+                        <a:tabLst/>
+                        <a:defRPr/>
+                      </a:pPr>
+                      <a:r>
+                        <a:rPr lang="en-US" sz="1400" dirty="0">
+                          <a:solidFill>
+                            <a:schemeClr val="tx1"/>
+                          </a:solidFill>
+                        </a:rPr>
+                        <a:t>driver</a:t>
+                      </a:r>
+                    </a:p>
+                    <a:p>
+                      <a:pPr marL="0" marR="0" lvl="0" indent="0" algn="ctr" defTabSz="914400" rtl="0" eaLnBrk="1" fontAlgn="auto" latinLnBrk="0" hangingPunct="1">
+                        <a:lnSpc>
+                          <a:spcPct val="100000"/>
+                        </a:lnSpc>
+                        <a:spcBef>
+                          <a:spcPts val="0"/>
+                        </a:spcBef>
+                        <a:spcAft>
+                          <a:spcPts val="0"/>
+                        </a:spcAft>
+                        <a:buClrTx/>
+                        <a:buSzTx/>
+                        <a:buFontTx/>
+                        <a:buNone/>
+                        <a:tabLst/>
+                        <a:defRPr/>
+                      </a:pPr>
+                      <a:r>
+                        <a:rPr lang="en-US" sz="1400" dirty="0">
+                          <a:solidFill>
+                            <a:schemeClr val="tx1"/>
+                          </a:solidFill>
+                        </a:rPr>
+                        <a:t>workflow</a:t>
                       </a:r>
                     </a:p>
                   </a:txBody>
@@ -7420,7 +7526,7 @@
                     <a:bodyPr/>
                     <a:lstStyle/>
                     <a:p>
-                      <a:pPr marL="0" marR="0" lvl="0" indent="0" algn="just" defTabSz="914400" rtl="0" eaLnBrk="1" fontAlgn="auto" latinLnBrk="0" hangingPunct="1">
+                      <a:pPr marL="0" marR="0" lvl="0" indent="0" algn="ctr" defTabSz="914400" rtl="0" eaLnBrk="1" fontAlgn="auto" latinLnBrk="0" hangingPunct="1">
                         <a:lnSpc>
                           <a:spcPct val="100000"/>
                         </a:lnSpc>
@@ -7438,9 +7544,68 @@
                         <a:defRPr/>
                       </a:pPr>
                       <a:r>
-                        <a:rPr lang="en-US" sz="1400" dirty="0"/>
-                        <a:t>Use the source code instead of the installation.</a:t>
-                      </a:r>
+                        <a:rPr lang="en-US" sz="1400" dirty="0">
+                          <a:solidFill>
+                            <a:schemeClr val="tx1"/>
+                          </a:solidFill>
+                        </a:rPr>
+                        <a:t>1725 passed in 14.35s</a:t>
+                      </a:r>
+                    </a:p>
+                    <a:p>
+                      <a:pPr marL="0" marR="0" lvl="0" indent="0" algn="ctr" defTabSz="914400" rtl="0" eaLnBrk="1" fontAlgn="auto" latinLnBrk="0" hangingPunct="1">
+                        <a:lnSpc>
+                          <a:spcPct val="100000"/>
+                        </a:lnSpc>
+                        <a:spcBef>
+                          <a:spcPts val="0"/>
+                        </a:spcBef>
+                        <a:spcAft>
+                          <a:spcPts val="0"/>
+                        </a:spcAft>
+                        <a:buClrTx/>
+                        <a:buSzTx/>
+                        <a:buFontTx/>
+                        <a:buNone/>
+                        <a:tabLst/>
+                        <a:defRPr/>
+                      </a:pPr>
+                      <a:r>
+                        <a:rPr lang="en-US" sz="1400" dirty="0">
+                          <a:solidFill>
+                            <a:schemeClr val="tx1"/>
+                          </a:solidFill>
+                        </a:rPr>
+                        <a:t>129 passed in 6.33s</a:t>
+                      </a:r>
+                    </a:p>
+                    <a:p>
+                      <a:pPr marL="0" marR="0" lvl="0" indent="0" algn="ctr" defTabSz="914400" rtl="0" eaLnBrk="1" fontAlgn="auto" latinLnBrk="0" hangingPunct="1">
+                        <a:lnSpc>
+                          <a:spcPct val="100000"/>
+                        </a:lnSpc>
+                        <a:spcBef>
+                          <a:spcPts val="0"/>
+                        </a:spcBef>
+                        <a:spcAft>
+                          <a:spcPts val="0"/>
+                        </a:spcAft>
+                        <a:buClrTx/>
+                        <a:buSzTx/>
+                        <a:buFontTx/>
+                        <a:buNone/>
+                        <a:tabLst/>
+                        <a:defRPr/>
+                      </a:pPr>
+                      <a:r>
+                        <a:rPr lang="en-US" sz="1400" dirty="0">
+                          <a:solidFill>
+                            <a:schemeClr val="tx1"/>
+                          </a:solidFill>
+                        </a:rPr>
+                        <a:t>43 passed in 4.16s</a:t>
+                      </a:r>
+                      <a:endParaRPr lang="en-US" sz="1400" dirty="0"/>
                     </a:p>
                   </a:txBody>
                   <a:tcPr marL="137160" marR="137160" marT="137160" marB="137160" anchor="ctr">
@@ -7464,24 +7629,32 @@
                     </a:lnB>
                   </a:tcPr>
                 </a:tc>
-                <a:extLst>
-                  <a:ext uri="{0D108BD9-81ED-4DB2-BD59-A6C34878D82A}">
-                    <a16:rowId xmlns:a16="http://schemas.microsoft.com/office/drawing/2014/main" val="1825471136"/>
-                  </a:ext>
-                </a:extLst>
-              </a:tr>
-              <a:tr h="848017">
-                <a:tc>
-                  <a:txBody>
-                    <a:bodyPr/>
-                    <a:lstStyle/>
-                    <a:p>
-                      <a:pPr algn="just"/>
-                      <a:r>
-                        <a:rPr lang="en-US" sz="1400" dirty="0" err="1"/>
-                        <a:t>nemd_test</a:t>
-                      </a:r>
-                      <a:endParaRPr lang="en-US" sz="1400" dirty="0"/>
+                <a:tc>
+                  <a:txBody>
+                    <a:bodyPr/>
+                    <a:lstStyle/>
+                    <a:p>
+                      <a:pPr marL="0" marR="0" lvl="0" indent="0" algn="ctr" defTabSz="914400" rtl="0" eaLnBrk="1" fontAlgn="auto" latinLnBrk="0" hangingPunct="1">
+                        <a:lnSpc>
+                          <a:spcPct val="100000"/>
+                        </a:lnSpc>
+                        <a:spcBef>
+                          <a:spcPts val="0"/>
+                        </a:spcBef>
+                        <a:spcAft>
+                          <a:spcPts val="0"/>
+                        </a:spcAft>
+                        <a:buClrTx/>
+                        <a:buSzTx/>
+                        <a:buFontTx/>
+                        <a:buNone/>
+                        <a:tabLst/>
+                        <a:defRPr/>
+                      </a:pPr>
+                      <a:r>
+                        <a:rPr lang="en-US" sz="1400" dirty="0"/>
+                        <a:t>0.0131s</a:t>
+                      </a:r>
                     </a:p>
                   </a:txBody>
                   <a:tcPr marL="137160" marR="137160" marT="137160" marB="137160" anchor="ctr">
@@ -7505,16 +7678,19 @@
                     </a:lnB>
                   </a:tcPr>
                 </a:tc>
-                <a:tc>
-                  <a:txBody>
-                    <a:bodyPr/>
-                    <a:lstStyle/>
-                    <a:p>
-                      <a:pPr algn="just"/>
-                      <a:r>
-                        <a:rPr lang="en-US" sz="1400" dirty="0"/>
-                        <a:t>test/unit/</a:t>
-                      </a:r>
+                <a:extLst>
+                  <a:ext uri="{0D108BD9-81ED-4DB2-BD59-A6C34878D82A}">
+                    <a16:rowId xmlns:a16="http://schemas.microsoft.com/office/drawing/2014/main" val="1825471136"/>
+                  </a:ext>
+                </a:extLst>
+              </a:tr>
+              <a:tr h="871903">
+                <a:tc vMerge="1">
+                  <a:txBody>
+                    <a:bodyPr/>
+                    <a:lstStyle/>
+                    <a:p>
+                      <a:endParaRPr dirty="0"/>
                     </a:p>
                   </a:txBody>
                   <a:tcPr marL="137160" marR="137160" marT="137160" marB="137160" anchor="ctr">
@@ -7543,36 +7719,10 @@
                     <a:bodyPr/>
                     <a:lstStyle/>
                     <a:p>
-                      <a:pPr marL="0" marR="0" lvl="0" indent="0" algn="just" defTabSz="914400" rtl="0" eaLnBrk="1" fontAlgn="auto" latinLnBrk="0" hangingPunct="1">
-                        <a:lnSpc>
-                          <a:spcPct val="100000"/>
-                        </a:lnSpc>
-                        <a:spcBef>
-                          <a:spcPts val="0"/>
-                        </a:spcBef>
-                        <a:spcAft>
-                          <a:spcPts val="0"/>
-                        </a:spcAft>
-                        <a:buClrTx/>
-                        <a:buSzTx/>
-                        <a:buFontTx/>
-                        <a:buNone/>
-                        <a:tabLst/>
-                        <a:defRPr/>
-                      </a:pPr>
-                      <a:r>
-                        <a:rPr lang="en-US" sz="1400" dirty="0">
-                          <a:solidFill>
-                            <a:schemeClr val="accent4">
-                              <a:lumMod val="75000"/>
-                            </a:schemeClr>
-                          </a:solidFill>
-                        </a:rPr>
-                        <a:t>Unit testing </a:t>
-                      </a:r>
+                      <a:pPr algn="ctr"/>
                       <a:r>
                         <a:rPr lang="en-US" sz="1400" dirty="0"/>
-                        <a:t>makes sure that functions and methods are operating as expected. (Bug-free for every piece)</a:t>
+                        <a:t>"-m slow"</a:t>
                       </a:r>
                     </a:p>
                   </a:txBody>
@@ -7602,7 +7752,7 @@
                     <a:bodyPr/>
                     <a:lstStyle/>
                     <a:p>
-                      <a:pPr marL="0" marR="0" lvl="0" indent="0" algn="just" defTabSz="914400" rtl="0" eaLnBrk="1" fontAlgn="auto" latinLnBrk="0" hangingPunct="1">
+                      <a:pPr marL="0" marR="0" lvl="0" indent="0" algn="ctr" defTabSz="914400" rtl="0" eaLnBrk="1" fontAlgn="auto" latinLnBrk="0" hangingPunct="1">
                         <a:lnSpc>
                           <a:spcPct val="100000"/>
                         </a:lnSpc>
@@ -7620,8 +7770,66 @@
                         <a:defRPr/>
                       </a:pPr>
                       <a:r>
-                        <a:rPr lang="en-US" sz="1400" dirty="0"/>
-                        <a:t>Free of bugs when parameterizing every piece of the code.</a:t>
+                        <a:rPr lang="en-US" sz="1400" dirty="0">
+                          <a:solidFill>
+                            <a:schemeClr val="tx1"/>
+                          </a:solidFill>
+                        </a:rPr>
+                        <a:t>module</a:t>
+                      </a:r>
+                    </a:p>
+                    <a:p>
+                      <a:pPr marL="0" marR="0" lvl="0" indent="0" algn="ctr" defTabSz="914400" rtl="0" eaLnBrk="1" fontAlgn="auto" latinLnBrk="0" hangingPunct="1">
+                        <a:lnSpc>
+                          <a:spcPct val="100000"/>
+                        </a:lnSpc>
+                        <a:spcBef>
+                          <a:spcPts val="0"/>
+                        </a:spcBef>
+                        <a:spcAft>
+                          <a:spcPts val="0"/>
+                        </a:spcAft>
+                        <a:buClrTx/>
+                        <a:buSzTx/>
+                        <a:buFontTx/>
+                        <a:buNone/>
+                        <a:tabLst/>
+                        <a:defRPr/>
+                      </a:pPr>
+                      <a:r>
+                        <a:rPr lang="en-US" sz="1400" dirty="0">
+                          <a:solidFill>
+                            <a:schemeClr val="tx1"/>
+                          </a:solidFill>
+                        </a:rPr>
+                        <a:t>driver</a:t>
+                      </a:r>
+                    </a:p>
+                    <a:p>
+                      <a:pPr marL="0" marR="0" lvl="0" indent="0" algn="ctr" defTabSz="914400" rtl="0" eaLnBrk="1" fontAlgn="auto" latinLnBrk="0" hangingPunct="1">
+                        <a:lnSpc>
+                          <a:spcPct val="100000"/>
+                        </a:lnSpc>
+                        <a:spcBef>
+                          <a:spcPts val="0"/>
+                        </a:spcBef>
+                        <a:spcAft>
+                          <a:spcPts val="0"/>
+                        </a:spcAft>
+                        <a:buClrTx/>
+                        <a:buSzTx/>
+                        <a:buFontTx/>
+                        <a:buNone/>
+                        <a:tabLst/>
+                        <a:defRPr/>
+                      </a:pPr>
+                      <a:r>
+                        <a:rPr lang="en-US" sz="1400" dirty="0">
+                          <a:solidFill>
+                            <a:schemeClr val="tx1"/>
+                          </a:solidFill>
+                        </a:rPr>
+                        <a:t>workflow</a:t>
                       </a:r>
                     </a:p>
                   </a:txBody>
@@ -7646,24 +7854,90 @@
                     </a:lnB>
                   </a:tcPr>
                 </a:tc>
-                <a:extLst>
-                  <a:ext uri="{0D108BD9-81ED-4DB2-BD59-A6C34878D82A}">
-                    <a16:rowId xmlns:a16="http://schemas.microsoft.com/office/drawing/2014/main" val="1370259124"/>
-                  </a:ext>
-                </a:extLst>
-              </a:tr>
-              <a:tr h="848017">
-                <a:tc>
-                  <a:txBody>
-                    <a:bodyPr/>
-                    <a:lstStyle/>
-                    <a:p>
-                      <a:pPr algn="just"/>
-                      <a:r>
-                        <a:rPr lang="en-US" sz="1400" dirty="0" err="1"/>
-                        <a:t>nemd_itest</a:t>
-                      </a:r>
-                      <a:endParaRPr lang="en-US" sz="1400" dirty="0"/>
+                <a:tc>
+                  <a:txBody>
+                    <a:bodyPr/>
+                    <a:lstStyle/>
+                    <a:p>
+                      <a:pPr marL="0" marR="0" lvl="0" indent="0" algn="ctr" defTabSz="914400" rtl="0" eaLnBrk="1" fontAlgn="auto" latinLnBrk="0" hangingPunct="1">
+                        <a:lnSpc>
+                          <a:spcPct val="100000"/>
+                        </a:lnSpc>
+                        <a:spcBef>
+                          <a:spcPts val="0"/>
+                        </a:spcBef>
+                        <a:spcAft>
+                          <a:spcPts val="0"/>
+                        </a:spcAft>
+                        <a:buClrTx/>
+                        <a:buSzTx/>
+                        <a:buFontTx/>
+                        <a:buNone/>
+                        <a:tabLst/>
+                        <a:defRPr/>
+                      </a:pPr>
+                      <a:r>
+                        <a:rPr lang="en-US" sz="1400" dirty="0">
+                          <a:solidFill>
+                            <a:schemeClr val="tx1"/>
+                          </a:solidFill>
+                        </a:rPr>
+                        <a:t>1 passed in 20.97s</a:t>
+                      </a:r>
+                    </a:p>
+                    <a:p>
+                      <a:pPr marL="0" marR="0" lvl="0" indent="0" algn="ctr" defTabSz="914400" rtl="0" eaLnBrk="1" fontAlgn="auto" latinLnBrk="0" hangingPunct="1">
+                        <a:lnSpc>
+                          <a:spcPct val="100000"/>
+                        </a:lnSpc>
+                        <a:spcBef>
+                          <a:spcPts val="0"/>
+                        </a:spcBef>
+                        <a:spcAft>
+                          <a:spcPts val="0"/>
+                        </a:spcAft>
+                        <a:buClrTx/>
+                        <a:buSzTx/>
+                        <a:buFontTx/>
+                        <a:buNone/>
+                        <a:tabLst/>
+                        <a:defRPr/>
+                      </a:pPr>
+                      <a:r>
+                        <a:rPr lang="en-US" sz="1400" dirty="0">
+                          <a:solidFill>
+                            <a:schemeClr val="tx1"/>
+                          </a:solidFill>
+                        </a:rPr>
+                        <a:t>1 passed in 3.98s</a:t>
+                      </a:r>
+                    </a:p>
+                    <a:p>
+                      <a:pPr marL="0" marR="0" lvl="0" indent="0" algn="ctr" defTabSz="914400" rtl="0" eaLnBrk="1" fontAlgn="auto" latinLnBrk="0" hangingPunct="1">
+                        <a:lnSpc>
+                          <a:spcPct val="100000"/>
+                        </a:lnSpc>
+                        <a:spcBef>
+                          <a:spcPts val="0"/>
+                        </a:spcBef>
+                        <a:spcAft>
+                          <a:spcPts val="0"/>
+                        </a:spcAft>
+                        <a:buClrTx/>
+                        <a:buSzTx/>
+                        <a:buFontTx/>
+                        <a:buNone/>
+                        <a:tabLst/>
+                        <a:defRPr/>
+                      </a:pPr>
+                      <a:r>
+                        <a:rPr lang="en-US" sz="1400" dirty="0">
+                          <a:solidFill>
+                            <a:schemeClr val="tx1"/>
+                          </a:solidFill>
+                        </a:rPr>
+                        <a:t>no tests ran in 2.03s</a:t>
+                      </a:r>
                     </a:p>
                   </a:txBody>
                   <a:tcPr marL="137160" marR="137160" marT="137160" marB="137160" anchor="ctr">
@@ -7692,7 +7966,7 @@
                     <a:bodyPr/>
                     <a:lstStyle/>
                     <a:p>
-                      <a:pPr marL="0" marR="0" lvl="0" indent="0" algn="just" defTabSz="914400" rtl="0" eaLnBrk="1" fontAlgn="auto" latinLnBrk="0" hangingPunct="1">
+                      <a:pPr marL="0" marR="0" lvl="0" indent="0" algn="ctr" defTabSz="914400" rtl="0" eaLnBrk="1" fontAlgn="auto" latinLnBrk="0" hangingPunct="1">
                         <a:lnSpc>
                           <a:spcPct val="100000"/>
                         </a:lnSpc>
@@ -7710,8 +7984,12 @@
                         <a:defRPr/>
                       </a:pPr>
                       <a:r>
-                        <a:rPr lang="en-US" sz="1400" dirty="0"/>
-                        <a:t>test/integration/</a:t>
+                        <a:rPr lang="en-US" sz="1400" dirty="0">
+                          <a:solidFill>
+                            <a:schemeClr val="tx1"/>
+                          </a:solidFill>
+                        </a:rPr>
+                        <a:t>13.49s</a:t>
                       </a:r>
                     </a:p>
                   </a:txBody>
@@ -7736,414 +8014,9 @@
                     </a:lnB>
                   </a:tcPr>
                 </a:tc>
-                <a:tc>
-                  <a:txBody>
-                    <a:bodyPr/>
-                    <a:lstStyle/>
-                    <a:p>
-                      <a:pPr algn="just"/>
-                      <a:r>
-                        <a:rPr lang="en-US" sz="1400" kern="1200" dirty="0">
-                          <a:solidFill>
-                            <a:schemeClr val="accent6"/>
-                          </a:solidFill>
-                          <a:effectLst/>
-                        </a:rPr>
-                        <a:t>Integration testing</a:t>
-                      </a:r>
-                      <a:r>
-                        <a:rPr lang="en-US" sz="1400" kern="1200" dirty="0">
-                          <a:effectLst/>
-                        </a:rPr>
-                        <a:t> </a:t>
-                      </a:r>
-                      <a:r>
-                        <a:rPr lang="en-US" sz="1400" dirty="0"/>
-                        <a:t>makes sure that scripts run without tracebacks and yield reproducible results. </a:t>
-                      </a:r>
-                    </a:p>
-                  </a:txBody>
-                  <a:tcPr marL="137160" marR="137160" marT="137160" marB="137160" anchor="ctr">
-                    <a:lnT w="12700" cap="flat" cmpd="sng" algn="ctr">
-                      <a:solidFill>
-                        <a:schemeClr val="tx1"/>
-                      </a:solidFill>
-                      <a:prstDash val="solid"/>
-                      <a:round/>
-                      <a:headEnd type="none" w="med" len="med"/>
-                      <a:tailEnd type="none" w="med" len="med"/>
-                    </a:lnT>
-                    <a:lnB w="12700" cap="flat" cmpd="sng" algn="ctr">
-                      <a:solidFill>
-                        <a:schemeClr val="tx1"/>
-                      </a:solidFill>
-                      <a:prstDash val="solid"/>
-                      <a:round/>
-                      <a:headEnd type="none" w="med" len="med"/>
-                      <a:tailEnd type="none" w="med" len="med"/>
-                    </a:lnB>
-                  </a:tcPr>
-                </a:tc>
-                <a:tc>
-                  <a:txBody>
-                    <a:bodyPr/>
-                    <a:lstStyle/>
-                    <a:p>
-                      <a:pPr algn="just"/>
-                      <a:r>
-                        <a:rPr lang="en-US" sz="1400" dirty="0"/>
-                        <a:t>Expected behavior and accuracy when driver and workflow combines pieces.</a:t>
-                      </a:r>
-                    </a:p>
-                  </a:txBody>
-                  <a:tcPr marL="137160" marR="137160" marT="137160" marB="137160" anchor="ctr">
-                    <a:lnT w="12700" cap="flat" cmpd="sng" algn="ctr">
-                      <a:solidFill>
-                        <a:schemeClr val="tx1"/>
-                      </a:solidFill>
-                      <a:prstDash val="solid"/>
-                      <a:round/>
-                      <a:headEnd type="none" w="med" len="med"/>
-                      <a:tailEnd type="none" w="med" len="med"/>
-                    </a:lnT>
-                    <a:lnB w="12700" cap="flat" cmpd="sng" algn="ctr">
-                      <a:solidFill>
-                        <a:schemeClr val="tx1"/>
-                      </a:solidFill>
-                      <a:prstDash val="solid"/>
-                      <a:round/>
-                      <a:headEnd type="none" w="med" len="med"/>
-                      <a:tailEnd type="none" w="med" len="med"/>
-                    </a:lnB>
-                  </a:tcPr>
-                </a:tc>
                 <a:extLst>
                   <a:ext uri="{0D108BD9-81ED-4DB2-BD59-A6C34878D82A}">
-                    <a16:rowId xmlns:a16="http://schemas.microsoft.com/office/drawing/2014/main" val="1118220872"/>
-                  </a:ext>
-                </a:extLst>
-              </a:tr>
-              <a:tr h="848017">
-                <a:tc>
-                  <a:txBody>
-                    <a:bodyPr/>
-                    <a:lstStyle/>
-                    <a:p>
-                      <a:pPr algn="just"/>
-                      <a:r>
-                        <a:rPr lang="en-US" sz="1400" dirty="0" err="1"/>
-                        <a:t>nemd_ptest</a:t>
-                      </a:r>
-                      <a:endParaRPr lang="en-US" sz="1400" dirty="0"/>
-                    </a:p>
-                  </a:txBody>
-                  <a:tcPr marL="137160" marR="137160" marT="137160" marB="137160" anchor="ctr">
-                    <a:lnT w="12700" cap="flat" cmpd="sng" algn="ctr">
-                      <a:solidFill>
-                        <a:schemeClr val="tx1"/>
-                      </a:solidFill>
-                      <a:prstDash val="solid"/>
-                      <a:round/>
-                      <a:headEnd type="none" w="med" len="med"/>
-                      <a:tailEnd type="none" w="med" len="med"/>
-                    </a:lnT>
-                    <a:lnB w="12700" cap="flat" cmpd="sng" algn="ctr">
-                      <a:solidFill>
-                        <a:schemeClr val="tx1"/>
-                      </a:solidFill>
-                      <a:prstDash val="solid"/>
-                      <a:round/>
-                      <a:headEnd type="none" w="med" len="med"/>
-                      <a:tailEnd type="none" w="med" len="med"/>
-                    </a:lnB>
-                  </a:tcPr>
-                </a:tc>
-                <a:tc>
-                  <a:txBody>
-                    <a:bodyPr/>
-                    <a:lstStyle/>
-                    <a:p>
-                      <a:pPr algn="just"/>
-                      <a:r>
-                        <a:rPr lang="en-US" sz="1400" dirty="0"/>
-                        <a:t>test/performance/</a:t>
-                      </a:r>
-                    </a:p>
-                  </a:txBody>
-                  <a:tcPr marL="137160" marR="137160" marT="137160" marB="137160" anchor="ctr">
-                    <a:lnT w="12700" cap="flat" cmpd="sng" algn="ctr">
-                      <a:solidFill>
-                        <a:schemeClr val="tx1"/>
-                      </a:solidFill>
-                      <a:prstDash val="solid"/>
-                      <a:round/>
-                      <a:headEnd type="none" w="med" len="med"/>
-                      <a:tailEnd type="none" w="med" len="med"/>
-                    </a:lnT>
-                    <a:lnB w="12700" cap="flat" cmpd="sng" algn="ctr">
-                      <a:solidFill>
-                        <a:schemeClr val="tx1"/>
-                      </a:solidFill>
-                      <a:prstDash val="solid"/>
-                      <a:round/>
-                      <a:headEnd type="none" w="med" len="med"/>
-                      <a:tailEnd type="none" w="med" len="med"/>
-                    </a:lnB>
-                  </a:tcPr>
-                </a:tc>
-                <a:tc>
-                  <a:txBody>
-                    <a:bodyPr/>
-                    <a:lstStyle/>
-                    <a:p>
-                      <a:pPr algn="just"/>
-                      <a:r>
-                        <a:rPr lang="en-US" sz="1400" dirty="0">
-                          <a:solidFill>
-                            <a:schemeClr val="accent1"/>
-                          </a:solidFill>
-                        </a:rPr>
-                        <a:t>Performance testing </a:t>
-                      </a:r>
-                      <a:r>
-                        <a:rPr lang="en-US" sz="1400" b="0" i="0" kern="1200" dirty="0">
-                          <a:solidFill>
-                            <a:schemeClr val="tx1"/>
-                          </a:solidFill>
-                          <a:effectLst/>
-                          <a:latin typeface="+mn-lt"/>
-                          <a:ea typeface="+mn-ea"/>
-                          <a:cs typeface="+mn-cs"/>
-                        </a:rPr>
-                        <a:t>evaluates the speed, responsiveness and stability for bottleneck identification and nullification. </a:t>
-                      </a:r>
-                      <a:endParaRPr lang="en-US" sz="1400" dirty="0"/>
-                    </a:p>
-                  </a:txBody>
-                  <a:tcPr marL="137160" marR="137160" marT="137160" marB="137160" anchor="ctr">
-                    <a:lnT w="12700" cap="flat" cmpd="sng" algn="ctr">
-                      <a:solidFill>
-                        <a:schemeClr val="tx1"/>
-                      </a:solidFill>
-                      <a:prstDash val="solid"/>
-                      <a:round/>
-                      <a:headEnd type="none" w="med" len="med"/>
-                      <a:tailEnd type="none" w="med" len="med"/>
-                    </a:lnT>
-                    <a:lnB w="12700" cap="flat" cmpd="sng" algn="ctr">
-                      <a:solidFill>
-                        <a:schemeClr val="tx1"/>
-                      </a:solidFill>
-                      <a:prstDash val="solid"/>
-                      <a:round/>
-                      <a:headEnd type="none" w="med" len="med"/>
-                      <a:tailEnd type="none" w="med" len="med"/>
-                    </a:lnB>
-                  </a:tcPr>
-                </a:tc>
-                <a:tc>
-                  <a:txBody>
-                    <a:bodyPr/>
-                    <a:lstStyle/>
-                    <a:p>
-                      <a:pPr algn="just"/>
-                      <a:r>
-                        <a:rPr lang="en-US" sz="1400" dirty="0"/>
-                        <a:t>Resource efficiency on scaling up.</a:t>
-                      </a:r>
-                    </a:p>
-                  </a:txBody>
-                  <a:tcPr marL="137160" marR="137160" marT="137160" marB="137160" anchor="ctr">
-                    <a:lnT w="12700" cap="flat" cmpd="sng" algn="ctr">
-                      <a:solidFill>
-                        <a:schemeClr val="tx1"/>
-                      </a:solidFill>
-                      <a:prstDash val="solid"/>
-                      <a:round/>
-                      <a:headEnd type="none" w="med" len="med"/>
-                      <a:tailEnd type="none" w="med" len="med"/>
-                    </a:lnT>
-                    <a:lnB w="12700" cap="flat" cmpd="sng" algn="ctr">
-                      <a:solidFill>
-                        <a:schemeClr val="tx1"/>
-                      </a:solidFill>
-                      <a:prstDash val="solid"/>
-                      <a:round/>
-                      <a:headEnd type="none" w="med" len="med"/>
-                      <a:tailEnd type="none" w="med" len="med"/>
-                    </a:lnB>
-                  </a:tcPr>
-                </a:tc>
-                <a:extLst>
-                  <a:ext uri="{0D108BD9-81ED-4DB2-BD59-A6C34878D82A}">
-                    <a16:rowId xmlns:a16="http://schemas.microsoft.com/office/drawing/2014/main" val="865586714"/>
-                  </a:ext>
-                </a:extLst>
-              </a:tr>
-              <a:tr h="848017">
-                <a:tc>
-                  <a:txBody>
-                    <a:bodyPr/>
-                    <a:lstStyle/>
-                    <a:p>
-                      <a:pPr algn="just"/>
-                      <a:r>
-                        <a:rPr lang="en-US" sz="1400" dirty="0" err="1"/>
-                        <a:t>nemd_stest</a:t>
-                      </a:r>
-                      <a:endParaRPr lang="en-US" sz="1400" dirty="0"/>
-                    </a:p>
-                  </a:txBody>
-                  <a:tcPr marL="137160" marR="137160" marT="137160" marB="137160" anchor="ctr">
-                    <a:lnT w="12700" cap="flat" cmpd="sng" algn="ctr">
-                      <a:solidFill>
-                        <a:schemeClr val="tx1"/>
-                      </a:solidFill>
-                      <a:prstDash val="solid"/>
-                      <a:round/>
-                      <a:headEnd type="none" w="med" len="med"/>
-                      <a:tailEnd type="none" w="med" len="med"/>
-                    </a:lnT>
-                    <a:lnB w="12700" cap="flat" cmpd="sng" algn="ctr">
-                      <a:solidFill>
-                        <a:schemeClr val="tx1"/>
-                      </a:solidFill>
-                      <a:prstDash val="solid"/>
-                      <a:round/>
-                      <a:headEnd type="none" w="med" len="med"/>
-                      <a:tailEnd type="none" w="med" len="med"/>
-                    </a:lnB>
-                  </a:tcPr>
-                </a:tc>
-                <a:tc>
-                  <a:txBody>
-                    <a:bodyPr/>
-                    <a:lstStyle/>
-                    <a:p>
-                      <a:pPr algn="just"/>
-                      <a:r>
-                        <a:rPr lang="en-US" sz="1400" dirty="0"/>
-                        <a:t>test/scientific/</a:t>
-                      </a:r>
-                    </a:p>
-                  </a:txBody>
-                  <a:tcPr marL="137160" marR="137160" marT="137160" marB="137160" anchor="ctr">
-                    <a:lnT w="12700" cap="flat" cmpd="sng" algn="ctr">
-                      <a:solidFill>
-                        <a:schemeClr val="tx1"/>
-                      </a:solidFill>
-                      <a:prstDash val="solid"/>
-                      <a:round/>
-                      <a:headEnd type="none" w="med" len="med"/>
-                      <a:tailEnd type="none" w="med" len="med"/>
-                    </a:lnT>
-                    <a:lnB w="12700" cap="flat" cmpd="sng" algn="ctr">
-                      <a:solidFill>
-                        <a:schemeClr val="tx1"/>
-                      </a:solidFill>
-                      <a:prstDash val="solid"/>
-                      <a:round/>
-                      <a:headEnd type="none" w="med" len="med"/>
-                      <a:tailEnd type="none" w="med" len="med"/>
-                    </a:lnB>
-                  </a:tcPr>
-                </a:tc>
-                <a:tc>
-                  <a:txBody>
-                    <a:bodyPr/>
-                    <a:lstStyle/>
-                    <a:p>
-                      <a:pPr algn="just"/>
-                      <a:r>
-                        <a:rPr lang="en-US" sz="1400" kern="1200" dirty="0">
-                          <a:solidFill>
-                            <a:schemeClr val="accent2"/>
-                          </a:solidFill>
-                          <a:latin typeface="+mn-lt"/>
-                          <a:ea typeface="+mn-ea"/>
-                          <a:cs typeface="+mn-cs"/>
-                        </a:rPr>
-                        <a:t>Scientific testing </a:t>
-                      </a:r>
-                      <a:r>
-                        <a:rPr lang="en-US" sz="1400" dirty="0"/>
-                        <a:t>ensures the repeatability, correctness and </a:t>
-                      </a:r>
-                      <a:r>
-                        <a:rPr lang="en-US" sz="1400" b="0" i="0" kern="1200" dirty="0">
-                          <a:solidFill>
-                            <a:schemeClr val="tx1"/>
-                          </a:solidFill>
-                          <a:effectLst/>
-                          <a:latin typeface="+mn-lt"/>
-                          <a:ea typeface="+mn-ea"/>
-                          <a:cs typeface="+mn-cs"/>
-                        </a:rPr>
-                        <a:t>accuracy of the </a:t>
-                      </a:r>
-                      <a:r>
-                        <a:rPr lang="en-US" sz="1400" dirty="0"/>
-                        <a:t>scientific outputs. </a:t>
-                      </a:r>
-                    </a:p>
-                  </a:txBody>
-                  <a:tcPr marL="137160" marR="137160" marT="137160" marB="137160" anchor="ctr">
-                    <a:lnT w="12700" cap="flat" cmpd="sng" algn="ctr">
-                      <a:solidFill>
-                        <a:schemeClr val="tx1"/>
-                      </a:solidFill>
-                      <a:prstDash val="solid"/>
-                      <a:round/>
-                      <a:headEnd type="none" w="med" len="med"/>
-                      <a:tailEnd type="none" w="med" len="med"/>
-                    </a:lnT>
-                    <a:lnB w="12700" cap="flat" cmpd="sng" algn="ctr">
-                      <a:solidFill>
-                        <a:schemeClr val="tx1"/>
-                      </a:solidFill>
-                      <a:prstDash val="solid"/>
-                      <a:round/>
-                      <a:headEnd type="none" w="med" len="med"/>
-                      <a:tailEnd type="none" w="med" len="med"/>
-                    </a:lnB>
-                  </a:tcPr>
-                </a:tc>
-                <a:tc>
-                  <a:txBody>
-                    <a:bodyPr/>
-                    <a:lstStyle/>
-                    <a:p>
-                      <a:pPr algn="just"/>
-                      <a:r>
-                        <a:rPr lang="en-US" sz="1400" dirty="0"/>
-                        <a:t>Physical meaning and standard deviation.</a:t>
-                      </a:r>
-                    </a:p>
-                  </a:txBody>
-                  <a:tcPr marL="137160" marR="137160" marT="137160" marB="137160" anchor="ctr">
-                    <a:lnT w="12700" cap="flat" cmpd="sng" algn="ctr">
-                      <a:solidFill>
-                        <a:schemeClr val="tx1"/>
-                      </a:solidFill>
-                      <a:prstDash val="solid"/>
-                      <a:round/>
-                      <a:headEnd type="none" w="med" len="med"/>
-                      <a:tailEnd type="none" w="med" len="med"/>
-                    </a:lnT>
-                    <a:lnB w="12700" cap="flat" cmpd="sng" algn="ctr">
-                      <a:solidFill>
-                        <a:schemeClr val="tx1"/>
-                      </a:solidFill>
-                      <a:prstDash val="solid"/>
-                      <a:round/>
-                      <a:headEnd type="none" w="med" len="med"/>
-                      <a:tailEnd type="none" w="med" len="med"/>
-                    </a:lnB>
-                  </a:tcPr>
-                </a:tc>
-                <a:extLst>
-                  <a:ext uri="{0D108BD9-81ED-4DB2-BD59-A6C34878D82A}">
-                    <a16:rowId xmlns:a16="http://schemas.microsoft.com/office/drawing/2014/main" val="3550715119"/>
+                    <a16:rowId xmlns:a16="http://schemas.microsoft.com/office/drawing/2014/main" val="1370259124"/>
                   </a:ext>
                 </a:extLst>
               </a:tr>
@@ -8194,7 +8067,7 @@
         </p:nvSpPr>
         <p:spPr>
           <a:xfrm>
-            <a:off x="714893" y="6355595"/>
+            <a:off x="4470010" y="6457528"/>
             <a:ext cx="6097064" cy="307777"/>
           </a:xfrm>
           <a:prstGeom prst="rect">
@@ -8240,6 +8113,1012 @@
           </a:p>
         </p:txBody>
       </p:sp>
+      <p:graphicFrame>
+        <p:nvGraphicFramePr>
+          <p:cNvPr id="7" name="Table 6">
+            <a:extLst>
+              <a:ext uri="{FF2B5EF4-FFF2-40B4-BE49-F238E27FC236}">
+                <a16:creationId xmlns:a16="http://schemas.microsoft.com/office/drawing/2014/main" id="{27D5B4CE-5718-2280-528F-82EBFA159824}"/>
+              </a:ext>
+            </a:extLst>
+          </p:cNvPr>
+          <p:cNvGraphicFramePr>
+            <a:graphicFrameLocks noGrp="1"/>
+          </p:cNvGraphicFramePr>
+          <p:nvPr>
+            <p:extLst>
+              <p:ext uri="{D42A27DB-BD31-4B8C-83A1-F6EECF244321}">
+                <p14:modId xmlns:p14="http://schemas.microsoft.com/office/powerpoint/2010/main" val="2024640112"/>
+              </p:ext>
+            </p:extLst>
+          </p:nvPr>
+        </p:nvGraphicFramePr>
+        <p:xfrm>
+          <a:off x="4470010" y="2586568"/>
+          <a:ext cx="6598228" cy="3870960"/>
+        </p:xfrm>
+        <a:graphic>
+          <a:graphicData uri="http://schemas.openxmlformats.org/drawingml/2006/table">
+            <a:tbl>
+              <a:tblPr firstRow="1" bandRow="1">
+                <a:tableStyleId>{2D5ABB26-0587-4C30-8999-92F81FD0307C}</a:tableStyleId>
+              </a:tblPr>
+              <a:tblGrid>
+                <a:gridCol w="1215743">
+                  <a:extLst>
+                    <a:ext uri="{9D8B030D-6E8A-4147-A177-3AD203B41FA5}">
+                      <a16:colId xmlns:a16="http://schemas.microsoft.com/office/drawing/2014/main" val="519871301"/>
+                    </a:ext>
+                  </a:extLst>
+                </a:gridCol>
+                <a:gridCol w="1370936">
+                  <a:extLst>
+                    <a:ext uri="{9D8B030D-6E8A-4147-A177-3AD203B41FA5}">
+                      <a16:colId xmlns:a16="http://schemas.microsoft.com/office/drawing/2014/main" val="3084682247"/>
+                    </a:ext>
+                  </a:extLst>
+                </a:gridCol>
+                <a:gridCol w="1082729">
+                  <a:extLst>
+                    <a:ext uri="{9D8B030D-6E8A-4147-A177-3AD203B41FA5}">
+                      <a16:colId xmlns:a16="http://schemas.microsoft.com/office/drawing/2014/main" val="2730536322"/>
+                    </a:ext>
+                  </a:extLst>
+                </a:gridCol>
+                <a:gridCol w="1553044">
+                  <a:extLst>
+                    <a:ext uri="{9D8B030D-6E8A-4147-A177-3AD203B41FA5}">
+                      <a16:colId xmlns:a16="http://schemas.microsoft.com/office/drawing/2014/main" val="3113920103"/>
+                    </a:ext>
+                  </a:extLst>
+                </a:gridCol>
+                <a:gridCol w="1375776">
+                  <a:extLst>
+                    <a:ext uri="{9D8B030D-6E8A-4147-A177-3AD203B41FA5}">
+                      <a16:colId xmlns:a16="http://schemas.microsoft.com/office/drawing/2014/main" val="1319148285"/>
+                    </a:ext>
+                  </a:extLst>
+                </a:gridCol>
+              </a:tblGrid>
+              <a:tr h="482252">
+                <a:tc>
+                  <a:txBody>
+                    <a:bodyPr/>
+                    <a:lstStyle/>
+                    <a:p>
+                      <a:pPr algn="ctr"/>
+                      <a:r>
+                        <a:rPr lang="en-US" sz="1400" dirty="0"/>
+                        <a:t>Command</a:t>
+                      </a:r>
+                    </a:p>
+                  </a:txBody>
+                  <a:tcPr marL="137160" marR="137160" marT="137160" marB="137160" anchor="ctr">
+                    <a:lnT w="12700" cap="flat" cmpd="sng" algn="ctr">
+                      <a:solidFill>
+                        <a:schemeClr val="tx1"/>
+                      </a:solidFill>
+                      <a:prstDash val="solid"/>
+                      <a:round/>
+                      <a:headEnd type="none" w="med" len="med"/>
+                      <a:tailEnd type="none" w="med" len="med"/>
+                    </a:lnT>
+                    <a:lnB w="12700" cap="flat" cmpd="sng" algn="ctr">
+                      <a:solidFill>
+                        <a:schemeClr val="tx1"/>
+                      </a:solidFill>
+                      <a:prstDash val="solid"/>
+                      <a:round/>
+                      <a:headEnd type="none" w="med" len="med"/>
+                      <a:tailEnd type="none" w="med" len="med"/>
+                    </a:lnB>
+                  </a:tcPr>
+                </a:tc>
+                <a:tc>
+                  <a:txBody>
+                    <a:bodyPr/>
+                    <a:lstStyle/>
+                    <a:p>
+                      <a:pPr algn="ctr"/>
+                      <a:r>
+                        <a:rPr lang="en-US" sz="1400" dirty="0"/>
+                        <a:t>PYTEST</a:t>
+                      </a:r>
+                    </a:p>
+                  </a:txBody>
+                  <a:tcPr marL="137160" marR="137160" marT="137160" marB="137160" anchor="ctr">
+                    <a:lnT w="12700" cap="flat" cmpd="sng" algn="ctr">
+                      <a:solidFill>
+                        <a:schemeClr val="tx1"/>
+                      </a:solidFill>
+                      <a:prstDash val="solid"/>
+                      <a:round/>
+                      <a:headEnd type="none" w="med" len="med"/>
+                      <a:tailEnd type="none" w="med" len="med"/>
+                    </a:lnT>
+                    <a:lnB w="12700" cap="flat" cmpd="sng" algn="ctr">
+                      <a:solidFill>
+                        <a:schemeClr val="tx1"/>
+                      </a:solidFill>
+                      <a:prstDash val="solid"/>
+                      <a:round/>
+                      <a:headEnd type="none" w="med" len="med"/>
+                      <a:tailEnd type="none" w="med" len="med"/>
+                    </a:lnB>
+                  </a:tcPr>
+                </a:tc>
+                <a:tc>
+                  <a:txBody>
+                    <a:bodyPr/>
+                    <a:lstStyle/>
+                    <a:p>
+                      <a:pPr marL="0" marR="0" lvl="0" indent="0" algn="ctr" defTabSz="914400" rtl="0" eaLnBrk="1" fontAlgn="auto" latinLnBrk="0" hangingPunct="1">
+                        <a:lnSpc>
+                          <a:spcPct val="100000"/>
+                        </a:lnSpc>
+                        <a:spcBef>
+                          <a:spcPts val="0"/>
+                        </a:spcBef>
+                        <a:spcAft>
+                          <a:spcPts val="0"/>
+                        </a:spcAft>
+                        <a:buClrTx/>
+                        <a:buSzTx/>
+                        <a:buFontTx/>
+                        <a:buNone/>
+                        <a:tabLst/>
+                        <a:defRPr/>
+                      </a:pPr>
+                      <a:r>
+                        <a:rPr lang="en-US" sz="1400" dirty="0" err="1">
+                          <a:solidFill>
+                            <a:schemeClr val="tx1"/>
+                          </a:solidFill>
+                        </a:rPr>
+                        <a:t>Dirname</a:t>
+                      </a:r>
+                      <a:endParaRPr lang="en-US" sz="1400" dirty="0">
+                        <a:solidFill>
+                          <a:schemeClr val="tx1"/>
+                        </a:solidFill>
+                      </a:endParaRPr>
+                    </a:p>
+                  </a:txBody>
+                  <a:tcPr marL="137160" marR="137160" marT="137160" marB="137160" anchor="ctr">
+                    <a:lnT w="12700" cap="flat" cmpd="sng" algn="ctr">
+                      <a:solidFill>
+                        <a:schemeClr val="tx1"/>
+                      </a:solidFill>
+                      <a:prstDash val="solid"/>
+                      <a:round/>
+                      <a:headEnd type="none" w="med" len="med"/>
+                      <a:tailEnd type="none" w="med" len="med"/>
+                    </a:lnT>
+                    <a:lnB w="12700" cap="flat" cmpd="sng" algn="ctr">
+                      <a:solidFill>
+                        <a:schemeClr val="tx1"/>
+                      </a:solidFill>
+                      <a:prstDash val="solid"/>
+                      <a:round/>
+                      <a:headEnd type="none" w="med" len="med"/>
+                      <a:tailEnd type="none" w="med" len="med"/>
+                    </a:lnB>
+                  </a:tcPr>
+                </a:tc>
+                <a:tc>
+                  <a:txBody>
+                    <a:bodyPr/>
+                    <a:lstStyle/>
+                    <a:p>
+                      <a:pPr marL="0" marR="0" lvl="0" indent="0" algn="ctr" defTabSz="914400" rtl="0" eaLnBrk="1" fontAlgn="auto" latinLnBrk="0" hangingPunct="1">
+                        <a:lnSpc>
+                          <a:spcPct val="100000"/>
+                        </a:lnSpc>
+                        <a:spcBef>
+                          <a:spcPts val="0"/>
+                        </a:spcBef>
+                        <a:spcAft>
+                          <a:spcPts val="0"/>
+                        </a:spcAft>
+                        <a:buClrTx/>
+                        <a:buSzTx/>
+                        <a:buFontTx/>
+                        <a:buNone/>
+                        <a:tabLst/>
+                        <a:defRPr/>
+                      </a:pPr>
+                      <a:r>
+                        <a:rPr lang="en-US" sz="1400" dirty="0">
+                          <a:solidFill>
+                            <a:schemeClr val="tx1"/>
+                          </a:solidFill>
+                        </a:rPr>
+                        <a:t>Type</a:t>
+                      </a:r>
+                    </a:p>
+                  </a:txBody>
+                  <a:tcPr marL="137160" marR="137160" marT="137160" marB="137160" anchor="ctr">
+                    <a:lnT w="12700" cap="flat" cmpd="sng" algn="ctr">
+                      <a:solidFill>
+                        <a:schemeClr val="tx1"/>
+                      </a:solidFill>
+                      <a:prstDash val="solid"/>
+                      <a:round/>
+                      <a:headEnd type="none" w="med" len="med"/>
+                      <a:tailEnd type="none" w="med" len="med"/>
+                    </a:lnT>
+                    <a:lnB w="12700" cap="flat" cmpd="sng" algn="ctr">
+                      <a:solidFill>
+                        <a:schemeClr val="tx1"/>
+                      </a:solidFill>
+                      <a:prstDash val="solid"/>
+                      <a:round/>
+                      <a:headEnd type="none" w="med" len="med"/>
+                      <a:tailEnd type="none" w="med" len="med"/>
+                    </a:lnB>
+                  </a:tcPr>
+                </a:tc>
+                <a:tc>
+                  <a:txBody>
+                    <a:bodyPr/>
+                    <a:lstStyle/>
+                    <a:p>
+                      <a:pPr marL="0" marR="0" lvl="0" indent="0" algn="ctr" defTabSz="914400" rtl="0" eaLnBrk="1" fontAlgn="auto" latinLnBrk="0" hangingPunct="1">
+                        <a:lnSpc>
+                          <a:spcPct val="100000"/>
+                        </a:lnSpc>
+                        <a:spcBef>
+                          <a:spcPts val="0"/>
+                        </a:spcBef>
+                        <a:spcAft>
+                          <a:spcPts val="0"/>
+                        </a:spcAft>
+                        <a:buClrTx/>
+                        <a:buSzTx/>
+                        <a:buFontTx/>
+                        <a:buNone/>
+                        <a:tabLst/>
+                        <a:defRPr/>
+                      </a:pPr>
+                      <a:r>
+                        <a:rPr lang="en-US" sz="1400" dirty="0"/>
+                        <a:t>Results</a:t>
+                      </a:r>
+                      <a:endParaRPr lang="en-US" sz="1400" dirty="0">
+                        <a:solidFill>
+                          <a:schemeClr val="tx1"/>
+                        </a:solidFill>
+                      </a:endParaRPr>
+                    </a:p>
+                  </a:txBody>
+                  <a:tcPr marL="137160" marR="137160" marT="137160" marB="137160" anchor="ctr">
+                    <a:lnT w="12700" cap="flat" cmpd="sng" algn="ctr">
+                      <a:solidFill>
+                        <a:schemeClr val="tx1"/>
+                      </a:solidFill>
+                      <a:prstDash val="solid"/>
+                      <a:round/>
+                      <a:headEnd type="none" w="med" len="med"/>
+                      <a:tailEnd type="none" w="med" len="med"/>
+                    </a:lnT>
+                    <a:lnB w="12700" cap="flat" cmpd="sng" algn="ctr">
+                      <a:solidFill>
+                        <a:schemeClr val="tx1"/>
+                      </a:solidFill>
+                      <a:prstDash val="solid"/>
+                      <a:round/>
+                      <a:headEnd type="none" w="med" len="med"/>
+                      <a:tailEnd type="none" w="med" len="med"/>
+                    </a:lnB>
+                  </a:tcPr>
+                </a:tc>
+                <a:extLst>
+                  <a:ext uri="{0D108BD9-81ED-4DB2-BD59-A6C34878D82A}">
+                    <a16:rowId xmlns:a16="http://schemas.microsoft.com/office/drawing/2014/main" val="1601929244"/>
+                  </a:ext>
+                </a:extLst>
+              </a:tr>
+              <a:tr h="1115209">
+                <a:tc rowSpan="3">
+                  <a:txBody>
+                    <a:bodyPr/>
+                    <a:lstStyle/>
+                    <a:p>
+                      <a:pPr marL="0" marR="0" lvl="0" indent="0" algn="ctr" defTabSz="914400" rtl="0" eaLnBrk="1" fontAlgn="auto" latinLnBrk="0" hangingPunct="1">
+                        <a:lnSpc>
+                          <a:spcPct val="100000"/>
+                        </a:lnSpc>
+                        <a:spcBef>
+                          <a:spcPts val="0"/>
+                        </a:spcBef>
+                        <a:spcAft>
+                          <a:spcPts val="0"/>
+                        </a:spcAft>
+                        <a:buClrTx/>
+                        <a:buSzTx/>
+                        <a:buFontTx/>
+                        <a:buNone/>
+                        <a:tabLst/>
+                        <a:defRPr/>
+                      </a:pPr>
+                      <a:r>
+                        <a:rPr lang="en-US" sz="1400" dirty="0" err="1"/>
+                        <a:t>nemd_cover</a:t>
+                      </a:r>
+                      <a:endParaRPr lang="en-US" sz="1400" dirty="0"/>
+                    </a:p>
+                  </a:txBody>
+                  <a:tcPr marL="137160" marR="137160" marT="137160" marB="137160" anchor="ctr">
+                    <a:lnT w="12700" cap="flat" cmpd="sng" algn="ctr">
+                      <a:solidFill>
+                        <a:schemeClr val="tx1"/>
+                      </a:solidFill>
+                      <a:prstDash val="solid"/>
+                      <a:round/>
+                      <a:headEnd type="none" w="med" len="med"/>
+                      <a:tailEnd type="none" w="med" len="med"/>
+                    </a:lnT>
+                    <a:lnB w="12700" cap="flat" cmpd="sng" algn="ctr">
+                      <a:solidFill>
+                        <a:schemeClr val="tx1"/>
+                      </a:solidFill>
+                      <a:prstDash val="solid"/>
+                      <a:round/>
+                      <a:headEnd type="none" w="med" len="med"/>
+                      <a:tailEnd type="none" w="med" len="med"/>
+                    </a:lnB>
+                  </a:tcPr>
+                </a:tc>
+                <a:tc rowSpan="3">
+                  <a:txBody>
+                    <a:bodyPr/>
+                    <a:lstStyle/>
+                    <a:p>
+                      <a:pPr marL="0" marR="0" lvl="0" indent="0" algn="ctr" defTabSz="914400" rtl="0" eaLnBrk="1" fontAlgn="auto" latinLnBrk="0" hangingPunct="1">
+                        <a:lnSpc>
+                          <a:spcPct val="100000"/>
+                        </a:lnSpc>
+                        <a:spcBef>
+                          <a:spcPts val="0"/>
+                        </a:spcBef>
+                        <a:spcAft>
+                          <a:spcPts val="0"/>
+                        </a:spcAft>
+                        <a:buClrTx/>
+                        <a:buSzTx/>
+                        <a:buFontTx/>
+                        <a:buNone/>
+                        <a:tabLst/>
+                        <a:defRPr/>
+                      </a:pPr>
+                      <a:r>
+                        <a:rPr lang="en-US" sz="1400" dirty="0"/>
+                        <a:t>"-m ''"</a:t>
+                      </a:r>
+                    </a:p>
+                  </a:txBody>
+                  <a:tcPr marL="137160" marR="137160" marT="137160" marB="137160" anchor="ctr">
+                    <a:lnT w="12700" cap="flat" cmpd="sng" algn="ctr">
+                      <a:solidFill>
+                        <a:schemeClr val="tx1"/>
+                      </a:solidFill>
+                      <a:prstDash val="solid"/>
+                      <a:round/>
+                      <a:headEnd type="none" w="med" len="med"/>
+                      <a:tailEnd type="none" w="med" len="med"/>
+                    </a:lnT>
+                    <a:lnB w="12700" cap="flat" cmpd="sng" algn="ctr">
+                      <a:solidFill>
+                        <a:schemeClr val="tx1"/>
+                      </a:solidFill>
+                      <a:prstDash val="solid"/>
+                      <a:round/>
+                      <a:headEnd type="none" w="med" len="med"/>
+                      <a:tailEnd type="none" w="med" len="med"/>
+                    </a:lnB>
+                  </a:tcPr>
+                </a:tc>
+                <a:tc>
+                  <a:txBody>
+                    <a:bodyPr/>
+                    <a:lstStyle/>
+                    <a:p>
+                      <a:pPr marL="0" marR="0" lvl="0" indent="0" algn="ctr" defTabSz="914400" rtl="0" eaLnBrk="1" fontAlgn="auto" latinLnBrk="0" hangingPunct="1">
+                        <a:lnSpc>
+                          <a:spcPct val="100000"/>
+                        </a:lnSpc>
+                        <a:spcBef>
+                          <a:spcPts val="0"/>
+                        </a:spcBef>
+                        <a:spcAft>
+                          <a:spcPts val="0"/>
+                        </a:spcAft>
+                        <a:buClrTx/>
+                        <a:buSzTx/>
+                        <a:buFontTx/>
+                        <a:buNone/>
+                        <a:tabLst/>
+                        <a:defRPr/>
+                      </a:pPr>
+                      <a:r>
+                        <a:rPr lang="en-US" sz="1400" dirty="0"/>
+                        <a:t>workflow</a:t>
+                      </a:r>
+                    </a:p>
+                  </a:txBody>
+                  <a:tcPr marL="137160" marR="137160" marT="137160" marB="137160" anchor="ctr">
+                    <a:lnT w="12700" cap="flat" cmpd="sng" algn="ctr">
+                      <a:solidFill>
+                        <a:schemeClr val="tx1"/>
+                      </a:solidFill>
+                      <a:prstDash val="solid"/>
+                      <a:round/>
+                      <a:headEnd type="none" w="med" len="med"/>
+                      <a:tailEnd type="none" w="med" len="med"/>
+                    </a:lnT>
+                    <a:lnB w="12700" cap="flat" cmpd="sng" algn="ctr">
+                      <a:solidFill>
+                        <a:schemeClr val="tx1"/>
+                      </a:solidFill>
+                      <a:prstDash val="solid"/>
+                      <a:round/>
+                      <a:headEnd type="none" w="med" len="med"/>
+                      <a:tailEnd type="none" w="med" len="med"/>
+                    </a:lnB>
+                  </a:tcPr>
+                </a:tc>
+                <a:tc>
+                  <a:txBody>
+                    <a:bodyPr/>
+                    <a:lstStyle/>
+                    <a:p>
+                      <a:pPr algn="ctr"/>
+                      <a:r>
+                        <a:rPr lang="en-US" sz="1400" dirty="0"/>
+                        <a:t>statements</a:t>
+                      </a:r>
+                    </a:p>
+                    <a:p>
+                      <a:pPr algn="ctr"/>
+                      <a:r>
+                        <a:rPr lang="en-US" sz="1400" dirty="0"/>
+                        <a:t>missing</a:t>
+                      </a:r>
+                    </a:p>
+                    <a:p>
+                      <a:pPr algn="ctr"/>
+                      <a:r>
+                        <a:rPr lang="en-US" sz="1400" dirty="0"/>
+                        <a:t>excluded</a:t>
+                      </a:r>
+                    </a:p>
+                    <a:p>
+                      <a:pPr algn="ctr"/>
+                      <a:r>
+                        <a:rPr lang="en-US" sz="1400" dirty="0"/>
+                        <a:t>coverage</a:t>
+                      </a:r>
+                    </a:p>
+                  </a:txBody>
+                  <a:tcPr marL="137160" marR="137160" marT="137160" marB="137160" anchor="ctr">
+                    <a:lnT w="12700" cap="flat" cmpd="sng" algn="ctr">
+                      <a:solidFill>
+                        <a:schemeClr val="tx1"/>
+                      </a:solidFill>
+                      <a:prstDash val="solid"/>
+                      <a:round/>
+                      <a:headEnd type="none" w="med" len="med"/>
+                      <a:tailEnd type="none" w="med" len="med"/>
+                    </a:lnT>
+                    <a:lnB w="12700" cap="flat" cmpd="sng" algn="ctr">
+                      <a:solidFill>
+                        <a:schemeClr val="tx1"/>
+                      </a:solidFill>
+                      <a:prstDash val="solid"/>
+                      <a:round/>
+                      <a:headEnd type="none" w="med" len="med"/>
+                      <a:tailEnd type="none" w="med" len="med"/>
+                    </a:lnB>
+                  </a:tcPr>
+                </a:tc>
+                <a:tc>
+                  <a:txBody>
+                    <a:bodyPr/>
+                    <a:lstStyle/>
+                    <a:p>
+                      <a:pPr algn="ctr"/>
+                      <a:r>
+                        <a:rPr lang="en-US" sz="1400" dirty="0"/>
+                        <a:t>200</a:t>
+                      </a:r>
+                    </a:p>
+                    <a:p>
+                      <a:pPr algn="ctr"/>
+                      <a:r>
+                        <a:rPr lang="en-US" sz="1400" dirty="0"/>
+                        <a:t>0</a:t>
+                      </a:r>
+                    </a:p>
+                    <a:p>
+                      <a:pPr algn="ctr"/>
+                      <a:r>
+                        <a:rPr lang="en-US" sz="1400" dirty="0"/>
+                        <a:t>8</a:t>
+                      </a:r>
+                    </a:p>
+                    <a:p>
+                      <a:pPr algn="ctr"/>
+                      <a:r>
+                        <a:rPr lang="en-US" sz="1400" dirty="0"/>
+                        <a:t>100%</a:t>
+                      </a:r>
+                    </a:p>
+                  </a:txBody>
+                  <a:tcPr marL="137160" marR="137160" marT="137160" marB="137160" anchor="ctr">
+                    <a:lnT w="12700" cap="flat" cmpd="sng" algn="ctr">
+                      <a:solidFill>
+                        <a:schemeClr val="tx1"/>
+                      </a:solidFill>
+                      <a:prstDash val="solid"/>
+                      <a:round/>
+                      <a:headEnd type="none" w="med" len="med"/>
+                      <a:tailEnd type="none" w="med" len="med"/>
+                    </a:lnT>
+                    <a:lnB w="12700" cap="flat" cmpd="sng" algn="ctr">
+                      <a:solidFill>
+                        <a:schemeClr val="tx1"/>
+                      </a:solidFill>
+                      <a:prstDash val="solid"/>
+                      <a:round/>
+                      <a:headEnd type="none" w="med" len="med"/>
+                      <a:tailEnd type="none" w="med" len="med"/>
+                    </a:lnB>
+                  </a:tcPr>
+                </a:tc>
+                <a:extLst>
+                  <a:ext uri="{0D108BD9-81ED-4DB2-BD59-A6C34878D82A}">
+                    <a16:rowId xmlns:a16="http://schemas.microsoft.com/office/drawing/2014/main" val="2430466548"/>
+                  </a:ext>
+                </a:extLst>
+              </a:tr>
+              <a:tr h="1115209">
+                <a:tc vMerge="1">
+                  <a:txBody>
+                    <a:bodyPr/>
+                    <a:lstStyle/>
+                    <a:p>
+                      <a:endParaRPr/>
+                    </a:p>
+                  </a:txBody>
+                  <a:tcPr marL="137160" marR="137160" marT="137160" marB="137160" anchor="ctr">
+                    <a:lnT w="12700" cap="flat" cmpd="sng" algn="ctr">
+                      <a:solidFill>
+                        <a:schemeClr val="tx1"/>
+                      </a:solidFill>
+                      <a:prstDash val="solid"/>
+                      <a:round/>
+                      <a:headEnd type="none" w="med" len="med"/>
+                      <a:tailEnd type="none" w="med" len="med"/>
+                    </a:lnT>
+                    <a:lnB w="12700" cap="flat" cmpd="sng" algn="ctr">
+                      <a:solidFill>
+                        <a:schemeClr val="tx1"/>
+                      </a:solidFill>
+                      <a:prstDash val="solid"/>
+                      <a:round/>
+                      <a:headEnd type="none" w="med" len="med"/>
+                      <a:tailEnd type="none" w="med" len="med"/>
+                    </a:lnB>
+                  </a:tcPr>
+                </a:tc>
+                <a:tc vMerge="1">
+                  <a:txBody>
+                    <a:bodyPr/>
+                    <a:lstStyle/>
+                    <a:p>
+                      <a:endParaRPr/>
+                    </a:p>
+                  </a:txBody>
+                  <a:tcPr marL="137160" marR="137160" marT="137160" marB="137160" anchor="ctr">
+                    <a:lnT w="12700" cap="flat" cmpd="sng" algn="ctr">
+                      <a:solidFill>
+                        <a:schemeClr val="tx1"/>
+                      </a:solidFill>
+                      <a:prstDash val="solid"/>
+                      <a:round/>
+                      <a:headEnd type="none" w="med" len="med"/>
+                      <a:tailEnd type="none" w="med" len="med"/>
+                    </a:lnT>
+                    <a:lnB w="12700" cap="flat" cmpd="sng" algn="ctr">
+                      <a:solidFill>
+                        <a:schemeClr val="tx1"/>
+                      </a:solidFill>
+                      <a:prstDash val="solid"/>
+                      <a:round/>
+                      <a:headEnd type="none" w="med" len="med"/>
+                      <a:tailEnd type="none" w="med" len="med"/>
+                    </a:lnB>
+                  </a:tcPr>
+                </a:tc>
+                <a:tc>
+                  <a:txBody>
+                    <a:bodyPr/>
+                    <a:lstStyle/>
+                    <a:p>
+                      <a:pPr algn="ctr"/>
+                      <a:r>
+                        <a:rPr lang="en-US" sz="1400" dirty="0"/>
+                        <a:t>driver</a:t>
+                      </a:r>
+                    </a:p>
+                  </a:txBody>
+                  <a:tcPr marL="137160" marR="137160" marT="137160" marB="137160" anchor="ctr">
+                    <a:lnT w="12700" cap="flat" cmpd="sng" algn="ctr">
+                      <a:solidFill>
+                        <a:schemeClr val="tx1"/>
+                      </a:solidFill>
+                      <a:prstDash val="solid"/>
+                      <a:round/>
+                      <a:headEnd type="none" w="med" len="med"/>
+                      <a:tailEnd type="none" w="med" len="med"/>
+                    </a:lnT>
+                    <a:lnB w="12700" cap="flat" cmpd="sng" algn="ctr">
+                      <a:solidFill>
+                        <a:schemeClr val="tx1"/>
+                      </a:solidFill>
+                      <a:prstDash val="solid"/>
+                      <a:round/>
+                      <a:headEnd type="none" w="med" len="med"/>
+                      <a:tailEnd type="none" w="med" len="med"/>
+                    </a:lnB>
+                  </a:tcPr>
+                </a:tc>
+                <a:tc>
+                  <a:txBody>
+                    <a:bodyPr/>
+                    <a:lstStyle/>
+                    <a:p>
+                      <a:pPr algn="ctr"/>
+                      <a:r>
+                        <a:rPr lang="en-US" sz="1400" dirty="0"/>
+                        <a:t>statements</a:t>
+                      </a:r>
+                    </a:p>
+                    <a:p>
+                      <a:pPr algn="ctr"/>
+                      <a:r>
+                        <a:rPr lang="en-US" sz="1400" dirty="0"/>
+                        <a:t>missing</a:t>
+                      </a:r>
+                    </a:p>
+                    <a:p>
+                      <a:pPr algn="ctr"/>
+                      <a:r>
+                        <a:rPr lang="en-US" sz="1400" dirty="0"/>
+                        <a:t>excluded</a:t>
+                      </a:r>
+                    </a:p>
+                    <a:p>
+                      <a:pPr algn="ctr"/>
+                      <a:r>
+                        <a:rPr lang="en-US" sz="1400" dirty="0"/>
+                        <a:t>coverage</a:t>
+                      </a:r>
+                    </a:p>
+                  </a:txBody>
+                  <a:tcPr marL="137160" marR="137160" marT="137160" marB="137160" anchor="ctr">
+                    <a:lnT w="12700" cap="flat" cmpd="sng" algn="ctr">
+                      <a:solidFill>
+                        <a:schemeClr val="tx1"/>
+                      </a:solidFill>
+                      <a:prstDash val="solid"/>
+                      <a:round/>
+                      <a:headEnd type="none" w="med" len="med"/>
+                      <a:tailEnd type="none" w="med" len="med"/>
+                    </a:lnT>
+                    <a:lnB w="12700" cap="flat" cmpd="sng" algn="ctr">
+                      <a:solidFill>
+                        <a:schemeClr val="tx1"/>
+                      </a:solidFill>
+                      <a:prstDash val="solid"/>
+                      <a:round/>
+                      <a:headEnd type="none" w="med" len="med"/>
+                      <a:tailEnd type="none" w="med" len="med"/>
+                    </a:lnB>
+                  </a:tcPr>
+                </a:tc>
+                <a:tc>
+                  <a:txBody>
+                    <a:bodyPr/>
+                    <a:lstStyle/>
+                    <a:p>
+                      <a:pPr algn="ctr"/>
+                      <a:r>
+                        <a:rPr lang="en-US" sz="1400" dirty="0"/>
+                        <a:t>466</a:t>
+                      </a:r>
+                    </a:p>
+                    <a:p>
+                      <a:pPr algn="ctr"/>
+                      <a:r>
+                        <a:rPr lang="en-US" sz="1400" dirty="0"/>
+                        <a:t>0</a:t>
+                      </a:r>
+                    </a:p>
+                    <a:p>
+                      <a:pPr algn="ctr"/>
+                      <a:r>
+                        <a:rPr lang="en-US" sz="1400" dirty="0"/>
+                        <a:t>16</a:t>
+                      </a:r>
+                    </a:p>
+                    <a:p>
+                      <a:pPr algn="ctr"/>
+                      <a:r>
+                        <a:rPr lang="en-US" sz="1400" dirty="0"/>
+                        <a:t>100%</a:t>
+                      </a:r>
+                    </a:p>
+                  </a:txBody>
+                  <a:tcPr marL="137160" marR="137160" marT="137160" marB="137160" anchor="ctr">
+                    <a:lnT w="12700" cap="flat" cmpd="sng" algn="ctr">
+                      <a:solidFill>
+                        <a:schemeClr val="tx1"/>
+                      </a:solidFill>
+                      <a:prstDash val="solid"/>
+                      <a:round/>
+                      <a:headEnd type="none" w="med" len="med"/>
+                      <a:tailEnd type="none" w="med" len="med"/>
+                    </a:lnT>
+                    <a:lnB w="12700" cap="flat" cmpd="sng" algn="ctr">
+                      <a:solidFill>
+                        <a:schemeClr val="tx1"/>
+                      </a:solidFill>
+                      <a:prstDash val="solid"/>
+                      <a:round/>
+                      <a:headEnd type="none" w="med" len="med"/>
+                      <a:tailEnd type="none" w="med" len="med"/>
+                    </a:lnB>
+                  </a:tcPr>
+                </a:tc>
+                <a:extLst>
+                  <a:ext uri="{0D108BD9-81ED-4DB2-BD59-A6C34878D82A}">
+                    <a16:rowId xmlns:a16="http://schemas.microsoft.com/office/drawing/2014/main" val="770493721"/>
+                  </a:ext>
+                </a:extLst>
+              </a:tr>
+              <a:tr h="1115209">
+                <a:tc vMerge="1">
+                  <a:txBody>
+                    <a:bodyPr/>
+                    <a:lstStyle/>
+                    <a:p>
+                      <a:pPr algn="just"/>
+                      <a:endParaRPr lang="en-US" sz="1400" dirty="0"/>
+                    </a:p>
+                  </a:txBody>
+                  <a:tcPr marL="137160" marR="137160" marT="137160" marB="137160" anchor="ctr">
+                    <a:lnT w="12700" cap="flat" cmpd="sng" algn="ctr">
+                      <a:solidFill>
+                        <a:schemeClr val="tx1"/>
+                      </a:solidFill>
+                      <a:prstDash val="solid"/>
+                      <a:round/>
+                      <a:headEnd type="none" w="med" len="med"/>
+                      <a:tailEnd type="none" w="med" len="med"/>
+                    </a:lnT>
+                    <a:lnB w="12700" cap="flat" cmpd="sng" algn="ctr">
+                      <a:solidFill>
+                        <a:schemeClr val="tx1"/>
+                      </a:solidFill>
+                      <a:prstDash val="solid"/>
+                      <a:round/>
+                      <a:headEnd type="none" w="med" len="med"/>
+                      <a:tailEnd type="none" w="med" len="med"/>
+                    </a:lnB>
+                  </a:tcPr>
+                </a:tc>
+                <a:tc vMerge="1">
+                  <a:txBody>
+                    <a:bodyPr/>
+                    <a:lstStyle/>
+                    <a:p>
+                      <a:pPr algn="just"/>
+                      <a:endParaRPr lang="en-US" sz="1400" dirty="0"/>
+                    </a:p>
+                  </a:txBody>
+                  <a:tcPr marL="137160" marR="137160" marT="137160" marB="137160" anchor="ctr">
+                    <a:lnT w="12700" cap="flat" cmpd="sng" algn="ctr">
+                      <a:solidFill>
+                        <a:schemeClr val="tx1"/>
+                      </a:solidFill>
+                      <a:prstDash val="solid"/>
+                      <a:round/>
+                      <a:headEnd type="none" w="med" len="med"/>
+                      <a:tailEnd type="none" w="med" len="med"/>
+                    </a:lnT>
+                    <a:lnB w="12700" cap="flat" cmpd="sng" algn="ctr">
+                      <a:solidFill>
+                        <a:schemeClr val="tx1"/>
+                      </a:solidFill>
+                      <a:prstDash val="solid"/>
+                      <a:round/>
+                      <a:headEnd type="none" w="med" len="med"/>
+                      <a:tailEnd type="none" w="med" len="med"/>
+                    </a:lnB>
+                  </a:tcPr>
+                </a:tc>
+                <a:tc>
+                  <a:txBody>
+                    <a:bodyPr/>
+                    <a:lstStyle/>
+                    <a:p>
+                      <a:pPr marL="0" marR="0" lvl="0" indent="0" algn="ctr" defTabSz="914400" rtl="0" eaLnBrk="1" fontAlgn="auto" latinLnBrk="0" hangingPunct="1">
+                        <a:lnSpc>
+                          <a:spcPct val="100000"/>
+                        </a:lnSpc>
+                        <a:spcBef>
+                          <a:spcPts val="0"/>
+                        </a:spcBef>
+                        <a:spcAft>
+                          <a:spcPts val="0"/>
+                        </a:spcAft>
+                        <a:buClrTx/>
+                        <a:buSzTx/>
+                        <a:buFontTx/>
+                        <a:buNone/>
+                        <a:tabLst/>
+                        <a:defRPr/>
+                      </a:pPr>
+                      <a:r>
+                        <a:rPr lang="en-US" sz="1400" dirty="0"/>
+                        <a:t>module</a:t>
+                      </a:r>
+                    </a:p>
+                    <a:p>
+                      <a:pPr algn="ctr"/>
+                      <a:endParaRPr lang="en-US" sz="1400" dirty="0"/>
+                    </a:p>
+                  </a:txBody>
+                  <a:tcPr marL="137160" marR="137160" marT="137160" marB="137160" anchor="ctr">
+                    <a:lnT w="12700" cap="flat" cmpd="sng" algn="ctr">
+                      <a:solidFill>
+                        <a:schemeClr val="tx1"/>
+                      </a:solidFill>
+                      <a:prstDash val="solid"/>
+                      <a:round/>
+                      <a:headEnd type="none" w="med" len="med"/>
+                      <a:tailEnd type="none" w="med" len="med"/>
+                    </a:lnT>
+                    <a:lnB w="12700" cap="flat" cmpd="sng" algn="ctr">
+                      <a:solidFill>
+                        <a:schemeClr val="tx1"/>
+                      </a:solidFill>
+                      <a:prstDash val="solid"/>
+                      <a:round/>
+                      <a:headEnd type="none" w="med" len="med"/>
+                      <a:tailEnd type="none" w="med" len="med"/>
+                    </a:lnB>
+                  </a:tcPr>
+                </a:tc>
+                <a:tc>
+                  <a:txBody>
+                    <a:bodyPr/>
+                    <a:lstStyle/>
+                    <a:p>
+                      <a:pPr algn="ctr"/>
+                      <a:r>
+                        <a:rPr lang="en-US" sz="1400" dirty="0"/>
+                        <a:t>statements</a:t>
+                      </a:r>
+                    </a:p>
+                    <a:p>
+                      <a:pPr algn="ctr"/>
+                      <a:r>
+                        <a:rPr lang="en-US" sz="1400" dirty="0"/>
+                        <a:t>missing</a:t>
+                      </a:r>
+                    </a:p>
+                    <a:p>
+                      <a:pPr algn="ctr"/>
+                      <a:r>
+                        <a:rPr lang="en-US" sz="1400" dirty="0"/>
+                        <a:t>excluded</a:t>
+                      </a:r>
+                    </a:p>
+                    <a:p>
+                      <a:pPr algn="ctr"/>
+                      <a:r>
+                        <a:rPr lang="en-US" sz="1400" dirty="0"/>
+                        <a:t>coverage</a:t>
+                      </a:r>
+                    </a:p>
+                  </a:txBody>
+                  <a:tcPr marL="137160" marR="137160" marT="137160" marB="137160" anchor="ctr">
+                    <a:lnT w="12700" cap="flat" cmpd="sng" algn="ctr">
+                      <a:solidFill>
+                        <a:schemeClr val="tx1"/>
+                      </a:solidFill>
+                      <a:prstDash val="solid"/>
+                      <a:round/>
+                      <a:headEnd type="none" w="med" len="med"/>
+                      <a:tailEnd type="none" w="med" len="med"/>
+                    </a:lnT>
+                    <a:lnB w="12700" cap="flat" cmpd="sng" algn="ctr">
+                      <a:solidFill>
+                        <a:schemeClr val="tx1"/>
+                      </a:solidFill>
+                      <a:prstDash val="solid"/>
+                      <a:round/>
+                      <a:headEnd type="none" w="med" len="med"/>
+                      <a:tailEnd type="none" w="med" len="med"/>
+                    </a:lnB>
+                  </a:tcPr>
+                </a:tc>
+                <a:tc>
+                  <a:txBody>
+                    <a:bodyPr/>
+                    <a:lstStyle/>
+                    <a:p>
+                      <a:pPr algn="ctr"/>
+                      <a:r>
+                        <a:rPr lang="en-US" sz="1400" dirty="0"/>
+                        <a:t>6082</a:t>
+                      </a:r>
+                    </a:p>
+                    <a:p>
+                      <a:pPr algn="ctr"/>
+                      <a:r>
+                        <a:rPr lang="en-US" sz="1400" dirty="0"/>
+                        <a:t>1</a:t>
+                      </a:r>
+                    </a:p>
+                    <a:p>
+                      <a:pPr algn="ctr"/>
+                      <a:r>
+                        <a:rPr lang="en-US" sz="1400" dirty="0"/>
+                        <a:t>164</a:t>
+                      </a:r>
+                    </a:p>
+                    <a:p>
+                      <a:pPr algn="ctr"/>
+                      <a:r>
+                        <a:rPr lang="en-US" sz="1400" dirty="0"/>
+                        <a:t>100%</a:t>
+                      </a:r>
+                    </a:p>
+                  </a:txBody>
+                  <a:tcPr marL="137160" marR="137160" marT="137160" marB="137160" anchor="ctr">
+                    <a:lnT w="12700" cap="flat" cmpd="sng" algn="ctr">
+                      <a:solidFill>
+                        <a:schemeClr val="tx1"/>
+                      </a:solidFill>
+                      <a:prstDash val="solid"/>
+                      <a:round/>
+                      <a:headEnd type="none" w="med" len="med"/>
+                      <a:tailEnd type="none" w="med" len="med"/>
+                    </a:lnT>
+                    <a:lnB w="12700" cap="flat" cmpd="sng" algn="ctr">
+                      <a:solidFill>
+                        <a:schemeClr val="tx1"/>
+                      </a:solidFill>
+                      <a:prstDash val="solid"/>
+                      <a:round/>
+                      <a:headEnd type="none" w="med" len="med"/>
+                      <a:tailEnd type="none" w="med" len="med"/>
+                    </a:lnB>
+                  </a:tcPr>
+                </a:tc>
+                <a:extLst>
+                  <a:ext uri="{0D108BD9-81ED-4DB2-BD59-A6C34878D82A}">
+                    <a16:rowId xmlns:a16="http://schemas.microsoft.com/office/drawing/2014/main" val="3949559036"/>
+                  </a:ext>
+                </a:extLst>
+              </a:tr>
+            </a:tbl>
+          </a:graphicData>
+        </a:graphic>
+      </p:graphicFrame>
     </p:spTree>
     <p:extLst>
       <p:ext uri="{BB962C8B-B14F-4D97-AF65-F5344CB8AC3E}">

</xml_diff>

<commit_message>
nemd_cover supports NEMD_SRC is None unitttes and cover added to nemd.pptx
</commit_message>
<xml_diff>
--- a/docs/power_point/nemd.pptx
+++ b/docs/power_point/nemd.pptx
@@ -3105,7 +3105,7 @@
           <a:p>
             <a:fld id="{4E7935B3-F5AC-0F49-A77F-693DEAA46623}" type="datetimeFigureOut">
               <a:rPr lang="en-US" smtClean="0"/>
-              <a:t>9/7/25</a:t>
+              <a:t>9/10/25</a:t>
             </a:fld>
             <a:endParaRPr lang="en-US"/>
           </a:p>
@@ -3879,7 +3879,7 @@
           <a:p>
             <a:fld id="{7139230D-D256-FE47-99BF-6F642436F56E}" type="datetime1">
               <a:rPr lang="en-US" smtClean="0"/>
-              <a:t>9/7/25</a:t>
+              <a:t>9/10/25</a:t>
             </a:fld>
             <a:endParaRPr lang="en-US"/>
           </a:p>
@@ -4077,7 +4077,7 @@
           <a:p>
             <a:fld id="{785AC849-5CEB-3846-9265-8D72BE481A70}" type="datetime1">
               <a:rPr lang="en-US" smtClean="0"/>
-              <a:t>9/7/25</a:t>
+              <a:t>9/10/25</a:t>
             </a:fld>
             <a:endParaRPr lang="en-US"/>
           </a:p>
@@ -4285,7 +4285,7 @@
           <a:p>
             <a:fld id="{A02BBDEB-BEE0-FD44-AAFC-27969F9541FD}" type="datetime1">
               <a:rPr lang="en-US" smtClean="0"/>
-              <a:t>9/7/25</a:t>
+              <a:t>9/10/25</a:t>
             </a:fld>
             <a:endParaRPr lang="en-US"/>
           </a:p>
@@ -4483,7 +4483,7 @@
           <a:p>
             <a:fld id="{4F82860A-5855-1941-A1E0-F1AE52EC854D}" type="datetime1">
               <a:rPr lang="en-US" smtClean="0"/>
-              <a:t>9/7/25</a:t>
+              <a:t>9/10/25</a:t>
             </a:fld>
             <a:endParaRPr lang="en-US"/>
           </a:p>
@@ -4758,7 +4758,7 @@
           <a:p>
             <a:fld id="{6A874B4C-42F5-E24E-B25F-613EC7F4AF0D}" type="datetime1">
               <a:rPr lang="en-US" smtClean="0"/>
-              <a:t>9/7/25</a:t>
+              <a:t>9/10/25</a:t>
             </a:fld>
             <a:endParaRPr lang="en-US"/>
           </a:p>
@@ -5023,7 +5023,7 @@
           <a:p>
             <a:fld id="{9A2BCD20-0178-0C41-9D8E-10FA267A6CCC}" type="datetime1">
               <a:rPr lang="en-US" smtClean="0"/>
-              <a:t>9/7/25</a:t>
+              <a:t>9/10/25</a:t>
             </a:fld>
             <a:endParaRPr lang="en-US"/>
           </a:p>
@@ -5435,7 +5435,7 @@
           <a:p>
             <a:fld id="{EDE58456-60EB-6840-BCEB-E4C2678C039E}" type="datetime1">
               <a:rPr lang="en-US" smtClean="0"/>
-              <a:t>9/7/25</a:t>
+              <a:t>9/10/25</a:t>
             </a:fld>
             <a:endParaRPr lang="en-US"/>
           </a:p>
@@ -5576,7 +5576,7 @@
           <a:p>
             <a:fld id="{8BBFCD94-1F0D-3948-A9F0-DB82F9AAC2D3}" type="datetime1">
               <a:rPr lang="en-US" smtClean="0"/>
-              <a:t>9/7/25</a:t>
+              <a:t>9/10/25</a:t>
             </a:fld>
             <a:endParaRPr lang="en-US"/>
           </a:p>
@@ -5689,7 +5689,7 @@
           <a:p>
             <a:fld id="{13692FAC-AC21-0848-AC27-426B7BF29104}" type="datetime1">
               <a:rPr lang="en-US" smtClean="0"/>
-              <a:t>9/7/25</a:t>
+              <a:t>9/10/25</a:t>
             </a:fld>
             <a:endParaRPr lang="en-US"/>
           </a:p>
@@ -6000,7 +6000,7 @@
           <a:p>
             <a:fld id="{A3FF56F3-8608-FF4D-9C26-AE6D473095CB}" type="datetime1">
               <a:rPr lang="en-US" smtClean="0"/>
-              <a:t>9/7/25</a:t>
+              <a:t>9/10/25</a:t>
             </a:fld>
             <a:endParaRPr lang="en-US"/>
           </a:p>
@@ -6288,7 +6288,7 @@
           <a:p>
             <a:fld id="{58CC49A9-C646-2345-B4A7-439457175566}" type="datetime1">
               <a:rPr lang="en-US" smtClean="0"/>
-              <a:t>9/7/25</a:t>
+              <a:t>9/10/25</a:t>
             </a:fld>
             <a:endParaRPr lang="en-US"/>
           </a:p>
@@ -6529,7 +6529,7 @@
           <a:p>
             <a:fld id="{D516C8CC-C3CD-B94B-94D6-0913487DB5E5}" type="datetime1">
               <a:rPr lang="en-US" smtClean="0"/>
-              <a:t>9/7/25</a:t>
+              <a:t>9/10/25</a:t>
             </a:fld>
             <a:endParaRPr lang="en-US"/>
           </a:p>
@@ -7132,7 +7132,7 @@
         <p:spPr>
           <a:xfrm>
             <a:off x="838200" y="365125"/>
-            <a:ext cx="3211286" cy="1325563"/>
+            <a:ext cx="3231292" cy="1325563"/>
           </a:xfrm>
         </p:spPr>
         <p:txBody>
@@ -7149,6 +7149,35 @@
               </a:rPr>
               <a:t>Unit Testing</a:t>
             </a:r>
+          </a:p>
+        </p:txBody>
+      </p:sp>
+      <p:sp>
+        <p:nvSpPr>
+          <p:cNvPr id="3" name="Slide Number Placeholder 2">
+            <a:extLst>
+              <a:ext uri="{FF2B5EF4-FFF2-40B4-BE49-F238E27FC236}">
+                <a16:creationId xmlns:a16="http://schemas.microsoft.com/office/drawing/2014/main" id="{93005D0D-F223-1F94-65FC-E62DB7B920D8}"/>
+              </a:ext>
+            </a:extLst>
+          </p:cNvPr>
+          <p:cNvSpPr>
+            <a:spLocks noGrp="1"/>
+          </p:cNvSpPr>
+          <p:nvPr>
+            <p:ph type="sldNum" sz="quarter" idx="12"/>
+          </p:nvPr>
+        </p:nvSpPr>
+        <p:spPr/>
+        <p:txBody>
+          <a:bodyPr/>
+          <a:lstStyle/>
+          <a:p>
+            <a:fld id="{CF79FC58-3559-EC47-B32E-5EF128B06581}" type="slidenum">
+              <a:rPr lang="en-US" smtClean="0"/>
+              <a:t>10</a:t>
+            </a:fld>
+            <a:endParaRPr lang="en-US"/>
           </a:p>
         </p:txBody>
       </p:sp>
@@ -7167,14 +7196,14 @@
           <p:nvPr>
             <p:extLst>
               <p:ext uri="{D42A27DB-BD31-4B8C-83A1-F6EECF244321}">
-                <p14:modId xmlns:p14="http://schemas.microsoft.com/office/powerpoint/2010/main" val="273126429"/>
+                <p14:modId xmlns:p14="http://schemas.microsoft.com/office/powerpoint/2010/main" val="3461875880"/>
               </p:ext>
             </p:extLst>
           </p:nvPr>
         </p:nvGraphicFramePr>
         <p:xfrm>
-          <a:off x="4470010" y="174303"/>
-          <a:ext cx="6598229" cy="2316480"/>
+          <a:off x="361233" y="3814120"/>
+          <a:ext cx="5734767" cy="2572541"/>
         </p:xfrm>
         <a:graphic>
           <a:graphicData uri="http://schemas.openxmlformats.org/drawingml/2006/table">
@@ -7183,35 +7212,35 @@
                 <a:tableStyleId>{2D5ABB26-0587-4C30-8999-92F81FD0307C}</a:tableStyleId>
               </a:tblPr>
               <a:tblGrid>
-                <a:gridCol w="1078739">
+                <a:gridCol w="970007">
                   <a:extLst>
                     <a:ext uri="{9D8B030D-6E8A-4147-A177-3AD203B41FA5}">
                       <a16:colId xmlns:a16="http://schemas.microsoft.com/office/drawing/2014/main" val="140681280"/>
                     </a:ext>
                   </a:extLst>
                 </a:gridCol>
-                <a:gridCol w="1591724">
+                <a:gridCol w="1504412">
                   <a:extLst>
                     <a:ext uri="{9D8B030D-6E8A-4147-A177-3AD203B41FA5}">
                       <a16:colId xmlns:a16="http://schemas.microsoft.com/office/drawing/2014/main" val="3804093500"/>
                     </a:ext>
                   </a:extLst>
                 </a:gridCol>
-                <a:gridCol w="987137">
+                <a:gridCol w="961202">
                   <a:extLst>
                     <a:ext uri="{9D8B030D-6E8A-4147-A177-3AD203B41FA5}">
                       <a16:colId xmlns:a16="http://schemas.microsoft.com/office/drawing/2014/main" val="3388334755"/>
                     </a:ext>
                   </a:extLst>
                 </a:gridCol>
-                <a:gridCol w="1993842">
+                <a:gridCol w="1385830">
                   <a:extLst>
                     <a:ext uri="{9D8B030D-6E8A-4147-A177-3AD203B41FA5}">
                       <a16:colId xmlns:a16="http://schemas.microsoft.com/office/drawing/2014/main" val="1365888191"/>
                     </a:ext>
                   </a:extLst>
                 </a:gridCol>
-                <a:gridCol w="946787">
+                <a:gridCol w="913316">
                   <a:extLst>
                     <a:ext uri="{9D8B030D-6E8A-4147-A177-3AD203B41FA5}">
                       <a16:colId xmlns:a16="http://schemas.microsoft.com/office/drawing/2014/main" val="4111230781"/>
@@ -7219,7 +7248,7 @@
                   </a:extLst>
                 </a:gridCol>
               </a:tblGrid>
-              <a:tr h="476888">
+              <a:tr h="707913">
                 <a:tc>
                   <a:txBody>
                     <a:bodyPr/>
@@ -7232,7 +7261,278 @@
                       </a:r>
                     </a:p>
                   </a:txBody>
-                  <a:tcPr marL="137160" marR="137160" marT="137160" marB="137160" anchor="ctr">
+                  <a:tcPr marT="137160" marB="137160" anchor="ctr">
+                    <a:lnL>
+                      <a:noFill/>
+                    </a:lnL>
+                    <a:lnR>
+                      <a:noFill/>
+                    </a:lnR>
+                    <a:lnT w="12700" cap="flat" cmpd="sng" algn="ctr">
+                      <a:solidFill>
+                        <a:schemeClr val="tx1"/>
+                      </a:solidFill>
+                      <a:prstDash val="solid"/>
+                      <a:round/>
+                      <a:headEnd type="none" w="med" len="med"/>
+                      <a:tailEnd type="none" w="med" len="med"/>
+                    </a:lnT>
+                    <a:lnB w="12700" cap="flat" cmpd="sng" algn="ctr">
+                      <a:solidFill>
+                        <a:schemeClr val="tx1"/>
+                      </a:solidFill>
+                      <a:prstDash val="solid"/>
+                      <a:round/>
+                      <a:headEnd type="none" w="med" len="med"/>
+                      <a:tailEnd type="none" w="med" len="med"/>
+                    </a:lnB>
+                    <a:lnTlToBr w="12700" cmpd="sng">
+                      <a:noFill/>
+                      <a:prstDash val="solid"/>
+                    </a:lnTlToBr>
+                    <a:lnBlToTr w="12700" cmpd="sng">
+                      <a:noFill/>
+                      <a:prstDash val="solid"/>
+                    </a:lnBlToTr>
+                  </a:tcPr>
+                </a:tc>
+                <a:tc>
+                  <a:txBody>
+                    <a:bodyPr/>
+                    <a:lstStyle/>
+                    <a:p>
+                      <a:pPr algn="ctr"/>
+                      <a:r>
+                        <a:rPr lang="en-US" sz="1400" dirty="0"/>
+                        <a:t>PYTEST_ADDOPTS</a:t>
+                      </a:r>
+                    </a:p>
+                  </a:txBody>
+                  <a:tcPr marT="137160" marB="137160" anchor="ctr">
+                    <a:lnL>
+                      <a:noFill/>
+                    </a:lnL>
+                    <a:lnR>
+                      <a:noFill/>
+                    </a:lnR>
+                    <a:lnT w="12700" cap="flat" cmpd="sng" algn="ctr">
+                      <a:solidFill>
+                        <a:schemeClr val="tx1"/>
+                      </a:solidFill>
+                      <a:prstDash val="solid"/>
+                      <a:round/>
+                      <a:headEnd type="none" w="med" len="med"/>
+                      <a:tailEnd type="none" w="med" len="med"/>
+                    </a:lnT>
+                    <a:lnB w="12700" cap="flat" cmpd="sng" algn="ctr">
+                      <a:solidFill>
+                        <a:schemeClr val="tx1"/>
+                      </a:solidFill>
+                      <a:prstDash val="solid"/>
+                      <a:round/>
+                      <a:headEnd type="none" w="med" len="med"/>
+                      <a:tailEnd type="none" w="med" len="med"/>
+                    </a:lnB>
+                    <a:lnTlToBr w="12700" cmpd="sng">
+                      <a:noFill/>
+                      <a:prstDash val="solid"/>
+                    </a:lnTlToBr>
+                    <a:lnBlToTr w="12700" cmpd="sng">
+                      <a:noFill/>
+                      <a:prstDash val="solid"/>
+                    </a:lnBlToTr>
+                  </a:tcPr>
+                </a:tc>
+                <a:tc>
+                  <a:txBody>
+                    <a:bodyPr/>
+                    <a:lstStyle/>
+                    <a:p>
+                      <a:pPr algn="ctr"/>
+                      <a:r>
+                        <a:rPr lang="en-US" sz="1400" dirty="0"/>
+                        <a:t>Type</a:t>
+                      </a:r>
+                    </a:p>
+                  </a:txBody>
+                  <a:tcPr marT="137160" marB="137160" anchor="ctr">
+                    <a:lnL>
+                      <a:noFill/>
+                    </a:lnL>
+                    <a:lnR>
+                      <a:noFill/>
+                    </a:lnR>
+                    <a:lnT w="12700" cap="flat" cmpd="sng" algn="ctr">
+                      <a:solidFill>
+                        <a:schemeClr val="tx1"/>
+                      </a:solidFill>
+                      <a:prstDash val="solid"/>
+                      <a:round/>
+                      <a:headEnd type="none" w="med" len="med"/>
+                      <a:tailEnd type="none" w="med" len="med"/>
+                    </a:lnT>
+                    <a:lnB w="12700" cap="flat" cmpd="sng" algn="ctr">
+                      <a:solidFill>
+                        <a:schemeClr val="tx1"/>
+                      </a:solidFill>
+                      <a:prstDash val="solid"/>
+                      <a:round/>
+                      <a:headEnd type="none" w="med" len="med"/>
+                      <a:tailEnd type="none" w="med" len="med"/>
+                    </a:lnB>
+                    <a:lnTlToBr w="12700" cmpd="sng">
+                      <a:noFill/>
+                      <a:prstDash val="solid"/>
+                    </a:lnTlToBr>
+                    <a:lnBlToTr w="12700" cmpd="sng">
+                      <a:noFill/>
+                      <a:prstDash val="solid"/>
+                    </a:lnBlToTr>
+                  </a:tcPr>
+                </a:tc>
+                <a:tc>
+                  <a:txBody>
+                    <a:bodyPr/>
+                    <a:lstStyle/>
+                    <a:p>
+                      <a:pPr algn="ctr"/>
+                      <a:r>
+                        <a:rPr lang="en-US" sz="1400" dirty="0"/>
+                        <a:t>Result (</a:t>
+                      </a:r>
+                      <a:r>
+                        <a:rPr lang="en-US" sz="1400" dirty="0" err="1"/>
+                        <a:t>num|sec</a:t>
+                      </a:r>
+                      <a:r>
+                        <a:rPr lang="en-US" sz="1400" dirty="0"/>
+                        <a:t>)</a:t>
+                      </a:r>
+                    </a:p>
+                  </a:txBody>
+                  <a:tcPr marL="0" marR="0" marT="137160" marB="137160" anchor="ctr">
+                    <a:lnL>
+                      <a:noFill/>
+                    </a:lnL>
+                    <a:lnR>
+                      <a:noFill/>
+                    </a:lnR>
+                    <a:lnT w="12700" cap="flat" cmpd="sng" algn="ctr">
+                      <a:solidFill>
+                        <a:schemeClr val="tx1"/>
+                      </a:solidFill>
+                      <a:prstDash val="solid"/>
+                      <a:round/>
+                      <a:headEnd type="none" w="med" len="med"/>
+                      <a:tailEnd type="none" w="med" len="med"/>
+                    </a:lnT>
+                    <a:lnB w="12700" cap="flat" cmpd="sng" algn="ctr">
+                      <a:solidFill>
+                        <a:schemeClr val="tx1"/>
+                      </a:solidFill>
+                      <a:prstDash val="solid"/>
+                      <a:round/>
+                      <a:headEnd type="none" w="med" len="med"/>
+                      <a:tailEnd type="none" w="med" len="med"/>
+                    </a:lnB>
+                    <a:lnTlToBr w="12700" cmpd="sng">
+                      <a:noFill/>
+                      <a:prstDash val="solid"/>
+                    </a:lnTlToBr>
+                    <a:lnBlToTr w="12700" cmpd="sng">
+                      <a:noFill/>
+                      <a:prstDash val="solid"/>
+                    </a:lnBlToTr>
+                  </a:tcPr>
+                </a:tc>
+                <a:tc>
+                  <a:txBody>
+                    <a:bodyPr/>
+                    <a:lstStyle/>
+                    <a:p>
+                      <a:pPr algn="ctr"/>
+                      <a:r>
+                        <a:rPr lang="en-US" sz="1400" kern="1200" dirty="0">
+                          <a:solidFill>
+                            <a:schemeClr val="tx1"/>
+                          </a:solidFill>
+                          <a:latin typeface="+mn-lt"/>
+                          <a:ea typeface="+mn-ea"/>
+                          <a:cs typeface="+mn-cs"/>
+                        </a:rPr>
+                        <a:t>Avg (sec</a:t>
+                      </a:r>
+                      <a:r>
+                        <a:rPr lang="en-US" sz="1400" dirty="0"/>
+                        <a:t>)</a:t>
+                      </a:r>
+                    </a:p>
+                  </a:txBody>
+                  <a:tcPr marT="137160" marB="137160" anchor="ctr">
+                    <a:lnL>
+                      <a:noFill/>
+                    </a:lnL>
+                    <a:lnR>
+                      <a:noFill/>
+                    </a:lnR>
+                    <a:lnT w="12700" cap="flat" cmpd="sng" algn="ctr">
+                      <a:solidFill>
+                        <a:schemeClr val="tx1"/>
+                      </a:solidFill>
+                      <a:prstDash val="solid"/>
+                      <a:round/>
+                      <a:headEnd type="none" w="med" len="med"/>
+                      <a:tailEnd type="none" w="med" len="med"/>
+                    </a:lnT>
+                    <a:lnB w="12700" cap="flat" cmpd="sng" algn="ctr">
+                      <a:solidFill>
+                        <a:schemeClr val="tx1"/>
+                      </a:solidFill>
+                      <a:prstDash val="solid"/>
+                      <a:round/>
+                      <a:headEnd type="none" w="med" len="med"/>
+                      <a:tailEnd type="none" w="med" len="med"/>
+                    </a:lnB>
+                    <a:lnTlToBr w="12700" cmpd="sng">
+                      <a:noFill/>
+                      <a:prstDash val="solid"/>
+                    </a:lnTlToBr>
+                    <a:lnBlToTr w="12700" cmpd="sng">
+                      <a:noFill/>
+                      <a:prstDash val="solid"/>
+                    </a:lnBlToTr>
+                  </a:tcPr>
+                </a:tc>
+                <a:extLst>
+                  <a:ext uri="{0D108BD9-81ED-4DB2-BD59-A6C34878D82A}">
+                    <a16:rowId xmlns:a16="http://schemas.microsoft.com/office/drawing/2014/main" val="2761390173"/>
+                  </a:ext>
+                </a:extLst>
+              </a:tr>
+              <a:tr h="932314">
+                <a:tc rowSpan="2">
+                  <a:txBody>
+                    <a:bodyPr/>
+                    <a:lstStyle/>
+                    <a:p>
+                      <a:pPr algn="ctr"/>
+                      <a:r>
+                        <a:rPr lang="en-US" sz="1400" i="1" dirty="0" err="1"/>
+                        <a:t>nemd_test</a:t>
+                      </a:r>
+                      <a:endParaRPr lang="en-US" sz="1400" i="1" dirty="0"/>
+                    </a:p>
+                  </a:txBody>
+                  <a:tcPr marT="137160" marB="137160" anchor="ctr">
+                    <a:lnT w="12700" cap="flat" cmpd="sng" algn="ctr">
+                      <a:solidFill>
+                        <a:schemeClr val="tx1"/>
+                      </a:solidFill>
+                      <a:prstDash val="solid"/>
+                      <a:round/>
+                      <a:headEnd type="none" w="med" len="med"/>
+                      <a:tailEnd type="none" w="med" len="med"/>
+                    </a:lnT>
                     <a:lnB w="12700" cap="flat" cmpd="sng" algn="ctr">
                       <a:solidFill>
                         <a:schemeClr val="tx1"/>
@@ -7251,12 +7551,21 @@
                     <a:p>
                       <a:pPr algn="ctr"/>
                       <a:r>
-                        <a:rPr lang="en-US" sz="1400" dirty="0"/>
-                        <a:t>PYTEST_ADDOPTS</a:t>
-                      </a:r>
-                    </a:p>
-                  </a:txBody>
-                  <a:tcPr marL="137160" marR="137160" marT="137160" marB="137160" anchor="ctr">
+                        <a:rPr lang="en-US" sz="1400" i="1" dirty="0"/>
+                        <a:t>"-m 'not slow'"</a:t>
+                      </a:r>
+                    </a:p>
+                  </a:txBody>
+                  <a:tcPr marT="137160" marB="137160" anchor="ctr">
+                    <a:lnT w="12700" cap="flat" cmpd="sng" algn="ctr">
+                      <a:solidFill>
+                        <a:schemeClr val="tx1"/>
+                      </a:solidFill>
+                      <a:prstDash val="solid"/>
+                      <a:round/>
+                      <a:headEnd type="none" w="med" len="med"/>
+                      <a:tailEnd type="none" w="med" len="med"/>
+                    </a:lnT>
                     <a:lnB w="12700" cap="flat" cmpd="sng" algn="ctr">
                       <a:solidFill>
                         <a:schemeClr val="tx1"/>
@@ -7273,14 +7582,97 @@
                     <a:bodyPr/>
                     <a:lstStyle/>
                     <a:p>
-                      <a:pPr algn="ctr"/>
-                      <a:r>
-                        <a:rPr lang="en-US" sz="1400" dirty="0"/>
-                        <a:t>Type</a:t>
-                      </a:r>
-                    </a:p>
-                  </a:txBody>
-                  <a:tcPr marL="137160" marR="137160" marT="137160" marB="137160" anchor="ctr">
+                      <a:pPr marL="0" marR="0" lvl="0" indent="0" algn="ctr" defTabSz="914400" rtl="0" eaLnBrk="1" fontAlgn="auto" latinLnBrk="0" hangingPunct="1">
+                        <a:lnSpc>
+                          <a:spcPct val="100000"/>
+                        </a:lnSpc>
+                        <a:spcBef>
+                          <a:spcPts val="0"/>
+                        </a:spcBef>
+                        <a:spcAft>
+                          <a:spcPts val="0"/>
+                        </a:spcAft>
+                        <a:buClrTx/>
+                        <a:buSzTx/>
+                        <a:buFontTx/>
+                        <a:buNone/>
+                        <a:tabLst/>
+                        <a:defRPr/>
+                      </a:pPr>
+                      <a:r>
+                        <a:rPr lang="en-US" sz="1400" dirty="0">
+                          <a:solidFill>
+                            <a:schemeClr val="tx1"/>
+                          </a:solidFill>
+                        </a:rPr>
+                        <a:t>module</a:t>
+                      </a:r>
+                    </a:p>
+                    <a:p>
+                      <a:pPr marL="0" marR="0" lvl="0" indent="0" algn="ctr" defTabSz="914400" rtl="0" eaLnBrk="1" fontAlgn="auto" latinLnBrk="0" hangingPunct="1">
+                        <a:lnSpc>
+                          <a:spcPct val="100000"/>
+                        </a:lnSpc>
+                        <a:spcBef>
+                          <a:spcPts val="0"/>
+                        </a:spcBef>
+                        <a:spcAft>
+                          <a:spcPts val="0"/>
+                        </a:spcAft>
+                        <a:buClrTx/>
+                        <a:buSzTx/>
+                        <a:buFontTx/>
+                        <a:buNone/>
+                        <a:tabLst/>
+                        <a:defRPr/>
+                      </a:pPr>
+                      <a:r>
+                        <a:rPr lang="en-US" sz="1400" dirty="0">
+                          <a:solidFill>
+                            <a:schemeClr val="tx1"/>
+                          </a:solidFill>
+                        </a:rPr>
+                        <a:t>driver</a:t>
+                      </a:r>
+                    </a:p>
+                    <a:p>
+                      <a:pPr marL="0" marR="0" lvl="0" indent="0" algn="ctr" defTabSz="914400" rtl="0" eaLnBrk="1" fontAlgn="auto" latinLnBrk="0" hangingPunct="1">
+                        <a:lnSpc>
+                          <a:spcPct val="100000"/>
+                        </a:lnSpc>
+                        <a:spcBef>
+                          <a:spcPts val="0"/>
+                        </a:spcBef>
+                        <a:spcAft>
+                          <a:spcPts val="0"/>
+                        </a:spcAft>
+                        <a:buClrTx/>
+                        <a:buSzTx/>
+                        <a:buFontTx/>
+                        <a:buNone/>
+                        <a:tabLst/>
+                        <a:defRPr/>
+                      </a:pPr>
+                      <a:r>
+                        <a:rPr lang="en-US" sz="1400" dirty="0">
+                          <a:solidFill>
+                            <a:schemeClr val="tx1"/>
+                          </a:solidFill>
+                        </a:rPr>
+                        <a:t>workflow</a:t>
+                      </a:r>
+                    </a:p>
+                  </a:txBody>
+                  <a:tcPr marT="137160" marB="137160" anchor="ctr">
+                    <a:lnT w="12700" cap="flat" cmpd="sng" algn="ctr">
+                      <a:solidFill>
+                        <a:schemeClr val="tx1"/>
+                      </a:solidFill>
+                      <a:prstDash val="solid"/>
+                      <a:round/>
+                      <a:headEnd type="none" w="med" len="med"/>
+                      <a:tailEnd type="none" w="med" len="med"/>
+                    </a:lnT>
                     <a:lnB w="12700" cap="flat" cmpd="sng" algn="ctr">
                       <a:solidFill>
                         <a:schemeClr val="tx1"/>
@@ -7297,14 +7689,98 @@
                     <a:bodyPr/>
                     <a:lstStyle/>
                     <a:p>
-                      <a:pPr algn="ctr"/>
-                      <a:r>
-                        <a:rPr lang="en-US" sz="1400" dirty="0"/>
-                        <a:t>Results</a:t>
-                      </a:r>
-                    </a:p>
-                  </a:txBody>
-                  <a:tcPr marL="137160" marR="137160" marT="137160" marB="137160" anchor="ctr">
+                      <a:pPr marL="0" marR="0" lvl="0" indent="0" algn="ctr" defTabSz="914400" rtl="0" eaLnBrk="1" fontAlgn="auto" latinLnBrk="0" hangingPunct="1">
+                        <a:lnSpc>
+                          <a:spcPct val="100000"/>
+                        </a:lnSpc>
+                        <a:spcBef>
+                          <a:spcPts val="0"/>
+                        </a:spcBef>
+                        <a:spcAft>
+                          <a:spcPts val="0"/>
+                        </a:spcAft>
+                        <a:buClrTx/>
+                        <a:buSzTx/>
+                        <a:buFontTx/>
+                        <a:buNone/>
+                        <a:tabLst/>
+                        <a:defRPr/>
+                      </a:pPr>
+                      <a:r>
+                        <a:rPr lang="en-US" sz="1400" dirty="0">
+                          <a:solidFill>
+                            <a:schemeClr val="tx1"/>
+                          </a:solidFill>
+                        </a:rPr>
+                        <a:t>1732 | 14.71</a:t>
+                      </a:r>
+                    </a:p>
+                    <a:p>
+                      <a:pPr marL="0" marR="0" lvl="0" indent="0" algn="ctr" defTabSz="914400" rtl="0" eaLnBrk="1" fontAlgn="auto" latinLnBrk="0" hangingPunct="1">
+                        <a:lnSpc>
+                          <a:spcPct val="100000"/>
+                        </a:lnSpc>
+                        <a:spcBef>
+                          <a:spcPts val="0"/>
+                        </a:spcBef>
+                        <a:spcAft>
+                          <a:spcPts val="0"/>
+                        </a:spcAft>
+                        <a:buClrTx/>
+                        <a:buSzTx/>
+                        <a:buFontTx/>
+                        <a:buNone/>
+                        <a:tabLst/>
+                        <a:defRPr/>
+                      </a:pPr>
+                      <a:r>
+                        <a:rPr lang="en-US" sz="1400" dirty="0">
+                          <a:solidFill>
+                            <a:schemeClr val="tx1"/>
+                          </a:solidFill>
+                        </a:rPr>
+                        <a:t>129 | 6.13</a:t>
+                      </a:r>
+                    </a:p>
+                    <a:p>
+                      <a:pPr marL="0" marR="0" lvl="0" indent="0" algn="ctr" defTabSz="914400" rtl="0" eaLnBrk="1" fontAlgn="auto" latinLnBrk="0" hangingPunct="1">
+                        <a:lnSpc>
+                          <a:spcPct val="100000"/>
+                        </a:lnSpc>
+                        <a:spcBef>
+                          <a:spcPts val="0"/>
+                        </a:spcBef>
+                        <a:spcAft>
+                          <a:spcPts val="0"/>
+                        </a:spcAft>
+                        <a:buClrTx/>
+                        <a:buSzTx/>
+                        <a:buFontTx/>
+                        <a:buNone/>
+                        <a:tabLst/>
+                        <a:defRPr/>
+                      </a:pPr>
+                      <a:r>
+                        <a:rPr lang="en-US" sz="1400" dirty="0">
+                          <a:solidFill>
+                            <a:schemeClr val="tx1"/>
+                          </a:solidFill>
+                        </a:rPr>
+                        <a:t>  43 | 4.25</a:t>
+                      </a:r>
+                      <a:endParaRPr lang="en-US" sz="1400" dirty="0"/>
+                    </a:p>
+                  </a:txBody>
+                  <a:tcPr marT="137160" marB="137160" anchor="ctr">
+                    <a:lnT w="12700" cap="flat" cmpd="sng" algn="ctr">
+                      <a:solidFill>
+                        <a:schemeClr val="tx1"/>
+                      </a:solidFill>
+                      <a:prstDash val="solid"/>
+                      <a:round/>
+                      <a:headEnd type="none" w="med" len="med"/>
+                      <a:tailEnd type="none" w="med" len="med"/>
+                    </a:lnT>
                     <a:lnB w="12700" cap="flat" cmpd="sng" algn="ctr">
                       <a:solidFill>
                         <a:schemeClr val="tx1"/>
@@ -7321,14 +7797,39 @@
                     <a:bodyPr/>
                     <a:lstStyle/>
                     <a:p>
-                      <a:pPr algn="ctr"/>
+                      <a:pPr marL="0" marR="0" lvl="0" indent="0" algn="ctr" defTabSz="914400" rtl="0" eaLnBrk="1" fontAlgn="auto" latinLnBrk="0" hangingPunct="1">
+                        <a:lnSpc>
+                          <a:spcPct val="100000"/>
+                        </a:lnSpc>
+                        <a:spcBef>
+                          <a:spcPts val="0"/>
+                        </a:spcBef>
+                        <a:spcAft>
+                          <a:spcPts val="0"/>
+                        </a:spcAft>
+                        <a:buClrTx/>
+                        <a:buSzTx/>
+                        <a:buFontTx/>
+                        <a:buNone/>
+                        <a:tabLst/>
+                        <a:defRPr/>
+                      </a:pPr>
                       <a:r>
                         <a:rPr lang="en-US" sz="1400" dirty="0"/>
-                        <a:t>Per-Test</a:t>
-                      </a:r>
-                    </a:p>
-                  </a:txBody>
-                  <a:tcPr marL="137160" marR="137160" marT="137160" marB="137160" anchor="ctr">
+                        <a:t>0.0132</a:t>
+                      </a:r>
+                    </a:p>
+                  </a:txBody>
+                  <a:tcPr marT="137160" marB="137160" anchor="ctr">
+                    <a:lnT w="12700" cap="flat" cmpd="sng" algn="ctr">
+                      <a:solidFill>
+                        <a:schemeClr val="tx1"/>
+                      </a:solidFill>
+                      <a:prstDash val="solid"/>
+                      <a:round/>
+                      <a:headEnd type="none" w="med" len="med"/>
+                      <a:tailEnd type="none" w="med" len="med"/>
+                    </a:lnT>
                     <a:lnB w="12700" cap="flat" cmpd="sng" algn="ctr">
                       <a:solidFill>
                         <a:schemeClr val="tx1"/>
@@ -7342,22 +7843,17 @@
                 </a:tc>
                 <a:extLst>
                   <a:ext uri="{0D108BD9-81ED-4DB2-BD59-A6C34878D82A}">
-                    <a16:rowId xmlns:a16="http://schemas.microsoft.com/office/drawing/2014/main" val="2761390173"/>
+                    <a16:rowId xmlns:a16="http://schemas.microsoft.com/office/drawing/2014/main" val="1825471136"/>
                   </a:ext>
                 </a:extLst>
               </a:tr>
-              <a:tr h="871903">
-                <a:tc rowSpan="2">
-                  <a:txBody>
-                    <a:bodyPr/>
-                    <a:lstStyle/>
-                    <a:p>
-                      <a:pPr algn="ctr"/>
-                      <a:r>
-                        <a:rPr lang="en-US" sz="1400" dirty="0" err="1"/>
-                        <a:t>nemd_test</a:t>
-                      </a:r>
-                      <a:endParaRPr lang="en-US" sz="1400" dirty="0"/>
+              <a:tr h="932314">
+                <a:tc vMerge="1">
+                  <a:txBody>
+                    <a:bodyPr/>
+                    <a:lstStyle/>
+                    <a:p>
+                      <a:endParaRPr dirty="0"/>
                     </a:p>
                   </a:txBody>
                   <a:tcPr marL="137160" marR="137160" marT="137160" marB="137160" anchor="ctr">
@@ -7388,9 +7884,944 @@
                     <a:p>
                       <a:pPr algn="ctr"/>
                       <a:r>
+                        <a:rPr lang="en-US" sz="1400" i="1" dirty="0"/>
+                        <a:t>"-m slow"</a:t>
+                      </a:r>
+                    </a:p>
+                  </a:txBody>
+                  <a:tcPr marT="137160" marB="137160" anchor="ctr">
+                    <a:lnT w="12700" cap="flat" cmpd="sng" algn="ctr">
+                      <a:solidFill>
+                        <a:schemeClr val="tx1"/>
+                      </a:solidFill>
+                      <a:prstDash val="solid"/>
+                      <a:round/>
+                      <a:headEnd type="none" w="med" len="med"/>
+                      <a:tailEnd type="none" w="med" len="med"/>
+                    </a:lnT>
+                    <a:lnB w="12700" cap="flat" cmpd="sng" algn="ctr">
+                      <a:solidFill>
+                        <a:schemeClr val="tx1"/>
+                      </a:solidFill>
+                      <a:prstDash val="solid"/>
+                      <a:round/>
+                      <a:headEnd type="none" w="med" len="med"/>
+                      <a:tailEnd type="none" w="med" len="med"/>
+                    </a:lnB>
+                  </a:tcPr>
+                </a:tc>
+                <a:tc>
+                  <a:txBody>
+                    <a:bodyPr/>
+                    <a:lstStyle/>
+                    <a:p>
+                      <a:pPr marL="0" marR="0" lvl="0" indent="0" algn="ctr" defTabSz="914400" rtl="0" eaLnBrk="1" fontAlgn="auto" latinLnBrk="0" hangingPunct="1">
+                        <a:lnSpc>
+                          <a:spcPct val="100000"/>
+                        </a:lnSpc>
+                        <a:spcBef>
+                          <a:spcPts val="0"/>
+                        </a:spcBef>
+                        <a:spcAft>
+                          <a:spcPts val="0"/>
+                        </a:spcAft>
+                        <a:buClrTx/>
+                        <a:buSzTx/>
+                        <a:buFontTx/>
+                        <a:buNone/>
+                        <a:tabLst/>
+                        <a:defRPr/>
+                      </a:pPr>
+                      <a:r>
+                        <a:rPr lang="en-US" sz="1400" dirty="0">
+                          <a:solidFill>
+                            <a:schemeClr val="tx1"/>
+                          </a:solidFill>
+                        </a:rPr>
+                        <a:t>module</a:t>
+                      </a:r>
+                    </a:p>
+                    <a:p>
+                      <a:pPr marL="0" marR="0" lvl="0" indent="0" algn="ctr" defTabSz="914400" rtl="0" eaLnBrk="1" fontAlgn="auto" latinLnBrk="0" hangingPunct="1">
+                        <a:lnSpc>
+                          <a:spcPct val="100000"/>
+                        </a:lnSpc>
+                        <a:spcBef>
+                          <a:spcPts val="0"/>
+                        </a:spcBef>
+                        <a:spcAft>
+                          <a:spcPts val="0"/>
+                        </a:spcAft>
+                        <a:buClrTx/>
+                        <a:buSzTx/>
+                        <a:buFontTx/>
+                        <a:buNone/>
+                        <a:tabLst/>
+                        <a:defRPr/>
+                      </a:pPr>
+                      <a:r>
+                        <a:rPr lang="en-US" sz="1400" dirty="0">
+                          <a:solidFill>
+                            <a:schemeClr val="tx1"/>
+                          </a:solidFill>
+                        </a:rPr>
+                        <a:t>driver</a:t>
+                      </a:r>
+                    </a:p>
+                    <a:p>
+                      <a:pPr marL="0" marR="0" lvl="0" indent="0" algn="ctr" defTabSz="914400" rtl="0" eaLnBrk="1" fontAlgn="auto" latinLnBrk="0" hangingPunct="1">
+                        <a:lnSpc>
+                          <a:spcPct val="100000"/>
+                        </a:lnSpc>
+                        <a:spcBef>
+                          <a:spcPts val="0"/>
+                        </a:spcBef>
+                        <a:spcAft>
+                          <a:spcPts val="0"/>
+                        </a:spcAft>
+                        <a:buClrTx/>
+                        <a:buSzTx/>
+                        <a:buFontTx/>
+                        <a:buNone/>
+                        <a:tabLst/>
+                        <a:defRPr/>
+                      </a:pPr>
+                      <a:r>
+                        <a:rPr lang="en-US" sz="1400" dirty="0">
+                          <a:solidFill>
+                            <a:schemeClr val="tx1"/>
+                          </a:solidFill>
+                        </a:rPr>
+                        <a:t>workflow</a:t>
+                      </a:r>
+                    </a:p>
+                  </a:txBody>
+                  <a:tcPr marT="137160" marB="137160" anchor="ctr">
+                    <a:lnT w="12700" cap="flat" cmpd="sng" algn="ctr">
+                      <a:solidFill>
+                        <a:schemeClr val="tx1"/>
+                      </a:solidFill>
+                      <a:prstDash val="solid"/>
+                      <a:round/>
+                      <a:headEnd type="none" w="med" len="med"/>
+                      <a:tailEnd type="none" w="med" len="med"/>
+                    </a:lnT>
+                    <a:lnB w="12700" cap="flat" cmpd="sng" algn="ctr">
+                      <a:solidFill>
+                        <a:schemeClr val="tx1"/>
+                      </a:solidFill>
+                      <a:prstDash val="solid"/>
+                      <a:round/>
+                      <a:headEnd type="none" w="med" len="med"/>
+                      <a:tailEnd type="none" w="med" len="med"/>
+                    </a:lnB>
+                  </a:tcPr>
+                </a:tc>
+                <a:tc>
+                  <a:txBody>
+                    <a:bodyPr/>
+                    <a:lstStyle/>
+                    <a:p>
+                      <a:pPr marL="0" marR="0" lvl="0" indent="0" algn="ctr" defTabSz="914400" rtl="0" eaLnBrk="1" fontAlgn="auto" latinLnBrk="0" hangingPunct="1">
+                        <a:lnSpc>
+                          <a:spcPct val="100000"/>
+                        </a:lnSpc>
+                        <a:spcBef>
+                          <a:spcPts val="0"/>
+                        </a:spcBef>
+                        <a:spcAft>
+                          <a:spcPts val="0"/>
+                        </a:spcAft>
+                        <a:buClrTx/>
+                        <a:buSzTx/>
+                        <a:buFontTx/>
+                        <a:buNone/>
+                        <a:tabLst/>
+                        <a:defRPr/>
+                      </a:pPr>
+                      <a:r>
+                        <a:rPr lang="en-US" sz="1400" dirty="0">
+                          <a:solidFill>
+                            <a:schemeClr val="tx1"/>
+                          </a:solidFill>
+                        </a:rPr>
+                        <a:t>      1 | 20.19</a:t>
+                      </a:r>
+                    </a:p>
+                    <a:p>
+                      <a:pPr marL="0" marR="0" lvl="0" indent="0" algn="ctr" defTabSz="914400" rtl="0" eaLnBrk="1" fontAlgn="auto" latinLnBrk="0" hangingPunct="1">
+                        <a:lnSpc>
+                          <a:spcPct val="100000"/>
+                        </a:lnSpc>
+                        <a:spcBef>
+                          <a:spcPts val="0"/>
+                        </a:spcBef>
+                        <a:spcAft>
+                          <a:spcPts val="0"/>
+                        </a:spcAft>
+                        <a:buClrTx/>
+                        <a:buSzTx/>
+                        <a:buFontTx/>
+                        <a:buNone/>
+                        <a:tabLst/>
+                        <a:defRPr/>
+                      </a:pPr>
+                      <a:r>
+                        <a:rPr lang="en-US" sz="1400" dirty="0">
+                          <a:solidFill>
+                            <a:schemeClr val="tx1"/>
+                          </a:solidFill>
+                        </a:rPr>
+                        <a:t>    1 | 3.95</a:t>
+                      </a:r>
+                    </a:p>
+                    <a:p>
+                      <a:pPr marL="0" marR="0" lvl="0" indent="0" algn="ctr" defTabSz="914400" rtl="0" eaLnBrk="1" fontAlgn="auto" latinLnBrk="0" hangingPunct="1">
+                        <a:lnSpc>
+                          <a:spcPct val="100000"/>
+                        </a:lnSpc>
+                        <a:spcBef>
+                          <a:spcPts val="0"/>
+                        </a:spcBef>
+                        <a:spcAft>
+                          <a:spcPts val="0"/>
+                        </a:spcAft>
+                        <a:buClrTx/>
+                        <a:buSzTx/>
+                        <a:buFontTx/>
+                        <a:buNone/>
+                        <a:tabLst/>
+                        <a:defRPr/>
+                      </a:pPr>
+                      <a:r>
+                        <a:rPr lang="en-US" sz="1400" dirty="0">
+                          <a:solidFill>
+                            <a:schemeClr val="tx1"/>
+                          </a:solidFill>
+                        </a:rPr>
+                        <a:t>    no tests</a:t>
+                      </a:r>
+                    </a:p>
+                  </a:txBody>
+                  <a:tcPr marT="137160" marB="137160" anchor="ctr">
+                    <a:lnT w="12700" cap="flat" cmpd="sng" algn="ctr">
+                      <a:solidFill>
+                        <a:schemeClr val="tx1"/>
+                      </a:solidFill>
+                      <a:prstDash val="solid"/>
+                      <a:round/>
+                      <a:headEnd type="none" w="med" len="med"/>
+                      <a:tailEnd type="none" w="med" len="med"/>
+                    </a:lnT>
+                    <a:lnB w="12700" cap="flat" cmpd="sng" algn="ctr">
+                      <a:solidFill>
+                        <a:schemeClr val="tx1"/>
+                      </a:solidFill>
+                      <a:prstDash val="solid"/>
+                      <a:round/>
+                      <a:headEnd type="none" w="med" len="med"/>
+                      <a:tailEnd type="none" w="med" len="med"/>
+                    </a:lnB>
+                  </a:tcPr>
+                </a:tc>
+                <a:tc>
+                  <a:txBody>
+                    <a:bodyPr/>
+                    <a:lstStyle/>
+                    <a:p>
+                      <a:pPr marL="0" marR="0" lvl="0" indent="0" algn="ctr" defTabSz="914400" rtl="0" eaLnBrk="1" fontAlgn="auto" latinLnBrk="0" hangingPunct="1">
+                        <a:lnSpc>
+                          <a:spcPct val="100000"/>
+                        </a:lnSpc>
+                        <a:spcBef>
+                          <a:spcPts val="0"/>
+                        </a:spcBef>
+                        <a:spcAft>
+                          <a:spcPts val="0"/>
+                        </a:spcAft>
+                        <a:buClrTx/>
+                        <a:buSzTx/>
+                        <a:buFontTx/>
+                        <a:buNone/>
+                        <a:tabLst/>
+                        <a:defRPr/>
+                      </a:pPr>
+                      <a:r>
+                        <a:rPr lang="en-US" sz="1400" dirty="0">
+                          <a:solidFill>
+                            <a:schemeClr val="tx1"/>
+                          </a:solidFill>
+                        </a:rPr>
+                        <a:t>13.49</a:t>
+                      </a:r>
+                    </a:p>
+                  </a:txBody>
+                  <a:tcPr marT="137160" marB="137160" anchor="ctr">
+                    <a:lnT w="12700" cap="flat" cmpd="sng" algn="ctr">
+                      <a:solidFill>
+                        <a:schemeClr val="tx1"/>
+                      </a:solidFill>
+                      <a:prstDash val="solid"/>
+                      <a:round/>
+                      <a:headEnd type="none" w="med" len="med"/>
+                      <a:tailEnd type="none" w="med" len="med"/>
+                    </a:lnT>
+                    <a:lnB w="12700" cap="flat" cmpd="sng" algn="ctr">
+                      <a:solidFill>
+                        <a:schemeClr val="tx1"/>
+                      </a:solidFill>
+                      <a:prstDash val="solid"/>
+                      <a:round/>
+                      <a:headEnd type="none" w="med" len="med"/>
+                      <a:tailEnd type="none" w="med" len="med"/>
+                    </a:lnB>
+                  </a:tcPr>
+                </a:tc>
+                <a:extLst>
+                  <a:ext uri="{0D108BD9-81ED-4DB2-BD59-A6C34878D82A}">
+                    <a16:rowId xmlns:a16="http://schemas.microsoft.com/office/drawing/2014/main" val="1370259124"/>
+                  </a:ext>
+                </a:extLst>
+              </a:tr>
+            </a:tbl>
+          </a:graphicData>
+        </a:graphic>
+      </p:graphicFrame>
+      <p:sp>
+        <p:nvSpPr>
+          <p:cNvPr id="6" name="TextBox 5">
+            <a:extLst>
+              <a:ext uri="{FF2B5EF4-FFF2-40B4-BE49-F238E27FC236}">
+                <a16:creationId xmlns:a16="http://schemas.microsoft.com/office/drawing/2014/main" id="{81139EAB-FAE4-FB7B-AED3-4DD3FAC9C920}"/>
+              </a:ext>
+            </a:extLst>
+          </p:cNvPr>
+          <p:cNvSpPr txBox="1"/>
+          <p:nvPr/>
+        </p:nvSpPr>
+        <p:spPr>
+          <a:xfrm>
+            <a:off x="361233" y="6386661"/>
+            <a:ext cx="3071833" cy="307777"/>
+          </a:xfrm>
+          <a:prstGeom prst="rect">
+            <a:avLst/>
+          </a:prstGeom>
+          <a:noFill/>
+        </p:spPr>
+        <p:txBody>
+          <a:bodyPr wrap="square">
+            <a:spAutoFit/>
+          </a:bodyPr>
+          <a:lstStyle/>
+          <a:p>
+            <a:pPr marL="0" marR="0" lvl="0" indent="0" algn="just" defTabSz="914400" rtl="0" eaLnBrk="1" fontAlgn="auto" latinLnBrk="0" hangingPunct="1">
+              <a:lnSpc>
+                <a:spcPct val="100000"/>
+              </a:lnSpc>
+              <a:spcBef>
+                <a:spcPts val="0"/>
+              </a:spcBef>
+              <a:spcAft>
+                <a:spcPts val="0"/>
+              </a:spcAft>
+              <a:buClrTx/>
+              <a:buSzTx/>
+              <a:buFontTx/>
+              <a:buNone/>
+              <a:tabLst/>
+              <a:defRPr/>
+            </a:pPr>
+            <a:r>
+              <a:rPr lang="en-US" sz="1400" i="1" dirty="0"/>
+              <a:t>* source </a:t>
+            </a:r>
+            <a:r>
+              <a:rPr lang="en-US" sz="1400" i="1" dirty="0" err="1"/>
+              <a:t>premake</a:t>
+            </a:r>
+            <a:r>
+              <a:rPr lang="en-US" sz="1400" dirty="0"/>
+              <a:t> before running tests</a:t>
+            </a:r>
+          </a:p>
+        </p:txBody>
+      </p:sp>
+      <p:graphicFrame>
+        <p:nvGraphicFramePr>
+          <p:cNvPr id="7" name="Table 6">
+            <a:extLst>
+              <a:ext uri="{FF2B5EF4-FFF2-40B4-BE49-F238E27FC236}">
+                <a16:creationId xmlns:a16="http://schemas.microsoft.com/office/drawing/2014/main" id="{27D5B4CE-5718-2280-528F-82EBFA159824}"/>
+              </a:ext>
+            </a:extLst>
+          </p:cNvPr>
+          <p:cNvGraphicFramePr>
+            <a:graphicFrameLocks noGrp="1"/>
+          </p:cNvGraphicFramePr>
+          <p:nvPr>
+            <p:extLst>
+              <p:ext uri="{D42A27DB-BD31-4B8C-83A1-F6EECF244321}">
+                <p14:modId xmlns:p14="http://schemas.microsoft.com/office/powerpoint/2010/main" val="4049380772"/>
+              </p:ext>
+            </p:extLst>
+          </p:nvPr>
+        </p:nvGraphicFramePr>
+        <p:xfrm>
+          <a:off x="6301520" y="2515701"/>
+          <a:ext cx="5305333" cy="3870960"/>
+        </p:xfrm>
+        <a:graphic>
+          <a:graphicData uri="http://schemas.openxmlformats.org/drawingml/2006/table">
+            <a:tbl>
+              <a:tblPr firstRow="1" bandRow="1">
+                <a:tableStyleId>{2D5ABB26-0587-4C30-8999-92F81FD0307C}</a:tableStyleId>
+              </a:tblPr>
+              <a:tblGrid>
+                <a:gridCol w="1196379">
+                  <a:extLst>
+                    <a:ext uri="{9D8B030D-6E8A-4147-A177-3AD203B41FA5}">
+                      <a16:colId xmlns:a16="http://schemas.microsoft.com/office/drawing/2014/main" val="519871301"/>
+                    </a:ext>
+                  </a:extLst>
+                </a:gridCol>
+                <a:gridCol w="883450">
+                  <a:extLst>
+                    <a:ext uri="{9D8B030D-6E8A-4147-A177-3AD203B41FA5}">
+                      <a16:colId xmlns:a16="http://schemas.microsoft.com/office/drawing/2014/main" val="3084682247"/>
+                    </a:ext>
+                  </a:extLst>
+                </a:gridCol>
+                <a:gridCol w="946500">
+                  <a:extLst>
+                    <a:ext uri="{9D8B030D-6E8A-4147-A177-3AD203B41FA5}">
+                      <a16:colId xmlns:a16="http://schemas.microsoft.com/office/drawing/2014/main" val="2730536322"/>
+                    </a:ext>
+                  </a:extLst>
+                </a:gridCol>
+                <a:gridCol w="1172805">
+                  <a:extLst>
+                    <a:ext uri="{9D8B030D-6E8A-4147-A177-3AD203B41FA5}">
+                      <a16:colId xmlns:a16="http://schemas.microsoft.com/office/drawing/2014/main" val="3113920103"/>
+                    </a:ext>
+                  </a:extLst>
+                </a:gridCol>
+                <a:gridCol w="1106199">
+                  <a:extLst>
+                    <a:ext uri="{9D8B030D-6E8A-4147-A177-3AD203B41FA5}">
+                      <a16:colId xmlns:a16="http://schemas.microsoft.com/office/drawing/2014/main" val="1319148285"/>
+                    </a:ext>
+                  </a:extLst>
+                </a:gridCol>
+              </a:tblGrid>
+              <a:tr h="477700">
+                <a:tc>
+                  <a:txBody>
+                    <a:bodyPr/>
+                    <a:lstStyle/>
+                    <a:p>
+                      <a:pPr algn="ctr"/>
+                      <a:r>
                         <a:rPr lang="en-US" sz="1400" dirty="0"/>
-                        <a:t>"-m 'not slow'"</a:t>
-                      </a:r>
+                        <a:t>Command</a:t>
+                      </a:r>
+                    </a:p>
+                  </a:txBody>
+                  <a:tcPr marT="137160" marB="137160" anchor="ctr">
+                    <a:lnT w="12700" cap="flat" cmpd="sng" algn="ctr">
+                      <a:solidFill>
+                        <a:schemeClr val="tx1"/>
+                      </a:solidFill>
+                      <a:prstDash val="solid"/>
+                      <a:round/>
+                      <a:headEnd type="none" w="med" len="med"/>
+                      <a:tailEnd type="none" w="med" len="med"/>
+                    </a:lnT>
+                    <a:lnB w="12700" cap="flat" cmpd="sng" algn="ctr">
+                      <a:solidFill>
+                        <a:schemeClr val="tx1"/>
+                      </a:solidFill>
+                      <a:prstDash val="solid"/>
+                      <a:round/>
+                      <a:headEnd type="none" w="med" len="med"/>
+                      <a:tailEnd type="none" w="med" len="med"/>
+                    </a:lnB>
+                  </a:tcPr>
+                </a:tc>
+                <a:tc>
+                  <a:txBody>
+                    <a:bodyPr/>
+                    <a:lstStyle/>
+                    <a:p>
+                      <a:pPr algn="ctr"/>
+                      <a:r>
+                        <a:rPr lang="en-US" sz="1400" dirty="0"/>
+                        <a:t>PYTEST</a:t>
+                      </a:r>
+                    </a:p>
+                  </a:txBody>
+                  <a:tcPr marT="137160" marB="137160" anchor="ctr">
+                    <a:lnT w="12700" cap="flat" cmpd="sng" algn="ctr">
+                      <a:solidFill>
+                        <a:schemeClr val="tx1"/>
+                      </a:solidFill>
+                      <a:prstDash val="solid"/>
+                      <a:round/>
+                      <a:headEnd type="none" w="med" len="med"/>
+                      <a:tailEnd type="none" w="med" len="med"/>
+                    </a:lnT>
+                    <a:lnB w="12700" cap="flat" cmpd="sng" algn="ctr">
+                      <a:solidFill>
+                        <a:schemeClr val="tx1"/>
+                      </a:solidFill>
+                      <a:prstDash val="solid"/>
+                      <a:round/>
+                      <a:headEnd type="none" w="med" len="med"/>
+                      <a:tailEnd type="none" w="med" len="med"/>
+                    </a:lnB>
+                  </a:tcPr>
+                </a:tc>
+                <a:tc>
+                  <a:txBody>
+                    <a:bodyPr/>
+                    <a:lstStyle/>
+                    <a:p>
+                      <a:pPr marL="0" marR="0" lvl="0" indent="0" algn="ctr" defTabSz="914400" rtl="0" eaLnBrk="1" fontAlgn="auto" latinLnBrk="0" hangingPunct="1">
+                        <a:lnSpc>
+                          <a:spcPct val="100000"/>
+                        </a:lnSpc>
+                        <a:spcBef>
+                          <a:spcPts val="0"/>
+                        </a:spcBef>
+                        <a:spcAft>
+                          <a:spcPts val="0"/>
+                        </a:spcAft>
+                        <a:buClrTx/>
+                        <a:buSzTx/>
+                        <a:buFontTx/>
+                        <a:buNone/>
+                        <a:tabLst/>
+                        <a:defRPr/>
+                      </a:pPr>
+                      <a:r>
+                        <a:rPr lang="en-US" sz="1400" dirty="0" err="1">
+                          <a:solidFill>
+                            <a:schemeClr val="tx1"/>
+                          </a:solidFill>
+                        </a:rPr>
+                        <a:t>Dirname</a:t>
+                      </a:r>
+                      <a:endParaRPr lang="en-US" sz="1400" dirty="0">
+                        <a:solidFill>
+                          <a:schemeClr val="tx1"/>
+                        </a:solidFill>
+                      </a:endParaRPr>
+                    </a:p>
+                  </a:txBody>
+                  <a:tcPr marT="137160" marB="137160" anchor="ctr">
+                    <a:lnT w="12700" cap="flat" cmpd="sng" algn="ctr">
+                      <a:solidFill>
+                        <a:schemeClr val="tx1"/>
+                      </a:solidFill>
+                      <a:prstDash val="solid"/>
+                      <a:round/>
+                      <a:headEnd type="none" w="med" len="med"/>
+                      <a:tailEnd type="none" w="med" len="med"/>
+                    </a:lnT>
+                    <a:lnB w="12700" cap="flat" cmpd="sng" algn="ctr">
+                      <a:solidFill>
+                        <a:schemeClr val="tx1"/>
+                      </a:solidFill>
+                      <a:prstDash val="solid"/>
+                      <a:round/>
+                      <a:headEnd type="none" w="med" len="med"/>
+                      <a:tailEnd type="none" w="med" len="med"/>
+                    </a:lnB>
+                  </a:tcPr>
+                </a:tc>
+                <a:tc>
+                  <a:txBody>
+                    <a:bodyPr/>
+                    <a:lstStyle/>
+                    <a:p>
+                      <a:pPr marL="0" marR="0" lvl="0" indent="0" algn="ctr" defTabSz="914400" rtl="0" eaLnBrk="1" fontAlgn="auto" latinLnBrk="0" hangingPunct="1">
+                        <a:lnSpc>
+                          <a:spcPct val="100000"/>
+                        </a:lnSpc>
+                        <a:spcBef>
+                          <a:spcPts val="0"/>
+                        </a:spcBef>
+                        <a:spcAft>
+                          <a:spcPts val="0"/>
+                        </a:spcAft>
+                        <a:buClrTx/>
+                        <a:buSzTx/>
+                        <a:buFontTx/>
+                        <a:buNone/>
+                        <a:tabLst/>
+                        <a:defRPr/>
+                      </a:pPr>
+                      <a:r>
+                        <a:rPr lang="en-US" sz="1400" dirty="0">
+                          <a:solidFill>
+                            <a:schemeClr val="tx1"/>
+                          </a:solidFill>
+                        </a:rPr>
+                        <a:t>Type</a:t>
+                      </a:r>
+                    </a:p>
+                  </a:txBody>
+                  <a:tcPr marT="137160" marB="137160" anchor="ctr">
+                    <a:lnT w="12700" cap="flat" cmpd="sng" algn="ctr">
+                      <a:solidFill>
+                        <a:schemeClr val="tx1"/>
+                      </a:solidFill>
+                      <a:prstDash val="solid"/>
+                      <a:round/>
+                      <a:headEnd type="none" w="med" len="med"/>
+                      <a:tailEnd type="none" w="med" len="med"/>
+                    </a:lnT>
+                    <a:lnB w="12700" cap="flat" cmpd="sng" algn="ctr">
+                      <a:solidFill>
+                        <a:schemeClr val="tx1"/>
+                      </a:solidFill>
+                      <a:prstDash val="solid"/>
+                      <a:round/>
+                      <a:headEnd type="none" w="med" len="med"/>
+                      <a:tailEnd type="none" w="med" len="med"/>
+                    </a:lnB>
+                  </a:tcPr>
+                </a:tc>
+                <a:tc>
+                  <a:txBody>
+                    <a:bodyPr/>
+                    <a:lstStyle/>
+                    <a:p>
+                      <a:pPr marL="0" marR="0" lvl="0" indent="0" algn="ctr" defTabSz="914400" rtl="0" eaLnBrk="1" fontAlgn="auto" latinLnBrk="0" hangingPunct="1">
+                        <a:lnSpc>
+                          <a:spcPct val="100000"/>
+                        </a:lnSpc>
+                        <a:spcBef>
+                          <a:spcPts val="0"/>
+                        </a:spcBef>
+                        <a:spcAft>
+                          <a:spcPts val="0"/>
+                        </a:spcAft>
+                        <a:buClrTx/>
+                        <a:buSzTx/>
+                        <a:buFontTx/>
+                        <a:buNone/>
+                        <a:tabLst/>
+                        <a:defRPr/>
+                      </a:pPr>
+                      <a:r>
+                        <a:rPr lang="en-US" sz="1400" dirty="0"/>
+                        <a:t>Results</a:t>
+                      </a:r>
+                      <a:endParaRPr lang="en-US" sz="1400" dirty="0">
+                        <a:solidFill>
+                          <a:schemeClr val="tx1"/>
+                        </a:solidFill>
+                      </a:endParaRPr>
+                    </a:p>
+                  </a:txBody>
+                  <a:tcPr marT="137160" marB="137160" anchor="ctr">
+                    <a:lnT w="12700" cap="flat" cmpd="sng" algn="ctr">
+                      <a:solidFill>
+                        <a:schemeClr val="tx1"/>
+                      </a:solidFill>
+                      <a:prstDash val="solid"/>
+                      <a:round/>
+                      <a:headEnd type="none" w="med" len="med"/>
+                      <a:tailEnd type="none" w="med" len="med"/>
+                    </a:lnT>
+                    <a:lnB w="12700" cap="flat" cmpd="sng" algn="ctr">
+                      <a:solidFill>
+                        <a:schemeClr val="tx1"/>
+                      </a:solidFill>
+                      <a:prstDash val="solid"/>
+                      <a:round/>
+                      <a:headEnd type="none" w="med" len="med"/>
+                      <a:tailEnd type="none" w="med" len="med"/>
+                    </a:lnB>
+                  </a:tcPr>
+                </a:tc>
+                <a:extLst>
+                  <a:ext uri="{0D108BD9-81ED-4DB2-BD59-A6C34878D82A}">
+                    <a16:rowId xmlns:a16="http://schemas.microsoft.com/office/drawing/2014/main" val="1601929244"/>
+                  </a:ext>
+                </a:extLst>
+              </a:tr>
+              <a:tr h="1104681">
+                <a:tc rowSpan="3">
+                  <a:txBody>
+                    <a:bodyPr/>
+                    <a:lstStyle/>
+                    <a:p>
+                      <a:pPr marL="0" marR="0" lvl="0" indent="0" algn="ctr" defTabSz="914400" rtl="0" eaLnBrk="1" fontAlgn="auto" latinLnBrk="0" hangingPunct="1">
+                        <a:lnSpc>
+                          <a:spcPct val="100000"/>
+                        </a:lnSpc>
+                        <a:spcBef>
+                          <a:spcPts val="0"/>
+                        </a:spcBef>
+                        <a:spcAft>
+                          <a:spcPts val="0"/>
+                        </a:spcAft>
+                        <a:buClrTx/>
+                        <a:buSzTx/>
+                        <a:buFontTx/>
+                        <a:buNone/>
+                        <a:tabLst/>
+                        <a:defRPr/>
+                      </a:pPr>
+                      <a:r>
+                        <a:rPr lang="en-US" sz="1400" i="1" dirty="0" err="1"/>
+                        <a:t>nemd_cover</a:t>
+                      </a:r>
+                      <a:endParaRPr lang="en-US" sz="1400" i="1" dirty="0"/>
+                    </a:p>
+                  </a:txBody>
+                  <a:tcPr marT="137160" marB="137160" anchor="ctr">
+                    <a:lnT w="12700" cap="flat" cmpd="sng" algn="ctr">
+                      <a:solidFill>
+                        <a:schemeClr val="tx1"/>
+                      </a:solidFill>
+                      <a:prstDash val="solid"/>
+                      <a:round/>
+                      <a:headEnd type="none" w="med" len="med"/>
+                      <a:tailEnd type="none" w="med" len="med"/>
+                    </a:lnT>
+                    <a:lnB w="12700" cap="flat" cmpd="sng" algn="ctr">
+                      <a:solidFill>
+                        <a:schemeClr val="tx1"/>
+                      </a:solidFill>
+                      <a:prstDash val="solid"/>
+                      <a:round/>
+                      <a:headEnd type="none" w="med" len="med"/>
+                      <a:tailEnd type="none" w="med" len="med"/>
+                    </a:lnB>
+                  </a:tcPr>
+                </a:tc>
+                <a:tc rowSpan="3">
+                  <a:txBody>
+                    <a:bodyPr/>
+                    <a:lstStyle/>
+                    <a:p>
+                      <a:pPr marL="0" marR="0" lvl="0" indent="0" algn="ctr" defTabSz="914400" rtl="0" eaLnBrk="1" fontAlgn="auto" latinLnBrk="0" hangingPunct="1">
+                        <a:lnSpc>
+                          <a:spcPct val="100000"/>
+                        </a:lnSpc>
+                        <a:spcBef>
+                          <a:spcPts val="0"/>
+                        </a:spcBef>
+                        <a:spcAft>
+                          <a:spcPts val="0"/>
+                        </a:spcAft>
+                        <a:buClrTx/>
+                        <a:buSzTx/>
+                        <a:buFontTx/>
+                        <a:buNone/>
+                        <a:tabLst/>
+                        <a:defRPr/>
+                      </a:pPr>
+                      <a:r>
+                        <a:rPr lang="en-US" sz="1400" i="1" dirty="0"/>
+                        <a:t>"-m ''"</a:t>
+                      </a:r>
+                    </a:p>
+                  </a:txBody>
+                  <a:tcPr marT="137160" marB="137160" anchor="ctr">
+                    <a:lnT w="12700" cap="flat" cmpd="sng" algn="ctr">
+                      <a:solidFill>
+                        <a:schemeClr val="tx1"/>
+                      </a:solidFill>
+                      <a:prstDash val="solid"/>
+                      <a:round/>
+                      <a:headEnd type="none" w="med" len="med"/>
+                      <a:tailEnd type="none" w="med" len="med"/>
+                    </a:lnT>
+                    <a:lnB w="12700" cap="flat" cmpd="sng" algn="ctr">
+                      <a:solidFill>
+                        <a:schemeClr val="tx1"/>
+                      </a:solidFill>
+                      <a:prstDash val="solid"/>
+                      <a:round/>
+                      <a:headEnd type="none" w="med" len="med"/>
+                      <a:tailEnd type="none" w="med" len="med"/>
+                    </a:lnB>
+                  </a:tcPr>
+                </a:tc>
+                <a:tc>
+                  <a:txBody>
+                    <a:bodyPr/>
+                    <a:lstStyle/>
+                    <a:p>
+                      <a:pPr marL="0" marR="0" lvl="0" indent="0" algn="ctr" defTabSz="914400" rtl="0" eaLnBrk="1" fontAlgn="auto" latinLnBrk="0" hangingPunct="1">
+                        <a:lnSpc>
+                          <a:spcPct val="100000"/>
+                        </a:lnSpc>
+                        <a:spcBef>
+                          <a:spcPts val="0"/>
+                        </a:spcBef>
+                        <a:spcAft>
+                          <a:spcPts val="0"/>
+                        </a:spcAft>
+                        <a:buClrTx/>
+                        <a:buSzTx/>
+                        <a:buFontTx/>
+                        <a:buNone/>
+                        <a:tabLst/>
+                        <a:defRPr/>
+                      </a:pPr>
+                      <a:r>
+                        <a:rPr lang="en-US" sz="1400" dirty="0"/>
+                        <a:t>workflow</a:t>
+                      </a:r>
+                    </a:p>
+                  </a:txBody>
+                  <a:tcPr marT="137160" marB="137160" anchor="ctr">
+                    <a:lnT w="12700" cap="flat" cmpd="sng" algn="ctr">
+                      <a:solidFill>
+                        <a:schemeClr val="tx1"/>
+                      </a:solidFill>
+                      <a:prstDash val="solid"/>
+                      <a:round/>
+                      <a:headEnd type="none" w="med" len="med"/>
+                      <a:tailEnd type="none" w="med" len="med"/>
+                    </a:lnT>
+                    <a:lnB w="12700" cap="flat" cmpd="sng" algn="ctr">
+                      <a:solidFill>
+                        <a:schemeClr val="tx1"/>
+                      </a:solidFill>
+                      <a:prstDash val="solid"/>
+                      <a:round/>
+                      <a:headEnd type="none" w="med" len="med"/>
+                      <a:tailEnd type="none" w="med" len="med"/>
+                    </a:lnB>
+                  </a:tcPr>
+                </a:tc>
+                <a:tc>
+                  <a:txBody>
+                    <a:bodyPr/>
+                    <a:lstStyle/>
+                    <a:p>
+                      <a:pPr algn="ctr"/>
+                      <a:r>
+                        <a:rPr lang="en-US" sz="1400" dirty="0"/>
+                        <a:t>statements</a:t>
+                      </a:r>
+                    </a:p>
+                    <a:p>
+                      <a:pPr algn="ctr"/>
+                      <a:r>
+                        <a:rPr lang="en-US" sz="1400" dirty="0"/>
+                        <a:t>missing</a:t>
+                      </a:r>
+                    </a:p>
+                    <a:p>
+                      <a:pPr algn="ctr"/>
+                      <a:r>
+                        <a:rPr lang="en-US" sz="1400" dirty="0"/>
+                        <a:t>excluded</a:t>
+                      </a:r>
+                    </a:p>
+                    <a:p>
+                      <a:pPr algn="ctr"/>
+                      <a:r>
+                        <a:rPr lang="en-US" sz="1400" dirty="0"/>
+                        <a:t>coverage</a:t>
+                      </a:r>
+                    </a:p>
+                  </a:txBody>
+                  <a:tcPr marT="137160" marB="137160" anchor="ctr">
+                    <a:lnT w="12700" cap="flat" cmpd="sng" algn="ctr">
+                      <a:solidFill>
+                        <a:schemeClr val="tx1"/>
+                      </a:solidFill>
+                      <a:prstDash val="solid"/>
+                      <a:round/>
+                      <a:headEnd type="none" w="med" len="med"/>
+                      <a:tailEnd type="none" w="med" len="med"/>
+                    </a:lnT>
+                    <a:lnB w="12700" cap="flat" cmpd="sng" algn="ctr">
+                      <a:solidFill>
+                        <a:schemeClr val="tx1"/>
+                      </a:solidFill>
+                      <a:prstDash val="solid"/>
+                      <a:round/>
+                      <a:headEnd type="none" w="med" len="med"/>
+                      <a:tailEnd type="none" w="med" len="med"/>
+                    </a:lnB>
+                  </a:tcPr>
+                </a:tc>
+                <a:tc>
+                  <a:txBody>
+                    <a:bodyPr/>
+                    <a:lstStyle/>
+                    <a:p>
+                      <a:pPr algn="ctr"/>
+                      <a:r>
+                        <a:rPr lang="en-US" sz="1400" dirty="0"/>
+                        <a:t>200</a:t>
+                      </a:r>
+                    </a:p>
+                    <a:p>
+                      <a:pPr algn="ctr"/>
+                      <a:r>
+                        <a:rPr lang="en-US" sz="1400" dirty="0"/>
+                        <a:t>0</a:t>
+                      </a:r>
+                    </a:p>
+                    <a:p>
+                      <a:pPr algn="ctr"/>
+                      <a:r>
+                        <a:rPr lang="en-US" sz="1400" dirty="0"/>
+                        <a:t>8</a:t>
+                      </a:r>
+                    </a:p>
+                    <a:p>
+                      <a:pPr algn="ctr"/>
+                      <a:r>
+                        <a:rPr lang="en-US" sz="1400" dirty="0"/>
+                        <a:t>100%</a:t>
+                      </a:r>
+                    </a:p>
+                  </a:txBody>
+                  <a:tcPr marT="137160" marB="137160" anchor="ctr">
+                    <a:lnT w="12700" cap="flat" cmpd="sng" algn="ctr">
+                      <a:solidFill>
+                        <a:schemeClr val="tx1"/>
+                      </a:solidFill>
+                      <a:prstDash val="solid"/>
+                      <a:round/>
+                      <a:headEnd type="none" w="med" len="med"/>
+                      <a:tailEnd type="none" w="med" len="med"/>
+                    </a:lnT>
+                    <a:lnB w="12700" cap="flat" cmpd="sng" algn="ctr">
+                      <a:solidFill>
+                        <a:schemeClr val="tx1"/>
+                      </a:solidFill>
+                      <a:prstDash val="solid"/>
+                      <a:round/>
+                      <a:headEnd type="none" w="med" len="med"/>
+                      <a:tailEnd type="none" w="med" len="med"/>
+                    </a:lnB>
+                  </a:tcPr>
+                </a:tc>
+                <a:extLst>
+                  <a:ext uri="{0D108BD9-81ED-4DB2-BD59-A6C34878D82A}">
+                    <a16:rowId xmlns:a16="http://schemas.microsoft.com/office/drawing/2014/main" val="2430466548"/>
+                  </a:ext>
+                </a:extLst>
+              </a:tr>
+              <a:tr h="1104681">
+                <a:tc vMerge="1">
+                  <a:txBody>
+                    <a:bodyPr/>
+                    <a:lstStyle/>
+                    <a:p>
+                      <a:endParaRPr/>
                     </a:p>
                   </a:txBody>
                   <a:tcPr marL="137160" marR="137160" marT="137160" marB="137160" anchor="ctr">
@@ -7414,90 +8845,12 @@
                     </a:lnB>
                   </a:tcPr>
                 </a:tc>
-                <a:tc>
-                  <a:txBody>
-                    <a:bodyPr/>
-                    <a:lstStyle/>
-                    <a:p>
-                      <a:pPr marL="0" marR="0" lvl="0" indent="0" algn="ctr" defTabSz="914400" rtl="0" eaLnBrk="1" fontAlgn="auto" latinLnBrk="0" hangingPunct="1">
-                        <a:lnSpc>
-                          <a:spcPct val="100000"/>
-                        </a:lnSpc>
-                        <a:spcBef>
-                          <a:spcPts val="0"/>
-                        </a:spcBef>
-                        <a:spcAft>
-                          <a:spcPts val="0"/>
-                        </a:spcAft>
-                        <a:buClrTx/>
-                        <a:buSzTx/>
-                        <a:buFontTx/>
-                        <a:buNone/>
-                        <a:tabLst/>
-                        <a:defRPr/>
-                      </a:pPr>
-                      <a:r>
-                        <a:rPr lang="en-US" sz="1400" dirty="0">
-                          <a:solidFill>
-                            <a:schemeClr val="tx1"/>
-                          </a:solidFill>
-                        </a:rPr>
-                        <a:t>module</a:t>
-                      </a:r>
-                    </a:p>
-                    <a:p>
-                      <a:pPr marL="0" marR="0" lvl="0" indent="0" algn="ctr" defTabSz="914400" rtl="0" eaLnBrk="1" fontAlgn="auto" latinLnBrk="0" hangingPunct="1">
-                        <a:lnSpc>
-                          <a:spcPct val="100000"/>
-                        </a:lnSpc>
-                        <a:spcBef>
-                          <a:spcPts val="0"/>
-                        </a:spcBef>
-                        <a:spcAft>
-                          <a:spcPts val="0"/>
-                        </a:spcAft>
-                        <a:buClrTx/>
-                        <a:buSzTx/>
-                        <a:buFontTx/>
-                        <a:buNone/>
-                        <a:tabLst/>
-                        <a:defRPr/>
-                      </a:pPr>
-                      <a:r>
-                        <a:rPr lang="en-US" sz="1400" dirty="0">
-                          <a:solidFill>
-                            <a:schemeClr val="tx1"/>
-                          </a:solidFill>
-                        </a:rPr>
-                        <a:t>driver</a:t>
-                      </a:r>
-                    </a:p>
-                    <a:p>
-                      <a:pPr marL="0" marR="0" lvl="0" indent="0" algn="ctr" defTabSz="914400" rtl="0" eaLnBrk="1" fontAlgn="auto" latinLnBrk="0" hangingPunct="1">
-                        <a:lnSpc>
-                          <a:spcPct val="100000"/>
-                        </a:lnSpc>
-                        <a:spcBef>
-                          <a:spcPts val="0"/>
-                        </a:spcBef>
-                        <a:spcAft>
-                          <a:spcPts val="0"/>
-                        </a:spcAft>
-                        <a:buClrTx/>
-                        <a:buSzTx/>
-                        <a:buFontTx/>
-                        <a:buNone/>
-                        <a:tabLst/>
-                        <a:defRPr/>
-                      </a:pPr>
-                      <a:r>
-                        <a:rPr lang="en-US" sz="1400" dirty="0">
-                          <a:solidFill>
-                            <a:schemeClr val="tx1"/>
-                          </a:solidFill>
-                        </a:rPr>
-                        <a:t>workflow</a:t>
-                      </a:r>
+                <a:tc vMerge="1">
+                  <a:txBody>
+                    <a:bodyPr/>
+                    <a:lstStyle/>
+                    <a:p>
+                      <a:endParaRPr/>
                     </a:p>
                   </a:txBody>
                   <a:tcPr marL="137160" marR="137160" marT="137160" marB="137160" anchor="ctr">
@@ -7526,85 +8879,155 @@
                     <a:bodyPr/>
                     <a:lstStyle/>
                     <a:p>
-                      <a:pPr marL="0" marR="0" lvl="0" indent="0" algn="ctr" defTabSz="914400" rtl="0" eaLnBrk="1" fontAlgn="auto" latinLnBrk="0" hangingPunct="1">
-                        <a:lnSpc>
-                          <a:spcPct val="100000"/>
-                        </a:lnSpc>
-                        <a:spcBef>
-                          <a:spcPts val="0"/>
-                        </a:spcBef>
-                        <a:spcAft>
-                          <a:spcPts val="0"/>
-                        </a:spcAft>
-                        <a:buClrTx/>
-                        <a:buSzTx/>
-                        <a:buFontTx/>
-                        <a:buNone/>
-                        <a:tabLst/>
-                        <a:defRPr/>
-                      </a:pPr>
-                      <a:r>
-                        <a:rPr lang="en-US" sz="1400" dirty="0">
-                          <a:solidFill>
-                            <a:schemeClr val="tx1"/>
-                          </a:solidFill>
-                        </a:rPr>
-                        <a:t>1725 passed in 14.35s</a:t>
-                      </a:r>
-                    </a:p>
-                    <a:p>
-                      <a:pPr marL="0" marR="0" lvl="0" indent="0" algn="ctr" defTabSz="914400" rtl="0" eaLnBrk="1" fontAlgn="auto" latinLnBrk="0" hangingPunct="1">
-                        <a:lnSpc>
-                          <a:spcPct val="100000"/>
-                        </a:lnSpc>
-                        <a:spcBef>
-                          <a:spcPts val="0"/>
-                        </a:spcBef>
-                        <a:spcAft>
-                          <a:spcPts val="0"/>
-                        </a:spcAft>
-                        <a:buClrTx/>
-                        <a:buSzTx/>
-                        <a:buFontTx/>
-                        <a:buNone/>
-                        <a:tabLst/>
-                        <a:defRPr/>
-                      </a:pPr>
-                      <a:r>
-                        <a:rPr lang="en-US" sz="1400" dirty="0">
-                          <a:solidFill>
-                            <a:schemeClr val="tx1"/>
-                          </a:solidFill>
-                        </a:rPr>
-                        <a:t>129 passed in 6.33s</a:t>
-                      </a:r>
-                    </a:p>
-                    <a:p>
-                      <a:pPr marL="0" marR="0" lvl="0" indent="0" algn="ctr" defTabSz="914400" rtl="0" eaLnBrk="1" fontAlgn="auto" latinLnBrk="0" hangingPunct="1">
-                        <a:lnSpc>
-                          <a:spcPct val="100000"/>
-                        </a:lnSpc>
-                        <a:spcBef>
-                          <a:spcPts val="0"/>
-                        </a:spcBef>
-                        <a:spcAft>
-                          <a:spcPts val="0"/>
-                        </a:spcAft>
-                        <a:buClrTx/>
-                        <a:buSzTx/>
-                        <a:buFontTx/>
-                        <a:buNone/>
-                        <a:tabLst/>
-                        <a:defRPr/>
-                      </a:pPr>
-                      <a:r>
-                        <a:rPr lang="en-US" sz="1400" dirty="0">
-                          <a:solidFill>
-                            <a:schemeClr val="tx1"/>
-                          </a:solidFill>
-                        </a:rPr>
-                        <a:t>43 passed in 4.16s</a:t>
-                      </a:r>
+                      <a:pPr algn="ctr"/>
+                      <a:r>
+                        <a:rPr lang="en-US" sz="1400" dirty="0"/>
+                        <a:t>driver</a:t>
+                      </a:r>
+                    </a:p>
+                  </a:txBody>
+                  <a:tcPr marT="137160" marB="137160" anchor="ctr">
+                    <a:lnT w="12700" cap="flat" cmpd="sng" algn="ctr">
+                      <a:solidFill>
+                        <a:schemeClr val="tx1"/>
+                      </a:solidFill>
+                      <a:prstDash val="solid"/>
+                      <a:round/>
+                      <a:headEnd type="none" w="med" len="med"/>
+                      <a:tailEnd type="none" w="med" len="med"/>
+                    </a:lnT>
+                    <a:lnB w="12700" cap="flat" cmpd="sng" algn="ctr">
+                      <a:solidFill>
+                        <a:schemeClr val="tx1"/>
+                      </a:solidFill>
+                      <a:prstDash val="solid"/>
+                      <a:round/>
+                      <a:headEnd type="none" w="med" len="med"/>
+                      <a:tailEnd type="none" w="med" len="med"/>
+                    </a:lnB>
+                  </a:tcPr>
+                </a:tc>
+                <a:tc>
+                  <a:txBody>
+                    <a:bodyPr/>
+                    <a:lstStyle/>
+                    <a:p>
+                      <a:pPr algn="ctr"/>
+                      <a:r>
+                        <a:rPr lang="en-US" sz="1400" dirty="0"/>
+                        <a:t>statements</a:t>
+                      </a:r>
+                    </a:p>
+                    <a:p>
+                      <a:pPr algn="ctr"/>
+                      <a:r>
+                        <a:rPr lang="en-US" sz="1400" dirty="0"/>
+                        <a:t>missing</a:t>
+                      </a:r>
+                    </a:p>
+                    <a:p>
+                      <a:pPr algn="ctr"/>
+                      <a:r>
+                        <a:rPr lang="en-US" sz="1400" dirty="0"/>
+                        <a:t>excluded</a:t>
+                      </a:r>
+                    </a:p>
+                    <a:p>
+                      <a:pPr algn="ctr"/>
+                      <a:r>
+                        <a:rPr lang="en-US" sz="1400" dirty="0"/>
+                        <a:t>coverage</a:t>
+                      </a:r>
+                    </a:p>
+                  </a:txBody>
+                  <a:tcPr marT="137160" marB="137160" anchor="ctr">
+                    <a:lnT w="12700" cap="flat" cmpd="sng" algn="ctr">
+                      <a:solidFill>
+                        <a:schemeClr val="tx1"/>
+                      </a:solidFill>
+                      <a:prstDash val="solid"/>
+                      <a:round/>
+                      <a:headEnd type="none" w="med" len="med"/>
+                      <a:tailEnd type="none" w="med" len="med"/>
+                    </a:lnT>
+                    <a:lnB w="12700" cap="flat" cmpd="sng" algn="ctr">
+                      <a:solidFill>
+                        <a:schemeClr val="tx1"/>
+                      </a:solidFill>
+                      <a:prstDash val="solid"/>
+                      <a:round/>
+                      <a:headEnd type="none" w="med" len="med"/>
+                      <a:tailEnd type="none" w="med" len="med"/>
+                    </a:lnB>
+                  </a:tcPr>
+                </a:tc>
+                <a:tc>
+                  <a:txBody>
+                    <a:bodyPr/>
+                    <a:lstStyle/>
+                    <a:p>
+                      <a:pPr algn="ctr"/>
+                      <a:r>
+                        <a:rPr lang="en-US" sz="1400" dirty="0"/>
+                        <a:t>466</a:t>
+                      </a:r>
+                    </a:p>
+                    <a:p>
+                      <a:pPr algn="ctr"/>
+                      <a:r>
+                        <a:rPr lang="en-US" sz="1400" dirty="0"/>
+                        <a:t>0</a:t>
+                      </a:r>
+                    </a:p>
+                    <a:p>
+                      <a:pPr algn="ctr"/>
+                      <a:r>
+                        <a:rPr lang="en-US" sz="1400" dirty="0"/>
+                        <a:t>16</a:t>
+                      </a:r>
+                    </a:p>
+                    <a:p>
+                      <a:pPr algn="ctr"/>
+                      <a:r>
+                        <a:rPr lang="en-US" sz="1400" dirty="0"/>
+                        <a:t>100%</a:t>
+                      </a:r>
+                    </a:p>
+                  </a:txBody>
+                  <a:tcPr marT="137160" marB="137160" anchor="ctr">
+                    <a:lnT w="12700" cap="flat" cmpd="sng" algn="ctr">
+                      <a:solidFill>
+                        <a:schemeClr val="tx1"/>
+                      </a:solidFill>
+                      <a:prstDash val="solid"/>
+                      <a:round/>
+                      <a:headEnd type="none" w="med" len="med"/>
+                      <a:tailEnd type="none" w="med" len="med"/>
+                    </a:lnT>
+                    <a:lnB w="12700" cap="flat" cmpd="sng" algn="ctr">
+                      <a:solidFill>
+                        <a:schemeClr val="tx1"/>
+                      </a:solidFill>
+                      <a:prstDash val="solid"/>
+                      <a:round/>
+                      <a:headEnd type="none" w="med" len="med"/>
+                      <a:tailEnd type="none" w="med" len="med"/>
+                    </a:lnB>
+                  </a:tcPr>
+                </a:tc>
+                <a:extLst>
+                  <a:ext uri="{0D108BD9-81ED-4DB2-BD59-A6C34878D82A}">
+                    <a16:rowId xmlns:a16="http://schemas.microsoft.com/office/drawing/2014/main" val="770493721"/>
+                  </a:ext>
+                </a:extLst>
+              </a:tr>
+              <a:tr h="1104681">
+                <a:tc vMerge="1">
+                  <a:txBody>
+                    <a:bodyPr/>
+                    <a:lstStyle/>
+                    <a:p>
+                      <a:pPr algn="just"/>
                       <a:endParaRPr lang="en-US" sz="1400" dirty="0"/>
                     </a:p>
                   </a:txBody>
@@ -7629,32 +9052,13 @@
                     </a:lnB>
                   </a:tcPr>
                 </a:tc>
-                <a:tc>
-                  <a:txBody>
-                    <a:bodyPr/>
-                    <a:lstStyle/>
-                    <a:p>
-                      <a:pPr marL="0" marR="0" lvl="0" indent="0" algn="ctr" defTabSz="914400" rtl="0" eaLnBrk="1" fontAlgn="auto" latinLnBrk="0" hangingPunct="1">
-                        <a:lnSpc>
-                          <a:spcPct val="100000"/>
-                        </a:lnSpc>
-                        <a:spcBef>
-                          <a:spcPts val="0"/>
-                        </a:spcBef>
-                        <a:spcAft>
-                          <a:spcPts val="0"/>
-                        </a:spcAft>
-                        <a:buClrTx/>
-                        <a:buSzTx/>
-                        <a:buFontTx/>
-                        <a:buNone/>
-                        <a:tabLst/>
-                        <a:defRPr/>
-                      </a:pPr>
-                      <a:r>
-                        <a:rPr lang="en-US" sz="1400" dirty="0"/>
-                        <a:t>0.0131s</a:t>
-                      </a:r>
+                <a:tc vMerge="1">
+                  <a:txBody>
+                    <a:bodyPr/>
+                    <a:lstStyle/>
+                    <a:p>
+                      <a:pPr algn="just"/>
+                      <a:endParaRPr lang="en-US" sz="1400" dirty="0"/>
                     </a:p>
                   </a:txBody>
                   <a:tcPr marL="137160" marR="137160" marT="137160" marB="137160" anchor="ctr">
@@ -7678,22 +9082,39 @@
                     </a:lnB>
                   </a:tcPr>
                 </a:tc>
-                <a:extLst>
-                  <a:ext uri="{0D108BD9-81ED-4DB2-BD59-A6C34878D82A}">
-                    <a16:rowId xmlns:a16="http://schemas.microsoft.com/office/drawing/2014/main" val="1825471136"/>
-                  </a:ext>
-                </a:extLst>
-              </a:tr>
-              <a:tr h="871903">
-                <a:tc vMerge="1">
-                  <a:txBody>
-                    <a:bodyPr/>
-                    <a:lstStyle/>
-                    <a:p>
-                      <a:endParaRPr dirty="0"/>
-                    </a:p>
-                  </a:txBody>
-                  <a:tcPr marL="137160" marR="137160" marT="137160" marB="137160" anchor="ctr">
+                <a:tc>
+                  <a:txBody>
+                    <a:bodyPr/>
+                    <a:lstStyle/>
+                    <a:p>
+                      <a:pPr marL="0" marR="0" lvl="0" indent="0" algn="ctr" defTabSz="914400" rtl="0" eaLnBrk="1" fontAlgn="auto" latinLnBrk="0" hangingPunct="1">
+                        <a:lnSpc>
+                          <a:spcPct val="100000"/>
+                        </a:lnSpc>
+                        <a:spcBef>
+                          <a:spcPts val="0"/>
+                        </a:spcBef>
+                        <a:spcAft>
+                          <a:spcPts val="0"/>
+                        </a:spcAft>
+                        <a:buClrTx/>
+                        <a:buSzTx/>
+                        <a:buFontTx/>
+                        <a:buNone/>
+                        <a:tabLst/>
+                        <a:defRPr/>
+                      </a:pPr>
+                      <a:r>
+                        <a:rPr lang="en-US" sz="1400" dirty="0"/>
+                        <a:t>module</a:t>
+                      </a:r>
+                    </a:p>
+                    <a:p>
+                      <a:pPr algn="ctr"/>
+                      <a:endParaRPr lang="en-US" sz="1400" dirty="0"/>
+                    </a:p>
+                  </a:txBody>
+                  <a:tcPr marT="137160" marB="137160" anchor="ctr">
                     <a:lnT w="12700" cap="flat" cmpd="sng" algn="ctr">
                       <a:solidFill>
                         <a:schemeClr val="tx1"/>
@@ -7722,11 +9143,32 @@
                       <a:pPr algn="ctr"/>
                       <a:r>
                         <a:rPr lang="en-US" sz="1400" dirty="0"/>
-                        <a:t>"-m slow"</a:t>
-                      </a:r>
-                    </a:p>
-                  </a:txBody>
-                  <a:tcPr marL="137160" marR="137160" marT="137160" marB="137160" anchor="ctr">
+                        <a:t>statements</a:t>
+                      </a:r>
+                    </a:p>
+                    <a:p>
+                      <a:pPr algn="ctr"/>
+                      <a:r>
+                        <a:rPr lang="en-US" sz="1400" dirty="0"/>
+                        <a:t>missing</a:t>
+                      </a:r>
+                    </a:p>
+                    <a:p>
+                      <a:pPr algn="ctr"/>
+                      <a:r>
+                        <a:rPr lang="en-US" sz="1400" dirty="0"/>
+                        <a:t>excluded</a:t>
+                      </a:r>
+                    </a:p>
+                    <a:p>
+                      <a:pPr algn="ctr"/>
+                      <a:r>
+                        <a:rPr lang="en-US" sz="1400" dirty="0"/>
+                        <a:t>coverage</a:t>
+                      </a:r>
+                    </a:p>
+                  </a:txBody>
+                  <a:tcPr marT="137160" marB="137160" anchor="ctr">
                     <a:lnT w="12700" cap="flat" cmpd="sng" algn="ctr">
                       <a:solidFill>
                         <a:schemeClr val="tx1"/>
@@ -7752,88 +9194,35 @@
                     <a:bodyPr/>
                     <a:lstStyle/>
                     <a:p>
-                      <a:pPr marL="0" marR="0" lvl="0" indent="0" algn="ctr" defTabSz="914400" rtl="0" eaLnBrk="1" fontAlgn="auto" latinLnBrk="0" hangingPunct="1">
-                        <a:lnSpc>
-                          <a:spcPct val="100000"/>
-                        </a:lnSpc>
-                        <a:spcBef>
-                          <a:spcPts val="0"/>
-                        </a:spcBef>
-                        <a:spcAft>
-                          <a:spcPts val="0"/>
-                        </a:spcAft>
-                        <a:buClrTx/>
-                        <a:buSzTx/>
-                        <a:buFontTx/>
-                        <a:buNone/>
-                        <a:tabLst/>
-                        <a:defRPr/>
-                      </a:pPr>
-                      <a:r>
-                        <a:rPr lang="en-US" sz="1400" dirty="0">
-                          <a:solidFill>
-                            <a:schemeClr val="tx1"/>
-                          </a:solidFill>
-                        </a:rPr>
-                        <a:t>module</a:t>
-                      </a:r>
-                    </a:p>
-                    <a:p>
-                      <a:pPr marL="0" marR="0" lvl="0" indent="0" algn="ctr" defTabSz="914400" rtl="0" eaLnBrk="1" fontAlgn="auto" latinLnBrk="0" hangingPunct="1">
-                        <a:lnSpc>
-                          <a:spcPct val="100000"/>
-                        </a:lnSpc>
-                        <a:spcBef>
-                          <a:spcPts val="0"/>
-                        </a:spcBef>
-                        <a:spcAft>
-                          <a:spcPts val="0"/>
-                        </a:spcAft>
-                        <a:buClrTx/>
-                        <a:buSzTx/>
-                        <a:buFontTx/>
-                        <a:buNone/>
-                        <a:tabLst/>
-                        <a:defRPr/>
-                      </a:pPr>
-                      <a:r>
-                        <a:rPr lang="en-US" sz="1400" dirty="0">
-                          <a:solidFill>
-                            <a:schemeClr val="tx1"/>
-                          </a:solidFill>
-                        </a:rPr>
-                        <a:t>driver</a:t>
-                      </a:r>
-                    </a:p>
-                    <a:p>
-                      <a:pPr marL="0" marR="0" lvl="0" indent="0" algn="ctr" defTabSz="914400" rtl="0" eaLnBrk="1" fontAlgn="auto" latinLnBrk="0" hangingPunct="1">
-                        <a:lnSpc>
-                          <a:spcPct val="100000"/>
-                        </a:lnSpc>
-                        <a:spcBef>
-                          <a:spcPts val="0"/>
-                        </a:spcBef>
-                        <a:spcAft>
-                          <a:spcPts val="0"/>
-                        </a:spcAft>
-                        <a:buClrTx/>
-                        <a:buSzTx/>
-                        <a:buFontTx/>
-                        <a:buNone/>
-                        <a:tabLst/>
-                        <a:defRPr/>
-                      </a:pPr>
-                      <a:r>
-                        <a:rPr lang="en-US" sz="1400" dirty="0">
-                          <a:solidFill>
-                            <a:schemeClr val="tx1"/>
-                          </a:solidFill>
-                        </a:rPr>
-                        <a:t>workflow</a:t>
-                      </a:r>
-                    </a:p>
-                  </a:txBody>
-                  <a:tcPr marL="137160" marR="137160" marT="137160" marB="137160" anchor="ctr">
+                      <a:pPr algn="ctr"/>
+                      <a:r>
+                        <a:rPr lang="en-US" sz="1400" dirty="0"/>
+                        <a:t>6088</a:t>
+                      </a:r>
+                    </a:p>
+                    <a:p>
+                      <a:pPr algn="ctr"/>
+                      <a:r>
+                        <a:rPr lang="en-US" sz="1400" dirty="0"/>
+                        <a:t>0</a:t>
+                      </a:r>
+                    </a:p>
+                    <a:p>
+                      <a:pPr algn="ctr"/>
+                      <a:r>
+                        <a:rPr lang="en-US" sz="1400" dirty="0"/>
+                        <a:t>164</a:t>
+                      </a:r>
+                    </a:p>
+                    <a:p>
+                      <a:pPr algn="ctr"/>
+                      <a:r>
+                        <a:rPr lang="en-US" sz="1400" dirty="0"/>
+                        <a:t>100%</a:t>
+                      </a:r>
+                    </a:p>
+                  </a:txBody>
+                  <a:tcPr marT="137160" marB="137160" anchor="ctr">
                     <a:lnT w="12700" cap="flat" cmpd="sng" algn="ctr">
                       <a:solidFill>
                         <a:schemeClr val="tx1"/>
@@ -7854,169 +9243,9 @@
                     </a:lnB>
                   </a:tcPr>
                 </a:tc>
-                <a:tc>
-                  <a:txBody>
-                    <a:bodyPr/>
-                    <a:lstStyle/>
-                    <a:p>
-                      <a:pPr marL="0" marR="0" lvl="0" indent="0" algn="ctr" defTabSz="914400" rtl="0" eaLnBrk="1" fontAlgn="auto" latinLnBrk="0" hangingPunct="1">
-                        <a:lnSpc>
-                          <a:spcPct val="100000"/>
-                        </a:lnSpc>
-                        <a:spcBef>
-                          <a:spcPts val="0"/>
-                        </a:spcBef>
-                        <a:spcAft>
-                          <a:spcPts val="0"/>
-                        </a:spcAft>
-                        <a:buClrTx/>
-                        <a:buSzTx/>
-                        <a:buFontTx/>
-                        <a:buNone/>
-                        <a:tabLst/>
-                        <a:defRPr/>
-                      </a:pPr>
-                      <a:r>
-                        <a:rPr lang="en-US" sz="1400" dirty="0">
-                          <a:solidFill>
-                            <a:schemeClr val="tx1"/>
-                          </a:solidFill>
-                        </a:rPr>
-                        <a:t>1 passed in 20.97s</a:t>
-                      </a:r>
-                    </a:p>
-                    <a:p>
-                      <a:pPr marL="0" marR="0" lvl="0" indent="0" algn="ctr" defTabSz="914400" rtl="0" eaLnBrk="1" fontAlgn="auto" latinLnBrk="0" hangingPunct="1">
-                        <a:lnSpc>
-                          <a:spcPct val="100000"/>
-                        </a:lnSpc>
-                        <a:spcBef>
-                          <a:spcPts val="0"/>
-                        </a:spcBef>
-                        <a:spcAft>
-                          <a:spcPts val="0"/>
-                        </a:spcAft>
-                        <a:buClrTx/>
-                        <a:buSzTx/>
-                        <a:buFontTx/>
-                        <a:buNone/>
-                        <a:tabLst/>
-                        <a:defRPr/>
-                      </a:pPr>
-                      <a:r>
-                        <a:rPr lang="en-US" sz="1400" dirty="0">
-                          <a:solidFill>
-                            <a:schemeClr val="tx1"/>
-                          </a:solidFill>
-                        </a:rPr>
-                        <a:t>1 passed in 3.98s</a:t>
-                      </a:r>
-                    </a:p>
-                    <a:p>
-                      <a:pPr marL="0" marR="0" lvl="0" indent="0" algn="ctr" defTabSz="914400" rtl="0" eaLnBrk="1" fontAlgn="auto" latinLnBrk="0" hangingPunct="1">
-                        <a:lnSpc>
-                          <a:spcPct val="100000"/>
-                        </a:lnSpc>
-                        <a:spcBef>
-                          <a:spcPts val="0"/>
-                        </a:spcBef>
-                        <a:spcAft>
-                          <a:spcPts val="0"/>
-                        </a:spcAft>
-                        <a:buClrTx/>
-                        <a:buSzTx/>
-                        <a:buFontTx/>
-                        <a:buNone/>
-                        <a:tabLst/>
-                        <a:defRPr/>
-                      </a:pPr>
-                      <a:r>
-                        <a:rPr lang="en-US" sz="1400" dirty="0">
-                          <a:solidFill>
-                            <a:schemeClr val="tx1"/>
-                          </a:solidFill>
-                        </a:rPr>
-                        <a:t>no tests ran in 2.03s</a:t>
-                      </a:r>
-                    </a:p>
-                  </a:txBody>
-                  <a:tcPr marL="137160" marR="137160" marT="137160" marB="137160" anchor="ctr">
-                    <a:lnT w="12700" cap="flat" cmpd="sng" algn="ctr">
-                      <a:solidFill>
-                        <a:schemeClr val="tx1"/>
-                      </a:solidFill>
-                      <a:prstDash val="solid"/>
-                      <a:round/>
-                      <a:headEnd type="none" w="med" len="med"/>
-                      <a:tailEnd type="none" w="med" len="med"/>
-                    </a:lnT>
-                    <a:lnB w="12700" cap="flat" cmpd="sng" algn="ctr">
-                      <a:solidFill>
-                        <a:schemeClr val="tx1"/>
-                      </a:solidFill>
-                      <a:prstDash val="solid"/>
-                      <a:round/>
-                      <a:headEnd type="none" w="med" len="med"/>
-                      <a:tailEnd type="none" w="med" len="med"/>
-                    </a:lnB>
-                  </a:tcPr>
-                </a:tc>
-                <a:tc>
-                  <a:txBody>
-                    <a:bodyPr/>
-                    <a:lstStyle/>
-                    <a:p>
-                      <a:pPr marL="0" marR="0" lvl="0" indent="0" algn="ctr" defTabSz="914400" rtl="0" eaLnBrk="1" fontAlgn="auto" latinLnBrk="0" hangingPunct="1">
-                        <a:lnSpc>
-                          <a:spcPct val="100000"/>
-                        </a:lnSpc>
-                        <a:spcBef>
-                          <a:spcPts val="0"/>
-                        </a:spcBef>
-                        <a:spcAft>
-                          <a:spcPts val="0"/>
-                        </a:spcAft>
-                        <a:buClrTx/>
-                        <a:buSzTx/>
-                        <a:buFontTx/>
-                        <a:buNone/>
-                        <a:tabLst/>
-                        <a:defRPr/>
-                      </a:pPr>
-                      <a:r>
-                        <a:rPr lang="en-US" sz="1400" dirty="0">
-                          <a:solidFill>
-                            <a:schemeClr val="tx1"/>
-                          </a:solidFill>
-                        </a:rPr>
-                        <a:t>13.49s</a:t>
-                      </a:r>
-                    </a:p>
-                  </a:txBody>
-                  <a:tcPr marL="137160" marR="137160" marT="137160" marB="137160" anchor="ctr">
-                    <a:lnT w="12700" cap="flat" cmpd="sng" algn="ctr">
-                      <a:solidFill>
-                        <a:schemeClr val="tx1"/>
-                      </a:solidFill>
-                      <a:prstDash val="solid"/>
-                      <a:round/>
-                      <a:headEnd type="none" w="med" len="med"/>
-                      <a:tailEnd type="none" w="med" len="med"/>
-                    </a:lnT>
-                    <a:lnB w="12700" cap="flat" cmpd="sng" algn="ctr">
-                      <a:solidFill>
-                        <a:schemeClr val="tx1"/>
-                      </a:solidFill>
-                      <a:prstDash val="solid"/>
-                      <a:round/>
-                      <a:headEnd type="none" w="med" len="med"/>
-                      <a:tailEnd type="none" w="med" len="med"/>
-                    </a:lnB>
-                  </a:tcPr>
-                </a:tc>
                 <a:extLst>
                   <a:ext uri="{0D108BD9-81ED-4DB2-BD59-A6C34878D82A}">
-                    <a16:rowId xmlns:a16="http://schemas.microsoft.com/office/drawing/2014/main" val="1370259124"/>
+                    <a16:rowId xmlns:a16="http://schemas.microsoft.com/office/drawing/2014/main" val="3949559036"/>
                   </a:ext>
                 </a:extLst>
               </a:tr>
@@ -8026,39 +9255,10 @@
       </p:graphicFrame>
       <p:sp>
         <p:nvSpPr>
-          <p:cNvPr id="3" name="Slide Number Placeholder 2">
+          <p:cNvPr id="13" name="TextBox 12">
             <a:extLst>
               <a:ext uri="{FF2B5EF4-FFF2-40B4-BE49-F238E27FC236}">
-                <a16:creationId xmlns:a16="http://schemas.microsoft.com/office/drawing/2014/main" id="{93005D0D-F223-1F94-65FC-E62DB7B920D8}"/>
-              </a:ext>
-            </a:extLst>
-          </p:cNvPr>
-          <p:cNvSpPr>
-            <a:spLocks noGrp="1"/>
-          </p:cNvSpPr>
-          <p:nvPr>
-            <p:ph type="sldNum" sz="quarter" idx="12"/>
-          </p:nvPr>
-        </p:nvSpPr>
-        <p:spPr/>
-        <p:txBody>
-          <a:bodyPr/>
-          <a:lstStyle/>
-          <a:p>
-            <a:fld id="{CF79FC58-3559-EC47-B32E-5EF128B06581}" type="slidenum">
-              <a:rPr lang="en-US" smtClean="0"/>
-              <a:t>10</a:t>
-            </a:fld>
-            <a:endParaRPr lang="en-US"/>
-          </a:p>
-        </p:txBody>
-      </p:sp>
-      <p:sp>
-        <p:nvSpPr>
-          <p:cNvPr id="6" name="TextBox 5">
-            <a:extLst>
-              <a:ext uri="{FF2B5EF4-FFF2-40B4-BE49-F238E27FC236}">
-                <a16:creationId xmlns:a16="http://schemas.microsoft.com/office/drawing/2014/main" id="{81139EAB-FAE4-FB7B-AED3-4DD3FAC9C920}"/>
+                <a16:creationId xmlns:a16="http://schemas.microsoft.com/office/drawing/2014/main" id="{D44CE8A1-94B7-AA2F-211C-76BBBE531409}"/>
               </a:ext>
             </a:extLst>
           </p:cNvPr>
@@ -8067,8 +9267,8 @@
         </p:nvSpPr>
         <p:spPr>
           <a:xfrm>
-            <a:off x="4470010" y="6457528"/>
-            <a:ext cx="6097064" cy="307777"/>
+            <a:off x="361233" y="1679020"/>
+            <a:ext cx="5586486" cy="369332"/>
           </a:xfrm>
           <a:prstGeom prst="rect">
             <a:avLst/>
@@ -8081,7 +9281,7 @@
           </a:bodyPr>
           <a:lstStyle/>
           <a:p>
-            <a:pPr marL="0" marR="0" lvl="0" indent="0" algn="just" defTabSz="914400" rtl="0" eaLnBrk="1" fontAlgn="auto" latinLnBrk="0" hangingPunct="1">
+            <a:pPr marL="0" marR="0" lvl="0" indent="0" algn="ctr" defTabSz="914400" rtl="0" eaLnBrk="1" fontAlgn="auto" latinLnBrk="0" hangingPunct="1">
               <a:lnSpc>
                 <a:spcPct val="100000"/>
               </a:lnSpc>
@@ -8099,26 +9299,30 @@
               <a:defRPr/>
             </a:pPr>
             <a:r>
-              <a:rPr lang="en-US" sz="1400" i="1" dirty="0"/>
-              <a:t>* source </a:t>
-            </a:r>
-            <a:r>
-              <a:rPr lang="en-US" sz="1400" i="1" dirty="0" err="1"/>
-              <a:t>premake</a:t>
-            </a:r>
-            <a:r>
-              <a:rPr lang="en-US" sz="1400" dirty="0"/>
-              <a:t> before running tests</a:t>
-            </a:r>
+              <a:rPr lang="en-US" sz="1800" kern="1200" dirty="0">
+                <a:solidFill>
+                  <a:schemeClr val="tx1"/>
+                </a:solidFill>
+                <a:effectLst/>
+                <a:latin typeface="+mn-lt"/>
+                <a:ea typeface="+mn-ea"/>
+                <a:cs typeface="+mn-cs"/>
+              </a:rPr>
+              <a:t>Run unit tests</a:t>
+            </a:r>
+            <a:endParaRPr lang="en-US" sz="1800" dirty="0">
+              <a:latin typeface="Times New Roman" panose="02020603050405020304" pitchFamily="18" charset="0"/>
+              <a:cs typeface="Times New Roman" panose="02020603050405020304" pitchFamily="18" charset="0"/>
+            </a:endParaRPr>
           </a:p>
         </p:txBody>
       </p:sp>
       <p:graphicFrame>
         <p:nvGraphicFramePr>
-          <p:cNvPr id="7" name="Table 6">
+          <p:cNvPr id="14" name="Table 13">
             <a:extLst>
               <a:ext uri="{FF2B5EF4-FFF2-40B4-BE49-F238E27FC236}">
-                <a16:creationId xmlns:a16="http://schemas.microsoft.com/office/drawing/2014/main" id="{27D5B4CE-5718-2280-528F-82EBFA159824}"/>
+                <a16:creationId xmlns:a16="http://schemas.microsoft.com/office/drawing/2014/main" id="{BDDD0116-5DFF-79FB-A652-1E32A9A868E4}"/>
               </a:ext>
             </a:extLst>
           </p:cNvPr>
@@ -8128,85 +9332,86 @@
           <p:nvPr>
             <p:extLst>
               <p:ext uri="{D42A27DB-BD31-4B8C-83A1-F6EECF244321}">
-                <p14:modId xmlns:p14="http://schemas.microsoft.com/office/powerpoint/2010/main" val="2024640112"/>
+                <p14:modId xmlns:p14="http://schemas.microsoft.com/office/powerpoint/2010/main" val="3837193985"/>
               </p:ext>
             </p:extLst>
           </p:nvPr>
         </p:nvGraphicFramePr>
         <p:xfrm>
-          <a:off x="4470010" y="2586568"/>
-          <a:ext cx="6598228" cy="3870960"/>
+          <a:off x="287092" y="2284237"/>
+          <a:ext cx="5734767" cy="1280160"/>
         </p:xfrm>
         <a:graphic>
           <a:graphicData uri="http://schemas.openxmlformats.org/drawingml/2006/table">
             <a:tbl>
               <a:tblPr firstRow="1" bandRow="1">
-                <a:tableStyleId>{2D5ABB26-0587-4C30-8999-92F81FD0307C}</a:tableStyleId>
+                <a:tableStyleId>{5940675A-B579-460E-94D1-54222C63F5DA}</a:tableStyleId>
               </a:tblPr>
               <a:tblGrid>
-                <a:gridCol w="1215743">
+                <a:gridCol w="2546724">
                   <a:extLst>
                     <a:ext uri="{9D8B030D-6E8A-4147-A177-3AD203B41FA5}">
-                      <a16:colId xmlns:a16="http://schemas.microsoft.com/office/drawing/2014/main" val="519871301"/>
+                      <a16:colId xmlns:a16="http://schemas.microsoft.com/office/drawing/2014/main" val="2111335203"/>
                     </a:ext>
                   </a:extLst>
                 </a:gridCol>
-                <a:gridCol w="1370936">
+                <a:gridCol w="3188043">
                   <a:extLst>
                     <a:ext uri="{9D8B030D-6E8A-4147-A177-3AD203B41FA5}">
-                      <a16:colId xmlns:a16="http://schemas.microsoft.com/office/drawing/2014/main" val="3084682247"/>
-                    </a:ext>
-                  </a:extLst>
-                </a:gridCol>
-                <a:gridCol w="1082729">
-                  <a:extLst>
-                    <a:ext uri="{9D8B030D-6E8A-4147-A177-3AD203B41FA5}">
-                      <a16:colId xmlns:a16="http://schemas.microsoft.com/office/drawing/2014/main" val="2730536322"/>
-                    </a:ext>
-                  </a:extLst>
-                </a:gridCol>
-                <a:gridCol w="1553044">
-                  <a:extLst>
-                    <a:ext uri="{9D8B030D-6E8A-4147-A177-3AD203B41FA5}">
-                      <a16:colId xmlns:a16="http://schemas.microsoft.com/office/drawing/2014/main" val="3113920103"/>
-                    </a:ext>
-                  </a:extLst>
-                </a:gridCol>
-                <a:gridCol w="1375776">
-                  <a:extLst>
-                    <a:ext uri="{9D8B030D-6E8A-4147-A177-3AD203B41FA5}">
-                      <a16:colId xmlns:a16="http://schemas.microsoft.com/office/drawing/2014/main" val="1319148285"/>
+                      <a16:colId xmlns:a16="http://schemas.microsoft.com/office/drawing/2014/main" val="2492083346"/>
                     </a:ext>
                   </a:extLst>
                 </a:gridCol>
               </a:tblGrid>
-              <a:tr h="482252">
-                <a:tc>
-                  <a:txBody>
-                    <a:bodyPr/>
-                    <a:lstStyle/>
-                    <a:p>
-                      <a:pPr algn="ctr"/>
-                      <a:r>
-                        <a:rPr lang="en-US" sz="1400" dirty="0"/>
-                        <a:t>Command</a:t>
-                      </a:r>
-                    </a:p>
-                  </a:txBody>
-                  <a:tcPr marL="137160" marR="137160" marT="137160" marB="137160" anchor="ctr">
+              <a:tr h="320040">
+                <a:tc>
+                  <a:txBody>
+                    <a:bodyPr/>
+                    <a:lstStyle/>
+                    <a:p>
+                      <a:pPr algn="l"/>
+                      <a:r>
+                        <a:rPr lang="en-US" sz="1400" i="1" kern="1200" dirty="0" err="1">
+                          <a:solidFill>
+                            <a:schemeClr val="tx1"/>
+                          </a:solidFill>
+                        </a:rPr>
+                        <a:t>nemd_test</a:t>
+                      </a:r>
+                      <a:endParaRPr lang="en-US" sz="1400" i="1" kern="1200" dirty="0">
+                        <a:solidFill>
+                          <a:schemeClr val="tx1"/>
+                        </a:solidFill>
+                        <a:latin typeface="Times New Roman" panose="02020603050405020304" pitchFamily="18" charset="0"/>
+                        <a:ea typeface="+mn-ea"/>
+                        <a:cs typeface="Times New Roman" panose="02020603050405020304" pitchFamily="18" charset="0"/>
+                      </a:endParaRPr>
+                    </a:p>
+                  </a:txBody>
+                  <a:tcPr>
+                    <a:lnL w="12700" cap="flat" cmpd="sng" algn="ctr">
+                      <a:noFill/>
+                      <a:prstDash val="solid"/>
+                      <a:round/>
+                      <a:headEnd type="none" w="med" len="med"/>
+                      <a:tailEnd type="none" w="med" len="med"/>
+                    </a:lnL>
+                    <a:lnR w="12700" cap="flat" cmpd="sng" algn="ctr">
+                      <a:noFill/>
+                      <a:prstDash val="solid"/>
+                      <a:round/>
+                      <a:headEnd type="none" w="med" len="med"/>
+                      <a:tailEnd type="none" w="med" len="med"/>
+                    </a:lnR>
                     <a:lnT w="12700" cap="flat" cmpd="sng" algn="ctr">
-                      <a:solidFill>
-                        <a:schemeClr val="tx1"/>
-                      </a:solidFill>
+                      <a:noFill/>
                       <a:prstDash val="solid"/>
                       <a:round/>
                       <a:headEnd type="none" w="med" len="med"/>
                       <a:tailEnd type="none" w="med" len="med"/>
                     </a:lnT>
                     <a:lnB w="12700" cap="flat" cmpd="sng" algn="ctr">
-                      <a:solidFill>
-                        <a:schemeClr val="tx1"/>
-                      </a:solidFill>
+                      <a:noFill/>
                       <a:prstDash val="solid"/>
                       <a:round/>
                       <a:headEnd type="none" w="med" len="med"/>
@@ -8219,27 +9424,49 @@
                     <a:bodyPr/>
                     <a:lstStyle/>
                     <a:p>
-                      <a:pPr algn="ctr"/>
-                      <a:r>
-                        <a:rPr lang="en-US" sz="1400" dirty="0"/>
-                        <a:t>PYTEST</a:t>
-                      </a:r>
-                    </a:p>
-                  </a:txBody>
-                  <a:tcPr marL="137160" marR="137160" marT="137160" marB="137160" anchor="ctr">
+                      <a:pPr algn="l"/>
+                      <a:r>
+                        <a:rPr lang="en-US" sz="1400" kern="1200" dirty="0">
+                          <a:solidFill>
+                            <a:schemeClr val="tx1"/>
+                          </a:solidFill>
+                        </a:rPr>
+                        <a:t>$NEMD_SRC/test/unit in parallel</a:t>
+                      </a:r>
+                      <a:endParaRPr lang="en-US" sz="1400" kern="1200" dirty="0">
+                        <a:solidFill>
+                          <a:schemeClr val="tx1"/>
+                        </a:solidFill>
+                        <a:latin typeface="Times New Roman" panose="02020603050405020304" pitchFamily="18" charset="0"/>
+                        <a:ea typeface="+mn-ea"/>
+                        <a:cs typeface="Times New Roman" panose="02020603050405020304" pitchFamily="18" charset="0"/>
+                      </a:endParaRPr>
+                    </a:p>
+                  </a:txBody>
+                  <a:tcPr>
+                    <a:lnL w="12700" cap="flat" cmpd="sng" algn="ctr">
+                      <a:noFill/>
+                      <a:prstDash val="solid"/>
+                      <a:round/>
+                      <a:headEnd type="none" w="med" len="med"/>
+                      <a:tailEnd type="none" w="med" len="med"/>
+                    </a:lnL>
+                    <a:lnR w="12700" cap="flat" cmpd="sng" algn="ctr">
+                      <a:noFill/>
+                      <a:prstDash val="solid"/>
+                      <a:round/>
+                      <a:headEnd type="none" w="med" len="med"/>
+                      <a:tailEnd type="none" w="med" len="med"/>
+                    </a:lnR>
                     <a:lnT w="12700" cap="flat" cmpd="sng" algn="ctr">
-                      <a:solidFill>
-                        <a:schemeClr val="tx1"/>
-                      </a:solidFill>
+                      <a:noFill/>
                       <a:prstDash val="solid"/>
                       <a:round/>
                       <a:headEnd type="none" w="med" len="med"/>
                       <a:tailEnd type="none" w="med" len="med"/>
                     </a:lnT>
                     <a:lnB w="12700" cap="flat" cmpd="sng" algn="ctr">
-                      <a:solidFill>
-                        <a:schemeClr val="tx1"/>
-                      </a:solidFill>
+                      <a:noFill/>
                       <a:prstDash val="solid"/>
                       <a:round/>
                       <a:headEnd type="none" w="med" len="med"/>
@@ -8247,57 +9474,69 @@
                     </a:lnB>
                   </a:tcPr>
                 </a:tc>
-                <a:tc>
-                  <a:txBody>
-                    <a:bodyPr/>
-                    <a:lstStyle/>
-                    <a:p>
-                      <a:pPr marL="0" marR="0" lvl="0" indent="0" algn="ctr" defTabSz="914400" rtl="0" eaLnBrk="1" fontAlgn="auto" latinLnBrk="0" hangingPunct="1">
-                        <a:lnSpc>
-                          <a:spcPct val="100000"/>
-                        </a:lnSpc>
-                        <a:spcBef>
-                          <a:spcPts val="0"/>
-                        </a:spcBef>
-                        <a:spcAft>
-                          <a:spcPts val="0"/>
-                        </a:spcAft>
-                        <a:buClrTx/>
-                        <a:buSzTx/>
-                        <a:buFontTx/>
-                        <a:buNone/>
-                        <a:tabLst/>
-                        <a:defRPr/>
-                      </a:pPr>
-                      <a:r>
-                        <a:rPr lang="en-US" sz="1400" dirty="0" err="1">
+                <a:extLst>
+                  <a:ext uri="{0D108BD9-81ED-4DB2-BD59-A6C34878D82A}">
+                    <a16:rowId xmlns:a16="http://schemas.microsoft.com/office/drawing/2014/main" val="1729835030"/>
+                  </a:ext>
+                </a:extLst>
+              </a:tr>
+              <a:tr h="320040">
+                <a:tc>
+                  <a:txBody>
+                    <a:bodyPr/>
+                    <a:lstStyle/>
+                    <a:p>
+                      <a:pPr algn="l"/>
+                      <a:r>
+                        <a:rPr lang="en-US" sz="1400" i="1" kern="1200" dirty="0" err="1">
                           <a:solidFill>
                             <a:schemeClr val="tx1"/>
                           </a:solidFill>
                         </a:rPr>
-                        <a:t>Dirname</a:t>
-                      </a:r>
-                      <a:endParaRPr lang="en-US" sz="1400" dirty="0">
+                        <a:t>nemd_test</a:t>
+                      </a:r>
+                      <a:r>
+                        <a:rPr lang="en-US" sz="1400" i="1" kern="1200" dirty="0">
+                          <a:solidFill>
+                            <a:schemeClr val="tx1"/>
+                          </a:solidFill>
+                        </a:rPr>
+                        <a:t> [file1 file2...]</a:t>
+                      </a:r>
+                      <a:endParaRPr lang="en-US" sz="1400" i="1" kern="1200" dirty="0">
                         <a:solidFill>
                           <a:schemeClr val="tx1"/>
                         </a:solidFill>
+                        <a:latin typeface="Times New Roman" panose="02020603050405020304" pitchFamily="18" charset="0"/>
+                        <a:ea typeface="+mn-ea"/>
+                        <a:cs typeface="Times New Roman" panose="02020603050405020304" pitchFamily="18" charset="0"/>
                       </a:endParaRPr>
                     </a:p>
                   </a:txBody>
-                  <a:tcPr marL="137160" marR="137160" marT="137160" marB="137160" anchor="ctr">
+                  <a:tcPr>
+                    <a:lnL w="12700" cap="flat" cmpd="sng" algn="ctr">
+                      <a:noFill/>
+                      <a:prstDash val="solid"/>
+                      <a:round/>
+                      <a:headEnd type="none" w="med" len="med"/>
+                      <a:tailEnd type="none" w="med" len="med"/>
+                    </a:lnL>
+                    <a:lnR w="12700" cap="flat" cmpd="sng" algn="ctr">
+                      <a:noFill/>
+                      <a:prstDash val="solid"/>
+                      <a:round/>
+                      <a:headEnd type="none" w="med" len="med"/>
+                      <a:tailEnd type="none" w="med" len="med"/>
+                    </a:lnR>
                     <a:lnT w="12700" cap="flat" cmpd="sng" algn="ctr">
-                      <a:solidFill>
-                        <a:schemeClr val="tx1"/>
-                      </a:solidFill>
+                      <a:noFill/>
                       <a:prstDash val="solid"/>
                       <a:round/>
                       <a:headEnd type="none" w="med" len="med"/>
                       <a:tailEnd type="none" w="med" len="med"/>
                     </a:lnT>
                     <a:lnB w="12700" cap="flat" cmpd="sng" algn="ctr">
-                      <a:solidFill>
-                        <a:schemeClr val="tx1"/>
-                      </a:solidFill>
+                      <a:noFill/>
                       <a:prstDash val="solid"/>
                       <a:round/>
                       <a:headEnd type="none" w="med" len="med"/>
@@ -8310,47 +9549,58 @@
                     <a:bodyPr/>
                     <a:lstStyle/>
                     <a:p>
-                      <a:pPr marL="0" marR="0" lvl="0" indent="0" algn="ctr" defTabSz="914400" rtl="0" eaLnBrk="1" fontAlgn="auto" latinLnBrk="0" hangingPunct="1">
-                        <a:lnSpc>
-                          <a:spcPct val="100000"/>
-                        </a:lnSpc>
-                        <a:spcBef>
-                          <a:spcPts val="0"/>
-                        </a:spcBef>
-                        <a:spcAft>
-                          <a:spcPts val="0"/>
-                        </a:spcAft>
-                        <a:buClrTx/>
-                        <a:buSzTx/>
-                        <a:buFontTx/>
-                        <a:buNone/>
-                        <a:tabLst/>
-                        <a:defRPr/>
-                      </a:pPr>
+                      <a:pPr algn="l"/>
                       <a:r>
                         <a:rPr lang="en-US" sz="1400" dirty="0">
                           <a:solidFill>
                             <a:schemeClr val="tx1"/>
                           </a:solidFill>
                         </a:rPr>
-                        <a:t>Type</a:t>
-                      </a:r>
-                    </a:p>
-                  </a:txBody>
-                  <a:tcPr marL="137160" marR="137160" marT="137160" marB="137160" anchor="ctr">
+                        <a:t>specific </a:t>
+                      </a:r>
+                      <a:r>
+                        <a:rPr lang="en-US" sz="1400" dirty="0">
+                          <a:solidFill>
+                            <a:schemeClr val="tx1"/>
+                          </a:solidFill>
+                          <a:effectLst/>
+                        </a:rPr>
+                        <a:t>tests</a:t>
+                      </a:r>
+                      <a:endParaRPr lang="en-US" sz="1400" kern="1200" dirty="0">
+                        <a:solidFill>
+                          <a:schemeClr val="tx1"/>
+                        </a:solidFill>
+                        <a:latin typeface="Times New Roman" panose="02020603050405020304" pitchFamily="18" charset="0"/>
+                        <a:ea typeface="+mn-ea"/>
+                        <a:cs typeface="Times New Roman" panose="02020603050405020304" pitchFamily="18" charset="0"/>
+                      </a:endParaRPr>
+                    </a:p>
+                  </a:txBody>
+                  <a:tcPr>
+                    <a:lnL w="12700" cap="flat" cmpd="sng" algn="ctr">
+                      <a:noFill/>
+                      <a:prstDash val="solid"/>
+                      <a:round/>
+                      <a:headEnd type="none" w="med" len="med"/>
+                      <a:tailEnd type="none" w="med" len="med"/>
+                    </a:lnL>
+                    <a:lnR w="12700" cap="flat" cmpd="sng" algn="ctr">
+                      <a:noFill/>
+                      <a:prstDash val="solid"/>
+                      <a:round/>
+                      <a:headEnd type="none" w="med" len="med"/>
+                      <a:tailEnd type="none" w="med" len="med"/>
+                    </a:lnR>
                     <a:lnT w="12700" cap="flat" cmpd="sng" algn="ctr">
-                      <a:solidFill>
-                        <a:schemeClr val="tx1"/>
-                      </a:solidFill>
+                      <a:noFill/>
                       <a:prstDash val="solid"/>
                       <a:round/>
                       <a:headEnd type="none" w="med" len="med"/>
                       <a:tailEnd type="none" w="med" len="med"/>
                     </a:lnT>
                     <a:lnB w="12700" cap="flat" cmpd="sng" algn="ctr">
-                      <a:solidFill>
-                        <a:schemeClr val="tx1"/>
-                      </a:solidFill>
+                      <a:noFill/>
                       <a:prstDash val="solid"/>
                       <a:round/>
                       <a:headEnd type="none" w="med" len="med"/>
@@ -8358,53 +9608,69 @@
                     </a:lnB>
                   </a:tcPr>
                 </a:tc>
-                <a:tc>
-                  <a:txBody>
-                    <a:bodyPr/>
-                    <a:lstStyle/>
-                    <a:p>
-                      <a:pPr marL="0" marR="0" lvl="0" indent="0" algn="ctr" defTabSz="914400" rtl="0" eaLnBrk="1" fontAlgn="auto" latinLnBrk="0" hangingPunct="1">
-                        <a:lnSpc>
-                          <a:spcPct val="100000"/>
-                        </a:lnSpc>
-                        <a:spcBef>
-                          <a:spcPts val="0"/>
-                        </a:spcBef>
-                        <a:spcAft>
-                          <a:spcPts val="0"/>
-                        </a:spcAft>
-                        <a:buClrTx/>
-                        <a:buSzTx/>
-                        <a:buFontTx/>
-                        <a:buNone/>
-                        <a:tabLst/>
-                        <a:defRPr/>
-                      </a:pPr>
-                      <a:r>
-                        <a:rPr lang="en-US" sz="1400" dirty="0"/>
-                        <a:t>Results</a:t>
-                      </a:r>
-                      <a:endParaRPr lang="en-US" sz="1400" dirty="0">
+                <a:extLst>
+                  <a:ext uri="{0D108BD9-81ED-4DB2-BD59-A6C34878D82A}">
+                    <a16:rowId xmlns:a16="http://schemas.microsoft.com/office/drawing/2014/main" val="1609350404"/>
+                  </a:ext>
+                </a:extLst>
+              </a:tr>
+              <a:tr h="320040">
+                <a:tc>
+                  <a:txBody>
+                    <a:bodyPr/>
+                    <a:lstStyle/>
+                    <a:p>
+                      <a:pPr algn="l"/>
+                      <a:r>
+                        <a:rPr lang="en-US" sz="1400" i="1" kern="1200" dirty="0" err="1">
+                          <a:solidFill>
+                            <a:schemeClr val="tx1"/>
+                          </a:solidFill>
+                        </a:rPr>
+                        <a:t>nemd_test</a:t>
+                      </a:r>
+                      <a:r>
+                        <a:rPr lang="en-US" sz="1400" i="1" kern="1200" dirty="0">
+                          <a:solidFill>
+                            <a:schemeClr val="tx1"/>
+                          </a:solidFill>
+                        </a:rPr>
+                        <a:t> -s -v [file1 file2...]</a:t>
+                      </a:r>
+                      <a:endParaRPr lang="en-US" sz="1400" i="1" kern="1200" dirty="0">
                         <a:solidFill>
                           <a:schemeClr val="tx1"/>
                         </a:solidFill>
+                        <a:latin typeface="Times New Roman" panose="02020603050405020304" pitchFamily="18" charset="0"/>
+                        <a:ea typeface="+mn-ea"/>
+                        <a:cs typeface="Times New Roman" panose="02020603050405020304" pitchFamily="18" charset="0"/>
                       </a:endParaRPr>
                     </a:p>
                   </a:txBody>
-                  <a:tcPr marL="137160" marR="137160" marT="137160" marB="137160" anchor="ctr">
+                  <a:tcPr>
+                    <a:lnL w="12700" cap="flat" cmpd="sng" algn="ctr">
+                      <a:noFill/>
+                      <a:prstDash val="solid"/>
+                      <a:round/>
+                      <a:headEnd type="none" w="med" len="med"/>
+                      <a:tailEnd type="none" w="med" len="med"/>
+                    </a:lnL>
+                    <a:lnR w="12700" cap="flat" cmpd="sng" algn="ctr">
+                      <a:noFill/>
+                      <a:prstDash val="solid"/>
+                      <a:round/>
+                      <a:headEnd type="none" w="med" len="med"/>
+                      <a:tailEnd type="none" w="med" len="med"/>
+                    </a:lnR>
                     <a:lnT w="12700" cap="flat" cmpd="sng" algn="ctr">
-                      <a:solidFill>
-                        <a:schemeClr val="tx1"/>
-                      </a:solidFill>
+                      <a:noFill/>
                       <a:prstDash val="solid"/>
                       <a:round/>
                       <a:headEnd type="none" w="med" len="med"/>
                       <a:tailEnd type="none" w="med" len="med"/>
                     </a:lnT>
                     <a:lnB w="12700" cap="flat" cmpd="sng" algn="ctr">
-                      <a:solidFill>
-                        <a:schemeClr val="tx1"/>
-                      </a:solidFill>
+                      <a:noFill/>
                       <a:prstDash val="solid"/>
                       <a:round/>
                       <a:headEnd type="none" w="med" len="med"/>
@@ -8412,56 +9678,54 @@
                     </a:lnB>
                   </a:tcPr>
                 </a:tc>
-                <a:extLst>
-                  <a:ext uri="{0D108BD9-81ED-4DB2-BD59-A6C34878D82A}">
-                    <a16:rowId xmlns:a16="http://schemas.microsoft.com/office/drawing/2014/main" val="1601929244"/>
-                  </a:ext>
-                </a:extLst>
-              </a:tr>
-              <a:tr h="1115209">
-                <a:tc rowSpan="3">
-                  <a:txBody>
-                    <a:bodyPr/>
-                    <a:lstStyle/>
-                    <a:p>
-                      <a:pPr marL="0" marR="0" lvl="0" indent="0" algn="ctr" defTabSz="914400" rtl="0" eaLnBrk="1" fontAlgn="auto" latinLnBrk="0" hangingPunct="1">
-                        <a:lnSpc>
-                          <a:spcPct val="100000"/>
-                        </a:lnSpc>
-                        <a:spcBef>
-                          <a:spcPts val="0"/>
-                        </a:spcBef>
-                        <a:spcAft>
-                          <a:spcPts val="0"/>
-                        </a:spcAft>
-                        <a:buClrTx/>
-                        <a:buSzTx/>
-                        <a:buFontTx/>
-                        <a:buNone/>
-                        <a:tabLst/>
-                        <a:defRPr/>
-                      </a:pPr>
-                      <a:r>
-                        <a:rPr lang="en-US" sz="1400" dirty="0" err="1"/>
-                        <a:t>nemd_cover</a:t>
-                      </a:r>
-                      <a:endParaRPr lang="en-US" sz="1400" dirty="0"/>
-                    </a:p>
-                  </a:txBody>
-                  <a:tcPr marL="137160" marR="137160" marT="137160" marB="137160" anchor="ctr">
+                <a:tc>
+                  <a:txBody>
+                    <a:bodyPr/>
+                    <a:lstStyle/>
+                    <a:p>
+                      <a:pPr algn="l"/>
+                      <a:r>
+                        <a:rPr lang="en-US" sz="1400" dirty="0">
+                          <a:solidFill>
+                            <a:schemeClr val="tx1"/>
+                          </a:solidFill>
+                        </a:rPr>
+                        <a:t>screen and verbose</a:t>
+                      </a:r>
+                      <a:endParaRPr lang="en-US" sz="1400" kern="1200" dirty="0">
+                        <a:solidFill>
+                          <a:schemeClr val="tx1"/>
+                        </a:solidFill>
+                        <a:latin typeface="Times New Roman" panose="02020603050405020304" pitchFamily="18" charset="0"/>
+                        <a:ea typeface="+mn-ea"/>
+                        <a:cs typeface="Times New Roman" panose="02020603050405020304" pitchFamily="18" charset="0"/>
+                      </a:endParaRPr>
+                    </a:p>
+                  </a:txBody>
+                  <a:tcPr>
+                    <a:lnL w="12700" cap="flat" cmpd="sng" algn="ctr">
+                      <a:noFill/>
+                      <a:prstDash val="solid"/>
+                      <a:round/>
+                      <a:headEnd type="none" w="med" len="med"/>
+                      <a:tailEnd type="none" w="med" len="med"/>
+                    </a:lnL>
+                    <a:lnR w="12700" cap="flat" cmpd="sng" algn="ctr">
+                      <a:noFill/>
+                      <a:prstDash val="solid"/>
+                      <a:round/>
+                      <a:headEnd type="none" w="med" len="med"/>
+                      <a:tailEnd type="none" w="med" len="med"/>
+                    </a:lnR>
                     <a:lnT w="12700" cap="flat" cmpd="sng" algn="ctr">
-                      <a:solidFill>
-                        <a:schemeClr val="tx1"/>
-                      </a:solidFill>
+                      <a:noFill/>
                       <a:prstDash val="solid"/>
                       <a:round/>
                       <a:headEnd type="none" w="med" len="med"/>
                       <a:tailEnd type="none" w="med" len="med"/>
                     </a:lnT>
                     <a:lnB w="12700" cap="flat" cmpd="sng" algn="ctr">
-                      <a:solidFill>
-                        <a:schemeClr val="tx1"/>
-                      </a:solidFill>
+                      <a:noFill/>
                       <a:prstDash val="solid"/>
                       <a:round/>
                       <a:headEnd type="none" w="med" len="med"/>
@@ -8469,48 +9733,69 @@
                     </a:lnB>
                   </a:tcPr>
                 </a:tc>
-                <a:tc rowSpan="3">
-                  <a:txBody>
-                    <a:bodyPr/>
-                    <a:lstStyle/>
-                    <a:p>
-                      <a:pPr marL="0" marR="0" lvl="0" indent="0" algn="ctr" defTabSz="914400" rtl="0" eaLnBrk="1" fontAlgn="auto" latinLnBrk="0" hangingPunct="1">
-                        <a:lnSpc>
-                          <a:spcPct val="100000"/>
-                        </a:lnSpc>
-                        <a:spcBef>
-                          <a:spcPts val="0"/>
-                        </a:spcBef>
-                        <a:spcAft>
-                          <a:spcPts val="0"/>
-                        </a:spcAft>
-                        <a:buClrTx/>
-                        <a:buSzTx/>
-                        <a:buFontTx/>
-                        <a:buNone/>
-                        <a:tabLst/>
-                        <a:defRPr/>
-                      </a:pPr>
-                      <a:r>
-                        <a:rPr lang="en-US" sz="1400" dirty="0"/>
-                        <a:t>"-m ''"</a:t>
-                      </a:r>
-                    </a:p>
-                  </a:txBody>
-                  <a:tcPr marL="137160" marR="137160" marT="137160" marB="137160" anchor="ctr">
+                <a:extLst>
+                  <a:ext uri="{0D108BD9-81ED-4DB2-BD59-A6C34878D82A}">
+                    <a16:rowId xmlns:a16="http://schemas.microsoft.com/office/drawing/2014/main" val="1757298434"/>
+                  </a:ext>
+                </a:extLst>
+              </a:tr>
+              <a:tr h="320040">
+                <a:tc>
+                  <a:txBody>
+                    <a:bodyPr/>
+                    <a:lstStyle/>
+                    <a:p>
+                      <a:pPr algn="l"/>
+                      <a:r>
+                        <a:rPr lang="en-US" sz="1400" i="1" kern="1200" dirty="0" err="1">
+                          <a:solidFill>
+                            <a:schemeClr val="tx1"/>
+                          </a:solidFill>
+                        </a:rPr>
+                        <a:t>nemd_test</a:t>
+                      </a:r>
+                      <a:r>
+                        <a:rPr lang="en-US" sz="1400" i="1" kern="1200" dirty="0">
+                          <a:solidFill>
+                            <a:schemeClr val="tx1"/>
+                          </a:solidFill>
+                        </a:rPr>
+                        <a:t> -m slow [file1 file2...]</a:t>
+                      </a:r>
+                      <a:endParaRPr lang="en-US" sz="1400" i="1" kern="1200" dirty="0">
+                        <a:solidFill>
+                          <a:schemeClr val="tx1"/>
+                        </a:solidFill>
+                        <a:latin typeface="Times New Roman" panose="02020603050405020304" pitchFamily="18" charset="0"/>
+                        <a:ea typeface="+mn-ea"/>
+                        <a:cs typeface="Times New Roman" panose="02020603050405020304" pitchFamily="18" charset="0"/>
+                      </a:endParaRPr>
+                    </a:p>
+                  </a:txBody>
+                  <a:tcPr>
+                    <a:lnL w="12700" cap="flat" cmpd="sng" algn="ctr">
+                      <a:noFill/>
+                      <a:prstDash val="solid"/>
+                      <a:round/>
+                      <a:headEnd type="none" w="med" len="med"/>
+                      <a:tailEnd type="none" w="med" len="med"/>
+                    </a:lnL>
+                    <a:lnR w="12700" cap="flat" cmpd="sng" algn="ctr">
+                      <a:noFill/>
+                      <a:prstDash val="solid"/>
+                      <a:round/>
+                      <a:headEnd type="none" w="med" len="med"/>
+                      <a:tailEnd type="none" w="med" len="med"/>
+                    </a:lnR>
                     <a:lnT w="12700" cap="flat" cmpd="sng" algn="ctr">
-                      <a:solidFill>
-                        <a:schemeClr val="tx1"/>
-                      </a:solidFill>
+                      <a:noFill/>
                       <a:prstDash val="solid"/>
                       <a:round/>
                       <a:headEnd type="none" w="med" len="med"/>
                       <a:tailEnd type="none" w="med" len="med"/>
                     </a:lnT>
                     <a:lnB w="12700" cap="flat" cmpd="sng" algn="ctr">
-                      <a:solidFill>
-                        <a:schemeClr val="tx1"/>
-                      </a:solidFill>
+                      <a:noFill/>
                       <a:prstDash val="solid"/>
                       <a:round/>
                       <a:headEnd type="none" w="med" len="med"/>
@@ -8523,43 +9808,50 @@
                     <a:bodyPr/>
                     <a:lstStyle/>
                     <a:p>
-                      <a:pPr marL="0" marR="0" lvl="0" indent="0" algn="ctr" defTabSz="914400" rtl="0" eaLnBrk="1" fontAlgn="auto" latinLnBrk="0" hangingPunct="1">
-                        <a:lnSpc>
-                          <a:spcPct val="100000"/>
-                        </a:lnSpc>
-                        <a:spcBef>
-                          <a:spcPts val="0"/>
-                        </a:spcBef>
-                        <a:spcAft>
-                          <a:spcPts val="0"/>
-                        </a:spcAft>
-                        <a:buClrTx/>
-                        <a:buSzTx/>
-                        <a:buFontTx/>
-                        <a:buNone/>
-                        <a:tabLst/>
-                        <a:defRPr/>
-                      </a:pPr>
-                      <a:r>
-                        <a:rPr lang="en-US" sz="1400" dirty="0"/>
-                        <a:t>workflow</a:t>
-                      </a:r>
-                    </a:p>
-                  </a:txBody>
-                  <a:tcPr marL="137160" marR="137160" marT="137160" marB="137160" anchor="ctr">
+                      <a:pPr algn="l"/>
+                      <a:r>
+                        <a:rPr lang="en-US" sz="1400" dirty="0">
+                          <a:solidFill>
+                            <a:schemeClr val="tx1"/>
+                          </a:solidFill>
+                          <a:effectLst/>
+                        </a:rPr>
+                        <a:t>selected tests marked with slow</a:t>
+                      </a:r>
+                      <a:endParaRPr lang="en-US" sz="1400" kern="1200" dirty="0">
+                        <a:solidFill>
+                          <a:schemeClr val="tx1"/>
+                        </a:solidFill>
+                        <a:latin typeface="Times New Roman" panose="02020603050405020304" pitchFamily="18" charset="0"/>
+                        <a:ea typeface="+mn-ea"/>
+                        <a:cs typeface="Times New Roman" panose="02020603050405020304" pitchFamily="18" charset="0"/>
+                      </a:endParaRPr>
+                    </a:p>
+                  </a:txBody>
+                  <a:tcPr>
+                    <a:lnL w="12700" cap="flat" cmpd="sng" algn="ctr">
+                      <a:noFill/>
+                      <a:prstDash val="solid"/>
+                      <a:round/>
+                      <a:headEnd type="none" w="med" len="med"/>
+                      <a:tailEnd type="none" w="med" len="med"/>
+                    </a:lnL>
+                    <a:lnR w="12700" cap="flat" cmpd="sng" algn="ctr">
+                      <a:noFill/>
+                      <a:prstDash val="solid"/>
+                      <a:round/>
+                      <a:headEnd type="none" w="med" len="med"/>
+                      <a:tailEnd type="none" w="med" len="med"/>
+                    </a:lnR>
                     <a:lnT w="12700" cap="flat" cmpd="sng" algn="ctr">
-                      <a:solidFill>
-                        <a:schemeClr val="tx1"/>
-                      </a:solidFill>
+                      <a:noFill/>
                       <a:prstDash val="solid"/>
                       <a:round/>
                       <a:headEnd type="none" w="med" len="med"/>
                       <a:tailEnd type="none" w="med" len="med"/>
                     </a:lnT>
                     <a:lnB w="12700" cap="flat" cmpd="sng" algn="ctr">
-                      <a:solidFill>
-                        <a:schemeClr val="tx1"/>
-                      </a:solidFill>
+                      <a:noFill/>
                       <a:prstDash val="solid"/>
                       <a:round/>
                       <a:headEnd type="none" w="med" len="med"/>
@@ -8567,551 +9859,9 @@
                     </a:lnB>
                   </a:tcPr>
                 </a:tc>
-                <a:tc>
-                  <a:txBody>
-                    <a:bodyPr/>
-                    <a:lstStyle/>
-                    <a:p>
-                      <a:pPr algn="ctr"/>
-                      <a:r>
-                        <a:rPr lang="en-US" sz="1400" dirty="0"/>
-                        <a:t>statements</a:t>
-                      </a:r>
-                    </a:p>
-                    <a:p>
-                      <a:pPr algn="ctr"/>
-                      <a:r>
-                        <a:rPr lang="en-US" sz="1400" dirty="0"/>
-                        <a:t>missing</a:t>
-                      </a:r>
-                    </a:p>
-                    <a:p>
-                      <a:pPr algn="ctr"/>
-                      <a:r>
-                        <a:rPr lang="en-US" sz="1400" dirty="0"/>
-                        <a:t>excluded</a:t>
-                      </a:r>
-                    </a:p>
-                    <a:p>
-                      <a:pPr algn="ctr"/>
-                      <a:r>
-                        <a:rPr lang="en-US" sz="1400" dirty="0"/>
-                        <a:t>coverage</a:t>
-                      </a:r>
-                    </a:p>
-                  </a:txBody>
-                  <a:tcPr marL="137160" marR="137160" marT="137160" marB="137160" anchor="ctr">
-                    <a:lnT w="12700" cap="flat" cmpd="sng" algn="ctr">
-                      <a:solidFill>
-                        <a:schemeClr val="tx1"/>
-                      </a:solidFill>
-                      <a:prstDash val="solid"/>
-                      <a:round/>
-                      <a:headEnd type="none" w="med" len="med"/>
-                      <a:tailEnd type="none" w="med" len="med"/>
-                    </a:lnT>
-                    <a:lnB w="12700" cap="flat" cmpd="sng" algn="ctr">
-                      <a:solidFill>
-                        <a:schemeClr val="tx1"/>
-                      </a:solidFill>
-                      <a:prstDash val="solid"/>
-                      <a:round/>
-                      <a:headEnd type="none" w="med" len="med"/>
-                      <a:tailEnd type="none" w="med" len="med"/>
-                    </a:lnB>
-                  </a:tcPr>
-                </a:tc>
-                <a:tc>
-                  <a:txBody>
-                    <a:bodyPr/>
-                    <a:lstStyle/>
-                    <a:p>
-                      <a:pPr algn="ctr"/>
-                      <a:r>
-                        <a:rPr lang="en-US" sz="1400" dirty="0"/>
-                        <a:t>200</a:t>
-                      </a:r>
-                    </a:p>
-                    <a:p>
-                      <a:pPr algn="ctr"/>
-                      <a:r>
-                        <a:rPr lang="en-US" sz="1400" dirty="0"/>
-                        <a:t>0</a:t>
-                      </a:r>
-                    </a:p>
-                    <a:p>
-                      <a:pPr algn="ctr"/>
-                      <a:r>
-                        <a:rPr lang="en-US" sz="1400" dirty="0"/>
-                        <a:t>8</a:t>
-                      </a:r>
-                    </a:p>
-                    <a:p>
-                      <a:pPr algn="ctr"/>
-                      <a:r>
-                        <a:rPr lang="en-US" sz="1400" dirty="0"/>
-                        <a:t>100%</a:t>
-                      </a:r>
-                    </a:p>
-                  </a:txBody>
-                  <a:tcPr marL="137160" marR="137160" marT="137160" marB="137160" anchor="ctr">
-                    <a:lnT w="12700" cap="flat" cmpd="sng" algn="ctr">
-                      <a:solidFill>
-                        <a:schemeClr val="tx1"/>
-                      </a:solidFill>
-                      <a:prstDash val="solid"/>
-                      <a:round/>
-                      <a:headEnd type="none" w="med" len="med"/>
-                      <a:tailEnd type="none" w="med" len="med"/>
-                    </a:lnT>
-                    <a:lnB w="12700" cap="flat" cmpd="sng" algn="ctr">
-                      <a:solidFill>
-                        <a:schemeClr val="tx1"/>
-                      </a:solidFill>
-                      <a:prstDash val="solid"/>
-                      <a:round/>
-                      <a:headEnd type="none" w="med" len="med"/>
-                      <a:tailEnd type="none" w="med" len="med"/>
-                    </a:lnB>
-                  </a:tcPr>
-                </a:tc>
                 <a:extLst>
                   <a:ext uri="{0D108BD9-81ED-4DB2-BD59-A6C34878D82A}">
-                    <a16:rowId xmlns:a16="http://schemas.microsoft.com/office/drawing/2014/main" val="2430466548"/>
-                  </a:ext>
-                </a:extLst>
-              </a:tr>
-              <a:tr h="1115209">
-                <a:tc vMerge="1">
-                  <a:txBody>
-                    <a:bodyPr/>
-                    <a:lstStyle/>
-                    <a:p>
-                      <a:endParaRPr/>
-                    </a:p>
-                  </a:txBody>
-                  <a:tcPr marL="137160" marR="137160" marT="137160" marB="137160" anchor="ctr">
-                    <a:lnT w="12700" cap="flat" cmpd="sng" algn="ctr">
-                      <a:solidFill>
-                        <a:schemeClr val="tx1"/>
-                      </a:solidFill>
-                      <a:prstDash val="solid"/>
-                      <a:round/>
-                      <a:headEnd type="none" w="med" len="med"/>
-                      <a:tailEnd type="none" w="med" len="med"/>
-                    </a:lnT>
-                    <a:lnB w="12700" cap="flat" cmpd="sng" algn="ctr">
-                      <a:solidFill>
-                        <a:schemeClr val="tx1"/>
-                      </a:solidFill>
-                      <a:prstDash val="solid"/>
-                      <a:round/>
-                      <a:headEnd type="none" w="med" len="med"/>
-                      <a:tailEnd type="none" w="med" len="med"/>
-                    </a:lnB>
-                  </a:tcPr>
-                </a:tc>
-                <a:tc vMerge="1">
-                  <a:txBody>
-                    <a:bodyPr/>
-                    <a:lstStyle/>
-                    <a:p>
-                      <a:endParaRPr/>
-                    </a:p>
-                  </a:txBody>
-                  <a:tcPr marL="137160" marR="137160" marT="137160" marB="137160" anchor="ctr">
-                    <a:lnT w="12700" cap="flat" cmpd="sng" algn="ctr">
-                      <a:solidFill>
-                        <a:schemeClr val="tx1"/>
-                      </a:solidFill>
-                      <a:prstDash val="solid"/>
-                      <a:round/>
-                      <a:headEnd type="none" w="med" len="med"/>
-                      <a:tailEnd type="none" w="med" len="med"/>
-                    </a:lnT>
-                    <a:lnB w="12700" cap="flat" cmpd="sng" algn="ctr">
-                      <a:solidFill>
-                        <a:schemeClr val="tx1"/>
-                      </a:solidFill>
-                      <a:prstDash val="solid"/>
-                      <a:round/>
-                      <a:headEnd type="none" w="med" len="med"/>
-                      <a:tailEnd type="none" w="med" len="med"/>
-                    </a:lnB>
-                  </a:tcPr>
-                </a:tc>
-                <a:tc>
-                  <a:txBody>
-                    <a:bodyPr/>
-                    <a:lstStyle/>
-                    <a:p>
-                      <a:pPr algn="ctr"/>
-                      <a:r>
-                        <a:rPr lang="en-US" sz="1400" dirty="0"/>
-                        <a:t>driver</a:t>
-                      </a:r>
-                    </a:p>
-                  </a:txBody>
-                  <a:tcPr marL="137160" marR="137160" marT="137160" marB="137160" anchor="ctr">
-                    <a:lnT w="12700" cap="flat" cmpd="sng" algn="ctr">
-                      <a:solidFill>
-                        <a:schemeClr val="tx1"/>
-                      </a:solidFill>
-                      <a:prstDash val="solid"/>
-                      <a:round/>
-                      <a:headEnd type="none" w="med" len="med"/>
-                      <a:tailEnd type="none" w="med" len="med"/>
-                    </a:lnT>
-                    <a:lnB w="12700" cap="flat" cmpd="sng" algn="ctr">
-                      <a:solidFill>
-                        <a:schemeClr val="tx1"/>
-                      </a:solidFill>
-                      <a:prstDash val="solid"/>
-                      <a:round/>
-                      <a:headEnd type="none" w="med" len="med"/>
-                      <a:tailEnd type="none" w="med" len="med"/>
-                    </a:lnB>
-                  </a:tcPr>
-                </a:tc>
-                <a:tc>
-                  <a:txBody>
-                    <a:bodyPr/>
-                    <a:lstStyle/>
-                    <a:p>
-                      <a:pPr algn="ctr"/>
-                      <a:r>
-                        <a:rPr lang="en-US" sz="1400" dirty="0"/>
-                        <a:t>statements</a:t>
-                      </a:r>
-                    </a:p>
-                    <a:p>
-                      <a:pPr algn="ctr"/>
-                      <a:r>
-                        <a:rPr lang="en-US" sz="1400" dirty="0"/>
-                        <a:t>missing</a:t>
-                      </a:r>
-                    </a:p>
-                    <a:p>
-                      <a:pPr algn="ctr"/>
-                      <a:r>
-                        <a:rPr lang="en-US" sz="1400" dirty="0"/>
-                        <a:t>excluded</a:t>
-                      </a:r>
-                    </a:p>
-                    <a:p>
-                      <a:pPr algn="ctr"/>
-                      <a:r>
-                        <a:rPr lang="en-US" sz="1400" dirty="0"/>
-                        <a:t>coverage</a:t>
-                      </a:r>
-                    </a:p>
-                  </a:txBody>
-                  <a:tcPr marL="137160" marR="137160" marT="137160" marB="137160" anchor="ctr">
-                    <a:lnT w="12700" cap="flat" cmpd="sng" algn="ctr">
-                      <a:solidFill>
-                        <a:schemeClr val="tx1"/>
-                      </a:solidFill>
-                      <a:prstDash val="solid"/>
-                      <a:round/>
-                      <a:headEnd type="none" w="med" len="med"/>
-                      <a:tailEnd type="none" w="med" len="med"/>
-                    </a:lnT>
-                    <a:lnB w="12700" cap="flat" cmpd="sng" algn="ctr">
-                      <a:solidFill>
-                        <a:schemeClr val="tx1"/>
-                      </a:solidFill>
-                      <a:prstDash val="solid"/>
-                      <a:round/>
-                      <a:headEnd type="none" w="med" len="med"/>
-                      <a:tailEnd type="none" w="med" len="med"/>
-                    </a:lnB>
-                  </a:tcPr>
-                </a:tc>
-                <a:tc>
-                  <a:txBody>
-                    <a:bodyPr/>
-                    <a:lstStyle/>
-                    <a:p>
-                      <a:pPr algn="ctr"/>
-                      <a:r>
-                        <a:rPr lang="en-US" sz="1400" dirty="0"/>
-                        <a:t>466</a:t>
-                      </a:r>
-                    </a:p>
-                    <a:p>
-                      <a:pPr algn="ctr"/>
-                      <a:r>
-                        <a:rPr lang="en-US" sz="1400" dirty="0"/>
-                        <a:t>0</a:t>
-                      </a:r>
-                    </a:p>
-                    <a:p>
-                      <a:pPr algn="ctr"/>
-                      <a:r>
-                        <a:rPr lang="en-US" sz="1400" dirty="0"/>
-                        <a:t>16</a:t>
-                      </a:r>
-                    </a:p>
-                    <a:p>
-                      <a:pPr algn="ctr"/>
-                      <a:r>
-                        <a:rPr lang="en-US" sz="1400" dirty="0"/>
-                        <a:t>100%</a:t>
-                      </a:r>
-                    </a:p>
-                  </a:txBody>
-                  <a:tcPr marL="137160" marR="137160" marT="137160" marB="137160" anchor="ctr">
-                    <a:lnT w="12700" cap="flat" cmpd="sng" algn="ctr">
-                      <a:solidFill>
-                        <a:schemeClr val="tx1"/>
-                      </a:solidFill>
-                      <a:prstDash val="solid"/>
-                      <a:round/>
-                      <a:headEnd type="none" w="med" len="med"/>
-                      <a:tailEnd type="none" w="med" len="med"/>
-                    </a:lnT>
-                    <a:lnB w="12700" cap="flat" cmpd="sng" algn="ctr">
-                      <a:solidFill>
-                        <a:schemeClr val="tx1"/>
-                      </a:solidFill>
-                      <a:prstDash val="solid"/>
-                      <a:round/>
-                      <a:headEnd type="none" w="med" len="med"/>
-                      <a:tailEnd type="none" w="med" len="med"/>
-                    </a:lnB>
-                  </a:tcPr>
-                </a:tc>
-                <a:extLst>
-                  <a:ext uri="{0D108BD9-81ED-4DB2-BD59-A6C34878D82A}">
-                    <a16:rowId xmlns:a16="http://schemas.microsoft.com/office/drawing/2014/main" val="770493721"/>
-                  </a:ext>
-                </a:extLst>
-              </a:tr>
-              <a:tr h="1115209">
-                <a:tc vMerge="1">
-                  <a:txBody>
-                    <a:bodyPr/>
-                    <a:lstStyle/>
-                    <a:p>
-                      <a:pPr algn="just"/>
-                      <a:endParaRPr lang="en-US" sz="1400" dirty="0"/>
-                    </a:p>
-                  </a:txBody>
-                  <a:tcPr marL="137160" marR="137160" marT="137160" marB="137160" anchor="ctr">
-                    <a:lnT w="12700" cap="flat" cmpd="sng" algn="ctr">
-                      <a:solidFill>
-                        <a:schemeClr val="tx1"/>
-                      </a:solidFill>
-                      <a:prstDash val="solid"/>
-                      <a:round/>
-                      <a:headEnd type="none" w="med" len="med"/>
-                      <a:tailEnd type="none" w="med" len="med"/>
-                    </a:lnT>
-                    <a:lnB w="12700" cap="flat" cmpd="sng" algn="ctr">
-                      <a:solidFill>
-                        <a:schemeClr val="tx1"/>
-                      </a:solidFill>
-                      <a:prstDash val="solid"/>
-                      <a:round/>
-                      <a:headEnd type="none" w="med" len="med"/>
-                      <a:tailEnd type="none" w="med" len="med"/>
-                    </a:lnB>
-                  </a:tcPr>
-                </a:tc>
-                <a:tc vMerge="1">
-                  <a:txBody>
-                    <a:bodyPr/>
-                    <a:lstStyle/>
-                    <a:p>
-                      <a:pPr algn="just"/>
-                      <a:endParaRPr lang="en-US" sz="1400" dirty="0"/>
-                    </a:p>
-                  </a:txBody>
-                  <a:tcPr marL="137160" marR="137160" marT="137160" marB="137160" anchor="ctr">
-                    <a:lnT w="12700" cap="flat" cmpd="sng" algn="ctr">
-                      <a:solidFill>
-                        <a:schemeClr val="tx1"/>
-                      </a:solidFill>
-                      <a:prstDash val="solid"/>
-                      <a:round/>
-                      <a:headEnd type="none" w="med" len="med"/>
-                      <a:tailEnd type="none" w="med" len="med"/>
-                    </a:lnT>
-                    <a:lnB w="12700" cap="flat" cmpd="sng" algn="ctr">
-                      <a:solidFill>
-                        <a:schemeClr val="tx1"/>
-                      </a:solidFill>
-                      <a:prstDash val="solid"/>
-                      <a:round/>
-                      <a:headEnd type="none" w="med" len="med"/>
-                      <a:tailEnd type="none" w="med" len="med"/>
-                    </a:lnB>
-                  </a:tcPr>
-                </a:tc>
-                <a:tc>
-                  <a:txBody>
-                    <a:bodyPr/>
-                    <a:lstStyle/>
-                    <a:p>
-                      <a:pPr marL="0" marR="0" lvl="0" indent="0" algn="ctr" defTabSz="914400" rtl="0" eaLnBrk="1" fontAlgn="auto" latinLnBrk="0" hangingPunct="1">
-                        <a:lnSpc>
-                          <a:spcPct val="100000"/>
-                        </a:lnSpc>
-                        <a:spcBef>
-                          <a:spcPts val="0"/>
-                        </a:spcBef>
-                        <a:spcAft>
-                          <a:spcPts val="0"/>
-                        </a:spcAft>
-                        <a:buClrTx/>
-                        <a:buSzTx/>
-                        <a:buFontTx/>
-                        <a:buNone/>
-                        <a:tabLst/>
-                        <a:defRPr/>
-                      </a:pPr>
-                      <a:r>
-                        <a:rPr lang="en-US" sz="1400" dirty="0"/>
-                        <a:t>module</a:t>
-                      </a:r>
-                    </a:p>
-                    <a:p>
-                      <a:pPr algn="ctr"/>
-                      <a:endParaRPr lang="en-US" sz="1400" dirty="0"/>
-                    </a:p>
-                  </a:txBody>
-                  <a:tcPr marL="137160" marR="137160" marT="137160" marB="137160" anchor="ctr">
-                    <a:lnT w="12700" cap="flat" cmpd="sng" algn="ctr">
-                      <a:solidFill>
-                        <a:schemeClr val="tx1"/>
-                      </a:solidFill>
-                      <a:prstDash val="solid"/>
-                      <a:round/>
-                      <a:headEnd type="none" w="med" len="med"/>
-                      <a:tailEnd type="none" w="med" len="med"/>
-                    </a:lnT>
-                    <a:lnB w="12700" cap="flat" cmpd="sng" algn="ctr">
-                      <a:solidFill>
-                        <a:schemeClr val="tx1"/>
-                      </a:solidFill>
-                      <a:prstDash val="solid"/>
-                      <a:round/>
-                      <a:headEnd type="none" w="med" len="med"/>
-                      <a:tailEnd type="none" w="med" len="med"/>
-                    </a:lnB>
-                  </a:tcPr>
-                </a:tc>
-                <a:tc>
-                  <a:txBody>
-                    <a:bodyPr/>
-                    <a:lstStyle/>
-                    <a:p>
-                      <a:pPr algn="ctr"/>
-                      <a:r>
-                        <a:rPr lang="en-US" sz="1400" dirty="0"/>
-                        <a:t>statements</a:t>
-                      </a:r>
-                    </a:p>
-                    <a:p>
-                      <a:pPr algn="ctr"/>
-                      <a:r>
-                        <a:rPr lang="en-US" sz="1400" dirty="0"/>
-                        <a:t>missing</a:t>
-                      </a:r>
-                    </a:p>
-                    <a:p>
-                      <a:pPr algn="ctr"/>
-                      <a:r>
-                        <a:rPr lang="en-US" sz="1400" dirty="0"/>
-                        <a:t>excluded</a:t>
-                      </a:r>
-                    </a:p>
-                    <a:p>
-                      <a:pPr algn="ctr"/>
-                      <a:r>
-                        <a:rPr lang="en-US" sz="1400" dirty="0"/>
-                        <a:t>coverage</a:t>
-                      </a:r>
-                    </a:p>
-                  </a:txBody>
-                  <a:tcPr marL="137160" marR="137160" marT="137160" marB="137160" anchor="ctr">
-                    <a:lnT w="12700" cap="flat" cmpd="sng" algn="ctr">
-                      <a:solidFill>
-                        <a:schemeClr val="tx1"/>
-                      </a:solidFill>
-                      <a:prstDash val="solid"/>
-                      <a:round/>
-                      <a:headEnd type="none" w="med" len="med"/>
-                      <a:tailEnd type="none" w="med" len="med"/>
-                    </a:lnT>
-                    <a:lnB w="12700" cap="flat" cmpd="sng" algn="ctr">
-                      <a:solidFill>
-                        <a:schemeClr val="tx1"/>
-                      </a:solidFill>
-                      <a:prstDash val="solid"/>
-                      <a:round/>
-                      <a:headEnd type="none" w="med" len="med"/>
-                      <a:tailEnd type="none" w="med" len="med"/>
-                    </a:lnB>
-                  </a:tcPr>
-                </a:tc>
-                <a:tc>
-                  <a:txBody>
-                    <a:bodyPr/>
-                    <a:lstStyle/>
-                    <a:p>
-                      <a:pPr algn="ctr"/>
-                      <a:r>
-                        <a:rPr lang="en-US" sz="1400" dirty="0"/>
-                        <a:t>6082</a:t>
-                      </a:r>
-                    </a:p>
-                    <a:p>
-                      <a:pPr algn="ctr"/>
-                      <a:r>
-                        <a:rPr lang="en-US" sz="1400" dirty="0"/>
-                        <a:t>1</a:t>
-                      </a:r>
-                    </a:p>
-                    <a:p>
-                      <a:pPr algn="ctr"/>
-                      <a:r>
-                        <a:rPr lang="en-US" sz="1400" dirty="0"/>
-                        <a:t>164</a:t>
-                      </a:r>
-                    </a:p>
-                    <a:p>
-                      <a:pPr algn="ctr"/>
-                      <a:r>
-                        <a:rPr lang="en-US" sz="1400" dirty="0"/>
-                        <a:t>100%</a:t>
-                      </a:r>
-                    </a:p>
-                  </a:txBody>
-                  <a:tcPr marL="137160" marR="137160" marT="137160" marB="137160" anchor="ctr">
-                    <a:lnT w="12700" cap="flat" cmpd="sng" algn="ctr">
-                      <a:solidFill>
-                        <a:schemeClr val="tx1"/>
-                      </a:solidFill>
-                      <a:prstDash val="solid"/>
-                      <a:round/>
-                      <a:headEnd type="none" w="med" len="med"/>
-                      <a:tailEnd type="none" w="med" len="med"/>
-                    </a:lnT>
-                    <a:lnB w="12700" cap="flat" cmpd="sng" algn="ctr">
-                      <a:solidFill>
-                        <a:schemeClr val="tx1"/>
-                      </a:solidFill>
-                      <a:prstDash val="solid"/>
-                      <a:round/>
-                      <a:headEnd type="none" w="med" len="med"/>
-                      <a:tailEnd type="none" w="med" len="med"/>
-                    </a:lnB>
-                  </a:tcPr>
-                </a:tc>
-                <a:extLst>
-                  <a:ext uri="{0D108BD9-81ED-4DB2-BD59-A6C34878D82A}">
-                    <a16:rowId xmlns:a16="http://schemas.microsoft.com/office/drawing/2014/main" val="3949559036"/>
+                    <a16:rowId xmlns:a16="http://schemas.microsoft.com/office/drawing/2014/main" val="1420218751"/>
                   </a:ext>
                 </a:extLst>
               </a:tr>
@@ -9119,6 +9869,679 @@
           </a:graphicData>
         </a:graphic>
       </p:graphicFrame>
+      <p:graphicFrame>
+        <p:nvGraphicFramePr>
+          <p:cNvPr id="15" name="Table 14">
+            <a:extLst>
+              <a:ext uri="{FF2B5EF4-FFF2-40B4-BE49-F238E27FC236}">
+                <a16:creationId xmlns:a16="http://schemas.microsoft.com/office/drawing/2014/main" id="{2368FDEB-1B1A-36FF-5EC9-704089116459}"/>
+              </a:ext>
+            </a:extLst>
+          </p:cNvPr>
+          <p:cNvGraphicFramePr>
+            <a:graphicFrameLocks noGrp="1"/>
+          </p:cNvGraphicFramePr>
+          <p:nvPr>
+            <p:extLst>
+              <p:ext uri="{D42A27DB-BD31-4B8C-83A1-F6EECF244321}">
+                <p14:modId xmlns:p14="http://schemas.microsoft.com/office/powerpoint/2010/main" val="1640213107"/>
+              </p:ext>
+            </p:extLst>
+          </p:nvPr>
+        </p:nvGraphicFramePr>
+        <p:xfrm>
+          <a:off x="6091539" y="853913"/>
+          <a:ext cx="5890054" cy="1437384"/>
+        </p:xfrm>
+        <a:graphic>
+          <a:graphicData uri="http://schemas.openxmlformats.org/drawingml/2006/table">
+            <a:tbl>
+              <a:tblPr firstRow="1" bandRow="1">
+                <a:tableStyleId>{5940675A-B579-460E-94D1-54222C63F5DA}</a:tableStyleId>
+              </a:tblPr>
+              <a:tblGrid>
+                <a:gridCol w="3209063">
+                  <a:extLst>
+                    <a:ext uri="{9D8B030D-6E8A-4147-A177-3AD203B41FA5}">
+                      <a16:colId xmlns:a16="http://schemas.microsoft.com/office/drawing/2014/main" val="3331805810"/>
+                    </a:ext>
+                  </a:extLst>
+                </a:gridCol>
+                <a:gridCol w="2680991">
+                  <a:extLst>
+                    <a:ext uri="{9D8B030D-6E8A-4147-A177-3AD203B41FA5}">
+                      <a16:colId xmlns:a16="http://schemas.microsoft.com/office/drawing/2014/main" val="1422148830"/>
+                    </a:ext>
+                  </a:extLst>
+                </a:gridCol>
+              </a:tblGrid>
+              <a:tr h="359346">
+                <a:tc>
+                  <a:txBody>
+                    <a:bodyPr/>
+                    <a:lstStyle/>
+                    <a:p>
+                      <a:r>
+                        <a:rPr lang="en-US" sz="1300" i="1" kern="1200" dirty="0" err="1">
+                          <a:solidFill>
+                            <a:schemeClr val="tx1"/>
+                          </a:solidFill>
+                          <a:latin typeface="+mn-lt"/>
+                          <a:ea typeface="+mn-ea"/>
+                          <a:cs typeface="+mn-cs"/>
+                        </a:rPr>
+                        <a:t>nemd_cover</a:t>
+                      </a:r>
+                      <a:endParaRPr lang="en-US" sz="1300" i="1" kern="1200" dirty="0">
+                        <a:solidFill>
+                          <a:schemeClr val="tx1"/>
+                        </a:solidFill>
+                        <a:latin typeface="+mn-lt"/>
+                        <a:ea typeface="+mn-ea"/>
+                        <a:cs typeface="+mn-cs"/>
+                      </a:endParaRPr>
+                    </a:p>
+                  </a:txBody>
+                  <a:tcPr marL="0" marR="0">
+                    <a:lnL w="12700" cap="flat" cmpd="sng" algn="ctr">
+                      <a:noFill/>
+                      <a:prstDash val="solid"/>
+                      <a:round/>
+                      <a:headEnd type="none" w="med" len="med"/>
+                      <a:tailEnd type="none" w="med" len="med"/>
+                    </a:lnL>
+                    <a:lnR w="12700" cap="flat" cmpd="sng" algn="ctr">
+                      <a:noFill/>
+                      <a:prstDash val="solid"/>
+                      <a:round/>
+                      <a:headEnd type="none" w="med" len="med"/>
+                      <a:tailEnd type="none" w="med" len="med"/>
+                    </a:lnR>
+                    <a:lnT w="12700" cap="flat" cmpd="sng" algn="ctr">
+                      <a:noFill/>
+                      <a:prstDash val="solid"/>
+                      <a:round/>
+                      <a:headEnd type="none" w="med" len="med"/>
+                      <a:tailEnd type="none" w="med" len="med"/>
+                    </a:lnT>
+                    <a:lnB w="12700" cap="flat" cmpd="sng" algn="ctr">
+                      <a:noFill/>
+                      <a:prstDash val="solid"/>
+                      <a:round/>
+                      <a:headEnd type="none" w="med" len="med"/>
+                      <a:tailEnd type="none" w="med" len="med"/>
+                    </a:lnB>
+                  </a:tcPr>
+                </a:tc>
+                <a:tc>
+                  <a:txBody>
+                    <a:bodyPr/>
+                    <a:lstStyle/>
+                    <a:p>
+                      <a:pPr algn="l"/>
+                      <a:r>
+                        <a:rPr lang="en-US" sz="1300" kern="1200" dirty="0">
+                          <a:solidFill>
+                            <a:schemeClr val="tx1"/>
+                          </a:solidFill>
+                          <a:latin typeface="+mn-lt"/>
+                          <a:ea typeface="+mn-ea"/>
+                          <a:cs typeface="+mn-cs"/>
+                        </a:rPr>
+                        <a:t>run analysis, create html, open browser</a:t>
+                      </a:r>
+                    </a:p>
+                  </a:txBody>
+                  <a:tcPr marL="0" marR="0">
+                    <a:lnL w="12700" cap="flat" cmpd="sng" algn="ctr">
+                      <a:noFill/>
+                      <a:prstDash val="solid"/>
+                      <a:round/>
+                      <a:headEnd type="none" w="med" len="med"/>
+                      <a:tailEnd type="none" w="med" len="med"/>
+                    </a:lnL>
+                    <a:lnR w="12700" cap="flat" cmpd="sng" algn="ctr">
+                      <a:noFill/>
+                      <a:prstDash val="solid"/>
+                      <a:round/>
+                      <a:headEnd type="none" w="med" len="med"/>
+                      <a:tailEnd type="none" w="med" len="med"/>
+                    </a:lnR>
+                    <a:lnT w="12700" cap="flat" cmpd="sng" algn="ctr">
+                      <a:noFill/>
+                      <a:prstDash val="solid"/>
+                      <a:round/>
+                      <a:headEnd type="none" w="med" len="med"/>
+                      <a:tailEnd type="none" w="med" len="med"/>
+                    </a:lnT>
+                    <a:lnB w="12700" cap="flat" cmpd="sng" algn="ctr">
+                      <a:noFill/>
+                      <a:prstDash val="solid"/>
+                      <a:round/>
+                      <a:headEnd type="none" w="med" len="med"/>
+                      <a:tailEnd type="none" w="med" len="med"/>
+                    </a:lnB>
+                  </a:tcPr>
+                </a:tc>
+                <a:extLst>
+                  <a:ext uri="{0D108BD9-81ED-4DB2-BD59-A6C34878D82A}">
+                    <a16:rowId xmlns:a16="http://schemas.microsoft.com/office/drawing/2014/main" val="1440872081"/>
+                  </a:ext>
+                </a:extLst>
+              </a:tr>
+              <a:tr h="359346">
+                <a:tc>
+                  <a:txBody>
+                    <a:bodyPr/>
+                    <a:lstStyle/>
+                    <a:p>
+                      <a:r>
+                        <a:rPr lang="en-US" sz="1300" i="1" kern="1200" dirty="0" err="1">
+                          <a:solidFill>
+                            <a:schemeClr val="tx1"/>
+                          </a:solidFill>
+                          <a:effectLst/>
+                          <a:latin typeface="+mn-lt"/>
+                          <a:ea typeface="+mn-ea"/>
+                          <a:cs typeface="+mn-cs"/>
+                        </a:rPr>
+                        <a:t>nemd_cover</a:t>
+                      </a:r>
+                      <a:r>
+                        <a:rPr lang="en-US" sz="1300" i="1" kern="1200" dirty="0">
+                          <a:solidFill>
+                            <a:schemeClr val="tx1"/>
+                          </a:solidFill>
+                          <a:effectLst/>
+                          <a:latin typeface="+mn-lt"/>
+                          <a:ea typeface="+mn-ea"/>
+                          <a:cs typeface="+mn-cs"/>
+                        </a:rPr>
+                        <a:t> driver</a:t>
+                      </a:r>
+                    </a:p>
+                  </a:txBody>
+                  <a:tcPr marL="0" marR="0">
+                    <a:lnL w="12700" cap="flat" cmpd="sng" algn="ctr">
+                      <a:noFill/>
+                      <a:prstDash val="solid"/>
+                      <a:round/>
+                      <a:headEnd type="none" w="med" len="med"/>
+                      <a:tailEnd type="none" w="med" len="med"/>
+                    </a:lnL>
+                    <a:lnR w="12700" cap="flat" cmpd="sng" algn="ctr">
+                      <a:noFill/>
+                      <a:prstDash val="solid"/>
+                      <a:round/>
+                      <a:headEnd type="none" w="med" len="med"/>
+                      <a:tailEnd type="none" w="med" len="med"/>
+                    </a:lnR>
+                    <a:lnT w="12700" cap="flat" cmpd="sng" algn="ctr">
+                      <a:noFill/>
+                      <a:prstDash val="solid"/>
+                      <a:round/>
+                      <a:headEnd type="none" w="med" len="med"/>
+                      <a:tailEnd type="none" w="med" len="med"/>
+                    </a:lnT>
+                    <a:lnB w="12700" cap="flat" cmpd="sng" algn="ctr">
+                      <a:noFill/>
+                      <a:prstDash val="solid"/>
+                      <a:round/>
+                      <a:headEnd type="none" w="med" len="med"/>
+                      <a:tailEnd type="none" w="med" len="med"/>
+                    </a:lnB>
+                  </a:tcPr>
+                </a:tc>
+                <a:tc>
+                  <a:txBody>
+                    <a:bodyPr/>
+                    <a:lstStyle/>
+                    <a:p>
+                      <a:pPr algn="l"/>
+                      <a:r>
+                        <a:rPr lang="en-US" sz="1300" kern="1200" dirty="0">
+                          <a:solidFill>
+                            <a:schemeClr val="tx1"/>
+                          </a:solidFill>
+                          <a:latin typeface="+mn-lt"/>
+                          <a:ea typeface="+mn-ea"/>
+                          <a:cs typeface="+mn-cs"/>
+                        </a:rPr>
+                        <a:t>analyze all driver tests</a:t>
+                      </a:r>
+                    </a:p>
+                  </a:txBody>
+                  <a:tcPr marL="0" marR="0">
+                    <a:lnL w="12700" cap="flat" cmpd="sng" algn="ctr">
+                      <a:noFill/>
+                      <a:prstDash val="solid"/>
+                      <a:round/>
+                      <a:headEnd type="none" w="med" len="med"/>
+                      <a:tailEnd type="none" w="med" len="med"/>
+                    </a:lnL>
+                    <a:lnR w="12700" cap="flat" cmpd="sng" algn="ctr">
+                      <a:noFill/>
+                      <a:prstDash val="solid"/>
+                      <a:round/>
+                      <a:headEnd type="none" w="med" len="med"/>
+                      <a:tailEnd type="none" w="med" len="med"/>
+                    </a:lnR>
+                    <a:lnT w="12700" cap="flat" cmpd="sng" algn="ctr">
+                      <a:noFill/>
+                      <a:prstDash val="solid"/>
+                      <a:round/>
+                      <a:headEnd type="none" w="med" len="med"/>
+                      <a:tailEnd type="none" w="med" len="med"/>
+                    </a:lnT>
+                    <a:lnB w="12700" cap="flat" cmpd="sng" algn="ctr">
+                      <a:noFill/>
+                      <a:prstDash val="solid"/>
+                      <a:round/>
+                      <a:headEnd type="none" w="med" len="med"/>
+                      <a:tailEnd type="none" w="med" len="med"/>
+                    </a:lnB>
+                  </a:tcPr>
+                </a:tc>
+                <a:extLst>
+                  <a:ext uri="{0D108BD9-81ED-4DB2-BD59-A6C34878D82A}">
+                    <a16:rowId xmlns:a16="http://schemas.microsoft.com/office/drawing/2014/main" val="4263310005"/>
+                  </a:ext>
+                </a:extLst>
+              </a:tr>
+              <a:tr h="359346">
+                <a:tc>
+                  <a:txBody>
+                    <a:bodyPr/>
+                    <a:lstStyle/>
+                    <a:p>
+                      <a:r>
+                        <a:rPr lang="en-US" sz="1300" i="1" kern="1200" dirty="0" err="1">
+                          <a:solidFill>
+                            <a:schemeClr val="tx1"/>
+                          </a:solidFill>
+                          <a:effectLst/>
+                          <a:latin typeface="+mn-lt"/>
+                          <a:ea typeface="+mn-ea"/>
+                          <a:cs typeface="+mn-cs"/>
+                        </a:rPr>
+                        <a:t>nemd_cover</a:t>
+                      </a:r>
+                      <a:r>
+                        <a:rPr lang="en-US" sz="1300" i="1" kern="1200" dirty="0">
+                          <a:solidFill>
+                            <a:schemeClr val="tx1"/>
+                          </a:solidFill>
+                          <a:effectLst/>
+                          <a:latin typeface="+mn-lt"/>
+                          <a:ea typeface="+mn-ea"/>
+                          <a:cs typeface="+mn-cs"/>
+                        </a:rPr>
+                        <a:t> workflow </a:t>
+                      </a:r>
+                      <a:r>
+                        <a:rPr lang="en-US" sz="1300" i="1" kern="1200" dirty="0" err="1">
+                          <a:solidFill>
+                            <a:schemeClr val="tx1"/>
+                          </a:solidFill>
+                          <a:effectLst/>
+                          <a:latin typeface="+mn-lt"/>
+                          <a:ea typeface="+mn-ea"/>
+                          <a:cs typeface="+mn-cs"/>
+                        </a:rPr>
+                        <a:t>test_workflow_test.py</a:t>
+                      </a:r>
+                      <a:endParaRPr lang="en-US" sz="1300" i="1" kern="1200" dirty="0">
+                        <a:solidFill>
+                          <a:schemeClr val="tx1"/>
+                        </a:solidFill>
+                        <a:effectLst/>
+                        <a:latin typeface="+mn-lt"/>
+                        <a:ea typeface="+mn-ea"/>
+                        <a:cs typeface="+mn-cs"/>
+                      </a:endParaRPr>
+                    </a:p>
+                  </a:txBody>
+                  <a:tcPr marL="0" marR="0">
+                    <a:lnL w="12700" cap="flat" cmpd="sng" algn="ctr">
+                      <a:noFill/>
+                      <a:prstDash val="solid"/>
+                      <a:round/>
+                      <a:headEnd type="none" w="med" len="med"/>
+                      <a:tailEnd type="none" w="med" len="med"/>
+                    </a:lnL>
+                    <a:lnR w="12700" cap="flat" cmpd="sng" algn="ctr">
+                      <a:noFill/>
+                      <a:prstDash val="solid"/>
+                      <a:round/>
+                      <a:headEnd type="none" w="med" len="med"/>
+                      <a:tailEnd type="none" w="med" len="med"/>
+                    </a:lnR>
+                    <a:lnT w="12700" cap="flat" cmpd="sng" algn="ctr">
+                      <a:noFill/>
+                      <a:prstDash val="solid"/>
+                      <a:round/>
+                      <a:headEnd type="none" w="med" len="med"/>
+                      <a:tailEnd type="none" w="med" len="med"/>
+                    </a:lnT>
+                    <a:lnB w="12700" cap="flat" cmpd="sng" algn="ctr">
+                      <a:noFill/>
+                      <a:prstDash val="solid"/>
+                      <a:round/>
+                      <a:headEnd type="none" w="med" len="med"/>
+                      <a:tailEnd type="none" w="med" len="med"/>
+                    </a:lnB>
+                  </a:tcPr>
+                </a:tc>
+                <a:tc>
+                  <a:txBody>
+                    <a:bodyPr/>
+                    <a:lstStyle/>
+                    <a:p>
+                      <a:pPr algn="l"/>
+                      <a:r>
+                        <a:rPr lang="en-US" sz="1300" kern="1200" dirty="0">
+                          <a:solidFill>
+                            <a:schemeClr val="tx1"/>
+                          </a:solidFill>
+                          <a:latin typeface="+mn-lt"/>
+                          <a:ea typeface="+mn-ea"/>
+                          <a:cs typeface="+mn-cs"/>
+                        </a:rPr>
+                        <a:t>analyze </a:t>
+                      </a:r>
+                      <a:r>
+                        <a:rPr lang="en-US" sz="1300" kern="1200" dirty="0" err="1">
+                          <a:solidFill>
+                            <a:schemeClr val="tx1"/>
+                          </a:solidFill>
+                          <a:latin typeface="+mn-lt"/>
+                          <a:ea typeface="+mn-ea"/>
+                          <a:cs typeface="+mn-cs"/>
+                        </a:rPr>
+                        <a:t>test_workflow_test.py</a:t>
+                      </a:r>
+                      <a:r>
+                        <a:rPr lang="en-US" sz="1300" kern="1200" dirty="0">
+                          <a:solidFill>
+                            <a:schemeClr val="tx1"/>
+                          </a:solidFill>
+                          <a:latin typeface="+mn-lt"/>
+                          <a:ea typeface="+mn-ea"/>
+                          <a:cs typeface="+mn-cs"/>
+                        </a:rPr>
+                        <a:t> only</a:t>
+                      </a:r>
+                    </a:p>
+                  </a:txBody>
+                  <a:tcPr marL="0" marR="0">
+                    <a:lnL w="12700" cap="flat" cmpd="sng" algn="ctr">
+                      <a:noFill/>
+                      <a:prstDash val="solid"/>
+                      <a:round/>
+                      <a:headEnd type="none" w="med" len="med"/>
+                      <a:tailEnd type="none" w="med" len="med"/>
+                    </a:lnL>
+                    <a:lnR w="12700" cap="flat" cmpd="sng" algn="ctr">
+                      <a:noFill/>
+                      <a:prstDash val="solid"/>
+                      <a:round/>
+                      <a:headEnd type="none" w="med" len="med"/>
+                      <a:tailEnd type="none" w="med" len="med"/>
+                    </a:lnR>
+                    <a:lnT w="12700" cap="flat" cmpd="sng" algn="ctr">
+                      <a:noFill/>
+                      <a:prstDash val="solid"/>
+                      <a:round/>
+                      <a:headEnd type="none" w="med" len="med"/>
+                      <a:tailEnd type="none" w="med" len="med"/>
+                    </a:lnT>
+                    <a:lnB w="12700" cap="flat" cmpd="sng" algn="ctr">
+                      <a:noFill/>
+                      <a:prstDash val="solid"/>
+                      <a:round/>
+                      <a:headEnd type="none" w="med" len="med"/>
+                      <a:tailEnd type="none" w="med" len="med"/>
+                    </a:lnB>
+                  </a:tcPr>
+                </a:tc>
+                <a:extLst>
+                  <a:ext uri="{0D108BD9-81ED-4DB2-BD59-A6C34878D82A}">
+                    <a16:rowId xmlns:a16="http://schemas.microsoft.com/office/drawing/2014/main" val="1903814008"/>
+                  </a:ext>
+                </a:extLst>
+              </a:tr>
+              <a:tr h="359346">
+                <a:tc>
+                  <a:txBody>
+                    <a:bodyPr/>
+                    <a:lstStyle/>
+                    <a:p>
+                      <a:r>
+                        <a:rPr lang="en-US" sz="1300" i="1" kern="1200" dirty="0" err="1">
+                          <a:solidFill>
+                            <a:schemeClr val="tx1"/>
+                          </a:solidFill>
+                          <a:effectLst/>
+                          <a:latin typeface="+mn-lt"/>
+                          <a:ea typeface="+mn-ea"/>
+                          <a:cs typeface="+mn-cs"/>
+                        </a:rPr>
+                        <a:t>nemd_cover</a:t>
+                      </a:r>
+                      <a:r>
+                        <a:rPr lang="en-US" sz="1300" i="1" kern="1200" dirty="0">
+                          <a:solidFill>
+                            <a:schemeClr val="tx1"/>
+                          </a:solidFill>
+                          <a:effectLst/>
+                          <a:latin typeface="+mn-lt"/>
+                          <a:ea typeface="+mn-ea"/>
+                          <a:cs typeface="+mn-cs"/>
+                        </a:rPr>
+                        <a:t> module </a:t>
+                      </a:r>
+                      <a:r>
+                        <a:rPr lang="en-US" sz="1300" i="1" kern="1200" dirty="0" err="1">
+                          <a:solidFill>
+                            <a:schemeClr val="tx1"/>
+                          </a:solidFill>
+                          <a:effectLst/>
+                          <a:latin typeface="+mn-lt"/>
+                          <a:ea typeface="+mn-ea"/>
+                          <a:cs typeface="+mn-cs"/>
+                        </a:rPr>
+                        <a:t>cru_test.py</a:t>
+                      </a:r>
+                      <a:r>
+                        <a:rPr lang="en-US" sz="1300" i="1" kern="1200" dirty="0">
+                          <a:solidFill>
+                            <a:schemeClr val="tx1"/>
+                          </a:solidFill>
+                          <a:effectLst/>
+                          <a:latin typeface="+mn-lt"/>
+                          <a:ea typeface="+mn-ea"/>
+                          <a:cs typeface="+mn-cs"/>
+                        </a:rPr>
+                        <a:t> </a:t>
+                      </a:r>
+                      <a:r>
+                        <a:rPr lang="en-US" sz="1300" i="1" kern="1200" dirty="0" err="1">
+                          <a:solidFill>
+                            <a:schemeClr val="tx1"/>
+                          </a:solidFill>
+                          <a:effectLst/>
+                          <a:latin typeface="+mn-lt"/>
+                          <a:ea typeface="+mn-ea"/>
+                          <a:cs typeface="+mn-cs"/>
+                        </a:rPr>
+                        <a:t>osutils_test.py</a:t>
+                      </a:r>
+                      <a:endParaRPr lang="en-US" sz="1300" i="1" kern="1200" dirty="0">
+                        <a:solidFill>
+                          <a:schemeClr val="tx1"/>
+                        </a:solidFill>
+                        <a:effectLst/>
+                        <a:latin typeface="+mn-lt"/>
+                        <a:ea typeface="+mn-ea"/>
+                        <a:cs typeface="+mn-cs"/>
+                      </a:endParaRPr>
+                    </a:p>
+                  </a:txBody>
+                  <a:tcPr marL="0" marR="0">
+                    <a:lnL w="12700" cap="flat" cmpd="sng" algn="ctr">
+                      <a:noFill/>
+                      <a:prstDash val="solid"/>
+                      <a:round/>
+                      <a:headEnd type="none" w="med" len="med"/>
+                      <a:tailEnd type="none" w="med" len="med"/>
+                    </a:lnL>
+                    <a:lnR w="12700" cap="flat" cmpd="sng" algn="ctr">
+                      <a:noFill/>
+                      <a:prstDash val="solid"/>
+                      <a:round/>
+                      <a:headEnd type="none" w="med" len="med"/>
+                      <a:tailEnd type="none" w="med" len="med"/>
+                    </a:lnR>
+                    <a:lnT w="12700" cap="flat" cmpd="sng" algn="ctr">
+                      <a:noFill/>
+                      <a:prstDash val="solid"/>
+                      <a:round/>
+                      <a:headEnd type="none" w="med" len="med"/>
+                      <a:tailEnd type="none" w="med" len="med"/>
+                    </a:lnT>
+                    <a:lnB w="12700" cap="flat" cmpd="sng" algn="ctr">
+                      <a:noFill/>
+                      <a:prstDash val="solid"/>
+                      <a:round/>
+                      <a:headEnd type="none" w="med" len="med"/>
+                      <a:tailEnd type="none" w="med" len="med"/>
+                    </a:lnB>
+                  </a:tcPr>
+                </a:tc>
+                <a:tc>
+                  <a:txBody>
+                    <a:bodyPr/>
+                    <a:lstStyle/>
+                    <a:p>
+                      <a:pPr algn="l"/>
+                      <a:r>
+                        <a:rPr lang="en-US" sz="1300" kern="1200" dirty="0">
+                          <a:solidFill>
+                            <a:schemeClr val="tx1"/>
+                          </a:solidFill>
+                          <a:latin typeface="+mn-lt"/>
+                          <a:ea typeface="+mn-ea"/>
+                          <a:cs typeface="+mn-cs"/>
+                        </a:rPr>
+                        <a:t>analyze multiple specific tests</a:t>
+                      </a:r>
+                    </a:p>
+                  </a:txBody>
+                  <a:tcPr marL="0" marR="0">
+                    <a:lnL w="12700" cap="flat" cmpd="sng" algn="ctr">
+                      <a:noFill/>
+                      <a:prstDash val="solid"/>
+                      <a:round/>
+                      <a:headEnd type="none" w="med" len="med"/>
+                      <a:tailEnd type="none" w="med" len="med"/>
+                    </a:lnL>
+                    <a:lnR w="12700" cap="flat" cmpd="sng" algn="ctr">
+                      <a:noFill/>
+                      <a:prstDash val="solid"/>
+                      <a:round/>
+                      <a:headEnd type="none" w="med" len="med"/>
+                      <a:tailEnd type="none" w="med" len="med"/>
+                    </a:lnR>
+                    <a:lnT w="12700" cap="flat" cmpd="sng" algn="ctr">
+                      <a:noFill/>
+                      <a:prstDash val="solid"/>
+                      <a:round/>
+                      <a:headEnd type="none" w="med" len="med"/>
+                      <a:tailEnd type="none" w="med" len="med"/>
+                    </a:lnT>
+                    <a:lnB w="12700" cap="flat" cmpd="sng" algn="ctr">
+                      <a:noFill/>
+                      <a:prstDash val="solid"/>
+                      <a:round/>
+                      <a:headEnd type="none" w="med" len="med"/>
+                      <a:tailEnd type="none" w="med" len="med"/>
+                    </a:lnB>
+                  </a:tcPr>
+                </a:tc>
+                <a:extLst>
+                  <a:ext uri="{0D108BD9-81ED-4DB2-BD59-A6C34878D82A}">
+                    <a16:rowId xmlns:a16="http://schemas.microsoft.com/office/drawing/2014/main" val="2700076492"/>
+                  </a:ext>
+                </a:extLst>
+              </a:tr>
+            </a:tbl>
+          </a:graphicData>
+        </a:graphic>
+      </p:graphicFrame>
+      <p:sp>
+        <p:nvSpPr>
+          <p:cNvPr id="17" name="TextBox 16">
+            <a:extLst>
+              <a:ext uri="{FF2B5EF4-FFF2-40B4-BE49-F238E27FC236}">
+                <a16:creationId xmlns:a16="http://schemas.microsoft.com/office/drawing/2014/main" id="{6A96FABA-B7F8-19BB-7F66-729319E7CC40}"/>
+              </a:ext>
+            </a:extLst>
+          </p:cNvPr>
+          <p:cNvSpPr txBox="1"/>
+          <p:nvPr/>
+        </p:nvSpPr>
+        <p:spPr>
+          <a:xfrm>
+            <a:off x="6227805" y="290983"/>
+            <a:ext cx="5461687" cy="369332"/>
+          </a:xfrm>
+          <a:prstGeom prst="rect">
+            <a:avLst/>
+          </a:prstGeom>
+          <a:noFill/>
+        </p:spPr>
+        <p:txBody>
+          <a:bodyPr wrap="square">
+            <a:spAutoFit/>
+          </a:bodyPr>
+          <a:lstStyle/>
+          <a:p>
+            <a:pPr marL="0" marR="0" lvl="0" indent="0" algn="ctr" defTabSz="914400" rtl="0" eaLnBrk="1" fontAlgn="auto" latinLnBrk="0" hangingPunct="1">
+              <a:lnSpc>
+                <a:spcPct val="100000"/>
+              </a:lnSpc>
+              <a:spcBef>
+                <a:spcPts val="0"/>
+              </a:spcBef>
+              <a:spcAft>
+                <a:spcPts val="0"/>
+              </a:spcAft>
+              <a:buClrTx/>
+              <a:buSzTx/>
+              <a:buFontTx/>
+              <a:buNone/>
+              <a:tabLst/>
+              <a:defRPr/>
+            </a:pPr>
+            <a:r>
+              <a:rPr lang="en-US" sz="1800" kern="1200" dirty="0">
+                <a:solidFill>
+                  <a:schemeClr val="tx1"/>
+                </a:solidFill>
+                <a:effectLst/>
+                <a:latin typeface="+mn-lt"/>
+                <a:ea typeface="+mn-ea"/>
+                <a:cs typeface="+mn-cs"/>
+              </a:rPr>
+              <a:t>Run coverage analysis and generate report</a:t>
+            </a:r>
+            <a:endParaRPr lang="en-US" sz="1800" dirty="0">
+              <a:latin typeface="Times New Roman" panose="02020603050405020304" pitchFamily="18" charset="0"/>
+              <a:cs typeface="Times New Roman" panose="02020603050405020304" pitchFamily="18" charset="0"/>
+            </a:endParaRPr>
+          </a:p>
+        </p:txBody>
+      </p:sp>
     </p:spTree>
     <p:extLst>
       <p:ext uri="{BB962C8B-B14F-4D97-AF65-F5344CB8AC3E}">

</xml_diff>

<commit_message>
ptest 1 - 6 added to docs/power_point/nemd.pptx
</commit_message>
<xml_diff>
--- a/docs/power_point/nemd.pptx
+++ b/docs/power_point/nemd.pptx
@@ -5,7 +5,7 @@
     <p:sldMasterId id="2147483648" r:id="rId1"/>
   </p:sldMasterIdLst>
   <p:notesMasterIdLst>
-    <p:notesMasterId r:id="rId20"/>
+    <p:notesMasterId r:id="rId23"/>
   </p:notesMasterIdLst>
   <p:sldIdLst>
     <p:sldId id="256" r:id="rId2"/>
@@ -23,9 +23,12 @@
     <p:sldId id="262" r:id="rId14"/>
     <p:sldId id="271" r:id="rId15"/>
     <p:sldId id="267" r:id="rId16"/>
-    <p:sldId id="268" r:id="rId17"/>
-    <p:sldId id="272" r:id="rId18"/>
-    <p:sldId id="265" r:id="rId19"/>
+    <p:sldId id="276" r:id="rId17"/>
+    <p:sldId id="277" r:id="rId18"/>
+    <p:sldId id="278" r:id="rId19"/>
+    <p:sldId id="268" r:id="rId20"/>
+    <p:sldId id="272" r:id="rId21"/>
+    <p:sldId id="265" r:id="rId22"/>
   </p:sldIdLst>
   <p:sldSz cx="12192000" cy="6858000"/>
   <p:notesSz cx="6858000" cy="9144000"/>
@@ -21968,36 +21971,6 @@
           </a:p>
         </p:txBody>
       </p:sp>
-      <p:pic>
-        <p:nvPicPr>
-          <p:cNvPr id="5" name="Picture 4">
-            <a:extLst>
-              <a:ext uri="{FF2B5EF4-FFF2-40B4-BE49-F238E27FC236}">
-                <a16:creationId xmlns:a16="http://schemas.microsoft.com/office/drawing/2014/main" id="{C6BFBF89-8989-C94F-A095-43490545E1AF}"/>
-              </a:ext>
-            </a:extLst>
-          </p:cNvPr>
-          <p:cNvPicPr>
-            <a:picLocks noChangeAspect="1"/>
-          </p:cNvPicPr>
-          <p:nvPr/>
-        </p:nvPicPr>
-        <p:blipFill>
-          <a:blip r:embed="rId2"/>
-          <a:stretch>
-            <a:fillRect/>
-          </a:stretch>
-        </p:blipFill>
-        <p:spPr>
-          <a:xfrm>
-            <a:off x="381000" y="2277533"/>
-            <a:ext cx="5715000" cy="3429000"/>
-          </a:xfrm>
-          <a:prstGeom prst="rect">
-            <a:avLst/>
-          </a:prstGeom>
-        </p:spPr>
-      </p:pic>
       <p:sp>
         <p:nvSpPr>
           <p:cNvPr id="6" name="Rectangle 5">
@@ -22012,8 +21985,8 @@
         </p:nvSpPr>
         <p:spPr>
           <a:xfrm>
-            <a:off x="922867" y="1506022"/>
-            <a:ext cx="9643533" cy="369332"/>
+            <a:off x="538766" y="1605949"/>
+            <a:ext cx="5446055" cy="369332"/>
           </a:xfrm>
           <a:prstGeom prst="rect">
             <a:avLst/>
@@ -22027,15 +22000,7 @@
           <a:p>
             <a:r>
               <a:rPr lang="en-US" dirty="0"/>
-              <a:t>0001: </a:t>
-            </a:r>
-            <a:r>
-              <a:rPr lang="en-US" dirty="0" err="1"/>
-              <a:t>buld</a:t>
-            </a:r>
-            <a:r>
-              <a:rPr lang="en-US" dirty="0"/>
-              <a:t> amorphous structure with via grid method 100 million  Argon molecules via grid method</a:t>
+              <a:t>0001: Grided Amorphous Structure of Argon Atoms</a:t>
             </a:r>
           </a:p>
         </p:txBody>
@@ -22054,8 +22019,8 @@
         </p:nvSpPr>
         <p:spPr>
           <a:xfrm>
-            <a:off x="1751651" y="5952067"/>
-            <a:ext cx="3168431" cy="646331"/>
+            <a:off x="1199476" y="6169580"/>
+            <a:ext cx="3494867" cy="369332"/>
           </a:xfrm>
           <a:prstGeom prst="rect">
             <a:avLst/>
@@ -22070,14 +22035,7 @@
             <a:pPr algn="ctr"/>
             <a:r>
               <a:rPr lang="en-US" dirty="0"/>
-              <a:t>1.4 GHz Quad-Core Intel Core i5</a:t>
-            </a:r>
-          </a:p>
-          <a:p>
-            <a:pPr algn="ctr"/>
-            <a:r>
-              <a:rPr lang="en-US" dirty="0"/>
-              <a:t>16 GB 2133 MHz LPDDR3</a:t>
+              <a:t>Mac mini: Apple M4, 16GB LPDDR5</a:t>
             </a:r>
           </a:p>
         </p:txBody>
@@ -22111,6 +22069,304 @@
           </a:p>
         </p:txBody>
       </p:sp>
+      <p:pic>
+        <p:nvPicPr>
+          <p:cNvPr id="23" name="Graphic 22">
+            <a:extLst>
+              <a:ext uri="{FF2B5EF4-FFF2-40B4-BE49-F238E27FC236}">
+                <a16:creationId xmlns:a16="http://schemas.microsoft.com/office/drawing/2014/main" id="{E983395F-DD1A-D6BB-FB3A-F98030330497}"/>
+              </a:ext>
+            </a:extLst>
+          </p:cNvPr>
+          <p:cNvPicPr>
+            <a:picLocks noChangeAspect="1"/>
+          </p:cNvPicPr>
+          <p:nvPr/>
+        </p:nvPicPr>
+        <p:blipFill>
+          <a:blip r:embed="rId2">
+            <a:extLst>
+              <a:ext uri="{96DAC541-7B7A-43D3-8B79-37D633B846F1}">
+                <asvg:svgBlip xmlns:asvg="http://schemas.microsoft.com/office/drawing/2016/SVG/main" r:embed="rId3"/>
+              </a:ext>
+            </a:extLst>
+          </a:blip>
+          <a:stretch>
+            <a:fillRect/>
+          </a:stretch>
+        </p:blipFill>
+        <p:spPr>
+          <a:xfrm>
+            <a:off x="361683" y="2054780"/>
+            <a:ext cx="5486400" cy="4114800"/>
+          </a:xfrm>
+          <a:prstGeom prst="rect">
+            <a:avLst/>
+          </a:prstGeom>
+        </p:spPr>
+      </p:pic>
+      <p:sp>
+        <p:nvSpPr>
+          <p:cNvPr id="12" name="TextBox 11">
+            <a:extLst>
+              <a:ext uri="{FF2B5EF4-FFF2-40B4-BE49-F238E27FC236}">
+                <a16:creationId xmlns:a16="http://schemas.microsoft.com/office/drawing/2014/main" id="{2C9635E0-25D1-4F99-062C-1853B502FBE9}"/>
+              </a:ext>
+            </a:extLst>
+          </p:cNvPr>
+          <p:cNvSpPr txBox="1"/>
+          <p:nvPr/>
+        </p:nvSpPr>
+        <p:spPr>
+          <a:xfrm>
+            <a:off x="2334517" y="2176115"/>
+            <a:ext cx="2105472" cy="338554"/>
+          </a:xfrm>
+          <a:prstGeom prst="rect">
+            <a:avLst/>
+          </a:prstGeom>
+          <a:noFill/>
+        </p:spPr>
+        <p:txBody>
+          <a:bodyPr wrap="square">
+            <a:spAutoFit/>
+          </a:bodyPr>
+          <a:lstStyle/>
+          <a:p>
+            <a:r>
+              <a:rPr lang="en-US" sz="1600" dirty="0">
+                <a:solidFill>
+                  <a:srgbClr val="C00000"/>
+                </a:solidFill>
+              </a:rPr>
+              <a:t> 20 min: 100 million </a:t>
+            </a:r>
+            <a:r>
+              <a:rPr lang="en-US" sz="1600" dirty="0" err="1">
+                <a:solidFill>
+                  <a:srgbClr val="C00000"/>
+                </a:solidFill>
+              </a:rPr>
+              <a:t>Ar</a:t>
+            </a:r>
+            <a:r>
+              <a:rPr lang="en-US" sz="1600" dirty="0">
+                <a:solidFill>
+                  <a:srgbClr val="C00000"/>
+                </a:solidFill>
+              </a:rPr>
+              <a:t>  </a:t>
+            </a:r>
+          </a:p>
+        </p:txBody>
+      </p:sp>
+      <p:cxnSp>
+        <p:nvCxnSpPr>
+          <p:cNvPr id="25" name="Straight Arrow Connector 24">
+            <a:extLst>
+              <a:ext uri="{FF2B5EF4-FFF2-40B4-BE49-F238E27FC236}">
+                <a16:creationId xmlns:a16="http://schemas.microsoft.com/office/drawing/2014/main" id="{BE3C28B7-43A3-3FB3-5C36-D4BF2DE44E38}"/>
+              </a:ext>
+            </a:extLst>
+          </p:cNvPr>
+          <p:cNvCxnSpPr/>
+          <p:nvPr/>
+        </p:nvCxnSpPr>
+        <p:spPr>
+          <a:xfrm>
+            <a:off x="4439989" y="2345392"/>
+            <a:ext cx="302654" cy="0"/>
+          </a:xfrm>
+          <a:prstGeom prst="straightConnector1">
+            <a:avLst/>
+          </a:prstGeom>
+          <a:ln>
+            <a:solidFill>
+              <a:srgbClr val="C00000"/>
+            </a:solidFill>
+            <a:tailEnd type="triangle"/>
+          </a:ln>
+        </p:spPr>
+        <p:style>
+          <a:lnRef idx="1">
+            <a:schemeClr val="accent6"/>
+          </a:lnRef>
+          <a:fillRef idx="0">
+            <a:schemeClr val="accent6"/>
+          </a:fillRef>
+          <a:effectRef idx="0">
+            <a:schemeClr val="accent6"/>
+          </a:effectRef>
+          <a:fontRef idx="minor">
+            <a:schemeClr val="tx1"/>
+          </a:fontRef>
+        </p:style>
+      </p:cxnSp>
+      <p:pic>
+        <p:nvPicPr>
+          <p:cNvPr id="28" name="Graphic 27">
+            <a:extLst>
+              <a:ext uri="{FF2B5EF4-FFF2-40B4-BE49-F238E27FC236}">
+                <a16:creationId xmlns:a16="http://schemas.microsoft.com/office/drawing/2014/main" id="{7D3CC966-FBD0-5F88-856B-0220834E920B}"/>
+              </a:ext>
+            </a:extLst>
+          </p:cNvPr>
+          <p:cNvPicPr>
+            <a:picLocks noChangeAspect="1"/>
+          </p:cNvPicPr>
+          <p:nvPr/>
+        </p:nvPicPr>
+        <p:blipFill>
+          <a:blip r:embed="rId4">
+            <a:extLst>
+              <a:ext uri="{96DAC541-7B7A-43D3-8B79-37D633B846F1}">
+                <asvg:svgBlip xmlns:asvg="http://schemas.microsoft.com/office/drawing/2016/SVG/main" r:embed="rId5"/>
+              </a:ext>
+            </a:extLst>
+          </a:blip>
+          <a:stretch>
+            <a:fillRect/>
+          </a:stretch>
+        </p:blipFill>
+        <p:spPr>
+          <a:xfrm>
+            <a:off x="6172200" y="2054780"/>
+            <a:ext cx="5486400" cy="4114800"/>
+          </a:xfrm>
+          <a:prstGeom prst="rect">
+            <a:avLst/>
+          </a:prstGeom>
+        </p:spPr>
+      </p:pic>
+      <p:sp>
+        <p:nvSpPr>
+          <p:cNvPr id="29" name="Rectangle 28">
+            <a:extLst>
+              <a:ext uri="{FF2B5EF4-FFF2-40B4-BE49-F238E27FC236}">
+                <a16:creationId xmlns:a16="http://schemas.microsoft.com/office/drawing/2014/main" id="{66608C93-331A-F65F-620B-533A94C75637}"/>
+              </a:ext>
+            </a:extLst>
+          </p:cNvPr>
+          <p:cNvSpPr/>
+          <p:nvPr/>
+        </p:nvSpPr>
+        <p:spPr>
+          <a:xfrm>
+            <a:off x="6284255" y="1605949"/>
+            <a:ext cx="5446055" cy="369332"/>
+          </a:xfrm>
+          <a:prstGeom prst="rect">
+            <a:avLst/>
+          </a:prstGeom>
+        </p:spPr>
+        <p:txBody>
+          <a:bodyPr wrap="square">
+            <a:spAutoFit/>
+          </a:bodyPr>
+          <a:lstStyle/>
+          <a:p>
+            <a:r>
+              <a:rPr lang="en-US" dirty="0"/>
+              <a:t>0002: Grided Amorphous Structure of Butane Molecules</a:t>
+            </a:r>
+          </a:p>
+        </p:txBody>
+      </p:sp>
+      <p:sp>
+        <p:nvSpPr>
+          <p:cNvPr id="30" name="TextBox 29">
+            <a:extLst>
+              <a:ext uri="{FF2B5EF4-FFF2-40B4-BE49-F238E27FC236}">
+                <a16:creationId xmlns:a16="http://schemas.microsoft.com/office/drawing/2014/main" id="{CDCB42D5-02D1-7A2C-322B-0B2F65AB9DDF}"/>
+              </a:ext>
+            </a:extLst>
+          </p:cNvPr>
+          <p:cNvSpPr txBox="1"/>
+          <p:nvPr/>
+        </p:nvSpPr>
+        <p:spPr>
+          <a:xfrm>
+            <a:off x="9140030" y="2763539"/>
+            <a:ext cx="1684340" cy="584775"/>
+          </a:xfrm>
+          <a:prstGeom prst="rect">
+            <a:avLst/>
+          </a:prstGeom>
+          <a:noFill/>
+        </p:spPr>
+        <p:txBody>
+          <a:bodyPr wrap="square">
+            <a:spAutoFit/>
+          </a:bodyPr>
+          <a:lstStyle/>
+          <a:p>
+            <a:pPr algn="ctr"/>
+            <a:r>
+              <a:rPr lang="en-US" sz="1600" dirty="0">
+                <a:solidFill>
+                  <a:srgbClr val="C00000"/>
+                </a:solidFill>
+              </a:rPr>
+              <a:t> 2.82 min</a:t>
+            </a:r>
+          </a:p>
+          <a:p>
+            <a:pPr algn="ctr"/>
+            <a:r>
+              <a:rPr lang="en-US" sz="1600" dirty="0">
+                <a:solidFill>
+                  <a:srgbClr val="C00000"/>
+                </a:solidFill>
+              </a:rPr>
+              <a:t>10 million butane </a:t>
+            </a:r>
+          </a:p>
+        </p:txBody>
+      </p:sp>
+      <p:cxnSp>
+        <p:nvCxnSpPr>
+          <p:cNvPr id="31" name="Straight Arrow Connector 30">
+            <a:extLst>
+              <a:ext uri="{FF2B5EF4-FFF2-40B4-BE49-F238E27FC236}">
+                <a16:creationId xmlns:a16="http://schemas.microsoft.com/office/drawing/2014/main" id="{F8D9CC07-5EBB-9AA5-B931-4ACB79A83F24}"/>
+              </a:ext>
+            </a:extLst>
+          </p:cNvPr>
+          <p:cNvCxnSpPr>
+            <a:cxnSpLocks/>
+          </p:cNvCxnSpPr>
+          <p:nvPr/>
+        </p:nvCxnSpPr>
+        <p:spPr>
+          <a:xfrm>
+            <a:off x="10328857" y="3348314"/>
+            <a:ext cx="227304" cy="93385"/>
+          </a:xfrm>
+          <a:prstGeom prst="straightConnector1">
+            <a:avLst/>
+          </a:prstGeom>
+          <a:ln>
+            <a:solidFill>
+              <a:srgbClr val="C00000"/>
+            </a:solidFill>
+            <a:tailEnd type="triangle"/>
+          </a:ln>
+        </p:spPr>
+        <p:style>
+          <a:lnRef idx="1">
+            <a:schemeClr val="accent6"/>
+          </a:lnRef>
+          <a:fillRef idx="0">
+            <a:schemeClr val="accent6"/>
+          </a:fillRef>
+          <a:effectRef idx="0">
+            <a:schemeClr val="accent6"/>
+          </a:effectRef>
+          <a:fontRef idx="minor">
+            <a:schemeClr val="tx1"/>
+          </a:fontRef>
+        </p:style>
+      </p:cxnSp>
     </p:spTree>
     <p:extLst>
       <p:ext uri="{BB962C8B-B14F-4D97-AF65-F5344CB8AC3E}">
@@ -22125,6 +22381,1429 @@
 </file>
 
 <file path=ppt/slides/slide16.xml><?xml version="1.0" encoding="utf-8"?>
+<p:sld xmlns:a="http://schemas.openxmlformats.org/drawingml/2006/main" xmlns:r="http://schemas.openxmlformats.org/officeDocument/2006/relationships" xmlns:p="http://schemas.openxmlformats.org/presentationml/2006/main">
+  <p:cSld>
+    <p:spTree>
+      <p:nvGrpSpPr>
+        <p:cNvPr id="1" name="">
+          <a:extLst>
+            <a:ext uri="{FF2B5EF4-FFF2-40B4-BE49-F238E27FC236}">
+              <a16:creationId xmlns:a16="http://schemas.microsoft.com/office/drawing/2014/main" id="{0EDE386F-D01B-61C8-CC01-4FB87CC8C4C6}"/>
+            </a:ext>
+          </a:extLst>
+        </p:cNvPr>
+        <p:cNvGrpSpPr/>
+        <p:nvPr/>
+      </p:nvGrpSpPr>
+      <p:grpSpPr>
+        <a:xfrm>
+          <a:off x="0" y="0"/>
+          <a:ext cx="0" cy="0"/>
+          <a:chOff x="0" y="0"/>
+          <a:chExt cx="0" cy="0"/>
+        </a:xfrm>
+      </p:grpSpPr>
+      <p:sp>
+        <p:nvSpPr>
+          <p:cNvPr id="2" name="Title 1">
+            <a:extLst>
+              <a:ext uri="{FF2B5EF4-FFF2-40B4-BE49-F238E27FC236}">
+                <a16:creationId xmlns:a16="http://schemas.microsoft.com/office/drawing/2014/main" id="{9EEB15EB-9855-2DBB-E76B-24FFD2FEA16B}"/>
+              </a:ext>
+            </a:extLst>
+          </p:cNvPr>
+          <p:cNvSpPr>
+            <a:spLocks noGrp="1"/>
+          </p:cNvSpPr>
+          <p:nvPr>
+            <p:ph type="title"/>
+          </p:nvPr>
+        </p:nvSpPr>
+        <p:spPr>
+          <a:xfrm>
+            <a:off x="838200" y="365125"/>
+            <a:ext cx="4415852" cy="1325563"/>
+          </a:xfrm>
+        </p:spPr>
+        <p:txBody>
+          <a:bodyPr/>
+          <a:lstStyle/>
+          <a:p>
+            <a:r>
+              <a:rPr lang="en-US" dirty="0"/>
+              <a:t>Performance Test</a:t>
+            </a:r>
+          </a:p>
+        </p:txBody>
+      </p:sp>
+      <p:sp>
+        <p:nvSpPr>
+          <p:cNvPr id="6" name="Rectangle 5">
+            <a:extLst>
+              <a:ext uri="{FF2B5EF4-FFF2-40B4-BE49-F238E27FC236}">
+                <a16:creationId xmlns:a16="http://schemas.microsoft.com/office/drawing/2014/main" id="{5DFEF9FC-DCA4-F8D0-4AFC-D07CAB07C9F2}"/>
+              </a:ext>
+            </a:extLst>
+          </p:cNvPr>
+          <p:cNvSpPr/>
+          <p:nvPr/>
+        </p:nvSpPr>
+        <p:spPr>
+          <a:xfrm>
+            <a:off x="538766" y="1605949"/>
+            <a:ext cx="5446055" cy="369332"/>
+          </a:xfrm>
+          <a:prstGeom prst="rect">
+            <a:avLst/>
+          </a:prstGeom>
+        </p:spPr>
+        <p:txBody>
+          <a:bodyPr wrap="square">
+            <a:spAutoFit/>
+          </a:bodyPr>
+          <a:lstStyle/>
+          <a:p>
+            <a:r>
+              <a:rPr lang="en-US" dirty="0"/>
+              <a:t>0003: Packed Amorphous Structure of Argon Atoms</a:t>
+            </a:r>
+          </a:p>
+        </p:txBody>
+      </p:sp>
+      <p:sp>
+        <p:nvSpPr>
+          <p:cNvPr id="8" name="Rectangle 7">
+            <a:extLst>
+              <a:ext uri="{FF2B5EF4-FFF2-40B4-BE49-F238E27FC236}">
+                <a16:creationId xmlns:a16="http://schemas.microsoft.com/office/drawing/2014/main" id="{674780FD-1A5C-59A7-F3B0-36B65C300F2A}"/>
+              </a:ext>
+            </a:extLst>
+          </p:cNvPr>
+          <p:cNvSpPr/>
+          <p:nvPr/>
+        </p:nvSpPr>
+        <p:spPr>
+          <a:xfrm>
+            <a:off x="1199476" y="6169580"/>
+            <a:ext cx="3494867" cy="369332"/>
+          </a:xfrm>
+          <a:prstGeom prst="rect">
+            <a:avLst/>
+          </a:prstGeom>
+        </p:spPr>
+        <p:txBody>
+          <a:bodyPr wrap="none">
+            <a:spAutoFit/>
+          </a:bodyPr>
+          <a:lstStyle/>
+          <a:p>
+            <a:pPr algn="ctr"/>
+            <a:r>
+              <a:rPr lang="en-US" dirty="0"/>
+              <a:t>Mac mini: Apple M4, 16GB LPDDR5</a:t>
+            </a:r>
+          </a:p>
+        </p:txBody>
+      </p:sp>
+      <p:sp>
+        <p:nvSpPr>
+          <p:cNvPr id="3" name="Slide Number Placeholder 2">
+            <a:extLst>
+              <a:ext uri="{FF2B5EF4-FFF2-40B4-BE49-F238E27FC236}">
+                <a16:creationId xmlns:a16="http://schemas.microsoft.com/office/drawing/2014/main" id="{D5FC0181-8DA8-9077-A41A-E5F0ED854374}"/>
+              </a:ext>
+            </a:extLst>
+          </p:cNvPr>
+          <p:cNvSpPr>
+            <a:spLocks noGrp="1"/>
+          </p:cNvSpPr>
+          <p:nvPr>
+            <p:ph type="sldNum" sz="quarter" idx="12"/>
+          </p:nvPr>
+        </p:nvSpPr>
+        <p:spPr/>
+        <p:txBody>
+          <a:bodyPr/>
+          <a:lstStyle/>
+          <a:p>
+            <a:fld id="{CF79FC58-3559-EC47-B32E-5EF128B06581}" type="slidenum">
+              <a:rPr lang="en-US" smtClean="0"/>
+              <a:t>16</a:t>
+            </a:fld>
+            <a:endParaRPr lang="en-US"/>
+          </a:p>
+        </p:txBody>
+      </p:sp>
+      <p:sp>
+        <p:nvSpPr>
+          <p:cNvPr id="29" name="Rectangle 28">
+            <a:extLst>
+              <a:ext uri="{FF2B5EF4-FFF2-40B4-BE49-F238E27FC236}">
+                <a16:creationId xmlns:a16="http://schemas.microsoft.com/office/drawing/2014/main" id="{535B7D35-656D-2872-5095-C6E37700935A}"/>
+              </a:ext>
+            </a:extLst>
+          </p:cNvPr>
+          <p:cNvSpPr/>
+          <p:nvPr/>
+        </p:nvSpPr>
+        <p:spPr>
+          <a:xfrm>
+            <a:off x="6284255" y="1605949"/>
+            <a:ext cx="5446055" cy="369332"/>
+          </a:xfrm>
+          <a:prstGeom prst="rect">
+            <a:avLst/>
+          </a:prstGeom>
+        </p:spPr>
+        <p:txBody>
+          <a:bodyPr wrap="square">
+            <a:spAutoFit/>
+          </a:bodyPr>
+          <a:lstStyle/>
+          <a:p>
+            <a:r>
+              <a:rPr lang="en-US" dirty="0"/>
+              <a:t>0004: Grown Amorphous Structure of Butane Molecules</a:t>
+            </a:r>
+          </a:p>
+        </p:txBody>
+      </p:sp>
+      <p:pic>
+        <p:nvPicPr>
+          <p:cNvPr id="14" name="Graphic 13">
+            <a:extLst>
+              <a:ext uri="{FF2B5EF4-FFF2-40B4-BE49-F238E27FC236}">
+                <a16:creationId xmlns:a16="http://schemas.microsoft.com/office/drawing/2014/main" id="{696D45E9-9943-DA7D-FD27-C6077CA6C669}"/>
+              </a:ext>
+            </a:extLst>
+          </p:cNvPr>
+          <p:cNvPicPr>
+            <a:picLocks noChangeAspect="1"/>
+          </p:cNvPicPr>
+          <p:nvPr/>
+        </p:nvPicPr>
+        <p:blipFill>
+          <a:blip r:embed="rId2">
+            <a:extLst>
+              <a:ext uri="{96DAC541-7B7A-43D3-8B79-37D633B846F1}">
+                <asvg:svgBlip xmlns:asvg="http://schemas.microsoft.com/office/drawing/2016/SVG/main" r:embed="rId3"/>
+              </a:ext>
+            </a:extLst>
+          </a:blip>
+          <a:stretch>
+            <a:fillRect/>
+          </a:stretch>
+        </p:blipFill>
+        <p:spPr>
+          <a:xfrm>
+            <a:off x="365760" y="2057400"/>
+            <a:ext cx="5486400" cy="4114800"/>
+          </a:xfrm>
+          <a:prstGeom prst="rect">
+            <a:avLst/>
+          </a:prstGeom>
+        </p:spPr>
+      </p:pic>
+      <p:sp>
+        <p:nvSpPr>
+          <p:cNvPr id="7" name="TextBox 6">
+            <a:extLst>
+              <a:ext uri="{FF2B5EF4-FFF2-40B4-BE49-F238E27FC236}">
+                <a16:creationId xmlns:a16="http://schemas.microsoft.com/office/drawing/2014/main" id="{801371B2-9BFC-E961-5590-4CE9647BCE43}"/>
+              </a:ext>
+            </a:extLst>
+          </p:cNvPr>
+          <p:cNvSpPr txBox="1"/>
+          <p:nvPr/>
+        </p:nvSpPr>
+        <p:spPr>
+          <a:xfrm>
+            <a:off x="2452926" y="2171929"/>
+            <a:ext cx="2105472" cy="338554"/>
+          </a:xfrm>
+          <a:prstGeom prst="rect">
+            <a:avLst/>
+          </a:prstGeom>
+          <a:noFill/>
+        </p:spPr>
+        <p:txBody>
+          <a:bodyPr wrap="square">
+            <a:spAutoFit/>
+          </a:bodyPr>
+          <a:lstStyle/>
+          <a:p>
+            <a:r>
+              <a:rPr lang="en-US" sz="1600" dirty="0">
+                <a:solidFill>
+                  <a:srgbClr val="C00000"/>
+                </a:solidFill>
+              </a:rPr>
+              <a:t> 4.94 h: 0.4 million </a:t>
+            </a:r>
+            <a:r>
+              <a:rPr lang="en-US" sz="1600" dirty="0" err="1">
+                <a:solidFill>
+                  <a:srgbClr val="C00000"/>
+                </a:solidFill>
+              </a:rPr>
+              <a:t>Ar</a:t>
+            </a:r>
+            <a:r>
+              <a:rPr lang="en-US" sz="1600" dirty="0">
+                <a:solidFill>
+                  <a:srgbClr val="C00000"/>
+                </a:solidFill>
+              </a:rPr>
+              <a:t>  </a:t>
+            </a:r>
+          </a:p>
+        </p:txBody>
+      </p:sp>
+      <p:cxnSp>
+        <p:nvCxnSpPr>
+          <p:cNvPr id="15" name="Straight Arrow Connector 14">
+            <a:extLst>
+              <a:ext uri="{FF2B5EF4-FFF2-40B4-BE49-F238E27FC236}">
+                <a16:creationId xmlns:a16="http://schemas.microsoft.com/office/drawing/2014/main" id="{BB72B392-ACF9-D213-818C-3CD5C6E424FF}"/>
+              </a:ext>
+            </a:extLst>
+          </p:cNvPr>
+          <p:cNvCxnSpPr>
+            <a:cxnSpLocks/>
+          </p:cNvCxnSpPr>
+          <p:nvPr/>
+        </p:nvCxnSpPr>
+        <p:spPr>
+          <a:xfrm>
+            <a:off x="4468458" y="2341206"/>
+            <a:ext cx="240875" cy="0"/>
+          </a:xfrm>
+          <a:prstGeom prst="straightConnector1">
+            <a:avLst/>
+          </a:prstGeom>
+          <a:ln>
+            <a:solidFill>
+              <a:srgbClr val="C00000"/>
+            </a:solidFill>
+            <a:tailEnd type="triangle"/>
+          </a:ln>
+        </p:spPr>
+        <p:style>
+          <a:lnRef idx="1">
+            <a:schemeClr val="accent6"/>
+          </a:lnRef>
+          <a:fillRef idx="0">
+            <a:schemeClr val="accent6"/>
+          </a:fillRef>
+          <a:effectRef idx="0">
+            <a:schemeClr val="accent6"/>
+          </a:effectRef>
+          <a:fontRef idx="minor">
+            <a:schemeClr val="tx1"/>
+          </a:fontRef>
+        </p:style>
+      </p:cxnSp>
+      <p:pic>
+        <p:nvPicPr>
+          <p:cNvPr id="18" name="Graphic 17">
+            <a:extLst>
+              <a:ext uri="{FF2B5EF4-FFF2-40B4-BE49-F238E27FC236}">
+                <a16:creationId xmlns:a16="http://schemas.microsoft.com/office/drawing/2014/main" id="{915E00C8-7022-A3DD-E2D4-0930D52B86CE}"/>
+              </a:ext>
+            </a:extLst>
+          </p:cNvPr>
+          <p:cNvPicPr>
+            <a:picLocks noChangeAspect="1"/>
+          </p:cNvPicPr>
+          <p:nvPr/>
+        </p:nvPicPr>
+        <p:blipFill>
+          <a:blip r:embed="rId4">
+            <a:extLst>
+              <a:ext uri="{96DAC541-7B7A-43D3-8B79-37D633B846F1}">
+                <asvg:svgBlip xmlns:asvg="http://schemas.microsoft.com/office/drawing/2016/SVG/main" r:embed="rId5"/>
+              </a:ext>
+            </a:extLst>
+          </a:blip>
+          <a:stretch>
+            <a:fillRect/>
+          </a:stretch>
+        </p:blipFill>
+        <p:spPr>
+          <a:xfrm>
+            <a:off x="6172200" y="2054780"/>
+            <a:ext cx="5486400" cy="4114800"/>
+          </a:xfrm>
+          <a:prstGeom prst="rect">
+            <a:avLst/>
+          </a:prstGeom>
+        </p:spPr>
+      </p:pic>
+      <p:sp>
+        <p:nvSpPr>
+          <p:cNvPr id="19" name="TextBox 18">
+            <a:extLst>
+              <a:ext uri="{FF2B5EF4-FFF2-40B4-BE49-F238E27FC236}">
+                <a16:creationId xmlns:a16="http://schemas.microsoft.com/office/drawing/2014/main" id="{5CF2FD89-4648-2B78-E696-7A5450448B2F}"/>
+              </a:ext>
+            </a:extLst>
+          </p:cNvPr>
+          <p:cNvSpPr txBox="1"/>
+          <p:nvPr/>
+        </p:nvSpPr>
+        <p:spPr>
+          <a:xfrm>
+            <a:off x="8196657" y="2171929"/>
+            <a:ext cx="2105472" cy="338554"/>
+          </a:xfrm>
+          <a:prstGeom prst="rect">
+            <a:avLst/>
+          </a:prstGeom>
+          <a:noFill/>
+        </p:spPr>
+        <p:txBody>
+          <a:bodyPr wrap="square">
+            <a:spAutoFit/>
+          </a:bodyPr>
+          <a:lstStyle/>
+          <a:p>
+            <a:r>
+              <a:rPr lang="en-US" sz="1600" dirty="0">
+                <a:solidFill>
+                  <a:srgbClr val="C00000"/>
+                </a:solidFill>
+              </a:rPr>
+              <a:t> 6.88 h: 0.4 million </a:t>
+            </a:r>
+            <a:r>
+              <a:rPr lang="en-US" sz="1600" dirty="0" err="1">
+                <a:solidFill>
+                  <a:srgbClr val="C00000"/>
+                </a:solidFill>
+              </a:rPr>
+              <a:t>Ar</a:t>
+            </a:r>
+            <a:r>
+              <a:rPr lang="en-US" sz="1600" dirty="0">
+                <a:solidFill>
+                  <a:srgbClr val="C00000"/>
+                </a:solidFill>
+              </a:rPr>
+              <a:t>  </a:t>
+            </a:r>
+          </a:p>
+        </p:txBody>
+      </p:sp>
+      <p:cxnSp>
+        <p:nvCxnSpPr>
+          <p:cNvPr id="20" name="Straight Arrow Connector 19">
+            <a:extLst>
+              <a:ext uri="{FF2B5EF4-FFF2-40B4-BE49-F238E27FC236}">
+                <a16:creationId xmlns:a16="http://schemas.microsoft.com/office/drawing/2014/main" id="{9E385BF6-D18B-3C71-031C-AD24F72D4112}"/>
+              </a:ext>
+            </a:extLst>
+          </p:cNvPr>
+          <p:cNvCxnSpPr>
+            <a:cxnSpLocks/>
+          </p:cNvCxnSpPr>
+          <p:nvPr/>
+        </p:nvCxnSpPr>
+        <p:spPr>
+          <a:xfrm>
+            <a:off x="10212189" y="2341206"/>
+            <a:ext cx="240875" cy="0"/>
+          </a:xfrm>
+          <a:prstGeom prst="straightConnector1">
+            <a:avLst/>
+          </a:prstGeom>
+          <a:ln>
+            <a:solidFill>
+              <a:srgbClr val="C00000"/>
+            </a:solidFill>
+            <a:tailEnd type="triangle"/>
+          </a:ln>
+        </p:spPr>
+        <p:style>
+          <a:lnRef idx="1">
+            <a:schemeClr val="accent6"/>
+          </a:lnRef>
+          <a:fillRef idx="0">
+            <a:schemeClr val="accent6"/>
+          </a:fillRef>
+          <a:effectRef idx="0">
+            <a:schemeClr val="accent6"/>
+          </a:effectRef>
+          <a:fontRef idx="minor">
+            <a:schemeClr val="tx1"/>
+          </a:fontRef>
+        </p:style>
+      </p:cxnSp>
+    </p:spTree>
+    <p:extLst>
+      <p:ext uri="{BB962C8B-B14F-4D97-AF65-F5344CB8AC3E}">
+        <p14:creationId xmlns:p14="http://schemas.microsoft.com/office/powerpoint/2010/main" val="2706071952"/>
+      </p:ext>
+    </p:extLst>
+  </p:cSld>
+  <p:clrMapOvr>
+    <a:masterClrMapping/>
+  </p:clrMapOvr>
+</p:sld>
+</file>
+
+<file path=ppt/slides/slide17.xml><?xml version="1.0" encoding="utf-8"?>
+<p:sld xmlns:a="http://schemas.openxmlformats.org/drawingml/2006/main" xmlns:r="http://schemas.openxmlformats.org/officeDocument/2006/relationships" xmlns:p="http://schemas.openxmlformats.org/presentationml/2006/main">
+  <p:cSld>
+    <p:spTree>
+      <p:nvGrpSpPr>
+        <p:cNvPr id="1" name="">
+          <a:extLst>
+            <a:ext uri="{FF2B5EF4-FFF2-40B4-BE49-F238E27FC236}">
+              <a16:creationId xmlns:a16="http://schemas.microsoft.com/office/drawing/2014/main" id="{3F0E1320-6ABC-DC34-B56E-6DA6270F5D14}"/>
+            </a:ext>
+          </a:extLst>
+        </p:cNvPr>
+        <p:cNvGrpSpPr/>
+        <p:nvPr/>
+      </p:nvGrpSpPr>
+      <p:grpSpPr>
+        <a:xfrm>
+          <a:off x="0" y="0"/>
+          <a:ext cx="0" cy="0"/>
+          <a:chOff x="0" y="0"/>
+          <a:chExt cx="0" cy="0"/>
+        </a:xfrm>
+      </p:grpSpPr>
+      <p:sp>
+        <p:nvSpPr>
+          <p:cNvPr id="2" name="Title 1">
+            <a:extLst>
+              <a:ext uri="{FF2B5EF4-FFF2-40B4-BE49-F238E27FC236}">
+                <a16:creationId xmlns:a16="http://schemas.microsoft.com/office/drawing/2014/main" id="{522E1A65-F062-B483-D49D-16EFCB7239DF}"/>
+              </a:ext>
+            </a:extLst>
+          </p:cNvPr>
+          <p:cNvSpPr>
+            <a:spLocks noGrp="1"/>
+          </p:cNvSpPr>
+          <p:nvPr>
+            <p:ph type="title"/>
+          </p:nvPr>
+        </p:nvSpPr>
+        <p:spPr>
+          <a:xfrm>
+            <a:off x="838200" y="365125"/>
+            <a:ext cx="4415852" cy="1325563"/>
+          </a:xfrm>
+        </p:spPr>
+        <p:txBody>
+          <a:bodyPr/>
+          <a:lstStyle/>
+          <a:p>
+            <a:r>
+              <a:rPr lang="en-US" dirty="0"/>
+              <a:t>Performance Test</a:t>
+            </a:r>
+          </a:p>
+        </p:txBody>
+      </p:sp>
+      <p:sp>
+        <p:nvSpPr>
+          <p:cNvPr id="6" name="Rectangle 5">
+            <a:extLst>
+              <a:ext uri="{FF2B5EF4-FFF2-40B4-BE49-F238E27FC236}">
+                <a16:creationId xmlns:a16="http://schemas.microsoft.com/office/drawing/2014/main" id="{A92ED74D-D530-449B-7201-2FC9752ACAE4}"/>
+              </a:ext>
+            </a:extLst>
+          </p:cNvPr>
+          <p:cNvSpPr/>
+          <p:nvPr/>
+        </p:nvSpPr>
+        <p:spPr>
+          <a:xfrm>
+            <a:off x="538766" y="1605949"/>
+            <a:ext cx="5446055" cy="369332"/>
+          </a:xfrm>
+          <a:prstGeom prst="rect">
+            <a:avLst/>
+          </a:prstGeom>
+        </p:spPr>
+        <p:txBody>
+          <a:bodyPr wrap="square">
+            <a:spAutoFit/>
+          </a:bodyPr>
+          <a:lstStyle/>
+          <a:p>
+            <a:r>
+              <a:rPr lang="en-US" dirty="0"/>
+              <a:t>0005: Packed Amorphous Structure of Polyethylene</a:t>
+            </a:r>
+          </a:p>
+        </p:txBody>
+      </p:sp>
+      <p:sp>
+        <p:nvSpPr>
+          <p:cNvPr id="8" name="Rectangle 7">
+            <a:extLst>
+              <a:ext uri="{FF2B5EF4-FFF2-40B4-BE49-F238E27FC236}">
+                <a16:creationId xmlns:a16="http://schemas.microsoft.com/office/drawing/2014/main" id="{FC8D5E20-2A6E-EDC8-ADF7-E8CEA5DD7D2C}"/>
+              </a:ext>
+            </a:extLst>
+          </p:cNvPr>
+          <p:cNvSpPr/>
+          <p:nvPr/>
+        </p:nvSpPr>
+        <p:spPr>
+          <a:xfrm>
+            <a:off x="1199476" y="6169580"/>
+            <a:ext cx="3494867" cy="369332"/>
+          </a:xfrm>
+          <a:prstGeom prst="rect">
+            <a:avLst/>
+          </a:prstGeom>
+        </p:spPr>
+        <p:txBody>
+          <a:bodyPr wrap="none">
+            <a:spAutoFit/>
+          </a:bodyPr>
+          <a:lstStyle/>
+          <a:p>
+            <a:pPr algn="ctr"/>
+            <a:r>
+              <a:rPr lang="en-US" dirty="0"/>
+              <a:t>Mac mini: Apple M4, 16GB LPDDR5</a:t>
+            </a:r>
+          </a:p>
+        </p:txBody>
+      </p:sp>
+      <p:sp>
+        <p:nvSpPr>
+          <p:cNvPr id="3" name="Slide Number Placeholder 2">
+            <a:extLst>
+              <a:ext uri="{FF2B5EF4-FFF2-40B4-BE49-F238E27FC236}">
+                <a16:creationId xmlns:a16="http://schemas.microsoft.com/office/drawing/2014/main" id="{E92E9CE8-3A4F-2B9E-07DB-3F268E5E69A4}"/>
+              </a:ext>
+            </a:extLst>
+          </p:cNvPr>
+          <p:cNvSpPr>
+            <a:spLocks noGrp="1"/>
+          </p:cNvSpPr>
+          <p:nvPr>
+            <p:ph type="sldNum" sz="quarter" idx="12"/>
+          </p:nvPr>
+        </p:nvSpPr>
+        <p:spPr/>
+        <p:txBody>
+          <a:bodyPr/>
+          <a:lstStyle/>
+          <a:p>
+            <a:fld id="{CF79FC58-3559-EC47-B32E-5EF128B06581}" type="slidenum">
+              <a:rPr lang="en-US" smtClean="0"/>
+              <a:t>17</a:t>
+            </a:fld>
+            <a:endParaRPr lang="en-US"/>
+          </a:p>
+        </p:txBody>
+      </p:sp>
+      <p:sp>
+        <p:nvSpPr>
+          <p:cNvPr id="29" name="Rectangle 28">
+            <a:extLst>
+              <a:ext uri="{FF2B5EF4-FFF2-40B4-BE49-F238E27FC236}">
+                <a16:creationId xmlns:a16="http://schemas.microsoft.com/office/drawing/2014/main" id="{B236B0A5-AC39-3F45-1A96-AF28B0F4801F}"/>
+              </a:ext>
+            </a:extLst>
+          </p:cNvPr>
+          <p:cNvSpPr/>
+          <p:nvPr/>
+        </p:nvSpPr>
+        <p:spPr>
+          <a:xfrm>
+            <a:off x="6730584" y="1605949"/>
+            <a:ext cx="4999726" cy="369332"/>
+          </a:xfrm>
+          <a:prstGeom prst="rect">
+            <a:avLst/>
+          </a:prstGeom>
+        </p:spPr>
+        <p:txBody>
+          <a:bodyPr wrap="square">
+            <a:spAutoFit/>
+          </a:bodyPr>
+          <a:lstStyle/>
+          <a:p>
+            <a:r>
+              <a:rPr lang="en-US" dirty="0"/>
+              <a:t>0006: Trajectory Density (100 hexane per frame)</a:t>
+            </a:r>
+          </a:p>
+        </p:txBody>
+      </p:sp>
+      <p:pic>
+        <p:nvPicPr>
+          <p:cNvPr id="10" name="Graphic 9">
+            <a:extLst>
+              <a:ext uri="{FF2B5EF4-FFF2-40B4-BE49-F238E27FC236}">
+                <a16:creationId xmlns:a16="http://schemas.microsoft.com/office/drawing/2014/main" id="{11127034-22E1-D4EE-1E57-73891AA7C585}"/>
+              </a:ext>
+            </a:extLst>
+          </p:cNvPr>
+          <p:cNvPicPr>
+            <a:picLocks noChangeAspect="1"/>
+          </p:cNvPicPr>
+          <p:nvPr/>
+        </p:nvPicPr>
+        <p:blipFill>
+          <a:blip r:embed="rId2">
+            <a:extLst>
+              <a:ext uri="{96DAC541-7B7A-43D3-8B79-37D633B846F1}">
+                <asvg:svgBlip xmlns:asvg="http://schemas.microsoft.com/office/drawing/2016/SVG/main" r:embed="rId3"/>
+              </a:ext>
+            </a:extLst>
+          </a:blip>
+          <a:stretch>
+            <a:fillRect/>
+          </a:stretch>
+        </p:blipFill>
+        <p:spPr>
+          <a:xfrm>
+            <a:off x="365760" y="2057400"/>
+            <a:ext cx="5486400" cy="4114800"/>
+          </a:xfrm>
+          <a:prstGeom prst="rect">
+            <a:avLst/>
+          </a:prstGeom>
+        </p:spPr>
+      </p:pic>
+      <p:sp>
+        <p:nvSpPr>
+          <p:cNvPr id="7" name="TextBox 6">
+            <a:extLst>
+              <a:ext uri="{FF2B5EF4-FFF2-40B4-BE49-F238E27FC236}">
+                <a16:creationId xmlns:a16="http://schemas.microsoft.com/office/drawing/2014/main" id="{40A007EF-A178-053A-2693-C95D32C2BBAC}"/>
+              </a:ext>
+            </a:extLst>
+          </p:cNvPr>
+          <p:cNvSpPr txBox="1"/>
+          <p:nvPr/>
+        </p:nvSpPr>
+        <p:spPr>
+          <a:xfrm>
+            <a:off x="3108960" y="2248873"/>
+            <a:ext cx="1771261" cy="523220"/>
+          </a:xfrm>
+          <a:prstGeom prst="rect">
+            <a:avLst/>
+          </a:prstGeom>
+          <a:noFill/>
+        </p:spPr>
+        <p:txBody>
+          <a:bodyPr wrap="square">
+            <a:spAutoFit/>
+          </a:bodyPr>
+          <a:lstStyle/>
+          <a:p>
+            <a:pPr algn="ctr"/>
+            <a:r>
+              <a:rPr lang="en-US" sz="1400" dirty="0">
+                <a:solidFill>
+                  <a:srgbClr val="C00000"/>
+                </a:solidFill>
+              </a:rPr>
+              <a:t> 22.59 h</a:t>
+            </a:r>
+          </a:p>
+          <a:p>
+            <a:pPr algn="ctr"/>
+            <a:r>
+              <a:rPr lang="en-US" sz="1400" dirty="0">
+                <a:solidFill>
+                  <a:srgbClr val="C00000"/>
+                </a:solidFill>
+              </a:rPr>
+              <a:t>20,000 (−CH2−)</a:t>
+            </a:r>
+            <a:r>
+              <a:rPr lang="en-US" sz="1400" baseline="-25000" dirty="0">
+                <a:solidFill>
+                  <a:srgbClr val="C00000"/>
+                </a:solidFill>
+              </a:rPr>
+              <a:t>100</a:t>
+            </a:r>
+            <a:endParaRPr lang="en-US" sz="1400" dirty="0">
+              <a:solidFill>
+                <a:srgbClr val="C00000"/>
+              </a:solidFill>
+            </a:endParaRPr>
+          </a:p>
+        </p:txBody>
+      </p:sp>
+      <p:cxnSp>
+        <p:nvCxnSpPr>
+          <p:cNvPr id="15" name="Straight Arrow Connector 14">
+            <a:extLst>
+              <a:ext uri="{FF2B5EF4-FFF2-40B4-BE49-F238E27FC236}">
+                <a16:creationId xmlns:a16="http://schemas.microsoft.com/office/drawing/2014/main" id="{012029C8-01A6-6519-F107-1103F0286A66}"/>
+              </a:ext>
+            </a:extLst>
+          </p:cNvPr>
+          <p:cNvCxnSpPr>
+            <a:cxnSpLocks/>
+          </p:cNvCxnSpPr>
+          <p:nvPr/>
+        </p:nvCxnSpPr>
+        <p:spPr>
+          <a:xfrm flipV="1">
+            <a:off x="4517758" y="2412288"/>
+            <a:ext cx="217848" cy="98195"/>
+          </a:xfrm>
+          <a:prstGeom prst="straightConnector1">
+            <a:avLst/>
+          </a:prstGeom>
+          <a:ln>
+            <a:solidFill>
+              <a:srgbClr val="C00000"/>
+            </a:solidFill>
+            <a:tailEnd type="triangle"/>
+          </a:ln>
+        </p:spPr>
+        <p:style>
+          <a:lnRef idx="1">
+            <a:schemeClr val="accent6"/>
+          </a:lnRef>
+          <a:fillRef idx="0">
+            <a:schemeClr val="accent6"/>
+          </a:fillRef>
+          <a:effectRef idx="0">
+            <a:schemeClr val="accent6"/>
+          </a:effectRef>
+          <a:fontRef idx="minor">
+            <a:schemeClr val="tx1"/>
+          </a:fontRef>
+        </p:style>
+      </p:cxnSp>
+      <p:pic>
+        <p:nvPicPr>
+          <p:cNvPr id="13" name="Graphic 12">
+            <a:extLst>
+              <a:ext uri="{FF2B5EF4-FFF2-40B4-BE49-F238E27FC236}">
+                <a16:creationId xmlns:a16="http://schemas.microsoft.com/office/drawing/2014/main" id="{F3925752-ECA0-507A-C833-2EA38A1F1C1B}"/>
+              </a:ext>
+            </a:extLst>
+          </p:cNvPr>
+          <p:cNvPicPr>
+            <a:picLocks noChangeAspect="1"/>
+          </p:cNvPicPr>
+          <p:nvPr/>
+        </p:nvPicPr>
+        <p:blipFill>
+          <a:blip r:embed="rId4">
+            <a:extLst>
+              <a:ext uri="{96DAC541-7B7A-43D3-8B79-37D633B846F1}">
+                <asvg:svgBlip xmlns:asvg="http://schemas.microsoft.com/office/drawing/2016/SVG/main" r:embed="rId5"/>
+              </a:ext>
+            </a:extLst>
+          </a:blip>
+          <a:stretch>
+            <a:fillRect/>
+          </a:stretch>
+        </p:blipFill>
+        <p:spPr>
+          <a:xfrm>
+            <a:off x="6172200" y="2057400"/>
+            <a:ext cx="5486400" cy="4114800"/>
+          </a:xfrm>
+          <a:prstGeom prst="rect">
+            <a:avLst/>
+          </a:prstGeom>
+        </p:spPr>
+      </p:pic>
+      <p:sp>
+        <p:nvSpPr>
+          <p:cNvPr id="21" name="TextBox 20">
+            <a:extLst>
+              <a:ext uri="{FF2B5EF4-FFF2-40B4-BE49-F238E27FC236}">
+                <a16:creationId xmlns:a16="http://schemas.microsoft.com/office/drawing/2014/main" id="{E4825302-C87F-AFE3-0A94-997E1B1DF4C6}"/>
+              </a:ext>
+            </a:extLst>
+          </p:cNvPr>
+          <p:cNvSpPr txBox="1"/>
+          <p:nvPr/>
+        </p:nvSpPr>
+        <p:spPr>
+          <a:xfrm>
+            <a:off x="9668656" y="3065359"/>
+            <a:ext cx="1397506" cy="523220"/>
+          </a:xfrm>
+          <a:prstGeom prst="rect">
+            <a:avLst/>
+          </a:prstGeom>
+          <a:noFill/>
+        </p:spPr>
+        <p:txBody>
+          <a:bodyPr wrap="square">
+            <a:spAutoFit/>
+          </a:bodyPr>
+          <a:lstStyle/>
+          <a:p>
+            <a:pPr algn="ctr"/>
+            <a:r>
+              <a:rPr lang="en-US" sz="1400" dirty="0">
+                <a:solidFill>
+                  <a:srgbClr val="C00000"/>
+                </a:solidFill>
+              </a:rPr>
+              <a:t>2 s / 200 MB</a:t>
+            </a:r>
+          </a:p>
+          <a:p>
+            <a:pPr algn="ctr"/>
+            <a:r>
+              <a:rPr lang="en-US" sz="1400" dirty="0">
+                <a:solidFill>
+                  <a:srgbClr val="C00000"/>
+                </a:solidFill>
+              </a:rPr>
+              <a:t>25,000 frames</a:t>
+            </a:r>
+          </a:p>
+        </p:txBody>
+      </p:sp>
+      <p:cxnSp>
+        <p:nvCxnSpPr>
+          <p:cNvPr id="22" name="Straight Arrow Connector 21">
+            <a:extLst>
+              <a:ext uri="{FF2B5EF4-FFF2-40B4-BE49-F238E27FC236}">
+                <a16:creationId xmlns:a16="http://schemas.microsoft.com/office/drawing/2014/main" id="{4B4FD964-C081-C9AB-CF9B-3D9E30989738}"/>
+              </a:ext>
+            </a:extLst>
+          </p:cNvPr>
+          <p:cNvCxnSpPr>
+            <a:cxnSpLocks/>
+          </p:cNvCxnSpPr>
+          <p:nvPr/>
+        </p:nvCxnSpPr>
+        <p:spPr>
+          <a:xfrm flipV="1">
+            <a:off x="10546302" y="2707579"/>
+            <a:ext cx="96714" cy="211147"/>
+          </a:xfrm>
+          <a:prstGeom prst="straightConnector1">
+            <a:avLst/>
+          </a:prstGeom>
+          <a:ln>
+            <a:solidFill>
+              <a:srgbClr val="C00000"/>
+            </a:solidFill>
+            <a:tailEnd type="triangle"/>
+          </a:ln>
+        </p:spPr>
+        <p:style>
+          <a:lnRef idx="1">
+            <a:schemeClr val="accent6"/>
+          </a:lnRef>
+          <a:fillRef idx="0">
+            <a:schemeClr val="accent6"/>
+          </a:fillRef>
+          <a:effectRef idx="0">
+            <a:schemeClr val="accent6"/>
+          </a:effectRef>
+          <a:fontRef idx="minor">
+            <a:schemeClr val="tx1"/>
+          </a:fontRef>
+        </p:style>
+      </p:cxnSp>
+    </p:spTree>
+    <p:extLst>
+      <p:ext uri="{BB962C8B-B14F-4D97-AF65-F5344CB8AC3E}">
+        <p14:creationId xmlns:p14="http://schemas.microsoft.com/office/powerpoint/2010/main" val="2133385246"/>
+      </p:ext>
+    </p:extLst>
+  </p:cSld>
+  <p:clrMapOvr>
+    <a:masterClrMapping/>
+  </p:clrMapOvr>
+</p:sld>
+</file>
+
+<file path=ppt/slides/slide18.xml><?xml version="1.0" encoding="utf-8"?>
+<p:sld xmlns:a="http://schemas.openxmlformats.org/drawingml/2006/main" xmlns:r="http://schemas.openxmlformats.org/officeDocument/2006/relationships" xmlns:p="http://schemas.openxmlformats.org/presentationml/2006/main">
+  <p:cSld>
+    <p:spTree>
+      <p:nvGrpSpPr>
+        <p:cNvPr id="1" name="">
+          <a:extLst>
+            <a:ext uri="{FF2B5EF4-FFF2-40B4-BE49-F238E27FC236}">
+              <a16:creationId xmlns:a16="http://schemas.microsoft.com/office/drawing/2014/main" id="{8D658E57-49B3-89B2-583A-235660011F12}"/>
+            </a:ext>
+          </a:extLst>
+        </p:cNvPr>
+        <p:cNvGrpSpPr/>
+        <p:nvPr/>
+      </p:nvGrpSpPr>
+      <p:grpSpPr>
+        <a:xfrm>
+          <a:off x="0" y="0"/>
+          <a:ext cx="0" cy="0"/>
+          <a:chOff x="0" y="0"/>
+          <a:chExt cx="0" cy="0"/>
+        </a:xfrm>
+      </p:grpSpPr>
+      <p:sp>
+        <p:nvSpPr>
+          <p:cNvPr id="2" name="Title 1">
+            <a:extLst>
+              <a:ext uri="{FF2B5EF4-FFF2-40B4-BE49-F238E27FC236}">
+                <a16:creationId xmlns:a16="http://schemas.microsoft.com/office/drawing/2014/main" id="{D8DD450C-4C4C-22C0-180F-91A9E8BC9724}"/>
+              </a:ext>
+            </a:extLst>
+          </p:cNvPr>
+          <p:cNvSpPr>
+            <a:spLocks noGrp="1"/>
+          </p:cNvSpPr>
+          <p:nvPr>
+            <p:ph type="title"/>
+          </p:nvPr>
+        </p:nvSpPr>
+        <p:spPr>
+          <a:xfrm>
+            <a:off x="838200" y="365125"/>
+            <a:ext cx="4415852" cy="1325563"/>
+          </a:xfrm>
+        </p:spPr>
+        <p:txBody>
+          <a:bodyPr/>
+          <a:lstStyle/>
+          <a:p>
+            <a:r>
+              <a:rPr lang="en-US" dirty="0"/>
+              <a:t>Performance Test</a:t>
+            </a:r>
+          </a:p>
+        </p:txBody>
+      </p:sp>
+      <p:sp>
+        <p:nvSpPr>
+          <p:cNvPr id="6" name="Rectangle 5">
+            <a:extLst>
+              <a:ext uri="{FF2B5EF4-FFF2-40B4-BE49-F238E27FC236}">
+                <a16:creationId xmlns:a16="http://schemas.microsoft.com/office/drawing/2014/main" id="{C6024479-EE2D-BDAA-C893-D2C616186633}"/>
+              </a:ext>
+            </a:extLst>
+          </p:cNvPr>
+          <p:cNvSpPr/>
+          <p:nvPr/>
+        </p:nvSpPr>
+        <p:spPr>
+          <a:xfrm>
+            <a:off x="538766" y="1605949"/>
+            <a:ext cx="5446055" cy="369332"/>
+          </a:xfrm>
+          <a:prstGeom prst="rect">
+            <a:avLst/>
+          </a:prstGeom>
+        </p:spPr>
+        <p:txBody>
+          <a:bodyPr wrap="square">
+            <a:spAutoFit/>
+          </a:bodyPr>
+          <a:lstStyle/>
+          <a:p>
+            <a:r>
+              <a:rPr lang="en-US" dirty="0"/>
+              <a:t>0005: Packed Amorphous Structure of Polyethylene</a:t>
+            </a:r>
+          </a:p>
+        </p:txBody>
+      </p:sp>
+      <p:sp>
+        <p:nvSpPr>
+          <p:cNvPr id="8" name="Rectangle 7">
+            <a:extLst>
+              <a:ext uri="{FF2B5EF4-FFF2-40B4-BE49-F238E27FC236}">
+                <a16:creationId xmlns:a16="http://schemas.microsoft.com/office/drawing/2014/main" id="{BF321DB4-6640-7318-B9B9-C87B6BFB9241}"/>
+              </a:ext>
+            </a:extLst>
+          </p:cNvPr>
+          <p:cNvSpPr/>
+          <p:nvPr/>
+        </p:nvSpPr>
+        <p:spPr>
+          <a:xfrm>
+            <a:off x="1199476" y="6169580"/>
+            <a:ext cx="3494867" cy="369332"/>
+          </a:xfrm>
+          <a:prstGeom prst="rect">
+            <a:avLst/>
+          </a:prstGeom>
+        </p:spPr>
+        <p:txBody>
+          <a:bodyPr wrap="none">
+            <a:spAutoFit/>
+          </a:bodyPr>
+          <a:lstStyle/>
+          <a:p>
+            <a:pPr algn="ctr"/>
+            <a:r>
+              <a:rPr lang="en-US" dirty="0"/>
+              <a:t>Mac mini: Apple M4, 16GB LPDDR5</a:t>
+            </a:r>
+          </a:p>
+        </p:txBody>
+      </p:sp>
+      <p:sp>
+        <p:nvSpPr>
+          <p:cNvPr id="3" name="Slide Number Placeholder 2">
+            <a:extLst>
+              <a:ext uri="{FF2B5EF4-FFF2-40B4-BE49-F238E27FC236}">
+                <a16:creationId xmlns:a16="http://schemas.microsoft.com/office/drawing/2014/main" id="{EE402DEC-C644-796D-0A16-9BEA4CBDA6E4}"/>
+              </a:ext>
+            </a:extLst>
+          </p:cNvPr>
+          <p:cNvSpPr>
+            <a:spLocks noGrp="1"/>
+          </p:cNvSpPr>
+          <p:nvPr>
+            <p:ph type="sldNum" sz="quarter" idx="12"/>
+          </p:nvPr>
+        </p:nvSpPr>
+        <p:spPr/>
+        <p:txBody>
+          <a:bodyPr/>
+          <a:lstStyle/>
+          <a:p>
+            <a:fld id="{CF79FC58-3559-EC47-B32E-5EF128B06581}" type="slidenum">
+              <a:rPr lang="en-US" smtClean="0"/>
+              <a:t>18</a:t>
+            </a:fld>
+            <a:endParaRPr lang="en-US"/>
+          </a:p>
+        </p:txBody>
+      </p:sp>
+      <p:sp>
+        <p:nvSpPr>
+          <p:cNvPr id="29" name="Rectangle 28">
+            <a:extLst>
+              <a:ext uri="{FF2B5EF4-FFF2-40B4-BE49-F238E27FC236}">
+                <a16:creationId xmlns:a16="http://schemas.microsoft.com/office/drawing/2014/main" id="{431F55DB-5D78-B208-80F7-232F7F98D263}"/>
+              </a:ext>
+            </a:extLst>
+          </p:cNvPr>
+          <p:cNvSpPr/>
+          <p:nvPr/>
+        </p:nvSpPr>
+        <p:spPr>
+          <a:xfrm>
+            <a:off x="6730584" y="1605949"/>
+            <a:ext cx="4999726" cy="369332"/>
+          </a:xfrm>
+          <a:prstGeom prst="rect">
+            <a:avLst/>
+          </a:prstGeom>
+        </p:spPr>
+        <p:txBody>
+          <a:bodyPr wrap="square">
+            <a:spAutoFit/>
+          </a:bodyPr>
+          <a:lstStyle/>
+          <a:p>
+            <a:r>
+              <a:rPr lang="en-US" dirty="0"/>
+              <a:t>0006: Trajectory Density (100 hexane per frame)</a:t>
+            </a:r>
+          </a:p>
+        </p:txBody>
+      </p:sp>
+      <p:pic>
+        <p:nvPicPr>
+          <p:cNvPr id="10" name="Graphic 9">
+            <a:extLst>
+              <a:ext uri="{FF2B5EF4-FFF2-40B4-BE49-F238E27FC236}">
+                <a16:creationId xmlns:a16="http://schemas.microsoft.com/office/drawing/2014/main" id="{942F901B-E192-6C42-006A-7C0794F9C9D2}"/>
+              </a:ext>
+            </a:extLst>
+          </p:cNvPr>
+          <p:cNvPicPr>
+            <a:picLocks noChangeAspect="1"/>
+          </p:cNvPicPr>
+          <p:nvPr/>
+        </p:nvPicPr>
+        <p:blipFill>
+          <a:blip r:embed="rId2">
+            <a:extLst>
+              <a:ext uri="{96DAC541-7B7A-43D3-8B79-37D633B846F1}">
+                <asvg:svgBlip xmlns:asvg="http://schemas.microsoft.com/office/drawing/2016/SVG/main" r:embed="rId3"/>
+              </a:ext>
+            </a:extLst>
+          </a:blip>
+          <a:stretch>
+            <a:fillRect/>
+          </a:stretch>
+        </p:blipFill>
+        <p:spPr>
+          <a:xfrm>
+            <a:off x="365760" y="2057400"/>
+            <a:ext cx="5486400" cy="4114800"/>
+          </a:xfrm>
+          <a:prstGeom prst="rect">
+            <a:avLst/>
+          </a:prstGeom>
+        </p:spPr>
+      </p:pic>
+      <p:sp>
+        <p:nvSpPr>
+          <p:cNvPr id="7" name="TextBox 6">
+            <a:extLst>
+              <a:ext uri="{FF2B5EF4-FFF2-40B4-BE49-F238E27FC236}">
+                <a16:creationId xmlns:a16="http://schemas.microsoft.com/office/drawing/2014/main" id="{840C698B-100F-E7CC-1FF8-E7C6EFD29A47}"/>
+              </a:ext>
+            </a:extLst>
+          </p:cNvPr>
+          <p:cNvSpPr txBox="1"/>
+          <p:nvPr/>
+        </p:nvSpPr>
+        <p:spPr>
+          <a:xfrm>
+            <a:off x="3108960" y="2248873"/>
+            <a:ext cx="1771261" cy="523220"/>
+          </a:xfrm>
+          <a:prstGeom prst="rect">
+            <a:avLst/>
+          </a:prstGeom>
+          <a:noFill/>
+        </p:spPr>
+        <p:txBody>
+          <a:bodyPr wrap="square">
+            <a:spAutoFit/>
+          </a:bodyPr>
+          <a:lstStyle/>
+          <a:p>
+            <a:pPr algn="ctr"/>
+            <a:r>
+              <a:rPr lang="en-US" sz="1400" dirty="0">
+                <a:solidFill>
+                  <a:srgbClr val="C00000"/>
+                </a:solidFill>
+              </a:rPr>
+              <a:t> 22.59 h</a:t>
+            </a:r>
+          </a:p>
+          <a:p>
+            <a:pPr algn="ctr"/>
+            <a:r>
+              <a:rPr lang="en-US" sz="1400" dirty="0">
+                <a:solidFill>
+                  <a:srgbClr val="C00000"/>
+                </a:solidFill>
+              </a:rPr>
+              <a:t>20,000 (−CH2−)</a:t>
+            </a:r>
+            <a:r>
+              <a:rPr lang="en-US" sz="1400" baseline="-25000" dirty="0">
+                <a:solidFill>
+                  <a:srgbClr val="C00000"/>
+                </a:solidFill>
+              </a:rPr>
+              <a:t>100</a:t>
+            </a:r>
+            <a:endParaRPr lang="en-US" sz="1400" dirty="0">
+              <a:solidFill>
+                <a:srgbClr val="C00000"/>
+              </a:solidFill>
+            </a:endParaRPr>
+          </a:p>
+        </p:txBody>
+      </p:sp>
+      <p:cxnSp>
+        <p:nvCxnSpPr>
+          <p:cNvPr id="15" name="Straight Arrow Connector 14">
+            <a:extLst>
+              <a:ext uri="{FF2B5EF4-FFF2-40B4-BE49-F238E27FC236}">
+                <a16:creationId xmlns:a16="http://schemas.microsoft.com/office/drawing/2014/main" id="{9BB0D861-82D2-5840-202E-689F97F1CEAC}"/>
+              </a:ext>
+            </a:extLst>
+          </p:cNvPr>
+          <p:cNvCxnSpPr>
+            <a:cxnSpLocks/>
+          </p:cNvCxnSpPr>
+          <p:nvPr/>
+        </p:nvCxnSpPr>
+        <p:spPr>
+          <a:xfrm flipV="1">
+            <a:off x="4517758" y="2412288"/>
+            <a:ext cx="217848" cy="98195"/>
+          </a:xfrm>
+          <a:prstGeom prst="straightConnector1">
+            <a:avLst/>
+          </a:prstGeom>
+          <a:ln>
+            <a:solidFill>
+              <a:srgbClr val="C00000"/>
+            </a:solidFill>
+            <a:tailEnd type="triangle"/>
+          </a:ln>
+        </p:spPr>
+        <p:style>
+          <a:lnRef idx="1">
+            <a:schemeClr val="accent6"/>
+          </a:lnRef>
+          <a:fillRef idx="0">
+            <a:schemeClr val="accent6"/>
+          </a:fillRef>
+          <a:effectRef idx="0">
+            <a:schemeClr val="accent6"/>
+          </a:effectRef>
+          <a:fontRef idx="minor">
+            <a:schemeClr val="tx1"/>
+          </a:fontRef>
+        </p:style>
+      </p:cxnSp>
+      <p:pic>
+        <p:nvPicPr>
+          <p:cNvPr id="13" name="Graphic 12">
+            <a:extLst>
+              <a:ext uri="{FF2B5EF4-FFF2-40B4-BE49-F238E27FC236}">
+                <a16:creationId xmlns:a16="http://schemas.microsoft.com/office/drawing/2014/main" id="{0642BD6E-00B3-B468-EF51-EA2B5D2A7436}"/>
+              </a:ext>
+            </a:extLst>
+          </p:cNvPr>
+          <p:cNvPicPr>
+            <a:picLocks noChangeAspect="1"/>
+          </p:cNvPicPr>
+          <p:nvPr/>
+        </p:nvPicPr>
+        <p:blipFill>
+          <a:blip r:embed="rId4">
+            <a:extLst>
+              <a:ext uri="{96DAC541-7B7A-43D3-8B79-37D633B846F1}">
+                <asvg:svgBlip xmlns:asvg="http://schemas.microsoft.com/office/drawing/2016/SVG/main" r:embed="rId5"/>
+              </a:ext>
+            </a:extLst>
+          </a:blip>
+          <a:stretch>
+            <a:fillRect/>
+          </a:stretch>
+        </p:blipFill>
+        <p:spPr>
+          <a:xfrm>
+            <a:off x="6172200" y="2057400"/>
+            <a:ext cx="5486400" cy="4114800"/>
+          </a:xfrm>
+          <a:prstGeom prst="rect">
+            <a:avLst/>
+          </a:prstGeom>
+        </p:spPr>
+      </p:pic>
+      <p:sp>
+        <p:nvSpPr>
+          <p:cNvPr id="21" name="TextBox 20">
+            <a:extLst>
+              <a:ext uri="{FF2B5EF4-FFF2-40B4-BE49-F238E27FC236}">
+                <a16:creationId xmlns:a16="http://schemas.microsoft.com/office/drawing/2014/main" id="{CC26F520-3BE8-95B5-699B-734F4F08106E}"/>
+              </a:ext>
+            </a:extLst>
+          </p:cNvPr>
+          <p:cNvSpPr txBox="1"/>
+          <p:nvPr/>
+        </p:nvSpPr>
+        <p:spPr>
+          <a:xfrm>
+            <a:off x="9668656" y="3065359"/>
+            <a:ext cx="1397506" cy="523220"/>
+          </a:xfrm>
+          <a:prstGeom prst="rect">
+            <a:avLst/>
+          </a:prstGeom>
+          <a:noFill/>
+        </p:spPr>
+        <p:txBody>
+          <a:bodyPr wrap="square">
+            <a:spAutoFit/>
+          </a:bodyPr>
+          <a:lstStyle/>
+          <a:p>
+            <a:pPr algn="ctr"/>
+            <a:r>
+              <a:rPr lang="en-US" sz="1400" dirty="0">
+                <a:solidFill>
+                  <a:srgbClr val="C00000"/>
+                </a:solidFill>
+              </a:rPr>
+              <a:t>2 s / 200 MB</a:t>
+            </a:r>
+          </a:p>
+          <a:p>
+            <a:pPr algn="ctr"/>
+            <a:r>
+              <a:rPr lang="en-US" sz="1400" dirty="0">
+                <a:solidFill>
+                  <a:srgbClr val="C00000"/>
+                </a:solidFill>
+              </a:rPr>
+              <a:t>25,000 frames</a:t>
+            </a:r>
+          </a:p>
+        </p:txBody>
+      </p:sp>
+      <p:cxnSp>
+        <p:nvCxnSpPr>
+          <p:cNvPr id="22" name="Straight Arrow Connector 21">
+            <a:extLst>
+              <a:ext uri="{FF2B5EF4-FFF2-40B4-BE49-F238E27FC236}">
+                <a16:creationId xmlns:a16="http://schemas.microsoft.com/office/drawing/2014/main" id="{EB54E5E2-3C6E-9AB0-0A3C-C98A4AAF9298}"/>
+              </a:ext>
+            </a:extLst>
+          </p:cNvPr>
+          <p:cNvCxnSpPr>
+            <a:cxnSpLocks/>
+          </p:cNvCxnSpPr>
+          <p:nvPr/>
+        </p:nvCxnSpPr>
+        <p:spPr>
+          <a:xfrm flipV="1">
+            <a:off x="10546302" y="2707579"/>
+            <a:ext cx="96714" cy="211147"/>
+          </a:xfrm>
+          <a:prstGeom prst="straightConnector1">
+            <a:avLst/>
+          </a:prstGeom>
+          <a:ln>
+            <a:solidFill>
+              <a:srgbClr val="C00000"/>
+            </a:solidFill>
+            <a:tailEnd type="triangle"/>
+          </a:ln>
+        </p:spPr>
+        <p:style>
+          <a:lnRef idx="1">
+            <a:schemeClr val="accent6"/>
+          </a:lnRef>
+          <a:fillRef idx="0">
+            <a:schemeClr val="accent6"/>
+          </a:fillRef>
+          <a:effectRef idx="0">
+            <a:schemeClr val="accent6"/>
+          </a:effectRef>
+          <a:fontRef idx="minor">
+            <a:schemeClr val="tx1"/>
+          </a:fontRef>
+        </p:style>
+      </p:cxnSp>
+    </p:spTree>
+    <p:extLst>
+      <p:ext uri="{BB962C8B-B14F-4D97-AF65-F5344CB8AC3E}">
+        <p14:creationId xmlns:p14="http://schemas.microsoft.com/office/powerpoint/2010/main" val="4294287161"/>
+      </p:ext>
+    </p:extLst>
+  </p:cSld>
+  <p:clrMapOvr>
+    <a:masterClrMapping/>
+  </p:clrMapOvr>
+</p:sld>
+</file>
+
+<file path=ppt/slides/slide19.xml><?xml version="1.0" encoding="utf-8"?>
 <p:sld xmlns:a="http://schemas.openxmlformats.org/drawingml/2006/main" xmlns:r="http://schemas.openxmlformats.org/officeDocument/2006/relationships" xmlns:p="http://schemas.openxmlformats.org/presentationml/2006/main">
   <p:cSld>
     <p:spTree>
@@ -22234,7 +23913,7 @@
           <a:p>
             <a:fld id="{CF79FC58-3559-EC47-B32E-5EF128B06581}" type="slidenum">
               <a:rPr lang="en-US" smtClean="0"/>
-              <a:t>16</a:t>
+              <a:t>19</a:t>
             </a:fld>
             <a:endParaRPr lang="en-US"/>
           </a:p>
@@ -22253,7 +23932,320 @@
 </p:sld>
 </file>
 
-<file path=ppt/slides/slide17.xml><?xml version="1.0" encoding="utf-8"?>
+<file path=ppt/slides/slide2.xml><?xml version="1.0" encoding="utf-8"?>
+<p:sld xmlns:a="http://schemas.openxmlformats.org/drawingml/2006/main" xmlns:r="http://schemas.openxmlformats.org/officeDocument/2006/relationships" xmlns:p="http://schemas.openxmlformats.org/presentationml/2006/main">
+  <p:cSld>
+    <p:spTree>
+      <p:nvGrpSpPr>
+        <p:cNvPr id="1" name=""/>
+        <p:cNvGrpSpPr/>
+        <p:nvPr/>
+      </p:nvGrpSpPr>
+      <p:grpSpPr>
+        <a:xfrm>
+          <a:off x="0" y="0"/>
+          <a:ext cx="0" cy="0"/>
+          <a:chOff x="0" y="0"/>
+          <a:chExt cx="0" cy="0"/>
+        </a:xfrm>
+      </p:grpSpPr>
+      <p:sp>
+        <p:nvSpPr>
+          <p:cNvPr id="2" name="Title 1">
+            <a:extLst>
+              <a:ext uri="{FF2B5EF4-FFF2-40B4-BE49-F238E27FC236}">
+                <a16:creationId xmlns:a16="http://schemas.microsoft.com/office/drawing/2014/main" id="{AAB1BF32-5317-534C-8BE4-58EF89998573}"/>
+              </a:ext>
+            </a:extLst>
+          </p:cNvPr>
+          <p:cNvSpPr>
+            <a:spLocks noGrp="1"/>
+          </p:cNvSpPr>
+          <p:nvPr>
+            <p:ph type="title"/>
+          </p:nvPr>
+        </p:nvSpPr>
+        <p:spPr/>
+        <p:txBody>
+          <a:bodyPr/>
+          <a:lstStyle/>
+          <a:p>
+            <a:r>
+              <a:rPr lang="en-US" dirty="0"/>
+              <a:t>BSD 3-Clause License</a:t>
+            </a:r>
+          </a:p>
+        </p:txBody>
+      </p:sp>
+      <p:sp>
+        <p:nvSpPr>
+          <p:cNvPr id="3" name="Content Placeholder 2">
+            <a:extLst>
+              <a:ext uri="{FF2B5EF4-FFF2-40B4-BE49-F238E27FC236}">
+                <a16:creationId xmlns:a16="http://schemas.microsoft.com/office/drawing/2014/main" id="{B5A98CB3-347C-6A40-A202-223224B9342A}"/>
+              </a:ext>
+            </a:extLst>
+          </p:cNvPr>
+          <p:cNvSpPr>
+            <a:spLocks noGrp="1"/>
+          </p:cNvSpPr>
+          <p:nvPr>
+            <p:ph idx="1"/>
+          </p:nvPr>
+        </p:nvSpPr>
+        <p:spPr/>
+        <p:txBody>
+          <a:bodyPr>
+            <a:normAutofit fontScale="85000" lnSpcReduction="20000"/>
+          </a:bodyPr>
+          <a:lstStyle/>
+          <a:p>
+            <a:pPr marL="0" indent="0">
+              <a:buNone/>
+            </a:pPr>
+            <a:r>
+              <a:rPr lang="en-US" sz="3000" dirty="0"/>
+              <a:t>Allow redistribution in any forms, with or without modification.</a:t>
+            </a:r>
+          </a:p>
+          <a:p>
+            <a:pPr marL="0" indent="0">
+              <a:buNone/>
+            </a:pPr>
+            <a:endParaRPr lang="en-US" sz="3000" dirty="0"/>
+          </a:p>
+          <a:p>
+            <a:pPr marL="0" indent="0">
+              <a:buNone/>
+            </a:pPr>
+            <a:r>
+              <a:rPr lang="en-US" dirty="0"/>
+              <a:t>In short:</a:t>
+            </a:r>
+          </a:p>
+          <a:p>
+            <a:pPr marL="514350" indent="-514350">
+              <a:buAutoNum type="arabicParenR"/>
+            </a:pPr>
+            <a:r>
+              <a:rPr lang="en-US" dirty="0"/>
+              <a:t>The general BSD 3-Clause copyright allows </a:t>
+            </a:r>
+            <a:r>
+              <a:rPr lang="en-US" b="1" dirty="0"/>
+              <a:t>similar redistribution</a:t>
+            </a:r>
+            <a:r>
+              <a:rPr lang="en-US" dirty="0"/>
+              <a:t>.</a:t>
+            </a:r>
+          </a:p>
+          <a:p>
+            <a:pPr marL="514350" indent="-514350">
+              <a:lnSpc>
+                <a:spcPct val="100000"/>
+              </a:lnSpc>
+              <a:buFont typeface="Arial" panose="020B0604020202020204" pitchFamily="34" charset="0"/>
+              <a:buAutoNum type="arabicParenR"/>
+            </a:pPr>
+            <a:r>
+              <a:rPr lang="en-US" dirty="0"/>
+              <a:t>The software is provided as is and in </a:t>
+            </a:r>
+            <a:r>
+              <a:rPr lang="en-US" b="1" dirty="0"/>
+              <a:t>no event </a:t>
+            </a:r>
+            <a:r>
+              <a:rPr lang="en-US" dirty="0"/>
+              <a:t>shall the copyright holder or contributors </a:t>
+            </a:r>
+            <a:r>
+              <a:rPr lang="en-US" b="1" dirty="0"/>
+              <a:t>be liable for any damages</a:t>
+            </a:r>
+            <a:r>
+              <a:rPr lang="en-US" dirty="0"/>
+              <a:t>.</a:t>
+            </a:r>
+          </a:p>
+          <a:p>
+            <a:pPr marL="514350" indent="-514350">
+              <a:lnSpc>
+                <a:spcPct val="100000"/>
+              </a:lnSpc>
+              <a:buFont typeface="Arial" panose="020B0604020202020204" pitchFamily="34" charset="0"/>
+              <a:buAutoNum type="arabicParenR"/>
+            </a:pPr>
+            <a:r>
+              <a:rPr lang="en-US" b="1" dirty="0"/>
+              <a:t>Neither </a:t>
+            </a:r>
+            <a:r>
+              <a:rPr lang="en-US" dirty="0"/>
+              <a:t>the name of the </a:t>
+            </a:r>
+            <a:r>
+              <a:rPr lang="en-US" b="1" dirty="0"/>
+              <a:t>copyright</a:t>
+            </a:r>
+            <a:r>
+              <a:rPr lang="en-US" dirty="0"/>
+              <a:t> </a:t>
+            </a:r>
+            <a:r>
+              <a:rPr lang="en-US" b="1" dirty="0"/>
+              <a:t>holder</a:t>
+            </a:r>
+            <a:r>
+              <a:rPr lang="en-US" dirty="0"/>
+              <a:t> </a:t>
+            </a:r>
+            <a:r>
+              <a:rPr lang="en-US" b="1" dirty="0"/>
+              <a:t>nor</a:t>
+            </a:r>
+            <a:r>
+              <a:rPr lang="en-US" dirty="0"/>
+              <a:t> the names of its </a:t>
+            </a:r>
+            <a:r>
+              <a:rPr lang="en-US" b="1" dirty="0"/>
+              <a:t>contributors</a:t>
+            </a:r>
+            <a:r>
+              <a:rPr lang="en-US" dirty="0"/>
+              <a:t> may be used to </a:t>
+            </a:r>
+            <a:r>
+              <a:rPr lang="en-US" b="1" dirty="0"/>
+              <a:t>endorse</a:t>
+            </a:r>
+            <a:r>
+              <a:rPr lang="en-US" dirty="0"/>
+              <a:t> </a:t>
+            </a:r>
+            <a:r>
+              <a:rPr lang="en-US" b="1" dirty="0"/>
+              <a:t>or promote products derived</a:t>
+            </a:r>
+            <a:r>
+              <a:rPr lang="en-US" dirty="0"/>
+              <a:t> from this software </a:t>
+            </a:r>
+            <a:r>
+              <a:rPr lang="en-US" b="1" dirty="0"/>
+              <a:t>without specific prior written permission</a:t>
+            </a:r>
+            <a:r>
+              <a:rPr lang="en-US" dirty="0"/>
+              <a:t>.</a:t>
+            </a:r>
+          </a:p>
+          <a:p>
+            <a:pPr marL="514350" indent="-514350">
+              <a:lnSpc>
+                <a:spcPct val="100000"/>
+              </a:lnSpc>
+              <a:buFont typeface="Arial" panose="020B0604020202020204" pitchFamily="34" charset="0"/>
+              <a:buAutoNum type="arabicParenR"/>
+            </a:pPr>
+            <a:endParaRPr lang="en-US" dirty="0"/>
+          </a:p>
+          <a:p>
+            <a:pPr marL="0" indent="0">
+              <a:buNone/>
+            </a:pPr>
+            <a:r>
+              <a:rPr lang="en-US" sz="2400" dirty="0"/>
+              <a:t>Full Information in </a:t>
+            </a:r>
+            <a:r>
+              <a:rPr lang="en-US" sz="2400" i="1" u="sng" dirty="0">
+                <a:solidFill>
+                  <a:schemeClr val="accent1"/>
+                </a:solidFill>
+              </a:rPr>
+              <a:t>https://</a:t>
+            </a:r>
+            <a:r>
+              <a:rPr lang="en-US" sz="2400" i="1" u="sng" dirty="0" err="1">
+                <a:solidFill>
+                  <a:schemeClr val="accent1"/>
+                </a:solidFill>
+              </a:rPr>
+              <a:t>github.com</a:t>
+            </a:r>
+            <a:r>
+              <a:rPr lang="en-US" sz="2400" i="1" u="sng" dirty="0">
+                <a:solidFill>
+                  <a:schemeClr val="accent1"/>
+                </a:solidFill>
+              </a:rPr>
+              <a:t>/zhteg4pvt/</a:t>
+            </a:r>
+            <a:r>
+              <a:rPr lang="en-US" sz="2400" i="1" u="sng" dirty="0" err="1">
+                <a:solidFill>
+                  <a:schemeClr val="accent1"/>
+                </a:solidFill>
+              </a:rPr>
+              <a:t>nemd</a:t>
+            </a:r>
+            <a:r>
+              <a:rPr lang="en-US" sz="2400" i="1" u="sng" dirty="0">
+                <a:solidFill>
+                  <a:schemeClr val="accent1"/>
+                </a:solidFill>
+              </a:rPr>
+              <a:t>/tree/main/LICENSE</a:t>
+            </a:r>
+          </a:p>
+        </p:txBody>
+      </p:sp>
+      <p:sp>
+        <p:nvSpPr>
+          <p:cNvPr id="4" name="Slide Number Placeholder 3">
+            <a:extLst>
+              <a:ext uri="{FF2B5EF4-FFF2-40B4-BE49-F238E27FC236}">
+                <a16:creationId xmlns:a16="http://schemas.microsoft.com/office/drawing/2014/main" id="{839FF44F-EF16-7C56-017A-21B581865526}"/>
+              </a:ext>
+            </a:extLst>
+          </p:cNvPr>
+          <p:cNvSpPr>
+            <a:spLocks noGrp="1"/>
+          </p:cNvSpPr>
+          <p:nvPr>
+            <p:ph type="sldNum" sz="quarter" idx="12"/>
+          </p:nvPr>
+        </p:nvSpPr>
+        <p:spPr/>
+        <p:txBody>
+          <a:bodyPr/>
+          <a:lstStyle/>
+          <a:p>
+            <a:fld id="{CF79FC58-3559-EC47-B32E-5EF128B06581}" type="slidenum">
+              <a:rPr lang="en-US" smtClean="0"/>
+              <a:t>2</a:t>
+            </a:fld>
+            <a:endParaRPr lang="en-US"/>
+          </a:p>
+        </p:txBody>
+      </p:sp>
+    </p:spTree>
+    <p:extLst>
+      <p:ext uri="{BB962C8B-B14F-4D97-AF65-F5344CB8AC3E}">
+        <p14:creationId xmlns:p14="http://schemas.microsoft.com/office/powerpoint/2010/main" val="3551528200"/>
+      </p:ext>
+    </p:extLst>
+  </p:cSld>
+  <p:clrMapOvr>
+    <a:masterClrMapping/>
+  </p:clrMapOvr>
+</p:sld>
+</file>
+
+<file path=ppt/slides/slide20.xml><?xml version="1.0" encoding="utf-8"?>
 <p:sld xmlns:a="http://schemas.openxmlformats.org/drawingml/2006/main" xmlns:r="http://schemas.openxmlformats.org/officeDocument/2006/relationships" xmlns:p="http://schemas.openxmlformats.org/presentationml/2006/main">
   <p:cSld>
     <p:spTree>
@@ -22321,7 +24313,7 @@
           <a:p>
             <a:fld id="{CF79FC58-3559-EC47-B32E-5EF128B06581}" type="slidenum">
               <a:rPr lang="en-US" smtClean="0"/>
-              <a:t>17</a:t>
+              <a:t>20</a:t>
             </a:fld>
             <a:endParaRPr lang="en-US"/>
           </a:p>
@@ -23622,7 +25614,7 @@
 </p:sld>
 </file>
 
-<file path=ppt/slides/slide18.xml><?xml version="1.0" encoding="utf-8"?>
+<file path=ppt/slides/slide21.xml><?xml version="1.0" encoding="utf-8"?>
 <p:sld xmlns:a="http://schemas.openxmlformats.org/drawingml/2006/main" xmlns:r="http://schemas.openxmlformats.org/officeDocument/2006/relationships" xmlns:p="http://schemas.openxmlformats.org/presentationml/2006/main">
   <p:cSld>
     <p:spTree>
@@ -23801,7 +25793,7 @@
           <a:p>
             <a:fld id="{CF79FC58-3559-EC47-B32E-5EF128B06581}" type="slidenum">
               <a:rPr lang="en-US" smtClean="0"/>
-              <a:t>18</a:t>
+              <a:t>21</a:t>
             </a:fld>
             <a:endParaRPr lang="en-US"/>
           </a:p>
@@ -23811,319 +25803,6 @@
     <p:extLst>
       <p:ext uri="{BB962C8B-B14F-4D97-AF65-F5344CB8AC3E}">
         <p14:creationId xmlns:p14="http://schemas.microsoft.com/office/powerpoint/2010/main" val="3378181472"/>
-      </p:ext>
-    </p:extLst>
-  </p:cSld>
-  <p:clrMapOvr>
-    <a:masterClrMapping/>
-  </p:clrMapOvr>
-</p:sld>
-</file>
-
-<file path=ppt/slides/slide2.xml><?xml version="1.0" encoding="utf-8"?>
-<p:sld xmlns:a="http://schemas.openxmlformats.org/drawingml/2006/main" xmlns:r="http://schemas.openxmlformats.org/officeDocument/2006/relationships" xmlns:p="http://schemas.openxmlformats.org/presentationml/2006/main">
-  <p:cSld>
-    <p:spTree>
-      <p:nvGrpSpPr>
-        <p:cNvPr id="1" name=""/>
-        <p:cNvGrpSpPr/>
-        <p:nvPr/>
-      </p:nvGrpSpPr>
-      <p:grpSpPr>
-        <a:xfrm>
-          <a:off x="0" y="0"/>
-          <a:ext cx="0" cy="0"/>
-          <a:chOff x="0" y="0"/>
-          <a:chExt cx="0" cy="0"/>
-        </a:xfrm>
-      </p:grpSpPr>
-      <p:sp>
-        <p:nvSpPr>
-          <p:cNvPr id="2" name="Title 1">
-            <a:extLst>
-              <a:ext uri="{FF2B5EF4-FFF2-40B4-BE49-F238E27FC236}">
-                <a16:creationId xmlns:a16="http://schemas.microsoft.com/office/drawing/2014/main" id="{AAB1BF32-5317-534C-8BE4-58EF89998573}"/>
-              </a:ext>
-            </a:extLst>
-          </p:cNvPr>
-          <p:cNvSpPr>
-            <a:spLocks noGrp="1"/>
-          </p:cNvSpPr>
-          <p:nvPr>
-            <p:ph type="title"/>
-          </p:nvPr>
-        </p:nvSpPr>
-        <p:spPr/>
-        <p:txBody>
-          <a:bodyPr/>
-          <a:lstStyle/>
-          <a:p>
-            <a:r>
-              <a:rPr lang="en-US" dirty="0"/>
-              <a:t>BSD 3-Clause License</a:t>
-            </a:r>
-          </a:p>
-        </p:txBody>
-      </p:sp>
-      <p:sp>
-        <p:nvSpPr>
-          <p:cNvPr id="3" name="Content Placeholder 2">
-            <a:extLst>
-              <a:ext uri="{FF2B5EF4-FFF2-40B4-BE49-F238E27FC236}">
-                <a16:creationId xmlns:a16="http://schemas.microsoft.com/office/drawing/2014/main" id="{B5A98CB3-347C-6A40-A202-223224B9342A}"/>
-              </a:ext>
-            </a:extLst>
-          </p:cNvPr>
-          <p:cNvSpPr>
-            <a:spLocks noGrp="1"/>
-          </p:cNvSpPr>
-          <p:nvPr>
-            <p:ph idx="1"/>
-          </p:nvPr>
-        </p:nvSpPr>
-        <p:spPr/>
-        <p:txBody>
-          <a:bodyPr>
-            <a:normAutofit fontScale="85000" lnSpcReduction="20000"/>
-          </a:bodyPr>
-          <a:lstStyle/>
-          <a:p>
-            <a:pPr marL="0" indent="0">
-              <a:buNone/>
-            </a:pPr>
-            <a:r>
-              <a:rPr lang="en-US" sz="3000" dirty="0"/>
-              <a:t>Allow redistribution in any forms, with or without modification.</a:t>
-            </a:r>
-          </a:p>
-          <a:p>
-            <a:pPr marL="0" indent="0">
-              <a:buNone/>
-            </a:pPr>
-            <a:endParaRPr lang="en-US" sz="3000" dirty="0"/>
-          </a:p>
-          <a:p>
-            <a:pPr marL="0" indent="0">
-              <a:buNone/>
-            </a:pPr>
-            <a:r>
-              <a:rPr lang="en-US" dirty="0"/>
-              <a:t>In short:</a:t>
-            </a:r>
-          </a:p>
-          <a:p>
-            <a:pPr marL="514350" indent="-514350">
-              <a:buAutoNum type="arabicParenR"/>
-            </a:pPr>
-            <a:r>
-              <a:rPr lang="en-US" dirty="0"/>
-              <a:t>The general BSD 3-Clause copyright allows </a:t>
-            </a:r>
-            <a:r>
-              <a:rPr lang="en-US" b="1" dirty="0"/>
-              <a:t>similar redistribution</a:t>
-            </a:r>
-            <a:r>
-              <a:rPr lang="en-US" dirty="0"/>
-              <a:t>.</a:t>
-            </a:r>
-          </a:p>
-          <a:p>
-            <a:pPr marL="514350" indent="-514350">
-              <a:lnSpc>
-                <a:spcPct val="100000"/>
-              </a:lnSpc>
-              <a:buFont typeface="Arial" panose="020B0604020202020204" pitchFamily="34" charset="0"/>
-              <a:buAutoNum type="arabicParenR"/>
-            </a:pPr>
-            <a:r>
-              <a:rPr lang="en-US" dirty="0"/>
-              <a:t>The software is provided as is and in </a:t>
-            </a:r>
-            <a:r>
-              <a:rPr lang="en-US" b="1" dirty="0"/>
-              <a:t>no event </a:t>
-            </a:r>
-            <a:r>
-              <a:rPr lang="en-US" dirty="0"/>
-              <a:t>shall the copyright holder or contributors </a:t>
-            </a:r>
-            <a:r>
-              <a:rPr lang="en-US" b="1" dirty="0"/>
-              <a:t>be liable for any damages</a:t>
-            </a:r>
-            <a:r>
-              <a:rPr lang="en-US" dirty="0"/>
-              <a:t>.</a:t>
-            </a:r>
-          </a:p>
-          <a:p>
-            <a:pPr marL="514350" indent="-514350">
-              <a:lnSpc>
-                <a:spcPct val="100000"/>
-              </a:lnSpc>
-              <a:buFont typeface="Arial" panose="020B0604020202020204" pitchFamily="34" charset="0"/>
-              <a:buAutoNum type="arabicParenR"/>
-            </a:pPr>
-            <a:r>
-              <a:rPr lang="en-US" b="1" dirty="0"/>
-              <a:t>Neither </a:t>
-            </a:r>
-            <a:r>
-              <a:rPr lang="en-US" dirty="0"/>
-              <a:t>the name of the </a:t>
-            </a:r>
-            <a:r>
-              <a:rPr lang="en-US" b="1" dirty="0"/>
-              <a:t>copyright</a:t>
-            </a:r>
-            <a:r>
-              <a:rPr lang="en-US" dirty="0"/>
-              <a:t> </a:t>
-            </a:r>
-            <a:r>
-              <a:rPr lang="en-US" b="1" dirty="0"/>
-              <a:t>holder</a:t>
-            </a:r>
-            <a:r>
-              <a:rPr lang="en-US" dirty="0"/>
-              <a:t> </a:t>
-            </a:r>
-            <a:r>
-              <a:rPr lang="en-US" b="1" dirty="0"/>
-              <a:t>nor</a:t>
-            </a:r>
-            <a:r>
-              <a:rPr lang="en-US" dirty="0"/>
-              <a:t> the names of its </a:t>
-            </a:r>
-            <a:r>
-              <a:rPr lang="en-US" b="1" dirty="0"/>
-              <a:t>contributors</a:t>
-            </a:r>
-            <a:r>
-              <a:rPr lang="en-US" dirty="0"/>
-              <a:t> may be used to </a:t>
-            </a:r>
-            <a:r>
-              <a:rPr lang="en-US" b="1" dirty="0"/>
-              <a:t>endorse</a:t>
-            </a:r>
-            <a:r>
-              <a:rPr lang="en-US" dirty="0"/>
-              <a:t> </a:t>
-            </a:r>
-            <a:r>
-              <a:rPr lang="en-US" b="1" dirty="0"/>
-              <a:t>or promote products derived</a:t>
-            </a:r>
-            <a:r>
-              <a:rPr lang="en-US" dirty="0"/>
-              <a:t> from this software </a:t>
-            </a:r>
-            <a:r>
-              <a:rPr lang="en-US" b="1" dirty="0"/>
-              <a:t>without specific prior written permission</a:t>
-            </a:r>
-            <a:r>
-              <a:rPr lang="en-US" dirty="0"/>
-              <a:t>.</a:t>
-            </a:r>
-          </a:p>
-          <a:p>
-            <a:pPr marL="514350" indent="-514350">
-              <a:lnSpc>
-                <a:spcPct val="100000"/>
-              </a:lnSpc>
-              <a:buFont typeface="Arial" panose="020B0604020202020204" pitchFamily="34" charset="0"/>
-              <a:buAutoNum type="arabicParenR"/>
-            </a:pPr>
-            <a:endParaRPr lang="en-US" dirty="0"/>
-          </a:p>
-          <a:p>
-            <a:pPr marL="0" indent="0">
-              <a:buNone/>
-            </a:pPr>
-            <a:r>
-              <a:rPr lang="en-US" sz="2400" dirty="0"/>
-              <a:t>Full Information in </a:t>
-            </a:r>
-            <a:r>
-              <a:rPr lang="en-US" sz="2400" i="1" u="sng" dirty="0">
-                <a:solidFill>
-                  <a:schemeClr val="accent1"/>
-                </a:solidFill>
-              </a:rPr>
-              <a:t>https://</a:t>
-            </a:r>
-            <a:r>
-              <a:rPr lang="en-US" sz="2400" i="1" u="sng" dirty="0" err="1">
-                <a:solidFill>
-                  <a:schemeClr val="accent1"/>
-                </a:solidFill>
-              </a:rPr>
-              <a:t>github.com</a:t>
-            </a:r>
-            <a:r>
-              <a:rPr lang="en-US" sz="2400" i="1" u="sng" dirty="0">
-                <a:solidFill>
-                  <a:schemeClr val="accent1"/>
-                </a:solidFill>
-              </a:rPr>
-              <a:t>/zhteg4pvt/</a:t>
-            </a:r>
-            <a:r>
-              <a:rPr lang="en-US" sz="2400" i="1" u="sng" dirty="0" err="1">
-                <a:solidFill>
-                  <a:schemeClr val="accent1"/>
-                </a:solidFill>
-              </a:rPr>
-              <a:t>nemd</a:t>
-            </a:r>
-            <a:r>
-              <a:rPr lang="en-US" sz="2400" i="1" u="sng" dirty="0">
-                <a:solidFill>
-                  <a:schemeClr val="accent1"/>
-                </a:solidFill>
-              </a:rPr>
-              <a:t>/tree/main/LICENSE</a:t>
-            </a:r>
-          </a:p>
-        </p:txBody>
-      </p:sp>
-      <p:sp>
-        <p:nvSpPr>
-          <p:cNvPr id="4" name="Slide Number Placeholder 3">
-            <a:extLst>
-              <a:ext uri="{FF2B5EF4-FFF2-40B4-BE49-F238E27FC236}">
-                <a16:creationId xmlns:a16="http://schemas.microsoft.com/office/drawing/2014/main" id="{839FF44F-EF16-7C56-017A-21B581865526}"/>
-              </a:ext>
-            </a:extLst>
-          </p:cNvPr>
-          <p:cNvSpPr>
-            <a:spLocks noGrp="1"/>
-          </p:cNvSpPr>
-          <p:nvPr>
-            <p:ph type="sldNum" sz="quarter" idx="12"/>
-          </p:nvPr>
-        </p:nvSpPr>
-        <p:spPr/>
-        <p:txBody>
-          <a:bodyPr/>
-          <a:lstStyle/>
-          <a:p>
-            <a:fld id="{CF79FC58-3559-EC47-B32E-5EF128B06581}" type="slidenum">
-              <a:rPr lang="en-US" smtClean="0"/>
-              <a:t>2</a:t>
-            </a:fld>
-            <a:endParaRPr lang="en-US"/>
-          </a:p>
-        </p:txBody>
-      </p:sp>
-    </p:spTree>
-    <p:extLst>
-      <p:ext uri="{BB962C8B-B14F-4D97-AF65-F5344CB8AC3E}">
-        <p14:creationId xmlns:p14="http://schemas.microsoft.com/office/powerpoint/2010/main" val="3551528200"/>
       </p:ext>
     </p:extLst>
   </p:cSld>

</xml_diff>

<commit_message>
ptest 7 - 11 added to docs/power_point/nemd.pptx
</commit_message>
<xml_diff>
--- a/docs/power_point/nemd.pptx
+++ b/docs/power_point/nemd.pptx
@@ -5,7 +5,7 @@
     <p:sldMasterId id="2147483648" r:id="rId1"/>
   </p:sldMasterIdLst>
   <p:notesMasterIdLst>
-    <p:notesMasterId r:id="rId23"/>
+    <p:notesMasterId r:id="rId25"/>
   </p:notesMasterIdLst>
   <p:sldIdLst>
     <p:sldId id="256" r:id="rId2"/>
@@ -26,9 +26,11 @@
     <p:sldId id="276" r:id="rId17"/>
     <p:sldId id="277" r:id="rId18"/>
     <p:sldId id="278" r:id="rId19"/>
-    <p:sldId id="268" r:id="rId20"/>
-    <p:sldId id="272" r:id="rId21"/>
-    <p:sldId id="265" r:id="rId22"/>
+    <p:sldId id="279" r:id="rId20"/>
+    <p:sldId id="280" r:id="rId21"/>
+    <p:sldId id="268" r:id="rId22"/>
+    <p:sldId id="272" r:id="rId23"/>
+    <p:sldId id="265" r:id="rId24"/>
   </p:sldIdLst>
   <p:sldSz cx="12192000" cy="6858000"/>
   <p:notesSz cx="6858000" cy="9144000"/>
@@ -3108,7 +3110,7 @@
           <a:p>
             <a:fld id="{4E7935B3-F5AC-0F49-A77F-693DEAA46623}" type="datetimeFigureOut">
               <a:rPr lang="en-US" smtClean="0"/>
-              <a:t>9/12/25</a:t>
+              <a:t>9/13/25</a:t>
             </a:fld>
             <a:endParaRPr lang="en-US"/>
           </a:p>
@@ -3966,7 +3968,7 @@
           <a:p>
             <a:fld id="{7139230D-D256-FE47-99BF-6F642436F56E}" type="datetime1">
               <a:rPr lang="en-US" smtClean="0"/>
-              <a:t>9/12/25</a:t>
+              <a:t>9/13/25</a:t>
             </a:fld>
             <a:endParaRPr lang="en-US"/>
           </a:p>
@@ -4164,7 +4166,7 @@
           <a:p>
             <a:fld id="{785AC849-5CEB-3846-9265-8D72BE481A70}" type="datetime1">
               <a:rPr lang="en-US" smtClean="0"/>
-              <a:t>9/12/25</a:t>
+              <a:t>9/13/25</a:t>
             </a:fld>
             <a:endParaRPr lang="en-US"/>
           </a:p>
@@ -4372,7 +4374,7 @@
           <a:p>
             <a:fld id="{A02BBDEB-BEE0-FD44-AAFC-27969F9541FD}" type="datetime1">
               <a:rPr lang="en-US" smtClean="0"/>
-              <a:t>9/12/25</a:t>
+              <a:t>9/13/25</a:t>
             </a:fld>
             <a:endParaRPr lang="en-US"/>
           </a:p>
@@ -4570,7 +4572,7 @@
           <a:p>
             <a:fld id="{4F82860A-5855-1941-A1E0-F1AE52EC854D}" type="datetime1">
               <a:rPr lang="en-US" smtClean="0"/>
-              <a:t>9/12/25</a:t>
+              <a:t>9/13/25</a:t>
             </a:fld>
             <a:endParaRPr lang="en-US"/>
           </a:p>
@@ -4845,7 +4847,7 @@
           <a:p>
             <a:fld id="{6A874B4C-42F5-E24E-B25F-613EC7F4AF0D}" type="datetime1">
               <a:rPr lang="en-US" smtClean="0"/>
-              <a:t>9/12/25</a:t>
+              <a:t>9/13/25</a:t>
             </a:fld>
             <a:endParaRPr lang="en-US"/>
           </a:p>
@@ -5110,7 +5112,7 @@
           <a:p>
             <a:fld id="{9A2BCD20-0178-0C41-9D8E-10FA267A6CCC}" type="datetime1">
               <a:rPr lang="en-US" smtClean="0"/>
-              <a:t>9/12/25</a:t>
+              <a:t>9/13/25</a:t>
             </a:fld>
             <a:endParaRPr lang="en-US"/>
           </a:p>
@@ -5522,7 +5524,7 @@
           <a:p>
             <a:fld id="{EDE58456-60EB-6840-BCEB-E4C2678C039E}" type="datetime1">
               <a:rPr lang="en-US" smtClean="0"/>
-              <a:t>9/12/25</a:t>
+              <a:t>9/13/25</a:t>
             </a:fld>
             <a:endParaRPr lang="en-US"/>
           </a:p>
@@ -5663,7 +5665,7 @@
           <a:p>
             <a:fld id="{8BBFCD94-1F0D-3948-A9F0-DB82F9AAC2D3}" type="datetime1">
               <a:rPr lang="en-US" smtClean="0"/>
-              <a:t>9/12/25</a:t>
+              <a:t>9/13/25</a:t>
             </a:fld>
             <a:endParaRPr lang="en-US"/>
           </a:p>
@@ -5776,7 +5778,7 @@
           <a:p>
             <a:fld id="{13692FAC-AC21-0848-AC27-426B7BF29104}" type="datetime1">
               <a:rPr lang="en-US" smtClean="0"/>
-              <a:t>9/12/25</a:t>
+              <a:t>9/13/25</a:t>
             </a:fld>
             <a:endParaRPr lang="en-US"/>
           </a:p>
@@ -6087,7 +6089,7 @@
           <a:p>
             <a:fld id="{A3FF56F3-8608-FF4D-9C26-AE6D473095CB}" type="datetime1">
               <a:rPr lang="en-US" smtClean="0"/>
-              <a:t>9/12/25</a:t>
+              <a:t>9/13/25</a:t>
             </a:fld>
             <a:endParaRPr lang="en-US"/>
           </a:p>
@@ -6375,7 +6377,7 @@
           <a:p>
             <a:fld id="{58CC49A9-C646-2345-B4A7-439457175566}" type="datetime1">
               <a:rPr lang="en-US" smtClean="0"/>
-              <a:t>9/12/25</a:t>
+              <a:t>9/13/25</a:t>
             </a:fld>
             <a:endParaRPr lang="en-US"/>
           </a:p>
@@ -6616,7 +6618,7 @@
           <a:p>
             <a:fld id="{D516C8CC-C3CD-B94B-94D6-0913487DB5E5}" type="datetime1">
               <a:rPr lang="en-US" smtClean="0"/>
-              <a:t>9/12/25</a:t>
+              <a:t>9/13/25</a:t>
             </a:fld>
             <a:endParaRPr lang="en-US"/>
           </a:p>
@@ -21985,8 +21987,8 @@
         </p:nvSpPr>
         <p:spPr>
           <a:xfrm>
-            <a:off x="538766" y="1605949"/>
-            <a:ext cx="5446055" cy="369332"/>
+            <a:off x="1508758" y="1605949"/>
+            <a:ext cx="3233885" cy="369332"/>
           </a:xfrm>
           <a:prstGeom prst="rect">
             <a:avLst/>
@@ -22000,7 +22002,7 @@
           <a:p>
             <a:r>
               <a:rPr lang="en-US" dirty="0"/>
-              <a:t>0001: Grided Amorphous Structure of Argon Atoms</a:t>
+              <a:t>01: Gridded Amorphous Argon</a:t>
             </a:r>
           </a:p>
         </p:txBody>
@@ -22019,8 +22021,8 @@
         </p:nvSpPr>
         <p:spPr>
           <a:xfrm>
-            <a:off x="1199476" y="6169580"/>
-            <a:ext cx="3494867" cy="369332"/>
+            <a:off x="7030146" y="227052"/>
+            <a:ext cx="4837606" cy="646331"/>
           </a:xfrm>
           <a:prstGeom prst="rect">
             <a:avLst/>
@@ -22035,7 +22037,14 @@
             <a:pPr algn="ctr"/>
             <a:r>
               <a:rPr lang="en-US" dirty="0"/>
-              <a:t>Mac mini: Apple M4, 16GB LPDDR5</a:t>
+              <a:t>macOS Sequoia 15.6.1, Apple M4, 16GB LPDDR5</a:t>
+            </a:r>
+          </a:p>
+          <a:p>
+            <a:pPr algn="ctr"/>
+            <a:r>
+              <a:rPr lang="en-US" dirty="0"/>
+              <a:t>Ubuntu 22.04.5 LTS, i5-11400F, RTX 3060 Ti, 16GB</a:t>
             </a:r>
           </a:p>
         </p:txBody>
@@ -22252,8 +22261,8 @@
         </p:nvSpPr>
         <p:spPr>
           <a:xfrm>
-            <a:off x="6284255" y="1605949"/>
-            <a:ext cx="5446055" cy="369332"/>
+            <a:off x="7223757" y="1609344"/>
+            <a:ext cx="3332404" cy="369332"/>
           </a:xfrm>
           <a:prstGeom prst="rect">
             <a:avLst/>
@@ -22267,7 +22276,7 @@
           <a:p>
             <a:r>
               <a:rPr lang="en-US" dirty="0"/>
-              <a:t>0002: Grided Amorphous Structure of Butane Molecules</a:t>
+              <a:t>02: Gridded Amorphous Butane</a:t>
             </a:r>
           </a:p>
         </p:txBody>
@@ -22286,7 +22295,7 @@
         </p:nvSpPr>
         <p:spPr>
           <a:xfrm>
-            <a:off x="9140030" y="2763539"/>
+            <a:off x="9140030" y="2789663"/>
             <a:ext cx="1684340" cy="584775"/>
           </a:xfrm>
           <a:prstGeom prst="rect">
@@ -22339,8 +22348,8 @@
         </p:nvCxnSpPr>
         <p:spPr>
           <a:xfrm>
-            <a:off x="10328857" y="3348314"/>
-            <a:ext cx="227304" cy="93385"/>
+            <a:off x="10365377" y="3374438"/>
+            <a:ext cx="190784" cy="67261"/>
           </a:xfrm>
           <a:prstGeom prst="straightConnector1">
             <a:avLst/>
@@ -22367,6 +22376,49 @@
           </a:fontRef>
         </p:style>
       </p:cxnSp>
+      <p:sp>
+        <p:nvSpPr>
+          <p:cNvPr id="7" name="TextBox 6">
+            <a:extLst>
+              <a:ext uri="{FF2B5EF4-FFF2-40B4-BE49-F238E27FC236}">
+                <a16:creationId xmlns:a16="http://schemas.microsoft.com/office/drawing/2014/main" id="{A04E0490-FAF4-DD25-5424-E24C679503C5}"/>
+              </a:ext>
+            </a:extLst>
+          </p:cNvPr>
+          <p:cNvSpPr txBox="1"/>
+          <p:nvPr/>
+        </p:nvSpPr>
+        <p:spPr>
+          <a:xfrm>
+            <a:off x="4947079" y="6169580"/>
+            <a:ext cx="2263010" cy="369332"/>
+          </a:xfrm>
+          <a:prstGeom prst="rect">
+            <a:avLst/>
+          </a:prstGeom>
+          <a:noFill/>
+        </p:spPr>
+        <p:txBody>
+          <a:bodyPr wrap="square">
+            <a:spAutoFit/>
+          </a:bodyPr>
+          <a:lstStyle/>
+          <a:p>
+            <a:r>
+              <a:rPr lang="en-US" dirty="0"/>
+              <a:t>0.5 g/cm</a:t>
+            </a:r>
+            <a:r>
+              <a:rPr lang="en-US" baseline="30000" dirty="0"/>
+              <a:t>3</a:t>
+            </a:r>
+            <a:r>
+              <a:rPr lang="en-US" dirty="0"/>
+              <a:t> &amp; 0.5 radius</a:t>
+            </a:r>
+          </a:p>
+        </p:txBody>
+      </p:sp>
     </p:spTree>
     <p:extLst>
       <p:ext uri="{BB962C8B-B14F-4D97-AF65-F5344CB8AC3E}">
@@ -22450,8 +22502,8 @@
         </p:nvSpPr>
         <p:spPr>
           <a:xfrm>
-            <a:off x="538766" y="1605949"/>
-            <a:ext cx="5446055" cy="369332"/>
+            <a:off x="1515291" y="1605949"/>
+            <a:ext cx="2953167" cy="369332"/>
           </a:xfrm>
           <a:prstGeom prst="rect">
             <a:avLst/>
@@ -22465,42 +22517,7 @@
           <a:p>
             <a:r>
               <a:rPr lang="en-US" dirty="0"/>
-              <a:t>0003: Packed Amorphous Structure of Argon Atoms</a:t>
-            </a:r>
-          </a:p>
-        </p:txBody>
-      </p:sp>
-      <p:sp>
-        <p:nvSpPr>
-          <p:cNvPr id="8" name="Rectangle 7">
-            <a:extLst>
-              <a:ext uri="{FF2B5EF4-FFF2-40B4-BE49-F238E27FC236}">
-                <a16:creationId xmlns:a16="http://schemas.microsoft.com/office/drawing/2014/main" id="{674780FD-1A5C-59A7-F3B0-36B65C300F2A}"/>
-              </a:ext>
-            </a:extLst>
-          </p:cNvPr>
-          <p:cNvSpPr/>
-          <p:nvPr/>
-        </p:nvSpPr>
-        <p:spPr>
-          <a:xfrm>
-            <a:off x="1199476" y="6169580"/>
-            <a:ext cx="3494867" cy="369332"/>
-          </a:xfrm>
-          <a:prstGeom prst="rect">
-            <a:avLst/>
-          </a:prstGeom>
-        </p:spPr>
-        <p:txBody>
-          <a:bodyPr wrap="none">
-            <a:spAutoFit/>
-          </a:bodyPr>
-          <a:lstStyle/>
-          <a:p>
-            <a:pPr algn="ctr"/>
-            <a:r>
-              <a:rPr lang="en-US" dirty="0"/>
-              <a:t>Mac mini: Apple M4, 16GB LPDDR5</a:t>
+              <a:t>03: Packed Amorphous Argon</a:t>
             </a:r>
           </a:p>
         </p:txBody>
@@ -22548,8 +22565,8 @@
         </p:nvSpPr>
         <p:spPr>
           <a:xfrm>
-            <a:off x="6284255" y="1605949"/>
-            <a:ext cx="5446055" cy="369332"/>
+            <a:off x="7230291" y="1605949"/>
+            <a:ext cx="3050178" cy="369332"/>
           </a:xfrm>
           <a:prstGeom prst="rect">
             <a:avLst/>
@@ -22563,7 +22580,7 @@
           <a:p>
             <a:r>
               <a:rPr lang="en-US" dirty="0"/>
-              <a:t>0004: Grown Amorphous Structure of Butane Molecules</a:t>
+              <a:t>04: Grown Amorphous Butane</a:t>
             </a:r>
           </a:p>
         </p:txBody>
@@ -22618,8 +22635,8 @@
         </p:nvSpPr>
         <p:spPr>
           <a:xfrm>
-            <a:off x="2452926" y="2171929"/>
-            <a:ext cx="2105472" cy="338554"/>
+            <a:off x="2518238" y="2171929"/>
+            <a:ext cx="1942725" cy="338554"/>
           </a:xfrm>
           <a:prstGeom prst="rect">
             <a:avLst/>
@@ -22753,8 +22770,8 @@
         </p:nvSpPr>
         <p:spPr>
           <a:xfrm>
-            <a:off x="8196657" y="2171929"/>
-            <a:ext cx="2105472" cy="338554"/>
+            <a:off x="8261970" y="2171929"/>
+            <a:ext cx="1950219" cy="338554"/>
           </a:xfrm>
           <a:prstGeom prst="rect">
             <a:avLst/>
@@ -22838,6 +22855,91 @@
           </a:fontRef>
         </p:style>
       </p:cxnSp>
+      <p:sp>
+        <p:nvSpPr>
+          <p:cNvPr id="11" name="TextBox 10">
+            <a:extLst>
+              <a:ext uri="{FF2B5EF4-FFF2-40B4-BE49-F238E27FC236}">
+                <a16:creationId xmlns:a16="http://schemas.microsoft.com/office/drawing/2014/main" id="{AAE119E6-1879-2FD7-BD79-0C284E8E58A4}"/>
+              </a:ext>
+            </a:extLst>
+          </p:cNvPr>
+          <p:cNvSpPr txBox="1"/>
+          <p:nvPr/>
+        </p:nvSpPr>
+        <p:spPr>
+          <a:xfrm>
+            <a:off x="4947079" y="6172200"/>
+            <a:ext cx="2263010" cy="369332"/>
+          </a:xfrm>
+          <a:prstGeom prst="rect">
+            <a:avLst/>
+          </a:prstGeom>
+          <a:noFill/>
+        </p:spPr>
+        <p:txBody>
+          <a:bodyPr wrap="square">
+            <a:spAutoFit/>
+          </a:bodyPr>
+          <a:lstStyle/>
+          <a:p>
+            <a:r>
+              <a:rPr lang="en-US" dirty="0"/>
+              <a:t>0.5 g/cm</a:t>
+            </a:r>
+            <a:r>
+              <a:rPr lang="en-US" baseline="30000" dirty="0"/>
+              <a:t>3</a:t>
+            </a:r>
+            <a:r>
+              <a:rPr lang="en-US" dirty="0"/>
+              <a:t> &amp; 0.5 radius</a:t>
+            </a:r>
+          </a:p>
+        </p:txBody>
+      </p:sp>
+      <p:sp>
+        <p:nvSpPr>
+          <p:cNvPr id="4" name="Rectangle 3">
+            <a:extLst>
+              <a:ext uri="{FF2B5EF4-FFF2-40B4-BE49-F238E27FC236}">
+                <a16:creationId xmlns:a16="http://schemas.microsoft.com/office/drawing/2014/main" id="{6FCDE2B8-1654-16A3-9D22-E6660D52DED2}"/>
+              </a:ext>
+            </a:extLst>
+          </p:cNvPr>
+          <p:cNvSpPr/>
+          <p:nvPr/>
+        </p:nvSpPr>
+        <p:spPr>
+          <a:xfrm>
+            <a:off x="7030146" y="227052"/>
+            <a:ext cx="4837606" cy="646331"/>
+          </a:xfrm>
+          <a:prstGeom prst="rect">
+            <a:avLst/>
+          </a:prstGeom>
+        </p:spPr>
+        <p:txBody>
+          <a:bodyPr wrap="none">
+            <a:spAutoFit/>
+          </a:bodyPr>
+          <a:lstStyle/>
+          <a:p>
+            <a:pPr algn="ctr"/>
+            <a:r>
+              <a:rPr lang="en-US" dirty="0"/>
+              <a:t>macOS Sequoia 15.6.1, Apple M4, 16GB LPDDR5</a:t>
+            </a:r>
+          </a:p>
+          <a:p>
+            <a:pPr algn="ctr"/>
+            <a:r>
+              <a:rPr lang="en-US" dirty="0"/>
+              <a:t>Ubuntu 22.04.5 LTS, i5-11400F, RTX 3060 Ti, 16GB</a:t>
+            </a:r>
+          </a:p>
+        </p:txBody>
+      </p:sp>
     </p:spTree>
     <p:extLst>
       <p:ext uri="{BB962C8B-B14F-4D97-AF65-F5344CB8AC3E}">
@@ -22921,8 +23023,8 @@
         </p:nvSpPr>
         <p:spPr>
           <a:xfrm>
-            <a:off x="538766" y="1605949"/>
-            <a:ext cx="5446055" cy="369332"/>
+            <a:off x="1306286" y="1605949"/>
+            <a:ext cx="5113244" cy="369332"/>
           </a:xfrm>
           <a:prstGeom prst="rect">
             <a:avLst/>
@@ -22936,42 +23038,7 @@
           <a:p>
             <a:r>
               <a:rPr lang="en-US" dirty="0"/>
-              <a:t>0005: Packed Amorphous Structure of Polyethylene</a:t>
-            </a:r>
-          </a:p>
-        </p:txBody>
-      </p:sp>
-      <p:sp>
-        <p:nvSpPr>
-          <p:cNvPr id="8" name="Rectangle 7">
-            <a:extLst>
-              <a:ext uri="{FF2B5EF4-FFF2-40B4-BE49-F238E27FC236}">
-                <a16:creationId xmlns:a16="http://schemas.microsoft.com/office/drawing/2014/main" id="{FC8D5E20-2A6E-EDC8-ADF7-E8CEA5DD7D2C}"/>
-              </a:ext>
-            </a:extLst>
-          </p:cNvPr>
-          <p:cNvSpPr/>
-          <p:nvPr/>
-        </p:nvSpPr>
-        <p:spPr>
-          <a:xfrm>
-            <a:off x="1199476" y="6169580"/>
-            <a:ext cx="3494867" cy="369332"/>
-          </a:xfrm>
-          <a:prstGeom prst="rect">
-            <a:avLst/>
-          </a:prstGeom>
-        </p:spPr>
-        <p:txBody>
-          <a:bodyPr wrap="none">
-            <a:spAutoFit/>
-          </a:bodyPr>
-          <a:lstStyle/>
-          <a:p>
-            <a:pPr algn="ctr"/>
-            <a:r>
-              <a:rPr lang="en-US" dirty="0"/>
-              <a:t>Mac mini: Apple M4, 16GB LPDDR5</a:t>
+              <a:t>05: Packed Amorphous Polyethylene</a:t>
             </a:r>
           </a:p>
         </p:txBody>
@@ -23019,8 +23086,8 @@
         </p:nvSpPr>
         <p:spPr>
           <a:xfrm>
-            <a:off x="6730584" y="1605949"/>
-            <a:ext cx="4999726" cy="369332"/>
+            <a:off x="7752805" y="1605949"/>
+            <a:ext cx="3871087" cy="369332"/>
           </a:xfrm>
           <a:prstGeom prst="rect">
             <a:avLst/>
@@ -23034,7 +23101,7 @@
           <a:p>
             <a:r>
               <a:rPr lang="en-US" dirty="0"/>
-              <a:t>0006: Trajectory Density (100 hexane per frame)</a:t>
+              <a:t>06: Trajectory Density</a:t>
             </a:r>
           </a:p>
         </p:txBody>
@@ -23067,7 +23134,7 @@
         </p:blipFill>
         <p:spPr>
           <a:xfrm>
-            <a:off x="365760" y="2057400"/>
+            <a:off x="457200" y="2057400"/>
             <a:ext cx="5486400" cy="4114800"/>
           </a:xfrm>
           <a:prstGeom prst="rect">
@@ -23089,7 +23156,7 @@
         </p:nvSpPr>
         <p:spPr>
           <a:xfrm>
-            <a:off x="3108960" y="2248873"/>
+            <a:off x="3180801" y="2248873"/>
             <a:ext cx="1771261" cy="523220"/>
           </a:xfrm>
           <a:prstGeom prst="rect">
@@ -23314,6 +23381,126 @@
           </a:fontRef>
         </p:style>
       </p:cxnSp>
+      <p:sp>
+        <p:nvSpPr>
+          <p:cNvPr id="9" name="TextBox 8">
+            <a:extLst>
+              <a:ext uri="{FF2B5EF4-FFF2-40B4-BE49-F238E27FC236}">
+                <a16:creationId xmlns:a16="http://schemas.microsoft.com/office/drawing/2014/main" id="{894AA54D-E7D2-7BC0-A470-182B76716D25}"/>
+              </a:ext>
+            </a:extLst>
+          </p:cNvPr>
+          <p:cNvSpPr txBox="1"/>
+          <p:nvPr/>
+        </p:nvSpPr>
+        <p:spPr>
+          <a:xfrm>
+            <a:off x="1915015" y="6172200"/>
+            <a:ext cx="2310819" cy="369332"/>
+          </a:xfrm>
+          <a:prstGeom prst="rect">
+            <a:avLst/>
+          </a:prstGeom>
+          <a:noFill/>
+        </p:spPr>
+        <p:txBody>
+          <a:bodyPr wrap="square">
+            <a:spAutoFit/>
+          </a:bodyPr>
+          <a:lstStyle/>
+          <a:p>
+            <a:r>
+              <a:rPr lang="en-US" dirty="0"/>
+              <a:t>0.5 g/cm</a:t>
+            </a:r>
+            <a:r>
+              <a:rPr lang="en-US" baseline="30000" dirty="0"/>
+              <a:t>3</a:t>
+            </a:r>
+            <a:r>
+              <a:rPr lang="en-US" dirty="0"/>
+              <a:t> &amp; 0.5 radius</a:t>
+            </a:r>
+          </a:p>
+        </p:txBody>
+      </p:sp>
+      <p:sp>
+        <p:nvSpPr>
+          <p:cNvPr id="12" name="TextBox 11">
+            <a:extLst>
+              <a:ext uri="{FF2B5EF4-FFF2-40B4-BE49-F238E27FC236}">
+                <a16:creationId xmlns:a16="http://schemas.microsoft.com/office/drawing/2014/main" id="{88388CB5-E31C-D9C7-4BCE-560227EFF033}"/>
+              </a:ext>
+            </a:extLst>
+          </p:cNvPr>
+          <p:cNvSpPr txBox="1"/>
+          <p:nvPr/>
+        </p:nvSpPr>
+        <p:spPr>
+          <a:xfrm>
+            <a:off x="7966712" y="6172200"/>
+            <a:ext cx="2310819" cy="369332"/>
+          </a:xfrm>
+          <a:prstGeom prst="rect">
+            <a:avLst/>
+          </a:prstGeom>
+          <a:noFill/>
+        </p:spPr>
+        <p:txBody>
+          <a:bodyPr wrap="square">
+            <a:spAutoFit/>
+          </a:bodyPr>
+          <a:lstStyle/>
+          <a:p>
+            <a:r>
+              <a:rPr lang="en-US" dirty="0"/>
+              <a:t>100 hexane per frame</a:t>
+            </a:r>
+          </a:p>
+        </p:txBody>
+      </p:sp>
+      <p:sp>
+        <p:nvSpPr>
+          <p:cNvPr id="5" name="Rectangle 4">
+            <a:extLst>
+              <a:ext uri="{FF2B5EF4-FFF2-40B4-BE49-F238E27FC236}">
+                <a16:creationId xmlns:a16="http://schemas.microsoft.com/office/drawing/2014/main" id="{BE5539B0-8416-34DD-550E-52013F1C6475}"/>
+              </a:ext>
+            </a:extLst>
+          </p:cNvPr>
+          <p:cNvSpPr/>
+          <p:nvPr/>
+        </p:nvSpPr>
+        <p:spPr>
+          <a:xfrm>
+            <a:off x="7030146" y="227052"/>
+            <a:ext cx="4837606" cy="646331"/>
+          </a:xfrm>
+          <a:prstGeom prst="rect">
+            <a:avLst/>
+          </a:prstGeom>
+        </p:spPr>
+        <p:txBody>
+          <a:bodyPr wrap="none">
+            <a:spAutoFit/>
+          </a:bodyPr>
+          <a:lstStyle/>
+          <a:p>
+            <a:pPr algn="ctr"/>
+            <a:r>
+              <a:rPr lang="en-US" dirty="0"/>
+              <a:t>macOS Sequoia 15.6.1, Apple M4, 16GB LPDDR5</a:t>
+            </a:r>
+          </a:p>
+          <a:p>
+            <a:pPr algn="ctr"/>
+            <a:r>
+              <a:rPr lang="en-US" dirty="0"/>
+              <a:t>Ubuntu 22.04.5 LTS, i5-11400F, RTX 3060 Ti, 16GB</a:t>
+            </a:r>
+          </a:p>
+        </p:txBody>
+      </p:sp>
     </p:spTree>
     <p:extLst>
       <p:ext uri="{BB962C8B-B14F-4D97-AF65-F5344CB8AC3E}">
@@ -23397,8 +23584,8 @@
         </p:nvSpPr>
         <p:spPr>
           <a:xfrm>
-            <a:off x="538766" y="1605949"/>
-            <a:ext cx="5446055" cy="369332"/>
+            <a:off x="1789612" y="1605949"/>
+            <a:ext cx="2495006" cy="369332"/>
           </a:xfrm>
           <a:prstGeom prst="rect">
             <a:avLst/>
@@ -23412,42 +23599,7 @@
           <a:p>
             <a:r>
               <a:rPr lang="en-US" dirty="0"/>
-              <a:t>0005: Packed Amorphous Structure of Polyethylene</a:t>
-            </a:r>
-          </a:p>
-        </p:txBody>
-      </p:sp>
-      <p:sp>
-        <p:nvSpPr>
-          <p:cNvPr id="8" name="Rectangle 7">
-            <a:extLst>
-              <a:ext uri="{FF2B5EF4-FFF2-40B4-BE49-F238E27FC236}">
-                <a16:creationId xmlns:a16="http://schemas.microsoft.com/office/drawing/2014/main" id="{BF321DB4-6640-7318-B9B9-C87B6BFB9241}"/>
-              </a:ext>
-            </a:extLst>
-          </p:cNvPr>
-          <p:cNvSpPr/>
-          <p:nvPr/>
-        </p:nvSpPr>
-        <p:spPr>
-          <a:xfrm>
-            <a:off x="1199476" y="6169580"/>
-            <a:ext cx="3494867" cy="369332"/>
-          </a:xfrm>
-          <a:prstGeom prst="rect">
-            <a:avLst/>
-          </a:prstGeom>
-        </p:spPr>
-        <p:txBody>
-          <a:bodyPr wrap="none">
-            <a:spAutoFit/>
-          </a:bodyPr>
-          <a:lstStyle/>
-          <a:p>
-            <a:pPr algn="ctr"/>
-            <a:r>
-              <a:rPr lang="en-US" dirty="0"/>
-              <a:t>Mac mini: Apple M4, 16GB LPDDR5</a:t>
+              <a:t>07: Trajectory XYZ writer</a:t>
             </a:r>
           </a:p>
         </p:txBody>
@@ -23477,7 +23629,7 @@
               <a:rPr lang="en-US" smtClean="0"/>
               <a:t>18</a:t>
             </a:fld>
-            <a:endParaRPr lang="en-US"/>
+            <a:endParaRPr lang="en-US" dirty="0"/>
           </a:p>
         </p:txBody>
       </p:sp>
@@ -23495,8 +23647,8 @@
         </p:nvSpPr>
         <p:spPr>
           <a:xfrm>
-            <a:off x="6730584" y="1605949"/>
-            <a:ext cx="4999726" cy="369332"/>
+            <a:off x="7458892" y="1605949"/>
+            <a:ext cx="2619102" cy="369332"/>
           </a:xfrm>
           <a:prstGeom prst="rect">
             <a:avLst/>
@@ -23510,17 +23662,17 @@
           <a:p>
             <a:r>
               <a:rPr lang="en-US" dirty="0"/>
-              <a:t>0006: Trajectory Density (100 hexane per frame)</a:t>
+              <a:t>08: Trajectory HTML View</a:t>
             </a:r>
           </a:p>
         </p:txBody>
       </p:sp>
       <p:pic>
         <p:nvPicPr>
-          <p:cNvPr id="10" name="Graphic 9">
+          <p:cNvPr id="9" name="Graphic 8">
             <a:extLst>
               <a:ext uri="{FF2B5EF4-FFF2-40B4-BE49-F238E27FC236}">
-                <a16:creationId xmlns:a16="http://schemas.microsoft.com/office/drawing/2014/main" id="{942F901B-E192-6C42-006A-7C0794F9C9D2}"/>
+                <a16:creationId xmlns:a16="http://schemas.microsoft.com/office/drawing/2014/main" id="{1AFEB8F6-2B28-75A4-CCA2-6E929B740CBC}"/>
               </a:ext>
             </a:extLst>
           </p:cNvPr>
@@ -23543,7 +23695,7 @@
         </p:blipFill>
         <p:spPr>
           <a:xfrm>
-            <a:off x="365760" y="2057400"/>
+            <a:off x="457200" y="2054780"/>
             <a:ext cx="5486400" cy="4114800"/>
           </a:xfrm>
           <a:prstGeom prst="rect">
@@ -23553,10 +23705,10 @@
       </p:pic>
       <p:sp>
         <p:nvSpPr>
-          <p:cNvPr id="7" name="TextBox 6">
+          <p:cNvPr id="11" name="TextBox 10">
             <a:extLst>
               <a:ext uri="{FF2B5EF4-FFF2-40B4-BE49-F238E27FC236}">
-                <a16:creationId xmlns:a16="http://schemas.microsoft.com/office/drawing/2014/main" id="{840C698B-100F-E7CC-1FF8-E7C6EFD29A47}"/>
+                <a16:creationId xmlns:a16="http://schemas.microsoft.com/office/drawing/2014/main" id="{2C0BAB78-9B73-510C-3F19-A1F9C974F1ED}"/>
               </a:ext>
             </a:extLst>
           </p:cNvPr>
@@ -23565,8 +23717,8 @@
         </p:nvSpPr>
         <p:spPr>
           <a:xfrm>
-            <a:off x="3108960" y="2248873"/>
-            <a:ext cx="1771261" cy="523220"/>
+            <a:off x="3187340" y="3601641"/>
+            <a:ext cx="2105472" cy="584775"/>
           </a:xfrm>
           <a:prstGeom prst="rect">
             <a:avLst/>
@@ -23581,46 +23733,33 @@
           <a:p>
             <a:pPr algn="ctr"/>
             <a:r>
-              <a:rPr lang="en-US" sz="1400" dirty="0">
+              <a:rPr lang="en-US" sz="1600" dirty="0">
                 <a:solidFill>
                   <a:srgbClr val="C00000"/>
                 </a:solidFill>
               </a:rPr>
-              <a:t> 22.59 h</a:t>
+              <a:t> 0.65 min / 200 MB</a:t>
             </a:r>
           </a:p>
           <a:p>
             <a:pPr algn="ctr"/>
             <a:r>
-              <a:rPr lang="en-US" sz="1400" dirty="0">
+              <a:rPr lang="en-US" sz="1600" dirty="0">
                 <a:solidFill>
                   <a:srgbClr val="C00000"/>
                 </a:solidFill>
               </a:rPr>
-              <a:t>20,000 (−CH2−)</a:t>
-            </a:r>
-            <a:r>
-              <a:rPr lang="en-US" sz="1400" baseline="-25000" dirty="0">
-                <a:solidFill>
-                  <a:srgbClr val="C00000"/>
-                </a:solidFill>
-              </a:rPr>
-              <a:t>100</a:t>
-            </a:r>
-            <a:endParaRPr lang="en-US" sz="1400" dirty="0">
-              <a:solidFill>
-                <a:srgbClr val="C00000"/>
-              </a:solidFill>
-            </a:endParaRPr>
+              <a:t>25,000 frames</a:t>
+            </a:r>
           </a:p>
         </p:txBody>
       </p:sp>
       <p:cxnSp>
         <p:nvCxnSpPr>
-          <p:cNvPr id="15" name="Straight Arrow Connector 14">
+          <p:cNvPr id="12" name="Straight Arrow Connector 11">
             <a:extLst>
               <a:ext uri="{FF2B5EF4-FFF2-40B4-BE49-F238E27FC236}">
-                <a16:creationId xmlns:a16="http://schemas.microsoft.com/office/drawing/2014/main" id="{9BB0D861-82D2-5840-202E-689F97F1CEAC}"/>
+                <a16:creationId xmlns:a16="http://schemas.microsoft.com/office/drawing/2014/main" id="{D4C7382D-E7AB-DE91-256A-9F618BFBD150}"/>
               </a:ext>
             </a:extLst>
           </p:cNvPr>
@@ -23630,9 +23769,9 @@
           <p:nvPr/>
         </p:nvCxnSpPr>
         <p:spPr>
-          <a:xfrm flipV="1">
-            <a:off x="4517758" y="2412288"/>
-            <a:ext cx="217848" cy="98195"/>
+          <a:xfrm>
+            <a:off x="4851095" y="3901858"/>
+            <a:ext cx="145446" cy="69251"/>
           </a:xfrm>
           <a:prstGeom prst="straightConnector1">
             <a:avLst/>
@@ -23661,10 +23800,594 @@
       </p:cxnSp>
       <p:pic>
         <p:nvPicPr>
-          <p:cNvPr id="13" name="Graphic 12">
+          <p:cNvPr id="17" name="Graphic 16">
             <a:extLst>
               <a:ext uri="{FF2B5EF4-FFF2-40B4-BE49-F238E27FC236}">
-                <a16:creationId xmlns:a16="http://schemas.microsoft.com/office/drawing/2014/main" id="{0642BD6E-00B3-B468-EF51-EA2B5D2A7436}"/>
+                <a16:creationId xmlns:a16="http://schemas.microsoft.com/office/drawing/2014/main" id="{8208EDF4-2B81-DD75-0AB9-1AE6AB620E6F}"/>
+              </a:ext>
+            </a:extLst>
+          </p:cNvPr>
+          <p:cNvPicPr>
+            <a:picLocks noChangeAspect="1"/>
+          </p:cNvPicPr>
+          <p:nvPr/>
+        </p:nvPicPr>
+        <p:blipFill>
+          <a:blip r:embed="rId4">
+            <a:extLst>
+              <a:ext uri="{96DAC541-7B7A-43D3-8B79-37D633B846F1}">
+                <asvg:svgBlip xmlns:asvg="http://schemas.microsoft.com/office/drawing/2016/SVG/main" r:embed="rId5"/>
+              </a:ext>
+            </a:extLst>
+          </a:blip>
+          <a:stretch>
+            <a:fillRect/>
+          </a:stretch>
+        </p:blipFill>
+        <p:spPr>
+          <a:xfrm>
+            <a:off x="6172200" y="2054780"/>
+            <a:ext cx="5486400" cy="4114800"/>
+          </a:xfrm>
+          <a:prstGeom prst="rect">
+            <a:avLst/>
+          </a:prstGeom>
+        </p:spPr>
+      </p:pic>
+      <p:sp>
+        <p:nvSpPr>
+          <p:cNvPr id="18" name="TextBox 17">
+            <a:extLst>
+              <a:ext uri="{FF2B5EF4-FFF2-40B4-BE49-F238E27FC236}">
+                <a16:creationId xmlns:a16="http://schemas.microsoft.com/office/drawing/2014/main" id="{493EE783-DE05-12B6-9B0A-0E15AE8A2624}"/>
+              </a:ext>
+            </a:extLst>
+          </p:cNvPr>
+          <p:cNvSpPr txBox="1"/>
+          <p:nvPr/>
+        </p:nvSpPr>
+        <p:spPr>
+          <a:xfrm>
+            <a:off x="9235439" y="2206096"/>
+            <a:ext cx="1593669" cy="584775"/>
+          </a:xfrm>
+          <a:prstGeom prst="rect">
+            <a:avLst/>
+          </a:prstGeom>
+          <a:noFill/>
+        </p:spPr>
+        <p:txBody>
+          <a:bodyPr wrap="square">
+            <a:spAutoFit/>
+          </a:bodyPr>
+          <a:lstStyle/>
+          <a:p>
+            <a:pPr algn="ctr"/>
+            <a:r>
+              <a:rPr lang="en-US" sz="1600" dirty="0">
+                <a:solidFill>
+                  <a:srgbClr val="C00000"/>
+                </a:solidFill>
+              </a:rPr>
+              <a:t> 26.37 min</a:t>
+            </a:r>
+          </a:p>
+          <a:p>
+            <a:pPr algn="ctr"/>
+            <a:r>
+              <a:rPr lang="en-US" sz="1600" dirty="0">
+                <a:solidFill>
+                  <a:srgbClr val="C00000"/>
+                </a:solidFill>
+              </a:rPr>
+              <a:t>3,000 frames</a:t>
+            </a:r>
+          </a:p>
+        </p:txBody>
+      </p:sp>
+      <p:cxnSp>
+        <p:nvCxnSpPr>
+          <p:cNvPr id="19" name="Straight Arrow Connector 18">
+            <a:extLst>
+              <a:ext uri="{FF2B5EF4-FFF2-40B4-BE49-F238E27FC236}">
+                <a16:creationId xmlns:a16="http://schemas.microsoft.com/office/drawing/2014/main" id="{DF4409C7-A819-2F35-5761-CA8D5E66E49C}"/>
+              </a:ext>
+            </a:extLst>
+          </p:cNvPr>
+          <p:cNvCxnSpPr>
+            <a:cxnSpLocks/>
+          </p:cNvCxnSpPr>
+          <p:nvPr/>
+        </p:nvCxnSpPr>
+        <p:spPr>
+          <a:xfrm>
+            <a:off x="10541948" y="2498483"/>
+            <a:ext cx="150001" cy="116212"/>
+          </a:xfrm>
+          <a:prstGeom prst="straightConnector1">
+            <a:avLst/>
+          </a:prstGeom>
+          <a:ln>
+            <a:solidFill>
+              <a:srgbClr val="C00000"/>
+            </a:solidFill>
+            <a:tailEnd type="triangle"/>
+          </a:ln>
+        </p:spPr>
+        <p:style>
+          <a:lnRef idx="1">
+            <a:schemeClr val="accent6"/>
+          </a:lnRef>
+          <a:fillRef idx="0">
+            <a:schemeClr val="accent6"/>
+          </a:fillRef>
+          <a:effectRef idx="0">
+            <a:schemeClr val="accent6"/>
+          </a:effectRef>
+          <a:fontRef idx="minor">
+            <a:schemeClr val="tx1"/>
+          </a:fontRef>
+        </p:style>
+      </p:cxnSp>
+      <p:sp>
+        <p:nvSpPr>
+          <p:cNvPr id="5" name="TextBox 4">
+            <a:extLst>
+              <a:ext uri="{FF2B5EF4-FFF2-40B4-BE49-F238E27FC236}">
+                <a16:creationId xmlns:a16="http://schemas.microsoft.com/office/drawing/2014/main" id="{DD4496F1-10A6-3267-1698-BE862A2A01BE}"/>
+              </a:ext>
+            </a:extLst>
+          </p:cNvPr>
+          <p:cNvSpPr txBox="1"/>
+          <p:nvPr/>
+        </p:nvSpPr>
+        <p:spPr>
+          <a:xfrm>
+            <a:off x="4944292" y="6172200"/>
+            <a:ext cx="2253345" cy="369332"/>
+          </a:xfrm>
+          <a:prstGeom prst="rect">
+            <a:avLst/>
+          </a:prstGeom>
+          <a:noFill/>
+        </p:spPr>
+        <p:txBody>
+          <a:bodyPr wrap="square">
+            <a:spAutoFit/>
+          </a:bodyPr>
+          <a:lstStyle/>
+          <a:p>
+            <a:r>
+              <a:rPr lang="en-US" dirty="0"/>
+              <a:t>100 hexane per frame</a:t>
+            </a:r>
+          </a:p>
+        </p:txBody>
+      </p:sp>
+      <p:sp>
+        <p:nvSpPr>
+          <p:cNvPr id="4" name="Rectangle 3">
+            <a:extLst>
+              <a:ext uri="{FF2B5EF4-FFF2-40B4-BE49-F238E27FC236}">
+                <a16:creationId xmlns:a16="http://schemas.microsoft.com/office/drawing/2014/main" id="{26F19A5C-C8F9-23E2-E39A-C8378C11FB00}"/>
+              </a:ext>
+            </a:extLst>
+          </p:cNvPr>
+          <p:cNvSpPr/>
+          <p:nvPr/>
+        </p:nvSpPr>
+        <p:spPr>
+          <a:xfrm>
+            <a:off x="7030146" y="227052"/>
+            <a:ext cx="4837606" cy="646331"/>
+          </a:xfrm>
+          <a:prstGeom prst="rect">
+            <a:avLst/>
+          </a:prstGeom>
+        </p:spPr>
+        <p:txBody>
+          <a:bodyPr wrap="none">
+            <a:spAutoFit/>
+          </a:bodyPr>
+          <a:lstStyle/>
+          <a:p>
+            <a:pPr algn="ctr"/>
+            <a:r>
+              <a:rPr lang="en-US" dirty="0"/>
+              <a:t>macOS Sequoia 15.6.1, Apple M4, 16GB LPDDR5</a:t>
+            </a:r>
+          </a:p>
+          <a:p>
+            <a:pPr algn="ctr"/>
+            <a:r>
+              <a:rPr lang="en-US" dirty="0"/>
+              <a:t>Ubuntu 22.04.5 LTS, i5-11400F, RTX 3060 Ti, 16GB</a:t>
+            </a:r>
+          </a:p>
+        </p:txBody>
+      </p:sp>
+    </p:spTree>
+    <p:extLst>
+      <p:ext uri="{BB962C8B-B14F-4D97-AF65-F5344CB8AC3E}">
+        <p14:creationId xmlns:p14="http://schemas.microsoft.com/office/powerpoint/2010/main" val="4294287161"/>
+      </p:ext>
+    </p:extLst>
+  </p:cSld>
+  <p:clrMapOvr>
+    <a:masterClrMapping/>
+  </p:clrMapOvr>
+</p:sld>
+</file>
+
+<file path=ppt/slides/slide19.xml><?xml version="1.0" encoding="utf-8"?>
+<p:sld xmlns:a="http://schemas.openxmlformats.org/drawingml/2006/main" xmlns:r="http://schemas.openxmlformats.org/officeDocument/2006/relationships" xmlns:p="http://schemas.openxmlformats.org/presentationml/2006/main">
+  <p:cSld>
+    <p:spTree>
+      <p:nvGrpSpPr>
+        <p:cNvPr id="1" name="">
+          <a:extLst>
+            <a:ext uri="{FF2B5EF4-FFF2-40B4-BE49-F238E27FC236}">
+              <a16:creationId xmlns:a16="http://schemas.microsoft.com/office/drawing/2014/main" id="{C0D80F29-4C1E-E8CC-D177-8DD57332F881}"/>
+            </a:ext>
+          </a:extLst>
+        </p:cNvPr>
+        <p:cNvGrpSpPr/>
+        <p:nvPr/>
+      </p:nvGrpSpPr>
+      <p:grpSpPr>
+        <a:xfrm>
+          <a:off x="0" y="0"/>
+          <a:ext cx="0" cy="0"/>
+          <a:chOff x="0" y="0"/>
+          <a:chExt cx="0" cy="0"/>
+        </a:xfrm>
+      </p:grpSpPr>
+      <p:sp>
+        <p:nvSpPr>
+          <p:cNvPr id="2" name="Title 1">
+            <a:extLst>
+              <a:ext uri="{FF2B5EF4-FFF2-40B4-BE49-F238E27FC236}">
+                <a16:creationId xmlns:a16="http://schemas.microsoft.com/office/drawing/2014/main" id="{96E6313B-5FAB-EAC8-2FC7-CBA5ADDAA24A}"/>
+              </a:ext>
+            </a:extLst>
+          </p:cNvPr>
+          <p:cNvSpPr>
+            <a:spLocks noGrp="1"/>
+          </p:cNvSpPr>
+          <p:nvPr>
+            <p:ph type="title"/>
+          </p:nvPr>
+        </p:nvSpPr>
+        <p:spPr>
+          <a:xfrm>
+            <a:off x="838200" y="365125"/>
+            <a:ext cx="4415852" cy="1325563"/>
+          </a:xfrm>
+        </p:spPr>
+        <p:txBody>
+          <a:bodyPr/>
+          <a:lstStyle/>
+          <a:p>
+            <a:r>
+              <a:rPr lang="en-US" dirty="0"/>
+              <a:t>Performance Test</a:t>
+            </a:r>
+          </a:p>
+        </p:txBody>
+      </p:sp>
+      <p:sp>
+        <p:nvSpPr>
+          <p:cNvPr id="6" name="Rectangle 5">
+            <a:extLst>
+              <a:ext uri="{FF2B5EF4-FFF2-40B4-BE49-F238E27FC236}">
+                <a16:creationId xmlns:a16="http://schemas.microsoft.com/office/drawing/2014/main" id="{A8E008B3-D38B-4511-E150-141D27F12B6C}"/>
+              </a:ext>
+            </a:extLst>
+          </p:cNvPr>
+          <p:cNvSpPr/>
+          <p:nvPr/>
+        </p:nvSpPr>
+        <p:spPr>
+          <a:xfrm>
+            <a:off x="966650" y="1605949"/>
+            <a:ext cx="4114800" cy="369332"/>
+          </a:xfrm>
+          <a:prstGeom prst="rect">
+            <a:avLst/>
+          </a:prstGeom>
+        </p:spPr>
+        <p:txBody>
+          <a:bodyPr wrap="square">
+            <a:spAutoFit/>
+          </a:bodyPr>
+          <a:lstStyle/>
+          <a:p>
+            <a:r>
+              <a:rPr lang="en-US" dirty="0"/>
+              <a:t>09: Trajectory Radial Distribution Function</a:t>
+            </a:r>
+          </a:p>
+        </p:txBody>
+      </p:sp>
+      <p:sp>
+        <p:nvSpPr>
+          <p:cNvPr id="3" name="Slide Number Placeholder 2">
+            <a:extLst>
+              <a:ext uri="{FF2B5EF4-FFF2-40B4-BE49-F238E27FC236}">
+                <a16:creationId xmlns:a16="http://schemas.microsoft.com/office/drawing/2014/main" id="{AC29D3AF-0176-86E0-42DF-BAD81E51067F}"/>
+              </a:ext>
+            </a:extLst>
+          </p:cNvPr>
+          <p:cNvSpPr>
+            <a:spLocks noGrp="1"/>
+          </p:cNvSpPr>
+          <p:nvPr>
+            <p:ph type="sldNum" sz="quarter" idx="12"/>
+          </p:nvPr>
+        </p:nvSpPr>
+        <p:spPr/>
+        <p:txBody>
+          <a:bodyPr/>
+          <a:lstStyle/>
+          <a:p>
+            <a:fld id="{CF79FC58-3559-EC47-B32E-5EF128B06581}" type="slidenum">
+              <a:rPr lang="en-US" smtClean="0"/>
+              <a:t>19</a:t>
+            </a:fld>
+            <a:endParaRPr lang="en-US" dirty="0"/>
+          </a:p>
+        </p:txBody>
+      </p:sp>
+      <p:sp>
+        <p:nvSpPr>
+          <p:cNvPr id="29" name="Rectangle 28">
+            <a:extLst>
+              <a:ext uri="{FF2B5EF4-FFF2-40B4-BE49-F238E27FC236}">
+                <a16:creationId xmlns:a16="http://schemas.microsoft.com/office/drawing/2014/main" id="{4B9176A4-2C3A-D45D-A91A-69A0EFE5F095}"/>
+              </a:ext>
+            </a:extLst>
+          </p:cNvPr>
+          <p:cNvSpPr/>
+          <p:nvPr/>
+        </p:nvSpPr>
+        <p:spPr>
+          <a:xfrm>
+            <a:off x="7478354" y="1605949"/>
+            <a:ext cx="2664956" cy="369332"/>
+          </a:xfrm>
+          <a:prstGeom prst="rect">
+            <a:avLst/>
+          </a:prstGeom>
+        </p:spPr>
+        <p:txBody>
+          <a:bodyPr wrap="square">
+            <a:spAutoFit/>
+          </a:bodyPr>
+          <a:lstStyle/>
+          <a:p>
+            <a:r>
+              <a:rPr lang="en-US" dirty="0"/>
+              <a:t>10: Trajectory clash count</a:t>
+            </a:r>
+          </a:p>
+        </p:txBody>
+      </p:sp>
+      <p:cxnSp>
+        <p:nvCxnSpPr>
+          <p:cNvPr id="12" name="Straight Arrow Connector 11">
+            <a:extLst>
+              <a:ext uri="{FF2B5EF4-FFF2-40B4-BE49-F238E27FC236}">
+                <a16:creationId xmlns:a16="http://schemas.microsoft.com/office/drawing/2014/main" id="{E80A32F8-D2E1-B77B-8404-45E999B0E553}"/>
+              </a:ext>
+            </a:extLst>
+          </p:cNvPr>
+          <p:cNvCxnSpPr>
+            <a:cxnSpLocks/>
+          </p:cNvCxnSpPr>
+          <p:nvPr/>
+        </p:nvCxnSpPr>
+        <p:spPr>
+          <a:xfrm>
+            <a:off x="4766188" y="3901858"/>
+            <a:ext cx="145446" cy="69251"/>
+          </a:xfrm>
+          <a:prstGeom prst="straightConnector1">
+            <a:avLst/>
+          </a:prstGeom>
+          <a:ln>
+            <a:solidFill>
+              <a:srgbClr val="C00000"/>
+            </a:solidFill>
+            <a:tailEnd type="triangle"/>
+          </a:ln>
+        </p:spPr>
+        <p:style>
+          <a:lnRef idx="1">
+            <a:schemeClr val="accent6"/>
+          </a:lnRef>
+          <a:fillRef idx="0">
+            <a:schemeClr val="accent6"/>
+          </a:fillRef>
+          <a:effectRef idx="0">
+            <a:schemeClr val="accent6"/>
+          </a:effectRef>
+          <a:fontRef idx="minor">
+            <a:schemeClr val="tx1"/>
+          </a:fontRef>
+        </p:style>
+      </p:cxnSp>
+      <p:pic>
+        <p:nvPicPr>
+          <p:cNvPr id="5" name="Graphic 4">
+            <a:extLst>
+              <a:ext uri="{FF2B5EF4-FFF2-40B4-BE49-F238E27FC236}">
+                <a16:creationId xmlns:a16="http://schemas.microsoft.com/office/drawing/2014/main" id="{33EAECA1-07DD-6CE6-DCAE-A9116E75A68C}"/>
+              </a:ext>
+            </a:extLst>
+          </p:cNvPr>
+          <p:cNvPicPr>
+            <a:picLocks noChangeAspect="1"/>
+          </p:cNvPicPr>
+          <p:nvPr/>
+        </p:nvPicPr>
+        <p:blipFill>
+          <a:blip r:embed="rId2">
+            <a:extLst>
+              <a:ext uri="{96DAC541-7B7A-43D3-8B79-37D633B846F1}">
+                <asvg:svgBlip xmlns:asvg="http://schemas.microsoft.com/office/drawing/2016/SVG/main" r:embed="rId3"/>
+              </a:ext>
+            </a:extLst>
+          </a:blip>
+          <a:stretch>
+            <a:fillRect/>
+          </a:stretch>
+        </p:blipFill>
+        <p:spPr>
+          <a:xfrm>
+            <a:off x="457200" y="2057400"/>
+            <a:ext cx="5486400" cy="4114800"/>
+          </a:xfrm>
+          <a:prstGeom prst="rect">
+            <a:avLst/>
+          </a:prstGeom>
+        </p:spPr>
+      </p:pic>
+      <p:sp>
+        <p:nvSpPr>
+          <p:cNvPr id="10" name="TextBox 9">
+            <a:extLst>
+              <a:ext uri="{FF2B5EF4-FFF2-40B4-BE49-F238E27FC236}">
+                <a16:creationId xmlns:a16="http://schemas.microsoft.com/office/drawing/2014/main" id="{69B82A0A-F48B-56E4-32F8-1CAB0775DF51}"/>
+              </a:ext>
+            </a:extLst>
+          </p:cNvPr>
+          <p:cNvSpPr txBox="1"/>
+          <p:nvPr/>
+        </p:nvSpPr>
+        <p:spPr>
+          <a:xfrm>
+            <a:off x="4922943" y="6172200"/>
+            <a:ext cx="2253344" cy="369332"/>
+          </a:xfrm>
+          <a:prstGeom prst="rect">
+            <a:avLst/>
+          </a:prstGeom>
+          <a:noFill/>
+        </p:spPr>
+        <p:txBody>
+          <a:bodyPr wrap="square">
+            <a:spAutoFit/>
+          </a:bodyPr>
+          <a:lstStyle/>
+          <a:p>
+            <a:r>
+              <a:rPr lang="en-US" dirty="0"/>
+              <a:t>100 hexane per frame</a:t>
+            </a:r>
+          </a:p>
+        </p:txBody>
+      </p:sp>
+      <p:sp>
+        <p:nvSpPr>
+          <p:cNvPr id="20" name="TextBox 19">
+            <a:extLst>
+              <a:ext uri="{FF2B5EF4-FFF2-40B4-BE49-F238E27FC236}">
+                <a16:creationId xmlns:a16="http://schemas.microsoft.com/office/drawing/2014/main" id="{740925CF-5C4B-8C58-24DC-2A93439C4572}"/>
+              </a:ext>
+            </a:extLst>
+          </p:cNvPr>
+          <p:cNvSpPr txBox="1"/>
+          <p:nvPr/>
+        </p:nvSpPr>
+        <p:spPr>
+          <a:xfrm>
+            <a:off x="3431176" y="4194492"/>
+            <a:ext cx="1822876" cy="584775"/>
+          </a:xfrm>
+          <a:prstGeom prst="rect">
+            <a:avLst/>
+          </a:prstGeom>
+          <a:noFill/>
+        </p:spPr>
+        <p:txBody>
+          <a:bodyPr wrap="square">
+            <a:spAutoFit/>
+          </a:bodyPr>
+          <a:lstStyle/>
+          <a:p>
+            <a:pPr algn="ctr"/>
+            <a:r>
+              <a:rPr lang="en-US" sz="1600" dirty="0">
+                <a:solidFill>
+                  <a:srgbClr val="C00000"/>
+                </a:solidFill>
+              </a:rPr>
+              <a:t> 6.23 min / 191 MB</a:t>
+            </a:r>
+          </a:p>
+          <a:p>
+            <a:pPr algn="ctr"/>
+            <a:r>
+              <a:rPr lang="en-US" sz="1600" dirty="0">
+                <a:solidFill>
+                  <a:srgbClr val="C00000"/>
+                </a:solidFill>
+              </a:rPr>
+              <a:t>25,000 frames</a:t>
+            </a:r>
+          </a:p>
+        </p:txBody>
+      </p:sp>
+      <p:cxnSp>
+        <p:nvCxnSpPr>
+          <p:cNvPr id="21" name="Straight Arrow Connector 20">
+            <a:extLst>
+              <a:ext uri="{FF2B5EF4-FFF2-40B4-BE49-F238E27FC236}">
+                <a16:creationId xmlns:a16="http://schemas.microsoft.com/office/drawing/2014/main" id="{64073423-D095-5F09-04D6-A1EE007B7B1D}"/>
+              </a:ext>
+            </a:extLst>
+          </p:cNvPr>
+          <p:cNvCxnSpPr>
+            <a:cxnSpLocks/>
+          </p:cNvCxnSpPr>
+          <p:nvPr/>
+        </p:nvCxnSpPr>
+        <p:spPr>
+          <a:xfrm flipV="1">
+            <a:off x="4772942" y="3725530"/>
+            <a:ext cx="138692" cy="263907"/>
+          </a:xfrm>
+          <a:prstGeom prst="straightConnector1">
+            <a:avLst/>
+          </a:prstGeom>
+          <a:ln>
+            <a:solidFill>
+              <a:srgbClr val="C00000"/>
+            </a:solidFill>
+            <a:tailEnd type="triangle"/>
+          </a:ln>
+        </p:spPr>
+        <p:style>
+          <a:lnRef idx="1">
+            <a:schemeClr val="accent6"/>
+          </a:lnRef>
+          <a:fillRef idx="0">
+            <a:schemeClr val="accent6"/>
+          </a:fillRef>
+          <a:effectRef idx="0">
+            <a:schemeClr val="accent6"/>
+          </a:effectRef>
+          <a:fontRef idx="minor">
+            <a:schemeClr val="tx1"/>
+          </a:fontRef>
+        </p:style>
+      </p:cxnSp>
+      <p:pic>
+        <p:nvPicPr>
+          <p:cNvPr id="24" name="Graphic 23">
+            <a:extLst>
+              <a:ext uri="{FF2B5EF4-FFF2-40B4-BE49-F238E27FC236}">
+                <a16:creationId xmlns:a16="http://schemas.microsoft.com/office/drawing/2014/main" id="{A3A89CCB-1BC3-06FC-7C11-193734E92027}"/>
               </a:ext>
             </a:extLst>
           </p:cNvPr>
@@ -23697,10 +24420,10 @@
       </p:pic>
       <p:sp>
         <p:nvSpPr>
-          <p:cNvPr id="21" name="TextBox 20">
+          <p:cNvPr id="25" name="TextBox 24">
             <a:extLst>
               <a:ext uri="{FF2B5EF4-FFF2-40B4-BE49-F238E27FC236}">
-                <a16:creationId xmlns:a16="http://schemas.microsoft.com/office/drawing/2014/main" id="{CC26F520-3BE8-95B5-699B-734F4F08106E}"/>
+                <a16:creationId xmlns:a16="http://schemas.microsoft.com/office/drawing/2014/main" id="{014671A1-7579-9E67-1F76-65AB617A4D12}"/>
               </a:ext>
             </a:extLst>
           </p:cNvPr>
@@ -23709,8 +24432,8 @@
         </p:nvSpPr>
         <p:spPr>
           <a:xfrm>
-            <a:off x="9668656" y="3065359"/>
-            <a:ext cx="1397506" cy="523220"/>
+            <a:off x="9148353" y="4288109"/>
+            <a:ext cx="1822876" cy="584775"/>
           </a:xfrm>
           <a:prstGeom prst="rect">
             <a:avLst/>
@@ -23725,135 +24448,33 @@
           <a:p>
             <a:pPr algn="ctr"/>
             <a:r>
-              <a:rPr lang="en-US" sz="1400" dirty="0">
+              <a:rPr lang="en-US" sz="1600" dirty="0">
                 <a:solidFill>
                   <a:srgbClr val="C00000"/>
                 </a:solidFill>
               </a:rPr>
-              <a:t>2 s / 200 MB</a:t>
+              <a:t> 7.05 min / 190 MB</a:t>
             </a:r>
           </a:p>
           <a:p>
             <a:pPr algn="ctr"/>
             <a:r>
-              <a:rPr lang="en-US" sz="1400" dirty="0">
+              <a:rPr lang="en-US" sz="1600" dirty="0">
                 <a:solidFill>
                   <a:srgbClr val="C00000"/>
                 </a:solidFill>
               </a:rPr>
               <a:t>25,000 frames</a:t>
-            </a:r>
-          </a:p>
-        </p:txBody>
-      </p:sp>
-      <p:cxnSp>
-        <p:nvCxnSpPr>
-          <p:cNvPr id="22" name="Straight Arrow Connector 21">
-            <a:extLst>
-              <a:ext uri="{FF2B5EF4-FFF2-40B4-BE49-F238E27FC236}">
-                <a16:creationId xmlns:a16="http://schemas.microsoft.com/office/drawing/2014/main" id="{EB54E5E2-3C6E-9AB0-0A3C-C98A4AAF9298}"/>
-              </a:ext>
-            </a:extLst>
-          </p:cNvPr>
-          <p:cNvCxnSpPr>
-            <a:cxnSpLocks/>
-          </p:cNvCxnSpPr>
-          <p:nvPr/>
-        </p:nvCxnSpPr>
-        <p:spPr>
-          <a:xfrm flipV="1">
-            <a:off x="10546302" y="2707579"/>
-            <a:ext cx="96714" cy="211147"/>
-          </a:xfrm>
-          <a:prstGeom prst="straightConnector1">
-            <a:avLst/>
-          </a:prstGeom>
-          <a:ln>
-            <a:solidFill>
-              <a:srgbClr val="C00000"/>
-            </a:solidFill>
-            <a:tailEnd type="triangle"/>
-          </a:ln>
-        </p:spPr>
-        <p:style>
-          <a:lnRef idx="1">
-            <a:schemeClr val="accent6"/>
-          </a:lnRef>
-          <a:fillRef idx="0">
-            <a:schemeClr val="accent6"/>
-          </a:fillRef>
-          <a:effectRef idx="0">
-            <a:schemeClr val="accent6"/>
-          </a:effectRef>
-          <a:fontRef idx="minor">
-            <a:schemeClr val="tx1"/>
-          </a:fontRef>
-        </p:style>
-      </p:cxnSp>
-    </p:spTree>
-    <p:extLst>
-      <p:ext uri="{BB962C8B-B14F-4D97-AF65-F5344CB8AC3E}">
-        <p14:creationId xmlns:p14="http://schemas.microsoft.com/office/powerpoint/2010/main" val="4294287161"/>
-      </p:ext>
-    </p:extLst>
-  </p:cSld>
-  <p:clrMapOvr>
-    <a:masterClrMapping/>
-  </p:clrMapOvr>
-</p:sld>
-</file>
-
-<file path=ppt/slides/slide19.xml><?xml version="1.0" encoding="utf-8"?>
-<p:sld xmlns:a="http://schemas.openxmlformats.org/drawingml/2006/main" xmlns:r="http://schemas.openxmlformats.org/officeDocument/2006/relationships" xmlns:p="http://schemas.openxmlformats.org/presentationml/2006/main">
-  <p:cSld>
-    <p:spTree>
-      <p:nvGrpSpPr>
-        <p:cNvPr id="1" name=""/>
-        <p:cNvGrpSpPr/>
-        <p:nvPr/>
-      </p:nvGrpSpPr>
-      <p:grpSpPr>
-        <a:xfrm>
-          <a:off x="0" y="0"/>
-          <a:ext cx="0" cy="0"/>
-          <a:chOff x="0" y="0"/>
-          <a:chExt cx="0" cy="0"/>
-        </a:xfrm>
-      </p:grpSpPr>
-      <p:sp>
-        <p:nvSpPr>
-          <p:cNvPr id="2" name="Title 1">
-            <a:extLst>
-              <a:ext uri="{FF2B5EF4-FFF2-40B4-BE49-F238E27FC236}">
-                <a16:creationId xmlns:a16="http://schemas.microsoft.com/office/drawing/2014/main" id="{CC174E11-7BE3-0048-94D8-35CDD799A536}"/>
-              </a:ext>
-            </a:extLst>
-          </p:cNvPr>
-          <p:cNvSpPr>
-            <a:spLocks noGrp="1"/>
-          </p:cNvSpPr>
-          <p:nvPr>
-            <p:ph type="title"/>
-          </p:nvPr>
-        </p:nvSpPr>
-        <p:spPr/>
-        <p:txBody>
-          <a:bodyPr/>
-          <a:lstStyle/>
-          <a:p>
-            <a:r>
-              <a:rPr lang="en-US" dirty="0"/>
-              <a:t>Scientific Test</a:t>
             </a:r>
           </a:p>
         </p:txBody>
       </p:sp>
       <p:sp>
         <p:nvSpPr>
-          <p:cNvPr id="6" name="Rectangle 5">
+          <p:cNvPr id="4" name="Rectangle 3">
             <a:extLst>
               <a:ext uri="{FF2B5EF4-FFF2-40B4-BE49-F238E27FC236}">
-                <a16:creationId xmlns:a16="http://schemas.microsoft.com/office/drawing/2014/main" id="{4FE4A50E-A4D4-994E-BB48-CC433E82E80C}"/>
+                <a16:creationId xmlns:a16="http://schemas.microsoft.com/office/drawing/2014/main" id="{4B27C9C6-4B3E-8966-B0DA-F41E68990E84}"/>
               </a:ext>
             </a:extLst>
           </p:cNvPr>
@@ -23862,67 +24483,38 @@
         </p:nvSpPr>
         <p:spPr>
           <a:xfrm>
-            <a:off x="922867" y="1506022"/>
-            <a:ext cx="9643533" cy="369332"/>
+            <a:off x="7030146" y="227052"/>
+            <a:ext cx="4837606" cy="646331"/>
           </a:xfrm>
           <a:prstGeom prst="rect">
             <a:avLst/>
           </a:prstGeom>
         </p:spPr>
         <p:txBody>
-          <a:bodyPr wrap="square">
+          <a:bodyPr wrap="none">
             <a:spAutoFit/>
           </a:bodyPr>
           <a:lstStyle/>
           <a:p>
+            <a:pPr algn="ctr"/>
             <a:r>
               <a:rPr lang="en-US" dirty="0"/>
-              <a:t>0001: </a:t>
-            </a:r>
-            <a:r>
-              <a:rPr lang="en-US" dirty="0" err="1"/>
-              <a:t>buld</a:t>
-            </a:r>
+              <a:t>macOS Sequoia 15.6.1, Apple M4, 16GB LPDDR5</a:t>
+            </a:r>
+          </a:p>
+          <a:p>
+            <a:pPr algn="ctr"/>
             <a:r>
               <a:rPr lang="en-US" dirty="0"/>
-              <a:t> amorphous structure with via grid method 100 million  Argon molecules via grid method</a:t>
-            </a:r>
-          </a:p>
-        </p:txBody>
-      </p:sp>
-      <p:sp>
-        <p:nvSpPr>
-          <p:cNvPr id="3" name="Slide Number Placeholder 2">
-            <a:extLst>
-              <a:ext uri="{FF2B5EF4-FFF2-40B4-BE49-F238E27FC236}">
-                <a16:creationId xmlns:a16="http://schemas.microsoft.com/office/drawing/2014/main" id="{69888FE3-FC9F-C19C-4839-C34F1FAD5590}"/>
-              </a:ext>
-            </a:extLst>
-          </p:cNvPr>
-          <p:cNvSpPr>
-            <a:spLocks noGrp="1"/>
-          </p:cNvSpPr>
-          <p:nvPr>
-            <p:ph type="sldNum" sz="quarter" idx="12"/>
-          </p:nvPr>
-        </p:nvSpPr>
-        <p:spPr/>
-        <p:txBody>
-          <a:bodyPr/>
-          <a:lstStyle/>
-          <a:p>
-            <a:fld id="{CF79FC58-3559-EC47-B32E-5EF128B06581}" type="slidenum">
-              <a:rPr lang="en-US" smtClean="0"/>
-              <a:t>19</a:t>
-            </a:fld>
-            <a:endParaRPr lang="en-US"/>
+              <a:t>Ubuntu 22.04.5 LTS, i5-11400F, RTX 3060 Ti, 16GB</a:t>
+            </a:r>
           </a:p>
         </p:txBody>
       </p:sp>
     </p:spTree>
     <p:extLst>
       <p:ext uri="{BB962C8B-B14F-4D97-AF65-F5344CB8AC3E}">
-        <p14:creationId xmlns:p14="http://schemas.microsoft.com/office/powerpoint/2010/main" val="3383553538"/>
+        <p14:creationId xmlns:p14="http://schemas.microsoft.com/office/powerpoint/2010/main" val="2106752069"/>
       </p:ext>
     </p:extLst>
   </p:cSld>
@@ -24250,6 +24842,475 @@
   <p:cSld>
     <p:spTree>
       <p:nvGrpSpPr>
+        <p:cNvPr id="1" name="">
+          <a:extLst>
+            <a:ext uri="{FF2B5EF4-FFF2-40B4-BE49-F238E27FC236}">
+              <a16:creationId xmlns:a16="http://schemas.microsoft.com/office/drawing/2014/main" id="{384B54B7-3989-D0DC-ACE7-087B02E23030}"/>
+            </a:ext>
+          </a:extLst>
+        </p:cNvPr>
+        <p:cNvGrpSpPr/>
+        <p:nvPr/>
+      </p:nvGrpSpPr>
+      <p:grpSpPr>
+        <a:xfrm>
+          <a:off x="0" y="0"/>
+          <a:ext cx="0" cy="0"/>
+          <a:chOff x="0" y="0"/>
+          <a:chExt cx="0" cy="0"/>
+        </a:xfrm>
+      </p:grpSpPr>
+      <p:sp>
+        <p:nvSpPr>
+          <p:cNvPr id="2" name="Title 1">
+            <a:extLst>
+              <a:ext uri="{FF2B5EF4-FFF2-40B4-BE49-F238E27FC236}">
+                <a16:creationId xmlns:a16="http://schemas.microsoft.com/office/drawing/2014/main" id="{8AC2A20A-2934-4874-EAF0-EEB3C8085A17}"/>
+              </a:ext>
+            </a:extLst>
+          </p:cNvPr>
+          <p:cNvSpPr>
+            <a:spLocks noGrp="1"/>
+          </p:cNvSpPr>
+          <p:nvPr>
+            <p:ph type="title"/>
+          </p:nvPr>
+        </p:nvSpPr>
+        <p:spPr>
+          <a:xfrm>
+            <a:off x="838200" y="365125"/>
+            <a:ext cx="4415852" cy="1325563"/>
+          </a:xfrm>
+        </p:spPr>
+        <p:txBody>
+          <a:bodyPr/>
+          <a:lstStyle/>
+          <a:p>
+            <a:r>
+              <a:rPr lang="en-US" dirty="0"/>
+              <a:t>Performance Test</a:t>
+            </a:r>
+          </a:p>
+        </p:txBody>
+      </p:sp>
+      <p:sp>
+        <p:nvSpPr>
+          <p:cNvPr id="6" name="Rectangle 5">
+            <a:extLst>
+              <a:ext uri="{FF2B5EF4-FFF2-40B4-BE49-F238E27FC236}">
+                <a16:creationId xmlns:a16="http://schemas.microsoft.com/office/drawing/2014/main" id="{555A2E31-EBF7-C337-18EF-000D2CC41FAB}"/>
+              </a:ext>
+            </a:extLst>
+          </p:cNvPr>
+          <p:cNvSpPr/>
+          <p:nvPr/>
+        </p:nvSpPr>
+        <p:spPr>
+          <a:xfrm>
+            <a:off x="966649" y="1605949"/>
+            <a:ext cx="4238899" cy="369332"/>
+          </a:xfrm>
+          <a:prstGeom prst="rect">
+            <a:avLst/>
+          </a:prstGeom>
+        </p:spPr>
+        <p:txBody>
+          <a:bodyPr wrap="square">
+            <a:spAutoFit/>
+          </a:bodyPr>
+          <a:lstStyle/>
+          <a:p>
+            <a:r>
+              <a:rPr lang="en-US" dirty="0"/>
+              <a:t>11: Trajectory Mean Squared Displacement</a:t>
+            </a:r>
+          </a:p>
+        </p:txBody>
+      </p:sp>
+      <p:sp>
+        <p:nvSpPr>
+          <p:cNvPr id="3" name="Slide Number Placeholder 2">
+            <a:extLst>
+              <a:ext uri="{FF2B5EF4-FFF2-40B4-BE49-F238E27FC236}">
+                <a16:creationId xmlns:a16="http://schemas.microsoft.com/office/drawing/2014/main" id="{7771319D-8E59-A016-A0F7-B28585297402}"/>
+              </a:ext>
+            </a:extLst>
+          </p:cNvPr>
+          <p:cNvSpPr>
+            <a:spLocks noGrp="1"/>
+          </p:cNvSpPr>
+          <p:nvPr>
+            <p:ph type="sldNum" sz="quarter" idx="12"/>
+          </p:nvPr>
+        </p:nvSpPr>
+        <p:spPr/>
+        <p:txBody>
+          <a:bodyPr/>
+          <a:lstStyle/>
+          <a:p>
+            <a:fld id="{CF79FC58-3559-EC47-B32E-5EF128B06581}" type="slidenum">
+              <a:rPr lang="en-US" smtClean="0"/>
+              <a:t>20</a:t>
+            </a:fld>
+            <a:endParaRPr lang="en-US" dirty="0"/>
+          </a:p>
+        </p:txBody>
+      </p:sp>
+      <p:sp>
+        <p:nvSpPr>
+          <p:cNvPr id="10" name="TextBox 9">
+            <a:extLst>
+              <a:ext uri="{FF2B5EF4-FFF2-40B4-BE49-F238E27FC236}">
+                <a16:creationId xmlns:a16="http://schemas.microsoft.com/office/drawing/2014/main" id="{0CC7B683-D4B8-BBC2-45F4-370D69F9A9C4}"/>
+              </a:ext>
+            </a:extLst>
+          </p:cNvPr>
+          <p:cNvSpPr txBox="1"/>
+          <p:nvPr/>
+        </p:nvSpPr>
+        <p:spPr>
+          <a:xfrm>
+            <a:off x="1970758" y="6172200"/>
+            <a:ext cx="2253344" cy="369332"/>
+          </a:xfrm>
+          <a:prstGeom prst="rect">
+            <a:avLst/>
+          </a:prstGeom>
+          <a:noFill/>
+        </p:spPr>
+        <p:txBody>
+          <a:bodyPr wrap="square">
+            <a:spAutoFit/>
+          </a:bodyPr>
+          <a:lstStyle/>
+          <a:p>
+            <a:r>
+              <a:rPr lang="en-US" dirty="0"/>
+              <a:t>100 hexane per frame</a:t>
+            </a:r>
+          </a:p>
+        </p:txBody>
+      </p:sp>
+      <p:pic>
+        <p:nvPicPr>
+          <p:cNvPr id="7" name="Graphic 6">
+            <a:extLst>
+              <a:ext uri="{FF2B5EF4-FFF2-40B4-BE49-F238E27FC236}">
+                <a16:creationId xmlns:a16="http://schemas.microsoft.com/office/drawing/2014/main" id="{59DD51C2-6B9E-8424-970F-6B8209D2301C}"/>
+              </a:ext>
+            </a:extLst>
+          </p:cNvPr>
+          <p:cNvPicPr>
+            <a:picLocks noChangeAspect="1"/>
+          </p:cNvPicPr>
+          <p:nvPr/>
+        </p:nvPicPr>
+        <p:blipFill>
+          <a:blip r:embed="rId2">
+            <a:extLst>
+              <a:ext uri="{96DAC541-7B7A-43D3-8B79-37D633B846F1}">
+                <asvg:svgBlip xmlns:asvg="http://schemas.microsoft.com/office/drawing/2016/SVG/main" r:embed="rId3"/>
+              </a:ext>
+            </a:extLst>
+          </a:blip>
+          <a:stretch>
+            <a:fillRect/>
+          </a:stretch>
+        </p:blipFill>
+        <p:spPr>
+          <a:xfrm>
+            <a:off x="457200" y="2057400"/>
+            <a:ext cx="5486400" cy="4114800"/>
+          </a:xfrm>
+          <a:prstGeom prst="rect">
+            <a:avLst/>
+          </a:prstGeom>
+        </p:spPr>
+      </p:pic>
+      <p:cxnSp>
+        <p:nvCxnSpPr>
+          <p:cNvPr id="12" name="Straight Arrow Connector 11">
+            <a:extLst>
+              <a:ext uri="{FF2B5EF4-FFF2-40B4-BE49-F238E27FC236}">
+                <a16:creationId xmlns:a16="http://schemas.microsoft.com/office/drawing/2014/main" id="{E25F3AEE-3907-0594-3025-7E078A484E00}"/>
+              </a:ext>
+            </a:extLst>
+          </p:cNvPr>
+          <p:cNvCxnSpPr>
+            <a:cxnSpLocks/>
+          </p:cNvCxnSpPr>
+          <p:nvPr/>
+        </p:nvCxnSpPr>
+        <p:spPr>
+          <a:xfrm>
+            <a:off x="4944294" y="4204364"/>
+            <a:ext cx="77499" cy="77659"/>
+          </a:xfrm>
+          <a:prstGeom prst="straightConnector1">
+            <a:avLst/>
+          </a:prstGeom>
+          <a:ln>
+            <a:solidFill>
+              <a:srgbClr val="C00000"/>
+            </a:solidFill>
+            <a:tailEnd type="triangle"/>
+          </a:ln>
+        </p:spPr>
+        <p:style>
+          <a:lnRef idx="1">
+            <a:schemeClr val="accent6"/>
+          </a:lnRef>
+          <a:fillRef idx="0">
+            <a:schemeClr val="accent6"/>
+          </a:fillRef>
+          <a:effectRef idx="0">
+            <a:schemeClr val="accent6"/>
+          </a:effectRef>
+          <a:fontRef idx="minor">
+            <a:schemeClr val="tx1"/>
+          </a:fontRef>
+        </p:style>
+      </p:cxnSp>
+      <p:sp>
+        <p:nvSpPr>
+          <p:cNvPr id="20" name="TextBox 19">
+            <a:extLst>
+              <a:ext uri="{FF2B5EF4-FFF2-40B4-BE49-F238E27FC236}">
+                <a16:creationId xmlns:a16="http://schemas.microsoft.com/office/drawing/2014/main" id="{00397244-1178-38FA-688E-42594C86C3F7}"/>
+              </a:ext>
+            </a:extLst>
+          </p:cNvPr>
+          <p:cNvSpPr txBox="1"/>
+          <p:nvPr/>
+        </p:nvSpPr>
+        <p:spPr>
+          <a:xfrm>
+            <a:off x="3516079" y="3942754"/>
+            <a:ext cx="1822876" cy="523220"/>
+          </a:xfrm>
+          <a:prstGeom prst="rect">
+            <a:avLst/>
+          </a:prstGeom>
+          <a:noFill/>
+        </p:spPr>
+        <p:txBody>
+          <a:bodyPr wrap="square">
+            <a:spAutoFit/>
+          </a:bodyPr>
+          <a:lstStyle/>
+          <a:p>
+            <a:pPr algn="ctr"/>
+            <a:r>
+              <a:rPr lang="en-US" sz="1400" dirty="0">
+                <a:solidFill>
+                  <a:srgbClr val="C00000"/>
+                </a:solidFill>
+              </a:rPr>
+              <a:t> 2.68 min / 264 MB</a:t>
+            </a:r>
+          </a:p>
+          <a:p>
+            <a:pPr algn="ctr"/>
+            <a:r>
+              <a:rPr lang="en-US" sz="1400" dirty="0">
+                <a:solidFill>
+                  <a:srgbClr val="C00000"/>
+                </a:solidFill>
+              </a:rPr>
+              <a:t>25,000 frames</a:t>
+            </a:r>
+          </a:p>
+        </p:txBody>
+      </p:sp>
+      <p:sp>
+        <p:nvSpPr>
+          <p:cNvPr id="4" name="Rectangle 3">
+            <a:extLst>
+              <a:ext uri="{FF2B5EF4-FFF2-40B4-BE49-F238E27FC236}">
+                <a16:creationId xmlns:a16="http://schemas.microsoft.com/office/drawing/2014/main" id="{4C75201B-FB61-42C1-DD2E-481489450FA1}"/>
+              </a:ext>
+            </a:extLst>
+          </p:cNvPr>
+          <p:cNvSpPr/>
+          <p:nvPr/>
+        </p:nvSpPr>
+        <p:spPr>
+          <a:xfrm>
+            <a:off x="7030146" y="227052"/>
+            <a:ext cx="4837606" cy="646331"/>
+          </a:xfrm>
+          <a:prstGeom prst="rect">
+            <a:avLst/>
+          </a:prstGeom>
+        </p:spPr>
+        <p:txBody>
+          <a:bodyPr wrap="none">
+            <a:spAutoFit/>
+          </a:bodyPr>
+          <a:lstStyle/>
+          <a:p>
+            <a:pPr algn="ctr"/>
+            <a:r>
+              <a:rPr lang="en-US" dirty="0"/>
+              <a:t>macOS Sequoia 15.6.1, Apple M4, 16GB LPDDR5</a:t>
+            </a:r>
+          </a:p>
+          <a:p>
+            <a:pPr algn="ctr"/>
+            <a:r>
+              <a:rPr lang="en-US" dirty="0"/>
+              <a:t>Ubuntu 22.04.5 LTS, i5-11400F, RTX 3060 Ti, 16GB</a:t>
+            </a:r>
+          </a:p>
+        </p:txBody>
+      </p:sp>
+    </p:spTree>
+    <p:extLst>
+      <p:ext uri="{BB962C8B-B14F-4D97-AF65-F5344CB8AC3E}">
+        <p14:creationId xmlns:p14="http://schemas.microsoft.com/office/powerpoint/2010/main" val="907613181"/>
+      </p:ext>
+    </p:extLst>
+  </p:cSld>
+  <p:clrMapOvr>
+    <a:masterClrMapping/>
+  </p:clrMapOvr>
+</p:sld>
+</file>
+
+<file path=ppt/slides/slide21.xml><?xml version="1.0" encoding="utf-8"?>
+<p:sld xmlns:a="http://schemas.openxmlformats.org/drawingml/2006/main" xmlns:r="http://schemas.openxmlformats.org/officeDocument/2006/relationships" xmlns:p="http://schemas.openxmlformats.org/presentationml/2006/main">
+  <p:cSld>
+    <p:spTree>
+      <p:nvGrpSpPr>
+        <p:cNvPr id="1" name=""/>
+        <p:cNvGrpSpPr/>
+        <p:nvPr/>
+      </p:nvGrpSpPr>
+      <p:grpSpPr>
+        <a:xfrm>
+          <a:off x="0" y="0"/>
+          <a:ext cx="0" cy="0"/>
+          <a:chOff x="0" y="0"/>
+          <a:chExt cx="0" cy="0"/>
+        </a:xfrm>
+      </p:grpSpPr>
+      <p:sp>
+        <p:nvSpPr>
+          <p:cNvPr id="2" name="Title 1">
+            <a:extLst>
+              <a:ext uri="{FF2B5EF4-FFF2-40B4-BE49-F238E27FC236}">
+                <a16:creationId xmlns:a16="http://schemas.microsoft.com/office/drawing/2014/main" id="{CC174E11-7BE3-0048-94D8-35CDD799A536}"/>
+              </a:ext>
+            </a:extLst>
+          </p:cNvPr>
+          <p:cNvSpPr>
+            <a:spLocks noGrp="1"/>
+          </p:cNvSpPr>
+          <p:nvPr>
+            <p:ph type="title"/>
+          </p:nvPr>
+        </p:nvSpPr>
+        <p:spPr/>
+        <p:txBody>
+          <a:bodyPr/>
+          <a:lstStyle/>
+          <a:p>
+            <a:r>
+              <a:rPr lang="en-US" dirty="0"/>
+              <a:t>Scientific Test</a:t>
+            </a:r>
+          </a:p>
+        </p:txBody>
+      </p:sp>
+      <p:sp>
+        <p:nvSpPr>
+          <p:cNvPr id="6" name="Rectangle 5">
+            <a:extLst>
+              <a:ext uri="{FF2B5EF4-FFF2-40B4-BE49-F238E27FC236}">
+                <a16:creationId xmlns:a16="http://schemas.microsoft.com/office/drawing/2014/main" id="{4FE4A50E-A4D4-994E-BB48-CC433E82E80C}"/>
+              </a:ext>
+            </a:extLst>
+          </p:cNvPr>
+          <p:cNvSpPr/>
+          <p:nvPr/>
+        </p:nvSpPr>
+        <p:spPr>
+          <a:xfrm>
+            <a:off x="922867" y="1506022"/>
+            <a:ext cx="9643533" cy="369332"/>
+          </a:xfrm>
+          <a:prstGeom prst="rect">
+            <a:avLst/>
+          </a:prstGeom>
+        </p:spPr>
+        <p:txBody>
+          <a:bodyPr wrap="square">
+            <a:spAutoFit/>
+          </a:bodyPr>
+          <a:lstStyle/>
+          <a:p>
+            <a:r>
+              <a:rPr lang="en-US" dirty="0"/>
+              <a:t>0001: </a:t>
+            </a:r>
+            <a:r>
+              <a:rPr lang="en-US" dirty="0" err="1"/>
+              <a:t>buld</a:t>
+            </a:r>
+            <a:r>
+              <a:rPr lang="en-US" dirty="0"/>
+              <a:t> amorphous structure with via grid method 100 million  Argon molecules via grid method</a:t>
+            </a:r>
+          </a:p>
+        </p:txBody>
+      </p:sp>
+      <p:sp>
+        <p:nvSpPr>
+          <p:cNvPr id="3" name="Slide Number Placeholder 2">
+            <a:extLst>
+              <a:ext uri="{FF2B5EF4-FFF2-40B4-BE49-F238E27FC236}">
+                <a16:creationId xmlns:a16="http://schemas.microsoft.com/office/drawing/2014/main" id="{69888FE3-FC9F-C19C-4839-C34F1FAD5590}"/>
+              </a:ext>
+            </a:extLst>
+          </p:cNvPr>
+          <p:cNvSpPr>
+            <a:spLocks noGrp="1"/>
+          </p:cNvSpPr>
+          <p:nvPr>
+            <p:ph type="sldNum" sz="quarter" idx="12"/>
+          </p:nvPr>
+        </p:nvSpPr>
+        <p:spPr/>
+        <p:txBody>
+          <a:bodyPr/>
+          <a:lstStyle/>
+          <a:p>
+            <a:fld id="{CF79FC58-3559-EC47-B32E-5EF128B06581}" type="slidenum">
+              <a:rPr lang="en-US" smtClean="0"/>
+              <a:t>21</a:t>
+            </a:fld>
+            <a:endParaRPr lang="en-US"/>
+          </a:p>
+        </p:txBody>
+      </p:sp>
+    </p:spTree>
+    <p:extLst>
+      <p:ext uri="{BB962C8B-B14F-4D97-AF65-F5344CB8AC3E}">
+        <p14:creationId xmlns:p14="http://schemas.microsoft.com/office/powerpoint/2010/main" val="3383553538"/>
+      </p:ext>
+    </p:extLst>
+  </p:cSld>
+  <p:clrMapOvr>
+    <a:masterClrMapping/>
+  </p:clrMapOvr>
+</p:sld>
+</file>
+
+<file path=ppt/slides/slide22.xml><?xml version="1.0" encoding="utf-8"?>
+<p:sld xmlns:a="http://schemas.openxmlformats.org/drawingml/2006/main" xmlns:r="http://schemas.openxmlformats.org/officeDocument/2006/relationships" xmlns:p="http://schemas.openxmlformats.org/presentationml/2006/main">
+  <p:cSld>
+    <p:spTree>
+      <p:nvGrpSpPr>
         <p:cNvPr id="1" name=""/>
         <p:cNvGrpSpPr/>
         <p:nvPr/>
@@ -24313,7 +25374,7 @@
           <a:p>
             <a:fld id="{CF79FC58-3559-EC47-B32E-5EF128B06581}" type="slidenum">
               <a:rPr lang="en-US" smtClean="0"/>
-              <a:t>20</a:t>
+              <a:t>22</a:t>
             </a:fld>
             <a:endParaRPr lang="en-US"/>
           </a:p>
@@ -25614,7 +26675,7 @@
 </p:sld>
 </file>
 
-<file path=ppt/slides/slide21.xml><?xml version="1.0" encoding="utf-8"?>
+<file path=ppt/slides/slide23.xml><?xml version="1.0" encoding="utf-8"?>
 <p:sld xmlns:a="http://schemas.openxmlformats.org/drawingml/2006/main" xmlns:r="http://schemas.openxmlformats.org/officeDocument/2006/relationships" xmlns:p="http://schemas.openxmlformats.org/presentationml/2006/main">
   <p:cSld>
     <p:spTree>
@@ -25793,7 +26854,7 @@
           <a:p>
             <a:fld id="{CF79FC58-3559-EC47-B32E-5EF128B06581}" type="slidenum">
               <a:rPr lang="en-US" smtClean="0"/>
-              <a:t>21</a:t>
+              <a:t>23</a:t>
             </a:fld>
             <a:endParaRPr lang="en-US"/>
           </a:p>

</xml_diff>